<commit_message>
Finish the first batch of slides
</commit_message>
<xml_diff>
--- a/beginning-haskell.pptx
+++ b/beginning-haskell.pptx
@@ -4,6 +4,9 @@
   <p:sldMasterIdLst>
     <p:sldMasterId id="2147483648" r:id="rId1"/>
   </p:sldMasterIdLst>
+  <p:notesMasterIdLst>
+    <p:notesMasterId r:id="rId9"/>
+  </p:notesMasterIdLst>
   <p:sldIdLst>
     <p:sldId id="263" r:id="rId2"/>
     <p:sldId id="262" r:id="rId3"/>
@@ -11,6 +14,7 @@
     <p:sldId id="259" r:id="rId5"/>
     <p:sldId id="260" r:id="rId6"/>
     <p:sldId id="261" r:id="rId7"/>
+    <p:sldId id="264" r:id="rId8"/>
   </p:sldIdLst>
   <p:sldSz cx="9144000" cy="6858000" type="screen4x3"/>
   <p:notesSz cx="6858000" cy="9144000"/>
@@ -110,6 +114,452 @@
     </a:lvl9pPr>
   </p:defaultTextStyle>
 </p:presentation>
+</file>
+
+<file path=ppt/notesMasters/notesMaster1.xml><?xml version="1.0" encoding="utf-8"?>
+<p:notesMaster xmlns:a="http://schemas.openxmlformats.org/drawingml/2006/main" xmlns:r="http://schemas.openxmlformats.org/officeDocument/2006/relationships" xmlns:p="http://schemas.openxmlformats.org/presentationml/2006/main">
+  <p:cSld>
+    <p:bg>
+      <p:bgRef idx="1001">
+        <a:schemeClr val="bg1"/>
+      </p:bgRef>
+    </p:bg>
+    <p:spTree>
+      <p:nvGrpSpPr>
+        <p:cNvPr id="1" name=""/>
+        <p:cNvGrpSpPr/>
+        <p:nvPr/>
+      </p:nvGrpSpPr>
+      <p:grpSpPr>
+        <a:xfrm>
+          <a:off x="0" y="0"/>
+          <a:ext cx="0" cy="0"/>
+          <a:chOff x="0" y="0"/>
+          <a:chExt cx="0" cy="0"/>
+        </a:xfrm>
+      </p:grpSpPr>
+      <p:sp>
+        <p:nvSpPr>
+          <p:cNvPr id="2" name="Header Placeholder 1"/>
+          <p:cNvSpPr>
+            <a:spLocks noGrp="1"/>
+          </p:cNvSpPr>
+          <p:nvPr>
+            <p:ph type="hdr" sz="quarter"/>
+          </p:nvPr>
+        </p:nvSpPr>
+        <p:spPr>
+          <a:xfrm>
+            <a:off x="0" y="0"/>
+            <a:ext cx="2971800" cy="457200"/>
+          </a:xfrm>
+          <a:prstGeom prst="rect">
+            <a:avLst/>
+          </a:prstGeom>
+        </p:spPr>
+        <p:txBody>
+          <a:bodyPr vert="horz" lIns="91440" tIns="45720" rIns="91440" bIns="45720" rtlCol="0"/>
+          <a:lstStyle>
+            <a:lvl1pPr algn="l">
+              <a:defRPr sz="1200"/>
+            </a:lvl1pPr>
+          </a:lstStyle>
+          <a:p>
+            <a:endParaRPr lang="en-GB" dirty="0"/>
+          </a:p>
+        </p:txBody>
+      </p:sp>
+      <p:sp>
+        <p:nvSpPr>
+          <p:cNvPr id="3" name="Date Placeholder 2"/>
+          <p:cNvSpPr>
+            <a:spLocks noGrp="1"/>
+          </p:cNvSpPr>
+          <p:nvPr>
+            <p:ph type="dt" idx="1"/>
+          </p:nvPr>
+        </p:nvSpPr>
+        <p:spPr>
+          <a:xfrm>
+            <a:off x="3884613" y="0"/>
+            <a:ext cx="2971800" cy="457200"/>
+          </a:xfrm>
+          <a:prstGeom prst="rect">
+            <a:avLst/>
+          </a:prstGeom>
+        </p:spPr>
+        <p:txBody>
+          <a:bodyPr vert="horz" lIns="91440" tIns="45720" rIns="91440" bIns="45720" rtlCol="0"/>
+          <a:lstStyle>
+            <a:lvl1pPr algn="r">
+              <a:defRPr sz="1200"/>
+            </a:lvl1pPr>
+          </a:lstStyle>
+          <a:p>
+            <a:fld id="{AD3FA50F-1914-4298-B603-A4EE2FCB29C0}" type="datetimeFigureOut">
+              <a:rPr lang="en-GB" smtClean="0"/>
+              <a:t>31/08/2015</a:t>
+            </a:fld>
+            <a:endParaRPr lang="en-GB" dirty="0"/>
+          </a:p>
+        </p:txBody>
+      </p:sp>
+      <p:sp>
+        <p:nvSpPr>
+          <p:cNvPr id="4" name="Slide Image Placeholder 3"/>
+          <p:cNvSpPr>
+            <a:spLocks noGrp="1" noRot="1" noChangeAspect="1"/>
+          </p:cNvSpPr>
+          <p:nvPr>
+            <p:ph type="sldImg" idx="2"/>
+          </p:nvPr>
+        </p:nvSpPr>
+        <p:spPr>
+          <a:xfrm>
+            <a:off x="1143000" y="685800"/>
+            <a:ext cx="4572000" cy="3429000"/>
+          </a:xfrm>
+          <a:prstGeom prst="rect">
+            <a:avLst/>
+          </a:prstGeom>
+          <a:noFill/>
+          <a:ln w="12700">
+            <a:solidFill>
+              <a:prstClr val="black"/>
+            </a:solidFill>
+          </a:ln>
+        </p:spPr>
+        <p:txBody>
+          <a:bodyPr vert="horz" lIns="91440" tIns="45720" rIns="91440" bIns="45720" rtlCol="0" anchor="ctr"/>
+          <a:lstStyle/>
+          <a:p>
+            <a:endParaRPr lang="en-GB" dirty="0"/>
+          </a:p>
+        </p:txBody>
+      </p:sp>
+      <p:sp>
+        <p:nvSpPr>
+          <p:cNvPr id="5" name="Notes Placeholder 4"/>
+          <p:cNvSpPr>
+            <a:spLocks noGrp="1"/>
+          </p:cNvSpPr>
+          <p:nvPr>
+            <p:ph type="body" sz="quarter" idx="3"/>
+          </p:nvPr>
+        </p:nvSpPr>
+        <p:spPr>
+          <a:xfrm>
+            <a:off x="685800" y="4343400"/>
+            <a:ext cx="5486400" cy="4114800"/>
+          </a:xfrm>
+          <a:prstGeom prst="rect">
+            <a:avLst/>
+          </a:prstGeom>
+        </p:spPr>
+        <p:txBody>
+          <a:bodyPr vert="horz" lIns="91440" tIns="45720" rIns="91440" bIns="45720" rtlCol="0"/>
+          <a:lstStyle/>
+          <a:p>
+            <a:pPr lvl="0"/>
+            <a:r>
+              <a:rPr lang="en-US" smtClean="0"/>
+              <a:t>Click to edit Master text styles</a:t>
+            </a:r>
+          </a:p>
+          <a:p>
+            <a:pPr lvl="1"/>
+            <a:r>
+              <a:rPr lang="en-US" smtClean="0"/>
+              <a:t>Second level</a:t>
+            </a:r>
+          </a:p>
+          <a:p>
+            <a:pPr lvl="2"/>
+            <a:r>
+              <a:rPr lang="en-US" smtClean="0"/>
+              <a:t>Third level</a:t>
+            </a:r>
+          </a:p>
+          <a:p>
+            <a:pPr lvl="3"/>
+            <a:r>
+              <a:rPr lang="en-US" smtClean="0"/>
+              <a:t>Fourth level</a:t>
+            </a:r>
+          </a:p>
+          <a:p>
+            <a:pPr lvl="4"/>
+            <a:r>
+              <a:rPr lang="en-US" smtClean="0"/>
+              <a:t>Fifth level</a:t>
+            </a:r>
+            <a:endParaRPr lang="en-GB"/>
+          </a:p>
+        </p:txBody>
+      </p:sp>
+      <p:sp>
+        <p:nvSpPr>
+          <p:cNvPr id="6" name="Footer Placeholder 5"/>
+          <p:cNvSpPr>
+            <a:spLocks noGrp="1"/>
+          </p:cNvSpPr>
+          <p:nvPr>
+            <p:ph type="ftr" sz="quarter" idx="4"/>
+          </p:nvPr>
+        </p:nvSpPr>
+        <p:spPr>
+          <a:xfrm>
+            <a:off x="0" y="8685213"/>
+            <a:ext cx="2971800" cy="457200"/>
+          </a:xfrm>
+          <a:prstGeom prst="rect">
+            <a:avLst/>
+          </a:prstGeom>
+        </p:spPr>
+        <p:txBody>
+          <a:bodyPr vert="horz" lIns="91440" tIns="45720" rIns="91440" bIns="45720" rtlCol="0" anchor="b"/>
+          <a:lstStyle>
+            <a:lvl1pPr algn="l">
+              <a:defRPr sz="1200"/>
+            </a:lvl1pPr>
+          </a:lstStyle>
+          <a:p>
+            <a:endParaRPr lang="en-GB" dirty="0"/>
+          </a:p>
+        </p:txBody>
+      </p:sp>
+      <p:sp>
+        <p:nvSpPr>
+          <p:cNvPr id="7" name="Slide Number Placeholder 6"/>
+          <p:cNvSpPr>
+            <a:spLocks noGrp="1"/>
+          </p:cNvSpPr>
+          <p:nvPr>
+            <p:ph type="sldNum" sz="quarter" idx="5"/>
+          </p:nvPr>
+        </p:nvSpPr>
+        <p:spPr>
+          <a:xfrm>
+            <a:off x="3884613" y="8685213"/>
+            <a:ext cx="2971800" cy="457200"/>
+          </a:xfrm>
+          <a:prstGeom prst="rect">
+            <a:avLst/>
+          </a:prstGeom>
+        </p:spPr>
+        <p:txBody>
+          <a:bodyPr vert="horz" lIns="91440" tIns="45720" rIns="91440" bIns="45720" rtlCol="0" anchor="b"/>
+          <a:lstStyle>
+            <a:lvl1pPr algn="r">
+              <a:defRPr sz="1200"/>
+            </a:lvl1pPr>
+          </a:lstStyle>
+          <a:p>
+            <a:fld id="{999CC533-FB79-4577-A6D0-2326348CB1C0}" type="slidenum">
+              <a:rPr lang="en-GB" smtClean="0"/>
+              <a:t>‹#›</a:t>
+            </a:fld>
+            <a:endParaRPr lang="en-GB" dirty="0"/>
+          </a:p>
+        </p:txBody>
+      </p:sp>
+    </p:spTree>
+    <p:extLst>
+      <p:ext uri="{BB962C8B-B14F-4D97-AF65-F5344CB8AC3E}">
+        <p14:creationId xmlns:p14="http://schemas.microsoft.com/office/powerpoint/2010/main" val="1168641221"/>
+      </p:ext>
+    </p:extLst>
+  </p:cSld>
+  <p:clrMap bg1="lt1" tx1="dk1" bg2="lt2" tx2="dk2" accent1="accent1" accent2="accent2" accent3="accent3" accent4="accent4" accent5="accent5" accent6="accent6" hlink="hlink" folHlink="folHlink"/>
+  <p:notesStyle>
+    <a:lvl1pPr marL="0" algn="l" defTabSz="914400" rtl="0" eaLnBrk="1" latinLnBrk="0" hangingPunct="1">
+      <a:defRPr sz="1200" kern="1200">
+        <a:solidFill>
+          <a:schemeClr val="tx1"/>
+        </a:solidFill>
+        <a:latin typeface="+mn-lt"/>
+        <a:ea typeface="+mn-ea"/>
+        <a:cs typeface="+mn-cs"/>
+      </a:defRPr>
+    </a:lvl1pPr>
+    <a:lvl2pPr marL="457200" algn="l" defTabSz="914400" rtl="0" eaLnBrk="1" latinLnBrk="0" hangingPunct="1">
+      <a:defRPr sz="1200" kern="1200">
+        <a:solidFill>
+          <a:schemeClr val="tx1"/>
+        </a:solidFill>
+        <a:latin typeface="+mn-lt"/>
+        <a:ea typeface="+mn-ea"/>
+        <a:cs typeface="+mn-cs"/>
+      </a:defRPr>
+    </a:lvl2pPr>
+    <a:lvl3pPr marL="914400" algn="l" defTabSz="914400" rtl="0" eaLnBrk="1" latinLnBrk="0" hangingPunct="1">
+      <a:defRPr sz="1200" kern="1200">
+        <a:solidFill>
+          <a:schemeClr val="tx1"/>
+        </a:solidFill>
+        <a:latin typeface="+mn-lt"/>
+        <a:ea typeface="+mn-ea"/>
+        <a:cs typeface="+mn-cs"/>
+      </a:defRPr>
+    </a:lvl3pPr>
+    <a:lvl4pPr marL="1371600" algn="l" defTabSz="914400" rtl="0" eaLnBrk="1" latinLnBrk="0" hangingPunct="1">
+      <a:defRPr sz="1200" kern="1200">
+        <a:solidFill>
+          <a:schemeClr val="tx1"/>
+        </a:solidFill>
+        <a:latin typeface="+mn-lt"/>
+        <a:ea typeface="+mn-ea"/>
+        <a:cs typeface="+mn-cs"/>
+      </a:defRPr>
+    </a:lvl4pPr>
+    <a:lvl5pPr marL="1828800" algn="l" defTabSz="914400" rtl="0" eaLnBrk="1" latinLnBrk="0" hangingPunct="1">
+      <a:defRPr sz="1200" kern="1200">
+        <a:solidFill>
+          <a:schemeClr val="tx1"/>
+        </a:solidFill>
+        <a:latin typeface="+mn-lt"/>
+        <a:ea typeface="+mn-ea"/>
+        <a:cs typeface="+mn-cs"/>
+      </a:defRPr>
+    </a:lvl5pPr>
+    <a:lvl6pPr marL="2286000" algn="l" defTabSz="914400" rtl="0" eaLnBrk="1" latinLnBrk="0" hangingPunct="1">
+      <a:defRPr sz="1200" kern="1200">
+        <a:solidFill>
+          <a:schemeClr val="tx1"/>
+        </a:solidFill>
+        <a:latin typeface="+mn-lt"/>
+        <a:ea typeface="+mn-ea"/>
+        <a:cs typeface="+mn-cs"/>
+      </a:defRPr>
+    </a:lvl6pPr>
+    <a:lvl7pPr marL="2743200" algn="l" defTabSz="914400" rtl="0" eaLnBrk="1" latinLnBrk="0" hangingPunct="1">
+      <a:defRPr sz="1200" kern="1200">
+        <a:solidFill>
+          <a:schemeClr val="tx1"/>
+        </a:solidFill>
+        <a:latin typeface="+mn-lt"/>
+        <a:ea typeface="+mn-ea"/>
+        <a:cs typeface="+mn-cs"/>
+      </a:defRPr>
+    </a:lvl7pPr>
+    <a:lvl8pPr marL="3200400" algn="l" defTabSz="914400" rtl="0" eaLnBrk="1" latinLnBrk="0" hangingPunct="1">
+      <a:defRPr sz="1200" kern="1200">
+        <a:solidFill>
+          <a:schemeClr val="tx1"/>
+        </a:solidFill>
+        <a:latin typeface="+mn-lt"/>
+        <a:ea typeface="+mn-ea"/>
+        <a:cs typeface="+mn-cs"/>
+      </a:defRPr>
+    </a:lvl8pPr>
+    <a:lvl9pPr marL="3657600" algn="l" defTabSz="914400" rtl="0" eaLnBrk="1" latinLnBrk="0" hangingPunct="1">
+      <a:defRPr sz="1200" kern="1200">
+        <a:solidFill>
+          <a:schemeClr val="tx1"/>
+        </a:solidFill>
+        <a:latin typeface="+mn-lt"/>
+        <a:ea typeface="+mn-ea"/>
+        <a:cs typeface="+mn-cs"/>
+      </a:defRPr>
+    </a:lvl9pPr>
+  </p:notesStyle>
+</p:notesMaster>
+</file>
+
+<file path=ppt/notesSlides/notesSlide1.xml><?xml version="1.0" encoding="utf-8"?>
+<p:notes xmlns:a="http://schemas.openxmlformats.org/drawingml/2006/main" xmlns:r="http://schemas.openxmlformats.org/officeDocument/2006/relationships" xmlns:p="http://schemas.openxmlformats.org/presentationml/2006/main">
+  <p:cSld>
+    <p:spTree>
+      <p:nvGrpSpPr>
+        <p:cNvPr id="1" name=""/>
+        <p:cNvGrpSpPr/>
+        <p:nvPr/>
+      </p:nvGrpSpPr>
+      <p:grpSpPr>
+        <a:xfrm>
+          <a:off x="0" y="0"/>
+          <a:ext cx="0" cy="0"/>
+          <a:chOff x="0" y="0"/>
+          <a:chExt cx="0" cy="0"/>
+        </a:xfrm>
+      </p:grpSpPr>
+      <p:sp>
+        <p:nvSpPr>
+          <p:cNvPr id="2" name="Slide Image Placeholder 1"/>
+          <p:cNvSpPr>
+            <a:spLocks noGrp="1" noRot="1" noChangeAspect="1"/>
+          </p:cNvSpPr>
+          <p:nvPr>
+            <p:ph type="sldImg"/>
+          </p:nvPr>
+        </p:nvSpPr>
+        <p:spPr/>
+      </p:sp>
+      <p:sp>
+        <p:nvSpPr>
+          <p:cNvPr id="3" name="Notes Placeholder 2"/>
+          <p:cNvSpPr>
+            <a:spLocks noGrp="1"/>
+          </p:cNvSpPr>
+          <p:nvPr>
+            <p:ph type="body" idx="1"/>
+          </p:nvPr>
+        </p:nvSpPr>
+        <p:spPr/>
+        <p:txBody>
+          <a:bodyPr/>
+          <a:lstStyle/>
+          <a:p>
+            <a:r>
+              <a:rPr lang="en-GB" dirty="0" smtClean="0"/>
+              <a:t>These slides accompany a two-hour “Beginning</a:t>
+            </a:r>
+            <a:r>
+              <a:rPr lang="en-GB" baseline="0" dirty="0" smtClean="0"/>
+              <a:t> Haskell</a:t>
+            </a:r>
+            <a:r>
+              <a:rPr lang="en-GB" baseline="0" smtClean="0"/>
+              <a:t>” course.</a:t>
+            </a:r>
+            <a:endParaRPr lang="en-GB" dirty="0"/>
+          </a:p>
+        </p:txBody>
+      </p:sp>
+      <p:sp>
+        <p:nvSpPr>
+          <p:cNvPr id="4" name="Slide Number Placeholder 3"/>
+          <p:cNvSpPr>
+            <a:spLocks noGrp="1"/>
+          </p:cNvSpPr>
+          <p:nvPr>
+            <p:ph type="sldNum" sz="quarter" idx="10"/>
+          </p:nvPr>
+        </p:nvSpPr>
+        <p:spPr/>
+        <p:txBody>
+          <a:bodyPr/>
+          <a:lstStyle/>
+          <a:p>
+            <a:fld id="{999CC533-FB79-4577-A6D0-2326348CB1C0}" type="slidenum">
+              <a:rPr lang="en-GB" smtClean="0"/>
+              <a:t>1</a:t>
+            </a:fld>
+            <a:endParaRPr lang="en-GB" dirty="0"/>
+          </a:p>
+        </p:txBody>
+      </p:sp>
+    </p:spTree>
+    <p:extLst>
+      <p:ext uri="{BB962C8B-B14F-4D97-AF65-F5344CB8AC3E}">
+        <p14:creationId xmlns:p14="http://schemas.microsoft.com/office/powerpoint/2010/main" val="4125636590"/>
+      </p:ext>
+    </p:extLst>
+  </p:cSld>
+  <p:clrMapOvr>
+    <a:masterClrMapping/>
+  </p:clrMapOvr>
+</p:notes>
 </file>
 
 <file path=ppt/slideLayouts/slideLayout1.xml><?xml version="1.0" encoding="utf-8"?>
@@ -4572,7 +5022,7 @@
         </p:nvSpPr>
         <p:spPr>
           <a:xfrm>
-            <a:off x="539551" y="1772816"/>
+            <a:off x="539551" y="2803575"/>
             <a:ext cx="2552302" cy="769441"/>
           </a:xfrm>
           <a:prstGeom prst="rect">
@@ -4608,7 +5058,7 @@
         </p:nvSpPr>
         <p:spPr>
           <a:xfrm>
-            <a:off x="4860032" y="1772816"/>
+            <a:off x="4860032" y="2803575"/>
             <a:ext cx="2552302" cy="769441"/>
           </a:xfrm>
           <a:prstGeom prst="rect">
@@ -4661,7 +5111,7 @@
         </p:nvSpPr>
         <p:spPr>
           <a:xfrm>
-            <a:off x="539551" y="3140968"/>
+            <a:off x="539551" y="4027711"/>
             <a:ext cx="8302273" cy="769441"/>
           </a:xfrm>
           <a:prstGeom prst="rect">
@@ -4748,8 +5198,8 @@
         </p:nvSpPr>
         <p:spPr>
           <a:xfrm>
-            <a:off x="533874" y="4509120"/>
-            <a:ext cx="3905236" cy="769441"/>
+            <a:off x="533874" y="5157192"/>
+            <a:ext cx="6272871" cy="769441"/>
           </a:xfrm>
           <a:prstGeom prst="rect">
             <a:avLst/>
@@ -4767,7 +5217,7 @@
                 <a:latin typeface="Courier New" panose="02070309020205020404" pitchFamily="49" charset="0"/>
                 <a:cs typeface="Courier New" panose="02070309020205020404" pitchFamily="49" charset="0"/>
               </a:rPr>
-              <a:t>sqrt sqrt 2</a:t>
+              <a:t>sin cos tan sqrt 2</a:t>
             </a:r>
             <a:endParaRPr lang="en-GB" sz="4400" dirty="0">
               <a:latin typeface="Courier New" panose="02070309020205020404" pitchFamily="49" charset="0"/>
@@ -4784,8 +5234,8 @@
         </p:nvCxnSpPr>
         <p:spPr>
           <a:xfrm>
-            <a:off x="755576" y="4437112"/>
-            <a:ext cx="3384376" cy="1008112"/>
+            <a:off x="755576" y="5085184"/>
+            <a:ext cx="5760640" cy="1008112"/>
           </a:xfrm>
           <a:prstGeom prst="line">
             <a:avLst/>
@@ -4811,10 +5261,627 @@
           </a:fontRef>
         </p:style>
       </p:cxnSp>
+      <p:sp>
+        <p:nvSpPr>
+          <p:cNvPr id="12" name="TextBox 11"/>
+          <p:cNvSpPr txBox="1"/>
+          <p:nvPr/>
+        </p:nvSpPr>
+        <p:spPr>
+          <a:xfrm>
+            <a:off x="539551" y="1556792"/>
+            <a:ext cx="1199367" cy="769441"/>
+          </a:xfrm>
+          <a:prstGeom prst="rect">
+            <a:avLst/>
+          </a:prstGeom>
+          <a:noFill/>
+        </p:spPr>
+        <p:txBody>
+          <a:bodyPr wrap="none" rtlCol="0">
+            <a:spAutoFit/>
+          </a:bodyPr>
+          <a:lstStyle/>
+          <a:p>
+            <a:r>
+              <a:rPr lang="en-GB" sz="4400" dirty="0" smtClean="0">
+                <a:latin typeface="Courier New" panose="02070309020205020404" pitchFamily="49" charset="0"/>
+                <a:cs typeface="Courier New" panose="02070309020205020404" pitchFamily="49" charset="0"/>
+              </a:rPr>
+              <a:t>f x</a:t>
+            </a:r>
+            <a:endParaRPr lang="en-GB" sz="4400" dirty="0">
+              <a:latin typeface="Courier New" panose="02070309020205020404" pitchFamily="49" charset="0"/>
+              <a:cs typeface="Courier New" panose="02070309020205020404" pitchFamily="49" charset="0"/>
+            </a:endParaRPr>
+          </a:p>
+        </p:txBody>
+      </p:sp>
+      <p:sp>
+        <p:nvSpPr>
+          <p:cNvPr id="13" name="TextBox 12"/>
+          <p:cNvSpPr txBox="1"/>
+          <p:nvPr/>
+        </p:nvSpPr>
+        <p:spPr>
+          <a:xfrm>
+            <a:off x="4860032" y="1556792"/>
+            <a:ext cx="1875835" cy="769441"/>
+          </a:xfrm>
+          <a:prstGeom prst="rect">
+            <a:avLst/>
+          </a:prstGeom>
+          <a:noFill/>
+        </p:spPr>
+        <p:txBody>
+          <a:bodyPr wrap="none" rtlCol="0">
+            <a:spAutoFit/>
+          </a:bodyPr>
+          <a:lstStyle/>
+          <a:p>
+            <a:r>
+              <a:rPr lang="en-GB" sz="4400" dirty="0">
+                <a:latin typeface="Courier New" panose="02070309020205020404" pitchFamily="49" charset="0"/>
+                <a:cs typeface="Courier New" panose="02070309020205020404" pitchFamily="49" charset="0"/>
+              </a:rPr>
+              <a:t>f</a:t>
+            </a:r>
+            <a:r>
+              <a:rPr lang="en-GB" sz="4400" dirty="0" smtClean="0">
+                <a:latin typeface="Courier New" panose="02070309020205020404" pitchFamily="49" charset="0"/>
+                <a:cs typeface="Courier New" panose="02070309020205020404" pitchFamily="49" charset="0"/>
+              </a:rPr>
+              <a:t> </a:t>
+            </a:r>
+            <a:r>
+              <a:rPr lang="en-GB" sz="4400" dirty="0" smtClean="0">
+                <a:solidFill>
+                  <a:srgbClr val="FF0000"/>
+                </a:solidFill>
+                <a:latin typeface="Courier New" panose="02070309020205020404" pitchFamily="49" charset="0"/>
+                <a:cs typeface="Courier New" panose="02070309020205020404" pitchFamily="49" charset="0"/>
+              </a:rPr>
+              <a:t>$</a:t>
+            </a:r>
+            <a:r>
+              <a:rPr lang="en-GB" sz="4400" dirty="0" smtClean="0">
+                <a:latin typeface="Courier New" panose="02070309020205020404" pitchFamily="49" charset="0"/>
+                <a:cs typeface="Courier New" panose="02070309020205020404" pitchFamily="49" charset="0"/>
+              </a:rPr>
+              <a:t> x</a:t>
+            </a:r>
+            <a:endParaRPr lang="en-GB" sz="4400" dirty="0">
+              <a:latin typeface="Courier New" panose="02070309020205020404" pitchFamily="49" charset="0"/>
+              <a:cs typeface="Courier New" panose="02070309020205020404" pitchFamily="49" charset="0"/>
+            </a:endParaRPr>
+          </a:p>
+        </p:txBody>
+      </p:sp>
     </p:spTree>
     <p:extLst>
       <p:ext uri="{BB962C8B-B14F-4D97-AF65-F5344CB8AC3E}">
         <p14:creationId xmlns:p14="http://schemas.microsoft.com/office/powerpoint/2010/main" val="1796922849"/>
+      </p:ext>
+    </p:extLst>
+  </p:cSld>
+  <p:clrMapOvr>
+    <a:masterClrMapping/>
+  </p:clrMapOvr>
+  <p:timing>
+    <p:tnLst>
+      <p:par>
+        <p:cTn id="1" dur="indefinite" restart="never" nodeType="tmRoot">
+          <p:childTnLst>
+            <p:seq concurrent="1" nextAc="seek">
+              <p:cTn id="2" dur="indefinite" nodeType="mainSeq">
+                <p:childTnLst>
+                  <p:par>
+                    <p:cTn id="3" fill="hold">
+                      <p:stCondLst>
+                        <p:cond delay="indefinite"/>
+                      </p:stCondLst>
+                      <p:childTnLst>
+                        <p:par>
+                          <p:cTn id="4" fill="hold">
+                            <p:stCondLst>
+                              <p:cond delay="0"/>
+                            </p:stCondLst>
+                            <p:childTnLst>
+                              <p:par>
+                                <p:cTn id="5" presetID="1" presetClass="entr" presetSubtype="0" fill="hold" grpId="0" nodeType="clickEffect">
+                                  <p:stCondLst>
+                                    <p:cond delay="0"/>
+                                  </p:stCondLst>
+                                  <p:childTnLst>
+                                    <p:set>
+                                      <p:cBhvr>
+                                        <p:cTn id="6" dur="1" fill="hold">
+                                          <p:stCondLst>
+                                            <p:cond delay="0"/>
+                                          </p:stCondLst>
+                                        </p:cTn>
+                                        <p:tgtEl>
+                                          <p:spTgt spid="12"/>
+                                        </p:tgtEl>
+                                        <p:attrNameLst>
+                                          <p:attrName>style.visibility</p:attrName>
+                                        </p:attrNameLst>
+                                      </p:cBhvr>
+                                      <p:to>
+                                        <p:strVal val="visible"/>
+                                      </p:to>
+                                    </p:set>
+                                  </p:childTnLst>
+                                </p:cTn>
+                              </p:par>
+                            </p:childTnLst>
+                          </p:cTn>
+                        </p:par>
+                      </p:childTnLst>
+                    </p:cTn>
+                  </p:par>
+                  <p:par>
+                    <p:cTn id="7" fill="hold">
+                      <p:stCondLst>
+                        <p:cond delay="indefinite"/>
+                      </p:stCondLst>
+                      <p:childTnLst>
+                        <p:par>
+                          <p:cTn id="8" fill="hold">
+                            <p:stCondLst>
+                              <p:cond delay="0"/>
+                            </p:stCondLst>
+                            <p:childTnLst>
+                              <p:par>
+                                <p:cTn id="9" presetID="1" presetClass="entr" presetSubtype="0" fill="hold" grpId="0" nodeType="clickEffect">
+                                  <p:stCondLst>
+                                    <p:cond delay="0"/>
+                                  </p:stCondLst>
+                                  <p:childTnLst>
+                                    <p:set>
+                                      <p:cBhvr>
+                                        <p:cTn id="10" dur="1" fill="hold">
+                                          <p:stCondLst>
+                                            <p:cond delay="0"/>
+                                          </p:stCondLst>
+                                        </p:cTn>
+                                        <p:tgtEl>
+                                          <p:spTgt spid="13"/>
+                                        </p:tgtEl>
+                                        <p:attrNameLst>
+                                          <p:attrName>style.visibility</p:attrName>
+                                        </p:attrNameLst>
+                                      </p:cBhvr>
+                                      <p:to>
+                                        <p:strVal val="visible"/>
+                                      </p:to>
+                                    </p:set>
+                                  </p:childTnLst>
+                                </p:cTn>
+                              </p:par>
+                            </p:childTnLst>
+                          </p:cTn>
+                        </p:par>
+                      </p:childTnLst>
+                    </p:cTn>
+                  </p:par>
+                  <p:par>
+                    <p:cTn id="11" fill="hold">
+                      <p:stCondLst>
+                        <p:cond delay="indefinite"/>
+                      </p:stCondLst>
+                      <p:childTnLst>
+                        <p:par>
+                          <p:cTn id="12" fill="hold">
+                            <p:stCondLst>
+                              <p:cond delay="0"/>
+                            </p:stCondLst>
+                            <p:childTnLst>
+                              <p:par>
+                                <p:cTn id="13" presetID="1" presetClass="entr" presetSubtype="0" fill="hold" grpId="0" nodeType="clickEffect">
+                                  <p:stCondLst>
+                                    <p:cond delay="0"/>
+                                  </p:stCondLst>
+                                  <p:childTnLst>
+                                    <p:set>
+                                      <p:cBhvr>
+                                        <p:cTn id="14" dur="1" fill="hold">
+                                          <p:stCondLst>
+                                            <p:cond delay="0"/>
+                                          </p:stCondLst>
+                                        </p:cTn>
+                                        <p:tgtEl>
+                                          <p:spTgt spid="4"/>
+                                        </p:tgtEl>
+                                        <p:attrNameLst>
+                                          <p:attrName>style.visibility</p:attrName>
+                                        </p:attrNameLst>
+                                      </p:cBhvr>
+                                      <p:to>
+                                        <p:strVal val="visible"/>
+                                      </p:to>
+                                    </p:set>
+                                  </p:childTnLst>
+                                </p:cTn>
+                              </p:par>
+                            </p:childTnLst>
+                          </p:cTn>
+                        </p:par>
+                      </p:childTnLst>
+                    </p:cTn>
+                  </p:par>
+                  <p:par>
+                    <p:cTn id="15" fill="hold">
+                      <p:stCondLst>
+                        <p:cond delay="indefinite"/>
+                      </p:stCondLst>
+                      <p:childTnLst>
+                        <p:par>
+                          <p:cTn id="16" fill="hold">
+                            <p:stCondLst>
+                              <p:cond delay="0"/>
+                            </p:stCondLst>
+                            <p:childTnLst>
+                              <p:par>
+                                <p:cTn id="17" presetID="1" presetClass="entr" presetSubtype="0" fill="hold" grpId="0" nodeType="clickEffect">
+                                  <p:stCondLst>
+                                    <p:cond delay="0"/>
+                                  </p:stCondLst>
+                                  <p:childTnLst>
+                                    <p:set>
+                                      <p:cBhvr>
+                                        <p:cTn id="18" dur="1" fill="hold">
+                                          <p:stCondLst>
+                                            <p:cond delay="0"/>
+                                          </p:stCondLst>
+                                        </p:cTn>
+                                        <p:tgtEl>
+                                          <p:spTgt spid="5"/>
+                                        </p:tgtEl>
+                                        <p:attrNameLst>
+                                          <p:attrName>style.visibility</p:attrName>
+                                        </p:attrNameLst>
+                                      </p:cBhvr>
+                                      <p:to>
+                                        <p:strVal val="visible"/>
+                                      </p:to>
+                                    </p:set>
+                                  </p:childTnLst>
+                                </p:cTn>
+                              </p:par>
+                            </p:childTnLst>
+                          </p:cTn>
+                        </p:par>
+                      </p:childTnLst>
+                    </p:cTn>
+                  </p:par>
+                  <p:par>
+                    <p:cTn id="19" fill="hold">
+                      <p:stCondLst>
+                        <p:cond delay="indefinite"/>
+                      </p:stCondLst>
+                      <p:childTnLst>
+                        <p:par>
+                          <p:cTn id="20" fill="hold">
+                            <p:stCondLst>
+                              <p:cond delay="0"/>
+                            </p:stCondLst>
+                            <p:childTnLst>
+                              <p:par>
+                                <p:cTn id="21" presetID="1" presetClass="entr" presetSubtype="0" fill="hold" grpId="0" nodeType="clickEffect">
+                                  <p:stCondLst>
+                                    <p:cond delay="0"/>
+                                  </p:stCondLst>
+                                  <p:childTnLst>
+                                    <p:set>
+                                      <p:cBhvr>
+                                        <p:cTn id="22" dur="1" fill="hold">
+                                          <p:stCondLst>
+                                            <p:cond delay="0"/>
+                                          </p:stCondLst>
+                                        </p:cTn>
+                                        <p:tgtEl>
+                                          <p:spTgt spid="6"/>
+                                        </p:tgtEl>
+                                        <p:attrNameLst>
+                                          <p:attrName>style.visibility</p:attrName>
+                                        </p:attrNameLst>
+                                      </p:cBhvr>
+                                      <p:to>
+                                        <p:strVal val="visible"/>
+                                      </p:to>
+                                    </p:set>
+                                  </p:childTnLst>
+                                </p:cTn>
+                              </p:par>
+                            </p:childTnLst>
+                          </p:cTn>
+                        </p:par>
+                      </p:childTnLst>
+                    </p:cTn>
+                  </p:par>
+                  <p:par>
+                    <p:cTn id="23" fill="hold">
+                      <p:stCondLst>
+                        <p:cond delay="indefinite"/>
+                      </p:stCondLst>
+                      <p:childTnLst>
+                        <p:par>
+                          <p:cTn id="24" fill="hold">
+                            <p:stCondLst>
+                              <p:cond delay="0"/>
+                            </p:stCondLst>
+                            <p:childTnLst>
+                              <p:par>
+                                <p:cTn id="25" presetID="1" presetClass="entr" presetSubtype="0" fill="hold" grpId="0" nodeType="clickEffect">
+                                  <p:stCondLst>
+                                    <p:cond delay="0"/>
+                                  </p:stCondLst>
+                                  <p:childTnLst>
+                                    <p:set>
+                                      <p:cBhvr>
+                                        <p:cTn id="26" dur="1" fill="hold">
+                                          <p:stCondLst>
+                                            <p:cond delay="0"/>
+                                          </p:stCondLst>
+                                        </p:cTn>
+                                        <p:tgtEl>
+                                          <p:spTgt spid="7"/>
+                                        </p:tgtEl>
+                                        <p:attrNameLst>
+                                          <p:attrName>style.visibility</p:attrName>
+                                        </p:attrNameLst>
+                                      </p:cBhvr>
+                                      <p:to>
+                                        <p:strVal val="visible"/>
+                                      </p:to>
+                                    </p:set>
+                                  </p:childTnLst>
+                                </p:cTn>
+                              </p:par>
+                              <p:par>
+                                <p:cTn id="27" presetID="1" presetClass="entr" presetSubtype="0" fill="hold" nodeType="withEffect">
+                                  <p:stCondLst>
+                                    <p:cond delay="0"/>
+                                  </p:stCondLst>
+                                  <p:childTnLst>
+                                    <p:set>
+                                      <p:cBhvr>
+                                        <p:cTn id="28" dur="1" fill="hold">
+                                          <p:stCondLst>
+                                            <p:cond delay="0"/>
+                                          </p:stCondLst>
+                                        </p:cTn>
+                                        <p:tgtEl>
+                                          <p:spTgt spid="8"/>
+                                        </p:tgtEl>
+                                        <p:attrNameLst>
+                                          <p:attrName>style.visibility</p:attrName>
+                                        </p:attrNameLst>
+                                      </p:cBhvr>
+                                      <p:to>
+                                        <p:strVal val="visible"/>
+                                      </p:to>
+                                    </p:set>
+                                  </p:childTnLst>
+                                </p:cTn>
+                              </p:par>
+                            </p:childTnLst>
+                          </p:cTn>
+                        </p:par>
+                      </p:childTnLst>
+                    </p:cTn>
+                  </p:par>
+                </p:childTnLst>
+              </p:cTn>
+              <p:prevCondLst>
+                <p:cond evt="onPrev" delay="0">
+                  <p:tgtEl>
+                    <p:sldTgt/>
+                  </p:tgtEl>
+                </p:cond>
+              </p:prevCondLst>
+              <p:nextCondLst>
+                <p:cond evt="onNext" delay="0">
+                  <p:tgtEl>
+                    <p:sldTgt/>
+                  </p:tgtEl>
+                </p:cond>
+              </p:nextCondLst>
+            </p:seq>
+          </p:childTnLst>
+        </p:cTn>
+      </p:par>
+    </p:tnLst>
+    <p:bldLst>
+      <p:bldP spid="4" grpId="0"/>
+      <p:bldP spid="5" grpId="0"/>
+      <p:bldP spid="6" grpId="0"/>
+      <p:bldP spid="7" grpId="0"/>
+      <p:bldP spid="12" grpId="0"/>
+      <p:bldP spid="13" grpId="0"/>
+    </p:bldLst>
+  </p:timing>
+</p:sld>
+</file>
+
+<file path=ppt/slides/slide6.xml><?xml version="1.0" encoding="utf-8"?>
+<p:sld xmlns:a="http://schemas.openxmlformats.org/drawingml/2006/main" xmlns:r="http://schemas.openxmlformats.org/officeDocument/2006/relationships" xmlns:p="http://schemas.openxmlformats.org/presentationml/2006/main">
+  <p:cSld>
+    <p:spTree>
+      <p:nvGrpSpPr>
+        <p:cNvPr id="1" name=""/>
+        <p:cNvGrpSpPr/>
+        <p:nvPr/>
+      </p:nvGrpSpPr>
+      <p:grpSpPr>
+        <a:xfrm>
+          <a:off x="0" y="0"/>
+          <a:ext cx="0" cy="0"/>
+          <a:chOff x="0" y="0"/>
+          <a:chExt cx="0" cy="0"/>
+        </a:xfrm>
+      </p:grpSpPr>
+      <p:sp>
+        <p:nvSpPr>
+          <p:cNvPr id="11" name="TextBox 10"/>
+          <p:cNvSpPr txBox="1"/>
+          <p:nvPr/>
+        </p:nvSpPr>
+        <p:spPr>
+          <a:xfrm>
+            <a:off x="323528" y="548680"/>
+            <a:ext cx="8302273" cy="2123658"/>
+          </a:xfrm>
+          <a:prstGeom prst="rect">
+            <a:avLst/>
+          </a:prstGeom>
+          <a:noFill/>
+        </p:spPr>
+        <p:txBody>
+          <a:bodyPr wrap="none" rtlCol="0">
+            <a:spAutoFit/>
+          </a:bodyPr>
+          <a:lstStyle/>
+          <a:p>
+            <a:r>
+              <a:rPr lang="en-GB" sz="4400" dirty="0" smtClean="0">
+                <a:latin typeface="Courier New" panose="02070309020205020404" pitchFamily="49" charset="0"/>
+                <a:cs typeface="Courier New" panose="02070309020205020404" pitchFamily="49" charset="0"/>
+              </a:rPr>
+              <a:t>sum</a:t>
+            </a:r>
+          </a:p>
+          <a:p>
+            <a:r>
+              <a:rPr lang="en-GB" sz="4400" dirty="0">
+                <a:latin typeface="Courier New" panose="02070309020205020404" pitchFamily="49" charset="0"/>
+                <a:cs typeface="Courier New" panose="02070309020205020404" pitchFamily="49" charset="0"/>
+              </a:rPr>
+              <a:t> </a:t>
+            </a:r>
+            <a:r>
+              <a:rPr lang="en-GB" sz="4400" dirty="0" smtClean="0">
+                <a:latin typeface="Courier New" panose="02070309020205020404" pitchFamily="49" charset="0"/>
+                <a:cs typeface="Courier New" panose="02070309020205020404" pitchFamily="49" charset="0"/>
+              </a:rPr>
+              <a:t> (map (^2)</a:t>
+            </a:r>
+          </a:p>
+          <a:p>
+            <a:r>
+              <a:rPr lang="en-GB" sz="4400" dirty="0">
+                <a:latin typeface="Courier New" panose="02070309020205020404" pitchFamily="49" charset="0"/>
+                <a:cs typeface="Courier New" panose="02070309020205020404" pitchFamily="49" charset="0"/>
+              </a:rPr>
+              <a:t> </a:t>
+            </a:r>
+            <a:r>
+              <a:rPr lang="en-GB" sz="4400" dirty="0" smtClean="0">
+                <a:latin typeface="Courier New" panose="02070309020205020404" pitchFamily="49" charset="0"/>
+                <a:cs typeface="Courier New" panose="02070309020205020404" pitchFamily="49" charset="0"/>
+              </a:rPr>
+              <a:t>   (filter odd [1..5]))</a:t>
+            </a:r>
+            <a:endParaRPr lang="en-GB" sz="4400" dirty="0">
+              <a:latin typeface="Courier New" panose="02070309020205020404" pitchFamily="49" charset="0"/>
+              <a:cs typeface="Courier New" panose="02070309020205020404" pitchFamily="49" charset="0"/>
+            </a:endParaRPr>
+          </a:p>
+        </p:txBody>
+      </p:sp>
+      <p:sp>
+        <p:nvSpPr>
+          <p:cNvPr id="4" name="TextBox 3"/>
+          <p:cNvSpPr txBox="1"/>
+          <p:nvPr/>
+        </p:nvSpPr>
+        <p:spPr>
+          <a:xfrm>
+            <a:off x="321266" y="3284984"/>
+            <a:ext cx="7287572" cy="2123658"/>
+          </a:xfrm>
+          <a:prstGeom prst="rect">
+            <a:avLst/>
+          </a:prstGeom>
+          <a:noFill/>
+        </p:spPr>
+        <p:txBody>
+          <a:bodyPr wrap="none" rtlCol="0">
+            <a:spAutoFit/>
+          </a:bodyPr>
+          <a:lstStyle/>
+          <a:p>
+            <a:r>
+              <a:rPr lang="en-GB" sz="4400" dirty="0" smtClean="0">
+                <a:latin typeface="Courier New" panose="02070309020205020404" pitchFamily="49" charset="0"/>
+                <a:cs typeface="Courier New" panose="02070309020205020404" pitchFamily="49" charset="0"/>
+              </a:rPr>
+              <a:t>sum </a:t>
+            </a:r>
+            <a:r>
+              <a:rPr lang="en-GB" sz="4400" dirty="0" smtClean="0">
+                <a:solidFill>
+                  <a:srgbClr val="FF0000"/>
+                </a:solidFill>
+                <a:latin typeface="Courier New" panose="02070309020205020404" pitchFamily="49" charset="0"/>
+                <a:cs typeface="Courier New" panose="02070309020205020404" pitchFamily="49" charset="0"/>
+              </a:rPr>
+              <a:t>$</a:t>
+            </a:r>
+          </a:p>
+          <a:p>
+            <a:r>
+              <a:rPr lang="en-GB" sz="4400" dirty="0">
+                <a:latin typeface="Courier New" panose="02070309020205020404" pitchFamily="49" charset="0"/>
+                <a:cs typeface="Courier New" panose="02070309020205020404" pitchFamily="49" charset="0"/>
+              </a:rPr>
+              <a:t> </a:t>
+            </a:r>
+            <a:r>
+              <a:rPr lang="en-GB" sz="4400" dirty="0" smtClean="0">
+                <a:latin typeface="Courier New" panose="02070309020205020404" pitchFamily="49" charset="0"/>
+                <a:cs typeface="Courier New" panose="02070309020205020404" pitchFamily="49" charset="0"/>
+              </a:rPr>
+              <a:t> map (^2) </a:t>
+            </a:r>
+            <a:r>
+              <a:rPr lang="en-GB" sz="4400" dirty="0" smtClean="0">
+                <a:solidFill>
+                  <a:srgbClr val="FF0000"/>
+                </a:solidFill>
+                <a:latin typeface="Courier New" panose="02070309020205020404" pitchFamily="49" charset="0"/>
+                <a:cs typeface="Courier New" panose="02070309020205020404" pitchFamily="49" charset="0"/>
+              </a:rPr>
+              <a:t>$</a:t>
+            </a:r>
+          </a:p>
+          <a:p>
+            <a:r>
+              <a:rPr lang="en-GB" sz="4400" dirty="0">
+                <a:latin typeface="Courier New" panose="02070309020205020404" pitchFamily="49" charset="0"/>
+                <a:cs typeface="Courier New" panose="02070309020205020404" pitchFamily="49" charset="0"/>
+              </a:rPr>
+              <a:t> </a:t>
+            </a:r>
+            <a:r>
+              <a:rPr lang="en-GB" sz="4400" dirty="0" smtClean="0">
+                <a:latin typeface="Courier New" panose="02070309020205020404" pitchFamily="49" charset="0"/>
+                <a:cs typeface="Courier New" panose="02070309020205020404" pitchFamily="49" charset="0"/>
+              </a:rPr>
+              <a:t>   filter odd [1..5]</a:t>
+            </a:r>
+            <a:endParaRPr lang="en-GB" sz="4400" dirty="0">
+              <a:latin typeface="Courier New" panose="02070309020205020404" pitchFamily="49" charset="0"/>
+              <a:cs typeface="Courier New" panose="02070309020205020404" pitchFamily="49" charset="0"/>
+            </a:endParaRPr>
+          </a:p>
+        </p:txBody>
+      </p:sp>
+    </p:spTree>
+    <p:extLst>
+      <p:ext uri="{BB962C8B-B14F-4D97-AF65-F5344CB8AC3E}">
+        <p14:creationId xmlns:p14="http://schemas.microsoft.com/office/powerpoint/2010/main" val="3547902431"/>
       </p:ext>
     </p:extLst>
   </p:cSld>
@@ -4874,6 +5941,254 @@
                       </p:childTnLst>
                     </p:cTn>
                   </p:par>
+                </p:childTnLst>
+              </p:cTn>
+              <p:prevCondLst>
+                <p:cond evt="onPrev" delay="0">
+                  <p:tgtEl>
+                    <p:sldTgt/>
+                  </p:tgtEl>
+                </p:cond>
+              </p:prevCondLst>
+              <p:nextCondLst>
+                <p:cond evt="onNext" delay="0">
+                  <p:tgtEl>
+                    <p:sldTgt/>
+                  </p:tgtEl>
+                </p:cond>
+              </p:nextCondLst>
+            </p:seq>
+          </p:childTnLst>
+        </p:cTn>
+      </p:par>
+    </p:tnLst>
+    <p:bldLst>
+      <p:bldP spid="4" grpId="0"/>
+    </p:bldLst>
+  </p:timing>
+</p:sld>
+</file>
+
+<file path=ppt/slides/slide7.xml><?xml version="1.0" encoding="utf-8"?>
+<p:sld xmlns:a="http://schemas.openxmlformats.org/drawingml/2006/main" xmlns:r="http://schemas.openxmlformats.org/officeDocument/2006/relationships" xmlns:p="http://schemas.openxmlformats.org/presentationml/2006/main">
+  <p:cSld>
+    <p:spTree>
+      <p:nvGrpSpPr>
+        <p:cNvPr id="1" name=""/>
+        <p:cNvGrpSpPr/>
+        <p:nvPr/>
+      </p:nvGrpSpPr>
+      <p:grpSpPr>
+        <a:xfrm>
+          <a:off x="0" y="0"/>
+          <a:ext cx="0" cy="0"/>
+          <a:chOff x="0" y="0"/>
+          <a:chExt cx="0" cy="0"/>
+        </a:xfrm>
+      </p:grpSpPr>
+      <p:sp>
+        <p:nvSpPr>
+          <p:cNvPr id="11" name="TextBox 10"/>
+          <p:cNvSpPr txBox="1"/>
+          <p:nvPr/>
+        </p:nvSpPr>
+        <p:spPr>
+          <a:xfrm>
+            <a:off x="323528" y="548680"/>
+            <a:ext cx="1875835" cy="769441"/>
+          </a:xfrm>
+          <a:prstGeom prst="rect">
+            <a:avLst/>
+          </a:prstGeom>
+          <a:noFill/>
+        </p:spPr>
+        <p:txBody>
+          <a:bodyPr wrap="none" rtlCol="0">
+            <a:spAutoFit/>
+          </a:bodyPr>
+          <a:lstStyle/>
+          <a:p>
+            <a:r>
+              <a:rPr lang="en-GB" sz="4400" dirty="0" smtClean="0">
+                <a:latin typeface="Courier New" panose="02070309020205020404" pitchFamily="49" charset="0"/>
+                <a:cs typeface="Courier New" panose="02070309020205020404" pitchFamily="49" charset="0"/>
+              </a:rPr>
+              <a:t>[1..]</a:t>
+            </a:r>
+            <a:endParaRPr lang="en-GB" sz="4400" dirty="0">
+              <a:latin typeface="Courier New" panose="02070309020205020404" pitchFamily="49" charset="0"/>
+              <a:cs typeface="Courier New" panose="02070309020205020404" pitchFamily="49" charset="0"/>
+            </a:endParaRPr>
+          </a:p>
+        </p:txBody>
+      </p:sp>
+      <p:sp>
+        <p:nvSpPr>
+          <p:cNvPr id="5" name="TextBox 4"/>
+          <p:cNvSpPr txBox="1"/>
+          <p:nvPr/>
+        </p:nvSpPr>
+        <p:spPr>
+          <a:xfrm>
+            <a:off x="323528" y="1772816"/>
+            <a:ext cx="6272871" cy="1446550"/>
+          </a:xfrm>
+          <a:prstGeom prst="rect">
+            <a:avLst/>
+          </a:prstGeom>
+          <a:noFill/>
+        </p:spPr>
+        <p:txBody>
+          <a:bodyPr wrap="none" rtlCol="0">
+            <a:spAutoFit/>
+          </a:bodyPr>
+          <a:lstStyle/>
+          <a:p>
+            <a:r>
+              <a:rPr lang="en-GB" sz="4400" dirty="0" smtClean="0">
+                <a:latin typeface="Courier New" panose="02070309020205020404" pitchFamily="49" charset="0"/>
+                <a:cs typeface="Courier New" panose="02070309020205020404" pitchFamily="49" charset="0"/>
+              </a:rPr>
+              <a:t>takeWhile (&lt;100) </a:t>
+            </a:r>
+            <a:r>
+              <a:rPr lang="en-GB" sz="4400" dirty="0" smtClean="0">
+                <a:solidFill>
+                  <a:srgbClr val="FF0000"/>
+                </a:solidFill>
+                <a:latin typeface="Courier New" panose="02070309020205020404" pitchFamily="49" charset="0"/>
+                <a:cs typeface="Courier New" panose="02070309020205020404" pitchFamily="49" charset="0"/>
+              </a:rPr>
+              <a:t>$</a:t>
+            </a:r>
+          </a:p>
+          <a:p>
+            <a:r>
+              <a:rPr lang="en-GB" sz="4400" dirty="0">
+                <a:latin typeface="Courier New" panose="02070309020205020404" pitchFamily="49" charset="0"/>
+                <a:cs typeface="Courier New" panose="02070309020205020404" pitchFamily="49" charset="0"/>
+              </a:rPr>
+              <a:t> </a:t>
+            </a:r>
+            <a:r>
+              <a:rPr lang="en-GB" sz="4400" dirty="0" smtClean="0">
+                <a:latin typeface="Courier New" panose="02070309020205020404" pitchFamily="49" charset="0"/>
+                <a:cs typeface="Courier New" panose="02070309020205020404" pitchFamily="49" charset="0"/>
+              </a:rPr>
+              <a:t> map (2^) [1..]</a:t>
+            </a:r>
+            <a:endParaRPr lang="en-GB" sz="4400" dirty="0">
+              <a:latin typeface="Courier New" panose="02070309020205020404" pitchFamily="49" charset="0"/>
+              <a:cs typeface="Courier New" panose="02070309020205020404" pitchFamily="49" charset="0"/>
+            </a:endParaRPr>
+          </a:p>
+        </p:txBody>
+      </p:sp>
+      <p:sp>
+        <p:nvSpPr>
+          <p:cNvPr id="6" name="TextBox 5"/>
+          <p:cNvSpPr txBox="1"/>
+          <p:nvPr/>
+        </p:nvSpPr>
+        <p:spPr>
+          <a:xfrm>
+            <a:off x="3347864" y="3068960"/>
+            <a:ext cx="5596404" cy="769441"/>
+          </a:xfrm>
+          <a:prstGeom prst="rect">
+            <a:avLst/>
+          </a:prstGeom>
+          <a:noFill/>
+        </p:spPr>
+        <p:txBody>
+          <a:bodyPr wrap="none" rtlCol="0">
+            <a:spAutoFit/>
+          </a:bodyPr>
+          <a:lstStyle/>
+          <a:p>
+            <a:r>
+              <a:rPr lang="en-GB" sz="4400" dirty="0" smtClean="0">
+                <a:solidFill>
+                  <a:srgbClr val="0070C0"/>
+                </a:solidFill>
+                <a:latin typeface="Courier New" panose="02070309020205020404" pitchFamily="49" charset="0"/>
+                <a:cs typeface="Courier New" panose="02070309020205020404" pitchFamily="49" charset="0"/>
+              </a:rPr>
+              <a:t>[2,4,8,16,32,64]</a:t>
+            </a:r>
+            <a:endParaRPr lang="en-GB" sz="4400" dirty="0">
+              <a:solidFill>
+                <a:srgbClr val="0070C0"/>
+              </a:solidFill>
+              <a:latin typeface="Courier New" panose="02070309020205020404" pitchFamily="49" charset="0"/>
+              <a:cs typeface="Courier New" panose="02070309020205020404" pitchFamily="49" charset="0"/>
+            </a:endParaRPr>
+          </a:p>
+        </p:txBody>
+      </p:sp>
+    </p:spTree>
+    <p:extLst>
+      <p:ext uri="{BB962C8B-B14F-4D97-AF65-F5344CB8AC3E}">
+        <p14:creationId xmlns:p14="http://schemas.microsoft.com/office/powerpoint/2010/main" val="2373322023"/>
+      </p:ext>
+    </p:extLst>
+  </p:cSld>
+  <p:clrMapOvr>
+    <a:masterClrMapping/>
+  </p:clrMapOvr>
+  <p:timing>
+    <p:tnLst>
+      <p:par>
+        <p:cTn id="1" dur="indefinite" restart="never" nodeType="tmRoot">
+          <p:childTnLst>
+            <p:seq concurrent="1" nextAc="seek">
+              <p:cTn id="2" dur="indefinite" nodeType="mainSeq">
+                <p:childTnLst>
+                  <p:par>
+                    <p:cTn id="3" fill="hold">
+                      <p:stCondLst>
+                        <p:cond delay="indefinite"/>
+                      </p:stCondLst>
+                      <p:childTnLst>
+                        <p:par>
+                          <p:cTn id="4" fill="hold">
+                            <p:stCondLst>
+                              <p:cond delay="0"/>
+                            </p:stCondLst>
+                            <p:childTnLst>
+                              <p:par>
+                                <p:cTn id="5" presetID="1" presetClass="entr" presetSubtype="0" fill="hold" grpId="0" nodeType="clickEffect">
+                                  <p:stCondLst>
+                                    <p:cond delay="0"/>
+                                  </p:stCondLst>
+                                  <p:childTnLst>
+                                    <p:set>
+                                      <p:cBhvr>
+                                        <p:cTn id="6" dur="1" fill="hold">
+                                          <p:stCondLst>
+                                            <p:cond delay="0"/>
+                                          </p:stCondLst>
+                                        </p:cTn>
+                                        <p:tgtEl>
+                                          <p:spTgt spid="5"/>
+                                        </p:tgtEl>
+                                        <p:attrNameLst>
+                                          <p:attrName>style.visibility</p:attrName>
+                                        </p:attrNameLst>
+                                      </p:cBhvr>
+                                      <p:to>
+                                        <p:strVal val="visible"/>
+                                      </p:to>
+                                    </p:set>
+                                  </p:childTnLst>
+                                </p:cTn>
+                              </p:par>
+                            </p:childTnLst>
+                          </p:cTn>
+                        </p:par>
+                      </p:childTnLst>
+                    </p:cTn>
+                  </p:par>
                   <p:par>
                     <p:cTn id="7" fill="hold">
                       <p:stCondLst>
@@ -4900,124 +6215,7 @@
                                           </p:stCondLst>
                                         </p:cTn>
                                         <p:tgtEl>
-                                          <p:spTgt spid="5"/>
-                                        </p:tgtEl>
-                                        <p:attrNameLst>
-                                          <p:attrName>style.visibility</p:attrName>
-                                        </p:attrNameLst>
-                                      </p:cBhvr>
-                                      <p:to>
-                                        <p:strVal val="visible"/>
-                                      </p:to>
-                                    </p:set>
-                                  </p:childTnLst>
-                                </p:cTn>
-                              </p:par>
-                            </p:childTnLst>
-                          </p:cTn>
-                        </p:par>
-                      </p:childTnLst>
-                    </p:cTn>
-                  </p:par>
-                  <p:par>
-                    <p:cTn id="11" fill="hold">
-                      <p:stCondLst>
-                        <p:cond delay="indefinite"/>
-                      </p:stCondLst>
-                      <p:childTnLst>
-                        <p:par>
-                          <p:cTn id="12" fill="hold">
-                            <p:stCondLst>
-                              <p:cond delay="0"/>
-                            </p:stCondLst>
-                            <p:childTnLst>
-                              <p:par>
-                                <p:cTn id="13" presetID="1" presetClass="entr" presetSubtype="0" fill="hold" grpId="0" nodeType="clickEffect">
-                                  <p:stCondLst>
-                                    <p:cond delay="0"/>
-                                  </p:stCondLst>
-                                  <p:childTnLst>
-                                    <p:set>
-                                      <p:cBhvr>
-                                        <p:cTn id="14" dur="1" fill="hold">
-                                          <p:stCondLst>
-                                            <p:cond delay="0"/>
-                                          </p:stCondLst>
-                                        </p:cTn>
-                                        <p:tgtEl>
                                           <p:spTgt spid="6"/>
-                                        </p:tgtEl>
-                                        <p:attrNameLst>
-                                          <p:attrName>style.visibility</p:attrName>
-                                        </p:attrNameLst>
-                                      </p:cBhvr>
-                                      <p:to>
-                                        <p:strVal val="visible"/>
-                                      </p:to>
-                                    </p:set>
-                                  </p:childTnLst>
-                                </p:cTn>
-                              </p:par>
-                            </p:childTnLst>
-                          </p:cTn>
-                        </p:par>
-                      </p:childTnLst>
-                    </p:cTn>
-                  </p:par>
-                  <p:par>
-                    <p:cTn id="15" fill="hold">
-                      <p:stCondLst>
-                        <p:cond delay="indefinite"/>
-                      </p:stCondLst>
-                      <p:childTnLst>
-                        <p:par>
-                          <p:cTn id="16" fill="hold">
-                            <p:stCondLst>
-                              <p:cond delay="0"/>
-                            </p:stCondLst>
-                            <p:childTnLst>
-                              <p:par>
-                                <p:cTn id="17" presetID="1" presetClass="entr" presetSubtype="0" fill="hold" grpId="0" nodeType="clickEffect">
-                                  <p:stCondLst>
-                                    <p:cond delay="0"/>
-                                  </p:stCondLst>
-                                  <p:childTnLst>
-                                    <p:set>
-                                      <p:cBhvr>
-                                        <p:cTn id="18" dur="1" fill="hold">
-                                          <p:stCondLst>
-                                            <p:cond delay="0"/>
-                                          </p:stCondLst>
-                                        </p:cTn>
-                                        <p:tgtEl>
-                                          <p:spTgt spid="7"/>
-                                        </p:tgtEl>
-                                        <p:attrNameLst>
-                                          <p:attrName>style.visibility</p:attrName>
-                                        </p:attrNameLst>
-                                      </p:cBhvr>
-                                      <p:to>
-                                        <p:strVal val="visible"/>
-                                      </p:to>
-                                    </p:set>
-                                  </p:childTnLst>
-                                </p:cTn>
-                              </p:par>
-                              <p:par>
-                                <p:cTn id="19" presetID="1" presetClass="entr" presetSubtype="0" fill="hold" nodeType="withEffect">
-                                  <p:stCondLst>
-                                    <p:cond delay="0"/>
-                                  </p:stCondLst>
-                                  <p:childTnLst>
-                                    <p:set>
-                                      <p:cBhvr>
-                                        <p:cTn id="20" dur="1" fill="hold">
-                                          <p:stCondLst>
-                                            <p:cond delay="0"/>
-                                          </p:stCondLst>
-                                        </p:cTn>
-                                        <p:tgtEl>
-                                          <p:spTgt spid="8"/>
                                         </p:tgtEl>
                                         <p:attrNameLst>
                                           <p:attrName>style.visibility</p:attrName>
@@ -5058,204 +6256,9 @@
       </p:par>
     </p:tnLst>
     <p:bldLst>
-      <p:bldP spid="4" grpId="0"/>
       <p:bldP spid="5" grpId="0"/>
       <p:bldP spid="6" grpId="0"/>
-      <p:bldP spid="7" grpId="0"/>
     </p:bldLst>
-  </p:timing>
-</p:sld>
-</file>
-
-<file path=ppt/slides/slide6.xml><?xml version="1.0" encoding="utf-8"?>
-<p:sld xmlns:a="http://schemas.openxmlformats.org/drawingml/2006/main" xmlns:r="http://schemas.openxmlformats.org/officeDocument/2006/relationships" xmlns:p="http://schemas.openxmlformats.org/presentationml/2006/main">
-  <p:cSld>
-    <p:spTree>
-      <p:nvGrpSpPr>
-        <p:cNvPr id="1" name=""/>
-        <p:cNvGrpSpPr/>
-        <p:nvPr/>
-      </p:nvGrpSpPr>
-      <p:grpSpPr>
-        <a:xfrm>
-          <a:off x="0" y="0"/>
-          <a:ext cx="0" cy="0"/>
-          <a:chOff x="0" y="0"/>
-          <a:chExt cx="0" cy="0"/>
-        </a:xfrm>
-      </p:grpSpPr>
-      <p:sp>
-        <p:nvSpPr>
-          <p:cNvPr id="11" name="TextBox 10"/>
-          <p:cNvSpPr txBox="1"/>
-          <p:nvPr/>
-        </p:nvSpPr>
-        <p:spPr>
-          <a:xfrm>
-            <a:off x="323528" y="548680"/>
-            <a:ext cx="8302273" cy="2123658"/>
-          </a:xfrm>
-          <a:prstGeom prst="rect">
-            <a:avLst/>
-          </a:prstGeom>
-          <a:noFill/>
-        </p:spPr>
-        <p:txBody>
-          <a:bodyPr wrap="none" rtlCol="0">
-            <a:spAutoFit/>
-          </a:bodyPr>
-          <a:lstStyle/>
-          <a:p>
-            <a:r>
-              <a:rPr lang="en-GB" sz="4400" dirty="0" smtClean="0">
-                <a:latin typeface="Courier New" panose="02070309020205020404" pitchFamily="49" charset="0"/>
-                <a:cs typeface="Courier New" panose="02070309020205020404" pitchFamily="49" charset="0"/>
-              </a:rPr>
-              <a:t>sum</a:t>
-            </a:r>
-          </a:p>
-          <a:p>
-            <a:r>
-              <a:rPr lang="en-GB" sz="4400" dirty="0">
-                <a:latin typeface="Courier New" panose="02070309020205020404" pitchFamily="49" charset="0"/>
-                <a:cs typeface="Courier New" panose="02070309020205020404" pitchFamily="49" charset="0"/>
-              </a:rPr>
-              <a:t> </a:t>
-            </a:r>
-            <a:r>
-              <a:rPr lang="en-GB" sz="4400" dirty="0" smtClean="0">
-                <a:latin typeface="Courier New" panose="02070309020205020404" pitchFamily="49" charset="0"/>
-                <a:cs typeface="Courier New" panose="02070309020205020404" pitchFamily="49" charset="0"/>
-              </a:rPr>
-              <a:t> (map (^2)</a:t>
-            </a:r>
-          </a:p>
-          <a:p>
-            <a:r>
-              <a:rPr lang="en-GB" sz="4400" dirty="0">
-                <a:latin typeface="Courier New" panose="02070309020205020404" pitchFamily="49" charset="0"/>
-                <a:cs typeface="Courier New" panose="02070309020205020404" pitchFamily="49" charset="0"/>
-              </a:rPr>
-              <a:t> </a:t>
-            </a:r>
-            <a:r>
-              <a:rPr lang="en-GB" sz="4400" dirty="0" smtClean="0">
-                <a:latin typeface="Courier New" panose="02070309020205020404" pitchFamily="49" charset="0"/>
-                <a:cs typeface="Courier New" panose="02070309020205020404" pitchFamily="49" charset="0"/>
-              </a:rPr>
-              <a:t>   (filter odd [1..5]))</a:t>
-            </a:r>
-            <a:endParaRPr lang="en-GB" sz="4400" dirty="0">
-              <a:latin typeface="Courier New" panose="02070309020205020404" pitchFamily="49" charset="0"/>
-              <a:cs typeface="Courier New" panose="02070309020205020404" pitchFamily="49" charset="0"/>
-            </a:endParaRPr>
-          </a:p>
-        </p:txBody>
-      </p:sp>
-      <p:sp>
-        <p:nvSpPr>
-          <p:cNvPr id="4" name="TextBox 3"/>
-          <p:cNvSpPr txBox="1"/>
-          <p:nvPr/>
-        </p:nvSpPr>
-        <p:spPr>
-          <a:xfrm>
-            <a:off x="321266" y="3284984"/>
-            <a:ext cx="7287572" cy="2123658"/>
-          </a:xfrm>
-          <a:prstGeom prst="rect">
-            <a:avLst/>
-          </a:prstGeom>
-          <a:noFill/>
-        </p:spPr>
-        <p:txBody>
-          <a:bodyPr wrap="none" rtlCol="0">
-            <a:spAutoFit/>
-          </a:bodyPr>
-          <a:lstStyle/>
-          <a:p>
-            <a:r>
-              <a:rPr lang="en-GB" sz="4400" dirty="0" smtClean="0">
-                <a:latin typeface="Courier New" panose="02070309020205020404" pitchFamily="49" charset="0"/>
-                <a:cs typeface="Courier New" panose="02070309020205020404" pitchFamily="49" charset="0"/>
-              </a:rPr>
-              <a:t>sum </a:t>
-            </a:r>
-            <a:r>
-              <a:rPr lang="en-GB" sz="4400" dirty="0" smtClean="0">
-                <a:solidFill>
-                  <a:srgbClr val="FF0000"/>
-                </a:solidFill>
-                <a:latin typeface="Courier New" panose="02070309020205020404" pitchFamily="49" charset="0"/>
-                <a:cs typeface="Courier New" panose="02070309020205020404" pitchFamily="49" charset="0"/>
-              </a:rPr>
-              <a:t>$</a:t>
-            </a:r>
-          </a:p>
-          <a:p>
-            <a:r>
-              <a:rPr lang="en-GB" sz="4400" dirty="0">
-                <a:latin typeface="Courier New" panose="02070309020205020404" pitchFamily="49" charset="0"/>
-                <a:cs typeface="Courier New" panose="02070309020205020404" pitchFamily="49" charset="0"/>
-              </a:rPr>
-              <a:t> </a:t>
-            </a:r>
-            <a:r>
-              <a:rPr lang="en-GB" sz="4400" dirty="0" smtClean="0">
-                <a:latin typeface="Courier New" panose="02070309020205020404" pitchFamily="49" charset="0"/>
-                <a:cs typeface="Courier New" panose="02070309020205020404" pitchFamily="49" charset="0"/>
-              </a:rPr>
-              <a:t> map (^2) </a:t>
-            </a:r>
-            <a:r>
-              <a:rPr lang="en-GB" sz="4400" dirty="0" smtClean="0">
-                <a:solidFill>
-                  <a:srgbClr val="FF0000"/>
-                </a:solidFill>
-                <a:latin typeface="Courier New" panose="02070309020205020404" pitchFamily="49" charset="0"/>
-                <a:cs typeface="Courier New" panose="02070309020205020404" pitchFamily="49" charset="0"/>
-              </a:rPr>
-              <a:t>$</a:t>
-            </a:r>
-          </a:p>
-          <a:p>
-            <a:r>
-              <a:rPr lang="en-GB" sz="4400" dirty="0">
-                <a:latin typeface="Courier New" panose="02070309020205020404" pitchFamily="49" charset="0"/>
-                <a:cs typeface="Courier New" panose="02070309020205020404" pitchFamily="49" charset="0"/>
-              </a:rPr>
-              <a:t> </a:t>
-            </a:r>
-            <a:r>
-              <a:rPr lang="en-GB" sz="4400" dirty="0" smtClean="0">
-                <a:latin typeface="Courier New" panose="02070309020205020404" pitchFamily="49" charset="0"/>
-                <a:cs typeface="Courier New" panose="02070309020205020404" pitchFamily="49" charset="0"/>
-              </a:rPr>
-              <a:t>   filter odd [1..5]</a:t>
-            </a:r>
-            <a:endParaRPr lang="en-GB" sz="4400" dirty="0">
-              <a:latin typeface="Courier New" panose="02070309020205020404" pitchFamily="49" charset="0"/>
-              <a:cs typeface="Courier New" panose="02070309020205020404" pitchFamily="49" charset="0"/>
-            </a:endParaRPr>
-          </a:p>
-        </p:txBody>
-      </p:sp>
-    </p:spTree>
-    <p:extLst>
-      <p:ext uri="{BB962C8B-B14F-4D97-AF65-F5344CB8AC3E}">
-        <p14:creationId xmlns:p14="http://schemas.microsoft.com/office/powerpoint/2010/main" val="3547902431"/>
-      </p:ext>
-    </p:extLst>
-  </p:cSld>
-  <p:clrMapOvr>
-    <a:masterClrMapping/>
-  </p:clrMapOvr>
-  <p:timing>
-    <p:tnLst>
-      <p:par>
-        <p:cTn id="1" dur="indefinite" restart="never" nodeType="tmRoot"/>
-      </p:par>
-    </p:tnLst>
   </p:timing>
 </p:sld>
 </file>
@@ -5543,4 +6546,289 @@
   <a:objectDefaults/>
   <a:extraClrSchemeLst/>
 </a:theme>
+</file>
+
+<file path=ppt/theme/theme2.xml><?xml version="1.0" encoding="utf-8"?>
+<a:theme xmlns:a="http://schemas.openxmlformats.org/drawingml/2006/main" name="Office Theme">
+  <a:themeElements>
+    <a:clrScheme name="Office">
+      <a:dk1>
+        <a:sysClr val="windowText" lastClr="000000"/>
+      </a:dk1>
+      <a:lt1>
+        <a:sysClr val="window" lastClr="FFFFFF"/>
+      </a:lt1>
+      <a:dk2>
+        <a:srgbClr val="1F497D"/>
+      </a:dk2>
+      <a:lt2>
+        <a:srgbClr val="EEECE1"/>
+      </a:lt2>
+      <a:accent1>
+        <a:srgbClr val="4F81BD"/>
+      </a:accent1>
+      <a:accent2>
+        <a:srgbClr val="C0504D"/>
+      </a:accent2>
+      <a:accent3>
+        <a:srgbClr val="9BBB59"/>
+      </a:accent3>
+      <a:accent4>
+        <a:srgbClr val="8064A2"/>
+      </a:accent4>
+      <a:accent5>
+        <a:srgbClr val="4BACC6"/>
+      </a:accent5>
+      <a:accent6>
+        <a:srgbClr val="F79646"/>
+      </a:accent6>
+      <a:hlink>
+        <a:srgbClr val="0000FF"/>
+      </a:hlink>
+      <a:folHlink>
+        <a:srgbClr val="800080"/>
+      </a:folHlink>
+    </a:clrScheme>
+    <a:fontScheme name="Office">
+      <a:majorFont>
+        <a:latin typeface="Calibri"/>
+        <a:ea typeface=""/>
+        <a:cs typeface=""/>
+        <a:font script="Jpan" typeface="ＭＳ Ｐゴシック"/>
+        <a:font script="Hang" typeface="맑은 고딕"/>
+        <a:font script="Hans" typeface="宋体"/>
+        <a:font script="Hant" typeface="新細明體"/>
+        <a:font script="Arab" typeface="Times New Roman"/>
+        <a:font script="Hebr" typeface="Times New Roman"/>
+        <a:font script="Thai" typeface="Angsana New"/>
+        <a:font script="Ethi" typeface="Nyala"/>
+        <a:font script="Beng" typeface="Vrinda"/>
+        <a:font script="Gujr" typeface="Shruti"/>
+        <a:font script="Khmr" typeface="MoolBoran"/>
+        <a:font script="Knda" typeface="Tunga"/>
+        <a:font script="Guru" typeface="Raavi"/>
+        <a:font script="Cans" typeface="Euphemia"/>
+        <a:font script="Cher" typeface="Plantagenet Cherokee"/>
+        <a:font script="Yiii" typeface="Microsoft Yi Baiti"/>
+        <a:font script="Tibt" typeface="Microsoft Himalaya"/>
+        <a:font script="Thaa" typeface="MV Boli"/>
+        <a:font script="Deva" typeface="Mangal"/>
+        <a:font script="Telu" typeface="Gautami"/>
+        <a:font script="Taml" typeface="Latha"/>
+        <a:font script="Syrc" typeface="Estrangelo Edessa"/>
+        <a:font script="Orya" typeface="Kalinga"/>
+        <a:font script="Mlym" typeface="Kartika"/>
+        <a:font script="Laoo" typeface="DokChampa"/>
+        <a:font script="Sinh" typeface="Iskoola Pota"/>
+        <a:font script="Mong" typeface="Mongolian Baiti"/>
+        <a:font script="Viet" typeface="Times New Roman"/>
+        <a:font script="Uigh" typeface="Microsoft Uighur"/>
+        <a:font script="Geor" typeface="Sylfaen"/>
+      </a:majorFont>
+      <a:minorFont>
+        <a:latin typeface="Calibri"/>
+        <a:ea typeface=""/>
+        <a:cs typeface=""/>
+        <a:font script="Jpan" typeface="ＭＳ Ｐゴシック"/>
+        <a:font script="Hang" typeface="맑은 고딕"/>
+        <a:font script="Hans" typeface="宋体"/>
+        <a:font script="Hant" typeface="新細明體"/>
+        <a:font script="Arab" typeface="Arial"/>
+        <a:font script="Hebr" typeface="Arial"/>
+        <a:font script="Thai" typeface="Cordia New"/>
+        <a:font script="Ethi" typeface="Nyala"/>
+        <a:font script="Beng" typeface="Vrinda"/>
+        <a:font script="Gujr" typeface="Shruti"/>
+        <a:font script="Khmr" typeface="DaunPenh"/>
+        <a:font script="Knda" typeface="Tunga"/>
+        <a:font script="Guru" typeface="Raavi"/>
+        <a:font script="Cans" typeface="Euphemia"/>
+        <a:font script="Cher" typeface="Plantagenet Cherokee"/>
+        <a:font script="Yiii" typeface="Microsoft Yi Baiti"/>
+        <a:font script="Tibt" typeface="Microsoft Himalaya"/>
+        <a:font script="Thaa" typeface="MV Boli"/>
+        <a:font script="Deva" typeface="Mangal"/>
+        <a:font script="Telu" typeface="Gautami"/>
+        <a:font script="Taml" typeface="Latha"/>
+        <a:font script="Syrc" typeface="Estrangelo Edessa"/>
+        <a:font script="Orya" typeface="Kalinga"/>
+        <a:font script="Mlym" typeface="Kartika"/>
+        <a:font script="Laoo" typeface="DokChampa"/>
+        <a:font script="Sinh" typeface="Iskoola Pota"/>
+        <a:font script="Mong" typeface="Mongolian Baiti"/>
+        <a:font script="Viet" typeface="Arial"/>
+        <a:font script="Uigh" typeface="Microsoft Uighur"/>
+        <a:font script="Geor" typeface="Sylfaen"/>
+      </a:minorFont>
+    </a:fontScheme>
+    <a:fmtScheme name="Office">
+      <a:fillStyleLst>
+        <a:solidFill>
+          <a:schemeClr val="phClr"/>
+        </a:solidFill>
+        <a:gradFill rotWithShape="1">
+          <a:gsLst>
+            <a:gs pos="0">
+              <a:schemeClr val="phClr">
+                <a:tint val="50000"/>
+                <a:satMod val="300000"/>
+              </a:schemeClr>
+            </a:gs>
+            <a:gs pos="35000">
+              <a:schemeClr val="phClr">
+                <a:tint val="37000"/>
+                <a:satMod val="300000"/>
+              </a:schemeClr>
+            </a:gs>
+            <a:gs pos="100000">
+              <a:schemeClr val="phClr">
+                <a:tint val="15000"/>
+                <a:satMod val="350000"/>
+              </a:schemeClr>
+            </a:gs>
+          </a:gsLst>
+          <a:lin ang="16200000" scaled="1"/>
+        </a:gradFill>
+        <a:gradFill rotWithShape="1">
+          <a:gsLst>
+            <a:gs pos="0">
+              <a:schemeClr val="phClr">
+                <a:shade val="51000"/>
+                <a:satMod val="130000"/>
+              </a:schemeClr>
+            </a:gs>
+            <a:gs pos="80000">
+              <a:schemeClr val="phClr">
+                <a:shade val="93000"/>
+                <a:satMod val="130000"/>
+              </a:schemeClr>
+            </a:gs>
+            <a:gs pos="100000">
+              <a:schemeClr val="phClr">
+                <a:shade val="94000"/>
+                <a:satMod val="135000"/>
+              </a:schemeClr>
+            </a:gs>
+          </a:gsLst>
+          <a:lin ang="16200000" scaled="0"/>
+        </a:gradFill>
+      </a:fillStyleLst>
+      <a:lnStyleLst>
+        <a:ln w="9525" cap="flat" cmpd="sng" algn="ctr">
+          <a:solidFill>
+            <a:schemeClr val="phClr">
+              <a:shade val="95000"/>
+              <a:satMod val="105000"/>
+            </a:schemeClr>
+          </a:solidFill>
+          <a:prstDash val="solid"/>
+        </a:ln>
+        <a:ln w="25400" cap="flat" cmpd="sng" algn="ctr">
+          <a:solidFill>
+            <a:schemeClr val="phClr"/>
+          </a:solidFill>
+          <a:prstDash val="solid"/>
+        </a:ln>
+        <a:ln w="38100" cap="flat" cmpd="sng" algn="ctr">
+          <a:solidFill>
+            <a:schemeClr val="phClr"/>
+          </a:solidFill>
+          <a:prstDash val="solid"/>
+        </a:ln>
+      </a:lnStyleLst>
+      <a:effectStyleLst>
+        <a:effectStyle>
+          <a:effectLst>
+            <a:outerShdw blurRad="40000" dist="20000" dir="5400000" rotWithShape="0">
+              <a:srgbClr val="000000">
+                <a:alpha val="38000"/>
+              </a:srgbClr>
+            </a:outerShdw>
+          </a:effectLst>
+        </a:effectStyle>
+        <a:effectStyle>
+          <a:effectLst>
+            <a:outerShdw blurRad="40000" dist="23000" dir="5400000" rotWithShape="0">
+              <a:srgbClr val="000000">
+                <a:alpha val="35000"/>
+              </a:srgbClr>
+            </a:outerShdw>
+          </a:effectLst>
+        </a:effectStyle>
+        <a:effectStyle>
+          <a:effectLst>
+            <a:outerShdw blurRad="40000" dist="23000" dir="5400000" rotWithShape="0">
+              <a:srgbClr val="000000">
+                <a:alpha val="35000"/>
+              </a:srgbClr>
+            </a:outerShdw>
+          </a:effectLst>
+          <a:scene3d>
+            <a:camera prst="orthographicFront">
+              <a:rot lat="0" lon="0" rev="0"/>
+            </a:camera>
+            <a:lightRig rig="threePt" dir="t">
+              <a:rot lat="0" lon="0" rev="1200000"/>
+            </a:lightRig>
+          </a:scene3d>
+          <a:sp3d>
+            <a:bevelT w="63500" h="25400"/>
+          </a:sp3d>
+        </a:effectStyle>
+      </a:effectStyleLst>
+      <a:bgFillStyleLst>
+        <a:solidFill>
+          <a:schemeClr val="phClr"/>
+        </a:solidFill>
+        <a:gradFill rotWithShape="1">
+          <a:gsLst>
+            <a:gs pos="0">
+              <a:schemeClr val="phClr">
+                <a:tint val="40000"/>
+                <a:satMod val="350000"/>
+              </a:schemeClr>
+            </a:gs>
+            <a:gs pos="40000">
+              <a:schemeClr val="phClr">
+                <a:tint val="45000"/>
+                <a:shade val="99000"/>
+                <a:satMod val="350000"/>
+              </a:schemeClr>
+            </a:gs>
+            <a:gs pos="100000">
+              <a:schemeClr val="phClr">
+                <a:shade val="20000"/>
+                <a:satMod val="255000"/>
+              </a:schemeClr>
+            </a:gs>
+          </a:gsLst>
+          <a:path path="circle">
+            <a:fillToRect l="50000" t="-80000" r="50000" b="180000"/>
+          </a:path>
+        </a:gradFill>
+        <a:gradFill rotWithShape="1">
+          <a:gsLst>
+            <a:gs pos="0">
+              <a:schemeClr val="phClr">
+                <a:tint val="80000"/>
+                <a:satMod val="300000"/>
+              </a:schemeClr>
+            </a:gs>
+            <a:gs pos="100000">
+              <a:schemeClr val="phClr">
+                <a:shade val="30000"/>
+                <a:satMod val="200000"/>
+              </a:schemeClr>
+            </a:gs>
+          </a:gsLst>
+          <a:path path="circle">
+            <a:fillToRect l="50000" t="50000" r="50000" b="50000"/>
+          </a:path>
+        </a:gradFill>
+      </a:bgFillStyleLst>
+    </a:fmtScheme>
+  </a:themeElements>
+  <a:objectDefaults/>
+  <a:extraClrSchemeLst/>
+</a:theme>
 </file>
</xml_diff>

<commit_message>
Add the defining functions section
</commit_message>
<xml_diff>
--- a/beginning-haskell.pptx
+++ b/beginning-haskell.pptx
@@ -5,7 +5,7 @@
     <p:sldMasterId id="2147483648" r:id="rId1"/>
   </p:sldMasterIdLst>
   <p:notesMasterIdLst>
-    <p:notesMasterId r:id="rId9"/>
+    <p:notesMasterId r:id="rId17"/>
   </p:notesMasterIdLst>
   <p:sldIdLst>
     <p:sldId id="263" r:id="rId2"/>
@@ -15,6 +15,14 @@
     <p:sldId id="260" r:id="rId6"/>
     <p:sldId id="261" r:id="rId7"/>
     <p:sldId id="264" r:id="rId8"/>
+    <p:sldId id="265" r:id="rId9"/>
+    <p:sldId id="267" r:id="rId10"/>
+    <p:sldId id="266" r:id="rId11"/>
+    <p:sldId id="268" r:id="rId12"/>
+    <p:sldId id="272" r:id="rId13"/>
+    <p:sldId id="274" r:id="rId14"/>
+    <p:sldId id="269" r:id="rId15"/>
+    <p:sldId id="275" r:id="rId16"/>
   </p:sldIdLst>
   <p:sldSz cx="9144000" cy="6858000" type="screen4x3"/>
   <p:notesSz cx="6858000" cy="9144000"/>
@@ -516,11 +524,7 @@
             </a:r>
             <a:r>
               <a:rPr lang="en-GB" baseline="0" dirty="0" smtClean="0"/>
-              <a:t> Haskell</a:t>
-            </a:r>
-            <a:r>
-              <a:rPr lang="en-GB" baseline="0" smtClean="0"/>
-              <a:t>” course.</a:t>
+              <a:t> Haskell” course.</a:t>
             </a:r>
             <a:endParaRPr lang="en-GB" dirty="0"/>
           </a:p>
@@ -544,6 +548,466 @@
             <a:fld id="{999CC533-FB79-4577-A6D0-2326348CB1C0}" type="slidenum">
               <a:rPr lang="en-GB" smtClean="0"/>
               <a:t>1</a:t>
+            </a:fld>
+            <a:endParaRPr lang="en-GB" dirty="0"/>
+          </a:p>
+        </p:txBody>
+      </p:sp>
+    </p:spTree>
+    <p:extLst>
+      <p:ext uri="{BB962C8B-B14F-4D97-AF65-F5344CB8AC3E}">
+        <p14:creationId xmlns:p14="http://schemas.microsoft.com/office/powerpoint/2010/main" val="4125636590"/>
+      </p:ext>
+    </p:extLst>
+  </p:cSld>
+  <p:clrMapOvr>
+    <a:masterClrMapping/>
+  </p:clrMapOvr>
+</p:notes>
+</file>
+
+<file path=ppt/notesSlides/notesSlide2.xml><?xml version="1.0" encoding="utf-8"?>
+<p:notes xmlns:a="http://schemas.openxmlformats.org/drawingml/2006/main" xmlns:r="http://schemas.openxmlformats.org/officeDocument/2006/relationships" xmlns:p="http://schemas.openxmlformats.org/presentationml/2006/main">
+  <p:cSld>
+    <p:spTree>
+      <p:nvGrpSpPr>
+        <p:cNvPr id="1" name=""/>
+        <p:cNvGrpSpPr/>
+        <p:nvPr/>
+      </p:nvGrpSpPr>
+      <p:grpSpPr>
+        <a:xfrm>
+          <a:off x="0" y="0"/>
+          <a:ext cx="0" cy="0"/>
+          <a:chOff x="0" y="0"/>
+          <a:chExt cx="0" cy="0"/>
+        </a:xfrm>
+      </p:grpSpPr>
+      <p:sp>
+        <p:nvSpPr>
+          <p:cNvPr id="2" name="Slide Image Placeholder 1"/>
+          <p:cNvSpPr>
+            <a:spLocks noGrp="1" noRot="1" noChangeAspect="1"/>
+          </p:cNvSpPr>
+          <p:nvPr>
+            <p:ph type="sldImg"/>
+          </p:nvPr>
+        </p:nvSpPr>
+        <p:spPr/>
+      </p:sp>
+      <p:sp>
+        <p:nvSpPr>
+          <p:cNvPr id="3" name="Notes Placeholder 2"/>
+          <p:cNvSpPr>
+            <a:spLocks noGrp="1"/>
+          </p:cNvSpPr>
+          <p:nvPr>
+            <p:ph type="body" idx="1"/>
+          </p:nvPr>
+        </p:nvSpPr>
+        <p:spPr/>
+        <p:txBody>
+          <a:bodyPr/>
+          <a:lstStyle/>
+          <a:p>
+            <a:r>
+              <a:rPr lang="en-GB" dirty="0" smtClean="0"/>
+              <a:t>These slides accompany a two-hour “Beginning</a:t>
+            </a:r>
+            <a:r>
+              <a:rPr lang="en-GB" baseline="0" dirty="0" smtClean="0"/>
+              <a:t> Haskell” course.</a:t>
+            </a:r>
+            <a:endParaRPr lang="en-GB" dirty="0"/>
+          </a:p>
+        </p:txBody>
+      </p:sp>
+      <p:sp>
+        <p:nvSpPr>
+          <p:cNvPr id="4" name="Slide Number Placeholder 3"/>
+          <p:cNvSpPr>
+            <a:spLocks noGrp="1"/>
+          </p:cNvSpPr>
+          <p:nvPr>
+            <p:ph type="sldNum" sz="quarter" idx="10"/>
+          </p:nvPr>
+        </p:nvSpPr>
+        <p:spPr/>
+        <p:txBody>
+          <a:bodyPr/>
+          <a:lstStyle/>
+          <a:p>
+            <a:fld id="{999CC533-FB79-4577-A6D0-2326348CB1C0}" type="slidenum">
+              <a:rPr lang="en-GB" smtClean="0"/>
+              <a:t>8</a:t>
+            </a:fld>
+            <a:endParaRPr lang="en-GB" dirty="0"/>
+          </a:p>
+        </p:txBody>
+      </p:sp>
+    </p:spTree>
+    <p:extLst>
+      <p:ext uri="{BB962C8B-B14F-4D97-AF65-F5344CB8AC3E}">
+        <p14:creationId xmlns:p14="http://schemas.microsoft.com/office/powerpoint/2010/main" val="4125636590"/>
+      </p:ext>
+    </p:extLst>
+  </p:cSld>
+  <p:clrMapOvr>
+    <a:masterClrMapping/>
+  </p:clrMapOvr>
+</p:notes>
+</file>
+
+<file path=ppt/notesSlides/notesSlide3.xml><?xml version="1.0" encoding="utf-8"?>
+<p:notes xmlns:a="http://schemas.openxmlformats.org/drawingml/2006/main" xmlns:r="http://schemas.openxmlformats.org/officeDocument/2006/relationships" xmlns:p="http://schemas.openxmlformats.org/presentationml/2006/main">
+  <p:cSld>
+    <p:spTree>
+      <p:nvGrpSpPr>
+        <p:cNvPr id="1" name=""/>
+        <p:cNvGrpSpPr/>
+        <p:nvPr/>
+      </p:nvGrpSpPr>
+      <p:grpSpPr>
+        <a:xfrm>
+          <a:off x="0" y="0"/>
+          <a:ext cx="0" cy="0"/>
+          <a:chOff x="0" y="0"/>
+          <a:chExt cx="0" cy="0"/>
+        </a:xfrm>
+      </p:grpSpPr>
+      <p:sp>
+        <p:nvSpPr>
+          <p:cNvPr id="2" name="Slide Image Placeholder 1"/>
+          <p:cNvSpPr>
+            <a:spLocks noGrp="1" noRot="1" noChangeAspect="1"/>
+          </p:cNvSpPr>
+          <p:nvPr>
+            <p:ph type="sldImg"/>
+          </p:nvPr>
+        </p:nvSpPr>
+        <p:spPr/>
+      </p:sp>
+      <p:sp>
+        <p:nvSpPr>
+          <p:cNvPr id="3" name="Notes Placeholder 2"/>
+          <p:cNvSpPr>
+            <a:spLocks noGrp="1"/>
+          </p:cNvSpPr>
+          <p:nvPr>
+            <p:ph type="body" idx="1"/>
+          </p:nvPr>
+        </p:nvSpPr>
+        <p:spPr/>
+        <p:txBody>
+          <a:bodyPr/>
+          <a:lstStyle/>
+          <a:p>
+            <a:r>
+              <a:rPr lang="en-GB" dirty="0" smtClean="0"/>
+              <a:t>These slides accompany a two-hour “Beginning</a:t>
+            </a:r>
+            <a:r>
+              <a:rPr lang="en-GB" baseline="0" dirty="0" smtClean="0"/>
+              <a:t> Haskell” course.</a:t>
+            </a:r>
+            <a:endParaRPr lang="en-GB" dirty="0"/>
+          </a:p>
+        </p:txBody>
+      </p:sp>
+      <p:sp>
+        <p:nvSpPr>
+          <p:cNvPr id="4" name="Slide Number Placeholder 3"/>
+          <p:cNvSpPr>
+            <a:spLocks noGrp="1"/>
+          </p:cNvSpPr>
+          <p:nvPr>
+            <p:ph type="sldNum" sz="quarter" idx="10"/>
+          </p:nvPr>
+        </p:nvSpPr>
+        <p:spPr/>
+        <p:txBody>
+          <a:bodyPr/>
+          <a:lstStyle/>
+          <a:p>
+            <a:fld id="{999CC533-FB79-4577-A6D0-2326348CB1C0}" type="slidenum">
+              <a:rPr lang="en-GB" smtClean="0"/>
+              <a:t>9</a:t>
+            </a:fld>
+            <a:endParaRPr lang="en-GB" dirty="0"/>
+          </a:p>
+        </p:txBody>
+      </p:sp>
+    </p:spTree>
+    <p:extLst>
+      <p:ext uri="{BB962C8B-B14F-4D97-AF65-F5344CB8AC3E}">
+        <p14:creationId xmlns:p14="http://schemas.microsoft.com/office/powerpoint/2010/main" val="4125636590"/>
+      </p:ext>
+    </p:extLst>
+  </p:cSld>
+  <p:clrMapOvr>
+    <a:masterClrMapping/>
+  </p:clrMapOvr>
+</p:notes>
+</file>
+
+<file path=ppt/notesSlides/notesSlide4.xml><?xml version="1.0" encoding="utf-8"?>
+<p:notes xmlns:a="http://schemas.openxmlformats.org/drawingml/2006/main" xmlns:r="http://schemas.openxmlformats.org/officeDocument/2006/relationships" xmlns:p="http://schemas.openxmlformats.org/presentationml/2006/main">
+  <p:cSld>
+    <p:spTree>
+      <p:nvGrpSpPr>
+        <p:cNvPr id="1" name=""/>
+        <p:cNvGrpSpPr/>
+        <p:nvPr/>
+      </p:nvGrpSpPr>
+      <p:grpSpPr>
+        <a:xfrm>
+          <a:off x="0" y="0"/>
+          <a:ext cx="0" cy="0"/>
+          <a:chOff x="0" y="0"/>
+          <a:chExt cx="0" cy="0"/>
+        </a:xfrm>
+      </p:grpSpPr>
+      <p:sp>
+        <p:nvSpPr>
+          <p:cNvPr id="2" name="Slide Image Placeholder 1"/>
+          <p:cNvSpPr>
+            <a:spLocks noGrp="1" noRot="1" noChangeAspect="1"/>
+          </p:cNvSpPr>
+          <p:nvPr>
+            <p:ph type="sldImg"/>
+          </p:nvPr>
+        </p:nvSpPr>
+        <p:spPr/>
+      </p:sp>
+      <p:sp>
+        <p:nvSpPr>
+          <p:cNvPr id="3" name="Notes Placeholder 2"/>
+          <p:cNvSpPr>
+            <a:spLocks noGrp="1"/>
+          </p:cNvSpPr>
+          <p:nvPr>
+            <p:ph type="body" idx="1"/>
+          </p:nvPr>
+        </p:nvSpPr>
+        <p:spPr/>
+        <p:txBody>
+          <a:bodyPr/>
+          <a:lstStyle/>
+          <a:p>
+            <a:r>
+              <a:rPr lang="en-GB" dirty="0" smtClean="0"/>
+              <a:t>These slides accompany a two-hour “Beginning</a:t>
+            </a:r>
+            <a:r>
+              <a:rPr lang="en-GB" baseline="0" dirty="0" smtClean="0"/>
+              <a:t> Haskell” course.</a:t>
+            </a:r>
+            <a:endParaRPr lang="en-GB" dirty="0"/>
+          </a:p>
+        </p:txBody>
+      </p:sp>
+      <p:sp>
+        <p:nvSpPr>
+          <p:cNvPr id="4" name="Slide Number Placeholder 3"/>
+          <p:cNvSpPr>
+            <a:spLocks noGrp="1"/>
+          </p:cNvSpPr>
+          <p:nvPr>
+            <p:ph type="sldNum" sz="quarter" idx="10"/>
+          </p:nvPr>
+        </p:nvSpPr>
+        <p:spPr/>
+        <p:txBody>
+          <a:bodyPr/>
+          <a:lstStyle/>
+          <a:p>
+            <a:fld id="{999CC533-FB79-4577-A6D0-2326348CB1C0}" type="slidenum">
+              <a:rPr lang="en-GB" smtClean="0"/>
+              <a:t>12</a:t>
+            </a:fld>
+            <a:endParaRPr lang="en-GB" dirty="0"/>
+          </a:p>
+        </p:txBody>
+      </p:sp>
+    </p:spTree>
+    <p:extLst>
+      <p:ext uri="{BB962C8B-B14F-4D97-AF65-F5344CB8AC3E}">
+        <p14:creationId xmlns:p14="http://schemas.microsoft.com/office/powerpoint/2010/main" val="4125636590"/>
+      </p:ext>
+    </p:extLst>
+  </p:cSld>
+  <p:clrMapOvr>
+    <a:masterClrMapping/>
+  </p:clrMapOvr>
+</p:notes>
+</file>
+
+<file path=ppt/notesSlides/notesSlide5.xml><?xml version="1.0" encoding="utf-8"?>
+<p:notes xmlns:a="http://schemas.openxmlformats.org/drawingml/2006/main" xmlns:r="http://schemas.openxmlformats.org/officeDocument/2006/relationships" xmlns:p="http://schemas.openxmlformats.org/presentationml/2006/main">
+  <p:cSld>
+    <p:spTree>
+      <p:nvGrpSpPr>
+        <p:cNvPr id="1" name=""/>
+        <p:cNvGrpSpPr/>
+        <p:nvPr/>
+      </p:nvGrpSpPr>
+      <p:grpSpPr>
+        <a:xfrm>
+          <a:off x="0" y="0"/>
+          <a:ext cx="0" cy="0"/>
+          <a:chOff x="0" y="0"/>
+          <a:chExt cx="0" cy="0"/>
+        </a:xfrm>
+      </p:grpSpPr>
+      <p:sp>
+        <p:nvSpPr>
+          <p:cNvPr id="2" name="Slide Image Placeholder 1"/>
+          <p:cNvSpPr>
+            <a:spLocks noGrp="1" noRot="1" noChangeAspect="1"/>
+          </p:cNvSpPr>
+          <p:nvPr>
+            <p:ph type="sldImg"/>
+          </p:nvPr>
+        </p:nvSpPr>
+        <p:spPr/>
+      </p:sp>
+      <p:sp>
+        <p:nvSpPr>
+          <p:cNvPr id="3" name="Notes Placeholder 2"/>
+          <p:cNvSpPr>
+            <a:spLocks noGrp="1"/>
+          </p:cNvSpPr>
+          <p:nvPr>
+            <p:ph type="body" idx="1"/>
+          </p:nvPr>
+        </p:nvSpPr>
+        <p:spPr/>
+        <p:txBody>
+          <a:bodyPr/>
+          <a:lstStyle/>
+          <a:p>
+            <a:r>
+              <a:rPr lang="en-GB" dirty="0" smtClean="0"/>
+              <a:t>These slides accompany a two-hour “Beginning</a:t>
+            </a:r>
+            <a:r>
+              <a:rPr lang="en-GB" baseline="0" dirty="0" smtClean="0"/>
+              <a:t> Haskell” course.</a:t>
+            </a:r>
+            <a:endParaRPr lang="en-GB" dirty="0"/>
+          </a:p>
+        </p:txBody>
+      </p:sp>
+      <p:sp>
+        <p:nvSpPr>
+          <p:cNvPr id="4" name="Slide Number Placeholder 3"/>
+          <p:cNvSpPr>
+            <a:spLocks noGrp="1"/>
+          </p:cNvSpPr>
+          <p:nvPr>
+            <p:ph type="sldNum" sz="quarter" idx="10"/>
+          </p:nvPr>
+        </p:nvSpPr>
+        <p:spPr/>
+        <p:txBody>
+          <a:bodyPr/>
+          <a:lstStyle/>
+          <a:p>
+            <a:fld id="{999CC533-FB79-4577-A6D0-2326348CB1C0}" type="slidenum">
+              <a:rPr lang="en-GB" smtClean="0"/>
+              <a:t>13</a:t>
+            </a:fld>
+            <a:endParaRPr lang="en-GB" dirty="0"/>
+          </a:p>
+        </p:txBody>
+      </p:sp>
+    </p:spTree>
+    <p:extLst>
+      <p:ext uri="{BB962C8B-B14F-4D97-AF65-F5344CB8AC3E}">
+        <p14:creationId xmlns:p14="http://schemas.microsoft.com/office/powerpoint/2010/main" val="4125636590"/>
+      </p:ext>
+    </p:extLst>
+  </p:cSld>
+  <p:clrMapOvr>
+    <a:masterClrMapping/>
+  </p:clrMapOvr>
+</p:notes>
+</file>
+
+<file path=ppt/notesSlides/notesSlide6.xml><?xml version="1.0" encoding="utf-8"?>
+<p:notes xmlns:a="http://schemas.openxmlformats.org/drawingml/2006/main" xmlns:r="http://schemas.openxmlformats.org/officeDocument/2006/relationships" xmlns:p="http://schemas.openxmlformats.org/presentationml/2006/main">
+  <p:cSld>
+    <p:spTree>
+      <p:nvGrpSpPr>
+        <p:cNvPr id="1" name=""/>
+        <p:cNvGrpSpPr/>
+        <p:nvPr/>
+      </p:nvGrpSpPr>
+      <p:grpSpPr>
+        <a:xfrm>
+          <a:off x="0" y="0"/>
+          <a:ext cx="0" cy="0"/>
+          <a:chOff x="0" y="0"/>
+          <a:chExt cx="0" cy="0"/>
+        </a:xfrm>
+      </p:grpSpPr>
+      <p:sp>
+        <p:nvSpPr>
+          <p:cNvPr id="2" name="Slide Image Placeholder 1"/>
+          <p:cNvSpPr>
+            <a:spLocks noGrp="1" noRot="1" noChangeAspect="1"/>
+          </p:cNvSpPr>
+          <p:nvPr>
+            <p:ph type="sldImg"/>
+          </p:nvPr>
+        </p:nvSpPr>
+        <p:spPr/>
+      </p:sp>
+      <p:sp>
+        <p:nvSpPr>
+          <p:cNvPr id="3" name="Notes Placeholder 2"/>
+          <p:cNvSpPr>
+            <a:spLocks noGrp="1"/>
+          </p:cNvSpPr>
+          <p:nvPr>
+            <p:ph type="body" idx="1"/>
+          </p:nvPr>
+        </p:nvSpPr>
+        <p:spPr/>
+        <p:txBody>
+          <a:bodyPr/>
+          <a:lstStyle/>
+          <a:p>
+            <a:r>
+              <a:rPr lang="en-GB" dirty="0" smtClean="0"/>
+              <a:t>These slides accompany a two-hour “Beginning</a:t>
+            </a:r>
+            <a:r>
+              <a:rPr lang="en-GB" baseline="0" dirty="0" smtClean="0"/>
+              <a:t> Haskell” course.</a:t>
+            </a:r>
+            <a:endParaRPr lang="en-GB" dirty="0"/>
+          </a:p>
+        </p:txBody>
+      </p:sp>
+      <p:sp>
+        <p:nvSpPr>
+          <p:cNvPr id="4" name="Slide Number Placeholder 3"/>
+          <p:cNvSpPr>
+            <a:spLocks noGrp="1"/>
+          </p:cNvSpPr>
+          <p:nvPr>
+            <p:ph type="sldNum" sz="quarter" idx="10"/>
+          </p:nvPr>
+        </p:nvSpPr>
+        <p:spPr/>
+        <p:txBody>
+          <a:bodyPr/>
+          <a:lstStyle/>
+          <a:p>
+            <a:fld id="{999CC533-FB79-4577-A6D0-2326348CB1C0}" type="slidenum">
+              <a:rPr lang="en-GB" smtClean="0"/>
+              <a:t>15</a:t>
             </a:fld>
             <a:endParaRPr lang="en-GB" dirty="0"/>
           </a:p>
@@ -3608,6 +4072,1968 @@
 </p:sld>
 </file>
 
+<file path=ppt/slides/slide10.xml><?xml version="1.0" encoding="utf-8"?>
+<p:sld xmlns:a="http://schemas.openxmlformats.org/drawingml/2006/main" xmlns:r="http://schemas.openxmlformats.org/officeDocument/2006/relationships" xmlns:p="http://schemas.openxmlformats.org/presentationml/2006/main">
+  <p:cSld>
+    <p:spTree>
+      <p:nvGrpSpPr>
+        <p:cNvPr id="1" name=""/>
+        <p:cNvGrpSpPr/>
+        <p:nvPr/>
+      </p:nvGrpSpPr>
+      <p:grpSpPr>
+        <a:xfrm>
+          <a:off x="0" y="0"/>
+          <a:ext cx="0" cy="0"/>
+          <a:chOff x="0" y="0"/>
+          <a:chExt cx="0" cy="0"/>
+        </a:xfrm>
+      </p:grpSpPr>
+      <p:sp>
+        <p:nvSpPr>
+          <p:cNvPr id="11" name="TextBox 10"/>
+          <p:cNvSpPr txBox="1"/>
+          <p:nvPr/>
+        </p:nvSpPr>
+        <p:spPr>
+          <a:xfrm>
+            <a:off x="1331640" y="1052736"/>
+            <a:ext cx="3567002" cy="769441"/>
+          </a:xfrm>
+          <a:prstGeom prst="rect">
+            <a:avLst/>
+          </a:prstGeom>
+          <a:noFill/>
+        </p:spPr>
+        <p:txBody>
+          <a:bodyPr wrap="none" rtlCol="0">
+            <a:spAutoFit/>
+          </a:bodyPr>
+          <a:lstStyle/>
+          <a:p>
+            <a:r>
+              <a:rPr lang="en-GB" sz="4400" dirty="0" smtClean="0">
+                <a:latin typeface="Courier New" panose="02070309020205020404" pitchFamily="49" charset="0"/>
+                <a:cs typeface="Courier New" panose="02070309020205020404" pitchFamily="49" charset="0"/>
+              </a:rPr>
+              <a:t>sq x = x^2</a:t>
+            </a:r>
+            <a:endParaRPr lang="en-GB" sz="4400" dirty="0">
+              <a:latin typeface="Courier New" panose="02070309020205020404" pitchFamily="49" charset="0"/>
+              <a:cs typeface="Courier New" panose="02070309020205020404" pitchFamily="49" charset="0"/>
+            </a:endParaRPr>
+          </a:p>
+        </p:txBody>
+      </p:sp>
+      <p:sp>
+        <p:nvSpPr>
+          <p:cNvPr id="7" name="TextBox 6"/>
+          <p:cNvSpPr txBox="1"/>
+          <p:nvPr/>
+        </p:nvSpPr>
+        <p:spPr>
+          <a:xfrm>
+            <a:off x="1308247" y="2398241"/>
+            <a:ext cx="4919937" cy="769441"/>
+          </a:xfrm>
+          <a:prstGeom prst="rect">
+            <a:avLst/>
+          </a:prstGeom>
+          <a:noFill/>
+        </p:spPr>
+        <p:txBody>
+          <a:bodyPr wrap="none" rtlCol="0">
+            <a:spAutoFit/>
+          </a:bodyPr>
+          <a:lstStyle/>
+          <a:p>
+            <a:r>
+              <a:rPr lang="en-GB" sz="4400" dirty="0" smtClean="0">
+                <a:latin typeface="Courier New" panose="02070309020205020404" pitchFamily="49" charset="0"/>
+                <a:cs typeface="Courier New" panose="02070309020205020404" pitchFamily="49" charset="0"/>
+              </a:rPr>
+              <a:t>sq = \x -&gt; x^2</a:t>
+            </a:r>
+            <a:endParaRPr lang="en-GB" sz="4400" dirty="0">
+              <a:latin typeface="Courier New" panose="02070309020205020404" pitchFamily="49" charset="0"/>
+              <a:cs typeface="Courier New" panose="02070309020205020404" pitchFamily="49" charset="0"/>
+            </a:endParaRPr>
+          </a:p>
+        </p:txBody>
+      </p:sp>
+      <p:sp>
+        <p:nvSpPr>
+          <p:cNvPr id="8" name="TextBox 7"/>
+          <p:cNvSpPr txBox="1"/>
+          <p:nvPr/>
+        </p:nvSpPr>
+        <p:spPr>
+          <a:xfrm>
+            <a:off x="1343231" y="3838401"/>
+            <a:ext cx="3228769" cy="769441"/>
+          </a:xfrm>
+          <a:prstGeom prst="rect">
+            <a:avLst/>
+          </a:prstGeom>
+          <a:noFill/>
+        </p:spPr>
+        <p:txBody>
+          <a:bodyPr wrap="none" rtlCol="0">
+            <a:spAutoFit/>
+          </a:bodyPr>
+          <a:lstStyle/>
+          <a:p>
+            <a:r>
+              <a:rPr lang="en-GB" sz="4400" dirty="0" smtClean="0">
+                <a:latin typeface="Courier New" panose="02070309020205020404" pitchFamily="49" charset="0"/>
+                <a:cs typeface="Courier New" panose="02070309020205020404" pitchFamily="49" charset="0"/>
+              </a:rPr>
+              <a:t>sq = (^2)</a:t>
+            </a:r>
+            <a:endParaRPr lang="en-GB" sz="4400" dirty="0">
+              <a:latin typeface="Courier New" panose="02070309020205020404" pitchFamily="49" charset="0"/>
+              <a:cs typeface="Courier New" panose="02070309020205020404" pitchFamily="49" charset="0"/>
+            </a:endParaRPr>
+          </a:p>
+        </p:txBody>
+      </p:sp>
+    </p:spTree>
+    <p:extLst>
+      <p:ext uri="{BB962C8B-B14F-4D97-AF65-F5344CB8AC3E}">
+        <p14:creationId xmlns:p14="http://schemas.microsoft.com/office/powerpoint/2010/main" val="2164630935"/>
+      </p:ext>
+    </p:extLst>
+  </p:cSld>
+  <p:clrMapOvr>
+    <a:masterClrMapping/>
+  </p:clrMapOvr>
+  <p:timing>
+    <p:tnLst>
+      <p:par>
+        <p:cTn id="1" dur="indefinite" restart="never" nodeType="tmRoot">
+          <p:childTnLst>
+            <p:seq concurrent="1" nextAc="seek">
+              <p:cTn id="2" dur="indefinite" nodeType="mainSeq">
+                <p:childTnLst>
+                  <p:par>
+                    <p:cTn id="3" fill="hold">
+                      <p:stCondLst>
+                        <p:cond delay="indefinite"/>
+                      </p:stCondLst>
+                      <p:childTnLst>
+                        <p:par>
+                          <p:cTn id="4" fill="hold">
+                            <p:stCondLst>
+                              <p:cond delay="0"/>
+                            </p:stCondLst>
+                            <p:childTnLst>
+                              <p:par>
+                                <p:cTn id="5" presetID="1" presetClass="entr" presetSubtype="0" fill="hold" grpId="0" nodeType="clickEffect">
+                                  <p:stCondLst>
+                                    <p:cond delay="0"/>
+                                  </p:stCondLst>
+                                  <p:childTnLst>
+                                    <p:set>
+                                      <p:cBhvr>
+                                        <p:cTn id="6" dur="1" fill="hold">
+                                          <p:stCondLst>
+                                            <p:cond delay="0"/>
+                                          </p:stCondLst>
+                                        </p:cTn>
+                                        <p:tgtEl>
+                                          <p:spTgt spid="7"/>
+                                        </p:tgtEl>
+                                        <p:attrNameLst>
+                                          <p:attrName>style.visibility</p:attrName>
+                                        </p:attrNameLst>
+                                      </p:cBhvr>
+                                      <p:to>
+                                        <p:strVal val="visible"/>
+                                      </p:to>
+                                    </p:set>
+                                  </p:childTnLst>
+                                </p:cTn>
+                              </p:par>
+                            </p:childTnLst>
+                          </p:cTn>
+                        </p:par>
+                      </p:childTnLst>
+                    </p:cTn>
+                  </p:par>
+                  <p:par>
+                    <p:cTn id="7" fill="hold">
+                      <p:stCondLst>
+                        <p:cond delay="indefinite"/>
+                      </p:stCondLst>
+                      <p:childTnLst>
+                        <p:par>
+                          <p:cTn id="8" fill="hold">
+                            <p:stCondLst>
+                              <p:cond delay="0"/>
+                            </p:stCondLst>
+                            <p:childTnLst>
+                              <p:par>
+                                <p:cTn id="9" presetID="1" presetClass="entr" presetSubtype="0" fill="hold" grpId="0" nodeType="clickEffect">
+                                  <p:stCondLst>
+                                    <p:cond delay="0"/>
+                                  </p:stCondLst>
+                                  <p:childTnLst>
+                                    <p:set>
+                                      <p:cBhvr>
+                                        <p:cTn id="10" dur="1" fill="hold">
+                                          <p:stCondLst>
+                                            <p:cond delay="0"/>
+                                          </p:stCondLst>
+                                        </p:cTn>
+                                        <p:tgtEl>
+                                          <p:spTgt spid="8"/>
+                                        </p:tgtEl>
+                                        <p:attrNameLst>
+                                          <p:attrName>style.visibility</p:attrName>
+                                        </p:attrNameLst>
+                                      </p:cBhvr>
+                                      <p:to>
+                                        <p:strVal val="visible"/>
+                                      </p:to>
+                                    </p:set>
+                                  </p:childTnLst>
+                                </p:cTn>
+                              </p:par>
+                            </p:childTnLst>
+                          </p:cTn>
+                        </p:par>
+                      </p:childTnLst>
+                    </p:cTn>
+                  </p:par>
+                </p:childTnLst>
+              </p:cTn>
+              <p:prevCondLst>
+                <p:cond evt="onPrev" delay="0">
+                  <p:tgtEl>
+                    <p:sldTgt/>
+                  </p:tgtEl>
+                </p:cond>
+              </p:prevCondLst>
+              <p:nextCondLst>
+                <p:cond evt="onNext" delay="0">
+                  <p:tgtEl>
+                    <p:sldTgt/>
+                  </p:tgtEl>
+                </p:cond>
+              </p:nextCondLst>
+            </p:seq>
+          </p:childTnLst>
+        </p:cTn>
+      </p:par>
+    </p:tnLst>
+    <p:bldLst>
+      <p:bldP spid="7" grpId="0"/>
+      <p:bldP spid="8" grpId="0"/>
+    </p:bldLst>
+  </p:timing>
+</p:sld>
+</file>
+
+<file path=ppt/slides/slide11.xml><?xml version="1.0" encoding="utf-8"?>
+<p:sld xmlns:a="http://schemas.openxmlformats.org/drawingml/2006/main" xmlns:r="http://schemas.openxmlformats.org/officeDocument/2006/relationships" xmlns:p="http://schemas.openxmlformats.org/presentationml/2006/main">
+  <p:cSld>
+    <p:spTree>
+      <p:nvGrpSpPr>
+        <p:cNvPr id="1" name=""/>
+        <p:cNvGrpSpPr/>
+        <p:nvPr/>
+      </p:nvGrpSpPr>
+      <p:grpSpPr>
+        <a:xfrm>
+          <a:off x="0" y="0"/>
+          <a:ext cx="0" cy="0"/>
+          <a:chOff x="0" y="0"/>
+          <a:chExt cx="0" cy="0"/>
+        </a:xfrm>
+      </p:grpSpPr>
+      <p:sp>
+        <p:nvSpPr>
+          <p:cNvPr id="11" name="TextBox 10"/>
+          <p:cNvSpPr txBox="1"/>
+          <p:nvPr/>
+        </p:nvSpPr>
+        <p:spPr>
+          <a:xfrm>
+            <a:off x="1331640" y="1484784"/>
+            <a:ext cx="5416868" cy="1323439"/>
+          </a:xfrm>
+          <a:prstGeom prst="rect">
+            <a:avLst/>
+          </a:prstGeom>
+          <a:noFill/>
+        </p:spPr>
+        <p:txBody>
+          <a:bodyPr wrap="none" rtlCol="0">
+            <a:spAutoFit/>
+          </a:bodyPr>
+          <a:lstStyle/>
+          <a:p>
+            <a:r>
+              <a:rPr lang="en-GB" sz="4000" dirty="0" smtClean="0">
+                <a:latin typeface="Courier New" panose="02070309020205020404" pitchFamily="49" charset="0"/>
+                <a:cs typeface="Courier New" panose="02070309020205020404" pitchFamily="49" charset="0"/>
+              </a:rPr>
+              <a:t>f 0 = 1</a:t>
+            </a:r>
+          </a:p>
+          <a:p>
+            <a:r>
+              <a:rPr lang="en-GB" sz="4000" dirty="0" smtClean="0">
+                <a:latin typeface="Courier New" panose="02070309020205020404" pitchFamily="49" charset="0"/>
+                <a:cs typeface="Courier New" panose="02070309020205020404" pitchFamily="49" charset="0"/>
+              </a:rPr>
+              <a:t>f n = n * f (n-1)</a:t>
+            </a:r>
+            <a:endParaRPr lang="en-GB" sz="4000" dirty="0">
+              <a:latin typeface="Courier New" panose="02070309020205020404" pitchFamily="49" charset="0"/>
+              <a:cs typeface="Courier New" panose="02070309020205020404" pitchFamily="49" charset="0"/>
+            </a:endParaRPr>
+          </a:p>
+        </p:txBody>
+      </p:sp>
+      <p:sp>
+        <p:nvSpPr>
+          <p:cNvPr id="9" name="TextBox 8"/>
+          <p:cNvSpPr txBox="1"/>
+          <p:nvPr/>
+        </p:nvSpPr>
+        <p:spPr>
+          <a:xfrm>
+            <a:off x="367820" y="332656"/>
+            <a:ext cx="3124060" cy="1107996"/>
+          </a:xfrm>
+          <a:prstGeom prst="rect">
+            <a:avLst/>
+          </a:prstGeom>
+          <a:noFill/>
+        </p:spPr>
+        <p:txBody>
+          <a:bodyPr wrap="none" rtlCol="0">
+            <a:spAutoFit/>
+          </a:bodyPr>
+          <a:lstStyle/>
+          <a:p>
+            <a:r>
+              <a:rPr lang="en-GB" sz="6600" dirty="0" smtClean="0">
+                <a:solidFill>
+                  <a:srgbClr val="0070C0"/>
+                </a:solidFill>
+              </a:rPr>
+              <a:t>Factorial</a:t>
+            </a:r>
+            <a:endParaRPr lang="en-GB" sz="8000" dirty="0">
+              <a:solidFill>
+                <a:srgbClr val="0070C0"/>
+              </a:solidFill>
+            </a:endParaRPr>
+          </a:p>
+        </p:txBody>
+      </p:sp>
+      <p:sp>
+        <p:nvSpPr>
+          <p:cNvPr id="6" name="TextBox 5"/>
+          <p:cNvSpPr txBox="1"/>
+          <p:nvPr/>
+        </p:nvSpPr>
+        <p:spPr>
+          <a:xfrm>
+            <a:off x="2244665" y="2924944"/>
+            <a:ext cx="2268570" cy="707886"/>
+          </a:xfrm>
+          <a:prstGeom prst="rect">
+            <a:avLst/>
+          </a:prstGeom>
+          <a:noFill/>
+        </p:spPr>
+        <p:txBody>
+          <a:bodyPr wrap="none" rtlCol="0">
+            <a:spAutoFit/>
+          </a:bodyPr>
+          <a:lstStyle/>
+          <a:p>
+            <a:r>
+              <a:rPr lang="en-GB" sz="4000" dirty="0" smtClean="0">
+                <a:solidFill>
+                  <a:srgbClr val="7030A0"/>
+                </a:solidFill>
+                <a:cs typeface="Courier New" panose="02070309020205020404" pitchFamily="49" charset="0"/>
+              </a:rPr>
+              <a:t>4! = 4 * 3!</a:t>
+            </a:r>
+            <a:endParaRPr lang="en-GB" sz="4000" dirty="0">
+              <a:solidFill>
+                <a:srgbClr val="7030A0"/>
+              </a:solidFill>
+              <a:cs typeface="Courier New" panose="02070309020205020404" pitchFamily="49" charset="0"/>
+            </a:endParaRPr>
+          </a:p>
+        </p:txBody>
+      </p:sp>
+      <p:sp>
+        <p:nvSpPr>
+          <p:cNvPr id="10" name="TextBox 9"/>
+          <p:cNvSpPr txBox="1"/>
+          <p:nvPr/>
+        </p:nvSpPr>
+        <p:spPr>
+          <a:xfrm>
+            <a:off x="1484040" y="3789040"/>
+            <a:ext cx="4185761" cy="2554545"/>
+          </a:xfrm>
+          <a:prstGeom prst="rect">
+            <a:avLst/>
+          </a:prstGeom>
+          <a:noFill/>
+        </p:spPr>
+        <p:txBody>
+          <a:bodyPr wrap="none" rtlCol="0">
+            <a:spAutoFit/>
+          </a:bodyPr>
+          <a:lstStyle/>
+          <a:p>
+            <a:r>
+              <a:rPr lang="en-GB" sz="4000" dirty="0" smtClean="0">
+                <a:solidFill>
+                  <a:srgbClr val="0070C0"/>
+                </a:solidFill>
+                <a:latin typeface="Courier New" panose="02070309020205020404" pitchFamily="49" charset="0"/>
+                <a:cs typeface="Courier New" panose="02070309020205020404" pitchFamily="49" charset="0"/>
+              </a:rPr>
+              <a:t>f 2</a:t>
+            </a:r>
+          </a:p>
+          <a:p>
+            <a:r>
+              <a:rPr lang="en-GB" sz="4000" dirty="0" smtClean="0">
+                <a:solidFill>
+                  <a:srgbClr val="0070C0"/>
+                </a:solidFill>
+                <a:latin typeface="Courier New" panose="02070309020205020404" pitchFamily="49" charset="0"/>
+                <a:cs typeface="Courier New" panose="02070309020205020404" pitchFamily="49" charset="0"/>
+              </a:rPr>
+              <a:t>2 * f 1</a:t>
+            </a:r>
+          </a:p>
+          <a:p>
+            <a:r>
+              <a:rPr lang="en-GB" sz="4000" dirty="0" smtClean="0">
+                <a:solidFill>
+                  <a:srgbClr val="0070C0"/>
+                </a:solidFill>
+                <a:latin typeface="Courier New" panose="02070309020205020404" pitchFamily="49" charset="0"/>
+                <a:cs typeface="Courier New" panose="02070309020205020404" pitchFamily="49" charset="0"/>
+              </a:rPr>
+              <a:t>2 * (1 * f 0)</a:t>
+            </a:r>
+          </a:p>
+          <a:p>
+            <a:r>
+              <a:rPr lang="en-GB" sz="4000" dirty="0" smtClean="0">
+                <a:solidFill>
+                  <a:srgbClr val="0070C0"/>
+                </a:solidFill>
+                <a:latin typeface="Courier New" panose="02070309020205020404" pitchFamily="49" charset="0"/>
+                <a:cs typeface="Courier New" panose="02070309020205020404" pitchFamily="49" charset="0"/>
+              </a:rPr>
+              <a:t>2 * (1 * 1)</a:t>
+            </a:r>
+          </a:p>
+        </p:txBody>
+      </p:sp>
+    </p:spTree>
+    <p:extLst>
+      <p:ext uri="{BB962C8B-B14F-4D97-AF65-F5344CB8AC3E}">
+        <p14:creationId xmlns:p14="http://schemas.microsoft.com/office/powerpoint/2010/main" val="3792015651"/>
+      </p:ext>
+    </p:extLst>
+  </p:cSld>
+  <p:clrMapOvr>
+    <a:masterClrMapping/>
+  </p:clrMapOvr>
+  <p:timing>
+    <p:tnLst>
+      <p:par>
+        <p:cTn id="1" dur="indefinite" restart="never" nodeType="tmRoot">
+          <p:childTnLst>
+            <p:seq concurrent="1" nextAc="seek">
+              <p:cTn id="2" dur="indefinite" nodeType="mainSeq">
+                <p:childTnLst>
+                  <p:par>
+                    <p:cTn id="3" fill="hold">
+                      <p:stCondLst>
+                        <p:cond delay="indefinite"/>
+                      </p:stCondLst>
+                      <p:childTnLst>
+                        <p:par>
+                          <p:cTn id="4" fill="hold">
+                            <p:stCondLst>
+                              <p:cond delay="0"/>
+                            </p:stCondLst>
+                            <p:childTnLst>
+                              <p:par>
+                                <p:cTn id="5" presetID="1" presetClass="entr" presetSubtype="0" fill="hold" grpId="0" nodeType="clickEffect">
+                                  <p:stCondLst>
+                                    <p:cond delay="0"/>
+                                  </p:stCondLst>
+                                  <p:childTnLst>
+                                    <p:set>
+                                      <p:cBhvr>
+                                        <p:cTn id="6" dur="1" fill="hold">
+                                          <p:stCondLst>
+                                            <p:cond delay="0"/>
+                                          </p:stCondLst>
+                                        </p:cTn>
+                                        <p:tgtEl>
+                                          <p:spTgt spid="6"/>
+                                        </p:tgtEl>
+                                        <p:attrNameLst>
+                                          <p:attrName>style.visibility</p:attrName>
+                                        </p:attrNameLst>
+                                      </p:cBhvr>
+                                      <p:to>
+                                        <p:strVal val="visible"/>
+                                      </p:to>
+                                    </p:set>
+                                  </p:childTnLst>
+                                </p:cTn>
+                              </p:par>
+                            </p:childTnLst>
+                          </p:cTn>
+                        </p:par>
+                      </p:childTnLst>
+                    </p:cTn>
+                  </p:par>
+                </p:childTnLst>
+              </p:cTn>
+              <p:prevCondLst>
+                <p:cond evt="onPrev" delay="0">
+                  <p:tgtEl>
+                    <p:sldTgt/>
+                  </p:tgtEl>
+                </p:cond>
+              </p:prevCondLst>
+              <p:nextCondLst>
+                <p:cond evt="onNext" delay="0">
+                  <p:tgtEl>
+                    <p:sldTgt/>
+                  </p:tgtEl>
+                </p:cond>
+              </p:nextCondLst>
+            </p:seq>
+          </p:childTnLst>
+        </p:cTn>
+      </p:par>
+    </p:tnLst>
+    <p:bldLst>
+      <p:bldP spid="6" grpId="0"/>
+    </p:bldLst>
+  </p:timing>
+</p:sld>
+</file>
+
+<file path=ppt/slides/slide12.xml><?xml version="1.0" encoding="utf-8"?>
+<p:sld xmlns:a="http://schemas.openxmlformats.org/drawingml/2006/main" xmlns:r="http://schemas.openxmlformats.org/officeDocument/2006/relationships" xmlns:p="http://schemas.openxmlformats.org/presentationml/2006/main">
+  <p:cSld>
+    <p:spTree>
+      <p:nvGrpSpPr>
+        <p:cNvPr id="1" name=""/>
+        <p:cNvGrpSpPr/>
+        <p:nvPr/>
+      </p:nvGrpSpPr>
+      <p:grpSpPr>
+        <a:xfrm>
+          <a:off x="0" y="0"/>
+          <a:ext cx="0" cy="0"/>
+          <a:chOff x="0" y="0"/>
+          <a:chExt cx="0" cy="0"/>
+        </a:xfrm>
+      </p:grpSpPr>
+      <p:sp>
+        <p:nvSpPr>
+          <p:cNvPr id="3" name="TextBox 2"/>
+          <p:cNvSpPr txBox="1"/>
+          <p:nvPr/>
+        </p:nvSpPr>
+        <p:spPr>
+          <a:xfrm>
+            <a:off x="961255" y="4410331"/>
+            <a:ext cx="3228769" cy="769441"/>
+          </a:xfrm>
+          <a:prstGeom prst="rect">
+            <a:avLst/>
+          </a:prstGeom>
+          <a:noFill/>
+        </p:spPr>
+        <p:txBody>
+          <a:bodyPr wrap="none" rtlCol="0">
+            <a:spAutoFit/>
+          </a:bodyPr>
+          <a:lstStyle/>
+          <a:p>
+            <a:r>
+              <a:rPr lang="en-GB" sz="4400" dirty="0" smtClean="0">
+                <a:latin typeface="Courier New" panose="02070309020205020404" pitchFamily="49" charset="0"/>
+                <a:cs typeface="Courier New" panose="02070309020205020404" pitchFamily="49" charset="0"/>
+              </a:rPr>
+              <a:t>4 : [5,6]</a:t>
+            </a:r>
+            <a:endParaRPr lang="en-GB" sz="4400" dirty="0">
+              <a:latin typeface="Courier New" panose="02070309020205020404" pitchFamily="49" charset="0"/>
+              <a:cs typeface="Courier New" panose="02070309020205020404" pitchFamily="49" charset="0"/>
+            </a:endParaRPr>
+          </a:p>
+        </p:txBody>
+      </p:sp>
+      <p:sp>
+        <p:nvSpPr>
+          <p:cNvPr id="4" name="TextBox 3"/>
+          <p:cNvSpPr txBox="1"/>
+          <p:nvPr/>
+        </p:nvSpPr>
+        <p:spPr>
+          <a:xfrm>
+            <a:off x="2915816" y="5179839"/>
+            <a:ext cx="2552302" cy="769441"/>
+          </a:xfrm>
+          <a:prstGeom prst="rect">
+            <a:avLst/>
+          </a:prstGeom>
+          <a:noFill/>
+        </p:spPr>
+        <p:txBody>
+          <a:bodyPr wrap="none" rtlCol="0">
+            <a:spAutoFit/>
+          </a:bodyPr>
+          <a:lstStyle/>
+          <a:p>
+            <a:r>
+              <a:rPr lang="en-GB" sz="4400" dirty="0" smtClean="0">
+                <a:solidFill>
+                  <a:srgbClr val="0070C0"/>
+                </a:solidFill>
+                <a:latin typeface="Courier New" panose="02070309020205020404" pitchFamily="49" charset="0"/>
+                <a:cs typeface="Courier New" panose="02070309020205020404" pitchFamily="49" charset="0"/>
+              </a:rPr>
+              <a:t>[4,5,6]</a:t>
+            </a:r>
+            <a:endParaRPr lang="en-GB" sz="4400" dirty="0">
+              <a:solidFill>
+                <a:srgbClr val="0070C0"/>
+              </a:solidFill>
+              <a:latin typeface="Courier New" panose="02070309020205020404" pitchFamily="49" charset="0"/>
+              <a:cs typeface="Courier New" panose="02070309020205020404" pitchFamily="49" charset="0"/>
+            </a:endParaRPr>
+          </a:p>
+        </p:txBody>
+      </p:sp>
+      <p:sp>
+        <p:nvSpPr>
+          <p:cNvPr id="5" name="TextBox 4"/>
+          <p:cNvSpPr txBox="1"/>
+          <p:nvPr/>
+        </p:nvSpPr>
+        <p:spPr>
+          <a:xfrm>
+            <a:off x="961255" y="476672"/>
+            <a:ext cx="5596404" cy="769441"/>
+          </a:xfrm>
+          <a:prstGeom prst="rect">
+            <a:avLst/>
+          </a:prstGeom>
+          <a:noFill/>
+        </p:spPr>
+        <p:txBody>
+          <a:bodyPr wrap="none" rtlCol="0">
+            <a:spAutoFit/>
+          </a:bodyPr>
+          <a:lstStyle/>
+          <a:p>
+            <a:r>
+              <a:rPr lang="en-GB" sz="4400" dirty="0" smtClean="0">
+                <a:latin typeface="Courier New" panose="02070309020205020404" pitchFamily="49" charset="0"/>
+                <a:cs typeface="Courier New" panose="02070309020205020404" pitchFamily="49" charset="0"/>
+              </a:rPr>
+              <a:t>[2,3] ++ [4,5,6]</a:t>
+            </a:r>
+            <a:endParaRPr lang="en-GB" sz="4400" dirty="0">
+              <a:latin typeface="Courier New" panose="02070309020205020404" pitchFamily="49" charset="0"/>
+              <a:cs typeface="Courier New" panose="02070309020205020404" pitchFamily="49" charset="0"/>
+            </a:endParaRPr>
+          </a:p>
+        </p:txBody>
+      </p:sp>
+      <p:sp>
+        <p:nvSpPr>
+          <p:cNvPr id="6" name="TextBox 5"/>
+          <p:cNvSpPr txBox="1"/>
+          <p:nvPr/>
+        </p:nvSpPr>
+        <p:spPr>
+          <a:xfrm>
+            <a:off x="4555196" y="1246180"/>
+            <a:ext cx="3905236" cy="769441"/>
+          </a:xfrm>
+          <a:prstGeom prst="rect">
+            <a:avLst/>
+          </a:prstGeom>
+          <a:noFill/>
+        </p:spPr>
+        <p:txBody>
+          <a:bodyPr wrap="none" rtlCol="0">
+            <a:spAutoFit/>
+          </a:bodyPr>
+          <a:lstStyle/>
+          <a:p>
+            <a:r>
+              <a:rPr lang="en-GB" sz="4400" dirty="0" smtClean="0">
+                <a:solidFill>
+                  <a:srgbClr val="0070C0"/>
+                </a:solidFill>
+                <a:latin typeface="Courier New" panose="02070309020205020404" pitchFamily="49" charset="0"/>
+                <a:cs typeface="Courier New" panose="02070309020205020404" pitchFamily="49" charset="0"/>
+              </a:rPr>
+              <a:t>[2,3,4,5,6]</a:t>
+            </a:r>
+            <a:endParaRPr lang="en-GB" sz="4400" dirty="0">
+              <a:solidFill>
+                <a:srgbClr val="0070C0"/>
+              </a:solidFill>
+              <a:latin typeface="Courier New" panose="02070309020205020404" pitchFamily="49" charset="0"/>
+              <a:cs typeface="Courier New" panose="02070309020205020404" pitchFamily="49" charset="0"/>
+            </a:endParaRPr>
+          </a:p>
+        </p:txBody>
+      </p:sp>
+      <p:sp>
+        <p:nvSpPr>
+          <p:cNvPr id="7" name="TextBox 6"/>
+          <p:cNvSpPr txBox="1"/>
+          <p:nvPr/>
+        </p:nvSpPr>
+        <p:spPr>
+          <a:xfrm>
+            <a:off x="2148497" y="1772816"/>
+            <a:ext cx="1199367" cy="769441"/>
+          </a:xfrm>
+          <a:prstGeom prst="rect">
+            <a:avLst/>
+          </a:prstGeom>
+          <a:noFill/>
+        </p:spPr>
+        <p:txBody>
+          <a:bodyPr wrap="none" rtlCol="0">
+            <a:spAutoFit/>
+          </a:bodyPr>
+          <a:lstStyle/>
+          <a:p>
+            <a:r>
+              <a:rPr lang="en-GB" sz="4400" dirty="0" smtClean="0">
+                <a:latin typeface="Courier New" panose="02070309020205020404" pitchFamily="49" charset="0"/>
+                <a:cs typeface="Courier New" panose="02070309020205020404" pitchFamily="49" charset="0"/>
+              </a:rPr>
+              <a:t>i++</a:t>
+            </a:r>
+            <a:endParaRPr lang="en-GB" sz="4400" dirty="0">
+              <a:latin typeface="Courier New" panose="02070309020205020404" pitchFamily="49" charset="0"/>
+              <a:cs typeface="Courier New" panose="02070309020205020404" pitchFamily="49" charset="0"/>
+            </a:endParaRPr>
+          </a:p>
+        </p:txBody>
+      </p:sp>
+      <p:cxnSp>
+        <p:nvCxnSpPr>
+          <p:cNvPr id="8" name="Straight Connector 7"/>
+          <p:cNvCxnSpPr/>
+          <p:nvPr/>
+        </p:nvCxnSpPr>
+        <p:spPr>
+          <a:xfrm>
+            <a:off x="2148497" y="1772816"/>
+            <a:ext cx="1199367" cy="769441"/>
+          </a:xfrm>
+          <a:prstGeom prst="line">
+            <a:avLst/>
+          </a:prstGeom>
+          <a:ln w="28575">
+            <a:solidFill>
+              <a:srgbClr val="FF0000"/>
+            </a:solidFill>
+          </a:ln>
+        </p:spPr>
+        <p:style>
+          <a:lnRef idx="1">
+            <a:schemeClr val="accent1"/>
+          </a:lnRef>
+          <a:fillRef idx="0">
+            <a:schemeClr val="accent1"/>
+          </a:fillRef>
+          <a:effectRef idx="0">
+            <a:schemeClr val="accent1"/>
+          </a:effectRef>
+          <a:fontRef idx="minor">
+            <a:schemeClr val="tx1"/>
+          </a:fontRef>
+        </p:style>
+      </p:cxnSp>
+      <p:sp>
+        <p:nvSpPr>
+          <p:cNvPr id="9" name="TextBox 8"/>
+          <p:cNvSpPr txBox="1"/>
+          <p:nvPr/>
+        </p:nvSpPr>
+        <p:spPr>
+          <a:xfrm>
+            <a:off x="961255" y="2852936"/>
+            <a:ext cx="4243469" cy="769441"/>
+          </a:xfrm>
+          <a:prstGeom prst="rect">
+            <a:avLst/>
+          </a:prstGeom>
+          <a:noFill/>
+        </p:spPr>
+        <p:txBody>
+          <a:bodyPr wrap="none" rtlCol="0">
+            <a:spAutoFit/>
+          </a:bodyPr>
+          <a:lstStyle/>
+          <a:p>
+            <a:r>
+              <a:rPr lang="en-GB" sz="4400" dirty="0" smtClean="0">
+                <a:latin typeface="Courier New" panose="02070309020205020404" pitchFamily="49" charset="0"/>
+                <a:cs typeface="Courier New" panose="02070309020205020404" pitchFamily="49" charset="0"/>
+              </a:rPr>
+              <a:t>[5,6,7] !! 2</a:t>
+            </a:r>
+            <a:endParaRPr lang="en-GB" sz="4400" dirty="0">
+              <a:latin typeface="Courier New" panose="02070309020205020404" pitchFamily="49" charset="0"/>
+              <a:cs typeface="Courier New" panose="02070309020205020404" pitchFamily="49" charset="0"/>
+            </a:endParaRPr>
+          </a:p>
+        </p:txBody>
+      </p:sp>
+      <p:sp>
+        <p:nvSpPr>
+          <p:cNvPr id="10" name="TextBox 9"/>
+          <p:cNvSpPr txBox="1"/>
+          <p:nvPr/>
+        </p:nvSpPr>
+        <p:spPr>
+          <a:xfrm>
+            <a:off x="5633276" y="3573016"/>
+            <a:ext cx="522900" cy="769441"/>
+          </a:xfrm>
+          <a:prstGeom prst="rect">
+            <a:avLst/>
+          </a:prstGeom>
+          <a:noFill/>
+        </p:spPr>
+        <p:txBody>
+          <a:bodyPr wrap="none" rtlCol="0">
+            <a:spAutoFit/>
+          </a:bodyPr>
+          <a:lstStyle/>
+          <a:p>
+            <a:r>
+              <a:rPr lang="en-GB" sz="4400" dirty="0" smtClean="0">
+                <a:solidFill>
+                  <a:srgbClr val="0070C0"/>
+                </a:solidFill>
+                <a:latin typeface="Courier New" panose="02070309020205020404" pitchFamily="49" charset="0"/>
+                <a:cs typeface="Courier New" panose="02070309020205020404" pitchFamily="49" charset="0"/>
+              </a:rPr>
+              <a:t>7</a:t>
+            </a:r>
+            <a:endParaRPr lang="en-GB" sz="4400" dirty="0">
+              <a:solidFill>
+                <a:srgbClr val="0070C0"/>
+              </a:solidFill>
+              <a:latin typeface="Courier New" panose="02070309020205020404" pitchFamily="49" charset="0"/>
+              <a:cs typeface="Courier New" panose="02070309020205020404" pitchFamily="49" charset="0"/>
+            </a:endParaRPr>
+          </a:p>
+        </p:txBody>
+      </p:sp>
+    </p:spTree>
+    <p:extLst>
+      <p:ext uri="{BB962C8B-B14F-4D97-AF65-F5344CB8AC3E}">
+        <p14:creationId xmlns:p14="http://schemas.microsoft.com/office/powerpoint/2010/main" val="456667680"/>
+      </p:ext>
+    </p:extLst>
+  </p:cSld>
+  <p:clrMapOvr>
+    <a:masterClrMapping/>
+  </p:clrMapOvr>
+  <p:timing>
+    <p:tnLst>
+      <p:par>
+        <p:cTn id="1" dur="indefinite" restart="never" nodeType="tmRoot">
+          <p:childTnLst>
+            <p:seq concurrent="1" nextAc="seek">
+              <p:cTn id="2" dur="indefinite" nodeType="mainSeq">
+                <p:childTnLst>
+                  <p:par>
+                    <p:cTn id="3" fill="hold">
+                      <p:stCondLst>
+                        <p:cond delay="indefinite"/>
+                      </p:stCondLst>
+                      <p:childTnLst>
+                        <p:par>
+                          <p:cTn id="4" fill="hold">
+                            <p:stCondLst>
+                              <p:cond delay="0"/>
+                            </p:stCondLst>
+                            <p:childTnLst>
+                              <p:par>
+                                <p:cTn id="5" presetID="1" presetClass="entr" presetSubtype="0" fill="hold" grpId="0" nodeType="clickEffect">
+                                  <p:stCondLst>
+                                    <p:cond delay="0"/>
+                                  </p:stCondLst>
+                                  <p:childTnLst>
+                                    <p:set>
+                                      <p:cBhvr>
+                                        <p:cTn id="6" dur="1" fill="hold">
+                                          <p:stCondLst>
+                                            <p:cond delay="0"/>
+                                          </p:stCondLst>
+                                        </p:cTn>
+                                        <p:tgtEl>
+                                          <p:spTgt spid="6"/>
+                                        </p:tgtEl>
+                                        <p:attrNameLst>
+                                          <p:attrName>style.visibility</p:attrName>
+                                        </p:attrNameLst>
+                                      </p:cBhvr>
+                                      <p:to>
+                                        <p:strVal val="visible"/>
+                                      </p:to>
+                                    </p:set>
+                                  </p:childTnLst>
+                                </p:cTn>
+                              </p:par>
+                            </p:childTnLst>
+                          </p:cTn>
+                        </p:par>
+                      </p:childTnLst>
+                    </p:cTn>
+                  </p:par>
+                  <p:par>
+                    <p:cTn id="7" fill="hold">
+                      <p:stCondLst>
+                        <p:cond delay="indefinite"/>
+                      </p:stCondLst>
+                      <p:childTnLst>
+                        <p:par>
+                          <p:cTn id="8" fill="hold">
+                            <p:stCondLst>
+                              <p:cond delay="0"/>
+                            </p:stCondLst>
+                            <p:childTnLst>
+                              <p:par>
+                                <p:cTn id="9" presetID="1" presetClass="entr" presetSubtype="0" fill="hold" grpId="0" nodeType="clickEffect">
+                                  <p:stCondLst>
+                                    <p:cond delay="0"/>
+                                  </p:stCondLst>
+                                  <p:childTnLst>
+                                    <p:set>
+                                      <p:cBhvr>
+                                        <p:cTn id="10" dur="1" fill="hold">
+                                          <p:stCondLst>
+                                            <p:cond delay="0"/>
+                                          </p:stCondLst>
+                                        </p:cTn>
+                                        <p:tgtEl>
+                                          <p:spTgt spid="7"/>
+                                        </p:tgtEl>
+                                        <p:attrNameLst>
+                                          <p:attrName>style.visibility</p:attrName>
+                                        </p:attrNameLst>
+                                      </p:cBhvr>
+                                      <p:to>
+                                        <p:strVal val="visible"/>
+                                      </p:to>
+                                    </p:set>
+                                  </p:childTnLst>
+                                </p:cTn>
+                              </p:par>
+                              <p:par>
+                                <p:cTn id="11" presetID="1" presetClass="entr" presetSubtype="0" fill="hold" nodeType="withEffect">
+                                  <p:stCondLst>
+                                    <p:cond delay="0"/>
+                                  </p:stCondLst>
+                                  <p:childTnLst>
+                                    <p:set>
+                                      <p:cBhvr>
+                                        <p:cTn id="12" dur="1" fill="hold">
+                                          <p:stCondLst>
+                                            <p:cond delay="0"/>
+                                          </p:stCondLst>
+                                        </p:cTn>
+                                        <p:tgtEl>
+                                          <p:spTgt spid="8"/>
+                                        </p:tgtEl>
+                                        <p:attrNameLst>
+                                          <p:attrName>style.visibility</p:attrName>
+                                        </p:attrNameLst>
+                                      </p:cBhvr>
+                                      <p:to>
+                                        <p:strVal val="visible"/>
+                                      </p:to>
+                                    </p:set>
+                                  </p:childTnLst>
+                                </p:cTn>
+                              </p:par>
+                            </p:childTnLst>
+                          </p:cTn>
+                        </p:par>
+                      </p:childTnLst>
+                    </p:cTn>
+                  </p:par>
+                  <p:par>
+                    <p:cTn id="13" fill="hold">
+                      <p:stCondLst>
+                        <p:cond delay="indefinite"/>
+                      </p:stCondLst>
+                      <p:childTnLst>
+                        <p:par>
+                          <p:cTn id="14" fill="hold">
+                            <p:stCondLst>
+                              <p:cond delay="0"/>
+                            </p:stCondLst>
+                            <p:childTnLst>
+                              <p:par>
+                                <p:cTn id="15" presetID="1" presetClass="entr" presetSubtype="0" fill="hold" grpId="0" nodeType="clickEffect">
+                                  <p:stCondLst>
+                                    <p:cond delay="0"/>
+                                  </p:stCondLst>
+                                  <p:childTnLst>
+                                    <p:set>
+                                      <p:cBhvr>
+                                        <p:cTn id="16" dur="1" fill="hold">
+                                          <p:stCondLst>
+                                            <p:cond delay="0"/>
+                                          </p:stCondLst>
+                                        </p:cTn>
+                                        <p:tgtEl>
+                                          <p:spTgt spid="9"/>
+                                        </p:tgtEl>
+                                        <p:attrNameLst>
+                                          <p:attrName>style.visibility</p:attrName>
+                                        </p:attrNameLst>
+                                      </p:cBhvr>
+                                      <p:to>
+                                        <p:strVal val="visible"/>
+                                      </p:to>
+                                    </p:set>
+                                  </p:childTnLst>
+                                </p:cTn>
+                              </p:par>
+                            </p:childTnLst>
+                          </p:cTn>
+                        </p:par>
+                      </p:childTnLst>
+                    </p:cTn>
+                  </p:par>
+                  <p:par>
+                    <p:cTn id="17" fill="hold">
+                      <p:stCondLst>
+                        <p:cond delay="indefinite"/>
+                      </p:stCondLst>
+                      <p:childTnLst>
+                        <p:par>
+                          <p:cTn id="18" fill="hold">
+                            <p:stCondLst>
+                              <p:cond delay="0"/>
+                            </p:stCondLst>
+                            <p:childTnLst>
+                              <p:par>
+                                <p:cTn id="19" presetID="1" presetClass="entr" presetSubtype="0" fill="hold" grpId="0" nodeType="clickEffect">
+                                  <p:stCondLst>
+                                    <p:cond delay="0"/>
+                                  </p:stCondLst>
+                                  <p:childTnLst>
+                                    <p:set>
+                                      <p:cBhvr>
+                                        <p:cTn id="20" dur="1" fill="hold">
+                                          <p:stCondLst>
+                                            <p:cond delay="0"/>
+                                          </p:stCondLst>
+                                        </p:cTn>
+                                        <p:tgtEl>
+                                          <p:spTgt spid="10"/>
+                                        </p:tgtEl>
+                                        <p:attrNameLst>
+                                          <p:attrName>style.visibility</p:attrName>
+                                        </p:attrNameLst>
+                                      </p:cBhvr>
+                                      <p:to>
+                                        <p:strVal val="visible"/>
+                                      </p:to>
+                                    </p:set>
+                                  </p:childTnLst>
+                                </p:cTn>
+                              </p:par>
+                            </p:childTnLst>
+                          </p:cTn>
+                        </p:par>
+                      </p:childTnLst>
+                    </p:cTn>
+                  </p:par>
+                  <p:par>
+                    <p:cTn id="21" fill="hold">
+                      <p:stCondLst>
+                        <p:cond delay="indefinite"/>
+                      </p:stCondLst>
+                      <p:childTnLst>
+                        <p:par>
+                          <p:cTn id="22" fill="hold">
+                            <p:stCondLst>
+                              <p:cond delay="0"/>
+                            </p:stCondLst>
+                            <p:childTnLst>
+                              <p:par>
+                                <p:cTn id="23" presetID="1" presetClass="entr" presetSubtype="0" fill="hold" grpId="0" nodeType="clickEffect">
+                                  <p:stCondLst>
+                                    <p:cond delay="0"/>
+                                  </p:stCondLst>
+                                  <p:childTnLst>
+                                    <p:set>
+                                      <p:cBhvr>
+                                        <p:cTn id="24" dur="1" fill="hold">
+                                          <p:stCondLst>
+                                            <p:cond delay="0"/>
+                                          </p:stCondLst>
+                                        </p:cTn>
+                                        <p:tgtEl>
+                                          <p:spTgt spid="3"/>
+                                        </p:tgtEl>
+                                        <p:attrNameLst>
+                                          <p:attrName>style.visibility</p:attrName>
+                                        </p:attrNameLst>
+                                      </p:cBhvr>
+                                      <p:to>
+                                        <p:strVal val="visible"/>
+                                      </p:to>
+                                    </p:set>
+                                  </p:childTnLst>
+                                </p:cTn>
+                              </p:par>
+                            </p:childTnLst>
+                          </p:cTn>
+                        </p:par>
+                      </p:childTnLst>
+                    </p:cTn>
+                  </p:par>
+                  <p:par>
+                    <p:cTn id="25" fill="hold">
+                      <p:stCondLst>
+                        <p:cond delay="indefinite"/>
+                      </p:stCondLst>
+                      <p:childTnLst>
+                        <p:par>
+                          <p:cTn id="26" fill="hold">
+                            <p:stCondLst>
+                              <p:cond delay="0"/>
+                            </p:stCondLst>
+                            <p:childTnLst>
+                              <p:par>
+                                <p:cTn id="27" presetID="1" presetClass="entr" presetSubtype="0" fill="hold" grpId="0" nodeType="clickEffect">
+                                  <p:stCondLst>
+                                    <p:cond delay="0"/>
+                                  </p:stCondLst>
+                                  <p:childTnLst>
+                                    <p:set>
+                                      <p:cBhvr>
+                                        <p:cTn id="28" dur="1" fill="hold">
+                                          <p:stCondLst>
+                                            <p:cond delay="0"/>
+                                          </p:stCondLst>
+                                        </p:cTn>
+                                        <p:tgtEl>
+                                          <p:spTgt spid="4"/>
+                                        </p:tgtEl>
+                                        <p:attrNameLst>
+                                          <p:attrName>style.visibility</p:attrName>
+                                        </p:attrNameLst>
+                                      </p:cBhvr>
+                                      <p:to>
+                                        <p:strVal val="visible"/>
+                                      </p:to>
+                                    </p:set>
+                                  </p:childTnLst>
+                                </p:cTn>
+                              </p:par>
+                            </p:childTnLst>
+                          </p:cTn>
+                        </p:par>
+                      </p:childTnLst>
+                    </p:cTn>
+                  </p:par>
+                </p:childTnLst>
+              </p:cTn>
+              <p:prevCondLst>
+                <p:cond evt="onPrev" delay="0">
+                  <p:tgtEl>
+                    <p:sldTgt/>
+                  </p:tgtEl>
+                </p:cond>
+              </p:prevCondLst>
+              <p:nextCondLst>
+                <p:cond evt="onNext" delay="0">
+                  <p:tgtEl>
+                    <p:sldTgt/>
+                  </p:tgtEl>
+                </p:cond>
+              </p:nextCondLst>
+            </p:seq>
+          </p:childTnLst>
+        </p:cTn>
+      </p:par>
+    </p:tnLst>
+    <p:bldLst>
+      <p:bldP spid="3" grpId="0"/>
+      <p:bldP spid="4" grpId="0"/>
+      <p:bldP spid="6" grpId="0"/>
+      <p:bldP spid="7" grpId="0"/>
+      <p:bldP spid="9" grpId="0"/>
+      <p:bldP spid="10" grpId="0"/>
+    </p:bldLst>
+  </p:timing>
+</p:sld>
+</file>
+
+<file path=ppt/slides/slide13.xml><?xml version="1.0" encoding="utf-8"?>
+<p:sld xmlns:a="http://schemas.openxmlformats.org/drawingml/2006/main" xmlns:r="http://schemas.openxmlformats.org/officeDocument/2006/relationships" xmlns:p="http://schemas.openxmlformats.org/presentationml/2006/main">
+  <p:cSld>
+    <p:spTree>
+      <p:nvGrpSpPr>
+        <p:cNvPr id="1" name=""/>
+        <p:cNvGrpSpPr/>
+        <p:nvPr/>
+      </p:nvGrpSpPr>
+      <p:grpSpPr>
+        <a:xfrm>
+          <a:off x="0" y="0"/>
+          <a:ext cx="0" cy="0"/>
+          <a:chOff x="0" y="0"/>
+          <a:chExt cx="0" cy="0"/>
+        </a:xfrm>
+      </p:grpSpPr>
+      <p:sp>
+        <p:nvSpPr>
+          <p:cNvPr id="3" name="TextBox 2"/>
+          <p:cNvSpPr txBox="1"/>
+          <p:nvPr/>
+        </p:nvSpPr>
+        <p:spPr>
+          <a:xfrm>
+            <a:off x="683568" y="620688"/>
+            <a:ext cx="1875835" cy="769441"/>
+          </a:xfrm>
+          <a:prstGeom prst="rect">
+            <a:avLst/>
+          </a:prstGeom>
+          <a:noFill/>
+        </p:spPr>
+        <p:txBody>
+          <a:bodyPr wrap="none" rtlCol="0">
+            <a:spAutoFit/>
+          </a:bodyPr>
+          <a:lstStyle/>
+          <a:p>
+            <a:r>
+              <a:rPr lang="en-GB" sz="4400" dirty="0" smtClean="0">
+                <a:latin typeface="Courier New" panose="02070309020205020404" pitchFamily="49" charset="0"/>
+                <a:cs typeface="Courier New" panose="02070309020205020404" pitchFamily="49" charset="0"/>
+              </a:rPr>
+              <a:t>[2,4]</a:t>
+            </a:r>
+          </a:p>
+        </p:txBody>
+      </p:sp>
+      <p:sp>
+        <p:nvSpPr>
+          <p:cNvPr id="13" name="TextBox 12"/>
+          <p:cNvSpPr txBox="1"/>
+          <p:nvPr/>
+        </p:nvSpPr>
+        <p:spPr>
+          <a:xfrm>
+            <a:off x="683568" y="1295264"/>
+            <a:ext cx="4243469" cy="2123658"/>
+          </a:xfrm>
+          <a:prstGeom prst="rect">
+            <a:avLst/>
+          </a:prstGeom>
+          <a:noFill/>
+        </p:spPr>
+        <p:txBody>
+          <a:bodyPr wrap="none" rtlCol="0">
+            <a:spAutoFit/>
+          </a:bodyPr>
+          <a:lstStyle/>
+          <a:p>
+            <a:r>
+              <a:rPr lang="en-GB" sz="4400" dirty="0" smtClean="0">
+                <a:latin typeface="Courier New" panose="02070309020205020404" pitchFamily="49" charset="0"/>
+                <a:cs typeface="Courier New" panose="02070309020205020404" pitchFamily="49" charset="0"/>
+              </a:rPr>
+              <a:t>2</a:t>
+            </a:r>
+            <a:r>
+              <a:rPr lang="en-GB" sz="4400" dirty="0" smtClean="0">
+                <a:latin typeface="Courier New" panose="02070309020205020404" pitchFamily="49" charset="0"/>
+                <a:cs typeface="Courier New" panose="02070309020205020404" pitchFamily="49" charset="0"/>
+              </a:rPr>
+              <a:t> : [4]</a:t>
+            </a:r>
+          </a:p>
+          <a:p>
+            <a:r>
+              <a:rPr lang="en-GB" sz="4400" dirty="0">
+                <a:latin typeface="Courier New" panose="02070309020205020404" pitchFamily="49" charset="0"/>
+                <a:cs typeface="Courier New" panose="02070309020205020404" pitchFamily="49" charset="0"/>
+              </a:rPr>
+              <a:t>2</a:t>
+            </a:r>
+            <a:r>
+              <a:rPr lang="en-GB" sz="4400" dirty="0" smtClean="0">
+                <a:latin typeface="Courier New" panose="02070309020205020404" pitchFamily="49" charset="0"/>
+                <a:cs typeface="Courier New" panose="02070309020205020404" pitchFamily="49" charset="0"/>
+              </a:rPr>
+              <a:t> : (4 : [])</a:t>
+            </a:r>
+          </a:p>
+          <a:p>
+            <a:r>
+              <a:rPr lang="en-GB" sz="4400" dirty="0" smtClean="0">
+                <a:latin typeface="Courier New" panose="02070309020205020404" pitchFamily="49" charset="0"/>
+                <a:cs typeface="Courier New" panose="02070309020205020404" pitchFamily="49" charset="0"/>
+              </a:rPr>
+              <a:t>2 : 4 : []</a:t>
+            </a:r>
+          </a:p>
+        </p:txBody>
+      </p:sp>
+    </p:spTree>
+    <p:extLst>
+      <p:ext uri="{BB962C8B-B14F-4D97-AF65-F5344CB8AC3E}">
+        <p14:creationId xmlns:p14="http://schemas.microsoft.com/office/powerpoint/2010/main" val="613305746"/>
+      </p:ext>
+    </p:extLst>
+  </p:cSld>
+  <p:clrMapOvr>
+    <a:masterClrMapping/>
+  </p:clrMapOvr>
+  <p:timing>
+    <p:tnLst>
+      <p:par>
+        <p:cTn id="1" dur="indefinite" restart="never" nodeType="tmRoot">
+          <p:childTnLst>
+            <p:seq concurrent="1" nextAc="seek">
+              <p:cTn id="2" dur="indefinite" nodeType="mainSeq">
+                <p:childTnLst>
+                  <p:par>
+                    <p:cTn id="3" fill="hold">
+                      <p:stCondLst>
+                        <p:cond delay="indefinite"/>
+                      </p:stCondLst>
+                      <p:childTnLst>
+                        <p:par>
+                          <p:cTn id="4" fill="hold">
+                            <p:stCondLst>
+                              <p:cond delay="0"/>
+                            </p:stCondLst>
+                            <p:childTnLst>
+                              <p:par>
+                                <p:cTn id="5" presetID="1" presetClass="entr" presetSubtype="0" fill="hold" grpId="0" nodeType="clickEffect">
+                                  <p:stCondLst>
+                                    <p:cond delay="0"/>
+                                  </p:stCondLst>
+                                  <p:childTnLst>
+                                    <p:set>
+                                      <p:cBhvr>
+                                        <p:cTn id="6" dur="1" fill="hold">
+                                          <p:stCondLst>
+                                            <p:cond delay="0"/>
+                                          </p:stCondLst>
+                                        </p:cTn>
+                                        <p:tgtEl>
+                                          <p:spTgt spid="13">
+                                            <p:txEl>
+                                              <p:pRg st="0" end="0"/>
+                                            </p:txEl>
+                                          </p:spTgt>
+                                        </p:tgtEl>
+                                        <p:attrNameLst>
+                                          <p:attrName>style.visibility</p:attrName>
+                                        </p:attrNameLst>
+                                      </p:cBhvr>
+                                      <p:to>
+                                        <p:strVal val="visible"/>
+                                      </p:to>
+                                    </p:set>
+                                  </p:childTnLst>
+                                </p:cTn>
+                              </p:par>
+                            </p:childTnLst>
+                          </p:cTn>
+                        </p:par>
+                      </p:childTnLst>
+                    </p:cTn>
+                  </p:par>
+                  <p:par>
+                    <p:cTn id="7" fill="hold">
+                      <p:stCondLst>
+                        <p:cond delay="indefinite"/>
+                      </p:stCondLst>
+                      <p:childTnLst>
+                        <p:par>
+                          <p:cTn id="8" fill="hold">
+                            <p:stCondLst>
+                              <p:cond delay="0"/>
+                            </p:stCondLst>
+                            <p:childTnLst>
+                              <p:par>
+                                <p:cTn id="9" presetID="1" presetClass="entr" presetSubtype="0" fill="hold" grpId="0" nodeType="clickEffect">
+                                  <p:stCondLst>
+                                    <p:cond delay="0"/>
+                                  </p:stCondLst>
+                                  <p:childTnLst>
+                                    <p:set>
+                                      <p:cBhvr>
+                                        <p:cTn id="10" dur="1" fill="hold">
+                                          <p:stCondLst>
+                                            <p:cond delay="0"/>
+                                          </p:stCondLst>
+                                        </p:cTn>
+                                        <p:tgtEl>
+                                          <p:spTgt spid="13">
+                                            <p:txEl>
+                                              <p:pRg st="1" end="1"/>
+                                            </p:txEl>
+                                          </p:spTgt>
+                                        </p:tgtEl>
+                                        <p:attrNameLst>
+                                          <p:attrName>style.visibility</p:attrName>
+                                        </p:attrNameLst>
+                                      </p:cBhvr>
+                                      <p:to>
+                                        <p:strVal val="visible"/>
+                                      </p:to>
+                                    </p:set>
+                                  </p:childTnLst>
+                                </p:cTn>
+                              </p:par>
+                            </p:childTnLst>
+                          </p:cTn>
+                        </p:par>
+                      </p:childTnLst>
+                    </p:cTn>
+                  </p:par>
+                  <p:par>
+                    <p:cTn id="11" fill="hold">
+                      <p:stCondLst>
+                        <p:cond delay="indefinite"/>
+                      </p:stCondLst>
+                      <p:childTnLst>
+                        <p:par>
+                          <p:cTn id="12" fill="hold">
+                            <p:stCondLst>
+                              <p:cond delay="0"/>
+                            </p:stCondLst>
+                            <p:childTnLst>
+                              <p:par>
+                                <p:cTn id="13" presetID="1" presetClass="entr" presetSubtype="0" fill="hold" grpId="0" nodeType="clickEffect">
+                                  <p:stCondLst>
+                                    <p:cond delay="0"/>
+                                  </p:stCondLst>
+                                  <p:childTnLst>
+                                    <p:set>
+                                      <p:cBhvr>
+                                        <p:cTn id="14" dur="1" fill="hold">
+                                          <p:stCondLst>
+                                            <p:cond delay="0"/>
+                                          </p:stCondLst>
+                                        </p:cTn>
+                                        <p:tgtEl>
+                                          <p:spTgt spid="13">
+                                            <p:txEl>
+                                              <p:pRg st="2" end="2"/>
+                                            </p:txEl>
+                                          </p:spTgt>
+                                        </p:tgtEl>
+                                        <p:attrNameLst>
+                                          <p:attrName>style.visibility</p:attrName>
+                                        </p:attrNameLst>
+                                      </p:cBhvr>
+                                      <p:to>
+                                        <p:strVal val="visible"/>
+                                      </p:to>
+                                    </p:set>
+                                  </p:childTnLst>
+                                </p:cTn>
+                              </p:par>
+                            </p:childTnLst>
+                          </p:cTn>
+                        </p:par>
+                      </p:childTnLst>
+                    </p:cTn>
+                  </p:par>
+                </p:childTnLst>
+              </p:cTn>
+              <p:prevCondLst>
+                <p:cond evt="onPrev" delay="0">
+                  <p:tgtEl>
+                    <p:sldTgt/>
+                  </p:tgtEl>
+                </p:cond>
+              </p:prevCondLst>
+              <p:nextCondLst>
+                <p:cond evt="onNext" delay="0">
+                  <p:tgtEl>
+                    <p:sldTgt/>
+                  </p:tgtEl>
+                </p:cond>
+              </p:nextCondLst>
+            </p:seq>
+          </p:childTnLst>
+        </p:cTn>
+      </p:par>
+    </p:tnLst>
+    <p:bldLst>
+      <p:bldP spid="13" grpId="0" build="p"/>
+    </p:bldLst>
+  </p:timing>
+</p:sld>
+</file>
+
+<file path=ppt/slides/slide14.xml><?xml version="1.0" encoding="utf-8"?>
+<p:sld xmlns:a="http://schemas.openxmlformats.org/drawingml/2006/main" xmlns:r="http://schemas.openxmlformats.org/officeDocument/2006/relationships" xmlns:p="http://schemas.openxmlformats.org/presentationml/2006/main">
+  <p:cSld>
+    <p:spTree>
+      <p:nvGrpSpPr>
+        <p:cNvPr id="1" name=""/>
+        <p:cNvGrpSpPr/>
+        <p:nvPr/>
+      </p:nvGrpSpPr>
+      <p:grpSpPr>
+        <a:xfrm>
+          <a:off x="0" y="0"/>
+          <a:ext cx="0" cy="0"/>
+          <a:chOff x="0" y="0"/>
+          <a:chExt cx="0" cy="0"/>
+        </a:xfrm>
+      </p:grpSpPr>
+      <p:sp>
+        <p:nvSpPr>
+          <p:cNvPr id="11" name="TextBox 10"/>
+          <p:cNvSpPr txBox="1"/>
+          <p:nvPr/>
+        </p:nvSpPr>
+        <p:spPr>
+          <a:xfrm>
+            <a:off x="323528" y="2132856"/>
+            <a:ext cx="8166018" cy="2123658"/>
+          </a:xfrm>
+          <a:prstGeom prst="rect">
+            <a:avLst/>
+          </a:prstGeom>
+          <a:noFill/>
+        </p:spPr>
+        <p:txBody>
+          <a:bodyPr wrap="none" rtlCol="0">
+            <a:spAutoFit/>
+          </a:bodyPr>
+          <a:lstStyle/>
+          <a:p>
+            <a:r>
+              <a:rPr lang="en-GB" sz="4400" dirty="0" smtClean="0">
+                <a:latin typeface="Courier New" panose="02070309020205020404" pitchFamily="49" charset="0"/>
+                <a:cs typeface="Courier New" panose="02070309020205020404" pitchFamily="49" charset="0"/>
+              </a:rPr>
+              <a:t>sum [] = 0</a:t>
+            </a:r>
+          </a:p>
+          <a:p>
+            <a:r>
+              <a:rPr lang="en-GB" sz="4400" i="1" dirty="0" smtClean="0">
+                <a:solidFill>
+                  <a:srgbClr val="C00000"/>
+                </a:solidFill>
+                <a:latin typeface="Courier New" panose="02070309020205020404" pitchFamily="49" charset="0"/>
+                <a:cs typeface="Courier New" panose="02070309020205020404" pitchFamily="49" charset="0"/>
+              </a:rPr>
+              <a:t>   </a:t>
+            </a:r>
+            <a:r>
+              <a:rPr lang="en-GB" sz="4400" i="1" dirty="0" smtClean="0">
+                <a:solidFill>
+                  <a:srgbClr val="C00000"/>
+                </a:solidFill>
+                <a:latin typeface="+mj-lt"/>
+                <a:cs typeface="Courier New" panose="02070309020205020404" pitchFamily="49" charset="0"/>
+              </a:rPr>
+              <a:t>sum [2, 3, 4]  =  2  +  sum [3, 4]</a:t>
+            </a:r>
+          </a:p>
+          <a:p>
+            <a:r>
+              <a:rPr lang="en-GB" sz="4400" dirty="0" smtClean="0">
+                <a:latin typeface="Courier New" panose="02070309020205020404" pitchFamily="49" charset="0"/>
+                <a:cs typeface="Courier New" panose="02070309020205020404" pitchFamily="49" charset="0"/>
+              </a:rPr>
+              <a:t>sum (x:xs) = x + sum xs</a:t>
+            </a:r>
+            <a:endParaRPr lang="en-GB" sz="4400" dirty="0">
+              <a:latin typeface="Courier New" panose="02070309020205020404" pitchFamily="49" charset="0"/>
+              <a:cs typeface="Courier New" panose="02070309020205020404" pitchFamily="49" charset="0"/>
+            </a:endParaRPr>
+          </a:p>
+        </p:txBody>
+      </p:sp>
+      <p:sp>
+        <p:nvSpPr>
+          <p:cNvPr id="9" name="TextBox 8"/>
+          <p:cNvSpPr txBox="1"/>
+          <p:nvPr/>
+        </p:nvSpPr>
+        <p:spPr>
+          <a:xfrm>
+            <a:off x="268516" y="548680"/>
+            <a:ext cx="8623964" cy="923330"/>
+          </a:xfrm>
+          <a:prstGeom prst="rect">
+            <a:avLst/>
+          </a:prstGeom>
+          <a:noFill/>
+        </p:spPr>
+        <p:txBody>
+          <a:bodyPr wrap="none" rtlCol="0">
+            <a:spAutoFit/>
+          </a:bodyPr>
+          <a:lstStyle/>
+          <a:p>
+            <a:r>
+              <a:rPr lang="en-GB" sz="5400" dirty="0" smtClean="0">
+                <a:solidFill>
+                  <a:srgbClr val="0070C0"/>
+                </a:solidFill>
+              </a:rPr>
+              <a:t>Writing our own sum function</a:t>
+            </a:r>
+            <a:endParaRPr lang="en-GB" sz="6600" dirty="0">
+              <a:solidFill>
+                <a:srgbClr val="0070C0"/>
+              </a:solidFill>
+            </a:endParaRPr>
+          </a:p>
+        </p:txBody>
+      </p:sp>
+    </p:spTree>
+    <p:extLst>
+      <p:ext uri="{BB962C8B-B14F-4D97-AF65-F5344CB8AC3E}">
+        <p14:creationId xmlns:p14="http://schemas.microsoft.com/office/powerpoint/2010/main" val="3111800040"/>
+      </p:ext>
+    </p:extLst>
+  </p:cSld>
+  <p:clrMapOvr>
+    <a:masterClrMapping/>
+  </p:clrMapOvr>
+  <p:timing>
+    <p:tnLst>
+      <p:par>
+        <p:cTn id="1" dur="indefinite" restart="never" nodeType="tmRoot">
+          <p:childTnLst>
+            <p:seq concurrent="1" nextAc="seek">
+              <p:cTn id="2" dur="indefinite" nodeType="mainSeq">
+                <p:childTnLst>
+                  <p:par>
+                    <p:cTn id="3" fill="hold">
+                      <p:stCondLst>
+                        <p:cond delay="indefinite"/>
+                      </p:stCondLst>
+                      <p:childTnLst>
+                        <p:par>
+                          <p:cTn id="4" fill="hold">
+                            <p:stCondLst>
+                              <p:cond delay="0"/>
+                            </p:stCondLst>
+                            <p:childTnLst>
+                              <p:par>
+                                <p:cTn id="5" presetID="1" presetClass="entr" presetSubtype="0" fill="hold" grpId="0" nodeType="clickEffect">
+                                  <p:stCondLst>
+                                    <p:cond delay="0"/>
+                                  </p:stCondLst>
+                                  <p:childTnLst>
+                                    <p:set>
+                                      <p:cBhvr>
+                                        <p:cTn id="6" dur="1" fill="hold">
+                                          <p:stCondLst>
+                                            <p:cond delay="0"/>
+                                          </p:stCondLst>
+                                        </p:cTn>
+                                        <p:tgtEl>
+                                          <p:spTgt spid="11">
+                                            <p:txEl>
+                                              <p:pRg st="0" end="0"/>
+                                            </p:txEl>
+                                          </p:spTgt>
+                                        </p:tgtEl>
+                                        <p:attrNameLst>
+                                          <p:attrName>style.visibility</p:attrName>
+                                        </p:attrNameLst>
+                                      </p:cBhvr>
+                                      <p:to>
+                                        <p:strVal val="visible"/>
+                                      </p:to>
+                                    </p:set>
+                                  </p:childTnLst>
+                                </p:cTn>
+                              </p:par>
+                            </p:childTnLst>
+                          </p:cTn>
+                        </p:par>
+                      </p:childTnLst>
+                    </p:cTn>
+                  </p:par>
+                  <p:par>
+                    <p:cTn id="7" fill="hold">
+                      <p:stCondLst>
+                        <p:cond delay="indefinite"/>
+                      </p:stCondLst>
+                      <p:childTnLst>
+                        <p:par>
+                          <p:cTn id="8" fill="hold">
+                            <p:stCondLst>
+                              <p:cond delay="0"/>
+                            </p:stCondLst>
+                            <p:childTnLst>
+                              <p:par>
+                                <p:cTn id="9" presetID="1" presetClass="entr" presetSubtype="0" fill="hold" grpId="0" nodeType="clickEffect">
+                                  <p:stCondLst>
+                                    <p:cond delay="0"/>
+                                  </p:stCondLst>
+                                  <p:childTnLst>
+                                    <p:set>
+                                      <p:cBhvr>
+                                        <p:cTn id="10" dur="1" fill="hold">
+                                          <p:stCondLst>
+                                            <p:cond delay="0"/>
+                                          </p:stCondLst>
+                                        </p:cTn>
+                                        <p:tgtEl>
+                                          <p:spTgt spid="11">
+                                            <p:txEl>
+                                              <p:pRg st="1" end="1"/>
+                                            </p:txEl>
+                                          </p:spTgt>
+                                        </p:tgtEl>
+                                        <p:attrNameLst>
+                                          <p:attrName>style.visibility</p:attrName>
+                                        </p:attrNameLst>
+                                      </p:cBhvr>
+                                      <p:to>
+                                        <p:strVal val="visible"/>
+                                      </p:to>
+                                    </p:set>
+                                  </p:childTnLst>
+                                </p:cTn>
+                              </p:par>
+                            </p:childTnLst>
+                          </p:cTn>
+                        </p:par>
+                      </p:childTnLst>
+                    </p:cTn>
+                  </p:par>
+                  <p:par>
+                    <p:cTn id="11" fill="hold">
+                      <p:stCondLst>
+                        <p:cond delay="indefinite"/>
+                      </p:stCondLst>
+                      <p:childTnLst>
+                        <p:par>
+                          <p:cTn id="12" fill="hold">
+                            <p:stCondLst>
+                              <p:cond delay="0"/>
+                            </p:stCondLst>
+                            <p:childTnLst>
+                              <p:par>
+                                <p:cTn id="13" presetID="1" presetClass="entr" presetSubtype="0" fill="hold" grpId="0" nodeType="clickEffect">
+                                  <p:stCondLst>
+                                    <p:cond delay="0"/>
+                                  </p:stCondLst>
+                                  <p:childTnLst>
+                                    <p:set>
+                                      <p:cBhvr>
+                                        <p:cTn id="14" dur="1" fill="hold">
+                                          <p:stCondLst>
+                                            <p:cond delay="0"/>
+                                          </p:stCondLst>
+                                        </p:cTn>
+                                        <p:tgtEl>
+                                          <p:spTgt spid="11">
+                                            <p:txEl>
+                                              <p:pRg st="2" end="2"/>
+                                            </p:txEl>
+                                          </p:spTgt>
+                                        </p:tgtEl>
+                                        <p:attrNameLst>
+                                          <p:attrName>style.visibility</p:attrName>
+                                        </p:attrNameLst>
+                                      </p:cBhvr>
+                                      <p:to>
+                                        <p:strVal val="visible"/>
+                                      </p:to>
+                                    </p:set>
+                                  </p:childTnLst>
+                                </p:cTn>
+                              </p:par>
+                            </p:childTnLst>
+                          </p:cTn>
+                        </p:par>
+                      </p:childTnLst>
+                    </p:cTn>
+                  </p:par>
+                </p:childTnLst>
+              </p:cTn>
+              <p:prevCondLst>
+                <p:cond evt="onPrev" delay="0">
+                  <p:tgtEl>
+                    <p:sldTgt/>
+                  </p:tgtEl>
+                </p:cond>
+              </p:prevCondLst>
+              <p:nextCondLst>
+                <p:cond evt="onNext" delay="0">
+                  <p:tgtEl>
+                    <p:sldTgt/>
+                  </p:tgtEl>
+                </p:cond>
+              </p:nextCondLst>
+            </p:seq>
+          </p:childTnLst>
+        </p:cTn>
+      </p:par>
+    </p:tnLst>
+    <p:bldLst>
+      <p:bldP spid="11" grpId="0" build="p"/>
+    </p:bldLst>
+  </p:timing>
+</p:sld>
+</file>
+
+<file path=ppt/slides/slide15.xml><?xml version="1.0" encoding="utf-8"?>
+<p:sld xmlns:a="http://schemas.openxmlformats.org/drawingml/2006/main" xmlns:r="http://schemas.openxmlformats.org/officeDocument/2006/relationships" xmlns:p="http://schemas.openxmlformats.org/presentationml/2006/main">
+  <p:cSld>
+    <p:spTree>
+      <p:nvGrpSpPr>
+        <p:cNvPr id="1" name=""/>
+        <p:cNvGrpSpPr/>
+        <p:nvPr/>
+      </p:nvGrpSpPr>
+      <p:grpSpPr>
+        <a:xfrm>
+          <a:off x="0" y="0"/>
+          <a:ext cx="0" cy="0"/>
+          <a:chOff x="0" y="0"/>
+          <a:chExt cx="0" cy="0"/>
+        </a:xfrm>
+      </p:grpSpPr>
+      <p:sp>
+        <p:nvSpPr>
+          <p:cNvPr id="2" name="TextBox 1"/>
+          <p:cNvSpPr txBox="1"/>
+          <p:nvPr/>
+        </p:nvSpPr>
+        <p:spPr>
+          <a:xfrm>
+            <a:off x="2627784" y="1700808"/>
+            <a:ext cx="3562770" cy="1200329"/>
+          </a:xfrm>
+          <a:prstGeom prst="rect">
+            <a:avLst/>
+          </a:prstGeom>
+          <a:noFill/>
+        </p:spPr>
+        <p:txBody>
+          <a:bodyPr wrap="none" rtlCol="0">
+            <a:spAutoFit/>
+          </a:bodyPr>
+          <a:lstStyle/>
+          <a:p>
+            <a:r>
+              <a:rPr lang="en-GB" sz="7200" dirty="0" smtClean="0">
+                <a:solidFill>
+                  <a:srgbClr val="0070C0"/>
+                </a:solidFill>
+              </a:rPr>
+              <a:t>Exercises</a:t>
+            </a:r>
+            <a:endParaRPr lang="en-GB" sz="7200" dirty="0">
+              <a:solidFill>
+                <a:srgbClr val="0070C0"/>
+              </a:solidFill>
+            </a:endParaRPr>
+          </a:p>
+        </p:txBody>
+      </p:sp>
+      <p:sp>
+        <p:nvSpPr>
+          <p:cNvPr id="3" name="TextBox 2"/>
+          <p:cNvSpPr txBox="1"/>
+          <p:nvPr/>
+        </p:nvSpPr>
+        <p:spPr>
+          <a:xfrm>
+            <a:off x="1619672" y="3573016"/>
+            <a:ext cx="5784532" cy="646331"/>
+          </a:xfrm>
+          <a:prstGeom prst="rect">
+            <a:avLst/>
+          </a:prstGeom>
+          <a:noFill/>
+        </p:spPr>
+        <p:txBody>
+          <a:bodyPr wrap="none" rtlCol="0">
+            <a:spAutoFit/>
+          </a:bodyPr>
+          <a:lstStyle/>
+          <a:p>
+            <a:r>
+              <a:rPr lang="en-GB" sz="3600" dirty="0" smtClean="0">
+                <a:hlinkClick r:id="rId3"/>
+              </a:rPr>
+              <a:t>http://dominicprior.github.io/</a:t>
+            </a:r>
+            <a:endParaRPr lang="en-GB" sz="3600" dirty="0"/>
+          </a:p>
+        </p:txBody>
+      </p:sp>
+    </p:spTree>
+    <p:extLst>
+      <p:ext uri="{BB962C8B-B14F-4D97-AF65-F5344CB8AC3E}">
+        <p14:creationId xmlns:p14="http://schemas.microsoft.com/office/powerpoint/2010/main" val="2370930051"/>
+      </p:ext>
+    </p:extLst>
+  </p:cSld>
+  <p:clrMapOvr>
+    <a:masterClrMapping/>
+  </p:clrMapOvr>
+  <p:timing>
+    <p:tnLst>
+      <p:par>
+        <p:cTn id="1" dur="indefinite" restart="never" nodeType="tmRoot"/>
+      </p:par>
+    </p:tnLst>
+  </p:timing>
+</p:sld>
+</file>
+
 <file path=ppt/slides/slide2.xml><?xml version="1.0" encoding="utf-8"?>
 <p:sld xmlns:a="http://schemas.openxmlformats.org/drawingml/2006/main" xmlns:r="http://schemas.openxmlformats.org/officeDocument/2006/relationships" xmlns:p="http://schemas.openxmlformats.org/presentationml/2006/main">
   <p:cSld>
@@ -4055,7 +6481,7 @@
         </p:nvSpPr>
         <p:spPr>
           <a:xfrm>
-            <a:off x="1155602" y="548680"/>
+            <a:off x="1155602" y="332656"/>
             <a:ext cx="5258171" cy="769441"/>
           </a:xfrm>
           <a:prstGeom prst="rect">
@@ -4074,7 +6500,7 @@
                 <a:latin typeface="Courier New" panose="02070309020205020404" pitchFamily="49" charset="0"/>
                 <a:cs typeface="Courier New" panose="02070309020205020404" pitchFamily="49" charset="0"/>
               </a:rPr>
-              <a:t>map (+2) [1..5]</a:t>
+              <a:t>map (*2) [1..5]</a:t>
             </a:r>
             <a:endParaRPr lang="en-GB" sz="4400" dirty="0">
               <a:latin typeface="Courier New" panose="02070309020205020404" pitchFamily="49" charset="0"/>
@@ -4290,8 +6716,8 @@
         </p:nvSpPr>
         <p:spPr>
           <a:xfrm>
-            <a:off x="3784687" y="1219399"/>
-            <a:ext cx="3905236" cy="769441"/>
+            <a:off x="3784687" y="1003375"/>
+            <a:ext cx="4243469" cy="769441"/>
           </a:xfrm>
           <a:prstGeom prst="rect">
             <a:avLst/>
@@ -4312,7 +6738,7 @@
                 <a:latin typeface="Courier New" panose="02070309020205020404" pitchFamily="49" charset="0"/>
                 <a:cs typeface="Courier New" panose="02070309020205020404" pitchFamily="49" charset="0"/>
               </a:rPr>
-              <a:t>[3,4,5,6,7]</a:t>
+              <a:t>[2,4,6,8,10]</a:t>
             </a:r>
             <a:endParaRPr lang="en-GB" sz="4400" dirty="0">
               <a:solidFill>
@@ -6263,6 +8689,188 @@
 </p:sld>
 </file>
 
+<file path=ppt/slides/slide8.xml><?xml version="1.0" encoding="utf-8"?>
+<p:sld xmlns:a="http://schemas.openxmlformats.org/drawingml/2006/main" xmlns:r="http://schemas.openxmlformats.org/officeDocument/2006/relationships" xmlns:p="http://schemas.openxmlformats.org/presentationml/2006/main">
+  <p:cSld>
+    <p:spTree>
+      <p:nvGrpSpPr>
+        <p:cNvPr id="1" name=""/>
+        <p:cNvGrpSpPr/>
+        <p:nvPr/>
+      </p:nvGrpSpPr>
+      <p:grpSpPr>
+        <a:xfrm>
+          <a:off x="0" y="0"/>
+          <a:ext cx="0" cy="0"/>
+          <a:chOff x="0" y="0"/>
+          <a:chExt cx="0" cy="0"/>
+        </a:xfrm>
+      </p:grpSpPr>
+      <p:sp>
+        <p:nvSpPr>
+          <p:cNvPr id="2" name="TextBox 1"/>
+          <p:cNvSpPr txBox="1"/>
+          <p:nvPr/>
+        </p:nvSpPr>
+        <p:spPr>
+          <a:xfrm>
+            <a:off x="2627784" y="1700808"/>
+            <a:ext cx="3562770" cy="1200329"/>
+          </a:xfrm>
+          <a:prstGeom prst="rect">
+            <a:avLst/>
+          </a:prstGeom>
+          <a:noFill/>
+        </p:spPr>
+        <p:txBody>
+          <a:bodyPr wrap="none" rtlCol="0">
+            <a:spAutoFit/>
+          </a:bodyPr>
+          <a:lstStyle/>
+          <a:p>
+            <a:r>
+              <a:rPr lang="en-GB" sz="7200" dirty="0" smtClean="0">
+                <a:solidFill>
+                  <a:srgbClr val="0070C0"/>
+                </a:solidFill>
+              </a:rPr>
+              <a:t>Exercises</a:t>
+            </a:r>
+            <a:endParaRPr lang="en-GB" sz="7200" dirty="0">
+              <a:solidFill>
+                <a:srgbClr val="0070C0"/>
+              </a:solidFill>
+            </a:endParaRPr>
+          </a:p>
+        </p:txBody>
+      </p:sp>
+      <p:sp>
+        <p:nvSpPr>
+          <p:cNvPr id="3" name="TextBox 2"/>
+          <p:cNvSpPr txBox="1"/>
+          <p:nvPr/>
+        </p:nvSpPr>
+        <p:spPr>
+          <a:xfrm>
+            <a:off x="1619672" y="3573016"/>
+            <a:ext cx="5784532" cy="646331"/>
+          </a:xfrm>
+          <a:prstGeom prst="rect">
+            <a:avLst/>
+          </a:prstGeom>
+          <a:noFill/>
+        </p:spPr>
+        <p:txBody>
+          <a:bodyPr wrap="none" rtlCol="0">
+            <a:spAutoFit/>
+          </a:bodyPr>
+          <a:lstStyle/>
+          <a:p>
+            <a:r>
+              <a:rPr lang="en-GB" sz="3600" dirty="0" smtClean="0">
+                <a:hlinkClick r:id="rId3"/>
+              </a:rPr>
+              <a:t>http://dominicprior.github.io/</a:t>
+            </a:r>
+            <a:endParaRPr lang="en-GB" sz="3600" dirty="0"/>
+          </a:p>
+        </p:txBody>
+      </p:sp>
+    </p:spTree>
+    <p:extLst>
+      <p:ext uri="{BB962C8B-B14F-4D97-AF65-F5344CB8AC3E}">
+        <p14:creationId xmlns:p14="http://schemas.microsoft.com/office/powerpoint/2010/main" val="126609115"/>
+      </p:ext>
+    </p:extLst>
+  </p:cSld>
+  <p:clrMapOvr>
+    <a:masterClrMapping/>
+  </p:clrMapOvr>
+  <p:timing>
+    <p:tnLst>
+      <p:par>
+        <p:cTn id="1" dur="indefinite" restart="never" nodeType="tmRoot"/>
+      </p:par>
+    </p:tnLst>
+  </p:timing>
+</p:sld>
+</file>
+
+<file path=ppt/slides/slide9.xml><?xml version="1.0" encoding="utf-8"?>
+<p:sld xmlns:a="http://schemas.openxmlformats.org/drawingml/2006/main" xmlns:r="http://schemas.openxmlformats.org/officeDocument/2006/relationships" xmlns:p="http://schemas.openxmlformats.org/presentationml/2006/main">
+  <p:cSld>
+    <p:spTree>
+      <p:nvGrpSpPr>
+        <p:cNvPr id="1" name=""/>
+        <p:cNvGrpSpPr/>
+        <p:nvPr/>
+      </p:nvGrpSpPr>
+      <p:grpSpPr>
+        <a:xfrm>
+          <a:off x="0" y="0"/>
+          <a:ext cx="0" cy="0"/>
+          <a:chOff x="0" y="0"/>
+          <a:chExt cx="0" cy="0"/>
+        </a:xfrm>
+      </p:grpSpPr>
+      <p:sp>
+        <p:nvSpPr>
+          <p:cNvPr id="2" name="TextBox 1"/>
+          <p:cNvSpPr txBox="1"/>
+          <p:nvPr/>
+        </p:nvSpPr>
+        <p:spPr>
+          <a:xfrm>
+            <a:off x="971600" y="2516703"/>
+            <a:ext cx="7165616" cy="1200329"/>
+          </a:xfrm>
+          <a:prstGeom prst="rect">
+            <a:avLst/>
+          </a:prstGeom>
+          <a:noFill/>
+        </p:spPr>
+        <p:txBody>
+          <a:bodyPr wrap="none" rtlCol="0">
+            <a:spAutoFit/>
+          </a:bodyPr>
+          <a:lstStyle/>
+          <a:p>
+            <a:r>
+              <a:rPr lang="en-GB" sz="7200" dirty="0" smtClean="0">
+                <a:solidFill>
+                  <a:srgbClr val="0070C0"/>
+                </a:solidFill>
+              </a:rPr>
+              <a:t>Defining Functions</a:t>
+            </a:r>
+            <a:endParaRPr lang="en-GB" sz="7200" dirty="0">
+              <a:solidFill>
+                <a:srgbClr val="0070C0"/>
+              </a:solidFill>
+            </a:endParaRPr>
+          </a:p>
+        </p:txBody>
+      </p:sp>
+    </p:spTree>
+    <p:extLst>
+      <p:ext uri="{BB962C8B-B14F-4D97-AF65-F5344CB8AC3E}">
+        <p14:creationId xmlns:p14="http://schemas.microsoft.com/office/powerpoint/2010/main" val="3832442951"/>
+      </p:ext>
+    </p:extLst>
+  </p:cSld>
+  <p:clrMapOvr>
+    <a:masterClrMapping/>
+  </p:clrMapOvr>
+  <p:timing>
+    <p:tnLst>
+      <p:par>
+        <p:cTn id="1" dur="indefinite" restart="never" nodeType="tmRoot"/>
+      </p:par>
+    </p:tnLst>
+  </p:timing>
+</p:sld>
+</file>
+
 <file path=ppt/theme/theme1.xml><?xml version="1.0" encoding="utf-8"?>
 <a:theme xmlns:a="http://schemas.openxmlformats.org/drawingml/2006/main" name="Office Theme">
   <a:themeElements>
@@ -6543,7 +9151,24 @@
       </a:bgFillStyleLst>
     </a:fmtScheme>
   </a:themeElements>
-  <a:objectDefaults/>
+  <a:objectDefaults>
+    <a:txDef>
+      <a:spPr>
+        <a:noFill/>
+      </a:spPr>
+      <a:bodyPr wrap="none" rtlCol="0">
+        <a:spAutoFit/>
+      </a:bodyPr>
+      <a:lstStyle>
+        <a:defPPr>
+          <a:defRPr sz="4400" dirty="0" smtClean="0">
+            <a:latin typeface="Courier New" panose="02070309020205020404" pitchFamily="49" charset="0"/>
+            <a:cs typeface="Courier New" panose="02070309020205020404" pitchFamily="49" charset="0"/>
+          </a:defRPr>
+        </a:defPPr>
+      </a:lstStyle>
+    </a:txDef>
+  </a:objectDefaults>
   <a:extraClrSchemeLst/>
 </a:theme>
 </file>

</xml_diff>

<commit_message>
Add section on types
</commit_message>
<xml_diff>
--- a/beginning-haskell.pptx
+++ b/beginning-haskell.pptx
@@ -5,7 +5,7 @@
     <p:sldMasterId id="2147483648" r:id="rId1"/>
   </p:sldMasterIdLst>
   <p:notesMasterIdLst>
-    <p:notesMasterId r:id="rId17"/>
+    <p:notesMasterId r:id="rId25"/>
   </p:notesMasterIdLst>
   <p:sldIdLst>
     <p:sldId id="263" r:id="rId2"/>
@@ -23,6 +23,14 @@
     <p:sldId id="274" r:id="rId14"/>
     <p:sldId id="269" r:id="rId15"/>
     <p:sldId id="275" r:id="rId16"/>
+    <p:sldId id="276" r:id="rId17"/>
+    <p:sldId id="277" r:id="rId18"/>
+    <p:sldId id="278" r:id="rId19"/>
+    <p:sldId id="279" r:id="rId20"/>
+    <p:sldId id="280" r:id="rId21"/>
+    <p:sldId id="281" r:id="rId22"/>
+    <p:sldId id="282" r:id="rId23"/>
+    <p:sldId id="283" r:id="rId24"/>
   </p:sldIdLst>
   <p:sldSz cx="9144000" cy="6858000" type="screen4x3"/>
   <p:notesSz cx="6858000" cy="9144000"/>
@@ -566,6 +574,98 @@
 </p:notes>
 </file>
 
+<file path=ppt/notesSlides/notesSlide10.xml><?xml version="1.0" encoding="utf-8"?>
+<p:notes xmlns:a="http://schemas.openxmlformats.org/drawingml/2006/main" xmlns:r="http://schemas.openxmlformats.org/officeDocument/2006/relationships" xmlns:p="http://schemas.openxmlformats.org/presentationml/2006/main">
+  <p:cSld>
+    <p:spTree>
+      <p:nvGrpSpPr>
+        <p:cNvPr id="1" name=""/>
+        <p:cNvGrpSpPr/>
+        <p:nvPr/>
+      </p:nvGrpSpPr>
+      <p:grpSpPr>
+        <a:xfrm>
+          <a:off x="0" y="0"/>
+          <a:ext cx="0" cy="0"/>
+          <a:chOff x="0" y="0"/>
+          <a:chExt cx="0" cy="0"/>
+        </a:xfrm>
+      </p:grpSpPr>
+      <p:sp>
+        <p:nvSpPr>
+          <p:cNvPr id="2" name="Slide Image Placeholder 1"/>
+          <p:cNvSpPr>
+            <a:spLocks noGrp="1" noRot="1" noChangeAspect="1"/>
+          </p:cNvSpPr>
+          <p:nvPr>
+            <p:ph type="sldImg"/>
+          </p:nvPr>
+        </p:nvSpPr>
+        <p:spPr/>
+      </p:sp>
+      <p:sp>
+        <p:nvSpPr>
+          <p:cNvPr id="3" name="Notes Placeholder 2"/>
+          <p:cNvSpPr>
+            <a:spLocks noGrp="1"/>
+          </p:cNvSpPr>
+          <p:nvPr>
+            <p:ph type="body" idx="1"/>
+          </p:nvPr>
+        </p:nvSpPr>
+        <p:spPr/>
+        <p:txBody>
+          <a:bodyPr/>
+          <a:lstStyle/>
+          <a:p>
+            <a:r>
+              <a:rPr lang="en-GB" dirty="0" smtClean="0"/>
+              <a:t>These slides accompany a two-hour “Beginning</a:t>
+            </a:r>
+            <a:r>
+              <a:rPr lang="en-GB" baseline="0" dirty="0" smtClean="0"/>
+              <a:t> Haskell” course.</a:t>
+            </a:r>
+            <a:endParaRPr lang="en-GB" dirty="0"/>
+          </a:p>
+        </p:txBody>
+      </p:sp>
+      <p:sp>
+        <p:nvSpPr>
+          <p:cNvPr id="4" name="Slide Number Placeholder 3"/>
+          <p:cNvSpPr>
+            <a:spLocks noGrp="1"/>
+          </p:cNvSpPr>
+          <p:nvPr>
+            <p:ph type="sldNum" sz="quarter" idx="10"/>
+          </p:nvPr>
+        </p:nvSpPr>
+        <p:spPr/>
+        <p:txBody>
+          <a:bodyPr/>
+          <a:lstStyle/>
+          <a:p>
+            <a:fld id="{999CC533-FB79-4577-A6D0-2326348CB1C0}" type="slidenum">
+              <a:rPr lang="en-GB" smtClean="0"/>
+              <a:t>23</a:t>
+            </a:fld>
+            <a:endParaRPr lang="en-GB" dirty="0"/>
+          </a:p>
+        </p:txBody>
+      </p:sp>
+    </p:spTree>
+    <p:extLst>
+      <p:ext uri="{BB962C8B-B14F-4D97-AF65-F5344CB8AC3E}">
+        <p14:creationId xmlns:p14="http://schemas.microsoft.com/office/powerpoint/2010/main" val="4125636590"/>
+      </p:ext>
+    </p:extLst>
+  </p:cSld>
+  <p:clrMapOvr>
+    <a:masterClrMapping/>
+  </p:clrMapOvr>
+</p:notes>
+</file>
+
 <file path=ppt/notesSlides/notesSlide2.xml><?xml version="1.0" encoding="utf-8"?>
 <p:notes xmlns:a="http://schemas.openxmlformats.org/drawingml/2006/main" xmlns:r="http://schemas.openxmlformats.org/officeDocument/2006/relationships" xmlns:p="http://schemas.openxmlformats.org/presentationml/2006/main">
   <p:cSld>
@@ -1008,6 +1108,282 @@
             <a:fld id="{999CC533-FB79-4577-A6D0-2326348CB1C0}" type="slidenum">
               <a:rPr lang="en-GB" smtClean="0"/>
               <a:t>15</a:t>
+            </a:fld>
+            <a:endParaRPr lang="en-GB" dirty="0"/>
+          </a:p>
+        </p:txBody>
+      </p:sp>
+    </p:spTree>
+    <p:extLst>
+      <p:ext uri="{BB962C8B-B14F-4D97-AF65-F5344CB8AC3E}">
+        <p14:creationId xmlns:p14="http://schemas.microsoft.com/office/powerpoint/2010/main" val="4125636590"/>
+      </p:ext>
+    </p:extLst>
+  </p:cSld>
+  <p:clrMapOvr>
+    <a:masterClrMapping/>
+  </p:clrMapOvr>
+</p:notes>
+</file>
+
+<file path=ppt/notesSlides/notesSlide7.xml><?xml version="1.0" encoding="utf-8"?>
+<p:notes xmlns:a="http://schemas.openxmlformats.org/drawingml/2006/main" xmlns:r="http://schemas.openxmlformats.org/officeDocument/2006/relationships" xmlns:p="http://schemas.openxmlformats.org/presentationml/2006/main">
+  <p:cSld>
+    <p:spTree>
+      <p:nvGrpSpPr>
+        <p:cNvPr id="1" name=""/>
+        <p:cNvGrpSpPr/>
+        <p:nvPr/>
+      </p:nvGrpSpPr>
+      <p:grpSpPr>
+        <a:xfrm>
+          <a:off x="0" y="0"/>
+          <a:ext cx="0" cy="0"/>
+          <a:chOff x="0" y="0"/>
+          <a:chExt cx="0" cy="0"/>
+        </a:xfrm>
+      </p:grpSpPr>
+      <p:sp>
+        <p:nvSpPr>
+          <p:cNvPr id="2" name="Slide Image Placeholder 1"/>
+          <p:cNvSpPr>
+            <a:spLocks noGrp="1" noRot="1" noChangeAspect="1"/>
+          </p:cNvSpPr>
+          <p:nvPr>
+            <p:ph type="sldImg"/>
+          </p:nvPr>
+        </p:nvSpPr>
+        <p:spPr/>
+      </p:sp>
+      <p:sp>
+        <p:nvSpPr>
+          <p:cNvPr id="3" name="Notes Placeholder 2"/>
+          <p:cNvSpPr>
+            <a:spLocks noGrp="1"/>
+          </p:cNvSpPr>
+          <p:nvPr>
+            <p:ph type="body" idx="1"/>
+          </p:nvPr>
+        </p:nvSpPr>
+        <p:spPr/>
+        <p:txBody>
+          <a:bodyPr/>
+          <a:lstStyle/>
+          <a:p>
+            <a:r>
+              <a:rPr lang="en-GB" dirty="0" smtClean="0"/>
+              <a:t>These slides accompany a two-hour “Beginning</a:t>
+            </a:r>
+            <a:r>
+              <a:rPr lang="en-GB" baseline="0" dirty="0" smtClean="0"/>
+              <a:t> Haskell” course.</a:t>
+            </a:r>
+            <a:endParaRPr lang="en-GB" dirty="0"/>
+          </a:p>
+        </p:txBody>
+      </p:sp>
+      <p:sp>
+        <p:nvSpPr>
+          <p:cNvPr id="4" name="Slide Number Placeholder 3"/>
+          <p:cNvSpPr>
+            <a:spLocks noGrp="1"/>
+          </p:cNvSpPr>
+          <p:nvPr>
+            <p:ph type="sldNum" sz="quarter" idx="10"/>
+          </p:nvPr>
+        </p:nvSpPr>
+        <p:spPr/>
+        <p:txBody>
+          <a:bodyPr/>
+          <a:lstStyle/>
+          <a:p>
+            <a:fld id="{999CC533-FB79-4577-A6D0-2326348CB1C0}" type="slidenum">
+              <a:rPr lang="en-GB" smtClean="0"/>
+              <a:t>16</a:t>
+            </a:fld>
+            <a:endParaRPr lang="en-GB" dirty="0"/>
+          </a:p>
+        </p:txBody>
+      </p:sp>
+    </p:spTree>
+    <p:extLst>
+      <p:ext uri="{BB962C8B-B14F-4D97-AF65-F5344CB8AC3E}">
+        <p14:creationId xmlns:p14="http://schemas.microsoft.com/office/powerpoint/2010/main" val="4125636590"/>
+      </p:ext>
+    </p:extLst>
+  </p:cSld>
+  <p:clrMapOvr>
+    <a:masterClrMapping/>
+  </p:clrMapOvr>
+</p:notes>
+</file>
+
+<file path=ppt/notesSlides/notesSlide8.xml><?xml version="1.0" encoding="utf-8"?>
+<p:notes xmlns:a="http://schemas.openxmlformats.org/drawingml/2006/main" xmlns:r="http://schemas.openxmlformats.org/officeDocument/2006/relationships" xmlns:p="http://schemas.openxmlformats.org/presentationml/2006/main">
+  <p:cSld>
+    <p:spTree>
+      <p:nvGrpSpPr>
+        <p:cNvPr id="1" name=""/>
+        <p:cNvGrpSpPr/>
+        <p:nvPr/>
+      </p:nvGrpSpPr>
+      <p:grpSpPr>
+        <a:xfrm>
+          <a:off x="0" y="0"/>
+          <a:ext cx="0" cy="0"/>
+          <a:chOff x="0" y="0"/>
+          <a:chExt cx="0" cy="0"/>
+        </a:xfrm>
+      </p:grpSpPr>
+      <p:sp>
+        <p:nvSpPr>
+          <p:cNvPr id="2" name="Slide Image Placeholder 1"/>
+          <p:cNvSpPr>
+            <a:spLocks noGrp="1" noRot="1" noChangeAspect="1"/>
+          </p:cNvSpPr>
+          <p:nvPr>
+            <p:ph type="sldImg"/>
+          </p:nvPr>
+        </p:nvSpPr>
+        <p:spPr/>
+      </p:sp>
+      <p:sp>
+        <p:nvSpPr>
+          <p:cNvPr id="3" name="Notes Placeholder 2"/>
+          <p:cNvSpPr>
+            <a:spLocks noGrp="1"/>
+          </p:cNvSpPr>
+          <p:nvPr>
+            <p:ph type="body" idx="1"/>
+          </p:nvPr>
+        </p:nvSpPr>
+        <p:spPr/>
+        <p:txBody>
+          <a:bodyPr/>
+          <a:lstStyle/>
+          <a:p>
+            <a:r>
+              <a:rPr lang="en-GB" dirty="0" smtClean="0"/>
+              <a:t>These slides accompany a two-hour “Beginning</a:t>
+            </a:r>
+            <a:r>
+              <a:rPr lang="en-GB" baseline="0" dirty="0" smtClean="0"/>
+              <a:t> Haskell” course.</a:t>
+            </a:r>
+            <a:endParaRPr lang="en-GB" dirty="0"/>
+          </a:p>
+        </p:txBody>
+      </p:sp>
+      <p:sp>
+        <p:nvSpPr>
+          <p:cNvPr id="4" name="Slide Number Placeholder 3"/>
+          <p:cNvSpPr>
+            <a:spLocks noGrp="1"/>
+          </p:cNvSpPr>
+          <p:nvPr>
+            <p:ph type="sldNum" sz="quarter" idx="10"/>
+          </p:nvPr>
+        </p:nvSpPr>
+        <p:spPr/>
+        <p:txBody>
+          <a:bodyPr/>
+          <a:lstStyle/>
+          <a:p>
+            <a:fld id="{999CC533-FB79-4577-A6D0-2326348CB1C0}" type="slidenum">
+              <a:rPr lang="en-GB" smtClean="0"/>
+              <a:t>17</a:t>
+            </a:fld>
+            <a:endParaRPr lang="en-GB" dirty="0"/>
+          </a:p>
+        </p:txBody>
+      </p:sp>
+    </p:spTree>
+    <p:extLst>
+      <p:ext uri="{BB962C8B-B14F-4D97-AF65-F5344CB8AC3E}">
+        <p14:creationId xmlns:p14="http://schemas.microsoft.com/office/powerpoint/2010/main" val="4125636590"/>
+      </p:ext>
+    </p:extLst>
+  </p:cSld>
+  <p:clrMapOvr>
+    <a:masterClrMapping/>
+  </p:clrMapOvr>
+</p:notes>
+</file>
+
+<file path=ppt/notesSlides/notesSlide9.xml><?xml version="1.0" encoding="utf-8"?>
+<p:notes xmlns:a="http://schemas.openxmlformats.org/drawingml/2006/main" xmlns:r="http://schemas.openxmlformats.org/officeDocument/2006/relationships" xmlns:p="http://schemas.openxmlformats.org/presentationml/2006/main">
+  <p:cSld>
+    <p:spTree>
+      <p:nvGrpSpPr>
+        <p:cNvPr id="1" name=""/>
+        <p:cNvGrpSpPr/>
+        <p:nvPr/>
+      </p:nvGrpSpPr>
+      <p:grpSpPr>
+        <a:xfrm>
+          <a:off x="0" y="0"/>
+          <a:ext cx="0" cy="0"/>
+          <a:chOff x="0" y="0"/>
+          <a:chExt cx="0" cy="0"/>
+        </a:xfrm>
+      </p:grpSpPr>
+      <p:sp>
+        <p:nvSpPr>
+          <p:cNvPr id="2" name="Slide Image Placeholder 1"/>
+          <p:cNvSpPr>
+            <a:spLocks noGrp="1" noRot="1" noChangeAspect="1"/>
+          </p:cNvSpPr>
+          <p:nvPr>
+            <p:ph type="sldImg"/>
+          </p:nvPr>
+        </p:nvSpPr>
+        <p:spPr/>
+      </p:sp>
+      <p:sp>
+        <p:nvSpPr>
+          <p:cNvPr id="3" name="Notes Placeholder 2"/>
+          <p:cNvSpPr>
+            <a:spLocks noGrp="1"/>
+          </p:cNvSpPr>
+          <p:nvPr>
+            <p:ph type="body" idx="1"/>
+          </p:nvPr>
+        </p:nvSpPr>
+        <p:spPr/>
+        <p:txBody>
+          <a:bodyPr/>
+          <a:lstStyle/>
+          <a:p>
+            <a:r>
+              <a:rPr lang="en-GB" dirty="0" smtClean="0"/>
+              <a:t>These slides accompany a two-hour “Beginning</a:t>
+            </a:r>
+            <a:r>
+              <a:rPr lang="en-GB" baseline="0" dirty="0" smtClean="0"/>
+              <a:t> Haskell” course.</a:t>
+            </a:r>
+            <a:endParaRPr lang="en-GB" dirty="0"/>
+          </a:p>
+        </p:txBody>
+      </p:sp>
+      <p:sp>
+        <p:nvSpPr>
+          <p:cNvPr id="4" name="Slide Number Placeholder 3"/>
+          <p:cNvSpPr>
+            <a:spLocks noGrp="1"/>
+          </p:cNvSpPr>
+          <p:nvPr>
+            <p:ph type="sldNum" sz="quarter" idx="10"/>
+          </p:nvPr>
+        </p:nvSpPr>
+        <p:spPr/>
+        <p:txBody>
+          <a:bodyPr/>
+          <a:lstStyle/>
+          <a:p>
+            <a:fld id="{999CC533-FB79-4577-A6D0-2326348CB1C0}" type="slidenum">
+              <a:rPr lang="en-GB" smtClean="0"/>
+              <a:t>18</a:t>
             </a:fld>
             <a:endParaRPr lang="en-GB" dirty="0"/>
           </a:p>
@@ -6034,6 +6410,1076 @@
 </p:sld>
 </file>
 
+<file path=ppt/slides/slide16.xml><?xml version="1.0" encoding="utf-8"?>
+<p:sld xmlns:a="http://schemas.openxmlformats.org/drawingml/2006/main" xmlns:r="http://schemas.openxmlformats.org/officeDocument/2006/relationships" xmlns:p="http://schemas.openxmlformats.org/presentationml/2006/main">
+  <p:cSld>
+    <p:spTree>
+      <p:nvGrpSpPr>
+        <p:cNvPr id="1" name=""/>
+        <p:cNvGrpSpPr/>
+        <p:nvPr/>
+      </p:nvGrpSpPr>
+      <p:grpSpPr>
+        <a:xfrm>
+          <a:off x="0" y="0"/>
+          <a:ext cx="0" cy="0"/>
+          <a:chOff x="0" y="0"/>
+          <a:chExt cx="0" cy="0"/>
+        </a:xfrm>
+      </p:grpSpPr>
+      <p:sp>
+        <p:nvSpPr>
+          <p:cNvPr id="2" name="TextBox 1"/>
+          <p:cNvSpPr txBox="1"/>
+          <p:nvPr/>
+        </p:nvSpPr>
+        <p:spPr>
+          <a:xfrm>
+            <a:off x="3347864" y="2516703"/>
+            <a:ext cx="2318007" cy="1200329"/>
+          </a:xfrm>
+          <a:prstGeom prst="rect">
+            <a:avLst/>
+          </a:prstGeom>
+          <a:noFill/>
+        </p:spPr>
+        <p:txBody>
+          <a:bodyPr wrap="none" rtlCol="0">
+            <a:spAutoFit/>
+          </a:bodyPr>
+          <a:lstStyle/>
+          <a:p>
+            <a:r>
+              <a:rPr lang="en-GB" sz="7200" dirty="0" smtClean="0">
+                <a:solidFill>
+                  <a:srgbClr val="0070C0"/>
+                </a:solidFill>
+              </a:rPr>
+              <a:t>Types</a:t>
+            </a:r>
+            <a:endParaRPr lang="en-GB" sz="7200" dirty="0">
+              <a:solidFill>
+                <a:srgbClr val="0070C0"/>
+              </a:solidFill>
+            </a:endParaRPr>
+          </a:p>
+        </p:txBody>
+      </p:sp>
+    </p:spTree>
+    <p:extLst>
+      <p:ext uri="{BB962C8B-B14F-4D97-AF65-F5344CB8AC3E}">
+        <p14:creationId xmlns:p14="http://schemas.microsoft.com/office/powerpoint/2010/main" val="1980119786"/>
+      </p:ext>
+    </p:extLst>
+  </p:cSld>
+  <p:clrMapOvr>
+    <a:masterClrMapping/>
+  </p:clrMapOvr>
+  <p:timing>
+    <p:tnLst>
+      <p:par>
+        <p:cTn id="1" dur="indefinite" restart="never" nodeType="tmRoot"/>
+      </p:par>
+    </p:tnLst>
+  </p:timing>
+</p:sld>
+</file>
+
+<file path=ppt/slides/slide17.xml><?xml version="1.0" encoding="utf-8"?>
+<p:sld xmlns:a="http://schemas.openxmlformats.org/drawingml/2006/main" xmlns:r="http://schemas.openxmlformats.org/officeDocument/2006/relationships" xmlns:p="http://schemas.openxmlformats.org/presentationml/2006/main">
+  <p:cSld>
+    <p:spTree>
+      <p:nvGrpSpPr>
+        <p:cNvPr id="1" name=""/>
+        <p:cNvGrpSpPr/>
+        <p:nvPr/>
+      </p:nvGrpSpPr>
+      <p:grpSpPr>
+        <a:xfrm>
+          <a:off x="0" y="0"/>
+          <a:ext cx="0" cy="0"/>
+          <a:chOff x="0" y="0"/>
+          <a:chExt cx="0" cy="0"/>
+        </a:xfrm>
+      </p:grpSpPr>
+      <p:sp>
+        <p:nvSpPr>
+          <p:cNvPr id="13" name="TextBox 12"/>
+          <p:cNvSpPr txBox="1"/>
+          <p:nvPr/>
+        </p:nvSpPr>
+        <p:spPr>
+          <a:xfrm>
+            <a:off x="467544" y="973172"/>
+            <a:ext cx="4243469" cy="5509200"/>
+          </a:xfrm>
+          <a:prstGeom prst="rect">
+            <a:avLst/>
+          </a:prstGeom>
+          <a:noFill/>
+        </p:spPr>
+        <p:txBody>
+          <a:bodyPr wrap="none" rtlCol="0">
+            <a:spAutoFit/>
+          </a:bodyPr>
+          <a:lstStyle/>
+          <a:p>
+            <a:r>
+              <a:rPr lang="en-GB" sz="4400" dirty="0" smtClean="0">
+                <a:latin typeface="Courier New" panose="02070309020205020404" pitchFamily="49" charset="0"/>
+                <a:cs typeface="Courier New" panose="02070309020205020404" pitchFamily="49" charset="0"/>
+              </a:rPr>
+              <a:t>Int</a:t>
+            </a:r>
+          </a:p>
+          <a:p>
+            <a:r>
+              <a:rPr lang="en-GB" sz="4400" dirty="0" smtClean="0">
+                <a:latin typeface="Courier New" panose="02070309020205020404" pitchFamily="49" charset="0"/>
+                <a:cs typeface="Courier New" panose="02070309020205020404" pitchFamily="49" charset="0"/>
+              </a:rPr>
+              <a:t>Integer</a:t>
+            </a:r>
+          </a:p>
+          <a:p>
+            <a:r>
+              <a:rPr lang="en-GB" sz="4400" dirty="0" smtClean="0">
+                <a:latin typeface="Courier New" panose="02070309020205020404" pitchFamily="49" charset="0"/>
+                <a:cs typeface="Courier New" panose="02070309020205020404" pitchFamily="49" charset="0"/>
+              </a:rPr>
+              <a:t>Float</a:t>
+            </a:r>
+          </a:p>
+          <a:p>
+            <a:r>
+              <a:rPr lang="en-GB" sz="4400" dirty="0" smtClean="0">
+                <a:latin typeface="Courier New" panose="02070309020205020404" pitchFamily="49" charset="0"/>
+                <a:cs typeface="Courier New" panose="02070309020205020404" pitchFamily="49" charset="0"/>
+              </a:rPr>
+              <a:t>Double</a:t>
+            </a:r>
+          </a:p>
+          <a:p>
+            <a:r>
+              <a:rPr lang="en-GB" sz="4400" dirty="0" smtClean="0">
+                <a:latin typeface="Courier New" panose="02070309020205020404" pitchFamily="49" charset="0"/>
+                <a:cs typeface="Courier New" panose="02070309020205020404" pitchFamily="49" charset="0"/>
+              </a:rPr>
+              <a:t>Char   </a:t>
+            </a:r>
+            <a:r>
+              <a:rPr lang="en-GB" sz="4400" i="1" dirty="0" smtClean="0">
+                <a:solidFill>
+                  <a:srgbClr val="0070C0"/>
+                </a:solidFill>
+                <a:latin typeface="Courier New" panose="02070309020205020404" pitchFamily="49" charset="0"/>
+                <a:cs typeface="Courier New" panose="02070309020205020404" pitchFamily="49" charset="0"/>
+              </a:rPr>
+              <a:t>'a'</a:t>
+            </a:r>
+          </a:p>
+          <a:p>
+            <a:r>
+              <a:rPr lang="en-GB" sz="4400" dirty="0" smtClean="0">
+                <a:latin typeface="Courier New" panose="02070309020205020404" pitchFamily="49" charset="0"/>
+                <a:cs typeface="Courier New" panose="02070309020205020404" pitchFamily="49" charset="0"/>
+              </a:rPr>
+              <a:t>String </a:t>
+            </a:r>
+            <a:r>
+              <a:rPr lang="en-GB" sz="4400" i="1" dirty="0" smtClean="0">
+                <a:solidFill>
+                  <a:srgbClr val="0070C0"/>
+                </a:solidFill>
+                <a:latin typeface="Courier New" panose="02070309020205020404" pitchFamily="49" charset="0"/>
+                <a:cs typeface="Courier New" panose="02070309020205020404" pitchFamily="49" charset="0"/>
+              </a:rPr>
+              <a:t>"hi"</a:t>
+            </a:r>
+          </a:p>
+          <a:p>
+            <a:r>
+              <a:rPr lang="en-GB" sz="4400" dirty="0" smtClean="0">
+                <a:latin typeface="Courier New" panose="02070309020205020404" pitchFamily="49" charset="0"/>
+                <a:cs typeface="Courier New" panose="02070309020205020404" pitchFamily="49" charset="0"/>
+              </a:rPr>
+              <a:t>Bool   </a:t>
+            </a:r>
+            <a:r>
+              <a:rPr lang="en-GB" sz="4400" i="1" dirty="0" smtClean="0">
+                <a:solidFill>
+                  <a:srgbClr val="0070C0"/>
+                </a:solidFill>
+                <a:latin typeface="Courier New" panose="02070309020205020404" pitchFamily="49" charset="0"/>
+                <a:cs typeface="Courier New" panose="02070309020205020404" pitchFamily="49" charset="0"/>
+              </a:rPr>
+              <a:t>True</a:t>
+            </a:r>
+          </a:p>
+          <a:p>
+            <a:r>
+              <a:rPr lang="en-GB" sz="4400" i="1" dirty="0">
+                <a:solidFill>
+                  <a:srgbClr val="C00000"/>
+                </a:solidFill>
+                <a:latin typeface="Courier New" panose="02070309020205020404" pitchFamily="49" charset="0"/>
+                <a:cs typeface="Courier New" panose="02070309020205020404" pitchFamily="49" charset="0"/>
+              </a:rPr>
+              <a:t> </a:t>
+            </a:r>
+            <a:r>
+              <a:rPr lang="en-GB" sz="4400" i="1" dirty="0" smtClean="0">
+                <a:solidFill>
+                  <a:srgbClr val="C00000"/>
+                </a:solidFill>
+                <a:latin typeface="Courier New" panose="02070309020205020404" pitchFamily="49" charset="0"/>
+                <a:cs typeface="Courier New" panose="02070309020205020404" pitchFamily="49" charset="0"/>
+              </a:rPr>
+              <a:t>      </a:t>
+            </a:r>
+            <a:r>
+              <a:rPr lang="en-GB" sz="4400" i="1" dirty="0" smtClean="0">
+                <a:solidFill>
+                  <a:srgbClr val="0070C0"/>
+                </a:solidFill>
+                <a:latin typeface="Courier New" panose="02070309020205020404" pitchFamily="49" charset="0"/>
+                <a:cs typeface="Courier New" panose="02070309020205020404" pitchFamily="49" charset="0"/>
+              </a:rPr>
+              <a:t>False</a:t>
+            </a:r>
+          </a:p>
+        </p:txBody>
+      </p:sp>
+      <p:sp>
+        <p:nvSpPr>
+          <p:cNvPr id="4" name="TextBox 3"/>
+          <p:cNvSpPr txBox="1"/>
+          <p:nvPr/>
+        </p:nvSpPr>
+        <p:spPr>
+          <a:xfrm>
+            <a:off x="5692106" y="973172"/>
+            <a:ext cx="3228769" cy="4832092"/>
+          </a:xfrm>
+          <a:prstGeom prst="rect">
+            <a:avLst/>
+          </a:prstGeom>
+          <a:noFill/>
+        </p:spPr>
+        <p:txBody>
+          <a:bodyPr wrap="none" rtlCol="0">
+            <a:spAutoFit/>
+          </a:bodyPr>
+          <a:lstStyle/>
+          <a:p>
+            <a:r>
+              <a:rPr lang="en-GB" sz="4400" dirty="0" smtClean="0">
+                <a:solidFill>
+                  <a:srgbClr val="FF0000"/>
+                </a:solidFill>
+                <a:latin typeface="Courier New" panose="02070309020205020404" pitchFamily="49" charset="0"/>
+                <a:cs typeface="Courier New" panose="02070309020205020404" pitchFamily="49" charset="0"/>
+              </a:rPr>
+              <a:t>[</a:t>
+            </a:r>
+            <a:r>
+              <a:rPr lang="en-GB" sz="4400" dirty="0" smtClean="0">
+                <a:latin typeface="Courier New" panose="02070309020205020404" pitchFamily="49" charset="0"/>
+                <a:cs typeface="Courier New" panose="02070309020205020404" pitchFamily="49" charset="0"/>
+              </a:rPr>
+              <a:t>Int</a:t>
+            </a:r>
+            <a:r>
+              <a:rPr lang="en-GB" sz="4400" dirty="0" smtClean="0">
+                <a:solidFill>
+                  <a:srgbClr val="FF0000"/>
+                </a:solidFill>
+                <a:latin typeface="Courier New" panose="02070309020205020404" pitchFamily="49" charset="0"/>
+                <a:cs typeface="Courier New" panose="02070309020205020404" pitchFamily="49" charset="0"/>
+              </a:rPr>
+              <a:t>]</a:t>
+            </a:r>
+          </a:p>
+          <a:p>
+            <a:r>
+              <a:rPr lang="en-GB" sz="4400" dirty="0" smtClean="0">
+                <a:solidFill>
+                  <a:srgbClr val="FF0000"/>
+                </a:solidFill>
+                <a:latin typeface="Courier New" panose="02070309020205020404" pitchFamily="49" charset="0"/>
+                <a:cs typeface="Courier New" panose="02070309020205020404" pitchFamily="49" charset="0"/>
+              </a:rPr>
+              <a:t>[</a:t>
+            </a:r>
+            <a:r>
+              <a:rPr lang="en-GB" sz="4400" dirty="0" smtClean="0">
+                <a:latin typeface="Courier New" panose="02070309020205020404" pitchFamily="49" charset="0"/>
+                <a:cs typeface="Courier New" panose="02070309020205020404" pitchFamily="49" charset="0"/>
+              </a:rPr>
+              <a:t>Integer</a:t>
+            </a:r>
+            <a:r>
+              <a:rPr lang="en-GB" sz="4400" dirty="0" smtClean="0">
+                <a:solidFill>
+                  <a:srgbClr val="FF0000"/>
+                </a:solidFill>
+                <a:latin typeface="Courier New" panose="02070309020205020404" pitchFamily="49" charset="0"/>
+                <a:cs typeface="Courier New" panose="02070309020205020404" pitchFamily="49" charset="0"/>
+              </a:rPr>
+              <a:t>]</a:t>
+            </a:r>
+            <a:endParaRPr lang="en-GB" sz="4400" dirty="0" smtClean="0">
+              <a:latin typeface="Courier New" panose="02070309020205020404" pitchFamily="49" charset="0"/>
+              <a:cs typeface="Courier New" panose="02070309020205020404" pitchFamily="49" charset="0"/>
+            </a:endParaRPr>
+          </a:p>
+          <a:p>
+            <a:r>
+              <a:rPr lang="en-GB" sz="4400" dirty="0" smtClean="0">
+                <a:solidFill>
+                  <a:srgbClr val="FF0000"/>
+                </a:solidFill>
+                <a:latin typeface="Courier New" panose="02070309020205020404" pitchFamily="49" charset="0"/>
+                <a:cs typeface="Courier New" panose="02070309020205020404" pitchFamily="49" charset="0"/>
+              </a:rPr>
+              <a:t>[</a:t>
+            </a:r>
+            <a:r>
+              <a:rPr lang="en-GB" sz="4400" dirty="0" smtClean="0">
+                <a:latin typeface="Courier New" panose="02070309020205020404" pitchFamily="49" charset="0"/>
+                <a:cs typeface="Courier New" panose="02070309020205020404" pitchFamily="49" charset="0"/>
+              </a:rPr>
+              <a:t>Float</a:t>
+            </a:r>
+            <a:r>
+              <a:rPr lang="en-GB" sz="4400" dirty="0" smtClean="0">
+                <a:solidFill>
+                  <a:srgbClr val="FF0000"/>
+                </a:solidFill>
+                <a:latin typeface="Courier New" panose="02070309020205020404" pitchFamily="49" charset="0"/>
+                <a:cs typeface="Courier New" panose="02070309020205020404" pitchFamily="49" charset="0"/>
+              </a:rPr>
+              <a:t>]</a:t>
+            </a:r>
+            <a:endParaRPr lang="en-GB" sz="4400" dirty="0" smtClean="0">
+              <a:latin typeface="Courier New" panose="02070309020205020404" pitchFamily="49" charset="0"/>
+              <a:cs typeface="Courier New" panose="02070309020205020404" pitchFamily="49" charset="0"/>
+            </a:endParaRPr>
+          </a:p>
+          <a:p>
+            <a:r>
+              <a:rPr lang="en-GB" sz="4400" dirty="0" smtClean="0">
+                <a:solidFill>
+                  <a:srgbClr val="FF0000"/>
+                </a:solidFill>
+                <a:latin typeface="Courier New" panose="02070309020205020404" pitchFamily="49" charset="0"/>
+                <a:cs typeface="Courier New" panose="02070309020205020404" pitchFamily="49" charset="0"/>
+              </a:rPr>
+              <a:t>[</a:t>
+            </a:r>
+            <a:r>
+              <a:rPr lang="en-GB" sz="4400" dirty="0" smtClean="0">
+                <a:latin typeface="Courier New" panose="02070309020205020404" pitchFamily="49" charset="0"/>
+                <a:cs typeface="Courier New" panose="02070309020205020404" pitchFamily="49" charset="0"/>
+              </a:rPr>
+              <a:t>Double</a:t>
+            </a:r>
+            <a:r>
+              <a:rPr lang="en-GB" sz="4400" dirty="0" smtClean="0">
+                <a:solidFill>
+                  <a:srgbClr val="FF0000"/>
+                </a:solidFill>
+                <a:latin typeface="Courier New" panose="02070309020205020404" pitchFamily="49" charset="0"/>
+                <a:cs typeface="Courier New" panose="02070309020205020404" pitchFamily="49" charset="0"/>
+              </a:rPr>
+              <a:t>]</a:t>
+            </a:r>
+            <a:endParaRPr lang="en-GB" sz="4400" dirty="0" smtClean="0">
+              <a:latin typeface="Courier New" panose="02070309020205020404" pitchFamily="49" charset="0"/>
+              <a:cs typeface="Courier New" panose="02070309020205020404" pitchFamily="49" charset="0"/>
+            </a:endParaRPr>
+          </a:p>
+          <a:p>
+            <a:r>
+              <a:rPr lang="en-GB" sz="4400" dirty="0" smtClean="0">
+                <a:solidFill>
+                  <a:srgbClr val="FF0000"/>
+                </a:solidFill>
+                <a:latin typeface="Courier New" panose="02070309020205020404" pitchFamily="49" charset="0"/>
+                <a:cs typeface="Courier New" panose="02070309020205020404" pitchFamily="49" charset="0"/>
+              </a:rPr>
+              <a:t>[</a:t>
+            </a:r>
+            <a:r>
+              <a:rPr lang="en-GB" sz="4400" dirty="0" smtClean="0">
+                <a:latin typeface="Courier New" panose="02070309020205020404" pitchFamily="49" charset="0"/>
+                <a:cs typeface="Courier New" panose="02070309020205020404" pitchFamily="49" charset="0"/>
+              </a:rPr>
+              <a:t>Char</a:t>
+            </a:r>
+            <a:r>
+              <a:rPr lang="en-GB" sz="4400" dirty="0" smtClean="0">
+                <a:solidFill>
+                  <a:srgbClr val="FF0000"/>
+                </a:solidFill>
+                <a:latin typeface="Courier New" panose="02070309020205020404" pitchFamily="49" charset="0"/>
+                <a:cs typeface="Courier New" panose="02070309020205020404" pitchFamily="49" charset="0"/>
+              </a:rPr>
+              <a:t>]</a:t>
+            </a:r>
+            <a:endParaRPr lang="en-GB" sz="4400" i="1" dirty="0" smtClean="0">
+              <a:solidFill>
+                <a:srgbClr val="C00000"/>
+              </a:solidFill>
+              <a:latin typeface="Courier New" panose="02070309020205020404" pitchFamily="49" charset="0"/>
+              <a:cs typeface="Courier New" panose="02070309020205020404" pitchFamily="49" charset="0"/>
+            </a:endParaRPr>
+          </a:p>
+          <a:p>
+            <a:r>
+              <a:rPr lang="en-GB" sz="4400" dirty="0" smtClean="0">
+                <a:solidFill>
+                  <a:srgbClr val="FF0000"/>
+                </a:solidFill>
+                <a:latin typeface="Courier New" panose="02070309020205020404" pitchFamily="49" charset="0"/>
+                <a:cs typeface="Courier New" panose="02070309020205020404" pitchFamily="49" charset="0"/>
+              </a:rPr>
+              <a:t>[</a:t>
+            </a:r>
+            <a:r>
+              <a:rPr lang="en-GB" sz="4400" dirty="0" smtClean="0">
+                <a:latin typeface="Courier New" panose="02070309020205020404" pitchFamily="49" charset="0"/>
+                <a:cs typeface="Courier New" panose="02070309020205020404" pitchFamily="49" charset="0"/>
+              </a:rPr>
+              <a:t>String</a:t>
+            </a:r>
+            <a:r>
+              <a:rPr lang="en-GB" sz="4400" dirty="0" smtClean="0">
+                <a:solidFill>
+                  <a:srgbClr val="FF0000"/>
+                </a:solidFill>
+                <a:latin typeface="Courier New" panose="02070309020205020404" pitchFamily="49" charset="0"/>
+                <a:cs typeface="Courier New" panose="02070309020205020404" pitchFamily="49" charset="0"/>
+              </a:rPr>
+              <a:t>]</a:t>
+            </a:r>
+            <a:endParaRPr lang="en-GB" sz="4400" i="1" dirty="0" smtClean="0">
+              <a:solidFill>
+                <a:srgbClr val="C00000"/>
+              </a:solidFill>
+              <a:latin typeface="Courier New" panose="02070309020205020404" pitchFamily="49" charset="0"/>
+              <a:cs typeface="Courier New" panose="02070309020205020404" pitchFamily="49" charset="0"/>
+            </a:endParaRPr>
+          </a:p>
+          <a:p>
+            <a:r>
+              <a:rPr lang="en-GB" sz="4400" dirty="0" smtClean="0">
+                <a:solidFill>
+                  <a:srgbClr val="FF0000"/>
+                </a:solidFill>
+                <a:latin typeface="Courier New" panose="02070309020205020404" pitchFamily="49" charset="0"/>
+                <a:cs typeface="Courier New" panose="02070309020205020404" pitchFamily="49" charset="0"/>
+              </a:rPr>
+              <a:t>[</a:t>
+            </a:r>
+            <a:r>
+              <a:rPr lang="en-GB" sz="4400" dirty="0" smtClean="0">
+                <a:latin typeface="Courier New" panose="02070309020205020404" pitchFamily="49" charset="0"/>
+                <a:cs typeface="Courier New" panose="02070309020205020404" pitchFamily="49" charset="0"/>
+              </a:rPr>
+              <a:t>Bool</a:t>
+            </a:r>
+            <a:r>
+              <a:rPr lang="en-GB" sz="4400" dirty="0" smtClean="0">
+                <a:solidFill>
+                  <a:srgbClr val="FF0000"/>
+                </a:solidFill>
+                <a:latin typeface="Courier New" panose="02070309020205020404" pitchFamily="49" charset="0"/>
+                <a:cs typeface="Courier New" panose="02070309020205020404" pitchFamily="49" charset="0"/>
+              </a:rPr>
+              <a:t>]</a:t>
+            </a:r>
+            <a:endParaRPr lang="en-GB" sz="4400" i="1" dirty="0" smtClean="0">
+              <a:solidFill>
+                <a:srgbClr val="C00000"/>
+              </a:solidFill>
+              <a:latin typeface="Courier New" panose="02070309020205020404" pitchFamily="49" charset="0"/>
+              <a:cs typeface="Courier New" panose="02070309020205020404" pitchFamily="49" charset="0"/>
+            </a:endParaRPr>
+          </a:p>
+        </p:txBody>
+      </p:sp>
+      <p:sp>
+        <p:nvSpPr>
+          <p:cNvPr id="2" name="TextBox 1"/>
+          <p:cNvSpPr txBox="1"/>
+          <p:nvPr/>
+        </p:nvSpPr>
+        <p:spPr>
+          <a:xfrm>
+            <a:off x="5692106" y="5899919"/>
+            <a:ext cx="2552302" cy="769441"/>
+          </a:xfrm>
+          <a:prstGeom prst="rect">
+            <a:avLst/>
+          </a:prstGeom>
+          <a:noFill/>
+        </p:spPr>
+        <p:txBody>
+          <a:bodyPr wrap="none" rtlCol="0">
+            <a:spAutoFit/>
+          </a:bodyPr>
+          <a:lstStyle/>
+          <a:p>
+            <a:r>
+              <a:rPr lang="en-GB" sz="4400" dirty="0" smtClean="0">
+                <a:solidFill>
+                  <a:srgbClr val="FF0000"/>
+                </a:solidFill>
+                <a:latin typeface="Courier New" panose="02070309020205020404" pitchFamily="49" charset="0"/>
+                <a:cs typeface="Courier New" panose="02070309020205020404" pitchFamily="49" charset="0"/>
+              </a:rPr>
+              <a:t>[[</a:t>
+            </a:r>
+            <a:r>
+              <a:rPr lang="en-GB" sz="4400" dirty="0" smtClean="0">
+                <a:latin typeface="Courier New" panose="02070309020205020404" pitchFamily="49" charset="0"/>
+                <a:cs typeface="Courier New" panose="02070309020205020404" pitchFamily="49" charset="0"/>
+              </a:rPr>
+              <a:t>Int</a:t>
+            </a:r>
+            <a:r>
+              <a:rPr lang="en-GB" sz="4400" dirty="0" smtClean="0">
+                <a:solidFill>
+                  <a:srgbClr val="FF0000"/>
+                </a:solidFill>
+                <a:latin typeface="Courier New" panose="02070309020205020404" pitchFamily="49" charset="0"/>
+                <a:cs typeface="Courier New" panose="02070309020205020404" pitchFamily="49" charset="0"/>
+              </a:rPr>
+              <a:t>]]</a:t>
+            </a:r>
+          </a:p>
+        </p:txBody>
+      </p:sp>
+    </p:spTree>
+    <p:extLst>
+      <p:ext uri="{BB962C8B-B14F-4D97-AF65-F5344CB8AC3E}">
+        <p14:creationId xmlns:p14="http://schemas.microsoft.com/office/powerpoint/2010/main" val="2901513206"/>
+      </p:ext>
+    </p:extLst>
+  </p:cSld>
+  <p:clrMapOvr>
+    <a:masterClrMapping/>
+  </p:clrMapOvr>
+  <p:timing>
+    <p:tnLst>
+      <p:par>
+        <p:cTn id="1" dur="indefinite" restart="never" nodeType="tmRoot">
+          <p:childTnLst>
+            <p:seq concurrent="1" nextAc="seek">
+              <p:cTn id="2" dur="indefinite" nodeType="mainSeq">
+                <p:childTnLst>
+                  <p:par>
+                    <p:cTn id="3" fill="hold">
+                      <p:stCondLst>
+                        <p:cond delay="indefinite"/>
+                      </p:stCondLst>
+                      <p:childTnLst>
+                        <p:par>
+                          <p:cTn id="4" fill="hold">
+                            <p:stCondLst>
+                              <p:cond delay="0"/>
+                            </p:stCondLst>
+                            <p:childTnLst>
+                              <p:par>
+                                <p:cTn id="5" presetID="1" presetClass="entr" presetSubtype="0" fill="hold" grpId="0" nodeType="clickEffect">
+                                  <p:stCondLst>
+                                    <p:cond delay="0"/>
+                                  </p:stCondLst>
+                                  <p:childTnLst>
+                                    <p:set>
+                                      <p:cBhvr>
+                                        <p:cTn id="6" dur="1" fill="hold">
+                                          <p:stCondLst>
+                                            <p:cond delay="0"/>
+                                          </p:stCondLst>
+                                        </p:cTn>
+                                        <p:tgtEl>
+                                          <p:spTgt spid="4"/>
+                                        </p:tgtEl>
+                                        <p:attrNameLst>
+                                          <p:attrName>style.visibility</p:attrName>
+                                        </p:attrNameLst>
+                                      </p:cBhvr>
+                                      <p:to>
+                                        <p:strVal val="visible"/>
+                                      </p:to>
+                                    </p:set>
+                                  </p:childTnLst>
+                                </p:cTn>
+                              </p:par>
+                            </p:childTnLst>
+                          </p:cTn>
+                        </p:par>
+                      </p:childTnLst>
+                    </p:cTn>
+                  </p:par>
+                  <p:par>
+                    <p:cTn id="7" fill="hold">
+                      <p:stCondLst>
+                        <p:cond delay="indefinite"/>
+                      </p:stCondLst>
+                      <p:childTnLst>
+                        <p:par>
+                          <p:cTn id="8" fill="hold">
+                            <p:stCondLst>
+                              <p:cond delay="0"/>
+                            </p:stCondLst>
+                            <p:childTnLst>
+                              <p:par>
+                                <p:cTn id="9" presetID="1" presetClass="entr" presetSubtype="0" fill="hold" grpId="0" nodeType="clickEffect">
+                                  <p:stCondLst>
+                                    <p:cond delay="0"/>
+                                  </p:stCondLst>
+                                  <p:childTnLst>
+                                    <p:set>
+                                      <p:cBhvr>
+                                        <p:cTn id="10" dur="1" fill="hold">
+                                          <p:stCondLst>
+                                            <p:cond delay="0"/>
+                                          </p:stCondLst>
+                                        </p:cTn>
+                                        <p:tgtEl>
+                                          <p:spTgt spid="2"/>
+                                        </p:tgtEl>
+                                        <p:attrNameLst>
+                                          <p:attrName>style.visibility</p:attrName>
+                                        </p:attrNameLst>
+                                      </p:cBhvr>
+                                      <p:to>
+                                        <p:strVal val="visible"/>
+                                      </p:to>
+                                    </p:set>
+                                  </p:childTnLst>
+                                </p:cTn>
+                              </p:par>
+                            </p:childTnLst>
+                          </p:cTn>
+                        </p:par>
+                      </p:childTnLst>
+                    </p:cTn>
+                  </p:par>
+                </p:childTnLst>
+              </p:cTn>
+              <p:prevCondLst>
+                <p:cond evt="onPrev" delay="0">
+                  <p:tgtEl>
+                    <p:sldTgt/>
+                  </p:tgtEl>
+                </p:cond>
+              </p:prevCondLst>
+              <p:nextCondLst>
+                <p:cond evt="onNext" delay="0">
+                  <p:tgtEl>
+                    <p:sldTgt/>
+                  </p:tgtEl>
+                </p:cond>
+              </p:nextCondLst>
+            </p:seq>
+          </p:childTnLst>
+        </p:cTn>
+      </p:par>
+    </p:tnLst>
+    <p:bldLst>
+      <p:bldP spid="4" grpId="0"/>
+      <p:bldP spid="2" grpId="0"/>
+    </p:bldLst>
+  </p:timing>
+</p:sld>
+</file>
+
+<file path=ppt/slides/slide18.xml><?xml version="1.0" encoding="utf-8"?>
+<p:sld xmlns:a="http://schemas.openxmlformats.org/drawingml/2006/main" xmlns:r="http://schemas.openxmlformats.org/officeDocument/2006/relationships" xmlns:p="http://schemas.openxmlformats.org/presentationml/2006/main">
+  <p:cSld>
+    <p:spTree>
+      <p:nvGrpSpPr>
+        <p:cNvPr id="1" name=""/>
+        <p:cNvGrpSpPr/>
+        <p:nvPr/>
+      </p:nvGrpSpPr>
+      <p:grpSpPr>
+        <a:xfrm>
+          <a:off x="0" y="0"/>
+          <a:ext cx="0" cy="0"/>
+          <a:chOff x="0" y="0"/>
+          <a:chExt cx="0" cy="0"/>
+        </a:xfrm>
+      </p:grpSpPr>
+      <p:sp>
+        <p:nvSpPr>
+          <p:cNvPr id="13" name="TextBox 12"/>
+          <p:cNvSpPr txBox="1"/>
+          <p:nvPr/>
+        </p:nvSpPr>
+        <p:spPr>
+          <a:xfrm>
+            <a:off x="467544" y="973172"/>
+            <a:ext cx="7287572" cy="2123658"/>
+          </a:xfrm>
+          <a:prstGeom prst="rect">
+            <a:avLst/>
+          </a:prstGeom>
+          <a:noFill/>
+        </p:spPr>
+        <p:txBody>
+          <a:bodyPr wrap="none" rtlCol="0">
+            <a:spAutoFit/>
+          </a:bodyPr>
+          <a:lstStyle/>
+          <a:p>
+            <a:r>
+              <a:rPr lang="en-GB" sz="4400" dirty="0" smtClean="0">
+                <a:latin typeface="Courier New" panose="02070309020205020404" pitchFamily="49" charset="0"/>
+                <a:cs typeface="Courier New" panose="02070309020205020404" pitchFamily="49" charset="0"/>
+              </a:rPr>
+              <a:t>Int </a:t>
+            </a:r>
+            <a:r>
+              <a:rPr lang="en-GB" sz="4400" dirty="0" smtClean="0">
+                <a:solidFill>
+                  <a:srgbClr val="FF0000"/>
+                </a:solidFill>
+                <a:latin typeface="Courier New" panose="02070309020205020404" pitchFamily="49" charset="0"/>
+                <a:cs typeface="Courier New" panose="02070309020205020404" pitchFamily="49" charset="0"/>
+              </a:rPr>
+              <a:t>-&gt;</a:t>
+            </a:r>
+            <a:r>
+              <a:rPr lang="en-GB" sz="4400" dirty="0" smtClean="0">
+                <a:latin typeface="Courier New" panose="02070309020205020404" pitchFamily="49" charset="0"/>
+                <a:cs typeface="Courier New" panose="02070309020205020404" pitchFamily="49" charset="0"/>
+              </a:rPr>
+              <a:t> Bool</a:t>
+            </a:r>
+          </a:p>
+          <a:p>
+            <a:r>
+              <a:rPr lang="en-GB" sz="4400" dirty="0" smtClean="0">
+                <a:latin typeface="Courier New" panose="02070309020205020404" pitchFamily="49" charset="0"/>
+                <a:cs typeface="Courier New" panose="02070309020205020404" pitchFamily="49" charset="0"/>
+              </a:rPr>
+              <a:t>Char </a:t>
+            </a:r>
+            <a:r>
+              <a:rPr lang="en-GB" sz="4400" dirty="0" smtClean="0">
+                <a:solidFill>
+                  <a:srgbClr val="FF0000"/>
+                </a:solidFill>
+                <a:latin typeface="Courier New" panose="02070309020205020404" pitchFamily="49" charset="0"/>
+                <a:cs typeface="Courier New" panose="02070309020205020404" pitchFamily="49" charset="0"/>
+              </a:rPr>
+              <a:t>-&gt;</a:t>
+            </a:r>
+            <a:r>
+              <a:rPr lang="en-GB" sz="4400" dirty="0" smtClean="0">
+                <a:latin typeface="Courier New" panose="02070309020205020404" pitchFamily="49" charset="0"/>
+                <a:cs typeface="Courier New" panose="02070309020205020404" pitchFamily="49" charset="0"/>
+              </a:rPr>
+              <a:t> Int</a:t>
+            </a:r>
+          </a:p>
+          <a:p>
+            <a:r>
+              <a:rPr lang="en-GB" sz="4400" dirty="0" smtClean="0">
+                <a:latin typeface="Courier New" panose="02070309020205020404" pitchFamily="49" charset="0"/>
+                <a:cs typeface="Courier New" panose="02070309020205020404" pitchFamily="49" charset="0"/>
+              </a:rPr>
+              <a:t>Int </a:t>
+            </a:r>
+            <a:r>
+              <a:rPr lang="en-GB" sz="4400" dirty="0" smtClean="0">
+                <a:solidFill>
+                  <a:srgbClr val="FF0000"/>
+                </a:solidFill>
+                <a:latin typeface="Courier New" panose="02070309020205020404" pitchFamily="49" charset="0"/>
+                <a:cs typeface="Courier New" panose="02070309020205020404" pitchFamily="49" charset="0"/>
+              </a:rPr>
+              <a:t>-&gt;</a:t>
+            </a:r>
+            <a:r>
+              <a:rPr lang="en-GB" sz="4400" dirty="0" smtClean="0">
+                <a:latin typeface="Courier New" panose="02070309020205020404" pitchFamily="49" charset="0"/>
+                <a:cs typeface="Courier New" panose="02070309020205020404" pitchFamily="49" charset="0"/>
+              </a:rPr>
+              <a:t> [Char] </a:t>
+            </a:r>
+            <a:r>
+              <a:rPr lang="en-GB" sz="4400" dirty="0" smtClean="0">
+                <a:solidFill>
+                  <a:srgbClr val="FF0000"/>
+                </a:solidFill>
+                <a:latin typeface="Courier New" panose="02070309020205020404" pitchFamily="49" charset="0"/>
+                <a:cs typeface="Courier New" panose="02070309020205020404" pitchFamily="49" charset="0"/>
+              </a:rPr>
+              <a:t>-&gt;</a:t>
+            </a:r>
+            <a:r>
+              <a:rPr lang="en-GB" sz="4400" dirty="0" smtClean="0">
+                <a:latin typeface="Courier New" panose="02070309020205020404" pitchFamily="49" charset="0"/>
+                <a:cs typeface="Courier New" panose="02070309020205020404" pitchFamily="49" charset="0"/>
+              </a:rPr>
+              <a:t> Char</a:t>
+            </a:r>
+            <a:endParaRPr lang="en-GB" sz="4400" dirty="0" smtClean="0">
+              <a:latin typeface="Courier New" panose="02070309020205020404" pitchFamily="49" charset="0"/>
+              <a:cs typeface="Courier New" panose="02070309020205020404" pitchFamily="49" charset="0"/>
+            </a:endParaRPr>
+          </a:p>
+        </p:txBody>
+      </p:sp>
+    </p:spTree>
+    <p:extLst>
+      <p:ext uri="{BB962C8B-B14F-4D97-AF65-F5344CB8AC3E}">
+        <p14:creationId xmlns:p14="http://schemas.microsoft.com/office/powerpoint/2010/main" val="1074749852"/>
+      </p:ext>
+    </p:extLst>
+  </p:cSld>
+  <p:clrMapOvr>
+    <a:masterClrMapping/>
+  </p:clrMapOvr>
+  <p:timing>
+    <p:tnLst>
+      <p:par>
+        <p:cTn id="1" dur="indefinite" restart="never" nodeType="tmRoot"/>
+      </p:par>
+    </p:tnLst>
+  </p:timing>
+</p:sld>
+</file>
+
+<file path=ppt/slides/slide19.xml><?xml version="1.0" encoding="utf-8"?>
+<p:sld xmlns:a="http://schemas.openxmlformats.org/drawingml/2006/main" xmlns:r="http://schemas.openxmlformats.org/officeDocument/2006/relationships" xmlns:p="http://schemas.openxmlformats.org/presentationml/2006/main">
+  <p:cSld>
+    <p:spTree>
+      <p:nvGrpSpPr>
+        <p:cNvPr id="1" name=""/>
+        <p:cNvGrpSpPr/>
+        <p:nvPr/>
+      </p:nvGrpSpPr>
+      <p:grpSpPr>
+        <a:xfrm>
+          <a:off x="0" y="0"/>
+          <a:ext cx="0" cy="0"/>
+          <a:chOff x="0" y="0"/>
+          <a:chExt cx="0" cy="0"/>
+        </a:xfrm>
+      </p:grpSpPr>
+      <p:sp>
+        <p:nvSpPr>
+          <p:cNvPr id="11" name="TextBox 10"/>
+          <p:cNvSpPr txBox="1"/>
+          <p:nvPr/>
+        </p:nvSpPr>
+        <p:spPr>
+          <a:xfrm>
+            <a:off x="496392" y="2132856"/>
+            <a:ext cx="7964040" cy="1446550"/>
+          </a:xfrm>
+          <a:prstGeom prst="rect">
+            <a:avLst/>
+          </a:prstGeom>
+          <a:noFill/>
+        </p:spPr>
+        <p:txBody>
+          <a:bodyPr wrap="none" rtlCol="0">
+            <a:spAutoFit/>
+          </a:bodyPr>
+          <a:lstStyle/>
+          <a:p>
+            <a:r>
+              <a:rPr lang="en-GB" sz="4400" dirty="0" smtClean="0">
+                <a:latin typeface="Courier New" panose="02070309020205020404" pitchFamily="49" charset="0"/>
+                <a:cs typeface="Courier New" panose="02070309020205020404" pitchFamily="49" charset="0"/>
+              </a:rPr>
+              <a:t>sum [] = 0</a:t>
+            </a:r>
+          </a:p>
+          <a:p>
+            <a:r>
+              <a:rPr lang="en-GB" sz="4400" dirty="0" smtClean="0">
+                <a:latin typeface="Courier New" panose="02070309020205020404" pitchFamily="49" charset="0"/>
+                <a:cs typeface="Courier New" panose="02070309020205020404" pitchFamily="49" charset="0"/>
+              </a:rPr>
+              <a:t>sum (x:xs) = x + sum xs</a:t>
+            </a:r>
+            <a:endParaRPr lang="en-GB" sz="4400" dirty="0">
+              <a:latin typeface="Courier New" panose="02070309020205020404" pitchFamily="49" charset="0"/>
+              <a:cs typeface="Courier New" panose="02070309020205020404" pitchFamily="49" charset="0"/>
+            </a:endParaRPr>
+          </a:p>
+        </p:txBody>
+      </p:sp>
+      <p:sp>
+        <p:nvSpPr>
+          <p:cNvPr id="5" name="TextBox 4"/>
+          <p:cNvSpPr txBox="1"/>
+          <p:nvPr/>
+        </p:nvSpPr>
+        <p:spPr>
+          <a:xfrm>
+            <a:off x="496392" y="1422089"/>
+            <a:ext cx="6611105" cy="769441"/>
+          </a:xfrm>
+          <a:prstGeom prst="rect">
+            <a:avLst/>
+          </a:prstGeom>
+          <a:noFill/>
+        </p:spPr>
+        <p:txBody>
+          <a:bodyPr wrap="none" rtlCol="0">
+            <a:spAutoFit/>
+          </a:bodyPr>
+          <a:lstStyle/>
+          <a:p>
+            <a:r>
+              <a:rPr lang="en-GB" sz="4400" dirty="0" smtClean="0">
+                <a:latin typeface="Courier New" panose="02070309020205020404" pitchFamily="49" charset="0"/>
+                <a:cs typeface="Courier New" panose="02070309020205020404" pitchFamily="49" charset="0"/>
+              </a:rPr>
+              <a:t>sum </a:t>
+            </a:r>
+            <a:r>
+              <a:rPr lang="en-GB" sz="4400" dirty="0" smtClean="0">
+                <a:solidFill>
+                  <a:srgbClr val="FF0000"/>
+                </a:solidFill>
+                <a:latin typeface="Courier New" panose="02070309020205020404" pitchFamily="49" charset="0"/>
+                <a:cs typeface="Courier New" panose="02070309020205020404" pitchFamily="49" charset="0"/>
+              </a:rPr>
+              <a:t>::</a:t>
+            </a:r>
+            <a:r>
+              <a:rPr lang="en-GB" sz="4400" dirty="0" smtClean="0">
+                <a:latin typeface="Courier New" panose="02070309020205020404" pitchFamily="49" charset="0"/>
+                <a:cs typeface="Courier New" panose="02070309020205020404" pitchFamily="49" charset="0"/>
+              </a:rPr>
+              <a:t> [Int] </a:t>
+            </a:r>
+            <a:r>
+              <a:rPr lang="en-GB" sz="4400" dirty="0" smtClean="0">
+                <a:solidFill>
+                  <a:srgbClr val="FF0000"/>
+                </a:solidFill>
+                <a:latin typeface="Courier New" panose="02070309020205020404" pitchFamily="49" charset="0"/>
+                <a:cs typeface="Courier New" panose="02070309020205020404" pitchFamily="49" charset="0"/>
+              </a:rPr>
+              <a:t>-&gt;</a:t>
+            </a:r>
+            <a:r>
+              <a:rPr lang="en-GB" sz="4400" dirty="0" smtClean="0">
+                <a:latin typeface="Courier New" panose="02070309020205020404" pitchFamily="49" charset="0"/>
+                <a:cs typeface="Courier New" panose="02070309020205020404" pitchFamily="49" charset="0"/>
+              </a:rPr>
+              <a:t> Int</a:t>
+            </a:r>
+            <a:endParaRPr lang="en-GB" sz="4400" dirty="0">
+              <a:latin typeface="Courier New" panose="02070309020205020404" pitchFamily="49" charset="0"/>
+              <a:cs typeface="Courier New" panose="02070309020205020404" pitchFamily="49" charset="0"/>
+            </a:endParaRPr>
+          </a:p>
+        </p:txBody>
+      </p:sp>
+    </p:spTree>
+    <p:extLst>
+      <p:ext uri="{BB962C8B-B14F-4D97-AF65-F5344CB8AC3E}">
+        <p14:creationId xmlns:p14="http://schemas.microsoft.com/office/powerpoint/2010/main" val="1976949730"/>
+      </p:ext>
+    </p:extLst>
+  </p:cSld>
+  <p:clrMapOvr>
+    <a:masterClrMapping/>
+  </p:clrMapOvr>
+  <p:timing>
+    <p:tnLst>
+      <p:par>
+        <p:cTn id="1" dur="indefinite" restart="never" nodeType="tmRoot">
+          <p:childTnLst>
+            <p:seq concurrent="1" nextAc="seek">
+              <p:cTn id="2" dur="indefinite" nodeType="mainSeq">
+                <p:childTnLst>
+                  <p:par>
+                    <p:cTn id="3" fill="hold">
+                      <p:stCondLst>
+                        <p:cond delay="indefinite"/>
+                      </p:stCondLst>
+                      <p:childTnLst>
+                        <p:par>
+                          <p:cTn id="4" fill="hold">
+                            <p:stCondLst>
+                              <p:cond delay="0"/>
+                            </p:stCondLst>
+                            <p:childTnLst>
+                              <p:par>
+                                <p:cTn id="5" presetID="1" presetClass="entr" presetSubtype="0" fill="hold" grpId="0" nodeType="clickEffect">
+                                  <p:stCondLst>
+                                    <p:cond delay="0"/>
+                                  </p:stCondLst>
+                                  <p:childTnLst>
+                                    <p:set>
+                                      <p:cBhvr>
+                                        <p:cTn id="6" dur="1" fill="hold">
+                                          <p:stCondLst>
+                                            <p:cond delay="0"/>
+                                          </p:stCondLst>
+                                        </p:cTn>
+                                        <p:tgtEl>
+                                          <p:spTgt spid="5"/>
+                                        </p:tgtEl>
+                                        <p:attrNameLst>
+                                          <p:attrName>style.visibility</p:attrName>
+                                        </p:attrNameLst>
+                                      </p:cBhvr>
+                                      <p:to>
+                                        <p:strVal val="visible"/>
+                                      </p:to>
+                                    </p:set>
+                                  </p:childTnLst>
+                                </p:cTn>
+                              </p:par>
+                            </p:childTnLst>
+                          </p:cTn>
+                        </p:par>
+                      </p:childTnLst>
+                    </p:cTn>
+                  </p:par>
+                </p:childTnLst>
+              </p:cTn>
+              <p:prevCondLst>
+                <p:cond evt="onPrev" delay="0">
+                  <p:tgtEl>
+                    <p:sldTgt/>
+                  </p:tgtEl>
+                </p:cond>
+              </p:prevCondLst>
+              <p:nextCondLst>
+                <p:cond evt="onNext" delay="0">
+                  <p:tgtEl>
+                    <p:sldTgt/>
+                  </p:tgtEl>
+                </p:cond>
+              </p:nextCondLst>
+            </p:seq>
+          </p:childTnLst>
+        </p:cTn>
+      </p:par>
+    </p:tnLst>
+    <p:bldLst>
+      <p:bldP spid="5" grpId="0"/>
+    </p:bldLst>
+  </p:timing>
+</p:sld>
+</file>
+
 <file path=ppt/slides/slide2.xml><?xml version="1.0" encoding="utf-8"?>
 <p:sld xmlns:a="http://schemas.openxmlformats.org/drawingml/2006/main" xmlns:r="http://schemas.openxmlformats.org/officeDocument/2006/relationships" xmlns:p="http://schemas.openxmlformats.org/presentationml/2006/main">
   <p:cSld>
@@ -6452,6 +7898,1891 @@
       <p:bldP spid="7" grpId="0"/>
       <p:bldP spid="8" grpId="0"/>
     </p:bldLst>
+  </p:timing>
+</p:sld>
+</file>
+
+<file path=ppt/slides/slide20.xml><?xml version="1.0" encoding="utf-8"?>
+<p:sld xmlns:a="http://schemas.openxmlformats.org/drawingml/2006/main" xmlns:r="http://schemas.openxmlformats.org/officeDocument/2006/relationships" xmlns:p="http://schemas.openxmlformats.org/presentationml/2006/main">
+  <p:cSld>
+    <p:spTree>
+      <p:nvGrpSpPr>
+        <p:cNvPr id="1" name=""/>
+        <p:cNvGrpSpPr/>
+        <p:nvPr/>
+      </p:nvGrpSpPr>
+      <p:grpSpPr>
+        <a:xfrm>
+          <a:off x="0" y="0"/>
+          <a:ext cx="0" cy="0"/>
+          <a:chOff x="0" y="0"/>
+          <a:chExt cx="0" cy="0"/>
+        </a:xfrm>
+      </p:grpSpPr>
+      <p:sp>
+        <p:nvSpPr>
+          <p:cNvPr id="11" name="TextBox 10"/>
+          <p:cNvSpPr txBox="1"/>
+          <p:nvPr/>
+        </p:nvSpPr>
+        <p:spPr>
+          <a:xfrm>
+            <a:off x="273780" y="3566626"/>
+            <a:ext cx="8978740" cy="1446550"/>
+          </a:xfrm>
+          <a:prstGeom prst="rect">
+            <a:avLst/>
+          </a:prstGeom>
+          <a:noFill/>
+        </p:spPr>
+        <p:txBody>
+          <a:bodyPr wrap="none" rtlCol="0">
+            <a:spAutoFit/>
+          </a:bodyPr>
+          <a:lstStyle/>
+          <a:p>
+            <a:r>
+              <a:rPr lang="en-GB" sz="4400" dirty="0" smtClean="0">
+                <a:latin typeface="Courier New" panose="02070309020205020404" pitchFamily="49" charset="0"/>
+                <a:cs typeface="Courier New" panose="02070309020205020404" pitchFamily="49" charset="0"/>
+              </a:rPr>
+              <a:t>rev [] = []</a:t>
+            </a:r>
+          </a:p>
+          <a:p>
+            <a:r>
+              <a:rPr lang="en-GB" sz="4400" dirty="0" smtClean="0">
+                <a:latin typeface="Courier New" panose="02070309020205020404" pitchFamily="49" charset="0"/>
+                <a:cs typeface="Courier New" panose="02070309020205020404" pitchFamily="49" charset="0"/>
+              </a:rPr>
+              <a:t>rev (x:xs) = rev xs ++ [x]</a:t>
+            </a:r>
+            <a:endParaRPr lang="en-GB" sz="4400" dirty="0">
+              <a:latin typeface="Courier New" panose="02070309020205020404" pitchFamily="49" charset="0"/>
+              <a:cs typeface="Courier New" panose="02070309020205020404" pitchFamily="49" charset="0"/>
+            </a:endParaRPr>
+          </a:p>
+        </p:txBody>
+      </p:sp>
+      <p:sp>
+        <p:nvSpPr>
+          <p:cNvPr id="5" name="TextBox 4"/>
+          <p:cNvSpPr txBox="1"/>
+          <p:nvPr/>
+        </p:nvSpPr>
+        <p:spPr>
+          <a:xfrm>
+            <a:off x="273780" y="2855859"/>
+            <a:ext cx="7287572" cy="769441"/>
+          </a:xfrm>
+          <a:prstGeom prst="rect">
+            <a:avLst/>
+          </a:prstGeom>
+          <a:noFill/>
+        </p:spPr>
+        <p:txBody>
+          <a:bodyPr wrap="none" rtlCol="0">
+            <a:spAutoFit/>
+          </a:bodyPr>
+          <a:lstStyle/>
+          <a:p>
+            <a:r>
+              <a:rPr lang="en-GB" sz="4400" dirty="0" smtClean="0">
+                <a:latin typeface="Courier New" panose="02070309020205020404" pitchFamily="49" charset="0"/>
+                <a:cs typeface="Courier New" panose="02070309020205020404" pitchFamily="49" charset="0"/>
+              </a:rPr>
+              <a:t>rev </a:t>
+            </a:r>
+            <a:r>
+              <a:rPr lang="en-GB" sz="4400" dirty="0" smtClean="0">
+                <a:solidFill>
+                  <a:srgbClr val="FF0000"/>
+                </a:solidFill>
+                <a:latin typeface="Courier New" panose="02070309020205020404" pitchFamily="49" charset="0"/>
+                <a:cs typeface="Courier New" panose="02070309020205020404" pitchFamily="49" charset="0"/>
+              </a:rPr>
+              <a:t>::</a:t>
+            </a:r>
+            <a:r>
+              <a:rPr lang="en-GB" sz="4400" dirty="0" smtClean="0">
+                <a:latin typeface="Courier New" panose="02070309020205020404" pitchFamily="49" charset="0"/>
+                <a:cs typeface="Courier New" panose="02070309020205020404" pitchFamily="49" charset="0"/>
+              </a:rPr>
+              <a:t> [Int] </a:t>
+            </a:r>
+            <a:r>
+              <a:rPr lang="en-GB" sz="4400" dirty="0" smtClean="0">
+                <a:solidFill>
+                  <a:srgbClr val="FF0000"/>
+                </a:solidFill>
+                <a:latin typeface="Courier New" panose="02070309020205020404" pitchFamily="49" charset="0"/>
+                <a:cs typeface="Courier New" panose="02070309020205020404" pitchFamily="49" charset="0"/>
+              </a:rPr>
+              <a:t>-&gt;</a:t>
+            </a:r>
+            <a:r>
+              <a:rPr lang="en-GB" sz="4400" dirty="0" smtClean="0">
+                <a:latin typeface="Courier New" panose="02070309020205020404" pitchFamily="49" charset="0"/>
+                <a:cs typeface="Courier New" panose="02070309020205020404" pitchFamily="49" charset="0"/>
+              </a:rPr>
+              <a:t> [Int]</a:t>
+            </a:r>
+            <a:endParaRPr lang="en-GB" sz="4400" dirty="0">
+              <a:latin typeface="Courier New" panose="02070309020205020404" pitchFamily="49" charset="0"/>
+              <a:cs typeface="Courier New" panose="02070309020205020404" pitchFamily="49" charset="0"/>
+            </a:endParaRPr>
+          </a:p>
+        </p:txBody>
+      </p:sp>
+      <p:sp>
+        <p:nvSpPr>
+          <p:cNvPr id="4" name="TextBox 3"/>
+          <p:cNvSpPr txBox="1"/>
+          <p:nvPr/>
+        </p:nvSpPr>
+        <p:spPr>
+          <a:xfrm>
+            <a:off x="273780" y="2086418"/>
+            <a:ext cx="7964040" cy="769441"/>
+          </a:xfrm>
+          <a:prstGeom prst="rect">
+            <a:avLst/>
+          </a:prstGeom>
+          <a:noFill/>
+        </p:spPr>
+        <p:txBody>
+          <a:bodyPr wrap="none" rtlCol="0">
+            <a:spAutoFit/>
+          </a:bodyPr>
+          <a:lstStyle/>
+          <a:p>
+            <a:r>
+              <a:rPr lang="en-GB" sz="4400" dirty="0" smtClean="0">
+                <a:latin typeface="Courier New" panose="02070309020205020404" pitchFamily="49" charset="0"/>
+                <a:cs typeface="Courier New" panose="02070309020205020404" pitchFamily="49" charset="0"/>
+              </a:rPr>
+              <a:t>rev </a:t>
+            </a:r>
+            <a:r>
+              <a:rPr lang="en-GB" sz="4400" dirty="0" smtClean="0">
+                <a:solidFill>
+                  <a:srgbClr val="FF0000"/>
+                </a:solidFill>
+                <a:latin typeface="Courier New" panose="02070309020205020404" pitchFamily="49" charset="0"/>
+                <a:cs typeface="Courier New" panose="02070309020205020404" pitchFamily="49" charset="0"/>
+              </a:rPr>
+              <a:t>::</a:t>
+            </a:r>
+            <a:r>
+              <a:rPr lang="en-GB" sz="4400" dirty="0" smtClean="0">
+                <a:latin typeface="Courier New" panose="02070309020205020404" pitchFamily="49" charset="0"/>
+                <a:cs typeface="Courier New" panose="02070309020205020404" pitchFamily="49" charset="0"/>
+              </a:rPr>
+              <a:t> [Char] </a:t>
+            </a:r>
+            <a:r>
+              <a:rPr lang="en-GB" sz="4400" dirty="0" smtClean="0">
+                <a:solidFill>
+                  <a:srgbClr val="FF0000"/>
+                </a:solidFill>
+                <a:latin typeface="Courier New" panose="02070309020205020404" pitchFamily="49" charset="0"/>
+                <a:cs typeface="Courier New" panose="02070309020205020404" pitchFamily="49" charset="0"/>
+              </a:rPr>
+              <a:t>-&gt;</a:t>
+            </a:r>
+            <a:r>
+              <a:rPr lang="en-GB" sz="4400" dirty="0" smtClean="0">
+                <a:latin typeface="Courier New" panose="02070309020205020404" pitchFamily="49" charset="0"/>
+                <a:cs typeface="Courier New" panose="02070309020205020404" pitchFamily="49" charset="0"/>
+              </a:rPr>
+              <a:t> [Char]</a:t>
+            </a:r>
+            <a:endParaRPr lang="en-GB" sz="4400" dirty="0">
+              <a:latin typeface="Courier New" panose="02070309020205020404" pitchFamily="49" charset="0"/>
+              <a:cs typeface="Courier New" panose="02070309020205020404" pitchFamily="49" charset="0"/>
+            </a:endParaRPr>
+          </a:p>
+        </p:txBody>
+      </p:sp>
+      <p:sp>
+        <p:nvSpPr>
+          <p:cNvPr id="6" name="TextBox 5"/>
+          <p:cNvSpPr txBox="1"/>
+          <p:nvPr/>
+        </p:nvSpPr>
+        <p:spPr>
+          <a:xfrm>
+            <a:off x="273780" y="1316977"/>
+            <a:ext cx="5934638" cy="769441"/>
+          </a:xfrm>
+          <a:prstGeom prst="rect">
+            <a:avLst/>
+          </a:prstGeom>
+          <a:noFill/>
+        </p:spPr>
+        <p:txBody>
+          <a:bodyPr wrap="none" rtlCol="0">
+            <a:spAutoFit/>
+          </a:bodyPr>
+          <a:lstStyle/>
+          <a:p>
+            <a:r>
+              <a:rPr lang="en-GB" sz="4400" dirty="0" smtClean="0">
+                <a:latin typeface="Courier New" panose="02070309020205020404" pitchFamily="49" charset="0"/>
+                <a:cs typeface="Courier New" panose="02070309020205020404" pitchFamily="49" charset="0"/>
+              </a:rPr>
+              <a:t>rev </a:t>
+            </a:r>
+            <a:r>
+              <a:rPr lang="en-GB" sz="4400" dirty="0" smtClean="0">
+                <a:solidFill>
+                  <a:srgbClr val="FF0000"/>
+                </a:solidFill>
+                <a:latin typeface="Courier New" panose="02070309020205020404" pitchFamily="49" charset="0"/>
+                <a:cs typeface="Courier New" panose="02070309020205020404" pitchFamily="49" charset="0"/>
+              </a:rPr>
+              <a:t>::</a:t>
+            </a:r>
+            <a:r>
+              <a:rPr lang="en-GB" sz="4400" dirty="0" smtClean="0">
+                <a:latin typeface="Courier New" panose="02070309020205020404" pitchFamily="49" charset="0"/>
+                <a:cs typeface="Courier New" panose="02070309020205020404" pitchFamily="49" charset="0"/>
+              </a:rPr>
+              <a:t> [a] </a:t>
+            </a:r>
+            <a:r>
+              <a:rPr lang="en-GB" sz="4400" dirty="0" smtClean="0">
+                <a:solidFill>
+                  <a:srgbClr val="FF0000"/>
+                </a:solidFill>
+                <a:latin typeface="Courier New" panose="02070309020205020404" pitchFamily="49" charset="0"/>
+                <a:cs typeface="Courier New" panose="02070309020205020404" pitchFamily="49" charset="0"/>
+              </a:rPr>
+              <a:t>-&gt;</a:t>
+            </a:r>
+            <a:r>
+              <a:rPr lang="en-GB" sz="4400" dirty="0" smtClean="0">
+                <a:latin typeface="Courier New" panose="02070309020205020404" pitchFamily="49" charset="0"/>
+                <a:cs typeface="Courier New" panose="02070309020205020404" pitchFamily="49" charset="0"/>
+              </a:rPr>
+              <a:t> [a]</a:t>
+            </a:r>
+            <a:endParaRPr lang="en-GB" sz="4400" dirty="0">
+              <a:latin typeface="Courier New" panose="02070309020205020404" pitchFamily="49" charset="0"/>
+              <a:cs typeface="Courier New" panose="02070309020205020404" pitchFamily="49" charset="0"/>
+            </a:endParaRPr>
+          </a:p>
+        </p:txBody>
+      </p:sp>
+      <p:cxnSp>
+        <p:nvCxnSpPr>
+          <p:cNvPr id="7" name="Straight Connector 6"/>
+          <p:cNvCxnSpPr/>
+          <p:nvPr/>
+        </p:nvCxnSpPr>
+        <p:spPr>
+          <a:xfrm>
+            <a:off x="395536" y="2996952"/>
+            <a:ext cx="6840760" cy="569674"/>
+          </a:xfrm>
+          <a:prstGeom prst="line">
+            <a:avLst/>
+          </a:prstGeom>
+        </p:spPr>
+        <p:style>
+          <a:lnRef idx="1">
+            <a:schemeClr val="accent1"/>
+          </a:lnRef>
+          <a:fillRef idx="0">
+            <a:schemeClr val="accent1"/>
+          </a:fillRef>
+          <a:effectRef idx="0">
+            <a:schemeClr val="accent1"/>
+          </a:effectRef>
+          <a:fontRef idx="minor">
+            <a:schemeClr val="tx1"/>
+          </a:fontRef>
+        </p:style>
+      </p:cxnSp>
+      <p:cxnSp>
+        <p:nvCxnSpPr>
+          <p:cNvPr id="9" name="Straight Connector 8"/>
+          <p:cNvCxnSpPr/>
+          <p:nvPr/>
+        </p:nvCxnSpPr>
+        <p:spPr>
+          <a:xfrm>
+            <a:off x="395536" y="2204864"/>
+            <a:ext cx="7529264" cy="617849"/>
+          </a:xfrm>
+          <a:prstGeom prst="line">
+            <a:avLst/>
+          </a:prstGeom>
+        </p:spPr>
+        <p:style>
+          <a:lnRef idx="1">
+            <a:schemeClr val="accent1"/>
+          </a:lnRef>
+          <a:fillRef idx="0">
+            <a:schemeClr val="accent1"/>
+          </a:fillRef>
+          <a:effectRef idx="0">
+            <a:schemeClr val="accent1"/>
+          </a:effectRef>
+          <a:fontRef idx="minor">
+            <a:schemeClr val="tx1"/>
+          </a:fontRef>
+        </p:style>
+      </p:cxnSp>
+    </p:spTree>
+    <p:extLst>
+      <p:ext uri="{BB962C8B-B14F-4D97-AF65-F5344CB8AC3E}">
+        <p14:creationId xmlns:p14="http://schemas.microsoft.com/office/powerpoint/2010/main" val="2575027571"/>
+      </p:ext>
+    </p:extLst>
+  </p:cSld>
+  <p:clrMapOvr>
+    <a:masterClrMapping/>
+  </p:clrMapOvr>
+  <p:timing>
+    <p:tnLst>
+      <p:par>
+        <p:cTn id="1" dur="indefinite" restart="never" nodeType="tmRoot">
+          <p:childTnLst>
+            <p:seq concurrent="1" nextAc="seek">
+              <p:cTn id="2" dur="indefinite" nodeType="mainSeq">
+                <p:childTnLst>
+                  <p:par>
+                    <p:cTn id="3" fill="hold">
+                      <p:stCondLst>
+                        <p:cond delay="indefinite"/>
+                      </p:stCondLst>
+                      <p:childTnLst>
+                        <p:par>
+                          <p:cTn id="4" fill="hold">
+                            <p:stCondLst>
+                              <p:cond delay="0"/>
+                            </p:stCondLst>
+                            <p:childTnLst>
+                              <p:par>
+                                <p:cTn id="5" presetID="1" presetClass="entr" presetSubtype="0" fill="hold" grpId="0" nodeType="clickEffect">
+                                  <p:stCondLst>
+                                    <p:cond delay="0"/>
+                                  </p:stCondLst>
+                                  <p:childTnLst>
+                                    <p:set>
+                                      <p:cBhvr>
+                                        <p:cTn id="6" dur="1" fill="hold">
+                                          <p:stCondLst>
+                                            <p:cond delay="0"/>
+                                          </p:stCondLst>
+                                        </p:cTn>
+                                        <p:tgtEl>
+                                          <p:spTgt spid="5"/>
+                                        </p:tgtEl>
+                                        <p:attrNameLst>
+                                          <p:attrName>style.visibility</p:attrName>
+                                        </p:attrNameLst>
+                                      </p:cBhvr>
+                                      <p:to>
+                                        <p:strVal val="visible"/>
+                                      </p:to>
+                                    </p:set>
+                                  </p:childTnLst>
+                                </p:cTn>
+                              </p:par>
+                            </p:childTnLst>
+                          </p:cTn>
+                        </p:par>
+                      </p:childTnLst>
+                    </p:cTn>
+                  </p:par>
+                  <p:par>
+                    <p:cTn id="7" fill="hold">
+                      <p:stCondLst>
+                        <p:cond delay="indefinite"/>
+                      </p:stCondLst>
+                      <p:childTnLst>
+                        <p:par>
+                          <p:cTn id="8" fill="hold">
+                            <p:stCondLst>
+                              <p:cond delay="0"/>
+                            </p:stCondLst>
+                            <p:childTnLst>
+                              <p:par>
+                                <p:cTn id="9" presetID="1" presetClass="entr" presetSubtype="0" fill="hold" grpId="0" nodeType="clickEffect">
+                                  <p:stCondLst>
+                                    <p:cond delay="0"/>
+                                  </p:stCondLst>
+                                  <p:childTnLst>
+                                    <p:set>
+                                      <p:cBhvr>
+                                        <p:cTn id="10" dur="1" fill="hold">
+                                          <p:stCondLst>
+                                            <p:cond delay="0"/>
+                                          </p:stCondLst>
+                                        </p:cTn>
+                                        <p:tgtEl>
+                                          <p:spTgt spid="4"/>
+                                        </p:tgtEl>
+                                        <p:attrNameLst>
+                                          <p:attrName>style.visibility</p:attrName>
+                                        </p:attrNameLst>
+                                      </p:cBhvr>
+                                      <p:to>
+                                        <p:strVal val="visible"/>
+                                      </p:to>
+                                    </p:set>
+                                  </p:childTnLst>
+                                </p:cTn>
+                              </p:par>
+                              <p:par>
+                                <p:cTn id="11" presetID="1" presetClass="entr" presetSubtype="0" fill="hold" nodeType="withEffect">
+                                  <p:stCondLst>
+                                    <p:cond delay="0"/>
+                                  </p:stCondLst>
+                                  <p:childTnLst>
+                                    <p:set>
+                                      <p:cBhvr>
+                                        <p:cTn id="12" dur="1" fill="hold">
+                                          <p:stCondLst>
+                                            <p:cond delay="0"/>
+                                          </p:stCondLst>
+                                        </p:cTn>
+                                        <p:tgtEl>
+                                          <p:spTgt spid="7"/>
+                                        </p:tgtEl>
+                                        <p:attrNameLst>
+                                          <p:attrName>style.visibility</p:attrName>
+                                        </p:attrNameLst>
+                                      </p:cBhvr>
+                                      <p:to>
+                                        <p:strVal val="visible"/>
+                                      </p:to>
+                                    </p:set>
+                                  </p:childTnLst>
+                                </p:cTn>
+                              </p:par>
+                            </p:childTnLst>
+                          </p:cTn>
+                        </p:par>
+                      </p:childTnLst>
+                    </p:cTn>
+                  </p:par>
+                  <p:par>
+                    <p:cTn id="13" fill="hold">
+                      <p:stCondLst>
+                        <p:cond delay="indefinite"/>
+                      </p:stCondLst>
+                      <p:childTnLst>
+                        <p:par>
+                          <p:cTn id="14" fill="hold">
+                            <p:stCondLst>
+                              <p:cond delay="0"/>
+                            </p:stCondLst>
+                            <p:childTnLst>
+                              <p:par>
+                                <p:cTn id="15" presetID="1" presetClass="entr" presetSubtype="0" fill="hold" grpId="0" nodeType="clickEffect">
+                                  <p:stCondLst>
+                                    <p:cond delay="0"/>
+                                  </p:stCondLst>
+                                  <p:childTnLst>
+                                    <p:set>
+                                      <p:cBhvr>
+                                        <p:cTn id="16" dur="1" fill="hold">
+                                          <p:stCondLst>
+                                            <p:cond delay="0"/>
+                                          </p:stCondLst>
+                                        </p:cTn>
+                                        <p:tgtEl>
+                                          <p:spTgt spid="6"/>
+                                        </p:tgtEl>
+                                        <p:attrNameLst>
+                                          <p:attrName>style.visibility</p:attrName>
+                                        </p:attrNameLst>
+                                      </p:cBhvr>
+                                      <p:to>
+                                        <p:strVal val="visible"/>
+                                      </p:to>
+                                    </p:set>
+                                  </p:childTnLst>
+                                </p:cTn>
+                              </p:par>
+                              <p:par>
+                                <p:cTn id="17" presetID="1" presetClass="entr" presetSubtype="0" fill="hold" nodeType="withEffect">
+                                  <p:stCondLst>
+                                    <p:cond delay="0"/>
+                                  </p:stCondLst>
+                                  <p:childTnLst>
+                                    <p:set>
+                                      <p:cBhvr>
+                                        <p:cTn id="18" dur="1" fill="hold">
+                                          <p:stCondLst>
+                                            <p:cond delay="0"/>
+                                          </p:stCondLst>
+                                        </p:cTn>
+                                        <p:tgtEl>
+                                          <p:spTgt spid="9"/>
+                                        </p:tgtEl>
+                                        <p:attrNameLst>
+                                          <p:attrName>style.visibility</p:attrName>
+                                        </p:attrNameLst>
+                                      </p:cBhvr>
+                                      <p:to>
+                                        <p:strVal val="visible"/>
+                                      </p:to>
+                                    </p:set>
+                                  </p:childTnLst>
+                                </p:cTn>
+                              </p:par>
+                            </p:childTnLst>
+                          </p:cTn>
+                        </p:par>
+                      </p:childTnLst>
+                    </p:cTn>
+                  </p:par>
+                </p:childTnLst>
+              </p:cTn>
+              <p:prevCondLst>
+                <p:cond evt="onPrev" delay="0">
+                  <p:tgtEl>
+                    <p:sldTgt/>
+                  </p:tgtEl>
+                </p:cond>
+              </p:prevCondLst>
+              <p:nextCondLst>
+                <p:cond evt="onNext" delay="0">
+                  <p:tgtEl>
+                    <p:sldTgt/>
+                  </p:tgtEl>
+                </p:cond>
+              </p:nextCondLst>
+            </p:seq>
+          </p:childTnLst>
+        </p:cTn>
+      </p:par>
+    </p:tnLst>
+    <p:bldLst>
+      <p:bldP spid="5" grpId="0"/>
+      <p:bldP spid="4" grpId="0"/>
+      <p:bldP spid="6" grpId="0"/>
+    </p:bldLst>
+  </p:timing>
+</p:sld>
+</file>
+
+<file path=ppt/slides/slide21.xml><?xml version="1.0" encoding="utf-8"?>
+<p:sld xmlns:a="http://schemas.openxmlformats.org/drawingml/2006/main" xmlns:r="http://schemas.openxmlformats.org/officeDocument/2006/relationships" xmlns:p="http://schemas.openxmlformats.org/presentationml/2006/main">
+  <p:cSld>
+    <p:spTree>
+      <p:nvGrpSpPr>
+        <p:cNvPr id="1" name=""/>
+        <p:cNvGrpSpPr/>
+        <p:nvPr/>
+      </p:nvGrpSpPr>
+      <p:grpSpPr>
+        <a:xfrm>
+          <a:off x="0" y="0"/>
+          <a:ext cx="0" cy="0"/>
+          <a:chOff x="0" y="0"/>
+          <a:chExt cx="0" cy="0"/>
+        </a:xfrm>
+      </p:grpSpPr>
+      <p:sp>
+        <p:nvSpPr>
+          <p:cNvPr id="11" name="TextBox 10"/>
+          <p:cNvSpPr txBox="1"/>
+          <p:nvPr/>
+        </p:nvSpPr>
+        <p:spPr>
+          <a:xfrm>
+            <a:off x="496392" y="3422610"/>
+            <a:ext cx="7964040" cy="1446550"/>
+          </a:xfrm>
+          <a:prstGeom prst="rect">
+            <a:avLst/>
+          </a:prstGeom>
+          <a:noFill/>
+        </p:spPr>
+        <p:txBody>
+          <a:bodyPr wrap="none" rtlCol="0">
+            <a:spAutoFit/>
+          </a:bodyPr>
+          <a:lstStyle/>
+          <a:p>
+            <a:r>
+              <a:rPr lang="en-GB" sz="4400" dirty="0" smtClean="0">
+                <a:latin typeface="Courier New" panose="02070309020205020404" pitchFamily="49" charset="0"/>
+                <a:cs typeface="Courier New" panose="02070309020205020404" pitchFamily="49" charset="0"/>
+              </a:rPr>
+              <a:t>sum [] = 0</a:t>
+            </a:r>
+          </a:p>
+          <a:p>
+            <a:r>
+              <a:rPr lang="en-GB" sz="4400" dirty="0" smtClean="0">
+                <a:latin typeface="Courier New" panose="02070309020205020404" pitchFamily="49" charset="0"/>
+                <a:cs typeface="Courier New" panose="02070309020205020404" pitchFamily="49" charset="0"/>
+              </a:rPr>
+              <a:t>sum (x:xs) = x + sum xs</a:t>
+            </a:r>
+            <a:endParaRPr lang="en-GB" sz="4400" dirty="0">
+              <a:latin typeface="Courier New" panose="02070309020205020404" pitchFamily="49" charset="0"/>
+              <a:cs typeface="Courier New" panose="02070309020205020404" pitchFamily="49" charset="0"/>
+            </a:endParaRPr>
+          </a:p>
+        </p:txBody>
+      </p:sp>
+      <p:sp>
+        <p:nvSpPr>
+          <p:cNvPr id="5" name="TextBox 4"/>
+          <p:cNvSpPr txBox="1"/>
+          <p:nvPr/>
+        </p:nvSpPr>
+        <p:spPr>
+          <a:xfrm>
+            <a:off x="496392" y="2711843"/>
+            <a:ext cx="6611105" cy="769441"/>
+          </a:xfrm>
+          <a:prstGeom prst="rect">
+            <a:avLst/>
+          </a:prstGeom>
+          <a:noFill/>
+        </p:spPr>
+        <p:txBody>
+          <a:bodyPr wrap="none" rtlCol="0">
+            <a:spAutoFit/>
+          </a:bodyPr>
+          <a:lstStyle/>
+          <a:p>
+            <a:r>
+              <a:rPr lang="en-GB" sz="4400" dirty="0" smtClean="0">
+                <a:latin typeface="Courier New" panose="02070309020205020404" pitchFamily="49" charset="0"/>
+                <a:cs typeface="Courier New" panose="02070309020205020404" pitchFamily="49" charset="0"/>
+              </a:rPr>
+              <a:t>sum </a:t>
+            </a:r>
+            <a:r>
+              <a:rPr lang="en-GB" sz="4400" dirty="0" smtClean="0">
+                <a:solidFill>
+                  <a:srgbClr val="FF0000"/>
+                </a:solidFill>
+                <a:latin typeface="Courier New" panose="02070309020205020404" pitchFamily="49" charset="0"/>
+                <a:cs typeface="Courier New" panose="02070309020205020404" pitchFamily="49" charset="0"/>
+              </a:rPr>
+              <a:t>::</a:t>
+            </a:r>
+            <a:r>
+              <a:rPr lang="en-GB" sz="4400" dirty="0" smtClean="0">
+                <a:latin typeface="Courier New" panose="02070309020205020404" pitchFamily="49" charset="0"/>
+                <a:cs typeface="Courier New" panose="02070309020205020404" pitchFamily="49" charset="0"/>
+              </a:rPr>
+              <a:t> [Int] </a:t>
+            </a:r>
+            <a:r>
+              <a:rPr lang="en-GB" sz="4400" dirty="0" smtClean="0">
+                <a:solidFill>
+                  <a:srgbClr val="FF0000"/>
+                </a:solidFill>
+                <a:latin typeface="Courier New" panose="02070309020205020404" pitchFamily="49" charset="0"/>
+                <a:cs typeface="Courier New" panose="02070309020205020404" pitchFamily="49" charset="0"/>
+              </a:rPr>
+              <a:t>-&gt;</a:t>
+            </a:r>
+            <a:r>
+              <a:rPr lang="en-GB" sz="4400" dirty="0" smtClean="0">
+                <a:latin typeface="Courier New" panose="02070309020205020404" pitchFamily="49" charset="0"/>
+                <a:cs typeface="Courier New" panose="02070309020205020404" pitchFamily="49" charset="0"/>
+              </a:rPr>
+              <a:t> Int</a:t>
+            </a:r>
+            <a:endParaRPr lang="en-GB" sz="4400" dirty="0">
+              <a:latin typeface="Courier New" panose="02070309020205020404" pitchFamily="49" charset="0"/>
+              <a:cs typeface="Courier New" panose="02070309020205020404" pitchFamily="49" charset="0"/>
+            </a:endParaRPr>
+          </a:p>
+        </p:txBody>
+      </p:sp>
+      <p:sp>
+        <p:nvSpPr>
+          <p:cNvPr id="4" name="TextBox 3"/>
+          <p:cNvSpPr txBox="1"/>
+          <p:nvPr/>
+        </p:nvSpPr>
+        <p:spPr>
+          <a:xfrm>
+            <a:off x="496392" y="1950802"/>
+            <a:ext cx="5258171" cy="769441"/>
+          </a:xfrm>
+          <a:prstGeom prst="rect">
+            <a:avLst/>
+          </a:prstGeom>
+          <a:noFill/>
+        </p:spPr>
+        <p:txBody>
+          <a:bodyPr wrap="none" rtlCol="0">
+            <a:spAutoFit/>
+          </a:bodyPr>
+          <a:lstStyle/>
+          <a:p>
+            <a:r>
+              <a:rPr lang="en-GB" sz="4400" dirty="0" smtClean="0">
+                <a:latin typeface="Courier New" panose="02070309020205020404" pitchFamily="49" charset="0"/>
+                <a:cs typeface="Courier New" panose="02070309020205020404" pitchFamily="49" charset="0"/>
+              </a:rPr>
+              <a:t>sum </a:t>
+            </a:r>
+            <a:r>
+              <a:rPr lang="en-GB" sz="4400" dirty="0" smtClean="0">
+                <a:solidFill>
+                  <a:srgbClr val="FF0000"/>
+                </a:solidFill>
+                <a:latin typeface="Courier New" panose="02070309020205020404" pitchFamily="49" charset="0"/>
+                <a:cs typeface="Courier New" panose="02070309020205020404" pitchFamily="49" charset="0"/>
+              </a:rPr>
+              <a:t>::</a:t>
+            </a:r>
+            <a:r>
+              <a:rPr lang="en-GB" sz="4400" dirty="0" smtClean="0">
+                <a:latin typeface="Courier New" panose="02070309020205020404" pitchFamily="49" charset="0"/>
+                <a:cs typeface="Courier New" panose="02070309020205020404" pitchFamily="49" charset="0"/>
+              </a:rPr>
+              <a:t> [a] </a:t>
+            </a:r>
+            <a:r>
+              <a:rPr lang="en-GB" sz="4400" dirty="0" smtClean="0">
+                <a:solidFill>
+                  <a:srgbClr val="FF0000"/>
+                </a:solidFill>
+                <a:latin typeface="Courier New" panose="02070309020205020404" pitchFamily="49" charset="0"/>
+                <a:cs typeface="Courier New" panose="02070309020205020404" pitchFamily="49" charset="0"/>
+              </a:rPr>
+              <a:t>-&gt;</a:t>
+            </a:r>
+            <a:r>
+              <a:rPr lang="en-GB" sz="4400" dirty="0" smtClean="0">
+                <a:latin typeface="Courier New" panose="02070309020205020404" pitchFamily="49" charset="0"/>
+                <a:cs typeface="Courier New" panose="02070309020205020404" pitchFamily="49" charset="0"/>
+              </a:rPr>
+              <a:t> a</a:t>
+            </a:r>
+            <a:endParaRPr lang="en-GB" sz="4400" dirty="0">
+              <a:latin typeface="Courier New" panose="02070309020205020404" pitchFamily="49" charset="0"/>
+              <a:cs typeface="Courier New" panose="02070309020205020404" pitchFamily="49" charset="0"/>
+            </a:endParaRPr>
+          </a:p>
+        </p:txBody>
+      </p:sp>
+      <p:sp>
+        <p:nvSpPr>
+          <p:cNvPr id="6" name="TextBox 5"/>
+          <p:cNvSpPr txBox="1"/>
+          <p:nvPr/>
+        </p:nvSpPr>
+        <p:spPr>
+          <a:xfrm>
+            <a:off x="496392" y="1181361"/>
+            <a:ext cx="8302273" cy="769441"/>
+          </a:xfrm>
+          <a:prstGeom prst="rect">
+            <a:avLst/>
+          </a:prstGeom>
+          <a:noFill/>
+        </p:spPr>
+        <p:txBody>
+          <a:bodyPr wrap="none" rtlCol="0">
+            <a:spAutoFit/>
+          </a:bodyPr>
+          <a:lstStyle/>
+          <a:p>
+            <a:r>
+              <a:rPr lang="en-GB" sz="4400" dirty="0" smtClean="0">
+                <a:latin typeface="Courier New" panose="02070309020205020404" pitchFamily="49" charset="0"/>
+                <a:cs typeface="Courier New" panose="02070309020205020404" pitchFamily="49" charset="0"/>
+              </a:rPr>
+              <a:t>sum </a:t>
+            </a:r>
+            <a:r>
+              <a:rPr lang="en-GB" sz="4400" dirty="0" smtClean="0">
+                <a:solidFill>
+                  <a:srgbClr val="FF0000"/>
+                </a:solidFill>
+                <a:latin typeface="Courier New" panose="02070309020205020404" pitchFamily="49" charset="0"/>
+                <a:cs typeface="Courier New" panose="02070309020205020404" pitchFamily="49" charset="0"/>
+              </a:rPr>
+              <a:t>::</a:t>
+            </a:r>
+            <a:r>
+              <a:rPr lang="en-GB" sz="4400" dirty="0" smtClean="0">
+                <a:latin typeface="Courier New" panose="02070309020205020404" pitchFamily="49" charset="0"/>
+                <a:cs typeface="Courier New" panose="02070309020205020404" pitchFamily="49" charset="0"/>
+              </a:rPr>
+              <a:t> Num a </a:t>
+            </a:r>
+            <a:r>
+              <a:rPr lang="en-GB" sz="4400" dirty="0" smtClean="0">
+                <a:solidFill>
+                  <a:srgbClr val="FF0000"/>
+                </a:solidFill>
+                <a:latin typeface="Courier New" panose="02070309020205020404" pitchFamily="49" charset="0"/>
+                <a:cs typeface="Courier New" panose="02070309020205020404" pitchFamily="49" charset="0"/>
+              </a:rPr>
+              <a:t>=&gt;</a:t>
+            </a:r>
+            <a:r>
+              <a:rPr lang="en-GB" sz="4400" dirty="0" smtClean="0">
+                <a:latin typeface="Courier New" panose="02070309020205020404" pitchFamily="49" charset="0"/>
+                <a:cs typeface="Courier New" panose="02070309020205020404" pitchFamily="49" charset="0"/>
+              </a:rPr>
+              <a:t> [a] </a:t>
+            </a:r>
+            <a:r>
+              <a:rPr lang="en-GB" sz="4400" dirty="0" smtClean="0">
+                <a:solidFill>
+                  <a:srgbClr val="FF0000"/>
+                </a:solidFill>
+                <a:latin typeface="Courier New" panose="02070309020205020404" pitchFamily="49" charset="0"/>
+                <a:cs typeface="Courier New" panose="02070309020205020404" pitchFamily="49" charset="0"/>
+              </a:rPr>
+              <a:t>-&gt;</a:t>
+            </a:r>
+            <a:r>
+              <a:rPr lang="en-GB" sz="4400" dirty="0" smtClean="0">
+                <a:latin typeface="Courier New" panose="02070309020205020404" pitchFamily="49" charset="0"/>
+                <a:cs typeface="Courier New" panose="02070309020205020404" pitchFamily="49" charset="0"/>
+              </a:rPr>
+              <a:t> a</a:t>
+            </a:r>
+            <a:endParaRPr lang="en-GB" sz="4400" dirty="0">
+              <a:latin typeface="Courier New" panose="02070309020205020404" pitchFamily="49" charset="0"/>
+              <a:cs typeface="Courier New" panose="02070309020205020404" pitchFamily="49" charset="0"/>
+            </a:endParaRPr>
+          </a:p>
+        </p:txBody>
+      </p:sp>
+      <p:cxnSp>
+        <p:nvCxnSpPr>
+          <p:cNvPr id="3" name="Straight Connector 2"/>
+          <p:cNvCxnSpPr/>
+          <p:nvPr/>
+        </p:nvCxnSpPr>
+        <p:spPr>
+          <a:xfrm>
+            <a:off x="611560" y="2852936"/>
+            <a:ext cx="6264696" cy="504056"/>
+          </a:xfrm>
+          <a:prstGeom prst="line">
+            <a:avLst/>
+          </a:prstGeom>
+        </p:spPr>
+        <p:style>
+          <a:lnRef idx="1">
+            <a:schemeClr val="accent1"/>
+          </a:lnRef>
+          <a:fillRef idx="0">
+            <a:schemeClr val="accent1"/>
+          </a:fillRef>
+          <a:effectRef idx="0">
+            <a:schemeClr val="accent1"/>
+          </a:effectRef>
+          <a:fontRef idx="minor">
+            <a:schemeClr val="tx1"/>
+          </a:fontRef>
+        </p:style>
+      </p:cxnSp>
+      <p:cxnSp>
+        <p:nvCxnSpPr>
+          <p:cNvPr id="8" name="Straight Connector 7"/>
+          <p:cNvCxnSpPr/>
+          <p:nvPr/>
+        </p:nvCxnSpPr>
+        <p:spPr>
+          <a:xfrm>
+            <a:off x="611560" y="2060848"/>
+            <a:ext cx="4896544" cy="504056"/>
+          </a:xfrm>
+          <a:prstGeom prst="line">
+            <a:avLst/>
+          </a:prstGeom>
+        </p:spPr>
+        <p:style>
+          <a:lnRef idx="1">
+            <a:schemeClr val="accent1"/>
+          </a:lnRef>
+          <a:fillRef idx="0">
+            <a:schemeClr val="accent1"/>
+          </a:fillRef>
+          <a:effectRef idx="0">
+            <a:schemeClr val="accent1"/>
+          </a:effectRef>
+          <a:fontRef idx="minor">
+            <a:schemeClr val="tx1"/>
+          </a:fontRef>
+        </p:style>
+      </p:cxnSp>
+    </p:spTree>
+    <p:extLst>
+      <p:ext uri="{BB962C8B-B14F-4D97-AF65-F5344CB8AC3E}">
+        <p14:creationId xmlns:p14="http://schemas.microsoft.com/office/powerpoint/2010/main" val="2892785066"/>
+      </p:ext>
+    </p:extLst>
+  </p:cSld>
+  <p:clrMapOvr>
+    <a:masterClrMapping/>
+  </p:clrMapOvr>
+  <p:timing>
+    <p:tnLst>
+      <p:par>
+        <p:cTn id="1" dur="indefinite" restart="never" nodeType="tmRoot">
+          <p:childTnLst>
+            <p:seq concurrent="1" nextAc="seek">
+              <p:cTn id="2" dur="indefinite" nodeType="mainSeq">
+                <p:childTnLst>
+                  <p:par>
+                    <p:cTn id="3" fill="hold">
+                      <p:stCondLst>
+                        <p:cond delay="indefinite"/>
+                      </p:stCondLst>
+                      <p:childTnLst>
+                        <p:par>
+                          <p:cTn id="4" fill="hold">
+                            <p:stCondLst>
+                              <p:cond delay="0"/>
+                            </p:stCondLst>
+                            <p:childTnLst>
+                              <p:par>
+                                <p:cTn id="5" presetID="1" presetClass="entr" presetSubtype="0" fill="hold" grpId="0" nodeType="clickEffect">
+                                  <p:stCondLst>
+                                    <p:cond delay="0"/>
+                                  </p:stCondLst>
+                                  <p:childTnLst>
+                                    <p:set>
+                                      <p:cBhvr>
+                                        <p:cTn id="6" dur="1" fill="hold">
+                                          <p:stCondLst>
+                                            <p:cond delay="0"/>
+                                          </p:stCondLst>
+                                        </p:cTn>
+                                        <p:tgtEl>
+                                          <p:spTgt spid="5"/>
+                                        </p:tgtEl>
+                                        <p:attrNameLst>
+                                          <p:attrName>style.visibility</p:attrName>
+                                        </p:attrNameLst>
+                                      </p:cBhvr>
+                                      <p:to>
+                                        <p:strVal val="visible"/>
+                                      </p:to>
+                                    </p:set>
+                                  </p:childTnLst>
+                                </p:cTn>
+                              </p:par>
+                            </p:childTnLst>
+                          </p:cTn>
+                        </p:par>
+                      </p:childTnLst>
+                    </p:cTn>
+                  </p:par>
+                  <p:par>
+                    <p:cTn id="7" fill="hold">
+                      <p:stCondLst>
+                        <p:cond delay="indefinite"/>
+                      </p:stCondLst>
+                      <p:childTnLst>
+                        <p:par>
+                          <p:cTn id="8" fill="hold">
+                            <p:stCondLst>
+                              <p:cond delay="0"/>
+                            </p:stCondLst>
+                            <p:childTnLst>
+                              <p:par>
+                                <p:cTn id="9" presetID="1" presetClass="entr" presetSubtype="0" fill="hold" grpId="0" nodeType="clickEffect">
+                                  <p:stCondLst>
+                                    <p:cond delay="0"/>
+                                  </p:stCondLst>
+                                  <p:childTnLst>
+                                    <p:set>
+                                      <p:cBhvr>
+                                        <p:cTn id="10" dur="1" fill="hold">
+                                          <p:stCondLst>
+                                            <p:cond delay="0"/>
+                                          </p:stCondLst>
+                                        </p:cTn>
+                                        <p:tgtEl>
+                                          <p:spTgt spid="4"/>
+                                        </p:tgtEl>
+                                        <p:attrNameLst>
+                                          <p:attrName>style.visibility</p:attrName>
+                                        </p:attrNameLst>
+                                      </p:cBhvr>
+                                      <p:to>
+                                        <p:strVal val="visible"/>
+                                      </p:to>
+                                    </p:set>
+                                  </p:childTnLst>
+                                </p:cTn>
+                              </p:par>
+                              <p:par>
+                                <p:cTn id="11" presetID="1" presetClass="entr" presetSubtype="0" fill="hold" nodeType="withEffect">
+                                  <p:stCondLst>
+                                    <p:cond delay="0"/>
+                                  </p:stCondLst>
+                                  <p:childTnLst>
+                                    <p:set>
+                                      <p:cBhvr>
+                                        <p:cTn id="12" dur="1" fill="hold">
+                                          <p:stCondLst>
+                                            <p:cond delay="0"/>
+                                          </p:stCondLst>
+                                        </p:cTn>
+                                        <p:tgtEl>
+                                          <p:spTgt spid="3"/>
+                                        </p:tgtEl>
+                                        <p:attrNameLst>
+                                          <p:attrName>style.visibility</p:attrName>
+                                        </p:attrNameLst>
+                                      </p:cBhvr>
+                                      <p:to>
+                                        <p:strVal val="visible"/>
+                                      </p:to>
+                                    </p:set>
+                                  </p:childTnLst>
+                                </p:cTn>
+                              </p:par>
+                            </p:childTnLst>
+                          </p:cTn>
+                        </p:par>
+                      </p:childTnLst>
+                    </p:cTn>
+                  </p:par>
+                  <p:par>
+                    <p:cTn id="13" fill="hold">
+                      <p:stCondLst>
+                        <p:cond delay="indefinite"/>
+                      </p:stCondLst>
+                      <p:childTnLst>
+                        <p:par>
+                          <p:cTn id="14" fill="hold">
+                            <p:stCondLst>
+                              <p:cond delay="0"/>
+                            </p:stCondLst>
+                            <p:childTnLst>
+                              <p:par>
+                                <p:cTn id="15" presetID="1" presetClass="entr" presetSubtype="0" fill="hold" grpId="0" nodeType="clickEffect">
+                                  <p:stCondLst>
+                                    <p:cond delay="0"/>
+                                  </p:stCondLst>
+                                  <p:childTnLst>
+                                    <p:set>
+                                      <p:cBhvr>
+                                        <p:cTn id="16" dur="1" fill="hold">
+                                          <p:stCondLst>
+                                            <p:cond delay="0"/>
+                                          </p:stCondLst>
+                                        </p:cTn>
+                                        <p:tgtEl>
+                                          <p:spTgt spid="6"/>
+                                        </p:tgtEl>
+                                        <p:attrNameLst>
+                                          <p:attrName>style.visibility</p:attrName>
+                                        </p:attrNameLst>
+                                      </p:cBhvr>
+                                      <p:to>
+                                        <p:strVal val="visible"/>
+                                      </p:to>
+                                    </p:set>
+                                  </p:childTnLst>
+                                </p:cTn>
+                              </p:par>
+                              <p:par>
+                                <p:cTn id="17" presetID="1" presetClass="entr" presetSubtype="0" fill="hold" nodeType="withEffect">
+                                  <p:stCondLst>
+                                    <p:cond delay="0"/>
+                                  </p:stCondLst>
+                                  <p:childTnLst>
+                                    <p:set>
+                                      <p:cBhvr>
+                                        <p:cTn id="18" dur="1" fill="hold">
+                                          <p:stCondLst>
+                                            <p:cond delay="0"/>
+                                          </p:stCondLst>
+                                        </p:cTn>
+                                        <p:tgtEl>
+                                          <p:spTgt spid="8"/>
+                                        </p:tgtEl>
+                                        <p:attrNameLst>
+                                          <p:attrName>style.visibility</p:attrName>
+                                        </p:attrNameLst>
+                                      </p:cBhvr>
+                                      <p:to>
+                                        <p:strVal val="visible"/>
+                                      </p:to>
+                                    </p:set>
+                                  </p:childTnLst>
+                                </p:cTn>
+                              </p:par>
+                            </p:childTnLst>
+                          </p:cTn>
+                        </p:par>
+                      </p:childTnLst>
+                    </p:cTn>
+                  </p:par>
+                </p:childTnLst>
+              </p:cTn>
+              <p:prevCondLst>
+                <p:cond evt="onPrev" delay="0">
+                  <p:tgtEl>
+                    <p:sldTgt/>
+                  </p:tgtEl>
+                </p:cond>
+              </p:prevCondLst>
+              <p:nextCondLst>
+                <p:cond evt="onNext" delay="0">
+                  <p:tgtEl>
+                    <p:sldTgt/>
+                  </p:tgtEl>
+                </p:cond>
+              </p:nextCondLst>
+            </p:seq>
+          </p:childTnLst>
+        </p:cTn>
+      </p:par>
+    </p:tnLst>
+    <p:bldLst>
+      <p:bldP spid="5" grpId="0"/>
+      <p:bldP spid="4" grpId="0"/>
+      <p:bldP spid="6" grpId="0"/>
+    </p:bldLst>
+  </p:timing>
+</p:sld>
+</file>
+
+<file path=ppt/slides/slide22.xml><?xml version="1.0" encoding="utf-8"?>
+<p:sld xmlns:a="http://schemas.openxmlformats.org/drawingml/2006/main" xmlns:r="http://schemas.openxmlformats.org/officeDocument/2006/relationships" xmlns:p="http://schemas.openxmlformats.org/presentationml/2006/main">
+  <p:cSld>
+    <p:spTree>
+      <p:nvGrpSpPr>
+        <p:cNvPr id="1" name=""/>
+        <p:cNvGrpSpPr/>
+        <p:nvPr/>
+      </p:nvGrpSpPr>
+      <p:grpSpPr>
+        <a:xfrm>
+          <a:off x="0" y="0"/>
+          <a:ext cx="0" cy="0"/>
+          <a:chOff x="0" y="0"/>
+          <a:chExt cx="0" cy="0"/>
+        </a:xfrm>
+      </p:grpSpPr>
+      <p:sp>
+        <p:nvSpPr>
+          <p:cNvPr id="11" name="TextBox 10"/>
+          <p:cNvSpPr txBox="1"/>
+          <p:nvPr/>
+        </p:nvSpPr>
+        <p:spPr>
+          <a:xfrm>
+            <a:off x="496392" y="838453"/>
+            <a:ext cx="4344459" cy="646331"/>
+          </a:xfrm>
+          <a:prstGeom prst="rect">
+            <a:avLst/>
+          </a:prstGeom>
+          <a:noFill/>
+        </p:spPr>
+        <p:txBody>
+          <a:bodyPr wrap="none" rtlCol="0">
+            <a:spAutoFit/>
+          </a:bodyPr>
+          <a:lstStyle/>
+          <a:p>
+            <a:r>
+              <a:rPr lang="en-GB" sz="3600" i="1" dirty="0" smtClean="0">
+                <a:solidFill>
+                  <a:srgbClr val="0070C0"/>
+                </a:solidFill>
+                <a:latin typeface="Courier New" panose="02070309020205020404" pitchFamily="49" charset="0"/>
+                <a:cs typeface="Courier New" panose="02070309020205020404" pitchFamily="49" charset="0"/>
+              </a:rPr>
+              <a:t>map sqrt [1..5]</a:t>
+            </a:r>
+          </a:p>
+        </p:txBody>
+      </p:sp>
+      <p:sp>
+        <p:nvSpPr>
+          <p:cNvPr id="5" name="TextBox 4"/>
+          <p:cNvSpPr txBox="1"/>
+          <p:nvPr/>
+        </p:nvSpPr>
+        <p:spPr>
+          <a:xfrm>
+            <a:off x="496392" y="1783870"/>
+            <a:ext cx="1848583" cy="646331"/>
+          </a:xfrm>
+          <a:prstGeom prst="rect">
+            <a:avLst/>
+          </a:prstGeom>
+          <a:noFill/>
+        </p:spPr>
+        <p:txBody>
+          <a:bodyPr wrap="none" rtlCol="0">
+            <a:spAutoFit/>
+          </a:bodyPr>
+          <a:lstStyle/>
+          <a:p>
+            <a:r>
+              <a:rPr lang="en-GB" sz="3600" dirty="0" smtClean="0">
+                <a:latin typeface="Courier New" panose="02070309020205020404" pitchFamily="49" charset="0"/>
+                <a:cs typeface="Courier New" panose="02070309020205020404" pitchFamily="49" charset="0"/>
+              </a:rPr>
+              <a:t>map </a:t>
+            </a:r>
+            <a:r>
+              <a:rPr lang="en-GB" sz="3600" dirty="0" smtClean="0">
+                <a:solidFill>
+                  <a:srgbClr val="FF0000"/>
+                </a:solidFill>
+                <a:latin typeface="Courier New" panose="02070309020205020404" pitchFamily="49" charset="0"/>
+                <a:cs typeface="Courier New" panose="02070309020205020404" pitchFamily="49" charset="0"/>
+              </a:rPr>
+              <a:t>::</a:t>
+            </a:r>
+            <a:endParaRPr lang="en-GB" sz="3600" dirty="0">
+              <a:latin typeface="Courier New" panose="02070309020205020404" pitchFamily="49" charset="0"/>
+              <a:cs typeface="Courier New" panose="02070309020205020404" pitchFamily="49" charset="0"/>
+            </a:endParaRPr>
+          </a:p>
+        </p:txBody>
+      </p:sp>
+      <p:sp>
+        <p:nvSpPr>
+          <p:cNvPr id="4" name="TextBox 3"/>
+          <p:cNvSpPr txBox="1"/>
+          <p:nvPr/>
+        </p:nvSpPr>
+        <p:spPr>
+          <a:xfrm>
+            <a:off x="2436260" y="1783869"/>
+            <a:ext cx="2329484" cy="646331"/>
+          </a:xfrm>
+          <a:prstGeom prst="rect">
+            <a:avLst/>
+          </a:prstGeom>
+          <a:noFill/>
+        </p:spPr>
+        <p:txBody>
+          <a:bodyPr wrap="none" rtlCol="0">
+            <a:spAutoFit/>
+          </a:bodyPr>
+          <a:lstStyle/>
+          <a:p>
+            <a:r>
+              <a:rPr lang="en-GB" sz="3600" dirty="0" smtClean="0">
+                <a:solidFill>
+                  <a:srgbClr val="7030A0"/>
+                </a:solidFill>
+                <a:latin typeface="+mj-lt"/>
+                <a:cs typeface="Courier New" panose="02070309020205020404" pitchFamily="49" charset="0"/>
+              </a:rPr>
+              <a:t>function  </a:t>
+            </a:r>
+            <a:r>
+              <a:rPr lang="en-GB" sz="3600" dirty="0" smtClean="0">
+                <a:solidFill>
+                  <a:srgbClr val="FF0000"/>
+                </a:solidFill>
+                <a:latin typeface="+mj-lt"/>
+                <a:cs typeface="Courier New" panose="02070309020205020404" pitchFamily="49" charset="0"/>
+              </a:rPr>
+              <a:t>-&gt;</a:t>
+            </a:r>
+            <a:endParaRPr lang="en-GB" sz="3600" dirty="0">
+              <a:solidFill>
+                <a:srgbClr val="7030A0"/>
+              </a:solidFill>
+              <a:latin typeface="+mj-lt"/>
+              <a:cs typeface="Courier New" panose="02070309020205020404" pitchFamily="49" charset="0"/>
+            </a:endParaRPr>
+          </a:p>
+        </p:txBody>
+      </p:sp>
+      <p:sp>
+        <p:nvSpPr>
+          <p:cNvPr id="6" name="TextBox 5"/>
+          <p:cNvSpPr txBox="1"/>
+          <p:nvPr/>
+        </p:nvSpPr>
+        <p:spPr>
+          <a:xfrm>
+            <a:off x="496392" y="2710661"/>
+            <a:ext cx="8226932" cy="646331"/>
+          </a:xfrm>
+          <a:prstGeom prst="rect">
+            <a:avLst/>
+          </a:prstGeom>
+          <a:noFill/>
+        </p:spPr>
+        <p:txBody>
+          <a:bodyPr wrap="none" rtlCol="0">
+            <a:spAutoFit/>
+          </a:bodyPr>
+          <a:lstStyle/>
+          <a:p>
+            <a:r>
+              <a:rPr lang="en-GB" sz="3600" dirty="0" smtClean="0">
+                <a:latin typeface="Courier New" panose="02070309020205020404" pitchFamily="49" charset="0"/>
+                <a:cs typeface="Courier New" panose="02070309020205020404" pitchFamily="49" charset="0"/>
+              </a:rPr>
+              <a:t>map </a:t>
+            </a:r>
+            <a:r>
+              <a:rPr lang="en-GB" sz="3600" dirty="0" smtClean="0">
+                <a:solidFill>
+                  <a:srgbClr val="FF0000"/>
+                </a:solidFill>
+                <a:latin typeface="Courier New" panose="02070309020205020404" pitchFamily="49" charset="0"/>
+                <a:cs typeface="Courier New" panose="02070309020205020404" pitchFamily="49" charset="0"/>
+              </a:rPr>
+              <a:t>:: </a:t>
+            </a:r>
+            <a:r>
+              <a:rPr lang="en-GB" sz="3600" dirty="0" smtClean="0">
+                <a:latin typeface="Courier New" panose="02070309020205020404" pitchFamily="49" charset="0"/>
+                <a:cs typeface="Courier New" panose="02070309020205020404" pitchFamily="49" charset="0"/>
+              </a:rPr>
+              <a:t>(a </a:t>
+            </a:r>
+            <a:r>
+              <a:rPr lang="en-GB" sz="3600" dirty="0" smtClean="0">
+                <a:solidFill>
+                  <a:srgbClr val="FF0000"/>
+                </a:solidFill>
+                <a:latin typeface="Courier New" panose="02070309020205020404" pitchFamily="49" charset="0"/>
+                <a:cs typeface="Courier New" panose="02070309020205020404" pitchFamily="49" charset="0"/>
+              </a:rPr>
+              <a:t>-&gt;</a:t>
+            </a:r>
+            <a:r>
+              <a:rPr lang="en-GB" sz="3600" dirty="0" smtClean="0">
+                <a:latin typeface="Courier New" panose="02070309020205020404" pitchFamily="49" charset="0"/>
+                <a:cs typeface="Courier New" panose="02070309020205020404" pitchFamily="49" charset="0"/>
+              </a:rPr>
+              <a:t> b) </a:t>
+            </a:r>
+            <a:r>
+              <a:rPr lang="en-GB" sz="3600" dirty="0" smtClean="0">
+                <a:solidFill>
+                  <a:srgbClr val="FF0000"/>
+                </a:solidFill>
+                <a:latin typeface="Courier New" panose="02070309020205020404" pitchFamily="49" charset="0"/>
+                <a:cs typeface="Courier New" panose="02070309020205020404" pitchFamily="49" charset="0"/>
+              </a:rPr>
+              <a:t>-&gt;</a:t>
+            </a:r>
+            <a:r>
+              <a:rPr lang="en-GB" sz="3600" dirty="0" smtClean="0">
+                <a:latin typeface="Courier New" panose="02070309020205020404" pitchFamily="49" charset="0"/>
+                <a:cs typeface="Courier New" panose="02070309020205020404" pitchFamily="49" charset="0"/>
+              </a:rPr>
+              <a:t> [a] </a:t>
+            </a:r>
+            <a:r>
+              <a:rPr lang="en-GB" sz="3600" dirty="0" smtClean="0">
+                <a:solidFill>
+                  <a:srgbClr val="FF0000"/>
+                </a:solidFill>
+                <a:latin typeface="Courier New" panose="02070309020205020404" pitchFamily="49" charset="0"/>
+                <a:cs typeface="Courier New" panose="02070309020205020404" pitchFamily="49" charset="0"/>
+              </a:rPr>
+              <a:t>-&gt;</a:t>
+            </a:r>
+            <a:r>
+              <a:rPr lang="en-GB" sz="3600" dirty="0" smtClean="0">
+                <a:latin typeface="Courier New" panose="02070309020205020404" pitchFamily="49" charset="0"/>
+                <a:cs typeface="Courier New" panose="02070309020205020404" pitchFamily="49" charset="0"/>
+              </a:rPr>
+              <a:t> [b]</a:t>
+            </a:r>
+            <a:endParaRPr lang="en-GB" sz="3600" dirty="0">
+              <a:latin typeface="Courier New" panose="02070309020205020404" pitchFamily="49" charset="0"/>
+              <a:cs typeface="Courier New" panose="02070309020205020404" pitchFamily="49" charset="0"/>
+            </a:endParaRPr>
+          </a:p>
+        </p:txBody>
+      </p:sp>
+      <p:sp>
+        <p:nvSpPr>
+          <p:cNvPr id="7" name="TextBox 6"/>
+          <p:cNvSpPr txBox="1"/>
+          <p:nvPr/>
+        </p:nvSpPr>
+        <p:spPr>
+          <a:xfrm>
+            <a:off x="4840851" y="1783868"/>
+            <a:ext cx="1304781" cy="646331"/>
+          </a:xfrm>
+          <a:prstGeom prst="rect">
+            <a:avLst/>
+          </a:prstGeom>
+          <a:noFill/>
+        </p:spPr>
+        <p:txBody>
+          <a:bodyPr wrap="none" rtlCol="0">
+            <a:spAutoFit/>
+          </a:bodyPr>
+          <a:lstStyle/>
+          <a:p>
+            <a:r>
+              <a:rPr lang="en-GB" sz="3600" dirty="0" smtClean="0">
+                <a:solidFill>
+                  <a:srgbClr val="7030A0"/>
+                </a:solidFill>
+                <a:latin typeface="+mj-lt"/>
+                <a:cs typeface="Courier New" panose="02070309020205020404" pitchFamily="49" charset="0"/>
+              </a:rPr>
+              <a:t>list  </a:t>
+            </a:r>
+            <a:r>
+              <a:rPr lang="en-GB" sz="3600" dirty="0" smtClean="0">
+                <a:solidFill>
+                  <a:srgbClr val="FF0000"/>
+                </a:solidFill>
+                <a:latin typeface="+mj-lt"/>
+                <a:cs typeface="Courier New" panose="02070309020205020404" pitchFamily="49" charset="0"/>
+              </a:rPr>
+              <a:t>-&gt;</a:t>
+            </a:r>
+            <a:endParaRPr lang="en-GB" sz="3600" dirty="0">
+              <a:solidFill>
+                <a:srgbClr val="7030A0"/>
+              </a:solidFill>
+              <a:latin typeface="+mj-lt"/>
+              <a:cs typeface="Courier New" panose="02070309020205020404" pitchFamily="49" charset="0"/>
+            </a:endParaRPr>
+          </a:p>
+        </p:txBody>
+      </p:sp>
+      <p:sp>
+        <p:nvSpPr>
+          <p:cNvPr id="9" name="TextBox 8"/>
+          <p:cNvSpPr txBox="1"/>
+          <p:nvPr/>
+        </p:nvSpPr>
+        <p:spPr>
+          <a:xfrm>
+            <a:off x="6156176" y="1783867"/>
+            <a:ext cx="726096" cy="646331"/>
+          </a:xfrm>
+          <a:prstGeom prst="rect">
+            <a:avLst/>
+          </a:prstGeom>
+          <a:noFill/>
+        </p:spPr>
+        <p:txBody>
+          <a:bodyPr wrap="none" rtlCol="0">
+            <a:spAutoFit/>
+          </a:bodyPr>
+          <a:lstStyle/>
+          <a:p>
+            <a:r>
+              <a:rPr lang="en-GB" sz="3600" dirty="0" smtClean="0">
+                <a:solidFill>
+                  <a:srgbClr val="7030A0"/>
+                </a:solidFill>
+                <a:latin typeface="+mj-lt"/>
+                <a:cs typeface="Courier New" panose="02070309020205020404" pitchFamily="49" charset="0"/>
+              </a:rPr>
+              <a:t>list</a:t>
+            </a:r>
+            <a:endParaRPr lang="en-GB" sz="3600" dirty="0">
+              <a:solidFill>
+                <a:srgbClr val="7030A0"/>
+              </a:solidFill>
+              <a:latin typeface="+mj-lt"/>
+              <a:cs typeface="Courier New" panose="02070309020205020404" pitchFamily="49" charset="0"/>
+            </a:endParaRPr>
+          </a:p>
+        </p:txBody>
+      </p:sp>
+    </p:spTree>
+    <p:extLst>
+      <p:ext uri="{BB962C8B-B14F-4D97-AF65-F5344CB8AC3E}">
+        <p14:creationId xmlns:p14="http://schemas.microsoft.com/office/powerpoint/2010/main" val="203874867"/>
+      </p:ext>
+    </p:extLst>
+  </p:cSld>
+  <p:clrMapOvr>
+    <a:masterClrMapping/>
+  </p:clrMapOvr>
+  <p:timing>
+    <p:tnLst>
+      <p:par>
+        <p:cTn id="1" dur="indefinite" restart="never" nodeType="tmRoot">
+          <p:childTnLst>
+            <p:seq concurrent="1" nextAc="seek">
+              <p:cTn id="2" dur="indefinite" nodeType="mainSeq">
+                <p:childTnLst>
+                  <p:par>
+                    <p:cTn id="3" fill="hold">
+                      <p:stCondLst>
+                        <p:cond delay="indefinite"/>
+                      </p:stCondLst>
+                      <p:childTnLst>
+                        <p:par>
+                          <p:cTn id="4" fill="hold">
+                            <p:stCondLst>
+                              <p:cond delay="0"/>
+                            </p:stCondLst>
+                            <p:childTnLst>
+                              <p:par>
+                                <p:cTn id="5" presetID="1" presetClass="entr" presetSubtype="0" fill="hold" grpId="0" nodeType="clickEffect">
+                                  <p:stCondLst>
+                                    <p:cond delay="0"/>
+                                  </p:stCondLst>
+                                  <p:childTnLst>
+                                    <p:set>
+                                      <p:cBhvr>
+                                        <p:cTn id="6" dur="1" fill="hold">
+                                          <p:stCondLst>
+                                            <p:cond delay="0"/>
+                                          </p:stCondLst>
+                                        </p:cTn>
+                                        <p:tgtEl>
+                                          <p:spTgt spid="5"/>
+                                        </p:tgtEl>
+                                        <p:attrNameLst>
+                                          <p:attrName>style.visibility</p:attrName>
+                                        </p:attrNameLst>
+                                      </p:cBhvr>
+                                      <p:to>
+                                        <p:strVal val="visible"/>
+                                      </p:to>
+                                    </p:set>
+                                  </p:childTnLst>
+                                </p:cTn>
+                              </p:par>
+                            </p:childTnLst>
+                          </p:cTn>
+                        </p:par>
+                      </p:childTnLst>
+                    </p:cTn>
+                  </p:par>
+                  <p:par>
+                    <p:cTn id="7" fill="hold">
+                      <p:stCondLst>
+                        <p:cond delay="indefinite"/>
+                      </p:stCondLst>
+                      <p:childTnLst>
+                        <p:par>
+                          <p:cTn id="8" fill="hold">
+                            <p:stCondLst>
+                              <p:cond delay="0"/>
+                            </p:stCondLst>
+                            <p:childTnLst>
+                              <p:par>
+                                <p:cTn id="9" presetID="1" presetClass="entr" presetSubtype="0" fill="hold" grpId="0" nodeType="clickEffect">
+                                  <p:stCondLst>
+                                    <p:cond delay="0"/>
+                                  </p:stCondLst>
+                                  <p:childTnLst>
+                                    <p:set>
+                                      <p:cBhvr>
+                                        <p:cTn id="10" dur="1" fill="hold">
+                                          <p:stCondLst>
+                                            <p:cond delay="0"/>
+                                          </p:stCondLst>
+                                        </p:cTn>
+                                        <p:tgtEl>
+                                          <p:spTgt spid="4"/>
+                                        </p:tgtEl>
+                                        <p:attrNameLst>
+                                          <p:attrName>style.visibility</p:attrName>
+                                        </p:attrNameLst>
+                                      </p:cBhvr>
+                                      <p:to>
+                                        <p:strVal val="visible"/>
+                                      </p:to>
+                                    </p:set>
+                                  </p:childTnLst>
+                                </p:cTn>
+                              </p:par>
+                            </p:childTnLst>
+                          </p:cTn>
+                        </p:par>
+                      </p:childTnLst>
+                    </p:cTn>
+                  </p:par>
+                  <p:par>
+                    <p:cTn id="11" fill="hold">
+                      <p:stCondLst>
+                        <p:cond delay="indefinite"/>
+                      </p:stCondLst>
+                      <p:childTnLst>
+                        <p:par>
+                          <p:cTn id="12" fill="hold">
+                            <p:stCondLst>
+                              <p:cond delay="0"/>
+                            </p:stCondLst>
+                            <p:childTnLst>
+                              <p:par>
+                                <p:cTn id="13" presetID="1" presetClass="entr" presetSubtype="0" fill="hold" grpId="0" nodeType="clickEffect">
+                                  <p:stCondLst>
+                                    <p:cond delay="0"/>
+                                  </p:stCondLst>
+                                  <p:childTnLst>
+                                    <p:set>
+                                      <p:cBhvr>
+                                        <p:cTn id="14" dur="1" fill="hold">
+                                          <p:stCondLst>
+                                            <p:cond delay="0"/>
+                                          </p:stCondLst>
+                                        </p:cTn>
+                                        <p:tgtEl>
+                                          <p:spTgt spid="7"/>
+                                        </p:tgtEl>
+                                        <p:attrNameLst>
+                                          <p:attrName>style.visibility</p:attrName>
+                                        </p:attrNameLst>
+                                      </p:cBhvr>
+                                      <p:to>
+                                        <p:strVal val="visible"/>
+                                      </p:to>
+                                    </p:set>
+                                  </p:childTnLst>
+                                </p:cTn>
+                              </p:par>
+                            </p:childTnLst>
+                          </p:cTn>
+                        </p:par>
+                      </p:childTnLst>
+                    </p:cTn>
+                  </p:par>
+                  <p:par>
+                    <p:cTn id="15" fill="hold">
+                      <p:stCondLst>
+                        <p:cond delay="indefinite"/>
+                      </p:stCondLst>
+                      <p:childTnLst>
+                        <p:par>
+                          <p:cTn id="16" fill="hold">
+                            <p:stCondLst>
+                              <p:cond delay="0"/>
+                            </p:stCondLst>
+                            <p:childTnLst>
+                              <p:par>
+                                <p:cTn id="17" presetID="1" presetClass="entr" presetSubtype="0" fill="hold" grpId="0" nodeType="clickEffect">
+                                  <p:stCondLst>
+                                    <p:cond delay="0"/>
+                                  </p:stCondLst>
+                                  <p:childTnLst>
+                                    <p:set>
+                                      <p:cBhvr>
+                                        <p:cTn id="18" dur="1" fill="hold">
+                                          <p:stCondLst>
+                                            <p:cond delay="0"/>
+                                          </p:stCondLst>
+                                        </p:cTn>
+                                        <p:tgtEl>
+                                          <p:spTgt spid="9"/>
+                                        </p:tgtEl>
+                                        <p:attrNameLst>
+                                          <p:attrName>style.visibility</p:attrName>
+                                        </p:attrNameLst>
+                                      </p:cBhvr>
+                                      <p:to>
+                                        <p:strVal val="visible"/>
+                                      </p:to>
+                                    </p:set>
+                                  </p:childTnLst>
+                                </p:cTn>
+                              </p:par>
+                            </p:childTnLst>
+                          </p:cTn>
+                        </p:par>
+                      </p:childTnLst>
+                    </p:cTn>
+                  </p:par>
+                  <p:par>
+                    <p:cTn id="19" fill="hold">
+                      <p:stCondLst>
+                        <p:cond delay="indefinite"/>
+                      </p:stCondLst>
+                      <p:childTnLst>
+                        <p:par>
+                          <p:cTn id="20" fill="hold">
+                            <p:stCondLst>
+                              <p:cond delay="0"/>
+                            </p:stCondLst>
+                            <p:childTnLst>
+                              <p:par>
+                                <p:cTn id="21" presetID="1" presetClass="entr" presetSubtype="0" fill="hold" grpId="0" nodeType="clickEffect">
+                                  <p:stCondLst>
+                                    <p:cond delay="0"/>
+                                  </p:stCondLst>
+                                  <p:childTnLst>
+                                    <p:set>
+                                      <p:cBhvr>
+                                        <p:cTn id="22" dur="1" fill="hold">
+                                          <p:stCondLst>
+                                            <p:cond delay="0"/>
+                                          </p:stCondLst>
+                                        </p:cTn>
+                                        <p:tgtEl>
+                                          <p:spTgt spid="6"/>
+                                        </p:tgtEl>
+                                        <p:attrNameLst>
+                                          <p:attrName>style.visibility</p:attrName>
+                                        </p:attrNameLst>
+                                      </p:cBhvr>
+                                      <p:to>
+                                        <p:strVal val="visible"/>
+                                      </p:to>
+                                    </p:set>
+                                  </p:childTnLst>
+                                </p:cTn>
+                              </p:par>
+                            </p:childTnLst>
+                          </p:cTn>
+                        </p:par>
+                      </p:childTnLst>
+                    </p:cTn>
+                  </p:par>
+                </p:childTnLst>
+              </p:cTn>
+              <p:prevCondLst>
+                <p:cond evt="onPrev" delay="0">
+                  <p:tgtEl>
+                    <p:sldTgt/>
+                  </p:tgtEl>
+                </p:cond>
+              </p:prevCondLst>
+              <p:nextCondLst>
+                <p:cond evt="onNext" delay="0">
+                  <p:tgtEl>
+                    <p:sldTgt/>
+                  </p:tgtEl>
+                </p:cond>
+              </p:nextCondLst>
+            </p:seq>
+          </p:childTnLst>
+        </p:cTn>
+      </p:par>
+    </p:tnLst>
+    <p:bldLst>
+      <p:bldP spid="5" grpId="0"/>
+      <p:bldP spid="4" grpId="0"/>
+      <p:bldP spid="6" grpId="0"/>
+      <p:bldP spid="7" grpId="0"/>
+      <p:bldP spid="9" grpId="0"/>
+    </p:bldLst>
+  </p:timing>
+</p:sld>
+</file>
+
+<file path=ppt/slides/slide23.xml><?xml version="1.0" encoding="utf-8"?>
+<p:sld xmlns:a="http://schemas.openxmlformats.org/drawingml/2006/main" xmlns:r="http://schemas.openxmlformats.org/officeDocument/2006/relationships" xmlns:p="http://schemas.openxmlformats.org/presentationml/2006/main">
+  <p:cSld>
+    <p:spTree>
+      <p:nvGrpSpPr>
+        <p:cNvPr id="1" name=""/>
+        <p:cNvGrpSpPr/>
+        <p:nvPr/>
+      </p:nvGrpSpPr>
+      <p:grpSpPr>
+        <a:xfrm>
+          <a:off x="0" y="0"/>
+          <a:ext cx="0" cy="0"/>
+          <a:chOff x="0" y="0"/>
+          <a:chExt cx="0" cy="0"/>
+        </a:xfrm>
+      </p:grpSpPr>
+      <p:sp>
+        <p:nvSpPr>
+          <p:cNvPr id="2" name="TextBox 1"/>
+          <p:cNvSpPr txBox="1"/>
+          <p:nvPr/>
+        </p:nvSpPr>
+        <p:spPr>
+          <a:xfrm>
+            <a:off x="2627784" y="1700808"/>
+            <a:ext cx="3562770" cy="1200329"/>
+          </a:xfrm>
+          <a:prstGeom prst="rect">
+            <a:avLst/>
+          </a:prstGeom>
+          <a:noFill/>
+        </p:spPr>
+        <p:txBody>
+          <a:bodyPr wrap="none" rtlCol="0">
+            <a:spAutoFit/>
+          </a:bodyPr>
+          <a:lstStyle/>
+          <a:p>
+            <a:r>
+              <a:rPr lang="en-GB" sz="7200" dirty="0" smtClean="0">
+                <a:solidFill>
+                  <a:srgbClr val="0070C0"/>
+                </a:solidFill>
+              </a:rPr>
+              <a:t>Exercises</a:t>
+            </a:r>
+            <a:endParaRPr lang="en-GB" sz="7200" dirty="0">
+              <a:solidFill>
+                <a:srgbClr val="0070C0"/>
+              </a:solidFill>
+            </a:endParaRPr>
+          </a:p>
+        </p:txBody>
+      </p:sp>
+      <p:sp>
+        <p:nvSpPr>
+          <p:cNvPr id="3" name="TextBox 2"/>
+          <p:cNvSpPr txBox="1"/>
+          <p:nvPr/>
+        </p:nvSpPr>
+        <p:spPr>
+          <a:xfrm>
+            <a:off x="1619672" y="3573016"/>
+            <a:ext cx="5784532" cy="646331"/>
+          </a:xfrm>
+          <a:prstGeom prst="rect">
+            <a:avLst/>
+          </a:prstGeom>
+          <a:noFill/>
+        </p:spPr>
+        <p:txBody>
+          <a:bodyPr wrap="none" rtlCol="0">
+            <a:spAutoFit/>
+          </a:bodyPr>
+          <a:lstStyle/>
+          <a:p>
+            <a:r>
+              <a:rPr lang="en-GB" sz="3600" dirty="0" smtClean="0">
+                <a:hlinkClick r:id="rId3"/>
+              </a:rPr>
+              <a:t>http://dominicprior.github.io/</a:t>
+            </a:r>
+            <a:endParaRPr lang="en-GB" sz="3600" dirty="0"/>
+          </a:p>
+        </p:txBody>
+      </p:sp>
+    </p:spTree>
+    <p:extLst>
+      <p:ext uri="{BB962C8B-B14F-4D97-AF65-F5344CB8AC3E}">
+        <p14:creationId xmlns:p14="http://schemas.microsoft.com/office/powerpoint/2010/main" val="1809113977"/>
+      </p:ext>
+    </p:extLst>
+  </p:cSld>
+  <p:clrMapOvr>
+    <a:masterClrMapping/>
+  </p:clrMapOvr>
+  <p:timing>
+    <p:tnLst>
+      <p:par>
+        <p:cTn id="1" dur="indefinite" restart="never" nodeType="tmRoot"/>
+      </p:par>
+    </p:tnLst>
   </p:timing>
 </p:sld>
 </file>

</xml_diff>

<commit_message>
Add tuples, Set and Maybe
</commit_message>
<xml_diff>
--- a/beginning-haskell.pptx
+++ b/beginning-haskell.pptx
@@ -5,8 +5,11 @@
     <p:sldMasterId id="2147483648" r:id="rId1"/>
   </p:sldMasterIdLst>
   <p:notesMasterIdLst>
-    <p:notesMasterId r:id="rId25"/>
+    <p:notesMasterId r:id="rId26"/>
   </p:notesMasterIdLst>
+  <p:handoutMasterIdLst>
+    <p:handoutMasterId r:id="rId27"/>
+  </p:handoutMasterIdLst>
   <p:sldIdLst>
     <p:sldId id="263" r:id="rId2"/>
     <p:sldId id="262" r:id="rId3"/>
@@ -25,15 +28,16 @@
     <p:sldId id="275" r:id="rId16"/>
     <p:sldId id="276" r:id="rId17"/>
     <p:sldId id="277" r:id="rId18"/>
-    <p:sldId id="278" r:id="rId19"/>
-    <p:sldId id="279" r:id="rId20"/>
-    <p:sldId id="280" r:id="rId21"/>
-    <p:sldId id="281" r:id="rId22"/>
-    <p:sldId id="282" r:id="rId23"/>
-    <p:sldId id="283" r:id="rId24"/>
+    <p:sldId id="284" r:id="rId19"/>
+    <p:sldId id="278" r:id="rId20"/>
+    <p:sldId id="279" r:id="rId21"/>
+    <p:sldId id="280" r:id="rId22"/>
+    <p:sldId id="281" r:id="rId23"/>
+    <p:sldId id="282" r:id="rId24"/>
+    <p:sldId id="283" r:id="rId25"/>
   </p:sldIdLst>
   <p:sldSz cx="9144000" cy="6858000" type="screen4x3"/>
-  <p:notesSz cx="6858000" cy="9144000"/>
+  <p:notesSz cx="6797675" cy="9926638"/>
   <p:defaultTextStyle>
     <a:defPPr>
       <a:defRPr lang="en-US"/>
@@ -132,6 +136,171 @@
 </p:presentation>
 </file>
 
+<file path=ppt/handoutMasters/handoutMaster1.xml><?xml version="1.0" encoding="utf-8"?>
+<p:handoutMaster xmlns:a="http://schemas.openxmlformats.org/drawingml/2006/main" xmlns:r="http://schemas.openxmlformats.org/officeDocument/2006/relationships" xmlns:p="http://schemas.openxmlformats.org/presentationml/2006/main">
+  <p:cSld>
+    <p:bg>
+      <p:bgRef idx="1001">
+        <a:schemeClr val="bg1"/>
+      </p:bgRef>
+    </p:bg>
+    <p:spTree>
+      <p:nvGrpSpPr>
+        <p:cNvPr id="1" name=""/>
+        <p:cNvGrpSpPr/>
+        <p:nvPr/>
+      </p:nvGrpSpPr>
+      <p:grpSpPr>
+        <a:xfrm>
+          <a:off x="0" y="0"/>
+          <a:ext cx="0" cy="0"/>
+          <a:chOff x="0" y="0"/>
+          <a:chExt cx="0" cy="0"/>
+        </a:xfrm>
+      </p:grpSpPr>
+      <p:sp>
+        <p:nvSpPr>
+          <p:cNvPr id="2" name="Header Placeholder 1"/>
+          <p:cNvSpPr>
+            <a:spLocks noGrp="1"/>
+          </p:cNvSpPr>
+          <p:nvPr>
+            <p:ph type="hdr" sz="quarter"/>
+          </p:nvPr>
+        </p:nvSpPr>
+        <p:spPr>
+          <a:xfrm>
+            <a:off x="0" y="0"/>
+            <a:ext cx="2945659" cy="496332"/>
+          </a:xfrm>
+          <a:prstGeom prst="rect">
+            <a:avLst/>
+          </a:prstGeom>
+        </p:spPr>
+        <p:txBody>
+          <a:bodyPr vert="horz" lIns="91440" tIns="45720" rIns="91440" bIns="45720" rtlCol="0"/>
+          <a:lstStyle>
+            <a:lvl1pPr algn="l">
+              <a:defRPr sz="1200"/>
+            </a:lvl1pPr>
+          </a:lstStyle>
+          <a:p>
+            <a:endParaRPr lang="en-GB" dirty="0"/>
+          </a:p>
+        </p:txBody>
+      </p:sp>
+      <p:sp>
+        <p:nvSpPr>
+          <p:cNvPr id="3" name="Date Placeholder 2"/>
+          <p:cNvSpPr>
+            <a:spLocks noGrp="1"/>
+          </p:cNvSpPr>
+          <p:nvPr>
+            <p:ph type="dt" sz="quarter" idx="1"/>
+          </p:nvPr>
+        </p:nvSpPr>
+        <p:spPr>
+          <a:xfrm>
+            <a:off x="3850443" y="0"/>
+            <a:ext cx="2945659" cy="496332"/>
+          </a:xfrm>
+          <a:prstGeom prst="rect">
+            <a:avLst/>
+          </a:prstGeom>
+        </p:spPr>
+        <p:txBody>
+          <a:bodyPr vert="horz" lIns="91440" tIns="45720" rIns="91440" bIns="45720" rtlCol="0"/>
+          <a:lstStyle>
+            <a:lvl1pPr algn="r">
+              <a:defRPr sz="1200"/>
+            </a:lvl1pPr>
+          </a:lstStyle>
+          <a:p>
+            <a:fld id="{8CF2A7F3-13F6-4645-BC6B-B3276F6FFD3F}" type="datetimeFigureOut">
+              <a:rPr lang="en-GB" smtClean="0"/>
+              <a:t>19/09/2015</a:t>
+            </a:fld>
+            <a:endParaRPr lang="en-GB" dirty="0"/>
+          </a:p>
+        </p:txBody>
+      </p:sp>
+      <p:sp>
+        <p:nvSpPr>
+          <p:cNvPr id="4" name="Footer Placeholder 3"/>
+          <p:cNvSpPr>
+            <a:spLocks noGrp="1"/>
+          </p:cNvSpPr>
+          <p:nvPr>
+            <p:ph type="ftr" sz="quarter" idx="2"/>
+          </p:nvPr>
+        </p:nvSpPr>
+        <p:spPr>
+          <a:xfrm>
+            <a:off x="0" y="9428583"/>
+            <a:ext cx="2945659" cy="496332"/>
+          </a:xfrm>
+          <a:prstGeom prst="rect">
+            <a:avLst/>
+          </a:prstGeom>
+        </p:spPr>
+        <p:txBody>
+          <a:bodyPr vert="horz" lIns="91440" tIns="45720" rIns="91440" bIns="45720" rtlCol="0" anchor="b"/>
+          <a:lstStyle>
+            <a:lvl1pPr algn="l">
+              <a:defRPr sz="1200"/>
+            </a:lvl1pPr>
+          </a:lstStyle>
+          <a:p>
+            <a:endParaRPr lang="en-GB" dirty="0"/>
+          </a:p>
+        </p:txBody>
+      </p:sp>
+      <p:sp>
+        <p:nvSpPr>
+          <p:cNvPr id="5" name="Slide Number Placeholder 4"/>
+          <p:cNvSpPr>
+            <a:spLocks noGrp="1"/>
+          </p:cNvSpPr>
+          <p:nvPr>
+            <p:ph type="sldNum" sz="quarter" idx="3"/>
+          </p:nvPr>
+        </p:nvSpPr>
+        <p:spPr>
+          <a:xfrm>
+            <a:off x="3850443" y="9428583"/>
+            <a:ext cx="2945659" cy="496332"/>
+          </a:xfrm>
+          <a:prstGeom prst="rect">
+            <a:avLst/>
+          </a:prstGeom>
+        </p:spPr>
+        <p:txBody>
+          <a:bodyPr vert="horz" lIns="91440" tIns="45720" rIns="91440" bIns="45720" rtlCol="0" anchor="b"/>
+          <a:lstStyle>
+            <a:lvl1pPr algn="r">
+              <a:defRPr sz="1200"/>
+            </a:lvl1pPr>
+          </a:lstStyle>
+          <a:p>
+            <a:fld id="{E4D49674-3472-4DFF-B49A-85257127384B}" type="slidenum">
+              <a:rPr lang="en-GB" smtClean="0"/>
+              <a:t>‹#›</a:t>
+            </a:fld>
+            <a:endParaRPr lang="en-GB" dirty="0"/>
+          </a:p>
+        </p:txBody>
+      </p:sp>
+    </p:spTree>
+    <p:extLst>
+      <p:ext uri="{BB962C8B-B14F-4D97-AF65-F5344CB8AC3E}">
+        <p14:creationId xmlns:p14="http://schemas.microsoft.com/office/powerpoint/2010/main" val="3278778906"/>
+      </p:ext>
+    </p:extLst>
+  </p:cSld>
+  <p:clrMap bg1="lt1" tx1="dk1" bg2="lt2" tx2="dk2" accent1="accent1" accent2="accent2" accent3="accent3" accent4="accent4" accent5="accent5" accent6="accent6" hlink="hlink" folHlink="folHlink"/>
+</p:handoutMaster>
+</file>
+
 <file path=ppt/notesMasters/notesMaster1.xml><?xml version="1.0" encoding="utf-8"?>
 <p:notesMaster xmlns:a="http://schemas.openxmlformats.org/drawingml/2006/main" xmlns:r="http://schemas.openxmlformats.org/officeDocument/2006/relationships" xmlns:p="http://schemas.openxmlformats.org/presentationml/2006/main">
   <p:cSld>
@@ -167,7 +336,7 @@
         <p:spPr>
           <a:xfrm>
             <a:off x="0" y="0"/>
-            <a:ext cx="2971800" cy="457200"/>
+            <a:ext cx="2945659" cy="496332"/>
           </a:xfrm>
           <a:prstGeom prst="rect">
             <a:avLst/>
@@ -197,8 +366,8 @@
         </p:nvSpPr>
         <p:spPr>
           <a:xfrm>
-            <a:off x="3884613" y="0"/>
-            <a:ext cx="2971800" cy="457200"/>
+            <a:off x="3850443" y="0"/>
+            <a:ext cx="2945659" cy="496332"/>
           </a:xfrm>
           <a:prstGeom prst="rect">
             <a:avLst/>
@@ -214,7 +383,7 @@
           <a:p>
             <a:fld id="{AD3FA50F-1914-4298-B603-A4EE2FCB29C0}" type="datetimeFigureOut">
               <a:rPr lang="en-GB" smtClean="0"/>
-              <a:t>31/08/2015</a:t>
+              <a:t>19/09/2015</a:t>
             </a:fld>
             <a:endParaRPr lang="en-GB" dirty="0"/>
           </a:p>
@@ -232,8 +401,8 @@
         </p:nvSpPr>
         <p:spPr>
           <a:xfrm>
-            <a:off x="1143000" y="685800"/>
-            <a:ext cx="4572000" cy="3429000"/>
+            <a:off x="917575" y="744538"/>
+            <a:ext cx="4962525" cy="3722687"/>
           </a:xfrm>
           <a:prstGeom prst="rect">
             <a:avLst/>
@@ -265,8 +434,8 @@
         </p:nvSpPr>
         <p:spPr>
           <a:xfrm>
-            <a:off x="685800" y="4343400"/>
-            <a:ext cx="5486400" cy="4114800"/>
+            <a:off x="679768" y="4715153"/>
+            <a:ext cx="5438140" cy="4466987"/>
           </a:xfrm>
           <a:prstGeom prst="rect">
             <a:avLst/>
@@ -325,8 +494,8 @@
         </p:nvSpPr>
         <p:spPr>
           <a:xfrm>
-            <a:off x="0" y="8685213"/>
-            <a:ext cx="2971800" cy="457200"/>
+            <a:off x="0" y="9428583"/>
+            <a:ext cx="2945659" cy="496332"/>
           </a:xfrm>
           <a:prstGeom prst="rect">
             <a:avLst/>
@@ -356,8 +525,8 @@
         </p:nvSpPr>
         <p:spPr>
           <a:xfrm>
-            <a:off x="3884613" y="8685213"/>
-            <a:ext cx="2971800" cy="457200"/>
+            <a:off x="3850443" y="9428583"/>
+            <a:ext cx="2945659" cy="496332"/>
           </a:xfrm>
           <a:prstGeom prst="rect">
             <a:avLst/>
@@ -647,7 +816,99 @@
           <a:p>
             <a:fld id="{999CC533-FB79-4577-A6D0-2326348CB1C0}" type="slidenum">
               <a:rPr lang="en-GB" smtClean="0"/>
-              <a:t>23</a:t>
+              <a:t>19</a:t>
+            </a:fld>
+            <a:endParaRPr lang="en-GB" dirty="0"/>
+          </a:p>
+        </p:txBody>
+      </p:sp>
+    </p:spTree>
+    <p:extLst>
+      <p:ext uri="{BB962C8B-B14F-4D97-AF65-F5344CB8AC3E}">
+        <p14:creationId xmlns:p14="http://schemas.microsoft.com/office/powerpoint/2010/main" val="4125636590"/>
+      </p:ext>
+    </p:extLst>
+  </p:cSld>
+  <p:clrMapOvr>
+    <a:masterClrMapping/>
+  </p:clrMapOvr>
+</p:notes>
+</file>
+
+<file path=ppt/notesSlides/notesSlide11.xml><?xml version="1.0" encoding="utf-8"?>
+<p:notes xmlns:a="http://schemas.openxmlformats.org/drawingml/2006/main" xmlns:r="http://schemas.openxmlformats.org/officeDocument/2006/relationships" xmlns:p="http://schemas.openxmlformats.org/presentationml/2006/main">
+  <p:cSld>
+    <p:spTree>
+      <p:nvGrpSpPr>
+        <p:cNvPr id="1" name=""/>
+        <p:cNvGrpSpPr/>
+        <p:nvPr/>
+      </p:nvGrpSpPr>
+      <p:grpSpPr>
+        <a:xfrm>
+          <a:off x="0" y="0"/>
+          <a:ext cx="0" cy="0"/>
+          <a:chOff x="0" y="0"/>
+          <a:chExt cx="0" cy="0"/>
+        </a:xfrm>
+      </p:grpSpPr>
+      <p:sp>
+        <p:nvSpPr>
+          <p:cNvPr id="2" name="Slide Image Placeholder 1"/>
+          <p:cNvSpPr>
+            <a:spLocks noGrp="1" noRot="1" noChangeAspect="1"/>
+          </p:cNvSpPr>
+          <p:nvPr>
+            <p:ph type="sldImg"/>
+          </p:nvPr>
+        </p:nvSpPr>
+        <p:spPr/>
+      </p:sp>
+      <p:sp>
+        <p:nvSpPr>
+          <p:cNvPr id="3" name="Notes Placeholder 2"/>
+          <p:cNvSpPr>
+            <a:spLocks noGrp="1"/>
+          </p:cNvSpPr>
+          <p:nvPr>
+            <p:ph type="body" idx="1"/>
+          </p:nvPr>
+        </p:nvSpPr>
+        <p:spPr/>
+        <p:txBody>
+          <a:bodyPr/>
+          <a:lstStyle/>
+          <a:p>
+            <a:r>
+              <a:rPr lang="en-GB" dirty="0" smtClean="0"/>
+              <a:t>These slides accompany a two-hour “Beginning</a:t>
+            </a:r>
+            <a:r>
+              <a:rPr lang="en-GB" baseline="0" dirty="0" smtClean="0"/>
+              <a:t> Haskell” course.</a:t>
+            </a:r>
+            <a:endParaRPr lang="en-GB" dirty="0"/>
+          </a:p>
+        </p:txBody>
+      </p:sp>
+      <p:sp>
+        <p:nvSpPr>
+          <p:cNvPr id="4" name="Slide Number Placeholder 3"/>
+          <p:cNvSpPr>
+            <a:spLocks noGrp="1"/>
+          </p:cNvSpPr>
+          <p:nvPr>
+            <p:ph type="sldNum" sz="quarter" idx="10"/>
+          </p:nvPr>
+        </p:nvSpPr>
+        <p:spPr/>
+        <p:txBody>
+          <a:bodyPr/>
+          <a:lstStyle/>
+          <a:p>
+            <a:fld id="{999CC533-FB79-4577-A6D0-2326348CB1C0}" type="slidenum">
+              <a:rPr lang="en-GB" smtClean="0"/>
+              <a:t>24</a:t>
             </a:fld>
             <a:endParaRPr lang="en-GB" dirty="0"/>
           </a:p>
@@ -1583,7 +1844,7 @@
           <a:p>
             <a:fld id="{95BECF0C-4CAB-4B68-A56B-44E0A3F5E222}" type="datetimeFigureOut">
               <a:rPr lang="en-GB" smtClean="0"/>
-              <a:t>30/08/2015</a:t>
+              <a:t>19/09/2015</a:t>
             </a:fld>
             <a:endParaRPr lang="en-GB" dirty="0"/>
           </a:p>
@@ -1753,7 +2014,7 @@
           <a:p>
             <a:fld id="{95BECF0C-4CAB-4B68-A56B-44E0A3F5E222}" type="datetimeFigureOut">
               <a:rPr lang="en-GB" smtClean="0"/>
-              <a:t>30/08/2015</a:t>
+              <a:t>19/09/2015</a:t>
             </a:fld>
             <a:endParaRPr lang="en-GB" dirty="0"/>
           </a:p>
@@ -1933,7 +2194,7 @@
           <a:p>
             <a:fld id="{95BECF0C-4CAB-4B68-A56B-44E0A3F5E222}" type="datetimeFigureOut">
               <a:rPr lang="en-GB" smtClean="0"/>
-              <a:t>30/08/2015</a:t>
+              <a:t>19/09/2015</a:t>
             </a:fld>
             <a:endParaRPr lang="en-GB" dirty="0"/>
           </a:p>
@@ -2103,7 +2364,7 @@
           <a:p>
             <a:fld id="{95BECF0C-4CAB-4B68-A56B-44E0A3F5E222}" type="datetimeFigureOut">
               <a:rPr lang="en-GB" smtClean="0"/>
-              <a:t>30/08/2015</a:t>
+              <a:t>19/09/2015</a:t>
             </a:fld>
             <a:endParaRPr lang="en-GB" dirty="0"/>
           </a:p>
@@ -2349,7 +2610,7 @@
           <a:p>
             <a:fld id="{95BECF0C-4CAB-4B68-A56B-44E0A3F5E222}" type="datetimeFigureOut">
               <a:rPr lang="en-GB" smtClean="0"/>
-              <a:t>30/08/2015</a:t>
+              <a:t>19/09/2015</a:t>
             </a:fld>
             <a:endParaRPr lang="en-GB" dirty="0"/>
           </a:p>
@@ -2637,7 +2898,7 @@
           <a:p>
             <a:fld id="{95BECF0C-4CAB-4B68-A56B-44E0A3F5E222}" type="datetimeFigureOut">
               <a:rPr lang="en-GB" smtClean="0"/>
-              <a:t>30/08/2015</a:t>
+              <a:t>19/09/2015</a:t>
             </a:fld>
             <a:endParaRPr lang="en-GB" dirty="0"/>
           </a:p>
@@ -3059,7 +3320,7 @@
           <a:p>
             <a:fld id="{95BECF0C-4CAB-4B68-A56B-44E0A3F5E222}" type="datetimeFigureOut">
               <a:rPr lang="en-GB" smtClean="0"/>
-              <a:t>30/08/2015</a:t>
+              <a:t>19/09/2015</a:t>
             </a:fld>
             <a:endParaRPr lang="en-GB" dirty="0"/>
           </a:p>
@@ -3177,7 +3438,7 @@
           <a:p>
             <a:fld id="{95BECF0C-4CAB-4B68-A56B-44E0A3F5E222}" type="datetimeFigureOut">
               <a:rPr lang="en-GB" smtClean="0"/>
-              <a:t>30/08/2015</a:t>
+              <a:t>19/09/2015</a:t>
             </a:fld>
             <a:endParaRPr lang="en-GB" dirty="0"/>
           </a:p>
@@ -3272,7 +3533,7 @@
           <a:p>
             <a:fld id="{95BECF0C-4CAB-4B68-A56B-44E0A3F5E222}" type="datetimeFigureOut">
               <a:rPr lang="en-GB" smtClean="0"/>
-              <a:t>30/08/2015</a:t>
+              <a:t>19/09/2015</a:t>
             </a:fld>
             <a:endParaRPr lang="en-GB" dirty="0"/>
           </a:p>
@@ -3549,7 +3810,7 @@
           <a:p>
             <a:fld id="{95BECF0C-4CAB-4B68-A56B-44E0A3F5E222}" type="datetimeFigureOut">
               <a:rPr lang="en-GB" smtClean="0"/>
-              <a:t>30/08/2015</a:t>
+              <a:t>19/09/2015</a:t>
             </a:fld>
             <a:endParaRPr lang="en-GB" dirty="0"/>
           </a:p>
@@ -3802,7 +4063,7 @@
           <a:p>
             <a:fld id="{95BECF0C-4CAB-4B68-A56B-44E0A3F5E222}" type="datetimeFigureOut">
               <a:rPr lang="en-GB" smtClean="0"/>
-              <a:t>30/08/2015</a:t>
+              <a:t>19/09/2015</a:t>
             </a:fld>
             <a:endParaRPr lang="en-GB" dirty="0"/>
           </a:p>
@@ -4015,7 +4276,7 @@
           <a:p>
             <a:fld id="{95BECF0C-4CAB-4B68-A56B-44E0A3F5E222}" type="datetimeFigureOut">
               <a:rPr lang="en-GB" smtClean="0"/>
-              <a:t>30/08/2015</a:t>
+              <a:t>19/09/2015</a:t>
             </a:fld>
             <a:endParaRPr lang="en-GB" dirty="0"/>
           </a:p>
@@ -5758,14 +6019,7 @@
                 <a:latin typeface="Courier New" panose="02070309020205020404" pitchFamily="49" charset="0"/>
                 <a:cs typeface="Courier New" panose="02070309020205020404" pitchFamily="49" charset="0"/>
               </a:rPr>
-              <a:t>2</a:t>
-            </a:r>
-            <a:r>
-              <a:rPr lang="en-GB" sz="4400" dirty="0" smtClean="0">
-                <a:latin typeface="Courier New" panose="02070309020205020404" pitchFamily="49" charset="0"/>
-                <a:cs typeface="Courier New" panose="02070309020205020404" pitchFamily="49" charset="0"/>
-              </a:rPr>
-              <a:t> : [4]</a:t>
+              <a:t>2 : [4]</a:t>
             </a:r>
           </a:p>
           <a:p>
@@ -6510,7 +6764,7 @@
         </p:nvSpPr>
         <p:spPr>
           <a:xfrm>
-            <a:off x="467544" y="973172"/>
+            <a:off x="467544" y="548680"/>
             <a:ext cx="4243469" cy="5509200"/>
           </a:xfrm>
           <a:prstGeom prst="rect">
@@ -6658,7 +6912,7 @@
         </p:nvSpPr>
         <p:spPr>
           <a:xfrm>
-            <a:off x="5692106" y="973172"/>
+            <a:off x="5692106" y="548680"/>
             <a:ext cx="3228769" cy="4832092"/>
           </a:xfrm>
           <a:prstGeom prst="rect">
@@ -6917,13 +7171,18 @@
         </p:nvSpPr>
         <p:spPr>
           <a:xfrm>
-            <a:off x="5692106" y="5899919"/>
+            <a:off x="5692106" y="5475427"/>
             <a:ext cx="2552302" cy="769441"/>
           </a:xfrm>
           <a:prstGeom prst="rect">
             <a:avLst/>
           </a:prstGeom>
           <a:noFill/>
+          <a:ln>
+            <a:solidFill>
+              <a:schemeClr val="accent1"/>
+            </a:solidFill>
+          </a:ln>
         </p:spPr>
         <p:txBody>
           <a:bodyPr wrap="none" rtlCol="0">
@@ -7092,7 +7351,7 @@
     </p:tnLst>
     <p:bldLst>
       <p:bldP spid="4" grpId="0"/>
-      <p:bldP spid="2" grpId="0"/>
+      <p:bldP spid="2" grpId="0" animBg="1"/>
     </p:bldLst>
   </p:timing>
 </p:sld>
@@ -7123,8 +7382,8 @@
         </p:nvSpPr>
         <p:spPr>
           <a:xfrm>
-            <a:off x="467544" y="973172"/>
-            <a:ext cx="7287572" cy="2123658"/>
+            <a:off x="467544" y="548680"/>
+            <a:ext cx="2552302" cy="4832092"/>
           </a:xfrm>
           <a:prstGeom prst="rect">
             <a:avLst/>
@@ -7142,148 +7401,89 @@
                 <a:latin typeface="Courier New" panose="02070309020205020404" pitchFamily="49" charset="0"/>
                 <a:cs typeface="Courier New" panose="02070309020205020404" pitchFamily="49" charset="0"/>
               </a:rPr>
-              <a:t>Int </a:t>
-            </a:r>
-            <a:r>
-              <a:rPr lang="en-GB" sz="4400" dirty="0" smtClean="0">
-                <a:solidFill>
-                  <a:srgbClr val="FF0000"/>
-                </a:solidFill>
-                <a:latin typeface="Courier New" panose="02070309020205020404" pitchFamily="49" charset="0"/>
-                <a:cs typeface="Courier New" panose="02070309020205020404" pitchFamily="49" charset="0"/>
-              </a:rPr>
-              <a:t>-&gt;</a:t>
-            </a:r>
-            <a:r>
-              <a:rPr lang="en-GB" sz="4400" dirty="0" smtClean="0">
-                <a:latin typeface="Courier New" panose="02070309020205020404" pitchFamily="49" charset="0"/>
-                <a:cs typeface="Courier New" panose="02070309020205020404" pitchFamily="49" charset="0"/>
-              </a:rPr>
-              <a:t> Bool</a:t>
-            </a:r>
-          </a:p>
-          <a:p>
-            <a:r>
-              <a:rPr lang="en-GB" sz="4400" dirty="0" smtClean="0">
-                <a:latin typeface="Courier New" panose="02070309020205020404" pitchFamily="49" charset="0"/>
-                <a:cs typeface="Courier New" panose="02070309020205020404" pitchFamily="49" charset="0"/>
-              </a:rPr>
-              <a:t>Char </a:t>
-            </a:r>
-            <a:r>
-              <a:rPr lang="en-GB" sz="4400" dirty="0" smtClean="0">
-                <a:solidFill>
-                  <a:srgbClr val="FF0000"/>
-                </a:solidFill>
-                <a:latin typeface="Courier New" panose="02070309020205020404" pitchFamily="49" charset="0"/>
-                <a:cs typeface="Courier New" panose="02070309020205020404" pitchFamily="49" charset="0"/>
-              </a:rPr>
-              <a:t>-&gt;</a:t>
-            </a:r>
-            <a:r>
-              <a:rPr lang="en-GB" sz="4400" dirty="0" smtClean="0">
-                <a:latin typeface="Courier New" panose="02070309020205020404" pitchFamily="49" charset="0"/>
-                <a:cs typeface="Courier New" panose="02070309020205020404" pitchFamily="49" charset="0"/>
-              </a:rPr>
-              <a:t> Int</a:t>
-            </a:r>
-          </a:p>
-          <a:p>
-            <a:r>
-              <a:rPr lang="en-GB" sz="4400" dirty="0" smtClean="0">
-                <a:latin typeface="Courier New" panose="02070309020205020404" pitchFamily="49" charset="0"/>
-                <a:cs typeface="Courier New" panose="02070309020205020404" pitchFamily="49" charset="0"/>
-              </a:rPr>
-              <a:t>Int </a:t>
-            </a:r>
-            <a:r>
-              <a:rPr lang="en-GB" sz="4400" dirty="0" smtClean="0">
-                <a:solidFill>
-                  <a:srgbClr val="FF0000"/>
-                </a:solidFill>
-                <a:latin typeface="Courier New" panose="02070309020205020404" pitchFamily="49" charset="0"/>
-                <a:cs typeface="Courier New" panose="02070309020205020404" pitchFamily="49" charset="0"/>
-              </a:rPr>
-              <a:t>-&gt;</a:t>
-            </a:r>
-            <a:r>
-              <a:rPr lang="en-GB" sz="4400" dirty="0" smtClean="0">
-                <a:latin typeface="Courier New" panose="02070309020205020404" pitchFamily="49" charset="0"/>
-                <a:cs typeface="Courier New" panose="02070309020205020404" pitchFamily="49" charset="0"/>
-              </a:rPr>
-              <a:t> [Char] </a:t>
-            </a:r>
-            <a:r>
-              <a:rPr lang="en-GB" sz="4400" dirty="0" smtClean="0">
-                <a:solidFill>
-                  <a:srgbClr val="FF0000"/>
-                </a:solidFill>
-                <a:latin typeface="Courier New" panose="02070309020205020404" pitchFamily="49" charset="0"/>
-                <a:cs typeface="Courier New" panose="02070309020205020404" pitchFamily="49" charset="0"/>
-              </a:rPr>
-              <a:t>-&gt;</a:t>
-            </a:r>
-            <a:r>
-              <a:rPr lang="en-GB" sz="4400" dirty="0" smtClean="0">
-                <a:latin typeface="Courier New" panose="02070309020205020404" pitchFamily="49" charset="0"/>
-                <a:cs typeface="Courier New" panose="02070309020205020404" pitchFamily="49" charset="0"/>
-              </a:rPr>
-              <a:t> Char</a:t>
-            </a:r>
-            <a:endParaRPr lang="en-GB" sz="4400" dirty="0" smtClean="0">
+              <a:t>Int</a:t>
+            </a:r>
+          </a:p>
+          <a:p>
+            <a:r>
+              <a:rPr lang="en-GB" sz="4400" dirty="0" smtClean="0">
+                <a:latin typeface="Courier New" panose="02070309020205020404" pitchFamily="49" charset="0"/>
+                <a:cs typeface="Courier New" panose="02070309020205020404" pitchFamily="49" charset="0"/>
+              </a:rPr>
+              <a:t>Integer</a:t>
+            </a:r>
+          </a:p>
+          <a:p>
+            <a:r>
+              <a:rPr lang="en-GB" sz="4400" dirty="0" smtClean="0">
+                <a:latin typeface="Courier New" panose="02070309020205020404" pitchFamily="49" charset="0"/>
+                <a:cs typeface="Courier New" panose="02070309020205020404" pitchFamily="49" charset="0"/>
+              </a:rPr>
+              <a:t>Float</a:t>
+            </a:r>
+          </a:p>
+          <a:p>
+            <a:r>
+              <a:rPr lang="en-GB" sz="4400" dirty="0" smtClean="0">
+                <a:latin typeface="Courier New" panose="02070309020205020404" pitchFamily="49" charset="0"/>
+                <a:cs typeface="Courier New" panose="02070309020205020404" pitchFamily="49" charset="0"/>
+              </a:rPr>
+              <a:t>Double</a:t>
+            </a:r>
+          </a:p>
+          <a:p>
+            <a:r>
+              <a:rPr lang="en-GB" sz="4400" dirty="0" smtClean="0">
+                <a:latin typeface="Courier New" panose="02070309020205020404" pitchFamily="49" charset="0"/>
+                <a:cs typeface="Courier New" panose="02070309020205020404" pitchFamily="49" charset="0"/>
+              </a:rPr>
+              <a:t>Char</a:t>
+            </a:r>
+            <a:endParaRPr lang="en-GB" sz="4400" i="1" dirty="0" smtClean="0">
+              <a:solidFill>
+                <a:srgbClr val="0070C0"/>
+              </a:solidFill>
               <a:latin typeface="Courier New" panose="02070309020205020404" pitchFamily="49" charset="0"/>
               <a:cs typeface="Courier New" panose="02070309020205020404" pitchFamily="49" charset="0"/>
             </a:endParaRPr>
           </a:p>
-        </p:txBody>
-      </p:sp>
-    </p:spTree>
-    <p:extLst>
-      <p:ext uri="{BB962C8B-B14F-4D97-AF65-F5344CB8AC3E}">
-        <p14:creationId xmlns:p14="http://schemas.microsoft.com/office/powerpoint/2010/main" val="1074749852"/>
-      </p:ext>
-    </p:extLst>
-  </p:cSld>
-  <p:clrMapOvr>
-    <a:masterClrMapping/>
-  </p:clrMapOvr>
-  <p:timing>
-    <p:tnLst>
-      <p:par>
-        <p:cTn id="1" dur="indefinite" restart="never" nodeType="tmRoot"/>
-      </p:par>
-    </p:tnLst>
-  </p:timing>
-</p:sld>
-</file>
-
-<file path=ppt/slides/slide19.xml><?xml version="1.0" encoding="utf-8"?>
-<p:sld xmlns:a="http://schemas.openxmlformats.org/drawingml/2006/main" xmlns:r="http://schemas.openxmlformats.org/officeDocument/2006/relationships" xmlns:p="http://schemas.openxmlformats.org/presentationml/2006/main">
-  <p:cSld>
-    <p:spTree>
-      <p:nvGrpSpPr>
-        <p:cNvPr id="1" name=""/>
-        <p:cNvGrpSpPr/>
-        <p:nvPr/>
-      </p:nvGrpSpPr>
-      <p:grpSpPr>
-        <a:xfrm>
-          <a:off x="0" y="0"/>
-          <a:ext cx="0" cy="0"/>
-          <a:chOff x="0" y="0"/>
-          <a:chExt cx="0" cy="0"/>
-        </a:xfrm>
-      </p:grpSpPr>
-      <p:sp>
-        <p:nvSpPr>
-          <p:cNvPr id="11" name="TextBox 10"/>
+          <a:p>
+            <a:r>
+              <a:rPr lang="en-GB" sz="4400" dirty="0" smtClean="0">
+                <a:latin typeface="Courier New" panose="02070309020205020404" pitchFamily="49" charset="0"/>
+                <a:cs typeface="Courier New" panose="02070309020205020404" pitchFamily="49" charset="0"/>
+              </a:rPr>
+              <a:t>String</a:t>
+            </a:r>
+          </a:p>
+          <a:p>
+            <a:r>
+              <a:rPr lang="en-GB" sz="4400" dirty="0" smtClean="0">
+                <a:latin typeface="Courier New" panose="02070309020205020404" pitchFamily="49" charset="0"/>
+                <a:cs typeface="Courier New" panose="02070309020205020404" pitchFamily="49" charset="0"/>
+              </a:rPr>
+              <a:t>Bool</a:t>
+            </a:r>
+            <a:endParaRPr lang="en-GB" sz="4400" i="1" dirty="0" smtClean="0">
+              <a:solidFill>
+                <a:srgbClr val="0070C0"/>
+              </a:solidFill>
+              <a:latin typeface="Courier New" panose="02070309020205020404" pitchFamily="49" charset="0"/>
+              <a:cs typeface="Courier New" panose="02070309020205020404" pitchFamily="49" charset="0"/>
+            </a:endParaRPr>
+          </a:p>
+        </p:txBody>
+      </p:sp>
+      <p:sp>
+        <p:nvSpPr>
+          <p:cNvPr id="4" name="TextBox 3"/>
           <p:cNvSpPr txBox="1"/>
           <p:nvPr/>
         </p:nvSpPr>
         <p:spPr>
           <a:xfrm>
-            <a:off x="496392" y="2132856"/>
-            <a:ext cx="7964040" cy="1446550"/>
+            <a:off x="5692106" y="548680"/>
+            <a:ext cx="3228769" cy="2123658"/>
           </a:xfrm>
           <a:prstGeom prst="rect">
             <a:avLst/>
@@ -7298,25 +7498,228 @@
           <a:p>
             <a:r>
               <a:rPr lang="en-GB" sz="4400" dirty="0" smtClean="0">
-                <a:latin typeface="Courier New" panose="02070309020205020404" pitchFamily="49" charset="0"/>
-                <a:cs typeface="Courier New" panose="02070309020205020404" pitchFamily="49" charset="0"/>
-              </a:rPr>
-              <a:t>sum [] = 0</a:t>
-            </a:r>
-          </a:p>
-          <a:p>
-            <a:r>
-              <a:rPr lang="en-GB" sz="4400" dirty="0" smtClean="0">
-                <a:latin typeface="Courier New" panose="02070309020205020404" pitchFamily="49" charset="0"/>
-                <a:cs typeface="Courier New" panose="02070309020205020404" pitchFamily="49" charset="0"/>
-              </a:rPr>
-              <a:t>sum (x:xs) = x + sum xs</a:t>
-            </a:r>
-            <a:endParaRPr lang="en-GB" sz="4400" dirty="0">
+                <a:solidFill>
+                  <a:srgbClr val="FF0000"/>
+                </a:solidFill>
+                <a:latin typeface="Courier New" panose="02070309020205020404" pitchFamily="49" charset="0"/>
+                <a:cs typeface="Courier New" panose="02070309020205020404" pitchFamily="49" charset="0"/>
+              </a:rPr>
+              <a:t>[</a:t>
+            </a:r>
+            <a:r>
+              <a:rPr lang="en-GB" sz="4400" dirty="0" smtClean="0">
+                <a:latin typeface="Courier New" panose="02070309020205020404" pitchFamily="49" charset="0"/>
+                <a:cs typeface="Courier New" panose="02070309020205020404" pitchFamily="49" charset="0"/>
+              </a:rPr>
+              <a:t>Int</a:t>
+            </a:r>
+            <a:r>
+              <a:rPr lang="en-GB" sz="4400" dirty="0" smtClean="0">
+                <a:solidFill>
+                  <a:srgbClr val="FF0000"/>
+                </a:solidFill>
+                <a:latin typeface="Courier New" panose="02070309020205020404" pitchFamily="49" charset="0"/>
+                <a:cs typeface="Courier New" panose="02070309020205020404" pitchFamily="49" charset="0"/>
+              </a:rPr>
+              <a:t>]</a:t>
+            </a:r>
+          </a:p>
+          <a:p>
+            <a:r>
+              <a:rPr lang="en-GB" sz="4400" dirty="0" smtClean="0">
+                <a:solidFill>
+                  <a:srgbClr val="FF0000"/>
+                </a:solidFill>
+                <a:latin typeface="Courier New" panose="02070309020205020404" pitchFamily="49" charset="0"/>
+                <a:cs typeface="Courier New" panose="02070309020205020404" pitchFamily="49" charset="0"/>
+              </a:rPr>
+              <a:t>[</a:t>
+            </a:r>
+            <a:r>
+              <a:rPr lang="en-GB" sz="4400" dirty="0" smtClean="0">
+                <a:latin typeface="Courier New" panose="02070309020205020404" pitchFamily="49" charset="0"/>
+                <a:cs typeface="Courier New" panose="02070309020205020404" pitchFamily="49" charset="0"/>
+              </a:rPr>
+              <a:t>Integer</a:t>
+            </a:r>
+            <a:r>
+              <a:rPr lang="en-GB" sz="4400" dirty="0" smtClean="0">
+                <a:solidFill>
+                  <a:srgbClr val="FF0000"/>
+                </a:solidFill>
+                <a:latin typeface="Courier New" panose="02070309020205020404" pitchFamily="49" charset="0"/>
+                <a:cs typeface="Courier New" panose="02070309020205020404" pitchFamily="49" charset="0"/>
+              </a:rPr>
+              <a:t>]</a:t>
+            </a:r>
+            <a:endParaRPr lang="en-GB" sz="4400" dirty="0" smtClean="0">
               <a:latin typeface="Courier New" panose="02070309020205020404" pitchFamily="49" charset="0"/>
               <a:cs typeface="Courier New" panose="02070309020205020404" pitchFamily="49" charset="0"/>
             </a:endParaRPr>
           </a:p>
+          <a:p>
+            <a:endParaRPr lang="en-GB" sz="4400" i="1" dirty="0" smtClean="0">
+              <a:solidFill>
+                <a:srgbClr val="C00000"/>
+              </a:solidFill>
+              <a:latin typeface="Courier New" panose="02070309020205020404" pitchFamily="49" charset="0"/>
+              <a:cs typeface="Courier New" panose="02070309020205020404" pitchFamily="49" charset="0"/>
+            </a:endParaRPr>
+          </a:p>
+        </p:txBody>
+      </p:sp>
+      <p:sp>
+        <p:nvSpPr>
+          <p:cNvPr id="3" name="TextBox 2"/>
+          <p:cNvSpPr txBox="1"/>
+          <p:nvPr/>
+        </p:nvSpPr>
+        <p:spPr>
+          <a:xfrm>
+            <a:off x="3027408" y="2364561"/>
+            <a:ext cx="6008376" cy="1200329"/>
+          </a:xfrm>
+          <a:prstGeom prst="rect">
+            <a:avLst/>
+          </a:prstGeom>
+          <a:noFill/>
+          <a:ln>
+            <a:solidFill>
+              <a:schemeClr val="accent1"/>
+            </a:solidFill>
+          </a:ln>
+        </p:spPr>
+        <p:txBody>
+          <a:bodyPr wrap="none" rtlCol="0">
+            <a:spAutoFit/>
+          </a:bodyPr>
+          <a:lstStyle/>
+          <a:p>
+            <a:r>
+              <a:rPr lang="en-GB" sz="3600" dirty="0" smtClean="0">
+                <a:solidFill>
+                  <a:srgbClr val="FF0000"/>
+                </a:solidFill>
+                <a:latin typeface="Courier New" panose="02070309020205020404" pitchFamily="49" charset="0"/>
+                <a:cs typeface="Courier New" panose="02070309020205020404" pitchFamily="49" charset="0"/>
+              </a:rPr>
+              <a:t>(</a:t>
+            </a:r>
+            <a:r>
+              <a:rPr lang="en-GB" sz="3600" dirty="0" smtClean="0">
+                <a:latin typeface="Courier New" panose="02070309020205020404" pitchFamily="49" charset="0"/>
+                <a:cs typeface="Courier New" panose="02070309020205020404" pitchFamily="49" charset="0"/>
+              </a:rPr>
+              <a:t>Int</a:t>
+            </a:r>
+            <a:r>
+              <a:rPr lang="en-GB" sz="3600" dirty="0" smtClean="0">
+                <a:solidFill>
+                  <a:srgbClr val="FF0000"/>
+                </a:solidFill>
+                <a:latin typeface="Courier New" panose="02070309020205020404" pitchFamily="49" charset="0"/>
+                <a:cs typeface="Courier New" panose="02070309020205020404" pitchFamily="49" charset="0"/>
+              </a:rPr>
+              <a:t>,</a:t>
+            </a:r>
+            <a:r>
+              <a:rPr lang="en-GB" sz="3600" dirty="0" smtClean="0">
+                <a:latin typeface="Courier New" panose="02070309020205020404" pitchFamily="49" charset="0"/>
+                <a:cs typeface="Courier New" panose="02070309020205020404" pitchFamily="49" charset="0"/>
+              </a:rPr>
+              <a:t>String</a:t>
+            </a:r>
+            <a:r>
+              <a:rPr lang="en-GB" sz="3600" dirty="0" smtClean="0">
+                <a:solidFill>
+                  <a:srgbClr val="FF0000"/>
+                </a:solidFill>
+                <a:latin typeface="Courier New" panose="02070309020205020404" pitchFamily="49" charset="0"/>
+                <a:cs typeface="Courier New" panose="02070309020205020404" pitchFamily="49" charset="0"/>
+              </a:rPr>
+              <a:t>) </a:t>
+            </a:r>
+            <a:r>
+              <a:rPr lang="en-GB" sz="3600" dirty="0" smtClean="0">
+                <a:solidFill>
+                  <a:srgbClr val="0070C0"/>
+                </a:solidFill>
+                <a:latin typeface="Courier New" panose="02070309020205020404" pitchFamily="49" charset="0"/>
+                <a:cs typeface="Courier New" panose="02070309020205020404" pitchFamily="49" charset="0"/>
+              </a:rPr>
+              <a:t>(3,"hi")</a:t>
+            </a:r>
+          </a:p>
+          <a:p>
+            <a:r>
+              <a:rPr lang="en-GB" sz="3600" dirty="0">
+                <a:solidFill>
+                  <a:srgbClr val="FF0000"/>
+                </a:solidFill>
+                <a:latin typeface="Courier New" panose="02070309020205020404" pitchFamily="49" charset="0"/>
+                <a:cs typeface="Courier New" panose="02070309020205020404" pitchFamily="49" charset="0"/>
+              </a:rPr>
+              <a:t>(</a:t>
+            </a:r>
+            <a:r>
+              <a:rPr lang="en-GB" sz="3600" dirty="0" smtClean="0">
+                <a:latin typeface="Courier New" panose="02070309020205020404" pitchFamily="49" charset="0"/>
+                <a:cs typeface="Courier New" panose="02070309020205020404" pitchFamily="49" charset="0"/>
+              </a:rPr>
+              <a:t>Char</a:t>
+            </a:r>
+            <a:r>
+              <a:rPr lang="en-GB" sz="3600" dirty="0" smtClean="0">
+                <a:solidFill>
+                  <a:srgbClr val="FF0000"/>
+                </a:solidFill>
+                <a:latin typeface="Courier New" panose="02070309020205020404" pitchFamily="49" charset="0"/>
+                <a:cs typeface="Courier New" panose="02070309020205020404" pitchFamily="49" charset="0"/>
+              </a:rPr>
+              <a:t>,</a:t>
+            </a:r>
+            <a:r>
+              <a:rPr lang="en-GB" sz="3600" dirty="0" smtClean="0">
+                <a:latin typeface="Courier New" panose="02070309020205020404" pitchFamily="49" charset="0"/>
+                <a:cs typeface="Courier New" panose="02070309020205020404" pitchFamily="49" charset="0"/>
+              </a:rPr>
+              <a:t>Bool</a:t>
+            </a:r>
+            <a:r>
+              <a:rPr lang="en-GB" sz="3600" dirty="0" smtClean="0">
+                <a:solidFill>
+                  <a:srgbClr val="FF0000"/>
+                </a:solidFill>
+                <a:latin typeface="Courier New" panose="02070309020205020404" pitchFamily="49" charset="0"/>
+                <a:cs typeface="Courier New" panose="02070309020205020404" pitchFamily="49" charset="0"/>
+              </a:rPr>
+              <a:t>,[</a:t>
+            </a:r>
+            <a:r>
+              <a:rPr lang="en-GB" sz="3600" dirty="0" smtClean="0">
+                <a:latin typeface="Courier New" panose="02070309020205020404" pitchFamily="49" charset="0"/>
+                <a:cs typeface="Courier New" panose="02070309020205020404" pitchFamily="49" charset="0"/>
+              </a:rPr>
+              <a:t>Int</a:t>
+            </a:r>
+            <a:r>
+              <a:rPr lang="en-GB" sz="3600" dirty="0" smtClean="0">
+                <a:solidFill>
+                  <a:srgbClr val="FF0000"/>
+                </a:solidFill>
+                <a:latin typeface="Courier New" panose="02070309020205020404" pitchFamily="49" charset="0"/>
+                <a:cs typeface="Courier New" panose="02070309020205020404" pitchFamily="49" charset="0"/>
+              </a:rPr>
+              <a:t>])</a:t>
+            </a:r>
+            <a:endParaRPr lang="en-GB" sz="3600" dirty="0" smtClean="0">
+              <a:solidFill>
+                <a:srgbClr val="FF0000"/>
+              </a:solidFill>
+              <a:latin typeface="Courier New" panose="02070309020205020404" pitchFamily="49" charset="0"/>
+              <a:cs typeface="Courier New" panose="02070309020205020404" pitchFamily="49" charset="0"/>
+            </a:endParaRPr>
+          </a:p>
         </p:txBody>
       </p:sp>
       <p:sp>
@@ -7327,8 +7730,8 @@
         </p:nvSpPr>
         <p:spPr>
           <a:xfrm>
-            <a:off x="496392" y="1422089"/>
-            <a:ext cx="6611105" cy="769441"/>
+            <a:off x="4139952" y="3955703"/>
+            <a:ext cx="3567002" cy="769441"/>
           </a:xfrm>
           <a:prstGeom prst="rect">
             <a:avLst/>
@@ -7346,53 +7749,97 @@
                 <a:latin typeface="Courier New" panose="02070309020205020404" pitchFamily="49" charset="0"/>
                 <a:cs typeface="Courier New" panose="02070309020205020404" pitchFamily="49" charset="0"/>
               </a:rPr>
-              <a:t>sum </a:t>
-            </a:r>
-            <a:r>
-              <a:rPr lang="en-GB" sz="4400" dirty="0" smtClean="0">
-                <a:solidFill>
-                  <a:srgbClr val="FF0000"/>
-                </a:solidFill>
-                <a:latin typeface="Courier New" panose="02070309020205020404" pitchFamily="49" charset="0"/>
-                <a:cs typeface="Courier New" panose="02070309020205020404" pitchFamily="49" charset="0"/>
-              </a:rPr>
-              <a:t>::</a:t>
-            </a:r>
-            <a:r>
-              <a:rPr lang="en-GB" sz="4400" dirty="0" smtClean="0">
-                <a:latin typeface="Courier New" panose="02070309020205020404" pitchFamily="49" charset="0"/>
-                <a:cs typeface="Courier New" panose="02070309020205020404" pitchFamily="49" charset="0"/>
-              </a:rPr>
-              <a:t> [Int] </a:t>
-            </a:r>
-            <a:r>
-              <a:rPr lang="en-GB" sz="4400" dirty="0" smtClean="0">
-                <a:solidFill>
-                  <a:srgbClr val="FF0000"/>
-                </a:solidFill>
-                <a:latin typeface="Courier New" panose="02070309020205020404" pitchFamily="49" charset="0"/>
-                <a:cs typeface="Courier New" panose="02070309020205020404" pitchFamily="49" charset="0"/>
-              </a:rPr>
-              <a:t>-&gt;</a:t>
-            </a:r>
-            <a:r>
-              <a:rPr lang="en-GB" sz="4400" dirty="0" smtClean="0">
-                <a:latin typeface="Courier New" panose="02070309020205020404" pitchFamily="49" charset="0"/>
-                <a:cs typeface="Courier New" panose="02070309020205020404" pitchFamily="49" charset="0"/>
-              </a:rPr>
-              <a:t> Int</a:t>
-            </a:r>
-            <a:endParaRPr lang="en-GB" sz="4400" dirty="0">
+              <a:t>Set String</a:t>
+            </a:r>
+            <a:endParaRPr lang="en-GB" sz="4400" dirty="0" smtClean="0">
               <a:latin typeface="Courier New" panose="02070309020205020404" pitchFamily="49" charset="0"/>
               <a:cs typeface="Courier New" panose="02070309020205020404" pitchFamily="49" charset="0"/>
             </a:endParaRPr>
           </a:p>
         </p:txBody>
       </p:sp>
+      <p:sp>
+        <p:nvSpPr>
+          <p:cNvPr id="6" name="TextBox 5"/>
+          <p:cNvSpPr txBox="1"/>
+          <p:nvPr/>
+        </p:nvSpPr>
+        <p:spPr>
+          <a:xfrm>
+            <a:off x="4139952" y="4869160"/>
+            <a:ext cx="3228769" cy="769441"/>
+          </a:xfrm>
+          <a:prstGeom prst="rect">
+            <a:avLst/>
+          </a:prstGeom>
+          <a:noFill/>
+        </p:spPr>
+        <p:txBody>
+          <a:bodyPr wrap="none" rtlCol="0">
+            <a:spAutoFit/>
+          </a:bodyPr>
+          <a:lstStyle/>
+          <a:p>
+            <a:r>
+              <a:rPr lang="en-GB" sz="4400" dirty="0" smtClean="0">
+                <a:latin typeface="Courier New" panose="02070309020205020404" pitchFamily="49" charset="0"/>
+                <a:cs typeface="Courier New" panose="02070309020205020404" pitchFamily="49" charset="0"/>
+              </a:rPr>
+              <a:t>Maybe Int</a:t>
+            </a:r>
+            <a:endParaRPr lang="en-GB" sz="4400" dirty="0" smtClean="0">
+              <a:latin typeface="Courier New" panose="02070309020205020404" pitchFamily="49" charset="0"/>
+              <a:cs typeface="Courier New" panose="02070309020205020404" pitchFamily="49" charset="0"/>
+            </a:endParaRPr>
+          </a:p>
+        </p:txBody>
+      </p:sp>
+      <p:sp>
+        <p:nvSpPr>
+          <p:cNvPr id="7" name="TextBox 6"/>
+          <p:cNvSpPr txBox="1"/>
+          <p:nvPr/>
+        </p:nvSpPr>
+        <p:spPr>
+          <a:xfrm>
+            <a:off x="2987824" y="5805264"/>
+            <a:ext cx="5934638" cy="769441"/>
+          </a:xfrm>
+          <a:prstGeom prst="rect">
+            <a:avLst/>
+          </a:prstGeom>
+          <a:noFill/>
+        </p:spPr>
+        <p:txBody>
+          <a:bodyPr wrap="none" rtlCol="0">
+            <a:spAutoFit/>
+          </a:bodyPr>
+          <a:lstStyle/>
+          <a:p>
+            <a:r>
+              <a:rPr lang="en-GB" sz="4400" dirty="0" smtClean="0">
+                <a:solidFill>
+                  <a:srgbClr val="0070C0"/>
+                </a:solidFill>
+                <a:latin typeface="Courier New" panose="02070309020205020404" pitchFamily="49" charset="0"/>
+                <a:cs typeface="Courier New" panose="02070309020205020404" pitchFamily="49" charset="0"/>
+              </a:rPr>
+              <a:t>Just 3    Nothing</a:t>
+            </a:r>
+            <a:endParaRPr lang="en-GB" sz="4400" dirty="0" smtClean="0">
+              <a:solidFill>
+                <a:srgbClr val="0070C0"/>
+              </a:solidFill>
+              <a:latin typeface="Courier New" panose="02070309020205020404" pitchFamily="49" charset="0"/>
+              <a:cs typeface="Courier New" panose="02070309020205020404" pitchFamily="49" charset="0"/>
+            </a:endParaRPr>
+          </a:p>
+        </p:txBody>
+      </p:sp>
     </p:spTree>
     <p:extLst>
       <p:ext uri="{BB962C8B-B14F-4D97-AF65-F5344CB8AC3E}">
-        <p14:creationId xmlns:p14="http://schemas.microsoft.com/office/powerpoint/2010/main" val="1976949730"/>
+        <p14:creationId xmlns:p14="http://schemas.microsoft.com/office/powerpoint/2010/main" val="3527980992"/>
       </p:ext>
     </p:extLst>
   </p:cSld>
@@ -7433,7 +7880,142 @@
                                           </p:stCondLst>
                                         </p:cTn>
                                         <p:tgtEl>
+                                          <p:spTgt spid="3"/>
+                                        </p:tgtEl>
+                                        <p:attrNameLst>
+                                          <p:attrName>style.visibility</p:attrName>
+                                        </p:attrNameLst>
+                                      </p:cBhvr>
+                                      <p:to>
+                                        <p:strVal val="visible"/>
+                                      </p:to>
+                                    </p:set>
+                                  </p:childTnLst>
+                                </p:cTn>
+                              </p:par>
+                            </p:childTnLst>
+                          </p:cTn>
+                        </p:par>
+                      </p:childTnLst>
+                    </p:cTn>
+                  </p:par>
+                  <p:par>
+                    <p:cTn id="7" fill="hold">
+                      <p:stCondLst>
+                        <p:cond delay="indefinite"/>
+                      </p:stCondLst>
+                      <p:childTnLst>
+                        <p:par>
+                          <p:cTn id="8" fill="hold">
+                            <p:stCondLst>
+                              <p:cond delay="0"/>
+                            </p:stCondLst>
+                            <p:childTnLst>
+                              <p:par>
+                                <p:cTn id="9" presetID="1" presetClass="entr" presetSubtype="0" fill="hold" grpId="0" nodeType="clickEffect">
+                                  <p:stCondLst>
+                                    <p:cond delay="0"/>
+                                  </p:stCondLst>
+                                  <p:childTnLst>
+                                    <p:set>
+                                      <p:cBhvr>
+                                        <p:cTn id="10" dur="1" fill="hold">
+                                          <p:stCondLst>
+                                            <p:cond delay="0"/>
+                                          </p:stCondLst>
+                                        </p:cTn>
+                                        <p:tgtEl>
                                           <p:spTgt spid="5"/>
+                                        </p:tgtEl>
+                                        <p:attrNameLst>
+                                          <p:attrName>style.visibility</p:attrName>
+                                        </p:attrNameLst>
+                                      </p:cBhvr>
+                                      <p:to>
+                                        <p:strVal val="visible"/>
+                                      </p:to>
+                                    </p:set>
+                                  </p:childTnLst>
+                                </p:cTn>
+                              </p:par>
+                            </p:childTnLst>
+                          </p:cTn>
+                        </p:par>
+                      </p:childTnLst>
+                    </p:cTn>
+                  </p:par>
+                  <p:par>
+                    <p:cTn id="11" fill="hold">
+                      <p:stCondLst>
+                        <p:cond delay="indefinite"/>
+                      </p:stCondLst>
+                      <p:childTnLst>
+                        <p:par>
+                          <p:cTn id="12" fill="hold">
+                            <p:stCondLst>
+                              <p:cond delay="0"/>
+                            </p:stCondLst>
+                            <p:childTnLst>
+                              <p:par>
+                                <p:cTn id="13" presetID="1" presetClass="entr" presetSubtype="0" fill="hold" grpId="0" nodeType="clickEffect">
+                                  <p:stCondLst>
+                                    <p:cond delay="0"/>
+                                  </p:stCondLst>
+                                  <p:childTnLst>
+                                    <p:set>
+                                      <p:cBhvr>
+                                        <p:cTn id="14" dur="1" fill="hold">
+                                          <p:stCondLst>
+                                            <p:cond delay="0"/>
+                                          </p:stCondLst>
+                                        </p:cTn>
+                                        <p:tgtEl>
+                                          <p:spTgt spid="6"/>
+                                        </p:tgtEl>
+                                        <p:attrNameLst>
+                                          <p:attrName>style.visibility</p:attrName>
+                                        </p:attrNameLst>
+                                      </p:cBhvr>
+                                      <p:to>
+                                        <p:strVal val="visible"/>
+                                      </p:to>
+                                    </p:set>
+                                  </p:childTnLst>
+                                </p:cTn>
+                              </p:par>
+                            </p:childTnLst>
+                          </p:cTn>
+                        </p:par>
+                      </p:childTnLst>
+                    </p:cTn>
+                  </p:par>
+                  <p:par>
+                    <p:cTn id="15" fill="hold">
+                      <p:stCondLst>
+                        <p:cond delay="indefinite"/>
+                      </p:stCondLst>
+                      <p:childTnLst>
+                        <p:par>
+                          <p:cTn id="16" fill="hold">
+                            <p:stCondLst>
+                              <p:cond delay="0"/>
+                            </p:stCondLst>
+                            <p:childTnLst>
+                              <p:par>
+                                <p:cTn id="17" presetID="1" presetClass="entr" presetSubtype="0" fill="hold" grpId="0" nodeType="clickEffect">
+                                  <p:stCondLst>
+                                    <p:cond delay="0"/>
+                                  </p:stCondLst>
+                                  <p:childTnLst>
+                                    <p:set>
+                                      <p:cBhvr>
+                                        <p:cTn id="18" dur="1" fill="hold">
+                                          <p:stCondLst>
+                                            <p:cond delay="0"/>
+                                          </p:stCondLst>
+                                        </p:cTn>
+                                        <p:tgtEl>
+                                          <p:spTgt spid="7"/>
                                         </p:tgtEl>
                                         <p:attrNameLst>
                                           <p:attrName>style.visibility</p:attrName>
@@ -7474,8 +8056,166 @@
       </p:par>
     </p:tnLst>
     <p:bldLst>
+      <p:bldP spid="3" grpId="0" animBg="1"/>
       <p:bldP spid="5" grpId="0"/>
+      <p:bldP spid="6" grpId="0"/>
+      <p:bldP spid="7" grpId="0"/>
     </p:bldLst>
+  </p:timing>
+</p:sld>
+</file>
+
+<file path=ppt/slides/slide19.xml><?xml version="1.0" encoding="utf-8"?>
+<p:sld xmlns:a="http://schemas.openxmlformats.org/drawingml/2006/main" xmlns:r="http://schemas.openxmlformats.org/officeDocument/2006/relationships" xmlns:p="http://schemas.openxmlformats.org/presentationml/2006/main">
+  <p:cSld>
+    <p:spTree>
+      <p:nvGrpSpPr>
+        <p:cNvPr id="1" name=""/>
+        <p:cNvGrpSpPr/>
+        <p:nvPr/>
+      </p:nvGrpSpPr>
+      <p:grpSpPr>
+        <a:xfrm>
+          <a:off x="0" y="0"/>
+          <a:ext cx="0" cy="0"/>
+          <a:chOff x="0" y="0"/>
+          <a:chExt cx="0" cy="0"/>
+        </a:xfrm>
+      </p:grpSpPr>
+      <p:sp>
+        <p:nvSpPr>
+          <p:cNvPr id="13" name="TextBox 12"/>
+          <p:cNvSpPr txBox="1"/>
+          <p:nvPr/>
+        </p:nvSpPr>
+        <p:spPr>
+          <a:xfrm>
+            <a:off x="467544" y="973172"/>
+            <a:ext cx="7287572" cy="2123658"/>
+          </a:xfrm>
+          <a:prstGeom prst="rect">
+            <a:avLst/>
+          </a:prstGeom>
+          <a:noFill/>
+        </p:spPr>
+        <p:txBody>
+          <a:bodyPr wrap="none" rtlCol="0">
+            <a:spAutoFit/>
+          </a:bodyPr>
+          <a:lstStyle/>
+          <a:p>
+            <a:r>
+              <a:rPr lang="en-GB" sz="4400" dirty="0" smtClean="0">
+                <a:latin typeface="Courier New" panose="02070309020205020404" pitchFamily="49" charset="0"/>
+                <a:cs typeface="Courier New" panose="02070309020205020404" pitchFamily="49" charset="0"/>
+              </a:rPr>
+              <a:t>Int </a:t>
+            </a:r>
+            <a:r>
+              <a:rPr lang="en-GB" sz="4400" dirty="0" smtClean="0">
+                <a:solidFill>
+                  <a:srgbClr val="FF0000"/>
+                </a:solidFill>
+                <a:latin typeface="Courier New" panose="02070309020205020404" pitchFamily="49" charset="0"/>
+                <a:cs typeface="Courier New" panose="02070309020205020404" pitchFamily="49" charset="0"/>
+              </a:rPr>
+              <a:t>-&gt;</a:t>
+            </a:r>
+            <a:r>
+              <a:rPr lang="en-GB" sz="4400" dirty="0" smtClean="0">
+                <a:latin typeface="Courier New" panose="02070309020205020404" pitchFamily="49" charset="0"/>
+                <a:cs typeface="Courier New" panose="02070309020205020404" pitchFamily="49" charset="0"/>
+              </a:rPr>
+              <a:t> Bool</a:t>
+            </a:r>
+          </a:p>
+          <a:p>
+            <a:r>
+              <a:rPr lang="en-GB" sz="4400" dirty="0" smtClean="0">
+                <a:latin typeface="Courier New" panose="02070309020205020404" pitchFamily="49" charset="0"/>
+                <a:cs typeface="Courier New" panose="02070309020205020404" pitchFamily="49" charset="0"/>
+              </a:rPr>
+              <a:t>Char </a:t>
+            </a:r>
+            <a:r>
+              <a:rPr lang="en-GB" sz="4400" dirty="0" smtClean="0">
+                <a:solidFill>
+                  <a:srgbClr val="FF0000"/>
+                </a:solidFill>
+                <a:latin typeface="Courier New" panose="02070309020205020404" pitchFamily="49" charset="0"/>
+                <a:cs typeface="Courier New" panose="02070309020205020404" pitchFamily="49" charset="0"/>
+              </a:rPr>
+              <a:t>-&gt;</a:t>
+            </a:r>
+            <a:r>
+              <a:rPr lang="en-GB" sz="4400" dirty="0" smtClean="0">
+                <a:latin typeface="Courier New" panose="02070309020205020404" pitchFamily="49" charset="0"/>
+                <a:cs typeface="Courier New" panose="02070309020205020404" pitchFamily="49" charset="0"/>
+              </a:rPr>
+              <a:t> Int</a:t>
+            </a:r>
+          </a:p>
+          <a:p>
+            <a:r>
+              <a:rPr lang="en-GB" sz="4400" dirty="0" smtClean="0">
+                <a:latin typeface="Courier New" panose="02070309020205020404" pitchFamily="49" charset="0"/>
+                <a:cs typeface="Courier New" panose="02070309020205020404" pitchFamily="49" charset="0"/>
+              </a:rPr>
+              <a:t>Int </a:t>
+            </a:r>
+            <a:r>
+              <a:rPr lang="en-GB" sz="4400" dirty="0" smtClean="0">
+                <a:solidFill>
+                  <a:srgbClr val="FF0000"/>
+                </a:solidFill>
+                <a:latin typeface="Courier New" panose="02070309020205020404" pitchFamily="49" charset="0"/>
+                <a:cs typeface="Courier New" panose="02070309020205020404" pitchFamily="49" charset="0"/>
+              </a:rPr>
+              <a:t>-&gt;</a:t>
+            </a:r>
+            <a:r>
+              <a:rPr lang="en-GB" sz="4400" dirty="0" smtClean="0">
+                <a:latin typeface="Courier New" panose="02070309020205020404" pitchFamily="49" charset="0"/>
+                <a:cs typeface="Courier New" panose="02070309020205020404" pitchFamily="49" charset="0"/>
+              </a:rPr>
+              <a:t> [Char] </a:t>
+            </a:r>
+            <a:r>
+              <a:rPr lang="en-GB" sz="4400" dirty="0" smtClean="0">
+                <a:solidFill>
+                  <a:srgbClr val="FF0000"/>
+                </a:solidFill>
+                <a:latin typeface="Courier New" panose="02070309020205020404" pitchFamily="49" charset="0"/>
+                <a:cs typeface="Courier New" panose="02070309020205020404" pitchFamily="49" charset="0"/>
+              </a:rPr>
+              <a:t>-&gt;</a:t>
+            </a:r>
+            <a:r>
+              <a:rPr lang="en-GB" sz="4400" dirty="0" smtClean="0">
+                <a:latin typeface="Courier New" panose="02070309020205020404" pitchFamily="49" charset="0"/>
+                <a:cs typeface="Courier New" panose="02070309020205020404" pitchFamily="49" charset="0"/>
+              </a:rPr>
+              <a:t> Char</a:t>
+            </a:r>
+          </a:p>
+        </p:txBody>
+      </p:sp>
+    </p:spTree>
+    <p:extLst>
+      <p:ext uri="{BB962C8B-B14F-4D97-AF65-F5344CB8AC3E}">
+        <p14:creationId xmlns:p14="http://schemas.microsoft.com/office/powerpoint/2010/main" val="1074749852"/>
+      </p:ext>
+    </p:extLst>
+  </p:cSld>
+  <p:clrMapOvr>
+    <a:masterClrMapping/>
+  </p:clrMapOvr>
+  <p:timing>
+    <p:tnLst>
+      <p:par>
+        <p:cTn id="1" dur="indefinite" restart="never" nodeType="tmRoot"/>
+      </p:par>
+    </p:tnLst>
   </p:timing>
 </p:sld>
 </file>
@@ -7713,6 +8453,48 @@
               <a:t>filter odd [1..5]</a:t>
             </a:r>
             <a:endParaRPr lang="en-GB" sz="4400" dirty="0">
+              <a:latin typeface="Courier New" panose="02070309020205020404" pitchFamily="49" charset="0"/>
+              <a:cs typeface="Courier New" panose="02070309020205020404" pitchFamily="49" charset="0"/>
+            </a:endParaRPr>
+          </a:p>
+        </p:txBody>
+      </p:sp>
+      <p:sp>
+        <p:nvSpPr>
+          <p:cNvPr id="9" name="TextBox 8"/>
+          <p:cNvSpPr txBox="1"/>
+          <p:nvPr/>
+        </p:nvSpPr>
+        <p:spPr>
+          <a:xfrm>
+            <a:off x="5476082" y="5877272"/>
+            <a:ext cx="2552302" cy="769441"/>
+          </a:xfrm>
+          <a:prstGeom prst="rect">
+            <a:avLst/>
+          </a:prstGeom>
+          <a:noFill/>
+        </p:spPr>
+        <p:txBody>
+          <a:bodyPr wrap="none" rtlCol="0">
+            <a:spAutoFit/>
+          </a:bodyPr>
+          <a:lstStyle/>
+          <a:p>
+            <a:r>
+              <a:rPr lang="en-GB" sz="4400" dirty="0" smtClean="0">
+                <a:solidFill>
+                  <a:srgbClr val="0070C0"/>
+                </a:solidFill>
+                <a:latin typeface="Courier New" panose="02070309020205020404" pitchFamily="49" charset="0"/>
+                <a:cs typeface="Courier New" panose="02070309020205020404" pitchFamily="49" charset="0"/>
+              </a:rPr>
+              <a:t>[1,3,5]</a:t>
+            </a:r>
+            <a:endParaRPr lang="en-GB" sz="4400" dirty="0">
+              <a:solidFill>
+                <a:srgbClr val="0070C0"/>
+              </a:solidFill>
               <a:latin typeface="Courier New" panose="02070309020205020404" pitchFamily="49" charset="0"/>
               <a:cs typeface="Courier New" panose="02070309020205020404" pitchFamily="49" charset="0"/>
             </a:endParaRPr>
@@ -7872,6 +8654,51 @@
                       </p:childTnLst>
                     </p:cTn>
                   </p:par>
+                  <p:par>
+                    <p:cTn id="15" fill="hold">
+                      <p:stCondLst>
+                        <p:cond delay="indefinite"/>
+                      </p:stCondLst>
+                      <p:childTnLst>
+                        <p:par>
+                          <p:cTn id="16" fill="hold">
+                            <p:stCondLst>
+                              <p:cond delay="0"/>
+                            </p:stCondLst>
+                            <p:childTnLst>
+                              <p:par>
+                                <p:cTn id="17" presetID="1" presetClass="entr" presetSubtype="0" fill="hold" grpId="0" nodeType="clickEffect">
+                                  <p:stCondLst>
+                                    <p:cond delay="0"/>
+                                  </p:stCondLst>
+                                  <p:childTnLst>
+                                    <p:set>
+                                      <p:cBhvr>
+                                        <p:cTn id="18" dur="1" fill="hold">
+                                          <p:stCondLst>
+                                            <p:cond delay="0"/>
+                                          </p:stCondLst>
+                                        </p:cTn>
+                                        <p:tgtEl>
+                                          <p:spTgt spid="9"/>
+                                        </p:tgtEl>
+                                        <p:attrNameLst>
+                                          <p:attrName>style.visibility</p:attrName>
+                                        </p:attrNameLst>
+                                      </p:cBhvr>
+                                      <p:to>
+                                        <p:strVal val="visible"/>
+                                      </p:to>
+                                    </p:set>
+                                  </p:childTnLst>
+                                </p:cTn>
+                              </p:par>
+                            </p:childTnLst>
+                          </p:cTn>
+                        </p:par>
+                      </p:childTnLst>
+                    </p:cTn>
+                  </p:par>
                 </p:childTnLst>
               </p:cTn>
               <p:prevCondLst>
@@ -7897,12 +8724,236 @@
       <p:bldP spid="6" grpId="0"/>
       <p:bldP spid="7" grpId="0"/>
       <p:bldP spid="8" grpId="0"/>
+      <p:bldP spid="9" grpId="0"/>
     </p:bldLst>
   </p:timing>
 </p:sld>
 </file>
 
 <file path=ppt/slides/slide20.xml><?xml version="1.0" encoding="utf-8"?>
+<p:sld xmlns:a="http://schemas.openxmlformats.org/drawingml/2006/main" xmlns:r="http://schemas.openxmlformats.org/officeDocument/2006/relationships" xmlns:p="http://schemas.openxmlformats.org/presentationml/2006/main">
+  <p:cSld>
+    <p:spTree>
+      <p:nvGrpSpPr>
+        <p:cNvPr id="1" name=""/>
+        <p:cNvGrpSpPr/>
+        <p:nvPr/>
+      </p:nvGrpSpPr>
+      <p:grpSpPr>
+        <a:xfrm>
+          <a:off x="0" y="0"/>
+          <a:ext cx="0" cy="0"/>
+          <a:chOff x="0" y="0"/>
+          <a:chExt cx="0" cy="0"/>
+        </a:xfrm>
+      </p:grpSpPr>
+      <p:sp>
+        <p:nvSpPr>
+          <p:cNvPr id="11" name="TextBox 10"/>
+          <p:cNvSpPr txBox="1"/>
+          <p:nvPr/>
+        </p:nvSpPr>
+        <p:spPr>
+          <a:xfrm>
+            <a:off x="496392" y="2132856"/>
+            <a:ext cx="7964040" cy="1446550"/>
+          </a:xfrm>
+          <a:prstGeom prst="rect">
+            <a:avLst/>
+          </a:prstGeom>
+          <a:noFill/>
+        </p:spPr>
+        <p:txBody>
+          <a:bodyPr wrap="none" rtlCol="0">
+            <a:spAutoFit/>
+          </a:bodyPr>
+          <a:lstStyle/>
+          <a:p>
+            <a:r>
+              <a:rPr lang="en-GB" sz="4400" dirty="0" smtClean="0">
+                <a:latin typeface="Courier New" panose="02070309020205020404" pitchFamily="49" charset="0"/>
+                <a:cs typeface="Courier New" panose="02070309020205020404" pitchFamily="49" charset="0"/>
+              </a:rPr>
+              <a:t>sum [] = 0</a:t>
+            </a:r>
+          </a:p>
+          <a:p>
+            <a:r>
+              <a:rPr lang="en-GB" sz="4400" dirty="0" smtClean="0">
+                <a:latin typeface="Courier New" panose="02070309020205020404" pitchFamily="49" charset="0"/>
+                <a:cs typeface="Courier New" panose="02070309020205020404" pitchFamily="49" charset="0"/>
+              </a:rPr>
+              <a:t>sum (x:xs) = x + sum xs</a:t>
+            </a:r>
+            <a:endParaRPr lang="en-GB" sz="4400" dirty="0">
+              <a:latin typeface="Courier New" panose="02070309020205020404" pitchFamily="49" charset="0"/>
+              <a:cs typeface="Courier New" panose="02070309020205020404" pitchFamily="49" charset="0"/>
+            </a:endParaRPr>
+          </a:p>
+        </p:txBody>
+      </p:sp>
+      <p:sp>
+        <p:nvSpPr>
+          <p:cNvPr id="5" name="TextBox 4"/>
+          <p:cNvSpPr txBox="1"/>
+          <p:nvPr/>
+        </p:nvSpPr>
+        <p:spPr>
+          <a:xfrm>
+            <a:off x="496392" y="1422089"/>
+            <a:ext cx="6611105" cy="769441"/>
+          </a:xfrm>
+          <a:prstGeom prst="rect">
+            <a:avLst/>
+          </a:prstGeom>
+          <a:noFill/>
+        </p:spPr>
+        <p:txBody>
+          <a:bodyPr wrap="none" rtlCol="0">
+            <a:spAutoFit/>
+          </a:bodyPr>
+          <a:lstStyle/>
+          <a:p>
+            <a:r>
+              <a:rPr lang="en-GB" sz="4400" dirty="0" smtClean="0">
+                <a:latin typeface="Courier New" panose="02070309020205020404" pitchFamily="49" charset="0"/>
+                <a:cs typeface="Courier New" panose="02070309020205020404" pitchFamily="49" charset="0"/>
+              </a:rPr>
+              <a:t>sum </a:t>
+            </a:r>
+            <a:r>
+              <a:rPr lang="en-GB" sz="4400" dirty="0" smtClean="0">
+                <a:solidFill>
+                  <a:srgbClr val="FF0000"/>
+                </a:solidFill>
+                <a:latin typeface="Courier New" panose="02070309020205020404" pitchFamily="49" charset="0"/>
+                <a:cs typeface="Courier New" panose="02070309020205020404" pitchFamily="49" charset="0"/>
+              </a:rPr>
+              <a:t>::</a:t>
+            </a:r>
+            <a:r>
+              <a:rPr lang="en-GB" sz="4400" dirty="0" smtClean="0">
+                <a:latin typeface="Courier New" panose="02070309020205020404" pitchFamily="49" charset="0"/>
+                <a:cs typeface="Courier New" panose="02070309020205020404" pitchFamily="49" charset="0"/>
+              </a:rPr>
+              <a:t> [Int] </a:t>
+            </a:r>
+            <a:r>
+              <a:rPr lang="en-GB" sz="4400" dirty="0" smtClean="0">
+                <a:solidFill>
+                  <a:srgbClr val="FF0000"/>
+                </a:solidFill>
+                <a:latin typeface="Courier New" panose="02070309020205020404" pitchFamily="49" charset="0"/>
+                <a:cs typeface="Courier New" panose="02070309020205020404" pitchFamily="49" charset="0"/>
+              </a:rPr>
+              <a:t>-&gt;</a:t>
+            </a:r>
+            <a:r>
+              <a:rPr lang="en-GB" sz="4400" dirty="0" smtClean="0">
+                <a:latin typeface="Courier New" panose="02070309020205020404" pitchFamily="49" charset="0"/>
+                <a:cs typeface="Courier New" panose="02070309020205020404" pitchFamily="49" charset="0"/>
+              </a:rPr>
+              <a:t> Int</a:t>
+            </a:r>
+            <a:endParaRPr lang="en-GB" sz="4400" dirty="0">
+              <a:latin typeface="Courier New" panose="02070309020205020404" pitchFamily="49" charset="0"/>
+              <a:cs typeface="Courier New" panose="02070309020205020404" pitchFamily="49" charset="0"/>
+            </a:endParaRPr>
+          </a:p>
+        </p:txBody>
+      </p:sp>
+    </p:spTree>
+    <p:extLst>
+      <p:ext uri="{BB962C8B-B14F-4D97-AF65-F5344CB8AC3E}">
+        <p14:creationId xmlns:p14="http://schemas.microsoft.com/office/powerpoint/2010/main" val="1976949730"/>
+      </p:ext>
+    </p:extLst>
+  </p:cSld>
+  <p:clrMapOvr>
+    <a:masterClrMapping/>
+  </p:clrMapOvr>
+  <p:timing>
+    <p:tnLst>
+      <p:par>
+        <p:cTn id="1" dur="indefinite" restart="never" nodeType="tmRoot">
+          <p:childTnLst>
+            <p:seq concurrent="1" nextAc="seek">
+              <p:cTn id="2" dur="indefinite" nodeType="mainSeq">
+                <p:childTnLst>
+                  <p:par>
+                    <p:cTn id="3" fill="hold">
+                      <p:stCondLst>
+                        <p:cond delay="indefinite"/>
+                      </p:stCondLst>
+                      <p:childTnLst>
+                        <p:par>
+                          <p:cTn id="4" fill="hold">
+                            <p:stCondLst>
+                              <p:cond delay="0"/>
+                            </p:stCondLst>
+                            <p:childTnLst>
+                              <p:par>
+                                <p:cTn id="5" presetID="1" presetClass="entr" presetSubtype="0" fill="hold" grpId="0" nodeType="clickEffect">
+                                  <p:stCondLst>
+                                    <p:cond delay="0"/>
+                                  </p:stCondLst>
+                                  <p:childTnLst>
+                                    <p:set>
+                                      <p:cBhvr>
+                                        <p:cTn id="6" dur="1" fill="hold">
+                                          <p:stCondLst>
+                                            <p:cond delay="0"/>
+                                          </p:stCondLst>
+                                        </p:cTn>
+                                        <p:tgtEl>
+                                          <p:spTgt spid="5"/>
+                                        </p:tgtEl>
+                                        <p:attrNameLst>
+                                          <p:attrName>style.visibility</p:attrName>
+                                        </p:attrNameLst>
+                                      </p:cBhvr>
+                                      <p:to>
+                                        <p:strVal val="visible"/>
+                                      </p:to>
+                                    </p:set>
+                                  </p:childTnLst>
+                                </p:cTn>
+                              </p:par>
+                            </p:childTnLst>
+                          </p:cTn>
+                        </p:par>
+                      </p:childTnLst>
+                    </p:cTn>
+                  </p:par>
+                </p:childTnLst>
+              </p:cTn>
+              <p:prevCondLst>
+                <p:cond evt="onPrev" delay="0">
+                  <p:tgtEl>
+                    <p:sldTgt/>
+                  </p:tgtEl>
+                </p:cond>
+              </p:prevCondLst>
+              <p:nextCondLst>
+                <p:cond evt="onNext" delay="0">
+                  <p:tgtEl>
+                    <p:sldTgt/>
+                  </p:tgtEl>
+                </p:cond>
+              </p:nextCondLst>
+            </p:seq>
+          </p:childTnLst>
+        </p:cTn>
+      </p:par>
+    </p:tnLst>
+    <p:bldLst>
+      <p:bldP spid="5" grpId="0"/>
+    </p:bldLst>
+  </p:timing>
+</p:sld>
+</file>
+
+<file path=ppt/slides/slide21.xml><?xml version="1.0" encoding="utf-8"?>
 <p:sld xmlns:a="http://schemas.openxmlformats.org/drawingml/2006/main" xmlns:r="http://schemas.openxmlformats.org/officeDocument/2006/relationships" xmlns:p="http://schemas.openxmlformats.org/presentationml/2006/main">
   <p:cSld>
     <p:spTree>
@@ -8471,7 +9522,7 @@
 </p:sld>
 </file>
 
-<file path=ppt/slides/slide21.xml><?xml version="1.0" encoding="utf-8"?>
+<file path=ppt/slides/slide22.xml><?xml version="1.0" encoding="utf-8"?>
 <p:sld xmlns:a="http://schemas.openxmlformats.org/drawingml/2006/main" xmlns:r="http://schemas.openxmlformats.org/officeDocument/2006/relationships" xmlns:p="http://schemas.openxmlformats.org/presentationml/2006/main">
   <p:cSld>
     <p:spTree>
@@ -9057,7 +10108,7 @@
 </p:sld>
 </file>
 
-<file path=ppt/slides/slide22.xml><?xml version="1.0" encoding="utf-8"?>
+<file path=ppt/slides/slide23.xml><?xml version="1.0" encoding="utf-8"?>
 <p:sld xmlns:a="http://schemas.openxmlformats.org/drawingml/2006/main" xmlns:r="http://schemas.openxmlformats.org/officeDocument/2006/relationships" xmlns:p="http://schemas.openxmlformats.org/presentationml/2006/main">
   <p:cSld>
     <p:spTree>
@@ -9680,7 +10731,7 @@
 </p:sld>
 </file>
 
-<file path=ppt/slides/slide23.xml><?xml version="1.0" encoding="utf-8"?>
+<file path=ppt/slides/slide24.xml><?xml version="1.0" encoding="utf-8"?>
 <p:sld xmlns:a="http://schemas.openxmlformats.org/drawingml/2006/main" xmlns:r="http://schemas.openxmlformats.org/officeDocument/2006/relationships" xmlns:p="http://schemas.openxmlformats.org/presentationml/2006/main">
   <p:cSld>
     <p:spTree>
@@ -11787,7 +12838,7 @@
         </p:nvSpPr>
         <p:spPr>
           <a:xfrm>
-            <a:off x="323528" y="1772816"/>
+            <a:off x="357354" y="3453680"/>
             <a:ext cx="6272871" cy="1446550"/>
           </a:xfrm>
           <a:prstGeom prst="rect">
@@ -11849,7 +12900,7 @@
         </p:nvSpPr>
         <p:spPr>
           <a:xfrm>
-            <a:off x="3347864" y="3068960"/>
+            <a:off x="3381690" y="4749824"/>
             <a:ext cx="5596404" cy="769441"/>
           </a:xfrm>
           <a:prstGeom prst="rect">
@@ -11880,6 +12931,41 @@
               <a:latin typeface="Courier New" panose="02070309020205020404" pitchFamily="49" charset="0"/>
               <a:cs typeface="Courier New" panose="02070309020205020404" pitchFamily="49" charset="0"/>
             </a:endParaRPr>
+          </a:p>
+        </p:txBody>
+      </p:sp>
+      <p:sp>
+        <p:nvSpPr>
+          <p:cNvPr id="2" name="TextBox 1"/>
+          <p:cNvSpPr txBox="1"/>
+          <p:nvPr/>
+        </p:nvSpPr>
+        <p:spPr>
+          <a:xfrm>
+            <a:off x="2530344" y="1549241"/>
+            <a:ext cx="2028119" cy="1015663"/>
+          </a:xfrm>
+          <a:prstGeom prst="rect">
+            <a:avLst/>
+          </a:prstGeom>
+          <a:noFill/>
+        </p:spPr>
+        <p:txBody>
+          <a:bodyPr wrap="none" rtlCol="0">
+            <a:spAutoFit/>
+          </a:bodyPr>
+          <a:lstStyle/>
+          <a:p>
+            <a:r>
+              <a:rPr lang="en-GB" sz="6000" i="1" dirty="0" smtClean="0">
+                <a:solidFill>
+                  <a:srgbClr val="FF0000"/>
+                </a:solidFill>
+                <a:latin typeface="+mj-lt"/>
+                <a:cs typeface="Courier New" panose="02070309020205020404" pitchFamily="49" charset="0"/>
+              </a:rPr>
+              <a:t>Demo</a:t>
+            </a:r>
           </a:p>
         </p:txBody>
       </p:sp>
@@ -11927,7 +13013,7 @@
                                           </p:stCondLst>
                                         </p:cTn>
                                         <p:tgtEl>
-                                          <p:spTgt spid="5"/>
+                                          <p:spTgt spid="2"/>
                                         </p:tgtEl>
                                         <p:attrNameLst>
                                           <p:attrName>style.visibility</p:attrName>
@@ -11967,6 +13053,51 @@
                                     <p:set>
                                       <p:cBhvr>
                                         <p:cTn id="10" dur="1" fill="hold">
+                                          <p:stCondLst>
+                                            <p:cond delay="0"/>
+                                          </p:stCondLst>
+                                        </p:cTn>
+                                        <p:tgtEl>
+                                          <p:spTgt spid="5"/>
+                                        </p:tgtEl>
+                                        <p:attrNameLst>
+                                          <p:attrName>style.visibility</p:attrName>
+                                        </p:attrNameLst>
+                                      </p:cBhvr>
+                                      <p:to>
+                                        <p:strVal val="visible"/>
+                                      </p:to>
+                                    </p:set>
+                                  </p:childTnLst>
+                                </p:cTn>
+                              </p:par>
+                            </p:childTnLst>
+                          </p:cTn>
+                        </p:par>
+                      </p:childTnLst>
+                    </p:cTn>
+                  </p:par>
+                  <p:par>
+                    <p:cTn id="11" fill="hold">
+                      <p:stCondLst>
+                        <p:cond delay="indefinite"/>
+                      </p:stCondLst>
+                      <p:childTnLst>
+                        <p:par>
+                          <p:cTn id="12" fill="hold">
+                            <p:stCondLst>
+                              <p:cond delay="0"/>
+                            </p:stCondLst>
+                            <p:childTnLst>
+                              <p:par>
+                                <p:cTn id="13" presetID="1" presetClass="entr" presetSubtype="0" fill="hold" grpId="0" nodeType="clickEffect">
+                                  <p:stCondLst>
+                                    <p:cond delay="0"/>
+                                  </p:stCondLst>
+                                  <p:childTnLst>
+                                    <p:set>
+                                      <p:cBhvr>
+                                        <p:cTn id="14" dur="1" fill="hold">
                                           <p:stCondLst>
                                             <p:cond delay="0"/>
                                           </p:stCondLst>
@@ -12015,6 +13146,7 @@
     <p:bldLst>
       <p:bldP spid="5" grpId="0"/>
       <p:bldP spid="6" grpId="0"/>
+      <p:bldP spid="2" grpId="0"/>
     </p:bldLst>
   </p:timing>
 </p:sld>
@@ -12787,4 +13919,289 @@
   <a:objectDefaults/>
   <a:extraClrSchemeLst/>
 </a:theme>
+</file>
+
+<file path=ppt/theme/theme3.xml><?xml version="1.0" encoding="utf-8"?>
+<a:theme xmlns:a="http://schemas.openxmlformats.org/drawingml/2006/main" name="Office Theme">
+  <a:themeElements>
+    <a:clrScheme name="Office">
+      <a:dk1>
+        <a:sysClr val="windowText" lastClr="000000"/>
+      </a:dk1>
+      <a:lt1>
+        <a:sysClr val="window" lastClr="FFFFFF"/>
+      </a:lt1>
+      <a:dk2>
+        <a:srgbClr val="1F497D"/>
+      </a:dk2>
+      <a:lt2>
+        <a:srgbClr val="EEECE1"/>
+      </a:lt2>
+      <a:accent1>
+        <a:srgbClr val="4F81BD"/>
+      </a:accent1>
+      <a:accent2>
+        <a:srgbClr val="C0504D"/>
+      </a:accent2>
+      <a:accent3>
+        <a:srgbClr val="9BBB59"/>
+      </a:accent3>
+      <a:accent4>
+        <a:srgbClr val="8064A2"/>
+      </a:accent4>
+      <a:accent5>
+        <a:srgbClr val="4BACC6"/>
+      </a:accent5>
+      <a:accent6>
+        <a:srgbClr val="F79646"/>
+      </a:accent6>
+      <a:hlink>
+        <a:srgbClr val="0000FF"/>
+      </a:hlink>
+      <a:folHlink>
+        <a:srgbClr val="800080"/>
+      </a:folHlink>
+    </a:clrScheme>
+    <a:fontScheme name="Office">
+      <a:majorFont>
+        <a:latin typeface="Calibri"/>
+        <a:ea typeface=""/>
+        <a:cs typeface=""/>
+        <a:font script="Jpan" typeface="ＭＳ Ｐゴシック"/>
+        <a:font script="Hang" typeface="맑은 고딕"/>
+        <a:font script="Hans" typeface="宋体"/>
+        <a:font script="Hant" typeface="新細明體"/>
+        <a:font script="Arab" typeface="Times New Roman"/>
+        <a:font script="Hebr" typeface="Times New Roman"/>
+        <a:font script="Thai" typeface="Angsana New"/>
+        <a:font script="Ethi" typeface="Nyala"/>
+        <a:font script="Beng" typeface="Vrinda"/>
+        <a:font script="Gujr" typeface="Shruti"/>
+        <a:font script="Khmr" typeface="MoolBoran"/>
+        <a:font script="Knda" typeface="Tunga"/>
+        <a:font script="Guru" typeface="Raavi"/>
+        <a:font script="Cans" typeface="Euphemia"/>
+        <a:font script="Cher" typeface="Plantagenet Cherokee"/>
+        <a:font script="Yiii" typeface="Microsoft Yi Baiti"/>
+        <a:font script="Tibt" typeface="Microsoft Himalaya"/>
+        <a:font script="Thaa" typeface="MV Boli"/>
+        <a:font script="Deva" typeface="Mangal"/>
+        <a:font script="Telu" typeface="Gautami"/>
+        <a:font script="Taml" typeface="Latha"/>
+        <a:font script="Syrc" typeface="Estrangelo Edessa"/>
+        <a:font script="Orya" typeface="Kalinga"/>
+        <a:font script="Mlym" typeface="Kartika"/>
+        <a:font script="Laoo" typeface="DokChampa"/>
+        <a:font script="Sinh" typeface="Iskoola Pota"/>
+        <a:font script="Mong" typeface="Mongolian Baiti"/>
+        <a:font script="Viet" typeface="Times New Roman"/>
+        <a:font script="Uigh" typeface="Microsoft Uighur"/>
+        <a:font script="Geor" typeface="Sylfaen"/>
+      </a:majorFont>
+      <a:minorFont>
+        <a:latin typeface="Calibri"/>
+        <a:ea typeface=""/>
+        <a:cs typeface=""/>
+        <a:font script="Jpan" typeface="ＭＳ Ｐゴシック"/>
+        <a:font script="Hang" typeface="맑은 고딕"/>
+        <a:font script="Hans" typeface="宋体"/>
+        <a:font script="Hant" typeface="新細明體"/>
+        <a:font script="Arab" typeface="Arial"/>
+        <a:font script="Hebr" typeface="Arial"/>
+        <a:font script="Thai" typeface="Cordia New"/>
+        <a:font script="Ethi" typeface="Nyala"/>
+        <a:font script="Beng" typeface="Vrinda"/>
+        <a:font script="Gujr" typeface="Shruti"/>
+        <a:font script="Khmr" typeface="DaunPenh"/>
+        <a:font script="Knda" typeface="Tunga"/>
+        <a:font script="Guru" typeface="Raavi"/>
+        <a:font script="Cans" typeface="Euphemia"/>
+        <a:font script="Cher" typeface="Plantagenet Cherokee"/>
+        <a:font script="Yiii" typeface="Microsoft Yi Baiti"/>
+        <a:font script="Tibt" typeface="Microsoft Himalaya"/>
+        <a:font script="Thaa" typeface="MV Boli"/>
+        <a:font script="Deva" typeface="Mangal"/>
+        <a:font script="Telu" typeface="Gautami"/>
+        <a:font script="Taml" typeface="Latha"/>
+        <a:font script="Syrc" typeface="Estrangelo Edessa"/>
+        <a:font script="Orya" typeface="Kalinga"/>
+        <a:font script="Mlym" typeface="Kartika"/>
+        <a:font script="Laoo" typeface="DokChampa"/>
+        <a:font script="Sinh" typeface="Iskoola Pota"/>
+        <a:font script="Mong" typeface="Mongolian Baiti"/>
+        <a:font script="Viet" typeface="Arial"/>
+        <a:font script="Uigh" typeface="Microsoft Uighur"/>
+        <a:font script="Geor" typeface="Sylfaen"/>
+      </a:minorFont>
+    </a:fontScheme>
+    <a:fmtScheme name="Office">
+      <a:fillStyleLst>
+        <a:solidFill>
+          <a:schemeClr val="phClr"/>
+        </a:solidFill>
+        <a:gradFill rotWithShape="1">
+          <a:gsLst>
+            <a:gs pos="0">
+              <a:schemeClr val="phClr">
+                <a:tint val="50000"/>
+                <a:satMod val="300000"/>
+              </a:schemeClr>
+            </a:gs>
+            <a:gs pos="35000">
+              <a:schemeClr val="phClr">
+                <a:tint val="37000"/>
+                <a:satMod val="300000"/>
+              </a:schemeClr>
+            </a:gs>
+            <a:gs pos="100000">
+              <a:schemeClr val="phClr">
+                <a:tint val="15000"/>
+                <a:satMod val="350000"/>
+              </a:schemeClr>
+            </a:gs>
+          </a:gsLst>
+          <a:lin ang="16200000" scaled="1"/>
+        </a:gradFill>
+        <a:gradFill rotWithShape="1">
+          <a:gsLst>
+            <a:gs pos="0">
+              <a:schemeClr val="phClr">
+                <a:shade val="51000"/>
+                <a:satMod val="130000"/>
+              </a:schemeClr>
+            </a:gs>
+            <a:gs pos="80000">
+              <a:schemeClr val="phClr">
+                <a:shade val="93000"/>
+                <a:satMod val="130000"/>
+              </a:schemeClr>
+            </a:gs>
+            <a:gs pos="100000">
+              <a:schemeClr val="phClr">
+                <a:shade val="94000"/>
+                <a:satMod val="135000"/>
+              </a:schemeClr>
+            </a:gs>
+          </a:gsLst>
+          <a:lin ang="16200000" scaled="0"/>
+        </a:gradFill>
+      </a:fillStyleLst>
+      <a:lnStyleLst>
+        <a:ln w="9525" cap="flat" cmpd="sng" algn="ctr">
+          <a:solidFill>
+            <a:schemeClr val="phClr">
+              <a:shade val="95000"/>
+              <a:satMod val="105000"/>
+            </a:schemeClr>
+          </a:solidFill>
+          <a:prstDash val="solid"/>
+        </a:ln>
+        <a:ln w="25400" cap="flat" cmpd="sng" algn="ctr">
+          <a:solidFill>
+            <a:schemeClr val="phClr"/>
+          </a:solidFill>
+          <a:prstDash val="solid"/>
+        </a:ln>
+        <a:ln w="38100" cap="flat" cmpd="sng" algn="ctr">
+          <a:solidFill>
+            <a:schemeClr val="phClr"/>
+          </a:solidFill>
+          <a:prstDash val="solid"/>
+        </a:ln>
+      </a:lnStyleLst>
+      <a:effectStyleLst>
+        <a:effectStyle>
+          <a:effectLst>
+            <a:outerShdw blurRad="40000" dist="20000" dir="5400000" rotWithShape="0">
+              <a:srgbClr val="000000">
+                <a:alpha val="38000"/>
+              </a:srgbClr>
+            </a:outerShdw>
+          </a:effectLst>
+        </a:effectStyle>
+        <a:effectStyle>
+          <a:effectLst>
+            <a:outerShdw blurRad="40000" dist="23000" dir="5400000" rotWithShape="0">
+              <a:srgbClr val="000000">
+                <a:alpha val="35000"/>
+              </a:srgbClr>
+            </a:outerShdw>
+          </a:effectLst>
+        </a:effectStyle>
+        <a:effectStyle>
+          <a:effectLst>
+            <a:outerShdw blurRad="40000" dist="23000" dir="5400000" rotWithShape="0">
+              <a:srgbClr val="000000">
+                <a:alpha val="35000"/>
+              </a:srgbClr>
+            </a:outerShdw>
+          </a:effectLst>
+          <a:scene3d>
+            <a:camera prst="orthographicFront">
+              <a:rot lat="0" lon="0" rev="0"/>
+            </a:camera>
+            <a:lightRig rig="threePt" dir="t">
+              <a:rot lat="0" lon="0" rev="1200000"/>
+            </a:lightRig>
+          </a:scene3d>
+          <a:sp3d>
+            <a:bevelT w="63500" h="25400"/>
+          </a:sp3d>
+        </a:effectStyle>
+      </a:effectStyleLst>
+      <a:bgFillStyleLst>
+        <a:solidFill>
+          <a:schemeClr val="phClr"/>
+        </a:solidFill>
+        <a:gradFill rotWithShape="1">
+          <a:gsLst>
+            <a:gs pos="0">
+              <a:schemeClr val="phClr">
+                <a:tint val="40000"/>
+                <a:satMod val="350000"/>
+              </a:schemeClr>
+            </a:gs>
+            <a:gs pos="40000">
+              <a:schemeClr val="phClr">
+                <a:tint val="45000"/>
+                <a:shade val="99000"/>
+                <a:satMod val="350000"/>
+              </a:schemeClr>
+            </a:gs>
+            <a:gs pos="100000">
+              <a:schemeClr val="phClr">
+                <a:shade val="20000"/>
+                <a:satMod val="255000"/>
+              </a:schemeClr>
+            </a:gs>
+          </a:gsLst>
+          <a:path path="circle">
+            <a:fillToRect l="50000" t="-80000" r="50000" b="180000"/>
+          </a:path>
+        </a:gradFill>
+        <a:gradFill rotWithShape="1">
+          <a:gsLst>
+            <a:gs pos="0">
+              <a:schemeClr val="phClr">
+                <a:tint val="80000"/>
+                <a:satMod val="300000"/>
+              </a:schemeClr>
+            </a:gs>
+            <a:gs pos="100000">
+              <a:schemeClr val="phClr">
+                <a:shade val="30000"/>
+                <a:satMod val="200000"/>
+              </a:schemeClr>
+            </a:gs>
+          </a:gsLst>
+          <a:path path="circle">
+            <a:fillToRect l="50000" t="50000" r="50000" b="50000"/>
+          </a:path>
+        </a:gradFill>
+      </a:bgFillStyleLst>
+    </a:fmtScheme>
+  </a:themeElements>
+  <a:objectDefaults/>
+  <a:extraClrSchemeLst/>
+</a:theme>
 </file>
</xml_diff>

<commit_message>
Add a section on I/O
</commit_message>
<xml_diff>
--- a/beginning-haskell.pptx
+++ b/beginning-haskell.pptx
@@ -5,10 +5,10 @@
     <p:sldMasterId id="2147483648" r:id="rId1"/>
   </p:sldMasterIdLst>
   <p:notesMasterIdLst>
-    <p:notesMasterId r:id="rId26"/>
+    <p:notesMasterId r:id="rId30"/>
   </p:notesMasterIdLst>
   <p:handoutMasterIdLst>
-    <p:handoutMasterId r:id="rId27"/>
+    <p:handoutMasterId r:id="rId31"/>
   </p:handoutMasterIdLst>
   <p:sldIdLst>
     <p:sldId id="263" r:id="rId2"/>
@@ -35,6 +35,10 @@
     <p:sldId id="281" r:id="rId23"/>
     <p:sldId id="282" r:id="rId24"/>
     <p:sldId id="283" r:id="rId25"/>
+    <p:sldId id="286" r:id="rId26"/>
+    <p:sldId id="287" r:id="rId27"/>
+    <p:sldId id="285" r:id="rId28"/>
+    <p:sldId id="288" r:id="rId29"/>
   </p:sldIdLst>
   <p:sldSz cx="9144000" cy="6858000" type="screen4x3"/>
   <p:notesSz cx="6797675" cy="9926638"/>
@@ -909,6 +913,98 @@
             <a:fld id="{999CC533-FB79-4577-A6D0-2326348CB1C0}" type="slidenum">
               <a:rPr lang="en-GB" smtClean="0"/>
               <a:t>24</a:t>
+            </a:fld>
+            <a:endParaRPr lang="en-GB" dirty="0"/>
+          </a:p>
+        </p:txBody>
+      </p:sp>
+    </p:spTree>
+    <p:extLst>
+      <p:ext uri="{BB962C8B-B14F-4D97-AF65-F5344CB8AC3E}">
+        <p14:creationId xmlns:p14="http://schemas.microsoft.com/office/powerpoint/2010/main" val="4125636590"/>
+      </p:ext>
+    </p:extLst>
+  </p:cSld>
+  <p:clrMapOvr>
+    <a:masterClrMapping/>
+  </p:clrMapOvr>
+</p:notes>
+</file>
+
+<file path=ppt/notesSlides/notesSlide12.xml><?xml version="1.0" encoding="utf-8"?>
+<p:notes xmlns:a="http://schemas.openxmlformats.org/drawingml/2006/main" xmlns:r="http://schemas.openxmlformats.org/officeDocument/2006/relationships" xmlns:p="http://schemas.openxmlformats.org/presentationml/2006/main">
+  <p:cSld>
+    <p:spTree>
+      <p:nvGrpSpPr>
+        <p:cNvPr id="1" name=""/>
+        <p:cNvGrpSpPr/>
+        <p:nvPr/>
+      </p:nvGrpSpPr>
+      <p:grpSpPr>
+        <a:xfrm>
+          <a:off x="0" y="0"/>
+          <a:ext cx="0" cy="0"/>
+          <a:chOff x="0" y="0"/>
+          <a:chExt cx="0" cy="0"/>
+        </a:xfrm>
+      </p:grpSpPr>
+      <p:sp>
+        <p:nvSpPr>
+          <p:cNvPr id="2" name="Slide Image Placeholder 1"/>
+          <p:cNvSpPr>
+            <a:spLocks noGrp="1" noRot="1" noChangeAspect="1"/>
+          </p:cNvSpPr>
+          <p:nvPr>
+            <p:ph type="sldImg"/>
+          </p:nvPr>
+        </p:nvSpPr>
+        <p:spPr/>
+      </p:sp>
+      <p:sp>
+        <p:nvSpPr>
+          <p:cNvPr id="3" name="Notes Placeholder 2"/>
+          <p:cNvSpPr>
+            <a:spLocks noGrp="1"/>
+          </p:cNvSpPr>
+          <p:nvPr>
+            <p:ph type="body" idx="1"/>
+          </p:nvPr>
+        </p:nvSpPr>
+        <p:spPr/>
+        <p:txBody>
+          <a:bodyPr/>
+          <a:lstStyle/>
+          <a:p>
+            <a:r>
+              <a:rPr lang="en-GB" dirty="0" smtClean="0"/>
+              <a:t>These slides accompany a two-hour “Beginning</a:t>
+            </a:r>
+            <a:r>
+              <a:rPr lang="en-GB" baseline="0" dirty="0" smtClean="0"/>
+              <a:t> Haskell” course.</a:t>
+            </a:r>
+            <a:endParaRPr lang="en-GB" dirty="0"/>
+          </a:p>
+        </p:txBody>
+      </p:sp>
+      <p:sp>
+        <p:nvSpPr>
+          <p:cNvPr id="4" name="Slide Number Placeholder 3"/>
+          <p:cNvSpPr>
+            <a:spLocks noGrp="1"/>
+          </p:cNvSpPr>
+          <p:nvPr>
+            <p:ph type="sldNum" sz="quarter" idx="10"/>
+          </p:nvPr>
+        </p:nvSpPr>
+        <p:spPr/>
+        <p:txBody>
+          <a:bodyPr/>
+          <a:lstStyle/>
+          <a:p>
+            <a:fld id="{999CC533-FB79-4577-A6D0-2326348CB1C0}" type="slidenum">
+              <a:rPr lang="en-GB" smtClean="0"/>
+              <a:t>25</a:t>
             </a:fld>
             <a:endParaRPr lang="en-GB" dirty="0"/>
           </a:p>
@@ -7712,13 +7808,6 @@
               </a:rPr>
               <a:t>])</a:t>
             </a:r>
-            <a:endParaRPr lang="en-GB" sz="3600" dirty="0" smtClean="0">
-              <a:solidFill>
-                <a:srgbClr val="FF0000"/>
-              </a:solidFill>
-              <a:latin typeface="Courier New" panose="02070309020205020404" pitchFamily="49" charset="0"/>
-              <a:cs typeface="Courier New" panose="02070309020205020404" pitchFamily="49" charset="0"/>
-            </a:endParaRPr>
           </a:p>
         </p:txBody>
       </p:sp>
@@ -7751,10 +7840,6 @@
               </a:rPr>
               <a:t>Set String</a:t>
             </a:r>
-            <a:endParaRPr lang="en-GB" sz="4400" dirty="0" smtClean="0">
-              <a:latin typeface="Courier New" panose="02070309020205020404" pitchFamily="49" charset="0"/>
-              <a:cs typeface="Courier New" panose="02070309020205020404" pitchFamily="49" charset="0"/>
-            </a:endParaRPr>
           </a:p>
         </p:txBody>
       </p:sp>
@@ -7787,10 +7872,6 @@
               </a:rPr>
               <a:t>Maybe Int</a:t>
             </a:r>
-            <a:endParaRPr lang="en-GB" sz="4400" dirty="0" smtClean="0">
-              <a:latin typeface="Courier New" panose="02070309020205020404" pitchFamily="49" charset="0"/>
-              <a:cs typeface="Courier New" panose="02070309020205020404" pitchFamily="49" charset="0"/>
-            </a:endParaRPr>
           </a:p>
         </p:txBody>
       </p:sp>
@@ -7826,13 +7907,6 @@
               </a:rPr>
               <a:t>Just 3    Nothing</a:t>
             </a:r>
-            <a:endParaRPr lang="en-GB" sz="4400" dirty="0" smtClean="0">
-              <a:solidFill>
-                <a:srgbClr val="0070C0"/>
-              </a:solidFill>
-              <a:latin typeface="Courier New" panose="02070309020205020404" pitchFamily="49" charset="0"/>
-              <a:cs typeface="Courier New" panose="02070309020205020404" pitchFamily="49" charset="0"/>
-            </a:endParaRPr>
           </a:p>
         </p:txBody>
       </p:sp>
@@ -10834,6 +10908,1748 @@
         <p:cTn id="1" dur="indefinite" restart="never" nodeType="tmRoot"/>
       </p:par>
     </p:tnLst>
+  </p:timing>
+</p:sld>
+</file>
+
+<file path=ppt/slides/slide25.xml><?xml version="1.0" encoding="utf-8"?>
+<p:sld xmlns:a="http://schemas.openxmlformats.org/drawingml/2006/main" xmlns:r="http://schemas.openxmlformats.org/officeDocument/2006/relationships" xmlns:p="http://schemas.openxmlformats.org/presentationml/2006/main">
+  <p:cSld>
+    <p:spTree>
+      <p:nvGrpSpPr>
+        <p:cNvPr id="1" name=""/>
+        <p:cNvGrpSpPr/>
+        <p:nvPr/>
+      </p:nvGrpSpPr>
+      <p:grpSpPr>
+        <a:xfrm>
+          <a:off x="0" y="0"/>
+          <a:ext cx="0" cy="0"/>
+          <a:chOff x="0" y="0"/>
+          <a:chExt cx="0" cy="0"/>
+        </a:xfrm>
+      </p:grpSpPr>
+      <p:sp>
+        <p:nvSpPr>
+          <p:cNvPr id="2" name="TextBox 1"/>
+          <p:cNvSpPr txBox="1"/>
+          <p:nvPr/>
+        </p:nvSpPr>
+        <p:spPr>
+          <a:xfrm>
+            <a:off x="3347864" y="2516703"/>
+            <a:ext cx="1383712" cy="1200329"/>
+          </a:xfrm>
+          <a:prstGeom prst="rect">
+            <a:avLst/>
+          </a:prstGeom>
+          <a:noFill/>
+        </p:spPr>
+        <p:txBody>
+          <a:bodyPr wrap="none" rtlCol="0">
+            <a:spAutoFit/>
+          </a:bodyPr>
+          <a:lstStyle/>
+          <a:p>
+            <a:r>
+              <a:rPr lang="en-GB" sz="7200" dirty="0" smtClean="0">
+                <a:solidFill>
+                  <a:srgbClr val="0070C0"/>
+                </a:solidFill>
+              </a:rPr>
+              <a:t>I/O</a:t>
+            </a:r>
+            <a:endParaRPr lang="en-GB" sz="7200" dirty="0">
+              <a:solidFill>
+                <a:srgbClr val="0070C0"/>
+              </a:solidFill>
+            </a:endParaRPr>
+          </a:p>
+        </p:txBody>
+      </p:sp>
+    </p:spTree>
+    <p:extLst>
+      <p:ext uri="{BB962C8B-B14F-4D97-AF65-F5344CB8AC3E}">
+        <p14:creationId xmlns:p14="http://schemas.microsoft.com/office/powerpoint/2010/main" val="4245207861"/>
+      </p:ext>
+    </p:extLst>
+  </p:cSld>
+  <p:clrMapOvr>
+    <a:masterClrMapping/>
+  </p:clrMapOvr>
+  <p:timing>
+    <p:tnLst>
+      <p:par>
+        <p:cTn id="1" dur="indefinite" restart="never" nodeType="tmRoot"/>
+      </p:par>
+    </p:tnLst>
+  </p:timing>
+</p:sld>
+</file>
+
+<file path=ppt/slides/slide26.xml><?xml version="1.0" encoding="utf-8"?>
+<p:sld xmlns:a="http://schemas.openxmlformats.org/drawingml/2006/main" xmlns:r="http://schemas.openxmlformats.org/officeDocument/2006/relationships" xmlns:p="http://schemas.openxmlformats.org/presentationml/2006/main">
+  <p:cSld>
+    <p:spTree>
+      <p:nvGrpSpPr>
+        <p:cNvPr id="1" name=""/>
+        <p:cNvGrpSpPr/>
+        <p:nvPr/>
+      </p:nvGrpSpPr>
+      <p:grpSpPr>
+        <a:xfrm>
+          <a:off x="0" y="0"/>
+          <a:ext cx="0" cy="0"/>
+          <a:chOff x="0" y="0"/>
+          <a:chExt cx="0" cy="0"/>
+        </a:xfrm>
+      </p:grpSpPr>
+      <p:sp>
+        <p:nvSpPr>
+          <p:cNvPr id="2" name="TextBox 1"/>
+          <p:cNvSpPr txBox="1"/>
+          <p:nvPr/>
+        </p:nvSpPr>
+        <p:spPr>
+          <a:xfrm>
+            <a:off x="539552" y="476672"/>
+            <a:ext cx="7287572" cy="769441"/>
+          </a:xfrm>
+          <a:prstGeom prst="rect">
+            <a:avLst/>
+          </a:prstGeom>
+          <a:noFill/>
+        </p:spPr>
+        <p:txBody>
+          <a:bodyPr wrap="none" rtlCol="0">
+            <a:spAutoFit/>
+          </a:bodyPr>
+          <a:lstStyle/>
+          <a:p>
+            <a:r>
+              <a:rPr lang="en-GB" sz="4400" dirty="0" smtClean="0">
+                <a:latin typeface="Courier New" panose="02070309020205020404" pitchFamily="49" charset="0"/>
+                <a:cs typeface="Courier New" panose="02070309020205020404" pitchFamily="49" charset="0"/>
+              </a:rPr>
+              <a:t>f </a:t>
+            </a:r>
+            <a:r>
+              <a:rPr lang="en-GB" sz="4400" dirty="0" smtClean="0">
+                <a:solidFill>
+                  <a:srgbClr val="FF0000"/>
+                </a:solidFill>
+                <a:latin typeface="Courier New" panose="02070309020205020404" pitchFamily="49" charset="0"/>
+                <a:cs typeface="Courier New" panose="02070309020205020404" pitchFamily="49" charset="0"/>
+              </a:rPr>
+              <a:t>::</a:t>
+            </a:r>
+            <a:r>
+              <a:rPr lang="en-GB" sz="4400" dirty="0" smtClean="0">
+                <a:latin typeface="Courier New" panose="02070309020205020404" pitchFamily="49" charset="0"/>
+                <a:cs typeface="Courier New" panose="02070309020205020404" pitchFamily="49" charset="0"/>
+              </a:rPr>
+              <a:t> String </a:t>
+            </a:r>
+            <a:r>
+              <a:rPr lang="en-GB" sz="4400" dirty="0" smtClean="0">
+                <a:solidFill>
+                  <a:srgbClr val="FF0000"/>
+                </a:solidFill>
+                <a:latin typeface="Courier New" panose="02070309020205020404" pitchFamily="49" charset="0"/>
+                <a:cs typeface="Courier New" panose="02070309020205020404" pitchFamily="49" charset="0"/>
+              </a:rPr>
+              <a:t>-&gt;</a:t>
+            </a:r>
+            <a:r>
+              <a:rPr lang="en-GB" sz="4400" dirty="0" smtClean="0">
+                <a:latin typeface="Courier New" panose="02070309020205020404" pitchFamily="49" charset="0"/>
+                <a:cs typeface="Courier New" panose="02070309020205020404" pitchFamily="49" charset="0"/>
+              </a:rPr>
+              <a:t> String</a:t>
+            </a:r>
+            <a:endParaRPr lang="en-GB" sz="4400" dirty="0" smtClean="0">
+              <a:latin typeface="Courier New" panose="02070309020205020404" pitchFamily="49" charset="0"/>
+              <a:cs typeface="Courier New" panose="02070309020205020404" pitchFamily="49" charset="0"/>
+            </a:endParaRPr>
+          </a:p>
+        </p:txBody>
+      </p:sp>
+      <p:sp>
+        <p:nvSpPr>
+          <p:cNvPr id="3" name="TextBox 2"/>
+          <p:cNvSpPr txBox="1"/>
+          <p:nvPr/>
+        </p:nvSpPr>
+        <p:spPr>
+          <a:xfrm>
+            <a:off x="539552" y="1484784"/>
+            <a:ext cx="8302273" cy="769441"/>
+          </a:xfrm>
+          <a:prstGeom prst="rect">
+            <a:avLst/>
+          </a:prstGeom>
+          <a:noFill/>
+        </p:spPr>
+        <p:txBody>
+          <a:bodyPr wrap="none" rtlCol="0">
+            <a:spAutoFit/>
+          </a:bodyPr>
+          <a:lstStyle/>
+          <a:p>
+            <a:r>
+              <a:rPr lang="en-GB" sz="4400" dirty="0">
+                <a:latin typeface="Courier New" panose="02070309020205020404" pitchFamily="49" charset="0"/>
+                <a:cs typeface="Courier New" panose="02070309020205020404" pitchFamily="49" charset="0"/>
+              </a:rPr>
+              <a:t>g</a:t>
+            </a:r>
+            <a:r>
+              <a:rPr lang="en-GB" sz="4400" dirty="0" smtClean="0">
+                <a:latin typeface="Courier New" panose="02070309020205020404" pitchFamily="49" charset="0"/>
+                <a:cs typeface="Courier New" panose="02070309020205020404" pitchFamily="49" charset="0"/>
+              </a:rPr>
+              <a:t> </a:t>
+            </a:r>
+            <a:r>
+              <a:rPr lang="en-GB" sz="4400" dirty="0" smtClean="0">
+                <a:solidFill>
+                  <a:srgbClr val="FF0000"/>
+                </a:solidFill>
+                <a:latin typeface="Courier New" panose="02070309020205020404" pitchFamily="49" charset="0"/>
+                <a:cs typeface="Courier New" panose="02070309020205020404" pitchFamily="49" charset="0"/>
+              </a:rPr>
+              <a:t>::</a:t>
+            </a:r>
+            <a:r>
+              <a:rPr lang="en-GB" sz="4400" dirty="0" smtClean="0">
+                <a:latin typeface="Courier New" panose="02070309020205020404" pitchFamily="49" charset="0"/>
+                <a:cs typeface="Courier New" panose="02070309020205020404" pitchFamily="49" charset="0"/>
+              </a:rPr>
+              <a:t> String </a:t>
+            </a:r>
+            <a:r>
+              <a:rPr lang="en-GB" sz="4400" dirty="0" smtClean="0">
+                <a:solidFill>
+                  <a:srgbClr val="FF0000"/>
+                </a:solidFill>
+                <a:latin typeface="Courier New" panose="02070309020205020404" pitchFamily="49" charset="0"/>
+                <a:cs typeface="Courier New" panose="02070309020205020404" pitchFamily="49" charset="0"/>
+              </a:rPr>
+              <a:t>-&gt;</a:t>
+            </a:r>
+            <a:r>
+              <a:rPr lang="en-GB" sz="4400" dirty="0" smtClean="0">
+                <a:latin typeface="Courier New" panose="02070309020205020404" pitchFamily="49" charset="0"/>
+                <a:cs typeface="Courier New" panose="02070309020205020404" pitchFamily="49" charset="0"/>
+              </a:rPr>
+              <a:t> IO String</a:t>
+            </a:r>
+            <a:endParaRPr lang="en-GB" sz="4400" dirty="0" smtClean="0">
+              <a:latin typeface="Courier New" panose="02070309020205020404" pitchFamily="49" charset="0"/>
+              <a:cs typeface="Courier New" panose="02070309020205020404" pitchFamily="49" charset="0"/>
+            </a:endParaRPr>
+          </a:p>
+        </p:txBody>
+      </p:sp>
+      <p:sp>
+        <p:nvSpPr>
+          <p:cNvPr id="4" name="TextBox 3"/>
+          <p:cNvSpPr txBox="1"/>
+          <p:nvPr/>
+        </p:nvSpPr>
+        <p:spPr>
+          <a:xfrm>
+            <a:off x="251520" y="2854677"/>
+            <a:ext cx="8781571" cy="646331"/>
+          </a:xfrm>
+          <a:prstGeom prst="rect">
+            <a:avLst/>
+          </a:prstGeom>
+          <a:noFill/>
+        </p:spPr>
+        <p:txBody>
+          <a:bodyPr wrap="none" rtlCol="0">
+            <a:spAutoFit/>
+          </a:bodyPr>
+          <a:lstStyle/>
+          <a:p>
+            <a:r>
+              <a:rPr lang="en-GB" sz="3600" dirty="0" smtClean="0">
+                <a:latin typeface="Courier New" panose="02070309020205020404" pitchFamily="49" charset="0"/>
+                <a:cs typeface="Courier New" panose="02070309020205020404" pitchFamily="49" charset="0"/>
+              </a:rPr>
+              <a:t>readFile </a:t>
+            </a:r>
+            <a:r>
+              <a:rPr lang="en-GB" sz="3600" dirty="0" smtClean="0">
+                <a:solidFill>
+                  <a:srgbClr val="FF0000"/>
+                </a:solidFill>
+                <a:latin typeface="Courier New" panose="02070309020205020404" pitchFamily="49" charset="0"/>
+                <a:cs typeface="Courier New" panose="02070309020205020404" pitchFamily="49" charset="0"/>
+              </a:rPr>
+              <a:t>::</a:t>
+            </a:r>
+            <a:r>
+              <a:rPr lang="en-GB" sz="3600" dirty="0" smtClean="0">
+                <a:latin typeface="Courier New" panose="02070309020205020404" pitchFamily="49" charset="0"/>
+                <a:cs typeface="Courier New" panose="02070309020205020404" pitchFamily="49" charset="0"/>
+              </a:rPr>
+              <a:t> String </a:t>
+            </a:r>
+            <a:r>
+              <a:rPr lang="en-GB" sz="3600" dirty="0" smtClean="0">
+                <a:solidFill>
+                  <a:srgbClr val="FF0000"/>
+                </a:solidFill>
+                <a:latin typeface="Courier New" panose="02070309020205020404" pitchFamily="49" charset="0"/>
+                <a:cs typeface="Courier New" panose="02070309020205020404" pitchFamily="49" charset="0"/>
+              </a:rPr>
+              <a:t>-&gt;</a:t>
+            </a:r>
+            <a:r>
+              <a:rPr lang="en-GB" sz="3600" dirty="0" smtClean="0">
+                <a:latin typeface="Courier New" panose="02070309020205020404" pitchFamily="49" charset="0"/>
+                <a:cs typeface="Courier New" panose="02070309020205020404" pitchFamily="49" charset="0"/>
+              </a:rPr>
+              <a:t> IO String</a:t>
+            </a:r>
+            <a:endParaRPr lang="en-GB" sz="3600" dirty="0" smtClean="0">
+              <a:latin typeface="Courier New" panose="02070309020205020404" pitchFamily="49" charset="0"/>
+              <a:cs typeface="Courier New" panose="02070309020205020404" pitchFamily="49" charset="0"/>
+            </a:endParaRPr>
+          </a:p>
+        </p:txBody>
+      </p:sp>
+      <p:sp>
+        <p:nvSpPr>
+          <p:cNvPr id="6" name="TextBox 5"/>
+          <p:cNvSpPr txBox="1"/>
+          <p:nvPr/>
+        </p:nvSpPr>
+        <p:spPr>
+          <a:xfrm>
+            <a:off x="251520" y="3718773"/>
+            <a:ext cx="5176417" cy="646331"/>
+          </a:xfrm>
+          <a:prstGeom prst="rect">
+            <a:avLst/>
+          </a:prstGeom>
+          <a:noFill/>
+        </p:spPr>
+        <p:txBody>
+          <a:bodyPr wrap="none" rtlCol="0">
+            <a:spAutoFit/>
+          </a:bodyPr>
+          <a:lstStyle/>
+          <a:p>
+            <a:r>
+              <a:rPr lang="en-GB" sz="3600" dirty="0" smtClean="0">
+                <a:latin typeface="Courier New" panose="02070309020205020404" pitchFamily="49" charset="0"/>
+                <a:cs typeface="Courier New" panose="02070309020205020404" pitchFamily="49" charset="0"/>
+              </a:rPr>
+              <a:t>getChar </a:t>
+            </a:r>
+            <a:r>
+              <a:rPr lang="en-GB" sz="3600" dirty="0" smtClean="0">
+                <a:solidFill>
+                  <a:srgbClr val="FF0000"/>
+                </a:solidFill>
+                <a:latin typeface="Courier New" panose="02070309020205020404" pitchFamily="49" charset="0"/>
+                <a:cs typeface="Courier New" panose="02070309020205020404" pitchFamily="49" charset="0"/>
+              </a:rPr>
+              <a:t>::</a:t>
+            </a:r>
+            <a:r>
+              <a:rPr lang="en-GB" sz="3600" dirty="0" smtClean="0">
+                <a:latin typeface="Courier New" panose="02070309020205020404" pitchFamily="49" charset="0"/>
+                <a:cs typeface="Courier New" panose="02070309020205020404" pitchFamily="49" charset="0"/>
+              </a:rPr>
+              <a:t> IO Char</a:t>
+            </a:r>
+            <a:endParaRPr lang="en-GB" sz="3600" dirty="0" smtClean="0">
+              <a:latin typeface="Courier New" panose="02070309020205020404" pitchFamily="49" charset="0"/>
+              <a:cs typeface="Courier New" panose="02070309020205020404" pitchFamily="49" charset="0"/>
+            </a:endParaRPr>
+          </a:p>
+        </p:txBody>
+      </p:sp>
+      <p:sp>
+        <p:nvSpPr>
+          <p:cNvPr id="8" name="TextBox 7"/>
+          <p:cNvSpPr txBox="1"/>
+          <p:nvPr/>
+        </p:nvSpPr>
+        <p:spPr>
+          <a:xfrm>
+            <a:off x="251519" y="4582869"/>
+            <a:ext cx="7117654" cy="646331"/>
+          </a:xfrm>
+          <a:prstGeom prst="rect">
+            <a:avLst/>
+          </a:prstGeom>
+          <a:noFill/>
+        </p:spPr>
+        <p:txBody>
+          <a:bodyPr wrap="none" rtlCol="0">
+            <a:spAutoFit/>
+          </a:bodyPr>
+          <a:lstStyle/>
+          <a:p>
+            <a:r>
+              <a:rPr lang="en-GB" sz="3600" dirty="0" smtClean="0">
+                <a:latin typeface="Courier New" panose="02070309020205020404" pitchFamily="49" charset="0"/>
+                <a:cs typeface="Courier New" panose="02070309020205020404" pitchFamily="49" charset="0"/>
+              </a:rPr>
+              <a:t>putStr</a:t>
+            </a:r>
+            <a:r>
+              <a:rPr lang="en-GB" sz="3600" dirty="0" smtClean="0">
+                <a:latin typeface="Courier New" panose="02070309020205020404" pitchFamily="49" charset="0"/>
+                <a:cs typeface="Courier New" panose="02070309020205020404" pitchFamily="49" charset="0"/>
+              </a:rPr>
+              <a:t> </a:t>
+            </a:r>
+            <a:r>
+              <a:rPr lang="en-GB" sz="3600" dirty="0" smtClean="0">
+                <a:solidFill>
+                  <a:srgbClr val="FF0000"/>
+                </a:solidFill>
+                <a:latin typeface="Courier New" panose="02070309020205020404" pitchFamily="49" charset="0"/>
+                <a:cs typeface="Courier New" panose="02070309020205020404" pitchFamily="49" charset="0"/>
+              </a:rPr>
+              <a:t>::</a:t>
+            </a:r>
+            <a:r>
+              <a:rPr lang="en-GB" sz="3600" dirty="0" smtClean="0">
+                <a:latin typeface="Courier New" panose="02070309020205020404" pitchFamily="49" charset="0"/>
+                <a:cs typeface="Courier New" panose="02070309020205020404" pitchFamily="49" charset="0"/>
+              </a:rPr>
+              <a:t> String </a:t>
+            </a:r>
+            <a:r>
+              <a:rPr lang="en-GB" sz="3600" dirty="0" smtClean="0">
+                <a:solidFill>
+                  <a:srgbClr val="FF0000"/>
+                </a:solidFill>
+                <a:latin typeface="Courier New" panose="02070309020205020404" pitchFamily="49" charset="0"/>
+                <a:cs typeface="Courier New" panose="02070309020205020404" pitchFamily="49" charset="0"/>
+              </a:rPr>
+              <a:t>-&gt;</a:t>
+            </a:r>
+            <a:r>
+              <a:rPr lang="en-GB" sz="3600" dirty="0" smtClean="0">
+                <a:latin typeface="Courier New" panose="02070309020205020404" pitchFamily="49" charset="0"/>
+                <a:cs typeface="Courier New" panose="02070309020205020404" pitchFamily="49" charset="0"/>
+              </a:rPr>
+              <a:t> IO ()</a:t>
+            </a:r>
+            <a:endParaRPr lang="en-GB" sz="3600" dirty="0" smtClean="0">
+              <a:latin typeface="Courier New" panose="02070309020205020404" pitchFamily="49" charset="0"/>
+              <a:cs typeface="Courier New" panose="02070309020205020404" pitchFamily="49" charset="0"/>
+            </a:endParaRPr>
+          </a:p>
+        </p:txBody>
+      </p:sp>
+      <p:sp>
+        <p:nvSpPr>
+          <p:cNvPr id="9" name="TextBox 8"/>
+          <p:cNvSpPr txBox="1"/>
+          <p:nvPr/>
+        </p:nvSpPr>
+        <p:spPr>
+          <a:xfrm>
+            <a:off x="1619672" y="5733256"/>
+            <a:ext cx="4581703" cy="769441"/>
+          </a:xfrm>
+          <a:prstGeom prst="rect">
+            <a:avLst/>
+          </a:prstGeom>
+          <a:noFill/>
+        </p:spPr>
+        <p:txBody>
+          <a:bodyPr wrap="none" rtlCol="0">
+            <a:spAutoFit/>
+          </a:bodyPr>
+          <a:lstStyle/>
+          <a:p>
+            <a:r>
+              <a:rPr lang="en-GB" sz="4400" dirty="0" smtClean="0">
+                <a:latin typeface="Courier New" panose="02070309020205020404" pitchFamily="49" charset="0"/>
+                <a:cs typeface="Courier New" panose="02070309020205020404" pitchFamily="49" charset="0"/>
+              </a:rPr>
+              <a:t>main </a:t>
+            </a:r>
+            <a:r>
+              <a:rPr lang="en-GB" sz="4400" dirty="0" smtClean="0">
+                <a:solidFill>
+                  <a:srgbClr val="FF0000"/>
+                </a:solidFill>
+                <a:latin typeface="Courier New" panose="02070309020205020404" pitchFamily="49" charset="0"/>
+                <a:cs typeface="Courier New" panose="02070309020205020404" pitchFamily="49" charset="0"/>
+              </a:rPr>
+              <a:t>::</a:t>
+            </a:r>
+            <a:r>
+              <a:rPr lang="en-GB" sz="4400" dirty="0" smtClean="0">
+                <a:latin typeface="Courier New" panose="02070309020205020404" pitchFamily="49" charset="0"/>
+                <a:cs typeface="Courier New" panose="02070309020205020404" pitchFamily="49" charset="0"/>
+              </a:rPr>
+              <a:t> IO ()</a:t>
+            </a:r>
+            <a:endParaRPr lang="en-GB" sz="4400" dirty="0" smtClean="0">
+              <a:latin typeface="Courier New" panose="02070309020205020404" pitchFamily="49" charset="0"/>
+              <a:cs typeface="Courier New" panose="02070309020205020404" pitchFamily="49" charset="0"/>
+            </a:endParaRPr>
+          </a:p>
+        </p:txBody>
+      </p:sp>
+    </p:spTree>
+    <p:extLst>
+      <p:ext uri="{BB962C8B-B14F-4D97-AF65-F5344CB8AC3E}">
+        <p14:creationId xmlns:p14="http://schemas.microsoft.com/office/powerpoint/2010/main" val="721338122"/>
+      </p:ext>
+    </p:extLst>
+  </p:cSld>
+  <p:clrMapOvr>
+    <a:masterClrMapping/>
+  </p:clrMapOvr>
+  <p:timing>
+    <p:tnLst>
+      <p:par>
+        <p:cTn id="1" dur="indefinite" restart="never" nodeType="tmRoot">
+          <p:childTnLst>
+            <p:seq concurrent="1" nextAc="seek">
+              <p:cTn id="2" dur="indefinite" nodeType="mainSeq">
+                <p:childTnLst>
+                  <p:par>
+                    <p:cTn id="3" fill="hold">
+                      <p:stCondLst>
+                        <p:cond delay="indefinite"/>
+                      </p:stCondLst>
+                      <p:childTnLst>
+                        <p:par>
+                          <p:cTn id="4" fill="hold">
+                            <p:stCondLst>
+                              <p:cond delay="0"/>
+                            </p:stCondLst>
+                            <p:childTnLst>
+                              <p:par>
+                                <p:cTn id="5" presetID="1" presetClass="entr" presetSubtype="0" fill="hold" grpId="0" nodeType="clickEffect">
+                                  <p:stCondLst>
+                                    <p:cond delay="0"/>
+                                  </p:stCondLst>
+                                  <p:childTnLst>
+                                    <p:set>
+                                      <p:cBhvr>
+                                        <p:cTn id="6" dur="1" fill="hold">
+                                          <p:stCondLst>
+                                            <p:cond delay="0"/>
+                                          </p:stCondLst>
+                                        </p:cTn>
+                                        <p:tgtEl>
+                                          <p:spTgt spid="3"/>
+                                        </p:tgtEl>
+                                        <p:attrNameLst>
+                                          <p:attrName>style.visibility</p:attrName>
+                                        </p:attrNameLst>
+                                      </p:cBhvr>
+                                      <p:to>
+                                        <p:strVal val="visible"/>
+                                      </p:to>
+                                    </p:set>
+                                  </p:childTnLst>
+                                </p:cTn>
+                              </p:par>
+                            </p:childTnLst>
+                          </p:cTn>
+                        </p:par>
+                      </p:childTnLst>
+                    </p:cTn>
+                  </p:par>
+                  <p:par>
+                    <p:cTn id="7" fill="hold">
+                      <p:stCondLst>
+                        <p:cond delay="indefinite"/>
+                      </p:stCondLst>
+                      <p:childTnLst>
+                        <p:par>
+                          <p:cTn id="8" fill="hold">
+                            <p:stCondLst>
+                              <p:cond delay="0"/>
+                            </p:stCondLst>
+                            <p:childTnLst>
+                              <p:par>
+                                <p:cTn id="9" presetID="1" presetClass="entr" presetSubtype="0" fill="hold" grpId="0" nodeType="clickEffect">
+                                  <p:stCondLst>
+                                    <p:cond delay="0"/>
+                                  </p:stCondLst>
+                                  <p:childTnLst>
+                                    <p:set>
+                                      <p:cBhvr>
+                                        <p:cTn id="10" dur="1" fill="hold">
+                                          <p:stCondLst>
+                                            <p:cond delay="0"/>
+                                          </p:stCondLst>
+                                        </p:cTn>
+                                        <p:tgtEl>
+                                          <p:spTgt spid="4"/>
+                                        </p:tgtEl>
+                                        <p:attrNameLst>
+                                          <p:attrName>style.visibility</p:attrName>
+                                        </p:attrNameLst>
+                                      </p:cBhvr>
+                                      <p:to>
+                                        <p:strVal val="visible"/>
+                                      </p:to>
+                                    </p:set>
+                                  </p:childTnLst>
+                                </p:cTn>
+                              </p:par>
+                            </p:childTnLst>
+                          </p:cTn>
+                        </p:par>
+                      </p:childTnLst>
+                    </p:cTn>
+                  </p:par>
+                  <p:par>
+                    <p:cTn id="11" fill="hold">
+                      <p:stCondLst>
+                        <p:cond delay="indefinite"/>
+                      </p:stCondLst>
+                      <p:childTnLst>
+                        <p:par>
+                          <p:cTn id="12" fill="hold">
+                            <p:stCondLst>
+                              <p:cond delay="0"/>
+                            </p:stCondLst>
+                            <p:childTnLst>
+                              <p:par>
+                                <p:cTn id="13" presetID="1" presetClass="entr" presetSubtype="0" fill="hold" grpId="0" nodeType="clickEffect">
+                                  <p:stCondLst>
+                                    <p:cond delay="0"/>
+                                  </p:stCondLst>
+                                  <p:childTnLst>
+                                    <p:set>
+                                      <p:cBhvr>
+                                        <p:cTn id="14" dur="1" fill="hold">
+                                          <p:stCondLst>
+                                            <p:cond delay="0"/>
+                                          </p:stCondLst>
+                                        </p:cTn>
+                                        <p:tgtEl>
+                                          <p:spTgt spid="6"/>
+                                        </p:tgtEl>
+                                        <p:attrNameLst>
+                                          <p:attrName>style.visibility</p:attrName>
+                                        </p:attrNameLst>
+                                      </p:cBhvr>
+                                      <p:to>
+                                        <p:strVal val="visible"/>
+                                      </p:to>
+                                    </p:set>
+                                  </p:childTnLst>
+                                </p:cTn>
+                              </p:par>
+                            </p:childTnLst>
+                          </p:cTn>
+                        </p:par>
+                      </p:childTnLst>
+                    </p:cTn>
+                  </p:par>
+                  <p:par>
+                    <p:cTn id="15" fill="hold">
+                      <p:stCondLst>
+                        <p:cond delay="indefinite"/>
+                      </p:stCondLst>
+                      <p:childTnLst>
+                        <p:par>
+                          <p:cTn id="16" fill="hold">
+                            <p:stCondLst>
+                              <p:cond delay="0"/>
+                            </p:stCondLst>
+                            <p:childTnLst>
+                              <p:par>
+                                <p:cTn id="17" presetID="1" presetClass="entr" presetSubtype="0" fill="hold" grpId="0" nodeType="clickEffect">
+                                  <p:stCondLst>
+                                    <p:cond delay="0"/>
+                                  </p:stCondLst>
+                                  <p:childTnLst>
+                                    <p:set>
+                                      <p:cBhvr>
+                                        <p:cTn id="18" dur="1" fill="hold">
+                                          <p:stCondLst>
+                                            <p:cond delay="0"/>
+                                          </p:stCondLst>
+                                        </p:cTn>
+                                        <p:tgtEl>
+                                          <p:spTgt spid="8"/>
+                                        </p:tgtEl>
+                                        <p:attrNameLst>
+                                          <p:attrName>style.visibility</p:attrName>
+                                        </p:attrNameLst>
+                                      </p:cBhvr>
+                                      <p:to>
+                                        <p:strVal val="visible"/>
+                                      </p:to>
+                                    </p:set>
+                                  </p:childTnLst>
+                                </p:cTn>
+                              </p:par>
+                            </p:childTnLst>
+                          </p:cTn>
+                        </p:par>
+                      </p:childTnLst>
+                    </p:cTn>
+                  </p:par>
+                  <p:par>
+                    <p:cTn id="19" fill="hold">
+                      <p:stCondLst>
+                        <p:cond delay="indefinite"/>
+                      </p:stCondLst>
+                      <p:childTnLst>
+                        <p:par>
+                          <p:cTn id="20" fill="hold">
+                            <p:stCondLst>
+                              <p:cond delay="0"/>
+                            </p:stCondLst>
+                            <p:childTnLst>
+                              <p:par>
+                                <p:cTn id="21" presetID="1" presetClass="entr" presetSubtype="0" fill="hold" grpId="0" nodeType="clickEffect">
+                                  <p:stCondLst>
+                                    <p:cond delay="0"/>
+                                  </p:stCondLst>
+                                  <p:childTnLst>
+                                    <p:set>
+                                      <p:cBhvr>
+                                        <p:cTn id="22" dur="1" fill="hold">
+                                          <p:stCondLst>
+                                            <p:cond delay="0"/>
+                                          </p:stCondLst>
+                                        </p:cTn>
+                                        <p:tgtEl>
+                                          <p:spTgt spid="9"/>
+                                        </p:tgtEl>
+                                        <p:attrNameLst>
+                                          <p:attrName>style.visibility</p:attrName>
+                                        </p:attrNameLst>
+                                      </p:cBhvr>
+                                      <p:to>
+                                        <p:strVal val="visible"/>
+                                      </p:to>
+                                    </p:set>
+                                  </p:childTnLst>
+                                </p:cTn>
+                              </p:par>
+                            </p:childTnLst>
+                          </p:cTn>
+                        </p:par>
+                      </p:childTnLst>
+                    </p:cTn>
+                  </p:par>
+                </p:childTnLst>
+              </p:cTn>
+              <p:prevCondLst>
+                <p:cond evt="onPrev" delay="0">
+                  <p:tgtEl>
+                    <p:sldTgt/>
+                  </p:tgtEl>
+                </p:cond>
+              </p:prevCondLst>
+              <p:nextCondLst>
+                <p:cond evt="onNext" delay="0">
+                  <p:tgtEl>
+                    <p:sldTgt/>
+                  </p:tgtEl>
+                </p:cond>
+              </p:nextCondLst>
+            </p:seq>
+          </p:childTnLst>
+        </p:cTn>
+      </p:par>
+    </p:tnLst>
+    <p:bldLst>
+      <p:bldP spid="3" grpId="0"/>
+      <p:bldP spid="4" grpId="0"/>
+      <p:bldP spid="6" grpId="0"/>
+      <p:bldP spid="8" grpId="0"/>
+      <p:bldP spid="9" grpId="0"/>
+    </p:bldLst>
+  </p:timing>
+</p:sld>
+</file>
+
+<file path=ppt/slides/slide27.xml><?xml version="1.0" encoding="utf-8"?>
+<p:sld xmlns:a="http://schemas.openxmlformats.org/drawingml/2006/main" xmlns:r="http://schemas.openxmlformats.org/officeDocument/2006/relationships" xmlns:p="http://schemas.openxmlformats.org/presentationml/2006/main">
+  <p:cSld>
+    <p:spTree>
+      <p:nvGrpSpPr>
+        <p:cNvPr id="1" name=""/>
+        <p:cNvGrpSpPr/>
+        <p:nvPr/>
+      </p:nvGrpSpPr>
+      <p:grpSpPr>
+        <a:xfrm>
+          <a:off x="0" y="0"/>
+          <a:ext cx="0" cy="0"/>
+          <a:chOff x="0" y="0"/>
+          <a:chExt cx="0" cy="0"/>
+        </a:xfrm>
+      </p:grpSpPr>
+      <p:sp>
+        <p:nvSpPr>
+          <p:cNvPr id="3" name="TextBox 2"/>
+          <p:cNvSpPr txBox="1"/>
+          <p:nvPr/>
+        </p:nvSpPr>
+        <p:spPr>
+          <a:xfrm>
+            <a:off x="306094" y="1522527"/>
+            <a:ext cx="8802410" cy="2554545"/>
+          </a:xfrm>
+          <a:prstGeom prst="rect">
+            <a:avLst/>
+          </a:prstGeom>
+          <a:noFill/>
+        </p:spPr>
+        <p:txBody>
+          <a:bodyPr wrap="none" rtlCol="0">
+            <a:spAutoFit/>
+          </a:bodyPr>
+          <a:lstStyle/>
+          <a:p>
+            <a:r>
+              <a:rPr lang="en-GB" sz="4000" dirty="0" smtClean="0">
+                <a:latin typeface="Courier New" panose="02070309020205020404" pitchFamily="49" charset="0"/>
+                <a:cs typeface="Courier New" panose="02070309020205020404" pitchFamily="49" charset="0"/>
+              </a:rPr>
+              <a:t>main </a:t>
+            </a:r>
+            <a:r>
+              <a:rPr lang="en-GB" sz="4000" dirty="0" smtClean="0">
+                <a:solidFill>
+                  <a:srgbClr val="FF0000"/>
+                </a:solidFill>
+                <a:latin typeface="Courier New" panose="02070309020205020404" pitchFamily="49" charset="0"/>
+                <a:cs typeface="Courier New" panose="02070309020205020404" pitchFamily="49" charset="0"/>
+              </a:rPr>
+              <a:t>=</a:t>
+            </a:r>
+            <a:r>
+              <a:rPr lang="en-GB" sz="4000" dirty="0" smtClean="0">
+                <a:latin typeface="Courier New" panose="02070309020205020404" pitchFamily="49" charset="0"/>
+                <a:cs typeface="Courier New" panose="02070309020205020404" pitchFamily="49" charset="0"/>
+              </a:rPr>
+              <a:t> </a:t>
+            </a:r>
+            <a:r>
+              <a:rPr lang="en-GB" sz="4000" dirty="0" smtClean="0">
+                <a:solidFill>
+                  <a:srgbClr val="0070C0"/>
+                </a:solidFill>
+                <a:latin typeface="Courier New" panose="02070309020205020404" pitchFamily="49" charset="0"/>
+                <a:cs typeface="Courier New" panose="02070309020205020404" pitchFamily="49" charset="0"/>
+              </a:rPr>
+              <a:t>do</a:t>
+            </a:r>
+          </a:p>
+          <a:p>
+            <a:r>
+              <a:rPr lang="en-GB" sz="4000" dirty="0">
+                <a:latin typeface="Courier New" panose="02070309020205020404" pitchFamily="49" charset="0"/>
+                <a:cs typeface="Courier New" panose="02070309020205020404" pitchFamily="49" charset="0"/>
+              </a:rPr>
+              <a:t> </a:t>
+            </a:r>
+            <a:r>
+              <a:rPr lang="en-GB" sz="4000" dirty="0" smtClean="0">
+                <a:latin typeface="Courier New" panose="02070309020205020404" pitchFamily="49" charset="0"/>
+                <a:cs typeface="Courier New" panose="02070309020205020404" pitchFamily="49" charset="0"/>
+              </a:rPr>
+              <a:t> str </a:t>
+            </a:r>
+            <a:r>
+              <a:rPr lang="en-GB" sz="4000" dirty="0" smtClean="0">
+                <a:solidFill>
+                  <a:srgbClr val="FF0000"/>
+                </a:solidFill>
+                <a:latin typeface="Courier New" panose="02070309020205020404" pitchFamily="49" charset="0"/>
+                <a:cs typeface="Courier New" panose="02070309020205020404" pitchFamily="49" charset="0"/>
+              </a:rPr>
+              <a:t>&lt;-</a:t>
+            </a:r>
+            <a:r>
+              <a:rPr lang="en-GB" sz="4000" dirty="0" smtClean="0">
+                <a:latin typeface="Courier New" panose="02070309020205020404" pitchFamily="49" charset="0"/>
+                <a:cs typeface="Courier New" panose="02070309020205020404" pitchFamily="49" charset="0"/>
+              </a:rPr>
+              <a:t> readFile "foo.txt"</a:t>
+            </a:r>
+          </a:p>
+          <a:p>
+            <a:r>
+              <a:rPr lang="en-GB" sz="4000" dirty="0">
+                <a:latin typeface="Courier New" panose="02070309020205020404" pitchFamily="49" charset="0"/>
+                <a:cs typeface="Courier New" panose="02070309020205020404" pitchFamily="49" charset="0"/>
+              </a:rPr>
+              <a:t> </a:t>
+            </a:r>
+            <a:r>
+              <a:rPr lang="en-GB" sz="4000" dirty="0" smtClean="0">
+                <a:latin typeface="Courier New" panose="02070309020205020404" pitchFamily="49" charset="0"/>
+                <a:cs typeface="Courier New" panose="02070309020205020404" pitchFamily="49" charset="0"/>
+              </a:rPr>
+              <a:t> </a:t>
+            </a:r>
+            <a:r>
+              <a:rPr lang="en-GB" sz="4000" dirty="0" smtClean="0">
+                <a:solidFill>
+                  <a:srgbClr val="0070C0"/>
+                </a:solidFill>
+                <a:latin typeface="Courier New" panose="02070309020205020404" pitchFamily="49" charset="0"/>
+                <a:cs typeface="Courier New" panose="02070309020205020404" pitchFamily="49" charset="0"/>
+              </a:rPr>
+              <a:t>let</a:t>
+            </a:r>
+            <a:r>
+              <a:rPr lang="en-GB" sz="4000" dirty="0" smtClean="0">
+                <a:latin typeface="Courier New" panose="02070309020205020404" pitchFamily="49" charset="0"/>
+                <a:cs typeface="Courier New" panose="02070309020205020404" pitchFamily="49" charset="0"/>
+              </a:rPr>
+              <a:t> str' </a:t>
+            </a:r>
+            <a:r>
+              <a:rPr lang="en-GB" sz="4000" dirty="0" smtClean="0">
+                <a:solidFill>
+                  <a:srgbClr val="FF0000"/>
+                </a:solidFill>
+                <a:latin typeface="Courier New" panose="02070309020205020404" pitchFamily="49" charset="0"/>
+                <a:cs typeface="Courier New" panose="02070309020205020404" pitchFamily="49" charset="0"/>
+              </a:rPr>
+              <a:t>=</a:t>
+            </a:r>
+            <a:r>
+              <a:rPr lang="en-GB" sz="4000" dirty="0" smtClean="0">
+                <a:latin typeface="Courier New" panose="02070309020205020404" pitchFamily="49" charset="0"/>
+                <a:cs typeface="Courier New" panose="02070309020205020404" pitchFamily="49" charset="0"/>
+              </a:rPr>
+              <a:t> take 100 str</a:t>
+            </a:r>
+          </a:p>
+          <a:p>
+            <a:r>
+              <a:rPr lang="en-GB" sz="4000" dirty="0">
+                <a:latin typeface="Courier New" panose="02070309020205020404" pitchFamily="49" charset="0"/>
+                <a:cs typeface="Courier New" panose="02070309020205020404" pitchFamily="49" charset="0"/>
+              </a:rPr>
+              <a:t> </a:t>
+            </a:r>
+            <a:r>
+              <a:rPr lang="en-GB" sz="4000" dirty="0" smtClean="0">
+                <a:latin typeface="Courier New" panose="02070309020205020404" pitchFamily="49" charset="0"/>
+                <a:cs typeface="Courier New" panose="02070309020205020404" pitchFamily="49" charset="0"/>
+              </a:rPr>
+              <a:t> writeFile "a.txt" str'</a:t>
+            </a:r>
+            <a:endParaRPr lang="en-GB" sz="4000" dirty="0" smtClean="0">
+              <a:latin typeface="Courier New" panose="02070309020205020404" pitchFamily="49" charset="0"/>
+              <a:cs typeface="Courier New" panose="02070309020205020404" pitchFamily="49" charset="0"/>
+            </a:endParaRPr>
+          </a:p>
+        </p:txBody>
+      </p:sp>
+      <p:sp>
+        <p:nvSpPr>
+          <p:cNvPr id="4" name="TextBox 3"/>
+          <p:cNvSpPr txBox="1"/>
+          <p:nvPr/>
+        </p:nvSpPr>
+        <p:spPr>
+          <a:xfrm>
+            <a:off x="2048940" y="548680"/>
+            <a:ext cx="6843540" cy="523220"/>
+          </a:xfrm>
+          <a:prstGeom prst="rect">
+            <a:avLst/>
+          </a:prstGeom>
+          <a:noFill/>
+          <a:ln>
+            <a:solidFill>
+              <a:schemeClr val="accent1"/>
+            </a:solidFill>
+          </a:ln>
+        </p:spPr>
+        <p:txBody>
+          <a:bodyPr wrap="none" rtlCol="0">
+            <a:spAutoFit/>
+          </a:bodyPr>
+          <a:lstStyle/>
+          <a:p>
+            <a:r>
+              <a:rPr lang="en-GB" sz="2800" dirty="0" smtClean="0">
+                <a:latin typeface="Courier New" panose="02070309020205020404" pitchFamily="49" charset="0"/>
+                <a:cs typeface="Courier New" panose="02070309020205020404" pitchFamily="49" charset="0"/>
+              </a:rPr>
+              <a:t>readFile </a:t>
+            </a:r>
+            <a:r>
+              <a:rPr lang="en-GB" sz="2800" dirty="0" smtClean="0">
+                <a:solidFill>
+                  <a:srgbClr val="FF0000"/>
+                </a:solidFill>
+                <a:latin typeface="Courier New" panose="02070309020205020404" pitchFamily="49" charset="0"/>
+                <a:cs typeface="Courier New" panose="02070309020205020404" pitchFamily="49" charset="0"/>
+              </a:rPr>
+              <a:t>::</a:t>
+            </a:r>
+            <a:r>
+              <a:rPr lang="en-GB" sz="2800" dirty="0" smtClean="0">
+                <a:latin typeface="Courier New" panose="02070309020205020404" pitchFamily="49" charset="0"/>
+                <a:cs typeface="Courier New" panose="02070309020205020404" pitchFamily="49" charset="0"/>
+              </a:rPr>
+              <a:t> String </a:t>
+            </a:r>
+            <a:r>
+              <a:rPr lang="en-GB" sz="2800" dirty="0" smtClean="0">
+                <a:solidFill>
+                  <a:srgbClr val="FF0000"/>
+                </a:solidFill>
+                <a:latin typeface="Courier New" panose="02070309020205020404" pitchFamily="49" charset="0"/>
+                <a:cs typeface="Courier New" panose="02070309020205020404" pitchFamily="49" charset="0"/>
+              </a:rPr>
+              <a:t>-&gt;</a:t>
+            </a:r>
+            <a:r>
+              <a:rPr lang="en-GB" sz="2800" dirty="0" smtClean="0">
+                <a:latin typeface="Courier New" panose="02070309020205020404" pitchFamily="49" charset="0"/>
+                <a:cs typeface="Courier New" panose="02070309020205020404" pitchFamily="49" charset="0"/>
+              </a:rPr>
+              <a:t> IO String</a:t>
+            </a:r>
+            <a:endParaRPr lang="en-GB" sz="2800" dirty="0" smtClean="0">
+              <a:latin typeface="Courier New" panose="02070309020205020404" pitchFamily="49" charset="0"/>
+              <a:cs typeface="Courier New" panose="02070309020205020404" pitchFamily="49" charset="0"/>
+            </a:endParaRPr>
+          </a:p>
+        </p:txBody>
+      </p:sp>
+      <p:cxnSp>
+        <p:nvCxnSpPr>
+          <p:cNvPr id="6" name="Straight Arrow Connector 5"/>
+          <p:cNvCxnSpPr/>
+          <p:nvPr/>
+        </p:nvCxnSpPr>
+        <p:spPr>
+          <a:xfrm>
+            <a:off x="3491880" y="1071900"/>
+            <a:ext cx="576064" cy="988948"/>
+          </a:xfrm>
+          <a:prstGeom prst="straightConnector1">
+            <a:avLst/>
+          </a:prstGeom>
+          <a:ln w="28575">
+            <a:tailEnd type="arrow"/>
+          </a:ln>
+        </p:spPr>
+        <p:style>
+          <a:lnRef idx="1">
+            <a:schemeClr val="accent1"/>
+          </a:lnRef>
+          <a:fillRef idx="0">
+            <a:schemeClr val="accent1"/>
+          </a:fillRef>
+          <a:effectRef idx="0">
+            <a:schemeClr val="accent1"/>
+          </a:effectRef>
+          <a:fontRef idx="minor">
+            <a:schemeClr val="tx1"/>
+          </a:fontRef>
+        </p:style>
+      </p:cxnSp>
+      <p:sp>
+        <p:nvSpPr>
+          <p:cNvPr id="7" name="TextBox 6"/>
+          <p:cNvSpPr txBox="1"/>
+          <p:nvPr/>
+        </p:nvSpPr>
+        <p:spPr>
+          <a:xfrm>
+            <a:off x="323528" y="4869160"/>
+            <a:ext cx="8347157" cy="523220"/>
+          </a:xfrm>
+          <a:prstGeom prst="rect">
+            <a:avLst/>
+          </a:prstGeom>
+          <a:noFill/>
+          <a:ln>
+            <a:solidFill>
+              <a:schemeClr val="accent1"/>
+            </a:solidFill>
+          </a:ln>
+        </p:spPr>
+        <p:txBody>
+          <a:bodyPr wrap="none" rtlCol="0">
+            <a:spAutoFit/>
+          </a:bodyPr>
+          <a:lstStyle/>
+          <a:p>
+            <a:r>
+              <a:rPr lang="en-GB" sz="2800" dirty="0" smtClean="0">
+                <a:latin typeface="Courier New" panose="02070309020205020404" pitchFamily="49" charset="0"/>
+                <a:cs typeface="Courier New" panose="02070309020205020404" pitchFamily="49" charset="0"/>
+              </a:rPr>
+              <a:t>write</a:t>
+            </a:r>
+            <a:r>
+              <a:rPr lang="en-GB" sz="2800" dirty="0" smtClean="0">
+                <a:latin typeface="Courier New" panose="02070309020205020404" pitchFamily="49" charset="0"/>
+                <a:cs typeface="Courier New" panose="02070309020205020404" pitchFamily="49" charset="0"/>
+              </a:rPr>
+              <a:t>File </a:t>
+            </a:r>
+            <a:r>
+              <a:rPr lang="en-GB" sz="2800" dirty="0" smtClean="0">
+                <a:solidFill>
+                  <a:srgbClr val="FF0000"/>
+                </a:solidFill>
+                <a:latin typeface="Courier New" panose="02070309020205020404" pitchFamily="49" charset="0"/>
+                <a:cs typeface="Courier New" panose="02070309020205020404" pitchFamily="49" charset="0"/>
+              </a:rPr>
+              <a:t>::</a:t>
+            </a:r>
+            <a:r>
+              <a:rPr lang="en-GB" sz="2800" dirty="0" smtClean="0">
+                <a:latin typeface="Courier New" panose="02070309020205020404" pitchFamily="49" charset="0"/>
+                <a:cs typeface="Courier New" panose="02070309020205020404" pitchFamily="49" charset="0"/>
+              </a:rPr>
+              <a:t> String </a:t>
+            </a:r>
+            <a:r>
+              <a:rPr lang="en-GB" sz="2800" dirty="0" smtClean="0">
+                <a:solidFill>
+                  <a:srgbClr val="FF0000"/>
+                </a:solidFill>
+                <a:latin typeface="Courier New" panose="02070309020205020404" pitchFamily="49" charset="0"/>
+                <a:cs typeface="Courier New" panose="02070309020205020404" pitchFamily="49" charset="0"/>
+              </a:rPr>
+              <a:t>-&gt;</a:t>
+            </a:r>
+            <a:r>
+              <a:rPr lang="en-GB" sz="2800" dirty="0" smtClean="0">
+                <a:latin typeface="Courier New" panose="02070309020205020404" pitchFamily="49" charset="0"/>
+                <a:cs typeface="Courier New" panose="02070309020205020404" pitchFamily="49" charset="0"/>
+              </a:rPr>
+              <a:t> String -&gt; IO ()</a:t>
+            </a:r>
+            <a:endParaRPr lang="en-GB" sz="2800" dirty="0" smtClean="0">
+              <a:latin typeface="Courier New" panose="02070309020205020404" pitchFamily="49" charset="0"/>
+              <a:cs typeface="Courier New" panose="02070309020205020404" pitchFamily="49" charset="0"/>
+            </a:endParaRPr>
+          </a:p>
+        </p:txBody>
+      </p:sp>
+      <p:cxnSp>
+        <p:nvCxnSpPr>
+          <p:cNvPr id="8" name="Straight Arrow Connector 7"/>
+          <p:cNvCxnSpPr/>
+          <p:nvPr/>
+        </p:nvCxnSpPr>
+        <p:spPr>
+          <a:xfrm flipV="1">
+            <a:off x="1907704" y="4077072"/>
+            <a:ext cx="576064" cy="792088"/>
+          </a:xfrm>
+          <a:prstGeom prst="straightConnector1">
+            <a:avLst/>
+          </a:prstGeom>
+          <a:ln w="28575">
+            <a:tailEnd type="arrow"/>
+          </a:ln>
+        </p:spPr>
+        <p:style>
+          <a:lnRef idx="1">
+            <a:schemeClr val="accent1"/>
+          </a:lnRef>
+          <a:fillRef idx="0">
+            <a:schemeClr val="accent1"/>
+          </a:fillRef>
+          <a:effectRef idx="0">
+            <a:schemeClr val="accent1"/>
+          </a:effectRef>
+          <a:fontRef idx="minor">
+            <a:schemeClr val="tx1"/>
+          </a:fontRef>
+        </p:style>
+      </p:cxnSp>
+    </p:spTree>
+    <p:extLst>
+      <p:ext uri="{BB962C8B-B14F-4D97-AF65-F5344CB8AC3E}">
+        <p14:creationId xmlns:p14="http://schemas.microsoft.com/office/powerpoint/2010/main" val="1830882714"/>
+      </p:ext>
+    </p:extLst>
+  </p:cSld>
+  <p:clrMapOvr>
+    <a:masterClrMapping/>
+  </p:clrMapOvr>
+  <p:timing>
+    <p:tnLst>
+      <p:par>
+        <p:cTn id="1" dur="indefinite" restart="never" nodeType="tmRoot">
+          <p:childTnLst>
+            <p:seq concurrent="1" nextAc="seek">
+              <p:cTn id="2" dur="indefinite" nodeType="mainSeq">
+                <p:childTnLst>
+                  <p:par>
+                    <p:cTn id="3" fill="hold">
+                      <p:stCondLst>
+                        <p:cond delay="indefinite"/>
+                      </p:stCondLst>
+                      <p:childTnLst>
+                        <p:par>
+                          <p:cTn id="4" fill="hold">
+                            <p:stCondLst>
+                              <p:cond delay="0"/>
+                            </p:stCondLst>
+                            <p:childTnLst>
+                              <p:par>
+                                <p:cTn id="5" presetID="1" presetClass="entr" presetSubtype="0" fill="hold" grpId="0" nodeType="clickEffect">
+                                  <p:stCondLst>
+                                    <p:cond delay="0"/>
+                                  </p:stCondLst>
+                                  <p:childTnLst>
+                                    <p:set>
+                                      <p:cBhvr>
+                                        <p:cTn id="6" dur="1" fill="hold">
+                                          <p:stCondLst>
+                                            <p:cond delay="0"/>
+                                          </p:stCondLst>
+                                        </p:cTn>
+                                        <p:tgtEl>
+                                          <p:spTgt spid="4"/>
+                                        </p:tgtEl>
+                                        <p:attrNameLst>
+                                          <p:attrName>style.visibility</p:attrName>
+                                        </p:attrNameLst>
+                                      </p:cBhvr>
+                                      <p:to>
+                                        <p:strVal val="visible"/>
+                                      </p:to>
+                                    </p:set>
+                                  </p:childTnLst>
+                                </p:cTn>
+                              </p:par>
+                              <p:par>
+                                <p:cTn id="7" presetID="1" presetClass="entr" presetSubtype="0" fill="hold" nodeType="withEffect">
+                                  <p:stCondLst>
+                                    <p:cond delay="0"/>
+                                  </p:stCondLst>
+                                  <p:childTnLst>
+                                    <p:set>
+                                      <p:cBhvr>
+                                        <p:cTn id="8" dur="1" fill="hold">
+                                          <p:stCondLst>
+                                            <p:cond delay="0"/>
+                                          </p:stCondLst>
+                                        </p:cTn>
+                                        <p:tgtEl>
+                                          <p:spTgt spid="6"/>
+                                        </p:tgtEl>
+                                        <p:attrNameLst>
+                                          <p:attrName>style.visibility</p:attrName>
+                                        </p:attrNameLst>
+                                      </p:cBhvr>
+                                      <p:to>
+                                        <p:strVal val="visible"/>
+                                      </p:to>
+                                    </p:set>
+                                  </p:childTnLst>
+                                </p:cTn>
+                              </p:par>
+                            </p:childTnLst>
+                          </p:cTn>
+                        </p:par>
+                      </p:childTnLst>
+                    </p:cTn>
+                  </p:par>
+                  <p:par>
+                    <p:cTn id="9" fill="hold">
+                      <p:stCondLst>
+                        <p:cond delay="indefinite"/>
+                      </p:stCondLst>
+                      <p:childTnLst>
+                        <p:par>
+                          <p:cTn id="10" fill="hold">
+                            <p:stCondLst>
+                              <p:cond delay="0"/>
+                            </p:stCondLst>
+                            <p:childTnLst>
+                              <p:par>
+                                <p:cTn id="11" presetID="1" presetClass="entr" presetSubtype="0" fill="hold" grpId="0" nodeType="clickEffect">
+                                  <p:stCondLst>
+                                    <p:cond delay="0"/>
+                                  </p:stCondLst>
+                                  <p:childTnLst>
+                                    <p:set>
+                                      <p:cBhvr>
+                                        <p:cTn id="12" dur="1" fill="hold">
+                                          <p:stCondLst>
+                                            <p:cond delay="0"/>
+                                          </p:stCondLst>
+                                        </p:cTn>
+                                        <p:tgtEl>
+                                          <p:spTgt spid="7"/>
+                                        </p:tgtEl>
+                                        <p:attrNameLst>
+                                          <p:attrName>style.visibility</p:attrName>
+                                        </p:attrNameLst>
+                                      </p:cBhvr>
+                                      <p:to>
+                                        <p:strVal val="visible"/>
+                                      </p:to>
+                                    </p:set>
+                                  </p:childTnLst>
+                                </p:cTn>
+                              </p:par>
+                              <p:par>
+                                <p:cTn id="13" presetID="1" presetClass="entr" presetSubtype="0" fill="hold" nodeType="withEffect">
+                                  <p:stCondLst>
+                                    <p:cond delay="0"/>
+                                  </p:stCondLst>
+                                  <p:childTnLst>
+                                    <p:set>
+                                      <p:cBhvr>
+                                        <p:cTn id="14" dur="1" fill="hold">
+                                          <p:stCondLst>
+                                            <p:cond delay="0"/>
+                                          </p:stCondLst>
+                                        </p:cTn>
+                                        <p:tgtEl>
+                                          <p:spTgt spid="8"/>
+                                        </p:tgtEl>
+                                        <p:attrNameLst>
+                                          <p:attrName>style.visibility</p:attrName>
+                                        </p:attrNameLst>
+                                      </p:cBhvr>
+                                      <p:to>
+                                        <p:strVal val="visible"/>
+                                      </p:to>
+                                    </p:set>
+                                  </p:childTnLst>
+                                </p:cTn>
+                              </p:par>
+                            </p:childTnLst>
+                          </p:cTn>
+                        </p:par>
+                      </p:childTnLst>
+                    </p:cTn>
+                  </p:par>
+                </p:childTnLst>
+              </p:cTn>
+              <p:prevCondLst>
+                <p:cond evt="onPrev" delay="0">
+                  <p:tgtEl>
+                    <p:sldTgt/>
+                  </p:tgtEl>
+                </p:cond>
+              </p:prevCondLst>
+              <p:nextCondLst>
+                <p:cond evt="onNext" delay="0">
+                  <p:tgtEl>
+                    <p:sldTgt/>
+                  </p:tgtEl>
+                </p:cond>
+              </p:nextCondLst>
+            </p:seq>
+          </p:childTnLst>
+        </p:cTn>
+      </p:par>
+    </p:tnLst>
+    <p:bldLst>
+      <p:bldP spid="4" grpId="0" animBg="1"/>
+      <p:bldP spid="7" grpId="0" animBg="1"/>
+    </p:bldLst>
+  </p:timing>
+</p:sld>
+</file>
+
+<file path=ppt/slides/slide28.xml><?xml version="1.0" encoding="utf-8"?>
+<p:sld xmlns:a="http://schemas.openxmlformats.org/drawingml/2006/main" xmlns:r="http://schemas.openxmlformats.org/officeDocument/2006/relationships" xmlns:p="http://schemas.openxmlformats.org/presentationml/2006/main">
+  <p:cSld>
+    <p:spTree>
+      <p:nvGrpSpPr>
+        <p:cNvPr id="1" name=""/>
+        <p:cNvGrpSpPr/>
+        <p:nvPr/>
+      </p:nvGrpSpPr>
+      <p:grpSpPr>
+        <a:xfrm>
+          <a:off x="0" y="0"/>
+          <a:ext cx="0" cy="0"/>
+          <a:chOff x="0" y="0"/>
+          <a:chExt cx="0" cy="0"/>
+        </a:xfrm>
+      </p:grpSpPr>
+      <p:sp>
+        <p:nvSpPr>
+          <p:cNvPr id="2" name="TextBox 1"/>
+          <p:cNvSpPr txBox="1"/>
+          <p:nvPr/>
+        </p:nvSpPr>
+        <p:spPr>
+          <a:xfrm>
+            <a:off x="323528" y="332656"/>
+            <a:ext cx="6340197" cy="3785652"/>
+          </a:xfrm>
+          <a:prstGeom prst="rect">
+            <a:avLst/>
+          </a:prstGeom>
+          <a:noFill/>
+          <a:ln>
+            <a:solidFill>
+              <a:schemeClr val="accent1"/>
+            </a:solidFill>
+          </a:ln>
+        </p:spPr>
+        <p:txBody>
+          <a:bodyPr wrap="none" rtlCol="0">
+            <a:spAutoFit/>
+          </a:bodyPr>
+          <a:lstStyle/>
+          <a:p>
+            <a:r>
+              <a:rPr lang="en-GB" sz="4000" dirty="0" smtClean="0">
+                <a:latin typeface="Courier New" panose="02070309020205020404" pitchFamily="49" charset="0"/>
+                <a:cs typeface="Courier New" panose="02070309020205020404" pitchFamily="49" charset="0"/>
+              </a:rPr>
+              <a:t>main </a:t>
+            </a:r>
+            <a:r>
+              <a:rPr lang="en-GB" sz="4000" dirty="0" smtClean="0">
+                <a:solidFill>
+                  <a:srgbClr val="FF0000"/>
+                </a:solidFill>
+                <a:latin typeface="Courier New" panose="02070309020205020404" pitchFamily="49" charset="0"/>
+                <a:cs typeface="Courier New" panose="02070309020205020404" pitchFamily="49" charset="0"/>
+              </a:rPr>
+              <a:t>=</a:t>
+            </a:r>
+            <a:r>
+              <a:rPr lang="en-GB" sz="4000" dirty="0" smtClean="0">
+                <a:latin typeface="Courier New" panose="02070309020205020404" pitchFamily="49" charset="0"/>
+                <a:cs typeface="Courier New" panose="02070309020205020404" pitchFamily="49" charset="0"/>
+              </a:rPr>
+              <a:t> </a:t>
+            </a:r>
+            <a:r>
+              <a:rPr lang="en-GB" sz="4000" dirty="0" smtClean="0">
+                <a:solidFill>
+                  <a:srgbClr val="0070C0"/>
+                </a:solidFill>
+                <a:latin typeface="Courier New" panose="02070309020205020404" pitchFamily="49" charset="0"/>
+                <a:cs typeface="Courier New" panose="02070309020205020404" pitchFamily="49" charset="0"/>
+              </a:rPr>
+              <a:t>do</a:t>
+            </a:r>
+          </a:p>
+          <a:p>
+            <a:r>
+              <a:rPr lang="en-GB" sz="4000" dirty="0">
+                <a:latin typeface="Courier New" panose="02070309020205020404" pitchFamily="49" charset="0"/>
+                <a:cs typeface="Courier New" panose="02070309020205020404" pitchFamily="49" charset="0"/>
+              </a:rPr>
+              <a:t> </a:t>
+            </a:r>
+            <a:r>
+              <a:rPr lang="en-GB" sz="4000" dirty="0" smtClean="0">
+                <a:latin typeface="Courier New" panose="02070309020205020404" pitchFamily="49" charset="0"/>
+                <a:cs typeface="Courier New" panose="02070309020205020404" pitchFamily="49" charset="0"/>
+              </a:rPr>
+              <a:t> str </a:t>
+            </a:r>
+            <a:r>
+              <a:rPr lang="en-GB" sz="4000" dirty="0" smtClean="0">
+                <a:solidFill>
+                  <a:srgbClr val="FF0000"/>
+                </a:solidFill>
+                <a:latin typeface="Courier New" panose="02070309020205020404" pitchFamily="49" charset="0"/>
+                <a:cs typeface="Courier New" panose="02070309020205020404" pitchFamily="49" charset="0"/>
+              </a:rPr>
+              <a:t>&lt;-</a:t>
+            </a:r>
+            <a:r>
+              <a:rPr lang="en-GB" sz="4000" dirty="0" smtClean="0">
+                <a:latin typeface="Courier New" panose="02070309020205020404" pitchFamily="49" charset="0"/>
+                <a:cs typeface="Courier New" panose="02070309020205020404" pitchFamily="49" charset="0"/>
+              </a:rPr>
+              <a:t> getContents</a:t>
+            </a:r>
+          </a:p>
+          <a:p>
+            <a:r>
+              <a:rPr lang="en-GB" sz="4000" dirty="0">
+                <a:latin typeface="Courier New" panose="02070309020205020404" pitchFamily="49" charset="0"/>
+                <a:cs typeface="Courier New" panose="02070309020205020404" pitchFamily="49" charset="0"/>
+              </a:rPr>
+              <a:t> </a:t>
+            </a:r>
+            <a:r>
+              <a:rPr lang="en-GB" sz="4000" dirty="0" smtClean="0">
+                <a:latin typeface="Courier New" panose="02070309020205020404" pitchFamily="49" charset="0"/>
+                <a:cs typeface="Courier New" panose="02070309020205020404" pitchFamily="49" charset="0"/>
+              </a:rPr>
+              <a:t> </a:t>
+            </a:r>
+            <a:r>
+              <a:rPr lang="en-GB" sz="4000" dirty="0" smtClean="0">
+                <a:solidFill>
+                  <a:srgbClr val="0070C0"/>
+                </a:solidFill>
+                <a:latin typeface="Courier New" panose="02070309020205020404" pitchFamily="49" charset="0"/>
+                <a:cs typeface="Courier New" panose="02070309020205020404" pitchFamily="49" charset="0"/>
+              </a:rPr>
+              <a:t>let</a:t>
+            </a:r>
+            <a:r>
+              <a:rPr lang="en-GB" sz="4000" dirty="0" smtClean="0">
+                <a:latin typeface="Courier New" panose="02070309020205020404" pitchFamily="49" charset="0"/>
+                <a:cs typeface="Courier New" panose="02070309020205020404" pitchFamily="49" charset="0"/>
+              </a:rPr>
+              <a:t> str' </a:t>
+            </a:r>
+            <a:r>
+              <a:rPr lang="en-GB" sz="4000" dirty="0" smtClean="0">
+                <a:solidFill>
+                  <a:srgbClr val="FF0000"/>
+                </a:solidFill>
+                <a:latin typeface="Courier New" panose="02070309020205020404" pitchFamily="49" charset="0"/>
+                <a:cs typeface="Courier New" panose="02070309020205020404" pitchFamily="49" charset="0"/>
+              </a:rPr>
+              <a:t>=</a:t>
+            </a:r>
+            <a:r>
+              <a:rPr lang="en-GB" sz="4000" dirty="0" smtClean="0">
+                <a:latin typeface="Courier New" panose="02070309020205020404" pitchFamily="49" charset="0"/>
+                <a:cs typeface="Courier New" panose="02070309020205020404" pitchFamily="49" charset="0"/>
+              </a:rPr>
+              <a:t> f str</a:t>
+            </a:r>
+          </a:p>
+          <a:p>
+            <a:r>
+              <a:rPr lang="en-GB" sz="4000" dirty="0">
+                <a:latin typeface="Courier New" panose="02070309020205020404" pitchFamily="49" charset="0"/>
+                <a:cs typeface="Courier New" panose="02070309020205020404" pitchFamily="49" charset="0"/>
+              </a:rPr>
+              <a:t> </a:t>
+            </a:r>
+            <a:r>
+              <a:rPr lang="en-GB" sz="4000" dirty="0" smtClean="0">
+                <a:latin typeface="Courier New" panose="02070309020205020404" pitchFamily="49" charset="0"/>
+                <a:cs typeface="Courier New" panose="02070309020205020404" pitchFamily="49" charset="0"/>
+              </a:rPr>
+              <a:t> putStr str'</a:t>
+            </a:r>
+          </a:p>
+          <a:p>
+            <a:endParaRPr lang="en-GB" sz="4000" dirty="0" smtClean="0">
+              <a:latin typeface="Courier New" panose="02070309020205020404" pitchFamily="49" charset="0"/>
+              <a:cs typeface="Courier New" panose="02070309020205020404" pitchFamily="49" charset="0"/>
+            </a:endParaRPr>
+          </a:p>
+          <a:p>
+            <a:r>
+              <a:rPr lang="en-GB" sz="4000" dirty="0" smtClean="0">
+                <a:latin typeface="Courier New" panose="02070309020205020404" pitchFamily="49" charset="0"/>
+                <a:cs typeface="Courier New" panose="02070309020205020404" pitchFamily="49" charset="0"/>
+              </a:rPr>
+              <a:t>f </a:t>
+            </a:r>
+            <a:r>
+              <a:rPr lang="en-GB" sz="4000" dirty="0" smtClean="0">
+                <a:solidFill>
+                  <a:srgbClr val="FF0000"/>
+                </a:solidFill>
+                <a:latin typeface="Courier New" panose="02070309020205020404" pitchFamily="49" charset="0"/>
+                <a:cs typeface="Courier New" panose="02070309020205020404" pitchFamily="49" charset="0"/>
+              </a:rPr>
+              <a:t>=</a:t>
+            </a:r>
+            <a:r>
+              <a:rPr lang="en-GB" sz="4000" dirty="0" smtClean="0">
+                <a:latin typeface="Courier New" panose="02070309020205020404" pitchFamily="49" charset="0"/>
+                <a:cs typeface="Courier New" panose="02070309020205020404" pitchFamily="49" charset="0"/>
+              </a:rPr>
+              <a:t> take 100</a:t>
+            </a:r>
+            <a:endParaRPr lang="en-GB" sz="4000" dirty="0" smtClean="0">
+              <a:latin typeface="Courier New" panose="02070309020205020404" pitchFamily="49" charset="0"/>
+              <a:cs typeface="Courier New" panose="02070309020205020404" pitchFamily="49" charset="0"/>
+            </a:endParaRPr>
+          </a:p>
+        </p:txBody>
+      </p:sp>
+      <p:sp>
+        <p:nvSpPr>
+          <p:cNvPr id="4" name="TextBox 3"/>
+          <p:cNvSpPr txBox="1"/>
+          <p:nvPr/>
+        </p:nvSpPr>
+        <p:spPr>
+          <a:xfrm>
+            <a:off x="323528" y="4725144"/>
+            <a:ext cx="8186857" cy="707886"/>
+          </a:xfrm>
+          <a:prstGeom prst="rect">
+            <a:avLst/>
+          </a:prstGeom>
+          <a:noFill/>
+          <a:ln>
+            <a:solidFill>
+              <a:schemeClr val="accent1"/>
+            </a:solidFill>
+          </a:ln>
+        </p:spPr>
+        <p:txBody>
+          <a:bodyPr wrap="none" rtlCol="0">
+            <a:spAutoFit/>
+          </a:bodyPr>
+          <a:lstStyle/>
+          <a:p>
+            <a:r>
+              <a:rPr lang="en-GB" sz="4000" dirty="0" smtClean="0">
+                <a:latin typeface="Courier New" panose="02070309020205020404" pitchFamily="49" charset="0"/>
+                <a:cs typeface="Courier New" panose="02070309020205020404" pitchFamily="49" charset="0"/>
+              </a:rPr>
+              <a:t>main </a:t>
+            </a:r>
+            <a:r>
+              <a:rPr lang="en-GB" sz="4000" dirty="0" smtClean="0">
+                <a:solidFill>
+                  <a:srgbClr val="FF0000"/>
+                </a:solidFill>
+                <a:latin typeface="Courier New" panose="02070309020205020404" pitchFamily="49" charset="0"/>
+                <a:cs typeface="Courier New" panose="02070309020205020404" pitchFamily="49" charset="0"/>
+              </a:rPr>
+              <a:t>=</a:t>
+            </a:r>
+            <a:r>
+              <a:rPr lang="en-GB" sz="4000" dirty="0" smtClean="0">
+                <a:latin typeface="Courier New" panose="02070309020205020404" pitchFamily="49" charset="0"/>
+                <a:cs typeface="Courier New" panose="02070309020205020404" pitchFamily="49" charset="0"/>
+              </a:rPr>
+              <a:t> interact </a:t>
+            </a:r>
+            <a:r>
+              <a:rPr lang="en-GB" sz="4000" dirty="0" smtClean="0">
+                <a:solidFill>
+                  <a:srgbClr val="FF0000"/>
+                </a:solidFill>
+                <a:latin typeface="Courier New" panose="02070309020205020404" pitchFamily="49" charset="0"/>
+                <a:cs typeface="Courier New" panose="02070309020205020404" pitchFamily="49" charset="0"/>
+              </a:rPr>
+              <a:t>$</a:t>
+            </a:r>
+            <a:r>
+              <a:rPr lang="en-GB" sz="4000" dirty="0" smtClean="0">
+                <a:latin typeface="Courier New" panose="02070309020205020404" pitchFamily="49" charset="0"/>
+                <a:cs typeface="Courier New" panose="02070309020205020404" pitchFamily="49" charset="0"/>
+              </a:rPr>
+              <a:t> take 100</a:t>
+            </a:r>
+            <a:endParaRPr lang="en-GB" sz="4000" dirty="0" smtClean="0">
+              <a:latin typeface="Courier New" panose="02070309020205020404" pitchFamily="49" charset="0"/>
+              <a:cs typeface="Courier New" panose="02070309020205020404" pitchFamily="49" charset="0"/>
+            </a:endParaRPr>
+          </a:p>
+        </p:txBody>
+      </p:sp>
+    </p:spTree>
+    <p:extLst>
+      <p:ext uri="{BB962C8B-B14F-4D97-AF65-F5344CB8AC3E}">
+        <p14:creationId xmlns:p14="http://schemas.microsoft.com/office/powerpoint/2010/main" val="119479251"/>
+      </p:ext>
+    </p:extLst>
+  </p:cSld>
+  <p:clrMapOvr>
+    <a:masterClrMapping/>
+  </p:clrMapOvr>
+  <p:timing>
+    <p:tnLst>
+      <p:par>
+        <p:cTn id="1" dur="indefinite" restart="never" nodeType="tmRoot">
+          <p:childTnLst>
+            <p:seq concurrent="1" nextAc="seek">
+              <p:cTn id="2" dur="indefinite" nodeType="mainSeq">
+                <p:childTnLst>
+                  <p:par>
+                    <p:cTn id="3" fill="hold">
+                      <p:stCondLst>
+                        <p:cond delay="indefinite"/>
+                      </p:stCondLst>
+                      <p:childTnLst>
+                        <p:par>
+                          <p:cTn id="4" fill="hold">
+                            <p:stCondLst>
+                              <p:cond delay="0"/>
+                            </p:stCondLst>
+                            <p:childTnLst>
+                              <p:par>
+                                <p:cTn id="5" presetID="1" presetClass="entr" presetSubtype="0" fill="hold" grpId="0" nodeType="clickEffect">
+                                  <p:stCondLst>
+                                    <p:cond delay="0"/>
+                                  </p:stCondLst>
+                                  <p:childTnLst>
+                                    <p:set>
+                                      <p:cBhvr>
+                                        <p:cTn id="6" dur="1" fill="hold">
+                                          <p:stCondLst>
+                                            <p:cond delay="0"/>
+                                          </p:stCondLst>
+                                        </p:cTn>
+                                        <p:tgtEl>
+                                          <p:spTgt spid="4"/>
+                                        </p:tgtEl>
+                                        <p:attrNameLst>
+                                          <p:attrName>style.visibility</p:attrName>
+                                        </p:attrNameLst>
+                                      </p:cBhvr>
+                                      <p:to>
+                                        <p:strVal val="visible"/>
+                                      </p:to>
+                                    </p:set>
+                                  </p:childTnLst>
+                                </p:cTn>
+                              </p:par>
+                            </p:childTnLst>
+                          </p:cTn>
+                        </p:par>
+                      </p:childTnLst>
+                    </p:cTn>
+                  </p:par>
+                </p:childTnLst>
+              </p:cTn>
+              <p:prevCondLst>
+                <p:cond evt="onPrev" delay="0">
+                  <p:tgtEl>
+                    <p:sldTgt/>
+                  </p:tgtEl>
+                </p:cond>
+              </p:prevCondLst>
+              <p:nextCondLst>
+                <p:cond evt="onNext" delay="0">
+                  <p:tgtEl>
+                    <p:sldTgt/>
+                  </p:tgtEl>
+                </p:cond>
+              </p:nextCondLst>
+            </p:seq>
+          </p:childTnLst>
+        </p:cTn>
+      </p:par>
+    </p:tnLst>
+    <p:bldLst>
+      <p:bldP spid="4" grpId="0" animBg="1"/>
+    </p:bldLst>
   </p:timing>
 </p:sld>
 </file>

</xml_diff>

<commit_message>
Add more to the section on I/O
</commit_message>
<xml_diff>
--- a/beginning-haskell.pptx
+++ b/beginning-haskell.pptx
@@ -12563,6 +12563,134 @@
           </a:p>
         </p:txBody>
       </p:sp>
+      <p:sp>
+        <p:nvSpPr>
+          <p:cNvPr id="6" name="TextBox 5"/>
+          <p:cNvSpPr txBox="1"/>
+          <p:nvPr/>
+        </p:nvSpPr>
+        <p:spPr>
+          <a:xfrm>
+            <a:off x="107504" y="6002124"/>
+            <a:ext cx="8561959" cy="523220"/>
+          </a:xfrm>
+          <a:prstGeom prst="rect">
+            <a:avLst/>
+          </a:prstGeom>
+          <a:noFill/>
+          <a:ln>
+            <a:solidFill>
+              <a:schemeClr val="accent1">
+                <a:shade val="95000"/>
+                <a:satMod val="105000"/>
+              </a:schemeClr>
+            </a:solidFill>
+          </a:ln>
+        </p:spPr>
+        <p:txBody>
+          <a:bodyPr wrap="none" rtlCol="0">
+            <a:spAutoFit/>
+          </a:bodyPr>
+          <a:lstStyle/>
+          <a:p>
+            <a:r>
+              <a:rPr lang="en-GB" sz="2800" dirty="0" smtClean="0">
+                <a:latin typeface="Courier New" panose="02070309020205020404" pitchFamily="49" charset="0"/>
+                <a:cs typeface="Courier New" panose="02070309020205020404" pitchFamily="49" charset="0"/>
+              </a:rPr>
+              <a:t>interact </a:t>
+            </a:r>
+            <a:r>
+              <a:rPr lang="en-GB" sz="2800" dirty="0" smtClean="0">
+                <a:solidFill>
+                  <a:srgbClr val="FF0000"/>
+                </a:solidFill>
+                <a:latin typeface="Courier New" panose="02070309020205020404" pitchFamily="49" charset="0"/>
+                <a:cs typeface="Courier New" panose="02070309020205020404" pitchFamily="49" charset="0"/>
+              </a:rPr>
+              <a:t>::</a:t>
+            </a:r>
+            <a:r>
+              <a:rPr lang="en-GB" sz="2800" dirty="0" smtClean="0">
+                <a:latin typeface="Courier New" panose="02070309020205020404" pitchFamily="49" charset="0"/>
+                <a:cs typeface="Courier New" panose="02070309020205020404" pitchFamily="49" charset="0"/>
+              </a:rPr>
+              <a:t> (String </a:t>
+            </a:r>
+            <a:r>
+              <a:rPr lang="en-GB" sz="2800" dirty="0" smtClean="0">
+                <a:solidFill>
+                  <a:srgbClr val="FF0000"/>
+                </a:solidFill>
+                <a:latin typeface="Courier New" panose="02070309020205020404" pitchFamily="49" charset="0"/>
+                <a:cs typeface="Courier New" panose="02070309020205020404" pitchFamily="49" charset="0"/>
+              </a:rPr>
+              <a:t>-&gt;</a:t>
+            </a:r>
+            <a:r>
+              <a:rPr lang="en-GB" sz="2800" dirty="0" smtClean="0">
+                <a:latin typeface="Courier New" panose="02070309020205020404" pitchFamily="49" charset="0"/>
+                <a:cs typeface="Courier New" panose="02070309020205020404" pitchFamily="49" charset="0"/>
+              </a:rPr>
+              <a:t> String) </a:t>
+            </a:r>
+            <a:r>
+              <a:rPr lang="en-GB" sz="2800" dirty="0" smtClean="0">
+                <a:solidFill>
+                  <a:srgbClr val="FF0000"/>
+                </a:solidFill>
+                <a:latin typeface="Courier New" panose="02070309020205020404" pitchFamily="49" charset="0"/>
+                <a:cs typeface="Courier New" panose="02070309020205020404" pitchFamily="49" charset="0"/>
+              </a:rPr>
+              <a:t>-&gt;</a:t>
+            </a:r>
+            <a:r>
+              <a:rPr lang="en-GB" sz="2800" dirty="0" smtClean="0">
+                <a:latin typeface="Courier New" panose="02070309020205020404" pitchFamily="49" charset="0"/>
+                <a:cs typeface="Courier New" panose="02070309020205020404" pitchFamily="49" charset="0"/>
+              </a:rPr>
+              <a:t> IO ()</a:t>
+            </a:r>
+            <a:endParaRPr lang="en-GB" sz="2800" dirty="0" smtClean="0">
+              <a:latin typeface="Courier New" panose="02070309020205020404" pitchFamily="49" charset="0"/>
+              <a:cs typeface="Courier New" panose="02070309020205020404" pitchFamily="49" charset="0"/>
+            </a:endParaRPr>
+          </a:p>
+        </p:txBody>
+      </p:sp>
+      <p:cxnSp>
+        <p:nvCxnSpPr>
+          <p:cNvPr id="8" name="Straight Arrow Connector 7"/>
+          <p:cNvCxnSpPr/>
+          <p:nvPr/>
+        </p:nvCxnSpPr>
+        <p:spPr>
+          <a:xfrm flipV="1">
+            <a:off x="1475656" y="5589240"/>
+            <a:ext cx="936104" cy="412884"/>
+          </a:xfrm>
+          <a:prstGeom prst="straightConnector1">
+            <a:avLst/>
+          </a:prstGeom>
+          <a:ln w="28575">
+            <a:tailEnd type="arrow"/>
+          </a:ln>
+        </p:spPr>
+        <p:style>
+          <a:lnRef idx="1">
+            <a:schemeClr val="accent1"/>
+          </a:lnRef>
+          <a:fillRef idx="0">
+            <a:schemeClr val="accent1"/>
+          </a:fillRef>
+          <a:effectRef idx="0">
+            <a:schemeClr val="accent1"/>
+          </a:effectRef>
+          <a:fontRef idx="minor">
+            <a:schemeClr val="tx1"/>
+          </a:fontRef>
+        </p:style>
+      </p:cxnSp>
     </p:spTree>
     <p:extLst>
       <p:ext uri="{BB962C8B-B14F-4D97-AF65-F5344CB8AC3E}">
@@ -12626,6 +12754,78 @@
                       </p:childTnLst>
                     </p:cTn>
                   </p:par>
+                  <p:par>
+                    <p:cTn id="7" fill="hold">
+                      <p:stCondLst>
+                        <p:cond delay="indefinite"/>
+                      </p:stCondLst>
+                      <p:childTnLst>
+                        <p:par>
+                          <p:cTn id="8" fill="hold">
+                            <p:stCondLst>
+                              <p:cond delay="0"/>
+                            </p:stCondLst>
+                            <p:childTnLst>
+                              <p:par>
+                                <p:cTn id="9" presetID="1" presetClass="entr" presetSubtype="0" fill="hold" nodeType="clickEffect">
+                                  <p:stCondLst>
+                                    <p:cond delay="0"/>
+                                  </p:stCondLst>
+                                  <p:childTnLst>
+                                    <p:set>
+                                      <p:cBhvr>
+                                        <p:cTn id="10" dur="1" fill="hold">
+                                          <p:stCondLst>
+                                            <p:cond delay="0"/>
+                                          </p:stCondLst>
+                                        </p:cTn>
+                                        <p:tgtEl>
+                                          <p:spTgt spid="8"/>
+                                        </p:tgtEl>
+                                        <p:attrNameLst>
+                                          <p:attrName>style.visibility</p:attrName>
+                                        </p:attrNameLst>
+                                      </p:cBhvr>
+                                      <p:to>
+                                        <p:strVal val="visible"/>
+                                      </p:to>
+                                    </p:set>
+                                  </p:childTnLst>
+                                </p:cTn>
+                              </p:par>
+                              <p:par>
+                                <p:cTn id="11" presetID="1" presetClass="entr" presetSubtype="0" fill="hold" grpId="0" nodeType="withEffect">
+                                  <p:stCondLst>
+                                    <p:cond delay="0"/>
+                                  </p:stCondLst>
+                                  <p:childTnLst>
+                                    <p:set>
+                                      <p:cBhvr>
+                                        <p:cTn id="12" dur="1" fill="hold">
+                                          <p:stCondLst>
+                                            <p:cond delay="0"/>
+                                          </p:stCondLst>
+                                        </p:cTn>
+                                        <p:tgtEl>
+                                          <p:spTgt spid="6"/>
+                                        </p:tgtEl>
+                                        <p:attrNameLst>
+                                          <p:attrName>style.visibility</p:attrName>
+                                        </p:attrNameLst>
+                                      </p:cBhvr>
+                                      <p:to>
+                                        <p:strVal val="visible"/>
+                                      </p:to>
+                                    </p:set>
+                                  </p:childTnLst>
+                                </p:cTn>
+                              </p:par>
+                            </p:childTnLst>
+                          </p:cTn>
+                        </p:par>
+                      </p:childTnLst>
+                    </p:cTn>
+                  </p:par>
                 </p:childTnLst>
               </p:cTn>
               <p:prevCondLst>
@@ -12649,6 +12849,7 @@
     </p:tnLst>
     <p:bldLst>
       <p:bldP spid="4" grpId="0" animBg="1"/>
+      <p:bldP spid="6" grpId="0" animBg="1"/>
     </p:bldLst>
   </p:timing>
 </p:sld>

</xml_diff>

<commit_message>
Add zipWith, folds, (.) and laziness
</commit_message>
<xml_diff>
--- a/beginning-haskell.pptx
+++ b/beginning-haskell.pptx
@@ -5,10 +5,10 @@
     <p:sldMasterId id="2147483648" r:id="rId1"/>
   </p:sldMasterIdLst>
   <p:notesMasterIdLst>
-    <p:notesMasterId r:id="rId30"/>
+    <p:notesMasterId r:id="rId34"/>
   </p:notesMasterIdLst>
   <p:handoutMasterIdLst>
-    <p:handoutMasterId r:id="rId31"/>
+    <p:handoutMasterId r:id="rId35"/>
   </p:handoutMasterIdLst>
   <p:sldIdLst>
     <p:sldId id="263" r:id="rId2"/>
@@ -36,9 +36,13 @@
     <p:sldId id="282" r:id="rId24"/>
     <p:sldId id="283" r:id="rId25"/>
     <p:sldId id="286" r:id="rId26"/>
-    <p:sldId id="287" r:id="rId27"/>
-    <p:sldId id="285" r:id="rId28"/>
-    <p:sldId id="288" r:id="rId29"/>
+    <p:sldId id="290" r:id="rId27"/>
+    <p:sldId id="287" r:id="rId28"/>
+    <p:sldId id="285" r:id="rId29"/>
+    <p:sldId id="288" r:id="rId30"/>
+    <p:sldId id="289" r:id="rId31"/>
+    <p:sldId id="291" r:id="rId32"/>
+    <p:sldId id="292" r:id="rId33"/>
   </p:sldIdLst>
   <p:sldSz cx="9144000" cy="6858000" type="screen4x3"/>
   <p:notesSz cx="6797675" cy="9926638"/>
@@ -1005,6 +1009,374 @@
             <a:fld id="{999CC533-FB79-4577-A6D0-2326348CB1C0}" type="slidenum">
               <a:rPr lang="en-GB" smtClean="0"/>
               <a:t>25</a:t>
+            </a:fld>
+            <a:endParaRPr lang="en-GB" dirty="0"/>
+          </a:p>
+        </p:txBody>
+      </p:sp>
+    </p:spTree>
+    <p:extLst>
+      <p:ext uri="{BB962C8B-B14F-4D97-AF65-F5344CB8AC3E}">
+        <p14:creationId xmlns:p14="http://schemas.microsoft.com/office/powerpoint/2010/main" val="4125636590"/>
+      </p:ext>
+    </p:extLst>
+  </p:cSld>
+  <p:clrMapOvr>
+    <a:masterClrMapping/>
+  </p:clrMapOvr>
+</p:notes>
+</file>
+
+<file path=ppt/notesSlides/notesSlide13.xml><?xml version="1.0" encoding="utf-8"?>
+<p:notes xmlns:a="http://schemas.openxmlformats.org/drawingml/2006/main" xmlns:r="http://schemas.openxmlformats.org/officeDocument/2006/relationships" xmlns:p="http://schemas.openxmlformats.org/presentationml/2006/main">
+  <p:cSld>
+    <p:spTree>
+      <p:nvGrpSpPr>
+        <p:cNvPr id="1" name=""/>
+        <p:cNvGrpSpPr/>
+        <p:nvPr/>
+      </p:nvGrpSpPr>
+      <p:grpSpPr>
+        <a:xfrm>
+          <a:off x="0" y="0"/>
+          <a:ext cx="0" cy="0"/>
+          <a:chOff x="0" y="0"/>
+          <a:chExt cx="0" cy="0"/>
+        </a:xfrm>
+      </p:grpSpPr>
+      <p:sp>
+        <p:nvSpPr>
+          <p:cNvPr id="2" name="Slide Image Placeholder 1"/>
+          <p:cNvSpPr>
+            <a:spLocks noGrp="1" noRot="1" noChangeAspect="1"/>
+          </p:cNvSpPr>
+          <p:nvPr>
+            <p:ph type="sldImg"/>
+          </p:nvPr>
+        </p:nvSpPr>
+        <p:spPr/>
+      </p:sp>
+      <p:sp>
+        <p:nvSpPr>
+          <p:cNvPr id="3" name="Notes Placeholder 2"/>
+          <p:cNvSpPr>
+            <a:spLocks noGrp="1"/>
+          </p:cNvSpPr>
+          <p:nvPr>
+            <p:ph type="body" idx="1"/>
+          </p:nvPr>
+        </p:nvSpPr>
+        <p:spPr/>
+        <p:txBody>
+          <a:bodyPr/>
+          <a:lstStyle/>
+          <a:p>
+            <a:r>
+              <a:rPr lang="en-GB" dirty="0" smtClean="0"/>
+              <a:t>These slides accompany a two-hour “Beginning</a:t>
+            </a:r>
+            <a:r>
+              <a:rPr lang="en-GB" baseline="0" dirty="0" smtClean="0"/>
+              <a:t> Haskell” course.</a:t>
+            </a:r>
+            <a:endParaRPr lang="en-GB" dirty="0"/>
+          </a:p>
+        </p:txBody>
+      </p:sp>
+      <p:sp>
+        <p:nvSpPr>
+          <p:cNvPr id="4" name="Slide Number Placeholder 3"/>
+          <p:cNvSpPr>
+            <a:spLocks noGrp="1"/>
+          </p:cNvSpPr>
+          <p:nvPr>
+            <p:ph type="sldNum" sz="quarter" idx="10"/>
+          </p:nvPr>
+        </p:nvSpPr>
+        <p:spPr/>
+        <p:txBody>
+          <a:bodyPr/>
+          <a:lstStyle/>
+          <a:p>
+            <a:fld id="{999CC533-FB79-4577-A6D0-2326348CB1C0}" type="slidenum">
+              <a:rPr lang="en-GB" smtClean="0"/>
+              <a:t>26</a:t>
+            </a:fld>
+            <a:endParaRPr lang="en-GB" dirty="0"/>
+          </a:p>
+        </p:txBody>
+      </p:sp>
+    </p:spTree>
+    <p:extLst>
+      <p:ext uri="{BB962C8B-B14F-4D97-AF65-F5344CB8AC3E}">
+        <p14:creationId xmlns:p14="http://schemas.microsoft.com/office/powerpoint/2010/main" val="4125636590"/>
+      </p:ext>
+    </p:extLst>
+  </p:cSld>
+  <p:clrMapOvr>
+    <a:masterClrMapping/>
+  </p:clrMapOvr>
+</p:notes>
+</file>
+
+<file path=ppt/notesSlides/notesSlide14.xml><?xml version="1.0" encoding="utf-8"?>
+<p:notes xmlns:a="http://schemas.openxmlformats.org/drawingml/2006/main" xmlns:r="http://schemas.openxmlformats.org/officeDocument/2006/relationships" xmlns:p="http://schemas.openxmlformats.org/presentationml/2006/main">
+  <p:cSld>
+    <p:spTree>
+      <p:nvGrpSpPr>
+        <p:cNvPr id="1" name=""/>
+        <p:cNvGrpSpPr/>
+        <p:nvPr/>
+      </p:nvGrpSpPr>
+      <p:grpSpPr>
+        <a:xfrm>
+          <a:off x="0" y="0"/>
+          <a:ext cx="0" cy="0"/>
+          <a:chOff x="0" y="0"/>
+          <a:chExt cx="0" cy="0"/>
+        </a:xfrm>
+      </p:grpSpPr>
+      <p:sp>
+        <p:nvSpPr>
+          <p:cNvPr id="2" name="Slide Image Placeholder 1"/>
+          <p:cNvSpPr>
+            <a:spLocks noGrp="1" noRot="1" noChangeAspect="1"/>
+          </p:cNvSpPr>
+          <p:nvPr>
+            <p:ph type="sldImg"/>
+          </p:nvPr>
+        </p:nvSpPr>
+        <p:spPr/>
+      </p:sp>
+      <p:sp>
+        <p:nvSpPr>
+          <p:cNvPr id="3" name="Notes Placeholder 2"/>
+          <p:cNvSpPr>
+            <a:spLocks noGrp="1"/>
+          </p:cNvSpPr>
+          <p:nvPr>
+            <p:ph type="body" idx="1"/>
+          </p:nvPr>
+        </p:nvSpPr>
+        <p:spPr/>
+        <p:txBody>
+          <a:bodyPr/>
+          <a:lstStyle/>
+          <a:p>
+            <a:r>
+              <a:rPr lang="en-GB" dirty="0" smtClean="0"/>
+              <a:t>These slides accompany a two-hour “Beginning</a:t>
+            </a:r>
+            <a:r>
+              <a:rPr lang="en-GB" baseline="0" dirty="0" smtClean="0"/>
+              <a:t> Haskell” course.</a:t>
+            </a:r>
+            <a:endParaRPr lang="en-GB" dirty="0"/>
+          </a:p>
+        </p:txBody>
+      </p:sp>
+      <p:sp>
+        <p:nvSpPr>
+          <p:cNvPr id="4" name="Slide Number Placeholder 3"/>
+          <p:cNvSpPr>
+            <a:spLocks noGrp="1"/>
+          </p:cNvSpPr>
+          <p:nvPr>
+            <p:ph type="sldNum" sz="quarter" idx="10"/>
+          </p:nvPr>
+        </p:nvSpPr>
+        <p:spPr/>
+        <p:txBody>
+          <a:bodyPr/>
+          <a:lstStyle/>
+          <a:p>
+            <a:fld id="{999CC533-FB79-4577-A6D0-2326348CB1C0}" type="slidenum">
+              <a:rPr lang="en-GB" smtClean="0"/>
+              <a:t>30</a:t>
+            </a:fld>
+            <a:endParaRPr lang="en-GB" dirty="0"/>
+          </a:p>
+        </p:txBody>
+      </p:sp>
+    </p:spTree>
+    <p:extLst>
+      <p:ext uri="{BB962C8B-B14F-4D97-AF65-F5344CB8AC3E}">
+        <p14:creationId xmlns:p14="http://schemas.microsoft.com/office/powerpoint/2010/main" val="4125636590"/>
+      </p:ext>
+    </p:extLst>
+  </p:cSld>
+  <p:clrMapOvr>
+    <a:masterClrMapping/>
+  </p:clrMapOvr>
+</p:notes>
+</file>
+
+<file path=ppt/notesSlides/notesSlide15.xml><?xml version="1.0" encoding="utf-8"?>
+<p:notes xmlns:a="http://schemas.openxmlformats.org/drawingml/2006/main" xmlns:r="http://schemas.openxmlformats.org/officeDocument/2006/relationships" xmlns:p="http://schemas.openxmlformats.org/presentationml/2006/main">
+  <p:cSld>
+    <p:spTree>
+      <p:nvGrpSpPr>
+        <p:cNvPr id="1" name=""/>
+        <p:cNvGrpSpPr/>
+        <p:nvPr/>
+      </p:nvGrpSpPr>
+      <p:grpSpPr>
+        <a:xfrm>
+          <a:off x="0" y="0"/>
+          <a:ext cx="0" cy="0"/>
+          <a:chOff x="0" y="0"/>
+          <a:chExt cx="0" cy="0"/>
+        </a:xfrm>
+      </p:grpSpPr>
+      <p:sp>
+        <p:nvSpPr>
+          <p:cNvPr id="2" name="Slide Image Placeholder 1"/>
+          <p:cNvSpPr>
+            <a:spLocks noGrp="1" noRot="1" noChangeAspect="1"/>
+          </p:cNvSpPr>
+          <p:nvPr>
+            <p:ph type="sldImg"/>
+          </p:nvPr>
+        </p:nvSpPr>
+        <p:spPr/>
+      </p:sp>
+      <p:sp>
+        <p:nvSpPr>
+          <p:cNvPr id="3" name="Notes Placeholder 2"/>
+          <p:cNvSpPr>
+            <a:spLocks noGrp="1"/>
+          </p:cNvSpPr>
+          <p:nvPr>
+            <p:ph type="body" idx="1"/>
+          </p:nvPr>
+        </p:nvSpPr>
+        <p:spPr/>
+        <p:txBody>
+          <a:bodyPr/>
+          <a:lstStyle/>
+          <a:p>
+            <a:r>
+              <a:rPr lang="en-GB" dirty="0" smtClean="0"/>
+              <a:t>These slides accompany a two-hour “Beginning</a:t>
+            </a:r>
+            <a:r>
+              <a:rPr lang="en-GB" baseline="0" dirty="0" smtClean="0"/>
+              <a:t> Haskell” course.</a:t>
+            </a:r>
+            <a:endParaRPr lang="en-GB" dirty="0"/>
+          </a:p>
+        </p:txBody>
+      </p:sp>
+      <p:sp>
+        <p:nvSpPr>
+          <p:cNvPr id="4" name="Slide Number Placeholder 3"/>
+          <p:cNvSpPr>
+            <a:spLocks noGrp="1"/>
+          </p:cNvSpPr>
+          <p:nvPr>
+            <p:ph type="sldNum" sz="quarter" idx="10"/>
+          </p:nvPr>
+        </p:nvSpPr>
+        <p:spPr/>
+        <p:txBody>
+          <a:bodyPr/>
+          <a:lstStyle/>
+          <a:p>
+            <a:fld id="{999CC533-FB79-4577-A6D0-2326348CB1C0}" type="slidenum">
+              <a:rPr lang="en-GB" smtClean="0"/>
+              <a:t>31</a:t>
+            </a:fld>
+            <a:endParaRPr lang="en-GB" dirty="0"/>
+          </a:p>
+        </p:txBody>
+      </p:sp>
+    </p:spTree>
+    <p:extLst>
+      <p:ext uri="{BB962C8B-B14F-4D97-AF65-F5344CB8AC3E}">
+        <p14:creationId xmlns:p14="http://schemas.microsoft.com/office/powerpoint/2010/main" val="4125636590"/>
+      </p:ext>
+    </p:extLst>
+  </p:cSld>
+  <p:clrMapOvr>
+    <a:masterClrMapping/>
+  </p:clrMapOvr>
+</p:notes>
+</file>
+
+<file path=ppt/notesSlides/notesSlide16.xml><?xml version="1.0" encoding="utf-8"?>
+<p:notes xmlns:a="http://schemas.openxmlformats.org/drawingml/2006/main" xmlns:r="http://schemas.openxmlformats.org/officeDocument/2006/relationships" xmlns:p="http://schemas.openxmlformats.org/presentationml/2006/main">
+  <p:cSld>
+    <p:spTree>
+      <p:nvGrpSpPr>
+        <p:cNvPr id="1" name=""/>
+        <p:cNvGrpSpPr/>
+        <p:nvPr/>
+      </p:nvGrpSpPr>
+      <p:grpSpPr>
+        <a:xfrm>
+          <a:off x="0" y="0"/>
+          <a:ext cx="0" cy="0"/>
+          <a:chOff x="0" y="0"/>
+          <a:chExt cx="0" cy="0"/>
+        </a:xfrm>
+      </p:grpSpPr>
+      <p:sp>
+        <p:nvSpPr>
+          <p:cNvPr id="2" name="Slide Image Placeholder 1"/>
+          <p:cNvSpPr>
+            <a:spLocks noGrp="1" noRot="1" noChangeAspect="1"/>
+          </p:cNvSpPr>
+          <p:nvPr>
+            <p:ph type="sldImg"/>
+          </p:nvPr>
+        </p:nvSpPr>
+        <p:spPr/>
+      </p:sp>
+      <p:sp>
+        <p:nvSpPr>
+          <p:cNvPr id="3" name="Notes Placeholder 2"/>
+          <p:cNvSpPr>
+            <a:spLocks noGrp="1"/>
+          </p:cNvSpPr>
+          <p:nvPr>
+            <p:ph type="body" idx="1"/>
+          </p:nvPr>
+        </p:nvSpPr>
+        <p:spPr/>
+        <p:txBody>
+          <a:bodyPr/>
+          <a:lstStyle/>
+          <a:p>
+            <a:r>
+              <a:rPr lang="en-GB" dirty="0" smtClean="0"/>
+              <a:t>These slides accompany a two-hour “Beginning</a:t>
+            </a:r>
+            <a:r>
+              <a:rPr lang="en-GB" baseline="0" dirty="0" smtClean="0"/>
+              <a:t> Haskell” course.</a:t>
+            </a:r>
+            <a:endParaRPr lang="en-GB" dirty="0"/>
+          </a:p>
+        </p:txBody>
+      </p:sp>
+      <p:sp>
+        <p:nvSpPr>
+          <p:cNvPr id="4" name="Slide Number Placeholder 3"/>
+          <p:cNvSpPr>
+            <a:spLocks noGrp="1"/>
+          </p:cNvSpPr>
+          <p:nvPr>
+            <p:ph type="sldNum" sz="quarter" idx="10"/>
+          </p:nvPr>
+        </p:nvSpPr>
+        <p:spPr/>
+        <p:txBody>
+          <a:bodyPr/>
+          <a:lstStyle/>
+          <a:p>
+            <a:fld id="{999CC533-FB79-4577-A6D0-2326348CB1C0}" type="slidenum">
+              <a:rPr lang="en-GB" smtClean="0"/>
+              <a:t>32</a:t>
             </a:fld>
             <a:endParaRPr lang="en-GB" dirty="0"/>
           </a:p>
@@ -6145,6 +6517,128 @@
           </a:p>
         </p:txBody>
       </p:sp>
+      <p:sp>
+        <p:nvSpPr>
+          <p:cNvPr id="2" name="TextBox 1"/>
+          <p:cNvSpPr txBox="1"/>
+          <p:nvPr/>
+        </p:nvSpPr>
+        <p:spPr>
+          <a:xfrm>
+            <a:off x="683568" y="3789040"/>
+            <a:ext cx="6949338" cy="769441"/>
+          </a:xfrm>
+          <a:prstGeom prst="rect">
+            <a:avLst/>
+          </a:prstGeom>
+          <a:noFill/>
+          <a:ln>
+            <a:solidFill>
+              <a:schemeClr val="accent1">
+                <a:shade val="95000"/>
+                <a:satMod val="105000"/>
+              </a:schemeClr>
+            </a:solidFill>
+          </a:ln>
+        </p:spPr>
+        <p:txBody>
+          <a:bodyPr wrap="none" rtlCol="0">
+            <a:spAutoFit/>
+          </a:bodyPr>
+          <a:lstStyle/>
+          <a:p>
+            <a:r>
+              <a:rPr lang="en-GB" sz="4400" dirty="0" smtClean="0">
+                <a:latin typeface="Courier New" panose="02070309020205020404" pitchFamily="49" charset="0"/>
+                <a:cs typeface="Courier New" panose="02070309020205020404" pitchFamily="49" charset="0"/>
+              </a:rPr>
+              <a:t>"hi"      ['h', 'i']</a:t>
+            </a:r>
+            <a:endParaRPr lang="en-GB" sz="4400" dirty="0" smtClean="0">
+              <a:latin typeface="Courier New" panose="02070309020205020404" pitchFamily="49" charset="0"/>
+              <a:cs typeface="Courier New" panose="02070309020205020404" pitchFamily="49" charset="0"/>
+            </a:endParaRPr>
+          </a:p>
+        </p:txBody>
+      </p:sp>
+      <p:sp>
+        <p:nvSpPr>
+          <p:cNvPr id="4" name="TextBox 3"/>
+          <p:cNvSpPr txBox="1"/>
+          <p:nvPr/>
+        </p:nvSpPr>
+        <p:spPr>
+          <a:xfrm>
+            <a:off x="683568" y="5013176"/>
+            <a:ext cx="4243469" cy="769441"/>
+          </a:xfrm>
+          <a:prstGeom prst="rect">
+            <a:avLst/>
+          </a:prstGeom>
+          <a:noFill/>
+        </p:spPr>
+        <p:txBody>
+          <a:bodyPr wrap="none" rtlCol="0">
+            <a:spAutoFit/>
+          </a:bodyPr>
+          <a:lstStyle/>
+          <a:p>
+            <a:r>
+              <a:rPr lang="en-GB" sz="4400" dirty="0" smtClean="0">
+                <a:latin typeface="Courier New" panose="02070309020205020404" pitchFamily="49" charset="0"/>
+                <a:cs typeface="Courier New" panose="02070309020205020404" pitchFamily="49" charset="0"/>
+              </a:rPr>
+              <a:t>"hello" !! 1</a:t>
+            </a:r>
+            <a:endParaRPr lang="en-GB" sz="4400" dirty="0" smtClean="0">
+              <a:latin typeface="Courier New" panose="02070309020205020404" pitchFamily="49" charset="0"/>
+              <a:cs typeface="Courier New" panose="02070309020205020404" pitchFamily="49" charset="0"/>
+            </a:endParaRPr>
+          </a:p>
+        </p:txBody>
+      </p:sp>
+      <p:sp>
+        <p:nvSpPr>
+          <p:cNvPr id="5" name="TextBox 4"/>
+          <p:cNvSpPr txBox="1"/>
+          <p:nvPr/>
+        </p:nvSpPr>
+        <p:spPr>
+          <a:xfrm>
+            <a:off x="6300192" y="5013176"/>
+            <a:ext cx="1199367" cy="769441"/>
+          </a:xfrm>
+          <a:prstGeom prst="rect">
+            <a:avLst/>
+          </a:prstGeom>
+          <a:noFill/>
+        </p:spPr>
+        <p:txBody>
+          <a:bodyPr wrap="none" rtlCol="0">
+            <a:spAutoFit/>
+          </a:bodyPr>
+          <a:lstStyle/>
+          <a:p>
+            <a:r>
+              <a:rPr lang="en-GB" sz="4400" dirty="0" smtClean="0">
+                <a:solidFill>
+                  <a:srgbClr val="0070C0"/>
+                </a:solidFill>
+                <a:latin typeface="Courier New" panose="02070309020205020404" pitchFamily="49" charset="0"/>
+                <a:cs typeface="Courier New" panose="02070309020205020404" pitchFamily="49" charset="0"/>
+              </a:rPr>
+              <a:t>'e'</a:t>
+            </a:r>
+            <a:endParaRPr lang="en-GB" sz="4400" dirty="0" smtClean="0">
+              <a:solidFill>
+                <a:srgbClr val="0070C0"/>
+              </a:solidFill>
+              <a:latin typeface="Courier New" panose="02070309020205020404" pitchFamily="49" charset="0"/>
+              <a:cs typeface="Courier New" panose="02070309020205020404" pitchFamily="49" charset="0"/>
+            </a:endParaRPr>
+          </a:p>
+        </p:txBody>
+      </p:sp>
     </p:spTree>
     <p:extLst>
       <p:ext uri="{BB962C8B-B14F-4D97-AF65-F5344CB8AC3E}">
@@ -6310,6 +6804,141 @@
                       </p:childTnLst>
                     </p:cTn>
                   </p:par>
+                  <p:par>
+                    <p:cTn id="15" fill="hold">
+                      <p:stCondLst>
+                        <p:cond delay="indefinite"/>
+                      </p:stCondLst>
+                      <p:childTnLst>
+                        <p:par>
+                          <p:cTn id="16" fill="hold">
+                            <p:stCondLst>
+                              <p:cond delay="0"/>
+                            </p:stCondLst>
+                            <p:childTnLst>
+                              <p:par>
+                                <p:cTn id="17" presetID="1" presetClass="entr" presetSubtype="0" fill="hold" grpId="0" nodeType="clickEffect">
+                                  <p:stCondLst>
+                                    <p:cond delay="0"/>
+                                  </p:stCondLst>
+                                  <p:childTnLst>
+                                    <p:set>
+                                      <p:cBhvr>
+                                        <p:cTn id="18" dur="1" fill="hold">
+                                          <p:stCondLst>
+                                            <p:cond delay="0"/>
+                                          </p:stCondLst>
+                                        </p:cTn>
+                                        <p:tgtEl>
+                                          <p:spTgt spid="2"/>
+                                        </p:tgtEl>
+                                        <p:attrNameLst>
+                                          <p:attrName>style.visibility</p:attrName>
+                                        </p:attrNameLst>
+                                      </p:cBhvr>
+                                      <p:to>
+                                        <p:strVal val="visible"/>
+                                      </p:to>
+                                    </p:set>
+                                  </p:childTnLst>
+                                </p:cTn>
+                              </p:par>
+                            </p:childTnLst>
+                          </p:cTn>
+                        </p:par>
+                      </p:childTnLst>
+                    </p:cTn>
+                  </p:par>
+                  <p:par>
+                    <p:cTn id="19" fill="hold">
+                      <p:stCondLst>
+                        <p:cond delay="indefinite"/>
+                      </p:stCondLst>
+                      <p:childTnLst>
+                        <p:par>
+                          <p:cTn id="20" fill="hold">
+                            <p:stCondLst>
+                              <p:cond delay="0"/>
+                            </p:stCondLst>
+                            <p:childTnLst>
+                              <p:par>
+                                <p:cTn id="21" presetID="1" presetClass="entr" presetSubtype="0" fill="hold" grpId="0" nodeType="clickEffect">
+                                  <p:stCondLst>
+                                    <p:cond delay="0"/>
+                                  </p:stCondLst>
+                                  <p:childTnLst>
+                                    <p:set>
+                                      <p:cBhvr>
+                                        <p:cTn id="22" dur="1" fill="hold">
+                                          <p:stCondLst>
+                                            <p:cond delay="0"/>
+                                          </p:stCondLst>
+                                        </p:cTn>
+                                        <p:tgtEl>
+                                          <p:spTgt spid="4"/>
+                                        </p:tgtEl>
+                                        <p:attrNameLst>
+                                          <p:attrName>style.visibility</p:attrName>
+                                        </p:attrNameLst>
+                                      </p:cBhvr>
+                                      <p:to>
+                                        <p:strVal val="visible"/>
+                                      </p:to>
+                                    </p:set>
+                                  </p:childTnLst>
+                                </p:cTn>
+                              </p:par>
+                            </p:childTnLst>
+                          </p:cTn>
+                        </p:par>
+                      </p:childTnLst>
+                    </p:cTn>
+                  </p:par>
+                  <p:par>
+                    <p:cTn id="23" fill="hold">
+                      <p:stCondLst>
+                        <p:cond delay="indefinite"/>
+                      </p:stCondLst>
+                      <p:childTnLst>
+                        <p:par>
+                          <p:cTn id="24" fill="hold">
+                            <p:stCondLst>
+                              <p:cond delay="0"/>
+                            </p:stCondLst>
+                            <p:childTnLst>
+                              <p:par>
+                                <p:cTn id="25" presetID="1" presetClass="entr" presetSubtype="0" fill="hold" grpId="0" nodeType="clickEffect">
+                                  <p:stCondLst>
+                                    <p:cond delay="0"/>
+                                  </p:stCondLst>
+                                  <p:childTnLst>
+                                    <p:set>
+                                      <p:cBhvr>
+                                        <p:cTn id="26" dur="1" fill="hold">
+                                          <p:stCondLst>
+                                            <p:cond delay="0"/>
+                                          </p:stCondLst>
+                                        </p:cTn>
+                                        <p:tgtEl>
+                                          <p:spTgt spid="5"/>
+                                        </p:tgtEl>
+                                        <p:attrNameLst>
+                                          <p:attrName>style.visibility</p:attrName>
+                                        </p:attrNameLst>
+                                      </p:cBhvr>
+                                      <p:to>
+                                        <p:strVal val="visible"/>
+                                      </p:to>
+                                    </p:set>
+                                  </p:childTnLst>
+                                </p:cTn>
+                              </p:par>
+                            </p:childTnLst>
+                          </p:cTn>
+                        </p:par>
+                      </p:childTnLst>
+                    </p:cTn>
+                  </p:par>
                 </p:childTnLst>
               </p:cTn>
               <p:prevCondLst>
@@ -6333,6 +6962,9 @@
     </p:tnLst>
     <p:bldLst>
       <p:bldP spid="13" grpId="0" build="p"/>
+      <p:bldP spid="2" grpId="0" animBg="1"/>
+      <p:bldP spid="4" grpId="0"/>
+      <p:bldP spid="5" grpId="0"/>
     </p:bldLst>
   </p:timing>
 </p:sld>
@@ -6679,7 +7311,7 @@
         <p:spPr>
           <a:xfrm>
             <a:off x="2627784" y="1700808"/>
-            <a:ext cx="3562770" cy="1200329"/>
+            <a:ext cx="4239237" cy="1200329"/>
           </a:xfrm>
           <a:prstGeom prst="rect">
             <a:avLst/>
@@ -6698,7 +7330,7 @@
                   <a:srgbClr val="0070C0"/>
                 </a:solidFill>
               </a:rPr>
-              <a:t>Exercises</a:t>
+              <a:t>Exercises 2</a:t>
             </a:r>
             <a:endParaRPr lang="en-GB" sz="7200" dirty="0">
               <a:solidFill>
@@ -10831,7 +11463,7 @@
         <p:spPr>
           <a:xfrm>
             <a:off x="2627784" y="1700808"/>
-            <a:ext cx="3562770" cy="1200329"/>
+            <a:ext cx="4239237" cy="1200329"/>
           </a:xfrm>
           <a:prstGeom prst="rect">
             <a:avLst/>
@@ -10850,7 +11482,7 @@
                   <a:srgbClr val="0070C0"/>
                 </a:solidFill>
               </a:rPr>
-              <a:t>Exercises</a:t>
+              <a:t>Exercises 3</a:t>
             </a:r>
             <a:endParaRPr lang="en-GB" sz="7200" dirty="0">
               <a:solidFill>
@@ -10931,6 +11563,697 @@
       </p:grpSpPr>
       <p:sp>
         <p:nvSpPr>
+          <p:cNvPr id="3" name="TextBox 2"/>
+          <p:cNvSpPr txBox="1"/>
+          <p:nvPr/>
+        </p:nvSpPr>
+        <p:spPr>
+          <a:xfrm>
+            <a:off x="467544" y="404664"/>
+            <a:ext cx="5109091" cy="707886"/>
+          </a:xfrm>
+          <a:prstGeom prst="rect">
+            <a:avLst/>
+          </a:prstGeom>
+          <a:noFill/>
+        </p:spPr>
+        <p:txBody>
+          <a:bodyPr wrap="none" rtlCol="0">
+            <a:spAutoFit/>
+          </a:bodyPr>
+          <a:lstStyle/>
+          <a:p>
+            <a:r>
+              <a:rPr lang="en-GB" sz="4000" dirty="0" smtClean="0">
+                <a:latin typeface="Courier New" panose="02070309020205020404" pitchFamily="49" charset="0"/>
+                <a:cs typeface="Courier New" panose="02070309020205020404" pitchFamily="49" charset="0"/>
+              </a:rPr>
+              <a:t>map (*2) [1,2,3]</a:t>
+            </a:r>
+            <a:endParaRPr lang="en-GB" sz="4000" dirty="0" smtClean="0">
+              <a:latin typeface="Courier New" panose="02070309020205020404" pitchFamily="49" charset="0"/>
+              <a:cs typeface="Courier New" panose="02070309020205020404" pitchFamily="49" charset="0"/>
+            </a:endParaRPr>
+          </a:p>
+        </p:txBody>
+      </p:sp>
+      <p:sp>
+        <p:nvSpPr>
+          <p:cNvPr id="4" name="TextBox 3"/>
+          <p:cNvSpPr txBox="1"/>
+          <p:nvPr/>
+        </p:nvSpPr>
+        <p:spPr>
+          <a:xfrm>
+            <a:off x="467544" y="1412776"/>
+            <a:ext cx="8494633" cy="707886"/>
+          </a:xfrm>
+          <a:prstGeom prst="rect">
+            <a:avLst/>
+          </a:prstGeom>
+          <a:noFill/>
+        </p:spPr>
+        <p:txBody>
+          <a:bodyPr wrap="none" rtlCol="0">
+            <a:spAutoFit/>
+          </a:bodyPr>
+          <a:lstStyle/>
+          <a:p>
+            <a:r>
+              <a:rPr lang="en-GB" sz="4000" dirty="0" smtClean="0">
+                <a:latin typeface="Courier New" panose="02070309020205020404" pitchFamily="49" charset="0"/>
+                <a:cs typeface="Courier New" panose="02070309020205020404" pitchFamily="49" charset="0"/>
+              </a:rPr>
+              <a:t>zipWith</a:t>
+            </a:r>
+            <a:r>
+              <a:rPr lang="en-GB" sz="4000" dirty="0" smtClean="0">
+                <a:latin typeface="Courier New" panose="02070309020205020404" pitchFamily="49" charset="0"/>
+                <a:cs typeface="Courier New" panose="02070309020205020404" pitchFamily="49" charset="0"/>
+              </a:rPr>
+              <a:t> (*) [1,2,3] [4,5,6]</a:t>
+            </a:r>
+            <a:endParaRPr lang="en-GB" sz="4000" dirty="0" smtClean="0">
+              <a:latin typeface="Courier New" panose="02070309020205020404" pitchFamily="49" charset="0"/>
+              <a:cs typeface="Courier New" panose="02070309020205020404" pitchFamily="49" charset="0"/>
+            </a:endParaRPr>
+          </a:p>
+        </p:txBody>
+      </p:sp>
+      <p:sp>
+        <p:nvSpPr>
+          <p:cNvPr id="5" name="TextBox 4"/>
+          <p:cNvSpPr txBox="1"/>
+          <p:nvPr/>
+        </p:nvSpPr>
+        <p:spPr>
+          <a:xfrm>
+            <a:off x="2123728" y="2060848"/>
+            <a:ext cx="2954655" cy="707886"/>
+          </a:xfrm>
+          <a:prstGeom prst="rect">
+            <a:avLst/>
+          </a:prstGeom>
+          <a:noFill/>
+        </p:spPr>
+        <p:txBody>
+          <a:bodyPr wrap="none" rtlCol="0">
+            <a:spAutoFit/>
+          </a:bodyPr>
+          <a:lstStyle/>
+          <a:p>
+            <a:r>
+              <a:rPr lang="en-GB" sz="4000" dirty="0" smtClean="0">
+                <a:solidFill>
+                  <a:srgbClr val="0070C0"/>
+                </a:solidFill>
+                <a:latin typeface="Courier New" panose="02070309020205020404" pitchFamily="49" charset="0"/>
+                <a:cs typeface="Courier New" panose="02070309020205020404" pitchFamily="49" charset="0"/>
+              </a:rPr>
+              <a:t>[4,10,18]</a:t>
+            </a:r>
+            <a:endParaRPr lang="en-GB" sz="4000" dirty="0" smtClean="0">
+              <a:solidFill>
+                <a:srgbClr val="0070C0"/>
+              </a:solidFill>
+              <a:latin typeface="Courier New" panose="02070309020205020404" pitchFamily="49" charset="0"/>
+              <a:cs typeface="Courier New" panose="02070309020205020404" pitchFamily="49" charset="0"/>
+            </a:endParaRPr>
+          </a:p>
+        </p:txBody>
+      </p:sp>
+      <p:sp>
+        <p:nvSpPr>
+          <p:cNvPr id="6" name="TextBox 5"/>
+          <p:cNvSpPr txBox="1"/>
+          <p:nvPr/>
+        </p:nvSpPr>
+        <p:spPr>
+          <a:xfrm>
+            <a:off x="611560" y="2996952"/>
+            <a:ext cx="5232523" cy="769441"/>
+          </a:xfrm>
+          <a:prstGeom prst="rect">
+            <a:avLst/>
+          </a:prstGeom>
+          <a:noFill/>
+        </p:spPr>
+        <p:txBody>
+          <a:bodyPr wrap="none" rtlCol="0">
+            <a:spAutoFit/>
+          </a:bodyPr>
+          <a:lstStyle/>
+          <a:p>
+            <a:r>
+              <a:rPr lang="en-GB" sz="4400" i="1" dirty="0" smtClean="0">
+                <a:solidFill>
+                  <a:srgbClr val="7030A0"/>
+                </a:solidFill>
+                <a:latin typeface="Calibri" panose="020F0502020204030204" pitchFamily="34" charset="0"/>
+                <a:cs typeface="Courier New" panose="02070309020205020404" pitchFamily="49" charset="0"/>
+              </a:rPr>
+              <a:t>[1,2,3,4]         </a:t>
+            </a:r>
+            <a:r>
+              <a:rPr lang="en-GB" sz="4400" i="1" dirty="0" smtClean="0">
+                <a:solidFill>
+                  <a:srgbClr val="7030A0"/>
+                </a:solidFill>
+                <a:latin typeface="Calibri" panose="020F0502020204030204" pitchFamily="34" charset="0"/>
+                <a:cs typeface="Courier New" panose="02070309020205020404" pitchFamily="49" charset="0"/>
+                <a:sym typeface="Wingdings" panose="05000000000000000000" pitchFamily="2" charset="2"/>
+              </a:rPr>
+              <a:t>1+2+3+4</a:t>
+            </a:r>
+            <a:endParaRPr lang="en-GB" sz="4400" i="1" dirty="0" smtClean="0">
+              <a:solidFill>
+                <a:srgbClr val="7030A0"/>
+              </a:solidFill>
+              <a:latin typeface="Calibri" panose="020F0502020204030204" pitchFamily="34" charset="0"/>
+              <a:cs typeface="Courier New" panose="02070309020205020404" pitchFamily="49" charset="0"/>
+            </a:endParaRPr>
+          </a:p>
+        </p:txBody>
+      </p:sp>
+      <p:sp>
+        <p:nvSpPr>
+          <p:cNvPr id="7" name="TextBox 6"/>
+          <p:cNvSpPr txBox="1"/>
+          <p:nvPr/>
+        </p:nvSpPr>
+        <p:spPr>
+          <a:xfrm>
+            <a:off x="611559" y="3739198"/>
+            <a:ext cx="5076583" cy="769441"/>
+          </a:xfrm>
+          <a:prstGeom prst="rect">
+            <a:avLst/>
+          </a:prstGeom>
+          <a:noFill/>
+        </p:spPr>
+        <p:txBody>
+          <a:bodyPr wrap="none" rtlCol="0">
+            <a:spAutoFit/>
+          </a:bodyPr>
+          <a:lstStyle/>
+          <a:p>
+            <a:r>
+              <a:rPr lang="en-GB" sz="4400" i="1" dirty="0" smtClean="0">
+                <a:solidFill>
+                  <a:srgbClr val="7030A0"/>
+                </a:solidFill>
+                <a:latin typeface="Calibri" panose="020F0502020204030204" pitchFamily="34" charset="0"/>
+                <a:cs typeface="Courier New" panose="02070309020205020404" pitchFamily="49" charset="0"/>
+              </a:rPr>
+              <a:t>foldr</a:t>
+            </a:r>
+            <a:r>
+              <a:rPr lang="en-GB" sz="4400" i="1" dirty="0" smtClean="0">
+                <a:solidFill>
+                  <a:srgbClr val="7030A0"/>
+                </a:solidFill>
+                <a:latin typeface="Calibri" panose="020F0502020204030204" pitchFamily="34" charset="0"/>
+                <a:cs typeface="Courier New" panose="02070309020205020404" pitchFamily="49" charset="0"/>
+              </a:rPr>
+              <a:t>         </a:t>
+            </a:r>
+            <a:r>
+              <a:rPr lang="en-GB" sz="4400" i="1" dirty="0" smtClean="0">
+                <a:solidFill>
+                  <a:srgbClr val="7030A0"/>
+                </a:solidFill>
+                <a:latin typeface="Calibri" panose="020F0502020204030204" pitchFamily="34" charset="0"/>
+                <a:cs typeface="Courier New" panose="02070309020205020404" pitchFamily="49" charset="0"/>
+                <a:sym typeface="Wingdings" panose="05000000000000000000" pitchFamily="2" charset="2"/>
+              </a:rPr>
+              <a:t>1+(2+(3+4))</a:t>
+            </a:r>
+            <a:endParaRPr lang="en-GB" sz="4400" i="1" dirty="0" smtClean="0">
+              <a:solidFill>
+                <a:srgbClr val="7030A0"/>
+              </a:solidFill>
+              <a:latin typeface="Calibri" panose="020F0502020204030204" pitchFamily="34" charset="0"/>
+              <a:cs typeface="Courier New" panose="02070309020205020404" pitchFamily="49" charset="0"/>
+            </a:endParaRPr>
+          </a:p>
+        </p:txBody>
+      </p:sp>
+      <p:sp>
+        <p:nvSpPr>
+          <p:cNvPr id="8" name="TextBox 7"/>
+          <p:cNvSpPr txBox="1"/>
+          <p:nvPr/>
+        </p:nvSpPr>
+        <p:spPr>
+          <a:xfrm>
+            <a:off x="611560" y="4508639"/>
+            <a:ext cx="5137497" cy="769441"/>
+          </a:xfrm>
+          <a:prstGeom prst="rect">
+            <a:avLst/>
+          </a:prstGeom>
+          <a:noFill/>
+        </p:spPr>
+        <p:txBody>
+          <a:bodyPr wrap="none" rtlCol="0">
+            <a:spAutoFit/>
+          </a:bodyPr>
+          <a:lstStyle/>
+          <a:p>
+            <a:r>
+              <a:rPr lang="en-GB" sz="4400" i="1" dirty="0" smtClean="0">
+                <a:solidFill>
+                  <a:srgbClr val="7030A0"/>
+                </a:solidFill>
+                <a:latin typeface="Calibri" panose="020F0502020204030204" pitchFamily="34" charset="0"/>
+                <a:cs typeface="Courier New" panose="02070309020205020404" pitchFamily="49" charset="0"/>
+              </a:rPr>
+              <a:t>foldl'</a:t>
+            </a:r>
+            <a:r>
+              <a:rPr lang="en-GB" sz="4400" i="1" dirty="0" smtClean="0">
+                <a:solidFill>
+                  <a:srgbClr val="7030A0"/>
+                </a:solidFill>
+                <a:latin typeface="Calibri" panose="020F0502020204030204" pitchFamily="34" charset="0"/>
+                <a:cs typeface="Courier New" panose="02070309020205020404" pitchFamily="49" charset="0"/>
+              </a:rPr>
+              <a:t>        ((</a:t>
+            </a:r>
+            <a:r>
+              <a:rPr lang="en-GB" sz="4400" i="1" dirty="0" smtClean="0">
+                <a:solidFill>
+                  <a:srgbClr val="7030A0"/>
+                </a:solidFill>
+                <a:latin typeface="Calibri" panose="020F0502020204030204" pitchFamily="34" charset="0"/>
+                <a:cs typeface="Courier New" panose="02070309020205020404" pitchFamily="49" charset="0"/>
+                <a:sym typeface="Wingdings" panose="05000000000000000000" pitchFamily="2" charset="2"/>
+              </a:rPr>
+              <a:t>1+2)+3)+4</a:t>
+            </a:r>
+            <a:endParaRPr lang="en-GB" sz="4400" i="1" dirty="0" smtClean="0">
+              <a:solidFill>
+                <a:srgbClr val="7030A0"/>
+              </a:solidFill>
+              <a:latin typeface="Calibri" panose="020F0502020204030204" pitchFamily="34" charset="0"/>
+              <a:cs typeface="Courier New" panose="02070309020205020404" pitchFamily="49" charset="0"/>
+            </a:endParaRPr>
+          </a:p>
+        </p:txBody>
+      </p:sp>
+      <p:sp>
+        <p:nvSpPr>
+          <p:cNvPr id="9" name="TextBox 8"/>
+          <p:cNvSpPr txBox="1"/>
+          <p:nvPr/>
+        </p:nvSpPr>
+        <p:spPr>
+          <a:xfrm>
+            <a:off x="467544" y="5589240"/>
+            <a:ext cx="7879080" cy="707886"/>
+          </a:xfrm>
+          <a:prstGeom prst="rect">
+            <a:avLst/>
+          </a:prstGeom>
+          <a:noFill/>
+        </p:spPr>
+        <p:txBody>
+          <a:bodyPr wrap="none" rtlCol="0">
+            <a:spAutoFit/>
+          </a:bodyPr>
+          <a:lstStyle/>
+          <a:p>
+            <a:r>
+              <a:rPr lang="en-GB" sz="4000" dirty="0" smtClean="0">
+                <a:latin typeface="Courier New" panose="02070309020205020404" pitchFamily="49" charset="0"/>
+                <a:cs typeface="Courier New" panose="02070309020205020404" pitchFamily="49" charset="0"/>
+              </a:rPr>
+              <a:t>map (sqrt </a:t>
+            </a:r>
+            <a:r>
+              <a:rPr lang="en-GB" sz="4000" dirty="0" smtClean="0">
+                <a:solidFill>
+                  <a:srgbClr val="FF0000"/>
+                </a:solidFill>
+                <a:latin typeface="Courier New" panose="02070309020205020404" pitchFamily="49" charset="0"/>
+                <a:cs typeface="Courier New" panose="02070309020205020404" pitchFamily="49" charset="0"/>
+              </a:rPr>
+              <a:t>.</a:t>
+            </a:r>
+            <a:r>
+              <a:rPr lang="en-GB" sz="4000" dirty="0" smtClean="0">
+                <a:latin typeface="Courier New" panose="02070309020205020404" pitchFamily="49" charset="0"/>
+                <a:cs typeface="Courier New" panose="02070309020205020404" pitchFamily="49" charset="0"/>
+              </a:rPr>
+              <a:t> sqrt) [1,2,3]</a:t>
+            </a:r>
+            <a:endParaRPr lang="en-GB" sz="4000" dirty="0" smtClean="0">
+              <a:latin typeface="Courier New" panose="02070309020205020404" pitchFamily="49" charset="0"/>
+              <a:cs typeface="Courier New" panose="02070309020205020404" pitchFamily="49" charset="0"/>
+            </a:endParaRPr>
+          </a:p>
+        </p:txBody>
+      </p:sp>
+    </p:spTree>
+    <p:extLst>
+      <p:ext uri="{BB962C8B-B14F-4D97-AF65-F5344CB8AC3E}">
+        <p14:creationId xmlns:p14="http://schemas.microsoft.com/office/powerpoint/2010/main" val="4245207861"/>
+      </p:ext>
+    </p:extLst>
+  </p:cSld>
+  <p:clrMapOvr>
+    <a:masterClrMapping/>
+  </p:clrMapOvr>
+  <p:timing>
+    <p:tnLst>
+      <p:par>
+        <p:cTn id="1" dur="indefinite" restart="never" nodeType="tmRoot">
+          <p:childTnLst>
+            <p:seq concurrent="1" nextAc="seek">
+              <p:cTn id="2" dur="indefinite" nodeType="mainSeq">
+                <p:childTnLst>
+                  <p:par>
+                    <p:cTn id="3" fill="hold">
+                      <p:stCondLst>
+                        <p:cond delay="indefinite"/>
+                      </p:stCondLst>
+                      <p:childTnLst>
+                        <p:par>
+                          <p:cTn id="4" fill="hold">
+                            <p:stCondLst>
+                              <p:cond delay="0"/>
+                            </p:stCondLst>
+                            <p:childTnLst>
+                              <p:par>
+                                <p:cTn id="5" presetID="1" presetClass="entr" presetSubtype="0" fill="hold" grpId="0" nodeType="clickEffect">
+                                  <p:stCondLst>
+                                    <p:cond delay="0"/>
+                                  </p:stCondLst>
+                                  <p:childTnLst>
+                                    <p:set>
+                                      <p:cBhvr>
+                                        <p:cTn id="6" dur="1" fill="hold">
+                                          <p:stCondLst>
+                                            <p:cond delay="0"/>
+                                          </p:stCondLst>
+                                        </p:cTn>
+                                        <p:tgtEl>
+                                          <p:spTgt spid="4"/>
+                                        </p:tgtEl>
+                                        <p:attrNameLst>
+                                          <p:attrName>style.visibility</p:attrName>
+                                        </p:attrNameLst>
+                                      </p:cBhvr>
+                                      <p:to>
+                                        <p:strVal val="visible"/>
+                                      </p:to>
+                                    </p:set>
+                                  </p:childTnLst>
+                                </p:cTn>
+                              </p:par>
+                            </p:childTnLst>
+                          </p:cTn>
+                        </p:par>
+                      </p:childTnLst>
+                    </p:cTn>
+                  </p:par>
+                  <p:par>
+                    <p:cTn id="7" fill="hold">
+                      <p:stCondLst>
+                        <p:cond delay="indefinite"/>
+                      </p:stCondLst>
+                      <p:childTnLst>
+                        <p:par>
+                          <p:cTn id="8" fill="hold">
+                            <p:stCondLst>
+                              <p:cond delay="0"/>
+                            </p:stCondLst>
+                            <p:childTnLst>
+                              <p:par>
+                                <p:cTn id="9" presetID="1" presetClass="entr" presetSubtype="0" fill="hold" grpId="0" nodeType="clickEffect">
+                                  <p:stCondLst>
+                                    <p:cond delay="0"/>
+                                  </p:stCondLst>
+                                  <p:childTnLst>
+                                    <p:set>
+                                      <p:cBhvr>
+                                        <p:cTn id="10" dur="1" fill="hold">
+                                          <p:stCondLst>
+                                            <p:cond delay="0"/>
+                                          </p:stCondLst>
+                                        </p:cTn>
+                                        <p:tgtEl>
+                                          <p:spTgt spid="5"/>
+                                        </p:tgtEl>
+                                        <p:attrNameLst>
+                                          <p:attrName>style.visibility</p:attrName>
+                                        </p:attrNameLst>
+                                      </p:cBhvr>
+                                      <p:to>
+                                        <p:strVal val="visible"/>
+                                      </p:to>
+                                    </p:set>
+                                  </p:childTnLst>
+                                </p:cTn>
+                              </p:par>
+                            </p:childTnLst>
+                          </p:cTn>
+                        </p:par>
+                      </p:childTnLst>
+                    </p:cTn>
+                  </p:par>
+                  <p:par>
+                    <p:cTn id="11" fill="hold">
+                      <p:stCondLst>
+                        <p:cond delay="indefinite"/>
+                      </p:stCondLst>
+                      <p:childTnLst>
+                        <p:par>
+                          <p:cTn id="12" fill="hold">
+                            <p:stCondLst>
+                              <p:cond delay="0"/>
+                            </p:stCondLst>
+                            <p:childTnLst>
+                              <p:par>
+                                <p:cTn id="13" presetID="1" presetClass="entr" presetSubtype="0" fill="hold" grpId="0" nodeType="clickEffect">
+                                  <p:stCondLst>
+                                    <p:cond delay="0"/>
+                                  </p:stCondLst>
+                                  <p:childTnLst>
+                                    <p:set>
+                                      <p:cBhvr>
+                                        <p:cTn id="14" dur="1" fill="hold">
+                                          <p:stCondLst>
+                                            <p:cond delay="0"/>
+                                          </p:stCondLst>
+                                        </p:cTn>
+                                        <p:tgtEl>
+                                          <p:spTgt spid="6"/>
+                                        </p:tgtEl>
+                                        <p:attrNameLst>
+                                          <p:attrName>style.visibility</p:attrName>
+                                        </p:attrNameLst>
+                                      </p:cBhvr>
+                                      <p:to>
+                                        <p:strVal val="visible"/>
+                                      </p:to>
+                                    </p:set>
+                                  </p:childTnLst>
+                                </p:cTn>
+                              </p:par>
+                            </p:childTnLst>
+                          </p:cTn>
+                        </p:par>
+                      </p:childTnLst>
+                    </p:cTn>
+                  </p:par>
+                  <p:par>
+                    <p:cTn id="15" fill="hold">
+                      <p:stCondLst>
+                        <p:cond delay="indefinite"/>
+                      </p:stCondLst>
+                      <p:childTnLst>
+                        <p:par>
+                          <p:cTn id="16" fill="hold">
+                            <p:stCondLst>
+                              <p:cond delay="0"/>
+                            </p:stCondLst>
+                            <p:childTnLst>
+                              <p:par>
+                                <p:cTn id="17" presetID="1" presetClass="entr" presetSubtype="0" fill="hold" grpId="0" nodeType="clickEffect">
+                                  <p:stCondLst>
+                                    <p:cond delay="0"/>
+                                  </p:stCondLst>
+                                  <p:childTnLst>
+                                    <p:set>
+                                      <p:cBhvr>
+                                        <p:cTn id="18" dur="1" fill="hold">
+                                          <p:stCondLst>
+                                            <p:cond delay="0"/>
+                                          </p:stCondLst>
+                                        </p:cTn>
+                                        <p:tgtEl>
+                                          <p:spTgt spid="7"/>
+                                        </p:tgtEl>
+                                        <p:attrNameLst>
+                                          <p:attrName>style.visibility</p:attrName>
+                                        </p:attrNameLst>
+                                      </p:cBhvr>
+                                      <p:to>
+                                        <p:strVal val="visible"/>
+                                      </p:to>
+                                    </p:set>
+                                  </p:childTnLst>
+                                </p:cTn>
+                              </p:par>
+                            </p:childTnLst>
+                          </p:cTn>
+                        </p:par>
+                      </p:childTnLst>
+                    </p:cTn>
+                  </p:par>
+                  <p:par>
+                    <p:cTn id="19" fill="hold">
+                      <p:stCondLst>
+                        <p:cond delay="indefinite"/>
+                      </p:stCondLst>
+                      <p:childTnLst>
+                        <p:par>
+                          <p:cTn id="20" fill="hold">
+                            <p:stCondLst>
+                              <p:cond delay="0"/>
+                            </p:stCondLst>
+                            <p:childTnLst>
+                              <p:par>
+                                <p:cTn id="21" presetID="1" presetClass="entr" presetSubtype="0" fill="hold" grpId="0" nodeType="clickEffect">
+                                  <p:stCondLst>
+                                    <p:cond delay="0"/>
+                                  </p:stCondLst>
+                                  <p:childTnLst>
+                                    <p:set>
+                                      <p:cBhvr>
+                                        <p:cTn id="22" dur="1" fill="hold">
+                                          <p:stCondLst>
+                                            <p:cond delay="0"/>
+                                          </p:stCondLst>
+                                        </p:cTn>
+                                        <p:tgtEl>
+                                          <p:spTgt spid="8"/>
+                                        </p:tgtEl>
+                                        <p:attrNameLst>
+                                          <p:attrName>style.visibility</p:attrName>
+                                        </p:attrNameLst>
+                                      </p:cBhvr>
+                                      <p:to>
+                                        <p:strVal val="visible"/>
+                                      </p:to>
+                                    </p:set>
+                                  </p:childTnLst>
+                                </p:cTn>
+                              </p:par>
+                            </p:childTnLst>
+                          </p:cTn>
+                        </p:par>
+                      </p:childTnLst>
+                    </p:cTn>
+                  </p:par>
+                  <p:par>
+                    <p:cTn id="23" fill="hold">
+                      <p:stCondLst>
+                        <p:cond delay="indefinite"/>
+                      </p:stCondLst>
+                      <p:childTnLst>
+                        <p:par>
+                          <p:cTn id="24" fill="hold">
+                            <p:stCondLst>
+                              <p:cond delay="0"/>
+                            </p:stCondLst>
+                            <p:childTnLst>
+                              <p:par>
+                                <p:cTn id="25" presetID="1" presetClass="entr" presetSubtype="0" fill="hold" grpId="0" nodeType="clickEffect">
+                                  <p:stCondLst>
+                                    <p:cond delay="0"/>
+                                  </p:stCondLst>
+                                  <p:childTnLst>
+                                    <p:set>
+                                      <p:cBhvr>
+                                        <p:cTn id="26" dur="1" fill="hold">
+                                          <p:stCondLst>
+                                            <p:cond delay="0"/>
+                                          </p:stCondLst>
+                                        </p:cTn>
+                                        <p:tgtEl>
+                                          <p:spTgt spid="9"/>
+                                        </p:tgtEl>
+                                        <p:attrNameLst>
+                                          <p:attrName>style.visibility</p:attrName>
+                                        </p:attrNameLst>
+                                      </p:cBhvr>
+                                      <p:to>
+                                        <p:strVal val="visible"/>
+                                      </p:to>
+                                    </p:set>
+                                  </p:childTnLst>
+                                </p:cTn>
+                              </p:par>
+                            </p:childTnLst>
+                          </p:cTn>
+                        </p:par>
+                      </p:childTnLst>
+                    </p:cTn>
+                  </p:par>
+                </p:childTnLst>
+              </p:cTn>
+              <p:prevCondLst>
+                <p:cond evt="onPrev" delay="0">
+                  <p:tgtEl>
+                    <p:sldTgt/>
+                  </p:tgtEl>
+                </p:cond>
+              </p:prevCondLst>
+              <p:nextCondLst>
+                <p:cond evt="onNext" delay="0">
+                  <p:tgtEl>
+                    <p:sldTgt/>
+                  </p:tgtEl>
+                </p:cond>
+              </p:nextCondLst>
+            </p:seq>
+          </p:childTnLst>
+        </p:cTn>
+      </p:par>
+    </p:tnLst>
+    <p:bldLst>
+      <p:bldP spid="4" grpId="0"/>
+      <p:bldP spid="5" grpId="0"/>
+      <p:bldP spid="6" grpId="0"/>
+      <p:bldP spid="7" grpId="0"/>
+      <p:bldP spid="8" grpId="0"/>
+      <p:bldP spid="9" grpId="0"/>
+    </p:bldLst>
+  </p:timing>
+</p:sld>
+</file>
+
+<file path=ppt/slides/slide26.xml><?xml version="1.0" encoding="utf-8"?>
+<p:sld xmlns:a="http://schemas.openxmlformats.org/drawingml/2006/main" xmlns:r="http://schemas.openxmlformats.org/officeDocument/2006/relationships" xmlns:p="http://schemas.openxmlformats.org/presentationml/2006/main">
+  <p:cSld>
+    <p:spTree>
+      <p:nvGrpSpPr>
+        <p:cNvPr id="1" name=""/>
+        <p:cNvGrpSpPr/>
+        <p:nvPr/>
+      </p:nvGrpSpPr>
+      <p:grpSpPr>
+        <a:xfrm>
+          <a:off x="0" y="0"/>
+          <a:ext cx="0" cy="0"/>
+          <a:chOff x="0" y="0"/>
+          <a:chExt cx="0" cy="0"/>
+        </a:xfrm>
+      </p:grpSpPr>
+      <p:sp>
+        <p:nvSpPr>
           <p:cNvPr id="2" name="TextBox 1"/>
           <p:cNvSpPr txBox="1"/>
           <p:nvPr/>
@@ -10970,7 +12293,7 @@
     </p:spTree>
     <p:extLst>
       <p:ext uri="{BB962C8B-B14F-4D97-AF65-F5344CB8AC3E}">
-        <p14:creationId xmlns:p14="http://schemas.microsoft.com/office/powerpoint/2010/main" val="4245207861"/>
+        <p14:creationId xmlns:p14="http://schemas.microsoft.com/office/powerpoint/2010/main" val="3892298216"/>
       </p:ext>
     </p:extLst>
   </p:cSld>
@@ -10987,7 +12310,7 @@
 </p:sld>
 </file>
 
-<file path=ppt/slides/slide26.xml><?xml version="1.0" encoding="utf-8"?>
+<file path=ppt/slides/slide27.xml><?xml version="1.0" encoding="utf-8"?>
 <p:sld xmlns:a="http://schemas.openxmlformats.org/drawingml/2006/main" xmlns:r="http://schemas.openxmlformats.org/officeDocument/2006/relationships" xmlns:p="http://schemas.openxmlformats.org/presentationml/2006/main">
   <p:cSld>
     <p:spTree>
@@ -11679,7 +13002,7 @@
 </p:sld>
 </file>
 
-<file path=ppt/slides/slide27.xml><?xml version="1.0" encoding="utf-8"?>
+<file path=ppt/slides/slide28.xml><?xml version="1.0" encoding="utf-8"?>
 <p:sld xmlns:a="http://schemas.openxmlformats.org/drawingml/2006/main" xmlns:r="http://schemas.openxmlformats.org/officeDocument/2006/relationships" xmlns:p="http://schemas.openxmlformats.org/presentationml/2006/main">
   <p:cSld>
     <p:spTree>
@@ -12272,7 +13595,7 @@
 </p:sld>
 </file>
 
-<file path=ppt/slides/slide28.xml><?xml version="1.0" encoding="utf-8"?>
+<file path=ppt/slides/slide29.xml><?xml version="1.0" encoding="utf-8"?>
 <p:sld xmlns:a="http://schemas.openxmlformats.org/drawingml/2006/main" xmlns:r="http://schemas.openxmlformats.org/officeDocument/2006/relationships" xmlns:p="http://schemas.openxmlformats.org/presentationml/2006/main">
   <p:cSld>
     <p:spTree>
@@ -13558,6 +14881,870 @@
 </p:sld>
 </file>
 
+<file path=ppt/slides/slide30.xml><?xml version="1.0" encoding="utf-8"?>
+<p:sld xmlns:a="http://schemas.openxmlformats.org/drawingml/2006/main" xmlns:r="http://schemas.openxmlformats.org/officeDocument/2006/relationships" xmlns:p="http://schemas.openxmlformats.org/presentationml/2006/main">
+  <p:cSld>
+    <p:spTree>
+      <p:nvGrpSpPr>
+        <p:cNvPr id="1" name=""/>
+        <p:cNvGrpSpPr/>
+        <p:nvPr/>
+      </p:nvGrpSpPr>
+      <p:grpSpPr>
+        <a:xfrm>
+          <a:off x="0" y="0"/>
+          <a:ext cx="0" cy="0"/>
+          <a:chOff x="0" y="0"/>
+          <a:chExt cx="0" cy="0"/>
+        </a:xfrm>
+      </p:grpSpPr>
+      <p:sp>
+        <p:nvSpPr>
+          <p:cNvPr id="2" name="TextBox 1"/>
+          <p:cNvSpPr txBox="1"/>
+          <p:nvPr/>
+        </p:nvSpPr>
+        <p:spPr>
+          <a:xfrm>
+            <a:off x="2627784" y="1700808"/>
+            <a:ext cx="4239237" cy="1200329"/>
+          </a:xfrm>
+          <a:prstGeom prst="rect">
+            <a:avLst/>
+          </a:prstGeom>
+          <a:noFill/>
+        </p:spPr>
+        <p:txBody>
+          <a:bodyPr wrap="none" rtlCol="0">
+            <a:spAutoFit/>
+          </a:bodyPr>
+          <a:lstStyle/>
+          <a:p>
+            <a:r>
+              <a:rPr lang="en-GB" sz="7200" dirty="0" smtClean="0">
+                <a:solidFill>
+                  <a:srgbClr val="0070C0"/>
+                </a:solidFill>
+              </a:rPr>
+              <a:t>Exercises 4</a:t>
+            </a:r>
+            <a:endParaRPr lang="en-GB" sz="7200" dirty="0">
+              <a:solidFill>
+                <a:srgbClr val="0070C0"/>
+              </a:solidFill>
+            </a:endParaRPr>
+          </a:p>
+        </p:txBody>
+      </p:sp>
+      <p:sp>
+        <p:nvSpPr>
+          <p:cNvPr id="3" name="TextBox 2"/>
+          <p:cNvSpPr txBox="1"/>
+          <p:nvPr/>
+        </p:nvSpPr>
+        <p:spPr>
+          <a:xfrm>
+            <a:off x="1619672" y="3573016"/>
+            <a:ext cx="5784532" cy="646331"/>
+          </a:xfrm>
+          <a:prstGeom prst="rect">
+            <a:avLst/>
+          </a:prstGeom>
+          <a:noFill/>
+        </p:spPr>
+        <p:txBody>
+          <a:bodyPr wrap="none" rtlCol="0">
+            <a:spAutoFit/>
+          </a:bodyPr>
+          <a:lstStyle/>
+          <a:p>
+            <a:r>
+              <a:rPr lang="en-GB" sz="3600" dirty="0" smtClean="0">
+                <a:hlinkClick r:id="rId3"/>
+              </a:rPr>
+              <a:t>http://dominicprior.github.io/</a:t>
+            </a:r>
+            <a:endParaRPr lang="en-GB" sz="3600" dirty="0"/>
+          </a:p>
+        </p:txBody>
+      </p:sp>
+    </p:spTree>
+    <p:extLst>
+      <p:ext uri="{BB962C8B-B14F-4D97-AF65-F5344CB8AC3E}">
+        <p14:creationId xmlns:p14="http://schemas.microsoft.com/office/powerpoint/2010/main" val="335475097"/>
+      </p:ext>
+    </p:extLst>
+  </p:cSld>
+  <p:clrMapOvr>
+    <a:masterClrMapping/>
+  </p:clrMapOvr>
+  <p:timing>
+    <p:tnLst>
+      <p:par>
+        <p:cTn id="1" dur="indefinite" restart="never" nodeType="tmRoot"/>
+      </p:par>
+    </p:tnLst>
+  </p:timing>
+</p:sld>
+</file>
+
+<file path=ppt/slides/slide31.xml><?xml version="1.0" encoding="utf-8"?>
+<p:sld xmlns:a="http://schemas.openxmlformats.org/drawingml/2006/main" xmlns:r="http://schemas.openxmlformats.org/officeDocument/2006/relationships" xmlns:p="http://schemas.openxmlformats.org/presentationml/2006/main">
+  <p:cSld>
+    <p:spTree>
+      <p:nvGrpSpPr>
+        <p:cNvPr id="1" name=""/>
+        <p:cNvGrpSpPr/>
+        <p:nvPr/>
+      </p:nvGrpSpPr>
+      <p:grpSpPr>
+        <a:xfrm>
+          <a:off x="0" y="0"/>
+          <a:ext cx="0" cy="0"/>
+          <a:chOff x="0" y="0"/>
+          <a:chExt cx="0" cy="0"/>
+        </a:xfrm>
+      </p:grpSpPr>
+      <p:sp>
+        <p:nvSpPr>
+          <p:cNvPr id="2" name="TextBox 1"/>
+          <p:cNvSpPr txBox="1"/>
+          <p:nvPr/>
+        </p:nvSpPr>
+        <p:spPr>
+          <a:xfrm>
+            <a:off x="2915816" y="2516703"/>
+            <a:ext cx="3259226" cy="1200329"/>
+          </a:xfrm>
+          <a:prstGeom prst="rect">
+            <a:avLst/>
+          </a:prstGeom>
+          <a:noFill/>
+        </p:spPr>
+        <p:txBody>
+          <a:bodyPr wrap="none" rtlCol="0">
+            <a:spAutoFit/>
+          </a:bodyPr>
+          <a:lstStyle/>
+          <a:p>
+            <a:r>
+              <a:rPr lang="en-GB" sz="7200" dirty="0" smtClean="0">
+                <a:solidFill>
+                  <a:srgbClr val="0070C0"/>
+                </a:solidFill>
+              </a:rPr>
+              <a:t>Laziness</a:t>
+            </a:r>
+            <a:endParaRPr lang="en-GB" sz="7200" dirty="0">
+              <a:solidFill>
+                <a:srgbClr val="0070C0"/>
+              </a:solidFill>
+            </a:endParaRPr>
+          </a:p>
+        </p:txBody>
+      </p:sp>
+    </p:spTree>
+    <p:extLst>
+      <p:ext uri="{BB962C8B-B14F-4D97-AF65-F5344CB8AC3E}">
+        <p14:creationId xmlns:p14="http://schemas.microsoft.com/office/powerpoint/2010/main" val="3867282665"/>
+      </p:ext>
+    </p:extLst>
+  </p:cSld>
+  <p:clrMapOvr>
+    <a:masterClrMapping/>
+  </p:clrMapOvr>
+  <p:timing>
+    <p:tnLst>
+      <p:par>
+        <p:cTn id="1" dur="indefinite" restart="never" nodeType="tmRoot"/>
+      </p:par>
+    </p:tnLst>
+  </p:timing>
+</p:sld>
+</file>
+
+<file path=ppt/slides/slide32.xml><?xml version="1.0" encoding="utf-8"?>
+<p:sld xmlns:a="http://schemas.openxmlformats.org/drawingml/2006/main" xmlns:r="http://schemas.openxmlformats.org/officeDocument/2006/relationships" xmlns:p="http://schemas.openxmlformats.org/presentationml/2006/main">
+  <p:cSld>
+    <p:spTree>
+      <p:nvGrpSpPr>
+        <p:cNvPr id="1" name=""/>
+        <p:cNvGrpSpPr/>
+        <p:nvPr/>
+      </p:nvGrpSpPr>
+      <p:grpSpPr>
+        <a:xfrm>
+          <a:off x="0" y="0"/>
+          <a:ext cx="0" cy="0"/>
+          <a:chOff x="0" y="0"/>
+          <a:chExt cx="0" cy="0"/>
+        </a:xfrm>
+      </p:grpSpPr>
+      <p:sp>
+        <p:nvSpPr>
+          <p:cNvPr id="3" name="TextBox 2"/>
+          <p:cNvSpPr txBox="1"/>
+          <p:nvPr/>
+        </p:nvSpPr>
+        <p:spPr>
+          <a:xfrm>
+            <a:off x="611560" y="548680"/>
+            <a:ext cx="7983468" cy="830997"/>
+          </a:xfrm>
+          <a:prstGeom prst="rect">
+            <a:avLst/>
+          </a:prstGeom>
+          <a:noFill/>
+        </p:spPr>
+        <p:txBody>
+          <a:bodyPr wrap="none" rtlCol="0">
+            <a:spAutoFit/>
+          </a:bodyPr>
+          <a:lstStyle/>
+          <a:p>
+            <a:r>
+              <a:rPr lang="en-GB" sz="4800" dirty="0" smtClean="0">
+                <a:solidFill>
+                  <a:srgbClr val="0070C0"/>
+                </a:solidFill>
+                <a:latin typeface="Calibri" panose="020F0502020204030204" pitchFamily="34" charset="0"/>
+                <a:cs typeface="Courier New" panose="02070309020205020404" pitchFamily="49" charset="0"/>
+              </a:rPr>
+              <a:t>Defining our own map function</a:t>
+            </a:r>
+            <a:endParaRPr lang="en-GB" sz="4800" dirty="0" smtClean="0">
+              <a:solidFill>
+                <a:srgbClr val="0070C0"/>
+              </a:solidFill>
+              <a:latin typeface="Calibri" panose="020F0502020204030204" pitchFamily="34" charset="0"/>
+              <a:cs typeface="Courier New" panose="02070309020205020404" pitchFamily="49" charset="0"/>
+            </a:endParaRPr>
+          </a:p>
+        </p:txBody>
+      </p:sp>
+      <p:sp>
+        <p:nvSpPr>
+          <p:cNvPr id="4" name="TextBox 3"/>
+          <p:cNvSpPr txBox="1"/>
+          <p:nvPr/>
+        </p:nvSpPr>
+        <p:spPr>
+          <a:xfrm>
+            <a:off x="467544" y="1772816"/>
+            <a:ext cx="8226932" cy="646331"/>
+          </a:xfrm>
+          <a:prstGeom prst="rect">
+            <a:avLst/>
+          </a:prstGeom>
+          <a:noFill/>
+        </p:spPr>
+        <p:txBody>
+          <a:bodyPr wrap="none" rtlCol="0">
+            <a:spAutoFit/>
+          </a:bodyPr>
+          <a:lstStyle/>
+          <a:p>
+            <a:r>
+              <a:rPr lang="en-GB" sz="3600" dirty="0" smtClean="0">
+                <a:latin typeface="Courier New" panose="02070309020205020404" pitchFamily="49" charset="0"/>
+                <a:cs typeface="Courier New" panose="02070309020205020404" pitchFamily="49" charset="0"/>
+              </a:rPr>
+              <a:t>map </a:t>
+            </a:r>
+            <a:r>
+              <a:rPr lang="en-GB" sz="3600" dirty="0" smtClean="0">
+                <a:solidFill>
+                  <a:srgbClr val="FF0000"/>
+                </a:solidFill>
+                <a:latin typeface="Courier New" panose="02070309020205020404" pitchFamily="49" charset="0"/>
+                <a:cs typeface="Courier New" panose="02070309020205020404" pitchFamily="49" charset="0"/>
+              </a:rPr>
+              <a:t>::</a:t>
+            </a:r>
+            <a:r>
+              <a:rPr lang="en-GB" sz="3600" dirty="0" smtClean="0">
+                <a:latin typeface="Courier New" panose="02070309020205020404" pitchFamily="49" charset="0"/>
+                <a:cs typeface="Courier New" panose="02070309020205020404" pitchFamily="49" charset="0"/>
+              </a:rPr>
+              <a:t> (a </a:t>
+            </a:r>
+            <a:r>
+              <a:rPr lang="en-GB" sz="3600" dirty="0" smtClean="0">
+                <a:solidFill>
+                  <a:srgbClr val="FF0000"/>
+                </a:solidFill>
+                <a:latin typeface="Courier New" panose="02070309020205020404" pitchFamily="49" charset="0"/>
+                <a:cs typeface="Courier New" panose="02070309020205020404" pitchFamily="49" charset="0"/>
+              </a:rPr>
+              <a:t>-&gt;</a:t>
+            </a:r>
+            <a:r>
+              <a:rPr lang="en-GB" sz="3600" dirty="0" smtClean="0">
+                <a:latin typeface="Courier New" panose="02070309020205020404" pitchFamily="49" charset="0"/>
+                <a:cs typeface="Courier New" panose="02070309020205020404" pitchFamily="49" charset="0"/>
+              </a:rPr>
+              <a:t> b) </a:t>
+            </a:r>
+            <a:r>
+              <a:rPr lang="en-GB" sz="3600" dirty="0" smtClean="0">
+                <a:solidFill>
+                  <a:srgbClr val="FF0000"/>
+                </a:solidFill>
+                <a:latin typeface="Courier New" panose="02070309020205020404" pitchFamily="49" charset="0"/>
+                <a:cs typeface="Courier New" panose="02070309020205020404" pitchFamily="49" charset="0"/>
+              </a:rPr>
+              <a:t>-&gt;</a:t>
+            </a:r>
+            <a:r>
+              <a:rPr lang="en-GB" sz="3600" dirty="0" smtClean="0">
+                <a:latin typeface="Courier New" panose="02070309020205020404" pitchFamily="49" charset="0"/>
+                <a:cs typeface="Courier New" panose="02070309020205020404" pitchFamily="49" charset="0"/>
+              </a:rPr>
+              <a:t> [a] </a:t>
+            </a:r>
+            <a:r>
+              <a:rPr lang="en-GB" sz="3600" dirty="0" smtClean="0">
+                <a:solidFill>
+                  <a:srgbClr val="FF0000"/>
+                </a:solidFill>
+                <a:latin typeface="Courier New" panose="02070309020205020404" pitchFamily="49" charset="0"/>
+                <a:cs typeface="Courier New" panose="02070309020205020404" pitchFamily="49" charset="0"/>
+              </a:rPr>
+              <a:t>-&gt;</a:t>
+            </a:r>
+            <a:r>
+              <a:rPr lang="en-GB" sz="3600" dirty="0" smtClean="0">
+                <a:latin typeface="Courier New" panose="02070309020205020404" pitchFamily="49" charset="0"/>
+                <a:cs typeface="Courier New" panose="02070309020205020404" pitchFamily="49" charset="0"/>
+              </a:rPr>
+              <a:t> [b]</a:t>
+            </a:r>
+            <a:endParaRPr lang="en-GB" sz="3600" dirty="0" smtClean="0">
+              <a:latin typeface="Courier New" panose="02070309020205020404" pitchFamily="49" charset="0"/>
+              <a:cs typeface="Courier New" panose="02070309020205020404" pitchFamily="49" charset="0"/>
+            </a:endParaRPr>
+          </a:p>
+        </p:txBody>
+      </p:sp>
+      <p:sp>
+        <p:nvSpPr>
+          <p:cNvPr id="5" name="TextBox 4"/>
+          <p:cNvSpPr txBox="1"/>
+          <p:nvPr/>
+        </p:nvSpPr>
+        <p:spPr>
+          <a:xfrm>
+            <a:off x="438525" y="2492896"/>
+            <a:ext cx="3789820" cy="646331"/>
+          </a:xfrm>
+          <a:prstGeom prst="rect">
+            <a:avLst/>
+          </a:prstGeom>
+          <a:noFill/>
+        </p:spPr>
+        <p:txBody>
+          <a:bodyPr wrap="none" rtlCol="0">
+            <a:spAutoFit/>
+          </a:bodyPr>
+          <a:lstStyle/>
+          <a:p>
+            <a:r>
+              <a:rPr lang="en-GB" sz="3600" dirty="0" smtClean="0">
+                <a:latin typeface="Courier New" panose="02070309020205020404" pitchFamily="49" charset="0"/>
+                <a:cs typeface="Courier New" panose="02070309020205020404" pitchFamily="49" charset="0"/>
+              </a:rPr>
+              <a:t>map _ [] = []</a:t>
+            </a:r>
+            <a:endParaRPr lang="en-GB" sz="3600" dirty="0" smtClean="0">
+              <a:latin typeface="Courier New" panose="02070309020205020404" pitchFamily="49" charset="0"/>
+              <a:cs typeface="Courier New" panose="02070309020205020404" pitchFamily="49" charset="0"/>
+            </a:endParaRPr>
+          </a:p>
+        </p:txBody>
+      </p:sp>
+      <p:sp>
+        <p:nvSpPr>
+          <p:cNvPr id="6" name="TextBox 5"/>
+          <p:cNvSpPr txBox="1"/>
+          <p:nvPr/>
+        </p:nvSpPr>
+        <p:spPr>
+          <a:xfrm>
+            <a:off x="899592" y="3212976"/>
+            <a:ext cx="7010252" cy="707886"/>
+          </a:xfrm>
+          <a:prstGeom prst="rect">
+            <a:avLst/>
+          </a:prstGeom>
+          <a:noFill/>
+        </p:spPr>
+        <p:txBody>
+          <a:bodyPr wrap="none" rtlCol="0">
+            <a:spAutoFit/>
+          </a:bodyPr>
+          <a:lstStyle/>
+          <a:p>
+            <a:r>
+              <a:rPr lang="en-GB" sz="4000" i="1" dirty="0" smtClean="0">
+                <a:solidFill>
+                  <a:srgbClr val="7030A0"/>
+                </a:solidFill>
+                <a:latin typeface="Calibri" panose="020F0502020204030204" pitchFamily="34" charset="0"/>
+                <a:cs typeface="Courier New" panose="02070309020205020404" pitchFamily="49" charset="0"/>
+              </a:rPr>
+              <a:t>map  f  [1,2,3]  =  [ f  1,  f  2,  f  3 ]</a:t>
+            </a:r>
+            <a:endParaRPr lang="en-GB" sz="4000" i="1" dirty="0" smtClean="0">
+              <a:solidFill>
+                <a:srgbClr val="7030A0"/>
+              </a:solidFill>
+              <a:latin typeface="Calibri" panose="020F0502020204030204" pitchFamily="34" charset="0"/>
+              <a:cs typeface="Courier New" panose="02070309020205020404" pitchFamily="49" charset="0"/>
+            </a:endParaRPr>
+          </a:p>
+        </p:txBody>
+      </p:sp>
+      <p:sp>
+        <p:nvSpPr>
+          <p:cNvPr id="7" name="TextBox 6"/>
+          <p:cNvSpPr txBox="1"/>
+          <p:nvPr/>
+        </p:nvSpPr>
+        <p:spPr>
+          <a:xfrm>
+            <a:off x="3995936" y="3982417"/>
+            <a:ext cx="4116833" cy="707886"/>
+          </a:xfrm>
+          <a:prstGeom prst="rect">
+            <a:avLst/>
+          </a:prstGeom>
+          <a:noFill/>
+        </p:spPr>
+        <p:txBody>
+          <a:bodyPr wrap="none" rtlCol="0">
+            <a:spAutoFit/>
+          </a:bodyPr>
+          <a:lstStyle/>
+          <a:p>
+            <a:r>
+              <a:rPr lang="en-GB" sz="4000" i="1" dirty="0" smtClean="0">
+                <a:solidFill>
+                  <a:srgbClr val="7030A0"/>
+                </a:solidFill>
+                <a:latin typeface="Calibri" panose="020F0502020204030204" pitchFamily="34" charset="0"/>
+                <a:cs typeface="Courier New" panose="02070309020205020404" pitchFamily="49" charset="0"/>
+              </a:rPr>
+              <a:t>=  f  1  :  [ f  2,  f  3 ]</a:t>
+            </a:r>
+            <a:endParaRPr lang="en-GB" sz="4000" i="1" dirty="0" smtClean="0">
+              <a:solidFill>
+                <a:srgbClr val="7030A0"/>
+              </a:solidFill>
+              <a:latin typeface="Calibri" panose="020F0502020204030204" pitchFamily="34" charset="0"/>
+              <a:cs typeface="Courier New" panose="02070309020205020404" pitchFamily="49" charset="0"/>
+            </a:endParaRPr>
+          </a:p>
+        </p:txBody>
+      </p:sp>
+      <p:sp>
+        <p:nvSpPr>
+          <p:cNvPr id="8" name="TextBox 7"/>
+          <p:cNvSpPr txBox="1"/>
+          <p:nvPr/>
+        </p:nvSpPr>
+        <p:spPr>
+          <a:xfrm>
+            <a:off x="3995936" y="4751858"/>
+            <a:ext cx="4432624" cy="707886"/>
+          </a:xfrm>
+          <a:prstGeom prst="rect">
+            <a:avLst/>
+          </a:prstGeom>
+          <a:noFill/>
+        </p:spPr>
+        <p:txBody>
+          <a:bodyPr wrap="none" rtlCol="0">
+            <a:spAutoFit/>
+          </a:bodyPr>
+          <a:lstStyle/>
+          <a:p>
+            <a:r>
+              <a:rPr lang="en-GB" sz="4000" i="1" dirty="0" smtClean="0">
+                <a:solidFill>
+                  <a:srgbClr val="7030A0"/>
+                </a:solidFill>
+                <a:latin typeface="Calibri" panose="020F0502020204030204" pitchFamily="34" charset="0"/>
+                <a:cs typeface="Courier New" panose="02070309020205020404" pitchFamily="49" charset="0"/>
+              </a:rPr>
+              <a:t>=  f  1  :  map  f  [2,3]</a:t>
+            </a:r>
+            <a:endParaRPr lang="en-GB" sz="4000" i="1" dirty="0" smtClean="0">
+              <a:solidFill>
+                <a:srgbClr val="7030A0"/>
+              </a:solidFill>
+              <a:latin typeface="Calibri" panose="020F0502020204030204" pitchFamily="34" charset="0"/>
+              <a:cs typeface="Courier New" panose="02070309020205020404" pitchFamily="49" charset="0"/>
+            </a:endParaRPr>
+          </a:p>
+        </p:txBody>
+      </p:sp>
+      <p:sp>
+        <p:nvSpPr>
+          <p:cNvPr id="9" name="TextBox 8"/>
+          <p:cNvSpPr txBox="1"/>
+          <p:nvPr/>
+        </p:nvSpPr>
+        <p:spPr>
+          <a:xfrm>
+            <a:off x="494148" y="5590981"/>
+            <a:ext cx="8226932" cy="646331"/>
+          </a:xfrm>
+          <a:prstGeom prst="rect">
+            <a:avLst/>
+          </a:prstGeom>
+          <a:noFill/>
+        </p:spPr>
+        <p:txBody>
+          <a:bodyPr wrap="none" rtlCol="0">
+            <a:spAutoFit/>
+          </a:bodyPr>
+          <a:lstStyle/>
+          <a:p>
+            <a:r>
+              <a:rPr lang="en-GB" sz="3600" dirty="0" smtClean="0">
+                <a:latin typeface="Courier New" panose="02070309020205020404" pitchFamily="49" charset="0"/>
+                <a:cs typeface="Courier New" panose="02070309020205020404" pitchFamily="49" charset="0"/>
+              </a:rPr>
+              <a:t>map f (x:xs) = f x : map f xs</a:t>
+            </a:r>
+            <a:endParaRPr lang="en-GB" sz="3600" dirty="0" smtClean="0">
+              <a:latin typeface="Courier New" panose="02070309020205020404" pitchFamily="49" charset="0"/>
+              <a:cs typeface="Courier New" panose="02070309020205020404" pitchFamily="49" charset="0"/>
+            </a:endParaRPr>
+          </a:p>
+        </p:txBody>
+      </p:sp>
+    </p:spTree>
+    <p:extLst>
+      <p:ext uri="{BB962C8B-B14F-4D97-AF65-F5344CB8AC3E}">
+        <p14:creationId xmlns:p14="http://schemas.microsoft.com/office/powerpoint/2010/main" val="3411727275"/>
+      </p:ext>
+    </p:extLst>
+  </p:cSld>
+  <p:clrMapOvr>
+    <a:masterClrMapping/>
+  </p:clrMapOvr>
+  <p:timing>
+    <p:tnLst>
+      <p:par>
+        <p:cTn id="1" dur="indefinite" restart="never" nodeType="tmRoot">
+          <p:childTnLst>
+            <p:seq concurrent="1" nextAc="seek">
+              <p:cTn id="2" dur="indefinite" nodeType="mainSeq">
+                <p:childTnLst>
+                  <p:par>
+                    <p:cTn id="3" fill="hold">
+                      <p:stCondLst>
+                        <p:cond delay="indefinite"/>
+                      </p:stCondLst>
+                      <p:childTnLst>
+                        <p:par>
+                          <p:cTn id="4" fill="hold">
+                            <p:stCondLst>
+                              <p:cond delay="0"/>
+                            </p:stCondLst>
+                            <p:childTnLst>
+                              <p:par>
+                                <p:cTn id="5" presetID="1" presetClass="entr" presetSubtype="0" fill="hold" grpId="0" nodeType="clickEffect">
+                                  <p:stCondLst>
+                                    <p:cond delay="0"/>
+                                  </p:stCondLst>
+                                  <p:childTnLst>
+                                    <p:set>
+                                      <p:cBhvr>
+                                        <p:cTn id="6" dur="1" fill="hold">
+                                          <p:stCondLst>
+                                            <p:cond delay="0"/>
+                                          </p:stCondLst>
+                                        </p:cTn>
+                                        <p:tgtEl>
+                                          <p:spTgt spid="4"/>
+                                        </p:tgtEl>
+                                        <p:attrNameLst>
+                                          <p:attrName>style.visibility</p:attrName>
+                                        </p:attrNameLst>
+                                      </p:cBhvr>
+                                      <p:to>
+                                        <p:strVal val="visible"/>
+                                      </p:to>
+                                    </p:set>
+                                  </p:childTnLst>
+                                </p:cTn>
+                              </p:par>
+                            </p:childTnLst>
+                          </p:cTn>
+                        </p:par>
+                      </p:childTnLst>
+                    </p:cTn>
+                  </p:par>
+                  <p:par>
+                    <p:cTn id="7" fill="hold">
+                      <p:stCondLst>
+                        <p:cond delay="indefinite"/>
+                      </p:stCondLst>
+                      <p:childTnLst>
+                        <p:par>
+                          <p:cTn id="8" fill="hold">
+                            <p:stCondLst>
+                              <p:cond delay="0"/>
+                            </p:stCondLst>
+                            <p:childTnLst>
+                              <p:par>
+                                <p:cTn id="9" presetID="1" presetClass="entr" presetSubtype="0" fill="hold" grpId="0" nodeType="clickEffect">
+                                  <p:stCondLst>
+                                    <p:cond delay="0"/>
+                                  </p:stCondLst>
+                                  <p:childTnLst>
+                                    <p:set>
+                                      <p:cBhvr>
+                                        <p:cTn id="10" dur="1" fill="hold">
+                                          <p:stCondLst>
+                                            <p:cond delay="0"/>
+                                          </p:stCondLst>
+                                        </p:cTn>
+                                        <p:tgtEl>
+                                          <p:spTgt spid="5"/>
+                                        </p:tgtEl>
+                                        <p:attrNameLst>
+                                          <p:attrName>style.visibility</p:attrName>
+                                        </p:attrNameLst>
+                                      </p:cBhvr>
+                                      <p:to>
+                                        <p:strVal val="visible"/>
+                                      </p:to>
+                                    </p:set>
+                                  </p:childTnLst>
+                                </p:cTn>
+                              </p:par>
+                            </p:childTnLst>
+                          </p:cTn>
+                        </p:par>
+                      </p:childTnLst>
+                    </p:cTn>
+                  </p:par>
+                  <p:par>
+                    <p:cTn id="11" fill="hold">
+                      <p:stCondLst>
+                        <p:cond delay="indefinite"/>
+                      </p:stCondLst>
+                      <p:childTnLst>
+                        <p:par>
+                          <p:cTn id="12" fill="hold">
+                            <p:stCondLst>
+                              <p:cond delay="0"/>
+                            </p:stCondLst>
+                            <p:childTnLst>
+                              <p:par>
+                                <p:cTn id="13" presetID="1" presetClass="entr" presetSubtype="0" fill="hold" grpId="0" nodeType="clickEffect">
+                                  <p:stCondLst>
+                                    <p:cond delay="0"/>
+                                  </p:stCondLst>
+                                  <p:childTnLst>
+                                    <p:set>
+                                      <p:cBhvr>
+                                        <p:cTn id="14" dur="1" fill="hold">
+                                          <p:stCondLst>
+                                            <p:cond delay="0"/>
+                                          </p:stCondLst>
+                                        </p:cTn>
+                                        <p:tgtEl>
+                                          <p:spTgt spid="6"/>
+                                        </p:tgtEl>
+                                        <p:attrNameLst>
+                                          <p:attrName>style.visibility</p:attrName>
+                                        </p:attrNameLst>
+                                      </p:cBhvr>
+                                      <p:to>
+                                        <p:strVal val="visible"/>
+                                      </p:to>
+                                    </p:set>
+                                  </p:childTnLst>
+                                </p:cTn>
+                              </p:par>
+                            </p:childTnLst>
+                          </p:cTn>
+                        </p:par>
+                      </p:childTnLst>
+                    </p:cTn>
+                  </p:par>
+                  <p:par>
+                    <p:cTn id="15" fill="hold">
+                      <p:stCondLst>
+                        <p:cond delay="indefinite"/>
+                      </p:stCondLst>
+                      <p:childTnLst>
+                        <p:par>
+                          <p:cTn id="16" fill="hold">
+                            <p:stCondLst>
+                              <p:cond delay="0"/>
+                            </p:stCondLst>
+                            <p:childTnLst>
+                              <p:par>
+                                <p:cTn id="17" presetID="1" presetClass="entr" presetSubtype="0" fill="hold" grpId="0" nodeType="clickEffect">
+                                  <p:stCondLst>
+                                    <p:cond delay="0"/>
+                                  </p:stCondLst>
+                                  <p:childTnLst>
+                                    <p:set>
+                                      <p:cBhvr>
+                                        <p:cTn id="18" dur="1" fill="hold">
+                                          <p:stCondLst>
+                                            <p:cond delay="0"/>
+                                          </p:stCondLst>
+                                        </p:cTn>
+                                        <p:tgtEl>
+                                          <p:spTgt spid="7"/>
+                                        </p:tgtEl>
+                                        <p:attrNameLst>
+                                          <p:attrName>style.visibility</p:attrName>
+                                        </p:attrNameLst>
+                                      </p:cBhvr>
+                                      <p:to>
+                                        <p:strVal val="visible"/>
+                                      </p:to>
+                                    </p:set>
+                                  </p:childTnLst>
+                                </p:cTn>
+                              </p:par>
+                            </p:childTnLst>
+                          </p:cTn>
+                        </p:par>
+                      </p:childTnLst>
+                    </p:cTn>
+                  </p:par>
+                  <p:par>
+                    <p:cTn id="19" fill="hold">
+                      <p:stCondLst>
+                        <p:cond delay="indefinite"/>
+                      </p:stCondLst>
+                      <p:childTnLst>
+                        <p:par>
+                          <p:cTn id="20" fill="hold">
+                            <p:stCondLst>
+                              <p:cond delay="0"/>
+                            </p:stCondLst>
+                            <p:childTnLst>
+                              <p:par>
+                                <p:cTn id="21" presetID="1" presetClass="entr" presetSubtype="0" fill="hold" grpId="0" nodeType="clickEffect">
+                                  <p:stCondLst>
+                                    <p:cond delay="0"/>
+                                  </p:stCondLst>
+                                  <p:childTnLst>
+                                    <p:set>
+                                      <p:cBhvr>
+                                        <p:cTn id="22" dur="1" fill="hold">
+                                          <p:stCondLst>
+                                            <p:cond delay="0"/>
+                                          </p:stCondLst>
+                                        </p:cTn>
+                                        <p:tgtEl>
+                                          <p:spTgt spid="8"/>
+                                        </p:tgtEl>
+                                        <p:attrNameLst>
+                                          <p:attrName>style.visibility</p:attrName>
+                                        </p:attrNameLst>
+                                      </p:cBhvr>
+                                      <p:to>
+                                        <p:strVal val="visible"/>
+                                      </p:to>
+                                    </p:set>
+                                  </p:childTnLst>
+                                </p:cTn>
+                              </p:par>
+                            </p:childTnLst>
+                          </p:cTn>
+                        </p:par>
+                      </p:childTnLst>
+                    </p:cTn>
+                  </p:par>
+                  <p:par>
+                    <p:cTn id="23" fill="hold">
+                      <p:stCondLst>
+                        <p:cond delay="indefinite"/>
+                      </p:stCondLst>
+                      <p:childTnLst>
+                        <p:par>
+                          <p:cTn id="24" fill="hold">
+                            <p:stCondLst>
+                              <p:cond delay="0"/>
+                            </p:stCondLst>
+                            <p:childTnLst>
+                              <p:par>
+                                <p:cTn id="25" presetID="1" presetClass="entr" presetSubtype="0" fill="hold" grpId="0" nodeType="clickEffect">
+                                  <p:stCondLst>
+                                    <p:cond delay="0"/>
+                                  </p:stCondLst>
+                                  <p:childTnLst>
+                                    <p:set>
+                                      <p:cBhvr>
+                                        <p:cTn id="26" dur="1" fill="hold">
+                                          <p:stCondLst>
+                                            <p:cond delay="0"/>
+                                          </p:stCondLst>
+                                        </p:cTn>
+                                        <p:tgtEl>
+                                          <p:spTgt spid="9"/>
+                                        </p:tgtEl>
+                                        <p:attrNameLst>
+                                          <p:attrName>style.visibility</p:attrName>
+                                        </p:attrNameLst>
+                                      </p:cBhvr>
+                                      <p:to>
+                                        <p:strVal val="visible"/>
+                                      </p:to>
+                                    </p:set>
+                                  </p:childTnLst>
+                                </p:cTn>
+                              </p:par>
+                            </p:childTnLst>
+                          </p:cTn>
+                        </p:par>
+                      </p:childTnLst>
+                    </p:cTn>
+                  </p:par>
+                </p:childTnLst>
+              </p:cTn>
+              <p:prevCondLst>
+                <p:cond evt="onPrev" delay="0">
+                  <p:tgtEl>
+                    <p:sldTgt/>
+                  </p:tgtEl>
+                </p:cond>
+              </p:prevCondLst>
+              <p:nextCondLst>
+                <p:cond evt="onNext" delay="0">
+                  <p:tgtEl>
+                    <p:sldTgt/>
+                  </p:tgtEl>
+                </p:cond>
+              </p:nextCondLst>
+            </p:seq>
+          </p:childTnLst>
+        </p:cTn>
+      </p:par>
+    </p:tnLst>
+    <p:bldLst>
+      <p:bldP spid="4" grpId="0"/>
+      <p:bldP spid="5" grpId="0"/>
+      <p:bldP spid="6" grpId="0"/>
+      <p:bldP spid="7" grpId="0"/>
+      <p:bldP spid="8" grpId="0"/>
+      <p:bldP spid="9" grpId="0"/>
+    </p:bldLst>
+  </p:timing>
+</p:sld>
+</file>
+
 <file path=ppt/slides/slide4.xml><?xml version="1.0" encoding="utf-8"?>
 <p:sld xmlns:a="http://schemas.openxmlformats.org/drawingml/2006/main" xmlns:r="http://schemas.openxmlformats.org/officeDocument/2006/relationships" xmlns:p="http://schemas.openxmlformats.org/presentationml/2006/main">
   <p:cSld>
@@ -15195,7 +17382,7 @@
         <p:spPr>
           <a:xfrm>
             <a:off x="2627784" y="1700808"/>
-            <a:ext cx="3562770" cy="1200329"/>
+            <a:ext cx="4239237" cy="1200329"/>
           </a:xfrm>
           <a:prstGeom prst="rect">
             <a:avLst/>
@@ -15214,7 +17401,7 @@
                   <a:srgbClr val="0070C0"/>
                 </a:solidFill>
               </a:rPr>
-              <a:t>Exercises</a:t>
+              <a:t>Exercises 1</a:t>
             </a:r>
             <a:endParaRPr lang="en-GB" sz="7200" dirty="0">
               <a:solidFill>

</xml_diff>

<commit_message>
Update function def and types sections
</commit_message>
<xml_diff>
--- a/beginning-haskell.pptx
+++ b/beginning-haskell.pptx
@@ -5,10 +5,10 @@
     <p:sldMasterId id="2147483648" r:id="rId1"/>
   </p:sldMasterIdLst>
   <p:notesMasterIdLst>
-    <p:notesMasterId r:id="rId35"/>
+    <p:notesMasterId r:id="rId32"/>
   </p:notesMasterIdLst>
   <p:handoutMasterIdLst>
-    <p:handoutMasterId r:id="rId36"/>
+    <p:handoutMasterId r:id="rId33"/>
   </p:handoutMasterIdLst>
   <p:sldIdLst>
     <p:sldId id="263" r:id="rId2"/>
@@ -31,19 +31,16 @@
     <p:sldId id="277" r:id="rId19"/>
     <p:sldId id="284" r:id="rId20"/>
     <p:sldId id="278" r:id="rId21"/>
-    <p:sldId id="279" r:id="rId22"/>
-    <p:sldId id="280" r:id="rId23"/>
-    <p:sldId id="281" r:id="rId24"/>
-    <p:sldId id="282" r:id="rId25"/>
-    <p:sldId id="283" r:id="rId26"/>
-    <p:sldId id="286" r:id="rId27"/>
-    <p:sldId id="290" r:id="rId28"/>
-    <p:sldId id="287" r:id="rId29"/>
-    <p:sldId id="285" r:id="rId30"/>
-    <p:sldId id="288" r:id="rId31"/>
-    <p:sldId id="289" r:id="rId32"/>
-    <p:sldId id="291" r:id="rId33"/>
-    <p:sldId id="292" r:id="rId34"/>
+    <p:sldId id="282" r:id="rId22"/>
+    <p:sldId id="283" r:id="rId23"/>
+    <p:sldId id="286" r:id="rId24"/>
+    <p:sldId id="290" r:id="rId25"/>
+    <p:sldId id="287" r:id="rId26"/>
+    <p:sldId id="285" r:id="rId27"/>
+    <p:sldId id="288" r:id="rId28"/>
+    <p:sldId id="289" r:id="rId29"/>
+    <p:sldId id="291" r:id="rId30"/>
+    <p:sldId id="292" r:id="rId31"/>
   </p:sldIdLst>
   <p:sldSz cx="9144000" cy="6858000" type="screen4x3"/>
   <p:notesSz cx="6797675" cy="9926638"/>
@@ -227,7 +224,7 @@
           <a:p>
             <a:fld id="{8CF2A7F3-13F6-4645-BC6B-B3276F6FFD3F}" type="datetimeFigureOut">
               <a:rPr lang="en-GB" smtClean="0"/>
-              <a:t>20/09/2015</a:t>
+              <a:t>22/09/2015</a:t>
             </a:fld>
             <a:endParaRPr lang="en-GB" dirty="0"/>
           </a:p>
@@ -392,7 +389,7 @@
           <a:p>
             <a:fld id="{AD3FA50F-1914-4298-B603-A4EE2FCB29C0}" type="datetimeFigureOut">
               <a:rPr lang="en-GB" smtClean="0"/>
-              <a:t>20/09/2015</a:t>
+              <a:t>22/09/2015</a:t>
             </a:fld>
             <a:endParaRPr lang="en-GB" dirty="0"/>
           </a:p>
@@ -917,7 +914,7 @@
           <a:p>
             <a:fld id="{999CC533-FB79-4577-A6D0-2326348CB1C0}" type="slidenum">
               <a:rPr lang="en-GB" smtClean="0"/>
-              <a:t>25</a:t>
+              <a:t>22</a:t>
             </a:fld>
             <a:endParaRPr lang="en-GB" dirty="0"/>
           </a:p>
@@ -1009,7 +1006,7 @@
           <a:p>
             <a:fld id="{999CC533-FB79-4577-A6D0-2326348CB1C0}" type="slidenum">
               <a:rPr lang="en-GB" smtClean="0"/>
-              <a:t>26</a:t>
+              <a:t>23</a:t>
             </a:fld>
             <a:endParaRPr lang="en-GB" dirty="0"/>
           </a:p>
@@ -1101,7 +1098,7 @@
           <a:p>
             <a:fld id="{999CC533-FB79-4577-A6D0-2326348CB1C0}" type="slidenum">
               <a:rPr lang="en-GB" smtClean="0"/>
-              <a:t>27</a:t>
+              <a:t>24</a:t>
             </a:fld>
             <a:endParaRPr lang="en-GB" dirty="0"/>
           </a:p>
@@ -1193,7 +1190,7 @@
           <a:p>
             <a:fld id="{999CC533-FB79-4577-A6D0-2326348CB1C0}" type="slidenum">
               <a:rPr lang="en-GB" smtClean="0"/>
-              <a:t>31</a:t>
+              <a:t>28</a:t>
             </a:fld>
             <a:endParaRPr lang="en-GB" dirty="0"/>
           </a:p>
@@ -1285,7 +1282,7 @@
           <a:p>
             <a:fld id="{999CC533-FB79-4577-A6D0-2326348CB1C0}" type="slidenum">
               <a:rPr lang="en-GB" smtClean="0"/>
-              <a:t>32</a:t>
+              <a:t>29</a:t>
             </a:fld>
             <a:endParaRPr lang="en-GB" dirty="0"/>
           </a:p>
@@ -1377,7 +1374,7 @@
           <a:p>
             <a:fld id="{999CC533-FB79-4577-A6D0-2326348CB1C0}" type="slidenum">
               <a:rPr lang="en-GB" smtClean="0"/>
-              <a:t>33</a:t>
+              <a:t>30</a:t>
             </a:fld>
             <a:endParaRPr lang="en-GB" dirty="0"/>
           </a:p>
@@ -2313,7 +2310,7 @@
           <a:p>
             <a:fld id="{95BECF0C-4CAB-4B68-A56B-44E0A3F5E222}" type="datetimeFigureOut">
               <a:rPr lang="en-GB" smtClean="0"/>
-              <a:t>20/09/2015</a:t>
+              <a:t>22/09/2015</a:t>
             </a:fld>
             <a:endParaRPr lang="en-GB" dirty="0"/>
           </a:p>
@@ -2483,7 +2480,7 @@
           <a:p>
             <a:fld id="{95BECF0C-4CAB-4B68-A56B-44E0A3F5E222}" type="datetimeFigureOut">
               <a:rPr lang="en-GB" smtClean="0"/>
-              <a:t>20/09/2015</a:t>
+              <a:t>22/09/2015</a:t>
             </a:fld>
             <a:endParaRPr lang="en-GB" dirty="0"/>
           </a:p>
@@ -2663,7 +2660,7 @@
           <a:p>
             <a:fld id="{95BECF0C-4CAB-4B68-A56B-44E0A3F5E222}" type="datetimeFigureOut">
               <a:rPr lang="en-GB" smtClean="0"/>
-              <a:t>20/09/2015</a:t>
+              <a:t>22/09/2015</a:t>
             </a:fld>
             <a:endParaRPr lang="en-GB" dirty="0"/>
           </a:p>
@@ -2833,7 +2830,7 @@
           <a:p>
             <a:fld id="{95BECF0C-4CAB-4B68-A56B-44E0A3F5E222}" type="datetimeFigureOut">
               <a:rPr lang="en-GB" smtClean="0"/>
-              <a:t>20/09/2015</a:t>
+              <a:t>22/09/2015</a:t>
             </a:fld>
             <a:endParaRPr lang="en-GB" dirty="0"/>
           </a:p>
@@ -3079,7 +3076,7 @@
           <a:p>
             <a:fld id="{95BECF0C-4CAB-4B68-A56B-44E0A3F5E222}" type="datetimeFigureOut">
               <a:rPr lang="en-GB" smtClean="0"/>
-              <a:t>20/09/2015</a:t>
+              <a:t>22/09/2015</a:t>
             </a:fld>
             <a:endParaRPr lang="en-GB" dirty="0"/>
           </a:p>
@@ -3367,7 +3364,7 @@
           <a:p>
             <a:fld id="{95BECF0C-4CAB-4B68-A56B-44E0A3F5E222}" type="datetimeFigureOut">
               <a:rPr lang="en-GB" smtClean="0"/>
-              <a:t>20/09/2015</a:t>
+              <a:t>22/09/2015</a:t>
             </a:fld>
             <a:endParaRPr lang="en-GB" dirty="0"/>
           </a:p>
@@ -3789,7 +3786,7 @@
           <a:p>
             <a:fld id="{95BECF0C-4CAB-4B68-A56B-44E0A3F5E222}" type="datetimeFigureOut">
               <a:rPr lang="en-GB" smtClean="0"/>
-              <a:t>20/09/2015</a:t>
+              <a:t>22/09/2015</a:t>
             </a:fld>
             <a:endParaRPr lang="en-GB" dirty="0"/>
           </a:p>
@@ -3907,7 +3904,7 @@
           <a:p>
             <a:fld id="{95BECF0C-4CAB-4B68-A56B-44E0A3F5E222}" type="datetimeFigureOut">
               <a:rPr lang="en-GB" smtClean="0"/>
-              <a:t>20/09/2015</a:t>
+              <a:t>22/09/2015</a:t>
             </a:fld>
             <a:endParaRPr lang="en-GB" dirty="0"/>
           </a:p>
@@ -4002,7 +3999,7 @@
           <a:p>
             <a:fld id="{95BECF0C-4CAB-4B68-A56B-44E0A3F5E222}" type="datetimeFigureOut">
               <a:rPr lang="en-GB" smtClean="0"/>
-              <a:t>20/09/2015</a:t>
+              <a:t>22/09/2015</a:t>
             </a:fld>
             <a:endParaRPr lang="en-GB" dirty="0"/>
           </a:p>
@@ -4279,7 +4276,7 @@
           <a:p>
             <a:fld id="{95BECF0C-4CAB-4B68-A56B-44E0A3F5E222}" type="datetimeFigureOut">
               <a:rPr lang="en-GB" smtClean="0"/>
-              <a:t>20/09/2015</a:t>
+              <a:t>22/09/2015</a:t>
             </a:fld>
             <a:endParaRPr lang="en-GB" dirty="0"/>
           </a:p>
@@ -4532,7 +4529,7 @@
           <a:p>
             <a:fld id="{95BECF0C-4CAB-4B68-A56B-44E0A3F5E222}" type="datetimeFigureOut">
               <a:rPr lang="en-GB" smtClean="0"/>
-              <a:t>20/09/2015</a:t>
+              <a:t>22/09/2015</a:t>
             </a:fld>
             <a:endParaRPr lang="en-GB" dirty="0"/>
           </a:p>
@@ -4745,7 +4742,7 @@
           <a:p>
             <a:fld id="{95BECF0C-4CAB-4B68-A56B-44E0A3F5E222}" type="datetimeFigureOut">
               <a:rPr lang="en-GB" smtClean="0"/>
-              <a:t>20/09/2015</a:t>
+              <a:t>22/09/2015</a:t>
             </a:fld>
             <a:endParaRPr lang="en-GB" dirty="0"/>
           </a:p>
@@ -5278,7 +5275,7 @@
         </p:nvSpPr>
         <p:spPr>
           <a:xfrm>
-            <a:off x="1331640" y="1052736"/>
+            <a:off x="1308247" y="476672"/>
             <a:ext cx="3567002" cy="769441"/>
           </a:xfrm>
           <a:prstGeom prst="rect">
@@ -5314,7 +5311,7 @@
         </p:nvSpPr>
         <p:spPr>
           <a:xfrm>
-            <a:off x="1308247" y="2398241"/>
+            <a:off x="1308247" y="1700808"/>
             <a:ext cx="4919937" cy="769441"/>
           </a:xfrm>
           <a:prstGeom prst="rect">
@@ -5350,7 +5347,7 @@
         </p:nvSpPr>
         <p:spPr>
           <a:xfrm>
-            <a:off x="1343231" y="3838401"/>
+            <a:off x="1308247" y="2996952"/>
             <a:ext cx="3228769" cy="769441"/>
           </a:xfrm>
           <a:prstGeom prst="rect">
@@ -5372,6 +5369,42 @@
               <a:t>sq = (^2)</a:t>
             </a:r>
             <a:endParaRPr lang="en-GB" sz="4400" dirty="0">
+              <a:latin typeface="Courier New" panose="02070309020205020404" pitchFamily="49" charset="0"/>
+              <a:cs typeface="Courier New" panose="02070309020205020404" pitchFamily="49" charset="0"/>
+            </a:endParaRPr>
+          </a:p>
+        </p:txBody>
+      </p:sp>
+      <p:sp>
+        <p:nvSpPr>
+          <p:cNvPr id="2" name="TextBox 1"/>
+          <p:cNvSpPr txBox="1"/>
+          <p:nvPr/>
+        </p:nvSpPr>
+        <p:spPr>
+          <a:xfrm>
+            <a:off x="1308247" y="4941168"/>
+            <a:ext cx="5934638" cy="769441"/>
+          </a:xfrm>
+          <a:prstGeom prst="rect">
+            <a:avLst/>
+          </a:prstGeom>
+          <a:noFill/>
+        </p:spPr>
+        <p:txBody>
+          <a:bodyPr wrap="none" rtlCol="0">
+            <a:spAutoFit/>
+          </a:bodyPr>
+          <a:lstStyle/>
+          <a:p>
+            <a:r>
+              <a:rPr lang="en-GB" sz="4400" dirty="0" smtClean="0">
+                <a:latin typeface="Courier New" panose="02070309020205020404" pitchFamily="49" charset="0"/>
+                <a:cs typeface="Courier New" panose="02070309020205020404" pitchFamily="49" charset="0"/>
+              </a:rPr>
+              <a:t>h x y = x + 2 * y</a:t>
+            </a:r>
+            <a:endParaRPr lang="en-GB" sz="4400" dirty="0" smtClean="0">
               <a:latin typeface="Courier New" panose="02070309020205020404" pitchFamily="49" charset="0"/>
               <a:cs typeface="Courier New" panose="02070309020205020404" pitchFamily="49" charset="0"/>
             </a:endParaRPr>
@@ -5789,6 +5822,51 @@
                       </p:childTnLst>
                     </p:cTn>
                   </p:par>
+                  <p:par>
+                    <p:cTn id="7" fill="hold">
+                      <p:stCondLst>
+                        <p:cond delay="indefinite"/>
+                      </p:stCondLst>
+                      <p:childTnLst>
+                        <p:par>
+                          <p:cTn id="8" fill="hold">
+                            <p:stCondLst>
+                              <p:cond delay="0"/>
+                            </p:stCondLst>
+                            <p:childTnLst>
+                              <p:par>
+                                <p:cTn id="9" presetID="1" presetClass="entr" presetSubtype="0" fill="hold" grpId="0" nodeType="clickEffect">
+                                  <p:stCondLst>
+                                    <p:cond delay="0"/>
+                                  </p:stCondLst>
+                                  <p:childTnLst>
+                                    <p:set>
+                                      <p:cBhvr>
+                                        <p:cTn id="10" dur="1" fill="hold">
+                                          <p:stCondLst>
+                                            <p:cond delay="0"/>
+                                          </p:stCondLst>
+                                        </p:cTn>
+                                        <p:tgtEl>
+                                          <p:spTgt spid="10"/>
+                                        </p:tgtEl>
+                                        <p:attrNameLst>
+                                          <p:attrName>style.visibility</p:attrName>
+                                        </p:attrNameLst>
+                                      </p:cBhvr>
+                                      <p:to>
+                                        <p:strVal val="visible"/>
+                                      </p:to>
+                                    </p:set>
+                                  </p:childTnLst>
+                                </p:cTn>
+                              </p:par>
+                            </p:childTnLst>
+                          </p:cTn>
+                        </p:par>
+                      </p:childTnLst>
+                    </p:cTn>
+                  </p:par>
                 </p:childTnLst>
               </p:cTn>
               <p:prevCondLst>
@@ -5812,6 +5890,7 @@
     </p:tnLst>
     <p:bldLst>
       <p:bldP spid="6" grpId="0"/>
+      <p:bldP spid="10" grpId="0"/>
     </p:bldLst>
   </p:timing>
 </p:sld>
@@ -8513,7 +8592,7 @@
         <p:spPr>
           <a:xfrm>
             <a:off x="4139952" y="3955703"/>
-            <a:ext cx="3567002" cy="769441"/>
+            <a:ext cx="3905236" cy="1446550"/>
           </a:xfrm>
           <a:prstGeom prst="rect">
             <a:avLst/>
@@ -8531,75 +8610,28 @@
                 <a:latin typeface="Courier New" panose="02070309020205020404" pitchFamily="49" charset="0"/>
                 <a:cs typeface="Courier New" panose="02070309020205020404" pitchFamily="49" charset="0"/>
               </a:rPr>
-              <a:t>Set String</a:t>
-            </a:r>
-          </a:p>
-        </p:txBody>
-      </p:sp>
-      <p:sp>
-        <p:nvSpPr>
-          <p:cNvPr id="6" name="TextBox 5"/>
-          <p:cNvSpPr txBox="1"/>
-          <p:nvPr/>
-        </p:nvSpPr>
-        <p:spPr>
-          <a:xfrm>
-            <a:off x="4139952" y="4869160"/>
-            <a:ext cx="3228769" cy="769441"/>
-          </a:xfrm>
-          <a:prstGeom prst="rect">
-            <a:avLst/>
-          </a:prstGeom>
-          <a:noFill/>
-        </p:spPr>
-        <p:txBody>
-          <a:bodyPr wrap="none" rtlCol="0">
-            <a:spAutoFit/>
-          </a:bodyPr>
-          <a:lstStyle/>
-          <a:p>
+              <a:t>Set </a:t>
+            </a:r>
             <a:r>
               <a:rPr lang="en-GB" sz="4400" dirty="0" smtClean="0">
                 <a:latin typeface="Courier New" panose="02070309020205020404" pitchFamily="49" charset="0"/>
                 <a:cs typeface="Courier New" panose="02070309020205020404" pitchFamily="49" charset="0"/>
               </a:rPr>
-              <a:t>Maybe Int</a:t>
-            </a:r>
-          </a:p>
-        </p:txBody>
-      </p:sp>
-      <p:sp>
-        <p:nvSpPr>
-          <p:cNvPr id="7" name="TextBox 6"/>
-          <p:cNvSpPr txBox="1"/>
-          <p:nvPr/>
-        </p:nvSpPr>
-        <p:spPr>
-          <a:xfrm>
-            <a:off x="2987824" y="5805264"/>
-            <a:ext cx="5934638" cy="769441"/>
-          </a:xfrm>
-          <a:prstGeom prst="rect">
-            <a:avLst/>
-          </a:prstGeom>
-          <a:noFill/>
-        </p:spPr>
-        <p:txBody>
-          <a:bodyPr wrap="none" rtlCol="0">
-            <a:spAutoFit/>
-          </a:bodyPr>
-          <a:lstStyle/>
+              <a:t>Int</a:t>
+            </a:r>
+          </a:p>
           <a:p>
             <a:r>
               <a:rPr lang="en-GB" sz="4400" dirty="0" smtClean="0">
-                <a:solidFill>
-                  <a:srgbClr val="0070C0"/>
-                </a:solidFill>
-                <a:latin typeface="Courier New" panose="02070309020205020404" pitchFamily="49" charset="0"/>
-                <a:cs typeface="Courier New" panose="02070309020205020404" pitchFamily="49" charset="0"/>
-              </a:rPr>
-              <a:t>Just 3    Nothing</a:t>
-            </a:r>
+                <a:latin typeface="Courier New" panose="02070309020205020404" pitchFamily="49" charset="0"/>
+                <a:cs typeface="Courier New" panose="02070309020205020404" pitchFamily="49" charset="0"/>
+              </a:rPr>
+              <a:t>Set Integer</a:t>
+            </a:r>
+            <a:endParaRPr lang="en-GB" sz="4400" dirty="0" smtClean="0">
+              <a:latin typeface="Courier New" panose="02070309020205020404" pitchFamily="49" charset="0"/>
+              <a:cs typeface="Courier New" panose="02070309020205020404" pitchFamily="49" charset="0"/>
+            </a:endParaRPr>
           </a:p>
         </p:txBody>
       </p:sp>
@@ -8711,96 +8743,6 @@
                       </p:childTnLst>
                     </p:cTn>
                   </p:par>
-                  <p:par>
-                    <p:cTn id="11" fill="hold">
-                      <p:stCondLst>
-                        <p:cond delay="indefinite"/>
-                      </p:stCondLst>
-                      <p:childTnLst>
-                        <p:par>
-                          <p:cTn id="12" fill="hold">
-                            <p:stCondLst>
-                              <p:cond delay="0"/>
-                            </p:stCondLst>
-                            <p:childTnLst>
-                              <p:par>
-                                <p:cTn id="13" presetID="1" presetClass="entr" presetSubtype="0" fill="hold" grpId="0" nodeType="clickEffect">
-                                  <p:stCondLst>
-                                    <p:cond delay="0"/>
-                                  </p:stCondLst>
-                                  <p:childTnLst>
-                                    <p:set>
-                                      <p:cBhvr>
-                                        <p:cTn id="14" dur="1" fill="hold">
-                                          <p:stCondLst>
-                                            <p:cond delay="0"/>
-                                          </p:stCondLst>
-                                        </p:cTn>
-                                        <p:tgtEl>
-                                          <p:spTgt spid="6"/>
-                                        </p:tgtEl>
-                                        <p:attrNameLst>
-                                          <p:attrName>style.visibility</p:attrName>
-                                        </p:attrNameLst>
-                                      </p:cBhvr>
-                                      <p:to>
-                                        <p:strVal val="visible"/>
-                                      </p:to>
-                                    </p:set>
-                                  </p:childTnLst>
-                                </p:cTn>
-                              </p:par>
-                            </p:childTnLst>
-                          </p:cTn>
-                        </p:par>
-                      </p:childTnLst>
-                    </p:cTn>
-                  </p:par>
-                  <p:par>
-                    <p:cTn id="15" fill="hold">
-                      <p:stCondLst>
-                        <p:cond delay="indefinite"/>
-                      </p:stCondLst>
-                      <p:childTnLst>
-                        <p:par>
-                          <p:cTn id="16" fill="hold">
-                            <p:stCondLst>
-                              <p:cond delay="0"/>
-                            </p:stCondLst>
-                            <p:childTnLst>
-                              <p:par>
-                                <p:cTn id="17" presetID="1" presetClass="entr" presetSubtype="0" fill="hold" grpId="0" nodeType="clickEffect">
-                                  <p:stCondLst>
-                                    <p:cond delay="0"/>
-                                  </p:stCondLst>
-                                  <p:childTnLst>
-                                    <p:set>
-                                      <p:cBhvr>
-                                        <p:cTn id="18" dur="1" fill="hold">
-                                          <p:stCondLst>
-                                            <p:cond delay="0"/>
-                                          </p:stCondLst>
-                                        </p:cTn>
-                                        <p:tgtEl>
-                                          <p:spTgt spid="7"/>
-                                        </p:tgtEl>
-                                        <p:attrNameLst>
-                                          <p:attrName>style.visibility</p:attrName>
-                                        </p:attrNameLst>
-                                      </p:cBhvr>
-                                      <p:to>
-                                        <p:strVal val="visible"/>
-                                      </p:to>
-                                    </p:set>
-                                  </p:childTnLst>
-                                </p:cTn>
-                              </p:par>
-                            </p:childTnLst>
-                          </p:cTn>
-                        </p:par>
-                      </p:childTnLst>
-                    </p:cTn>
-                  </p:par>
                 </p:childTnLst>
               </p:cTn>
               <p:prevCondLst>
@@ -8825,8 +8767,6 @@
     <p:bldLst>
       <p:bldP spid="3" grpId="0" animBg="1"/>
       <p:bldP spid="5" grpId="0"/>
-      <p:bldP spid="6" grpId="0"/>
-      <p:bldP spid="7" grpId="0"/>
     </p:bldLst>
   </p:timing>
 </p:sld>
@@ -9367,8 +9307,8 @@
         </p:nvSpPr>
         <p:spPr>
           <a:xfrm>
-            <a:off x="467544" y="973172"/>
-            <a:ext cx="7287572" cy="2123658"/>
+            <a:off x="251520" y="973172"/>
+            <a:ext cx="8640507" cy="3477875"/>
           </a:xfrm>
           <a:prstGeom prst="rect">
             <a:avLst/>
@@ -9386,7 +9326,7 @@
                 <a:latin typeface="Courier New" panose="02070309020205020404" pitchFamily="49" charset="0"/>
                 <a:cs typeface="Courier New" panose="02070309020205020404" pitchFamily="49" charset="0"/>
               </a:rPr>
-              <a:t>Int </a:t>
+              <a:t>odd </a:t>
             </a:r>
             <a:r>
               <a:rPr lang="en-GB" sz="4400" dirty="0" smtClean="0">
@@ -9396,23 +9336,14 @@
                 <a:latin typeface="Courier New" panose="02070309020205020404" pitchFamily="49" charset="0"/>
                 <a:cs typeface="Courier New" panose="02070309020205020404" pitchFamily="49" charset="0"/>
               </a:rPr>
-              <a:t>-&gt;</a:t>
+              <a:t>::</a:t>
             </a:r>
             <a:r>
               <a:rPr lang="en-GB" sz="4400" dirty="0" smtClean="0">
                 <a:latin typeface="Courier New" panose="02070309020205020404" pitchFamily="49" charset="0"/>
                 <a:cs typeface="Courier New" panose="02070309020205020404" pitchFamily="49" charset="0"/>
               </a:rPr>
-              <a:t> Bool</a:t>
-            </a:r>
-          </a:p>
-          <a:p>
-            <a:r>
-              <a:rPr lang="en-GB" sz="4400" dirty="0" smtClean="0">
-                <a:latin typeface="Courier New" panose="02070309020205020404" pitchFamily="49" charset="0"/>
-                <a:cs typeface="Courier New" panose="02070309020205020404" pitchFamily="49" charset="0"/>
-              </a:rPr>
-              <a:t>Char </a:t>
+              <a:t> Int </a:t>
             </a:r>
             <a:r>
               <a:rPr lang="en-GB" sz="4400" dirty="0" smtClean="0">
@@ -9429,7 +9360,7 @@
                 <a:latin typeface="Courier New" panose="02070309020205020404" pitchFamily="49" charset="0"/>
                 <a:cs typeface="Courier New" panose="02070309020205020404" pitchFamily="49" charset="0"/>
               </a:rPr>
-              <a:t> Int</a:t>
+              <a:t> Bool</a:t>
             </a:r>
           </a:p>
           <a:p>
@@ -9438,7 +9369,7 @@
                 <a:latin typeface="Courier New" panose="02070309020205020404" pitchFamily="49" charset="0"/>
                 <a:cs typeface="Courier New" panose="02070309020205020404" pitchFamily="49" charset="0"/>
               </a:rPr>
-              <a:t>Int </a:t>
+              <a:t>length </a:t>
             </a:r>
             <a:r>
               <a:rPr lang="en-GB" sz="4400" dirty="0" smtClean="0">
@@ -9448,14 +9379,14 @@
                 <a:latin typeface="Courier New" panose="02070309020205020404" pitchFamily="49" charset="0"/>
                 <a:cs typeface="Courier New" panose="02070309020205020404" pitchFamily="49" charset="0"/>
               </a:rPr>
-              <a:t>-&gt;</a:t>
+              <a:t>::</a:t>
             </a:r>
             <a:r>
               <a:rPr lang="en-GB" sz="4400" dirty="0" smtClean="0">
                 <a:latin typeface="Courier New" panose="02070309020205020404" pitchFamily="49" charset="0"/>
                 <a:cs typeface="Courier New" panose="02070309020205020404" pitchFamily="49" charset="0"/>
               </a:rPr>
-              <a:t> [Char] </a:t>
+              <a:t> [a] </a:t>
             </a:r>
             <a:r>
               <a:rPr lang="en-GB" sz="4400" dirty="0" smtClean="0">
@@ -9472,7 +9403,137 @@
                 <a:latin typeface="Courier New" panose="02070309020205020404" pitchFamily="49" charset="0"/>
                 <a:cs typeface="Courier New" panose="02070309020205020404" pitchFamily="49" charset="0"/>
               </a:rPr>
-              <a:t> Char</a:t>
+              <a:t> Int</a:t>
+            </a:r>
+            <a:endParaRPr lang="en-GB" sz="4400" dirty="0" smtClean="0">
+              <a:latin typeface="Courier New" panose="02070309020205020404" pitchFamily="49" charset="0"/>
+              <a:cs typeface="Courier New" panose="02070309020205020404" pitchFamily="49" charset="0"/>
+            </a:endParaRPr>
+          </a:p>
+          <a:p>
+            <a:r>
+              <a:rPr lang="en-GB" sz="4400" dirty="0" smtClean="0">
+                <a:latin typeface="Courier New" panose="02070309020205020404" pitchFamily="49" charset="0"/>
+                <a:cs typeface="Courier New" panose="02070309020205020404" pitchFamily="49" charset="0"/>
+              </a:rPr>
+              <a:t>take </a:t>
+            </a:r>
+            <a:r>
+              <a:rPr lang="en-GB" sz="4400" dirty="0" smtClean="0">
+                <a:solidFill>
+                  <a:srgbClr val="FF0000"/>
+                </a:solidFill>
+                <a:latin typeface="Courier New" panose="02070309020205020404" pitchFamily="49" charset="0"/>
+                <a:cs typeface="Courier New" panose="02070309020205020404" pitchFamily="49" charset="0"/>
+              </a:rPr>
+              <a:t>::</a:t>
+            </a:r>
+            <a:r>
+              <a:rPr lang="en-GB" sz="4400" dirty="0" smtClean="0">
+                <a:latin typeface="Courier New" panose="02070309020205020404" pitchFamily="49" charset="0"/>
+                <a:cs typeface="Courier New" panose="02070309020205020404" pitchFamily="49" charset="0"/>
+              </a:rPr>
+              <a:t> Int </a:t>
+            </a:r>
+            <a:r>
+              <a:rPr lang="en-GB" sz="4400" dirty="0" smtClean="0">
+                <a:solidFill>
+                  <a:srgbClr val="FF0000"/>
+                </a:solidFill>
+                <a:latin typeface="Courier New" panose="02070309020205020404" pitchFamily="49" charset="0"/>
+                <a:cs typeface="Courier New" panose="02070309020205020404" pitchFamily="49" charset="0"/>
+              </a:rPr>
+              <a:t>-&gt;</a:t>
+            </a:r>
+            <a:r>
+              <a:rPr lang="en-GB" sz="4400" dirty="0" smtClean="0">
+                <a:latin typeface="Courier New" panose="02070309020205020404" pitchFamily="49" charset="0"/>
+                <a:cs typeface="Courier New" panose="02070309020205020404" pitchFamily="49" charset="0"/>
+              </a:rPr>
+              <a:t> [a] </a:t>
+            </a:r>
+            <a:r>
+              <a:rPr lang="en-GB" sz="4400" dirty="0" smtClean="0">
+                <a:solidFill>
+                  <a:srgbClr val="FF0000"/>
+                </a:solidFill>
+                <a:latin typeface="Courier New" panose="02070309020205020404" pitchFamily="49" charset="0"/>
+                <a:cs typeface="Courier New" panose="02070309020205020404" pitchFamily="49" charset="0"/>
+              </a:rPr>
+              <a:t>-&gt;</a:t>
+            </a:r>
+            <a:r>
+              <a:rPr lang="en-GB" sz="4400" dirty="0" smtClean="0">
+                <a:latin typeface="Courier New" panose="02070309020205020404" pitchFamily="49" charset="0"/>
+                <a:cs typeface="Courier New" panose="02070309020205020404" pitchFamily="49" charset="0"/>
+              </a:rPr>
+              <a:t> [a]</a:t>
+            </a:r>
+          </a:p>
+          <a:p>
+            <a:endParaRPr lang="en-GB" sz="4400" dirty="0">
+              <a:latin typeface="Courier New" panose="02070309020205020404" pitchFamily="49" charset="0"/>
+              <a:cs typeface="Courier New" panose="02070309020205020404" pitchFamily="49" charset="0"/>
+            </a:endParaRPr>
+          </a:p>
+          <a:p>
+            <a:r>
+              <a:rPr lang="en-GB" sz="4400" dirty="0" smtClean="0">
+                <a:latin typeface="Courier New" panose="02070309020205020404" pitchFamily="49" charset="0"/>
+                <a:cs typeface="Courier New" panose="02070309020205020404" pitchFamily="49" charset="0"/>
+              </a:rPr>
+              <a:t>sum </a:t>
+            </a:r>
+            <a:r>
+              <a:rPr lang="en-GB" sz="4400" dirty="0" smtClean="0">
+                <a:solidFill>
+                  <a:srgbClr val="FF0000"/>
+                </a:solidFill>
+                <a:latin typeface="Courier New" panose="02070309020205020404" pitchFamily="49" charset="0"/>
+                <a:cs typeface="Courier New" panose="02070309020205020404" pitchFamily="49" charset="0"/>
+              </a:rPr>
+              <a:t>::</a:t>
+            </a:r>
+            <a:r>
+              <a:rPr lang="en-GB" sz="4400" dirty="0" smtClean="0">
+                <a:latin typeface="Courier New" panose="02070309020205020404" pitchFamily="49" charset="0"/>
+                <a:cs typeface="Courier New" panose="02070309020205020404" pitchFamily="49" charset="0"/>
+              </a:rPr>
+              <a:t> Num a </a:t>
+            </a:r>
+            <a:r>
+              <a:rPr lang="en-GB" sz="4400" dirty="0" smtClean="0">
+                <a:solidFill>
+                  <a:srgbClr val="FF0000"/>
+                </a:solidFill>
+                <a:latin typeface="Courier New" panose="02070309020205020404" pitchFamily="49" charset="0"/>
+                <a:cs typeface="Courier New" panose="02070309020205020404" pitchFamily="49" charset="0"/>
+              </a:rPr>
+              <a:t>=&gt;</a:t>
+            </a:r>
+            <a:r>
+              <a:rPr lang="en-GB" sz="4400" dirty="0" smtClean="0">
+                <a:latin typeface="Courier New" panose="02070309020205020404" pitchFamily="49" charset="0"/>
+                <a:cs typeface="Courier New" panose="02070309020205020404" pitchFamily="49" charset="0"/>
+              </a:rPr>
+              <a:t> [a] </a:t>
+            </a:r>
+            <a:r>
+              <a:rPr lang="en-GB" sz="4400" dirty="0" smtClean="0">
+                <a:solidFill>
+                  <a:srgbClr val="FF0000"/>
+                </a:solidFill>
+                <a:latin typeface="Courier New" panose="02070309020205020404" pitchFamily="49" charset="0"/>
+                <a:cs typeface="Courier New" panose="02070309020205020404" pitchFamily="49" charset="0"/>
+              </a:rPr>
+              <a:t>-&gt;</a:t>
+            </a:r>
+            <a:r>
+              <a:rPr lang="en-GB" sz="4400" dirty="0" smtClean="0">
+                <a:latin typeface="Courier New" panose="02070309020205020404" pitchFamily="49" charset="0"/>
+                <a:cs typeface="Courier New" panose="02070309020205020404" pitchFamily="49" charset="0"/>
+              </a:rPr>
+              <a:t> a</a:t>
             </a:r>
           </a:p>
         </p:txBody>
@@ -9522,1384 +9583,6 @@
         </p:nvSpPr>
         <p:spPr>
           <a:xfrm>
-            <a:off x="496392" y="2132856"/>
-            <a:ext cx="7964040" cy="1446550"/>
-          </a:xfrm>
-          <a:prstGeom prst="rect">
-            <a:avLst/>
-          </a:prstGeom>
-          <a:noFill/>
-        </p:spPr>
-        <p:txBody>
-          <a:bodyPr wrap="none" rtlCol="0">
-            <a:spAutoFit/>
-          </a:bodyPr>
-          <a:lstStyle/>
-          <a:p>
-            <a:r>
-              <a:rPr lang="en-GB" sz="4400" dirty="0" smtClean="0">
-                <a:latin typeface="Courier New" panose="02070309020205020404" pitchFamily="49" charset="0"/>
-                <a:cs typeface="Courier New" panose="02070309020205020404" pitchFamily="49" charset="0"/>
-              </a:rPr>
-              <a:t>sum [] = 0</a:t>
-            </a:r>
-          </a:p>
-          <a:p>
-            <a:r>
-              <a:rPr lang="en-GB" sz="4400" dirty="0" smtClean="0">
-                <a:latin typeface="Courier New" panose="02070309020205020404" pitchFamily="49" charset="0"/>
-                <a:cs typeface="Courier New" panose="02070309020205020404" pitchFamily="49" charset="0"/>
-              </a:rPr>
-              <a:t>sum (x:xs) = x + sum xs</a:t>
-            </a:r>
-            <a:endParaRPr lang="en-GB" sz="4400" dirty="0">
-              <a:latin typeface="Courier New" panose="02070309020205020404" pitchFamily="49" charset="0"/>
-              <a:cs typeface="Courier New" panose="02070309020205020404" pitchFamily="49" charset="0"/>
-            </a:endParaRPr>
-          </a:p>
-        </p:txBody>
-      </p:sp>
-      <p:sp>
-        <p:nvSpPr>
-          <p:cNvPr id="5" name="TextBox 4"/>
-          <p:cNvSpPr txBox="1"/>
-          <p:nvPr/>
-        </p:nvSpPr>
-        <p:spPr>
-          <a:xfrm>
-            <a:off x="496392" y="1422089"/>
-            <a:ext cx="6611105" cy="769441"/>
-          </a:xfrm>
-          <a:prstGeom prst="rect">
-            <a:avLst/>
-          </a:prstGeom>
-          <a:noFill/>
-        </p:spPr>
-        <p:txBody>
-          <a:bodyPr wrap="none" rtlCol="0">
-            <a:spAutoFit/>
-          </a:bodyPr>
-          <a:lstStyle/>
-          <a:p>
-            <a:r>
-              <a:rPr lang="en-GB" sz="4400" dirty="0" smtClean="0">
-                <a:latin typeface="Courier New" panose="02070309020205020404" pitchFamily="49" charset="0"/>
-                <a:cs typeface="Courier New" panose="02070309020205020404" pitchFamily="49" charset="0"/>
-              </a:rPr>
-              <a:t>sum </a:t>
-            </a:r>
-            <a:r>
-              <a:rPr lang="en-GB" sz="4400" dirty="0" smtClean="0">
-                <a:solidFill>
-                  <a:srgbClr val="FF0000"/>
-                </a:solidFill>
-                <a:latin typeface="Courier New" panose="02070309020205020404" pitchFamily="49" charset="0"/>
-                <a:cs typeface="Courier New" panose="02070309020205020404" pitchFamily="49" charset="0"/>
-              </a:rPr>
-              <a:t>::</a:t>
-            </a:r>
-            <a:r>
-              <a:rPr lang="en-GB" sz="4400" dirty="0" smtClean="0">
-                <a:latin typeface="Courier New" panose="02070309020205020404" pitchFamily="49" charset="0"/>
-                <a:cs typeface="Courier New" panose="02070309020205020404" pitchFamily="49" charset="0"/>
-              </a:rPr>
-              <a:t> [Int] </a:t>
-            </a:r>
-            <a:r>
-              <a:rPr lang="en-GB" sz="4400" dirty="0" smtClean="0">
-                <a:solidFill>
-                  <a:srgbClr val="FF0000"/>
-                </a:solidFill>
-                <a:latin typeface="Courier New" panose="02070309020205020404" pitchFamily="49" charset="0"/>
-                <a:cs typeface="Courier New" panose="02070309020205020404" pitchFamily="49" charset="0"/>
-              </a:rPr>
-              <a:t>-&gt;</a:t>
-            </a:r>
-            <a:r>
-              <a:rPr lang="en-GB" sz="4400" dirty="0" smtClean="0">
-                <a:latin typeface="Courier New" panose="02070309020205020404" pitchFamily="49" charset="0"/>
-                <a:cs typeface="Courier New" panose="02070309020205020404" pitchFamily="49" charset="0"/>
-              </a:rPr>
-              <a:t> Int</a:t>
-            </a:r>
-            <a:endParaRPr lang="en-GB" sz="4400" dirty="0">
-              <a:latin typeface="Courier New" panose="02070309020205020404" pitchFamily="49" charset="0"/>
-              <a:cs typeface="Courier New" panose="02070309020205020404" pitchFamily="49" charset="0"/>
-            </a:endParaRPr>
-          </a:p>
-        </p:txBody>
-      </p:sp>
-    </p:spTree>
-    <p:extLst>
-      <p:ext uri="{BB962C8B-B14F-4D97-AF65-F5344CB8AC3E}">
-        <p14:creationId xmlns:p14="http://schemas.microsoft.com/office/powerpoint/2010/main" val="1976949730"/>
-      </p:ext>
-    </p:extLst>
-  </p:cSld>
-  <p:clrMapOvr>
-    <a:masterClrMapping/>
-  </p:clrMapOvr>
-  <p:timing>
-    <p:tnLst>
-      <p:par>
-        <p:cTn id="1" dur="indefinite" restart="never" nodeType="tmRoot">
-          <p:childTnLst>
-            <p:seq concurrent="1" nextAc="seek">
-              <p:cTn id="2" dur="indefinite" nodeType="mainSeq">
-                <p:childTnLst>
-                  <p:par>
-                    <p:cTn id="3" fill="hold">
-                      <p:stCondLst>
-                        <p:cond delay="indefinite"/>
-                      </p:stCondLst>
-                      <p:childTnLst>
-                        <p:par>
-                          <p:cTn id="4" fill="hold">
-                            <p:stCondLst>
-                              <p:cond delay="0"/>
-                            </p:stCondLst>
-                            <p:childTnLst>
-                              <p:par>
-                                <p:cTn id="5" presetID="1" presetClass="entr" presetSubtype="0" fill="hold" grpId="0" nodeType="clickEffect">
-                                  <p:stCondLst>
-                                    <p:cond delay="0"/>
-                                  </p:stCondLst>
-                                  <p:childTnLst>
-                                    <p:set>
-                                      <p:cBhvr>
-                                        <p:cTn id="6" dur="1" fill="hold">
-                                          <p:stCondLst>
-                                            <p:cond delay="0"/>
-                                          </p:stCondLst>
-                                        </p:cTn>
-                                        <p:tgtEl>
-                                          <p:spTgt spid="5"/>
-                                        </p:tgtEl>
-                                        <p:attrNameLst>
-                                          <p:attrName>style.visibility</p:attrName>
-                                        </p:attrNameLst>
-                                      </p:cBhvr>
-                                      <p:to>
-                                        <p:strVal val="visible"/>
-                                      </p:to>
-                                    </p:set>
-                                  </p:childTnLst>
-                                </p:cTn>
-                              </p:par>
-                            </p:childTnLst>
-                          </p:cTn>
-                        </p:par>
-                      </p:childTnLst>
-                    </p:cTn>
-                  </p:par>
-                </p:childTnLst>
-              </p:cTn>
-              <p:prevCondLst>
-                <p:cond evt="onPrev" delay="0">
-                  <p:tgtEl>
-                    <p:sldTgt/>
-                  </p:tgtEl>
-                </p:cond>
-              </p:prevCondLst>
-              <p:nextCondLst>
-                <p:cond evt="onNext" delay="0">
-                  <p:tgtEl>
-                    <p:sldTgt/>
-                  </p:tgtEl>
-                </p:cond>
-              </p:nextCondLst>
-            </p:seq>
-          </p:childTnLst>
-        </p:cTn>
-      </p:par>
-    </p:tnLst>
-    <p:bldLst>
-      <p:bldP spid="5" grpId="0"/>
-    </p:bldLst>
-  </p:timing>
-</p:sld>
-</file>
-
-<file path=ppt/slides/slide22.xml><?xml version="1.0" encoding="utf-8"?>
-<p:sld xmlns:a="http://schemas.openxmlformats.org/drawingml/2006/main" xmlns:r="http://schemas.openxmlformats.org/officeDocument/2006/relationships" xmlns:p="http://schemas.openxmlformats.org/presentationml/2006/main">
-  <p:cSld>
-    <p:spTree>
-      <p:nvGrpSpPr>
-        <p:cNvPr id="1" name=""/>
-        <p:cNvGrpSpPr/>
-        <p:nvPr/>
-      </p:nvGrpSpPr>
-      <p:grpSpPr>
-        <a:xfrm>
-          <a:off x="0" y="0"/>
-          <a:ext cx="0" cy="0"/>
-          <a:chOff x="0" y="0"/>
-          <a:chExt cx="0" cy="0"/>
-        </a:xfrm>
-      </p:grpSpPr>
-      <p:sp>
-        <p:nvSpPr>
-          <p:cNvPr id="11" name="TextBox 10"/>
-          <p:cNvSpPr txBox="1"/>
-          <p:nvPr/>
-        </p:nvSpPr>
-        <p:spPr>
-          <a:xfrm>
-            <a:off x="273780" y="3566626"/>
-            <a:ext cx="8978740" cy="1446550"/>
-          </a:xfrm>
-          <a:prstGeom prst="rect">
-            <a:avLst/>
-          </a:prstGeom>
-          <a:noFill/>
-        </p:spPr>
-        <p:txBody>
-          <a:bodyPr wrap="none" rtlCol="0">
-            <a:spAutoFit/>
-          </a:bodyPr>
-          <a:lstStyle/>
-          <a:p>
-            <a:r>
-              <a:rPr lang="en-GB" sz="4400" dirty="0" smtClean="0">
-                <a:latin typeface="Courier New" panose="02070309020205020404" pitchFamily="49" charset="0"/>
-                <a:cs typeface="Courier New" panose="02070309020205020404" pitchFamily="49" charset="0"/>
-              </a:rPr>
-              <a:t>rev [] = []</a:t>
-            </a:r>
-          </a:p>
-          <a:p>
-            <a:r>
-              <a:rPr lang="en-GB" sz="4400" dirty="0" smtClean="0">
-                <a:latin typeface="Courier New" panose="02070309020205020404" pitchFamily="49" charset="0"/>
-                <a:cs typeface="Courier New" panose="02070309020205020404" pitchFamily="49" charset="0"/>
-              </a:rPr>
-              <a:t>rev (x:xs) = rev xs ++ [x]</a:t>
-            </a:r>
-            <a:endParaRPr lang="en-GB" sz="4400" dirty="0">
-              <a:latin typeface="Courier New" panose="02070309020205020404" pitchFamily="49" charset="0"/>
-              <a:cs typeface="Courier New" panose="02070309020205020404" pitchFamily="49" charset="0"/>
-            </a:endParaRPr>
-          </a:p>
-        </p:txBody>
-      </p:sp>
-      <p:sp>
-        <p:nvSpPr>
-          <p:cNvPr id="5" name="TextBox 4"/>
-          <p:cNvSpPr txBox="1"/>
-          <p:nvPr/>
-        </p:nvSpPr>
-        <p:spPr>
-          <a:xfrm>
-            <a:off x="273780" y="2855859"/>
-            <a:ext cx="7287572" cy="769441"/>
-          </a:xfrm>
-          <a:prstGeom prst="rect">
-            <a:avLst/>
-          </a:prstGeom>
-          <a:noFill/>
-        </p:spPr>
-        <p:txBody>
-          <a:bodyPr wrap="none" rtlCol="0">
-            <a:spAutoFit/>
-          </a:bodyPr>
-          <a:lstStyle/>
-          <a:p>
-            <a:r>
-              <a:rPr lang="en-GB" sz="4400" dirty="0" smtClean="0">
-                <a:latin typeface="Courier New" panose="02070309020205020404" pitchFamily="49" charset="0"/>
-                <a:cs typeface="Courier New" panose="02070309020205020404" pitchFamily="49" charset="0"/>
-              </a:rPr>
-              <a:t>rev </a:t>
-            </a:r>
-            <a:r>
-              <a:rPr lang="en-GB" sz="4400" dirty="0" smtClean="0">
-                <a:solidFill>
-                  <a:srgbClr val="FF0000"/>
-                </a:solidFill>
-                <a:latin typeface="Courier New" panose="02070309020205020404" pitchFamily="49" charset="0"/>
-                <a:cs typeface="Courier New" panose="02070309020205020404" pitchFamily="49" charset="0"/>
-              </a:rPr>
-              <a:t>::</a:t>
-            </a:r>
-            <a:r>
-              <a:rPr lang="en-GB" sz="4400" dirty="0" smtClean="0">
-                <a:latin typeface="Courier New" panose="02070309020205020404" pitchFamily="49" charset="0"/>
-                <a:cs typeface="Courier New" panose="02070309020205020404" pitchFamily="49" charset="0"/>
-              </a:rPr>
-              <a:t> [Int] </a:t>
-            </a:r>
-            <a:r>
-              <a:rPr lang="en-GB" sz="4400" dirty="0" smtClean="0">
-                <a:solidFill>
-                  <a:srgbClr val="FF0000"/>
-                </a:solidFill>
-                <a:latin typeface="Courier New" panose="02070309020205020404" pitchFamily="49" charset="0"/>
-                <a:cs typeface="Courier New" panose="02070309020205020404" pitchFamily="49" charset="0"/>
-              </a:rPr>
-              <a:t>-&gt;</a:t>
-            </a:r>
-            <a:r>
-              <a:rPr lang="en-GB" sz="4400" dirty="0" smtClean="0">
-                <a:latin typeface="Courier New" panose="02070309020205020404" pitchFamily="49" charset="0"/>
-                <a:cs typeface="Courier New" panose="02070309020205020404" pitchFamily="49" charset="0"/>
-              </a:rPr>
-              <a:t> [Int]</a:t>
-            </a:r>
-            <a:endParaRPr lang="en-GB" sz="4400" dirty="0">
-              <a:latin typeface="Courier New" panose="02070309020205020404" pitchFamily="49" charset="0"/>
-              <a:cs typeface="Courier New" panose="02070309020205020404" pitchFamily="49" charset="0"/>
-            </a:endParaRPr>
-          </a:p>
-        </p:txBody>
-      </p:sp>
-      <p:sp>
-        <p:nvSpPr>
-          <p:cNvPr id="4" name="TextBox 3"/>
-          <p:cNvSpPr txBox="1"/>
-          <p:nvPr/>
-        </p:nvSpPr>
-        <p:spPr>
-          <a:xfrm>
-            <a:off x="273780" y="2086418"/>
-            <a:ext cx="7964040" cy="769441"/>
-          </a:xfrm>
-          <a:prstGeom prst="rect">
-            <a:avLst/>
-          </a:prstGeom>
-          <a:noFill/>
-        </p:spPr>
-        <p:txBody>
-          <a:bodyPr wrap="none" rtlCol="0">
-            <a:spAutoFit/>
-          </a:bodyPr>
-          <a:lstStyle/>
-          <a:p>
-            <a:r>
-              <a:rPr lang="en-GB" sz="4400" dirty="0" smtClean="0">
-                <a:latin typeface="Courier New" panose="02070309020205020404" pitchFamily="49" charset="0"/>
-                <a:cs typeface="Courier New" panose="02070309020205020404" pitchFamily="49" charset="0"/>
-              </a:rPr>
-              <a:t>rev </a:t>
-            </a:r>
-            <a:r>
-              <a:rPr lang="en-GB" sz="4400" dirty="0" smtClean="0">
-                <a:solidFill>
-                  <a:srgbClr val="FF0000"/>
-                </a:solidFill>
-                <a:latin typeface="Courier New" panose="02070309020205020404" pitchFamily="49" charset="0"/>
-                <a:cs typeface="Courier New" panose="02070309020205020404" pitchFamily="49" charset="0"/>
-              </a:rPr>
-              <a:t>::</a:t>
-            </a:r>
-            <a:r>
-              <a:rPr lang="en-GB" sz="4400" dirty="0" smtClean="0">
-                <a:latin typeface="Courier New" panose="02070309020205020404" pitchFamily="49" charset="0"/>
-                <a:cs typeface="Courier New" panose="02070309020205020404" pitchFamily="49" charset="0"/>
-              </a:rPr>
-              <a:t> [Char] </a:t>
-            </a:r>
-            <a:r>
-              <a:rPr lang="en-GB" sz="4400" dirty="0" smtClean="0">
-                <a:solidFill>
-                  <a:srgbClr val="FF0000"/>
-                </a:solidFill>
-                <a:latin typeface="Courier New" panose="02070309020205020404" pitchFamily="49" charset="0"/>
-                <a:cs typeface="Courier New" panose="02070309020205020404" pitchFamily="49" charset="0"/>
-              </a:rPr>
-              <a:t>-&gt;</a:t>
-            </a:r>
-            <a:r>
-              <a:rPr lang="en-GB" sz="4400" dirty="0" smtClean="0">
-                <a:latin typeface="Courier New" panose="02070309020205020404" pitchFamily="49" charset="0"/>
-                <a:cs typeface="Courier New" panose="02070309020205020404" pitchFamily="49" charset="0"/>
-              </a:rPr>
-              <a:t> [Char]</a:t>
-            </a:r>
-            <a:endParaRPr lang="en-GB" sz="4400" dirty="0">
-              <a:latin typeface="Courier New" panose="02070309020205020404" pitchFamily="49" charset="0"/>
-              <a:cs typeface="Courier New" panose="02070309020205020404" pitchFamily="49" charset="0"/>
-            </a:endParaRPr>
-          </a:p>
-        </p:txBody>
-      </p:sp>
-      <p:sp>
-        <p:nvSpPr>
-          <p:cNvPr id="6" name="TextBox 5"/>
-          <p:cNvSpPr txBox="1"/>
-          <p:nvPr/>
-        </p:nvSpPr>
-        <p:spPr>
-          <a:xfrm>
-            <a:off x="273780" y="1316977"/>
-            <a:ext cx="5934638" cy="769441"/>
-          </a:xfrm>
-          <a:prstGeom prst="rect">
-            <a:avLst/>
-          </a:prstGeom>
-          <a:noFill/>
-        </p:spPr>
-        <p:txBody>
-          <a:bodyPr wrap="none" rtlCol="0">
-            <a:spAutoFit/>
-          </a:bodyPr>
-          <a:lstStyle/>
-          <a:p>
-            <a:r>
-              <a:rPr lang="en-GB" sz="4400" dirty="0" smtClean="0">
-                <a:latin typeface="Courier New" panose="02070309020205020404" pitchFamily="49" charset="0"/>
-                <a:cs typeface="Courier New" panose="02070309020205020404" pitchFamily="49" charset="0"/>
-              </a:rPr>
-              <a:t>rev </a:t>
-            </a:r>
-            <a:r>
-              <a:rPr lang="en-GB" sz="4400" dirty="0" smtClean="0">
-                <a:solidFill>
-                  <a:srgbClr val="FF0000"/>
-                </a:solidFill>
-                <a:latin typeface="Courier New" panose="02070309020205020404" pitchFamily="49" charset="0"/>
-                <a:cs typeface="Courier New" panose="02070309020205020404" pitchFamily="49" charset="0"/>
-              </a:rPr>
-              <a:t>::</a:t>
-            </a:r>
-            <a:r>
-              <a:rPr lang="en-GB" sz="4400" dirty="0" smtClean="0">
-                <a:latin typeface="Courier New" panose="02070309020205020404" pitchFamily="49" charset="0"/>
-                <a:cs typeface="Courier New" panose="02070309020205020404" pitchFamily="49" charset="0"/>
-              </a:rPr>
-              <a:t> [a] </a:t>
-            </a:r>
-            <a:r>
-              <a:rPr lang="en-GB" sz="4400" dirty="0" smtClean="0">
-                <a:solidFill>
-                  <a:srgbClr val="FF0000"/>
-                </a:solidFill>
-                <a:latin typeface="Courier New" panose="02070309020205020404" pitchFamily="49" charset="0"/>
-                <a:cs typeface="Courier New" panose="02070309020205020404" pitchFamily="49" charset="0"/>
-              </a:rPr>
-              <a:t>-&gt;</a:t>
-            </a:r>
-            <a:r>
-              <a:rPr lang="en-GB" sz="4400" dirty="0" smtClean="0">
-                <a:latin typeface="Courier New" panose="02070309020205020404" pitchFamily="49" charset="0"/>
-                <a:cs typeface="Courier New" panose="02070309020205020404" pitchFamily="49" charset="0"/>
-              </a:rPr>
-              <a:t> [a]</a:t>
-            </a:r>
-            <a:endParaRPr lang="en-GB" sz="4400" dirty="0">
-              <a:latin typeface="Courier New" panose="02070309020205020404" pitchFamily="49" charset="0"/>
-              <a:cs typeface="Courier New" panose="02070309020205020404" pitchFamily="49" charset="0"/>
-            </a:endParaRPr>
-          </a:p>
-        </p:txBody>
-      </p:sp>
-      <p:cxnSp>
-        <p:nvCxnSpPr>
-          <p:cNvPr id="7" name="Straight Connector 6"/>
-          <p:cNvCxnSpPr/>
-          <p:nvPr/>
-        </p:nvCxnSpPr>
-        <p:spPr>
-          <a:xfrm>
-            <a:off x="395536" y="2996952"/>
-            <a:ext cx="6840760" cy="569674"/>
-          </a:xfrm>
-          <a:prstGeom prst="line">
-            <a:avLst/>
-          </a:prstGeom>
-        </p:spPr>
-        <p:style>
-          <a:lnRef idx="1">
-            <a:schemeClr val="accent1"/>
-          </a:lnRef>
-          <a:fillRef idx="0">
-            <a:schemeClr val="accent1"/>
-          </a:fillRef>
-          <a:effectRef idx="0">
-            <a:schemeClr val="accent1"/>
-          </a:effectRef>
-          <a:fontRef idx="minor">
-            <a:schemeClr val="tx1"/>
-          </a:fontRef>
-        </p:style>
-      </p:cxnSp>
-      <p:cxnSp>
-        <p:nvCxnSpPr>
-          <p:cNvPr id="9" name="Straight Connector 8"/>
-          <p:cNvCxnSpPr/>
-          <p:nvPr/>
-        </p:nvCxnSpPr>
-        <p:spPr>
-          <a:xfrm>
-            <a:off x="395536" y="2204864"/>
-            <a:ext cx="7529264" cy="617849"/>
-          </a:xfrm>
-          <a:prstGeom prst="line">
-            <a:avLst/>
-          </a:prstGeom>
-        </p:spPr>
-        <p:style>
-          <a:lnRef idx="1">
-            <a:schemeClr val="accent1"/>
-          </a:lnRef>
-          <a:fillRef idx="0">
-            <a:schemeClr val="accent1"/>
-          </a:fillRef>
-          <a:effectRef idx="0">
-            <a:schemeClr val="accent1"/>
-          </a:effectRef>
-          <a:fontRef idx="minor">
-            <a:schemeClr val="tx1"/>
-          </a:fontRef>
-        </p:style>
-      </p:cxnSp>
-    </p:spTree>
-    <p:extLst>
-      <p:ext uri="{BB962C8B-B14F-4D97-AF65-F5344CB8AC3E}">
-        <p14:creationId xmlns:p14="http://schemas.microsoft.com/office/powerpoint/2010/main" val="2575027571"/>
-      </p:ext>
-    </p:extLst>
-  </p:cSld>
-  <p:clrMapOvr>
-    <a:masterClrMapping/>
-  </p:clrMapOvr>
-  <p:timing>
-    <p:tnLst>
-      <p:par>
-        <p:cTn id="1" dur="indefinite" restart="never" nodeType="tmRoot">
-          <p:childTnLst>
-            <p:seq concurrent="1" nextAc="seek">
-              <p:cTn id="2" dur="indefinite" nodeType="mainSeq">
-                <p:childTnLst>
-                  <p:par>
-                    <p:cTn id="3" fill="hold">
-                      <p:stCondLst>
-                        <p:cond delay="indefinite"/>
-                      </p:stCondLst>
-                      <p:childTnLst>
-                        <p:par>
-                          <p:cTn id="4" fill="hold">
-                            <p:stCondLst>
-                              <p:cond delay="0"/>
-                            </p:stCondLst>
-                            <p:childTnLst>
-                              <p:par>
-                                <p:cTn id="5" presetID="1" presetClass="entr" presetSubtype="0" fill="hold" grpId="0" nodeType="clickEffect">
-                                  <p:stCondLst>
-                                    <p:cond delay="0"/>
-                                  </p:stCondLst>
-                                  <p:childTnLst>
-                                    <p:set>
-                                      <p:cBhvr>
-                                        <p:cTn id="6" dur="1" fill="hold">
-                                          <p:stCondLst>
-                                            <p:cond delay="0"/>
-                                          </p:stCondLst>
-                                        </p:cTn>
-                                        <p:tgtEl>
-                                          <p:spTgt spid="5"/>
-                                        </p:tgtEl>
-                                        <p:attrNameLst>
-                                          <p:attrName>style.visibility</p:attrName>
-                                        </p:attrNameLst>
-                                      </p:cBhvr>
-                                      <p:to>
-                                        <p:strVal val="visible"/>
-                                      </p:to>
-                                    </p:set>
-                                  </p:childTnLst>
-                                </p:cTn>
-                              </p:par>
-                            </p:childTnLst>
-                          </p:cTn>
-                        </p:par>
-                      </p:childTnLst>
-                    </p:cTn>
-                  </p:par>
-                  <p:par>
-                    <p:cTn id="7" fill="hold">
-                      <p:stCondLst>
-                        <p:cond delay="indefinite"/>
-                      </p:stCondLst>
-                      <p:childTnLst>
-                        <p:par>
-                          <p:cTn id="8" fill="hold">
-                            <p:stCondLst>
-                              <p:cond delay="0"/>
-                            </p:stCondLst>
-                            <p:childTnLst>
-                              <p:par>
-                                <p:cTn id="9" presetID="1" presetClass="entr" presetSubtype="0" fill="hold" grpId="0" nodeType="clickEffect">
-                                  <p:stCondLst>
-                                    <p:cond delay="0"/>
-                                  </p:stCondLst>
-                                  <p:childTnLst>
-                                    <p:set>
-                                      <p:cBhvr>
-                                        <p:cTn id="10" dur="1" fill="hold">
-                                          <p:stCondLst>
-                                            <p:cond delay="0"/>
-                                          </p:stCondLst>
-                                        </p:cTn>
-                                        <p:tgtEl>
-                                          <p:spTgt spid="4"/>
-                                        </p:tgtEl>
-                                        <p:attrNameLst>
-                                          <p:attrName>style.visibility</p:attrName>
-                                        </p:attrNameLst>
-                                      </p:cBhvr>
-                                      <p:to>
-                                        <p:strVal val="visible"/>
-                                      </p:to>
-                                    </p:set>
-                                  </p:childTnLst>
-                                </p:cTn>
-                              </p:par>
-                              <p:par>
-                                <p:cTn id="11" presetID="1" presetClass="entr" presetSubtype="0" fill="hold" nodeType="withEffect">
-                                  <p:stCondLst>
-                                    <p:cond delay="0"/>
-                                  </p:stCondLst>
-                                  <p:childTnLst>
-                                    <p:set>
-                                      <p:cBhvr>
-                                        <p:cTn id="12" dur="1" fill="hold">
-                                          <p:stCondLst>
-                                            <p:cond delay="0"/>
-                                          </p:stCondLst>
-                                        </p:cTn>
-                                        <p:tgtEl>
-                                          <p:spTgt spid="7"/>
-                                        </p:tgtEl>
-                                        <p:attrNameLst>
-                                          <p:attrName>style.visibility</p:attrName>
-                                        </p:attrNameLst>
-                                      </p:cBhvr>
-                                      <p:to>
-                                        <p:strVal val="visible"/>
-                                      </p:to>
-                                    </p:set>
-                                  </p:childTnLst>
-                                </p:cTn>
-                              </p:par>
-                            </p:childTnLst>
-                          </p:cTn>
-                        </p:par>
-                      </p:childTnLst>
-                    </p:cTn>
-                  </p:par>
-                  <p:par>
-                    <p:cTn id="13" fill="hold">
-                      <p:stCondLst>
-                        <p:cond delay="indefinite"/>
-                      </p:stCondLst>
-                      <p:childTnLst>
-                        <p:par>
-                          <p:cTn id="14" fill="hold">
-                            <p:stCondLst>
-                              <p:cond delay="0"/>
-                            </p:stCondLst>
-                            <p:childTnLst>
-                              <p:par>
-                                <p:cTn id="15" presetID="1" presetClass="entr" presetSubtype="0" fill="hold" grpId="0" nodeType="clickEffect">
-                                  <p:stCondLst>
-                                    <p:cond delay="0"/>
-                                  </p:stCondLst>
-                                  <p:childTnLst>
-                                    <p:set>
-                                      <p:cBhvr>
-                                        <p:cTn id="16" dur="1" fill="hold">
-                                          <p:stCondLst>
-                                            <p:cond delay="0"/>
-                                          </p:stCondLst>
-                                        </p:cTn>
-                                        <p:tgtEl>
-                                          <p:spTgt spid="6"/>
-                                        </p:tgtEl>
-                                        <p:attrNameLst>
-                                          <p:attrName>style.visibility</p:attrName>
-                                        </p:attrNameLst>
-                                      </p:cBhvr>
-                                      <p:to>
-                                        <p:strVal val="visible"/>
-                                      </p:to>
-                                    </p:set>
-                                  </p:childTnLst>
-                                </p:cTn>
-                              </p:par>
-                              <p:par>
-                                <p:cTn id="17" presetID="1" presetClass="entr" presetSubtype="0" fill="hold" nodeType="withEffect">
-                                  <p:stCondLst>
-                                    <p:cond delay="0"/>
-                                  </p:stCondLst>
-                                  <p:childTnLst>
-                                    <p:set>
-                                      <p:cBhvr>
-                                        <p:cTn id="18" dur="1" fill="hold">
-                                          <p:stCondLst>
-                                            <p:cond delay="0"/>
-                                          </p:stCondLst>
-                                        </p:cTn>
-                                        <p:tgtEl>
-                                          <p:spTgt spid="9"/>
-                                        </p:tgtEl>
-                                        <p:attrNameLst>
-                                          <p:attrName>style.visibility</p:attrName>
-                                        </p:attrNameLst>
-                                      </p:cBhvr>
-                                      <p:to>
-                                        <p:strVal val="visible"/>
-                                      </p:to>
-                                    </p:set>
-                                  </p:childTnLst>
-                                </p:cTn>
-                              </p:par>
-                            </p:childTnLst>
-                          </p:cTn>
-                        </p:par>
-                      </p:childTnLst>
-                    </p:cTn>
-                  </p:par>
-                </p:childTnLst>
-              </p:cTn>
-              <p:prevCondLst>
-                <p:cond evt="onPrev" delay="0">
-                  <p:tgtEl>
-                    <p:sldTgt/>
-                  </p:tgtEl>
-                </p:cond>
-              </p:prevCondLst>
-              <p:nextCondLst>
-                <p:cond evt="onNext" delay="0">
-                  <p:tgtEl>
-                    <p:sldTgt/>
-                  </p:tgtEl>
-                </p:cond>
-              </p:nextCondLst>
-            </p:seq>
-          </p:childTnLst>
-        </p:cTn>
-      </p:par>
-    </p:tnLst>
-    <p:bldLst>
-      <p:bldP spid="5" grpId="0"/>
-      <p:bldP spid="4" grpId="0"/>
-      <p:bldP spid="6" grpId="0"/>
-    </p:bldLst>
-  </p:timing>
-</p:sld>
-</file>
-
-<file path=ppt/slides/slide23.xml><?xml version="1.0" encoding="utf-8"?>
-<p:sld xmlns:a="http://schemas.openxmlformats.org/drawingml/2006/main" xmlns:r="http://schemas.openxmlformats.org/officeDocument/2006/relationships" xmlns:p="http://schemas.openxmlformats.org/presentationml/2006/main">
-  <p:cSld>
-    <p:spTree>
-      <p:nvGrpSpPr>
-        <p:cNvPr id="1" name=""/>
-        <p:cNvGrpSpPr/>
-        <p:nvPr/>
-      </p:nvGrpSpPr>
-      <p:grpSpPr>
-        <a:xfrm>
-          <a:off x="0" y="0"/>
-          <a:ext cx="0" cy="0"/>
-          <a:chOff x="0" y="0"/>
-          <a:chExt cx="0" cy="0"/>
-        </a:xfrm>
-      </p:grpSpPr>
-      <p:sp>
-        <p:nvSpPr>
-          <p:cNvPr id="11" name="TextBox 10"/>
-          <p:cNvSpPr txBox="1"/>
-          <p:nvPr/>
-        </p:nvSpPr>
-        <p:spPr>
-          <a:xfrm>
-            <a:off x="496392" y="3422610"/>
-            <a:ext cx="7964040" cy="1446550"/>
-          </a:xfrm>
-          <a:prstGeom prst="rect">
-            <a:avLst/>
-          </a:prstGeom>
-          <a:noFill/>
-        </p:spPr>
-        <p:txBody>
-          <a:bodyPr wrap="none" rtlCol="0">
-            <a:spAutoFit/>
-          </a:bodyPr>
-          <a:lstStyle/>
-          <a:p>
-            <a:r>
-              <a:rPr lang="en-GB" sz="4400" dirty="0" smtClean="0">
-                <a:latin typeface="Courier New" panose="02070309020205020404" pitchFamily="49" charset="0"/>
-                <a:cs typeface="Courier New" panose="02070309020205020404" pitchFamily="49" charset="0"/>
-              </a:rPr>
-              <a:t>sum [] = 0</a:t>
-            </a:r>
-          </a:p>
-          <a:p>
-            <a:r>
-              <a:rPr lang="en-GB" sz="4400" dirty="0" smtClean="0">
-                <a:latin typeface="Courier New" panose="02070309020205020404" pitchFamily="49" charset="0"/>
-                <a:cs typeface="Courier New" panose="02070309020205020404" pitchFamily="49" charset="0"/>
-              </a:rPr>
-              <a:t>sum (x:xs) = x + sum xs</a:t>
-            </a:r>
-            <a:endParaRPr lang="en-GB" sz="4400" dirty="0">
-              <a:latin typeface="Courier New" panose="02070309020205020404" pitchFamily="49" charset="0"/>
-              <a:cs typeface="Courier New" panose="02070309020205020404" pitchFamily="49" charset="0"/>
-            </a:endParaRPr>
-          </a:p>
-        </p:txBody>
-      </p:sp>
-      <p:sp>
-        <p:nvSpPr>
-          <p:cNvPr id="5" name="TextBox 4"/>
-          <p:cNvSpPr txBox="1"/>
-          <p:nvPr/>
-        </p:nvSpPr>
-        <p:spPr>
-          <a:xfrm>
-            <a:off x="496392" y="2711843"/>
-            <a:ext cx="6611105" cy="769441"/>
-          </a:xfrm>
-          <a:prstGeom prst="rect">
-            <a:avLst/>
-          </a:prstGeom>
-          <a:noFill/>
-        </p:spPr>
-        <p:txBody>
-          <a:bodyPr wrap="none" rtlCol="0">
-            <a:spAutoFit/>
-          </a:bodyPr>
-          <a:lstStyle/>
-          <a:p>
-            <a:r>
-              <a:rPr lang="en-GB" sz="4400" dirty="0" smtClean="0">
-                <a:latin typeface="Courier New" panose="02070309020205020404" pitchFamily="49" charset="0"/>
-                <a:cs typeface="Courier New" panose="02070309020205020404" pitchFamily="49" charset="0"/>
-              </a:rPr>
-              <a:t>sum </a:t>
-            </a:r>
-            <a:r>
-              <a:rPr lang="en-GB" sz="4400" dirty="0" smtClean="0">
-                <a:solidFill>
-                  <a:srgbClr val="FF0000"/>
-                </a:solidFill>
-                <a:latin typeface="Courier New" panose="02070309020205020404" pitchFamily="49" charset="0"/>
-                <a:cs typeface="Courier New" panose="02070309020205020404" pitchFamily="49" charset="0"/>
-              </a:rPr>
-              <a:t>::</a:t>
-            </a:r>
-            <a:r>
-              <a:rPr lang="en-GB" sz="4400" dirty="0" smtClean="0">
-                <a:latin typeface="Courier New" panose="02070309020205020404" pitchFamily="49" charset="0"/>
-                <a:cs typeface="Courier New" panose="02070309020205020404" pitchFamily="49" charset="0"/>
-              </a:rPr>
-              <a:t> [Int] </a:t>
-            </a:r>
-            <a:r>
-              <a:rPr lang="en-GB" sz="4400" dirty="0" smtClean="0">
-                <a:solidFill>
-                  <a:srgbClr val="FF0000"/>
-                </a:solidFill>
-                <a:latin typeface="Courier New" panose="02070309020205020404" pitchFamily="49" charset="0"/>
-                <a:cs typeface="Courier New" panose="02070309020205020404" pitchFamily="49" charset="0"/>
-              </a:rPr>
-              <a:t>-&gt;</a:t>
-            </a:r>
-            <a:r>
-              <a:rPr lang="en-GB" sz="4400" dirty="0" smtClean="0">
-                <a:latin typeface="Courier New" panose="02070309020205020404" pitchFamily="49" charset="0"/>
-                <a:cs typeface="Courier New" panose="02070309020205020404" pitchFamily="49" charset="0"/>
-              </a:rPr>
-              <a:t> Int</a:t>
-            </a:r>
-            <a:endParaRPr lang="en-GB" sz="4400" dirty="0">
-              <a:latin typeface="Courier New" panose="02070309020205020404" pitchFamily="49" charset="0"/>
-              <a:cs typeface="Courier New" panose="02070309020205020404" pitchFamily="49" charset="0"/>
-            </a:endParaRPr>
-          </a:p>
-        </p:txBody>
-      </p:sp>
-      <p:sp>
-        <p:nvSpPr>
-          <p:cNvPr id="4" name="TextBox 3"/>
-          <p:cNvSpPr txBox="1"/>
-          <p:nvPr/>
-        </p:nvSpPr>
-        <p:spPr>
-          <a:xfrm>
-            <a:off x="496392" y="1950802"/>
-            <a:ext cx="5258171" cy="769441"/>
-          </a:xfrm>
-          <a:prstGeom prst="rect">
-            <a:avLst/>
-          </a:prstGeom>
-          <a:noFill/>
-        </p:spPr>
-        <p:txBody>
-          <a:bodyPr wrap="none" rtlCol="0">
-            <a:spAutoFit/>
-          </a:bodyPr>
-          <a:lstStyle/>
-          <a:p>
-            <a:r>
-              <a:rPr lang="en-GB" sz="4400" dirty="0" smtClean="0">
-                <a:latin typeface="Courier New" panose="02070309020205020404" pitchFamily="49" charset="0"/>
-                <a:cs typeface="Courier New" panose="02070309020205020404" pitchFamily="49" charset="0"/>
-              </a:rPr>
-              <a:t>sum </a:t>
-            </a:r>
-            <a:r>
-              <a:rPr lang="en-GB" sz="4400" dirty="0" smtClean="0">
-                <a:solidFill>
-                  <a:srgbClr val="FF0000"/>
-                </a:solidFill>
-                <a:latin typeface="Courier New" panose="02070309020205020404" pitchFamily="49" charset="0"/>
-                <a:cs typeface="Courier New" panose="02070309020205020404" pitchFamily="49" charset="0"/>
-              </a:rPr>
-              <a:t>::</a:t>
-            </a:r>
-            <a:r>
-              <a:rPr lang="en-GB" sz="4400" dirty="0" smtClean="0">
-                <a:latin typeface="Courier New" panose="02070309020205020404" pitchFamily="49" charset="0"/>
-                <a:cs typeface="Courier New" panose="02070309020205020404" pitchFamily="49" charset="0"/>
-              </a:rPr>
-              <a:t> [a] </a:t>
-            </a:r>
-            <a:r>
-              <a:rPr lang="en-GB" sz="4400" dirty="0" smtClean="0">
-                <a:solidFill>
-                  <a:srgbClr val="FF0000"/>
-                </a:solidFill>
-                <a:latin typeface="Courier New" panose="02070309020205020404" pitchFamily="49" charset="0"/>
-                <a:cs typeface="Courier New" panose="02070309020205020404" pitchFamily="49" charset="0"/>
-              </a:rPr>
-              <a:t>-&gt;</a:t>
-            </a:r>
-            <a:r>
-              <a:rPr lang="en-GB" sz="4400" dirty="0" smtClean="0">
-                <a:latin typeface="Courier New" panose="02070309020205020404" pitchFamily="49" charset="0"/>
-                <a:cs typeface="Courier New" panose="02070309020205020404" pitchFamily="49" charset="0"/>
-              </a:rPr>
-              <a:t> a</a:t>
-            </a:r>
-            <a:endParaRPr lang="en-GB" sz="4400" dirty="0">
-              <a:latin typeface="Courier New" panose="02070309020205020404" pitchFamily="49" charset="0"/>
-              <a:cs typeface="Courier New" panose="02070309020205020404" pitchFamily="49" charset="0"/>
-            </a:endParaRPr>
-          </a:p>
-        </p:txBody>
-      </p:sp>
-      <p:sp>
-        <p:nvSpPr>
-          <p:cNvPr id="6" name="TextBox 5"/>
-          <p:cNvSpPr txBox="1"/>
-          <p:nvPr/>
-        </p:nvSpPr>
-        <p:spPr>
-          <a:xfrm>
-            <a:off x="496392" y="1181361"/>
-            <a:ext cx="8302273" cy="769441"/>
-          </a:xfrm>
-          <a:prstGeom prst="rect">
-            <a:avLst/>
-          </a:prstGeom>
-          <a:noFill/>
-        </p:spPr>
-        <p:txBody>
-          <a:bodyPr wrap="none" rtlCol="0">
-            <a:spAutoFit/>
-          </a:bodyPr>
-          <a:lstStyle/>
-          <a:p>
-            <a:r>
-              <a:rPr lang="en-GB" sz="4400" dirty="0" smtClean="0">
-                <a:latin typeface="Courier New" panose="02070309020205020404" pitchFamily="49" charset="0"/>
-                <a:cs typeface="Courier New" panose="02070309020205020404" pitchFamily="49" charset="0"/>
-              </a:rPr>
-              <a:t>sum </a:t>
-            </a:r>
-            <a:r>
-              <a:rPr lang="en-GB" sz="4400" dirty="0" smtClean="0">
-                <a:solidFill>
-                  <a:srgbClr val="FF0000"/>
-                </a:solidFill>
-                <a:latin typeface="Courier New" panose="02070309020205020404" pitchFamily="49" charset="0"/>
-                <a:cs typeface="Courier New" panose="02070309020205020404" pitchFamily="49" charset="0"/>
-              </a:rPr>
-              <a:t>::</a:t>
-            </a:r>
-            <a:r>
-              <a:rPr lang="en-GB" sz="4400" dirty="0" smtClean="0">
-                <a:latin typeface="Courier New" panose="02070309020205020404" pitchFamily="49" charset="0"/>
-                <a:cs typeface="Courier New" panose="02070309020205020404" pitchFamily="49" charset="0"/>
-              </a:rPr>
-              <a:t> Num a </a:t>
-            </a:r>
-            <a:r>
-              <a:rPr lang="en-GB" sz="4400" dirty="0" smtClean="0">
-                <a:solidFill>
-                  <a:srgbClr val="FF0000"/>
-                </a:solidFill>
-                <a:latin typeface="Courier New" panose="02070309020205020404" pitchFamily="49" charset="0"/>
-                <a:cs typeface="Courier New" panose="02070309020205020404" pitchFamily="49" charset="0"/>
-              </a:rPr>
-              <a:t>=&gt;</a:t>
-            </a:r>
-            <a:r>
-              <a:rPr lang="en-GB" sz="4400" dirty="0" smtClean="0">
-                <a:latin typeface="Courier New" panose="02070309020205020404" pitchFamily="49" charset="0"/>
-                <a:cs typeface="Courier New" panose="02070309020205020404" pitchFamily="49" charset="0"/>
-              </a:rPr>
-              <a:t> [a] </a:t>
-            </a:r>
-            <a:r>
-              <a:rPr lang="en-GB" sz="4400" dirty="0" smtClean="0">
-                <a:solidFill>
-                  <a:srgbClr val="FF0000"/>
-                </a:solidFill>
-                <a:latin typeface="Courier New" panose="02070309020205020404" pitchFamily="49" charset="0"/>
-                <a:cs typeface="Courier New" panose="02070309020205020404" pitchFamily="49" charset="0"/>
-              </a:rPr>
-              <a:t>-&gt;</a:t>
-            </a:r>
-            <a:r>
-              <a:rPr lang="en-GB" sz="4400" dirty="0" smtClean="0">
-                <a:latin typeface="Courier New" panose="02070309020205020404" pitchFamily="49" charset="0"/>
-                <a:cs typeface="Courier New" panose="02070309020205020404" pitchFamily="49" charset="0"/>
-              </a:rPr>
-              <a:t> a</a:t>
-            </a:r>
-            <a:endParaRPr lang="en-GB" sz="4400" dirty="0">
-              <a:latin typeface="Courier New" panose="02070309020205020404" pitchFamily="49" charset="0"/>
-              <a:cs typeface="Courier New" panose="02070309020205020404" pitchFamily="49" charset="0"/>
-            </a:endParaRPr>
-          </a:p>
-        </p:txBody>
-      </p:sp>
-      <p:cxnSp>
-        <p:nvCxnSpPr>
-          <p:cNvPr id="3" name="Straight Connector 2"/>
-          <p:cNvCxnSpPr/>
-          <p:nvPr/>
-        </p:nvCxnSpPr>
-        <p:spPr>
-          <a:xfrm>
-            <a:off x="611560" y="2852936"/>
-            <a:ext cx="6264696" cy="504056"/>
-          </a:xfrm>
-          <a:prstGeom prst="line">
-            <a:avLst/>
-          </a:prstGeom>
-        </p:spPr>
-        <p:style>
-          <a:lnRef idx="1">
-            <a:schemeClr val="accent1"/>
-          </a:lnRef>
-          <a:fillRef idx="0">
-            <a:schemeClr val="accent1"/>
-          </a:fillRef>
-          <a:effectRef idx="0">
-            <a:schemeClr val="accent1"/>
-          </a:effectRef>
-          <a:fontRef idx="minor">
-            <a:schemeClr val="tx1"/>
-          </a:fontRef>
-        </p:style>
-      </p:cxnSp>
-      <p:cxnSp>
-        <p:nvCxnSpPr>
-          <p:cNvPr id="8" name="Straight Connector 7"/>
-          <p:cNvCxnSpPr/>
-          <p:nvPr/>
-        </p:nvCxnSpPr>
-        <p:spPr>
-          <a:xfrm>
-            <a:off x="611560" y="2060848"/>
-            <a:ext cx="4896544" cy="504056"/>
-          </a:xfrm>
-          <a:prstGeom prst="line">
-            <a:avLst/>
-          </a:prstGeom>
-        </p:spPr>
-        <p:style>
-          <a:lnRef idx="1">
-            <a:schemeClr val="accent1"/>
-          </a:lnRef>
-          <a:fillRef idx="0">
-            <a:schemeClr val="accent1"/>
-          </a:fillRef>
-          <a:effectRef idx="0">
-            <a:schemeClr val="accent1"/>
-          </a:effectRef>
-          <a:fontRef idx="minor">
-            <a:schemeClr val="tx1"/>
-          </a:fontRef>
-        </p:style>
-      </p:cxnSp>
-    </p:spTree>
-    <p:extLst>
-      <p:ext uri="{BB962C8B-B14F-4D97-AF65-F5344CB8AC3E}">
-        <p14:creationId xmlns:p14="http://schemas.microsoft.com/office/powerpoint/2010/main" val="2892785066"/>
-      </p:ext>
-    </p:extLst>
-  </p:cSld>
-  <p:clrMapOvr>
-    <a:masterClrMapping/>
-  </p:clrMapOvr>
-  <p:timing>
-    <p:tnLst>
-      <p:par>
-        <p:cTn id="1" dur="indefinite" restart="never" nodeType="tmRoot">
-          <p:childTnLst>
-            <p:seq concurrent="1" nextAc="seek">
-              <p:cTn id="2" dur="indefinite" nodeType="mainSeq">
-                <p:childTnLst>
-                  <p:par>
-                    <p:cTn id="3" fill="hold">
-                      <p:stCondLst>
-                        <p:cond delay="indefinite"/>
-                      </p:stCondLst>
-                      <p:childTnLst>
-                        <p:par>
-                          <p:cTn id="4" fill="hold">
-                            <p:stCondLst>
-                              <p:cond delay="0"/>
-                            </p:stCondLst>
-                            <p:childTnLst>
-                              <p:par>
-                                <p:cTn id="5" presetID="1" presetClass="entr" presetSubtype="0" fill="hold" grpId="0" nodeType="clickEffect">
-                                  <p:stCondLst>
-                                    <p:cond delay="0"/>
-                                  </p:stCondLst>
-                                  <p:childTnLst>
-                                    <p:set>
-                                      <p:cBhvr>
-                                        <p:cTn id="6" dur="1" fill="hold">
-                                          <p:stCondLst>
-                                            <p:cond delay="0"/>
-                                          </p:stCondLst>
-                                        </p:cTn>
-                                        <p:tgtEl>
-                                          <p:spTgt spid="5"/>
-                                        </p:tgtEl>
-                                        <p:attrNameLst>
-                                          <p:attrName>style.visibility</p:attrName>
-                                        </p:attrNameLst>
-                                      </p:cBhvr>
-                                      <p:to>
-                                        <p:strVal val="visible"/>
-                                      </p:to>
-                                    </p:set>
-                                  </p:childTnLst>
-                                </p:cTn>
-                              </p:par>
-                            </p:childTnLst>
-                          </p:cTn>
-                        </p:par>
-                      </p:childTnLst>
-                    </p:cTn>
-                  </p:par>
-                  <p:par>
-                    <p:cTn id="7" fill="hold">
-                      <p:stCondLst>
-                        <p:cond delay="indefinite"/>
-                      </p:stCondLst>
-                      <p:childTnLst>
-                        <p:par>
-                          <p:cTn id="8" fill="hold">
-                            <p:stCondLst>
-                              <p:cond delay="0"/>
-                            </p:stCondLst>
-                            <p:childTnLst>
-                              <p:par>
-                                <p:cTn id="9" presetID="1" presetClass="entr" presetSubtype="0" fill="hold" grpId="0" nodeType="clickEffect">
-                                  <p:stCondLst>
-                                    <p:cond delay="0"/>
-                                  </p:stCondLst>
-                                  <p:childTnLst>
-                                    <p:set>
-                                      <p:cBhvr>
-                                        <p:cTn id="10" dur="1" fill="hold">
-                                          <p:stCondLst>
-                                            <p:cond delay="0"/>
-                                          </p:stCondLst>
-                                        </p:cTn>
-                                        <p:tgtEl>
-                                          <p:spTgt spid="4"/>
-                                        </p:tgtEl>
-                                        <p:attrNameLst>
-                                          <p:attrName>style.visibility</p:attrName>
-                                        </p:attrNameLst>
-                                      </p:cBhvr>
-                                      <p:to>
-                                        <p:strVal val="visible"/>
-                                      </p:to>
-                                    </p:set>
-                                  </p:childTnLst>
-                                </p:cTn>
-                              </p:par>
-                              <p:par>
-                                <p:cTn id="11" presetID="1" presetClass="entr" presetSubtype="0" fill="hold" nodeType="withEffect">
-                                  <p:stCondLst>
-                                    <p:cond delay="0"/>
-                                  </p:stCondLst>
-                                  <p:childTnLst>
-                                    <p:set>
-                                      <p:cBhvr>
-                                        <p:cTn id="12" dur="1" fill="hold">
-                                          <p:stCondLst>
-                                            <p:cond delay="0"/>
-                                          </p:stCondLst>
-                                        </p:cTn>
-                                        <p:tgtEl>
-                                          <p:spTgt spid="3"/>
-                                        </p:tgtEl>
-                                        <p:attrNameLst>
-                                          <p:attrName>style.visibility</p:attrName>
-                                        </p:attrNameLst>
-                                      </p:cBhvr>
-                                      <p:to>
-                                        <p:strVal val="visible"/>
-                                      </p:to>
-                                    </p:set>
-                                  </p:childTnLst>
-                                </p:cTn>
-                              </p:par>
-                            </p:childTnLst>
-                          </p:cTn>
-                        </p:par>
-                      </p:childTnLst>
-                    </p:cTn>
-                  </p:par>
-                  <p:par>
-                    <p:cTn id="13" fill="hold">
-                      <p:stCondLst>
-                        <p:cond delay="indefinite"/>
-                      </p:stCondLst>
-                      <p:childTnLst>
-                        <p:par>
-                          <p:cTn id="14" fill="hold">
-                            <p:stCondLst>
-                              <p:cond delay="0"/>
-                            </p:stCondLst>
-                            <p:childTnLst>
-                              <p:par>
-                                <p:cTn id="15" presetID="1" presetClass="entr" presetSubtype="0" fill="hold" grpId="0" nodeType="clickEffect">
-                                  <p:stCondLst>
-                                    <p:cond delay="0"/>
-                                  </p:stCondLst>
-                                  <p:childTnLst>
-                                    <p:set>
-                                      <p:cBhvr>
-                                        <p:cTn id="16" dur="1" fill="hold">
-                                          <p:stCondLst>
-                                            <p:cond delay="0"/>
-                                          </p:stCondLst>
-                                        </p:cTn>
-                                        <p:tgtEl>
-                                          <p:spTgt spid="6"/>
-                                        </p:tgtEl>
-                                        <p:attrNameLst>
-                                          <p:attrName>style.visibility</p:attrName>
-                                        </p:attrNameLst>
-                                      </p:cBhvr>
-                                      <p:to>
-                                        <p:strVal val="visible"/>
-                                      </p:to>
-                                    </p:set>
-                                  </p:childTnLst>
-                                </p:cTn>
-                              </p:par>
-                              <p:par>
-                                <p:cTn id="17" presetID="1" presetClass="entr" presetSubtype="0" fill="hold" nodeType="withEffect">
-                                  <p:stCondLst>
-                                    <p:cond delay="0"/>
-                                  </p:stCondLst>
-                                  <p:childTnLst>
-                                    <p:set>
-                                      <p:cBhvr>
-                                        <p:cTn id="18" dur="1" fill="hold">
-                                          <p:stCondLst>
-                                            <p:cond delay="0"/>
-                                          </p:stCondLst>
-                                        </p:cTn>
-                                        <p:tgtEl>
-                                          <p:spTgt spid="8"/>
-                                        </p:tgtEl>
-                                        <p:attrNameLst>
-                                          <p:attrName>style.visibility</p:attrName>
-                                        </p:attrNameLst>
-                                      </p:cBhvr>
-                                      <p:to>
-                                        <p:strVal val="visible"/>
-                                      </p:to>
-                                    </p:set>
-                                  </p:childTnLst>
-                                </p:cTn>
-                              </p:par>
-                            </p:childTnLst>
-                          </p:cTn>
-                        </p:par>
-                      </p:childTnLst>
-                    </p:cTn>
-                  </p:par>
-                </p:childTnLst>
-              </p:cTn>
-              <p:prevCondLst>
-                <p:cond evt="onPrev" delay="0">
-                  <p:tgtEl>
-                    <p:sldTgt/>
-                  </p:tgtEl>
-                </p:cond>
-              </p:prevCondLst>
-              <p:nextCondLst>
-                <p:cond evt="onNext" delay="0">
-                  <p:tgtEl>
-                    <p:sldTgt/>
-                  </p:tgtEl>
-                </p:cond>
-              </p:nextCondLst>
-            </p:seq>
-          </p:childTnLst>
-        </p:cTn>
-      </p:par>
-    </p:tnLst>
-    <p:bldLst>
-      <p:bldP spid="5" grpId="0"/>
-      <p:bldP spid="4" grpId="0"/>
-      <p:bldP spid="6" grpId="0"/>
-    </p:bldLst>
-  </p:timing>
-</p:sld>
-</file>
-
-<file path=ppt/slides/slide24.xml><?xml version="1.0" encoding="utf-8"?>
-<p:sld xmlns:a="http://schemas.openxmlformats.org/drawingml/2006/main" xmlns:r="http://schemas.openxmlformats.org/officeDocument/2006/relationships" xmlns:p="http://schemas.openxmlformats.org/presentationml/2006/main">
-  <p:cSld>
-    <p:spTree>
-      <p:nvGrpSpPr>
-        <p:cNvPr id="1" name=""/>
-        <p:cNvGrpSpPr/>
-        <p:nvPr/>
-      </p:nvGrpSpPr>
-      <p:grpSpPr>
-        <a:xfrm>
-          <a:off x="0" y="0"/>
-          <a:ext cx="0" cy="0"/>
-          <a:chOff x="0" y="0"/>
-          <a:chExt cx="0" cy="0"/>
-        </a:xfrm>
-      </p:grpSpPr>
-      <p:sp>
-        <p:nvSpPr>
-          <p:cNvPr id="11" name="TextBox 10"/>
-          <p:cNvSpPr txBox="1"/>
-          <p:nvPr/>
-        </p:nvSpPr>
-        <p:spPr>
-          <a:xfrm>
             <a:off x="496392" y="838453"/>
             <a:ext cx="4344459" cy="646331"/>
           </a:xfrm>
@@ -10982,7 +9665,7 @@
         <p:spPr>
           <a:xfrm>
             <a:off x="2436260" y="1783869"/>
-            <a:ext cx="2329484" cy="646331"/>
+            <a:ext cx="3456395" cy="646331"/>
           </a:xfrm>
           <a:prstGeom prst="rect">
             <a:avLst/>
@@ -11003,7 +9686,7 @@
                 <a:latin typeface="+mj-lt"/>
                 <a:cs typeface="Courier New" panose="02070309020205020404" pitchFamily="49" charset="0"/>
               </a:rPr>
-              <a:t>function  </a:t>
+              <a:t>some function  </a:t>
             </a:r>
             <a:r>
               <a:rPr lang="en-GB" sz="3600" dirty="0" smtClean="0">
@@ -11033,7 +9716,7 @@
         </p:nvSpPr>
         <p:spPr>
           <a:xfrm>
-            <a:off x="496392" y="2710661"/>
+            <a:off x="496392" y="3718773"/>
             <a:ext cx="8226932" cy="646331"/>
           </a:xfrm>
           <a:prstGeom prst="rect">
@@ -11137,8 +9820,8 @@
         </p:nvSpPr>
         <p:spPr>
           <a:xfrm>
-            <a:off x="4840851" y="1783868"/>
-            <a:ext cx="1304781" cy="646331"/>
+            <a:off x="5903799" y="1808718"/>
+            <a:ext cx="1630190" cy="646331"/>
           </a:xfrm>
           <a:prstGeom prst="rect">
             <a:avLst/>
@@ -11159,7 +9842,7 @@
                 <a:latin typeface="+mj-lt"/>
                 <a:cs typeface="Courier New" panose="02070309020205020404" pitchFamily="49" charset="0"/>
               </a:rPr>
-              <a:t>list  </a:t>
+              <a:t>a list  </a:t>
             </a:r>
             <a:r>
               <a:rPr lang="en-GB" sz="3600" dirty="0" smtClean="0">
@@ -11189,8 +9872,8 @@
         </p:nvSpPr>
         <p:spPr>
           <a:xfrm>
-            <a:off x="6156176" y="1783867"/>
-            <a:ext cx="726096" cy="646331"/>
+            <a:off x="6228184" y="2453532"/>
+            <a:ext cx="2322687" cy="646331"/>
           </a:xfrm>
           <a:prstGeom prst="rect">
             <a:avLst/>
@@ -11211,7 +9894,7 @@
                 <a:latin typeface="+mj-lt"/>
                 <a:cs typeface="Courier New" panose="02070309020205020404" pitchFamily="49" charset="0"/>
               </a:rPr>
-              <a:t>list</a:t>
+              <a:t>another list</a:t>
             </a:r>
             <a:endParaRPr lang="en-GB" sz="3600" dirty="0">
               <a:solidFill>
@@ -11498,7 +10181,7 @@
 </p:sld>
 </file>
 
-<file path=ppt/slides/slide25.xml><?xml version="1.0" encoding="utf-8"?>
+<file path=ppt/slides/slide22.xml><?xml version="1.0" encoding="utf-8"?>
 <p:sld xmlns:a="http://schemas.openxmlformats.org/drawingml/2006/main" xmlns:r="http://schemas.openxmlformats.org/officeDocument/2006/relationships" xmlns:p="http://schemas.openxmlformats.org/presentationml/2006/main">
   <p:cSld>
     <p:spTree>
@@ -11605,7 +10288,7 @@
 </p:sld>
 </file>
 
-<file path=ppt/slides/slide26.xml><?xml version="1.0" encoding="utf-8"?>
+<file path=ppt/slides/slide23.xml><?xml version="1.0" encoding="utf-8"?>
 <p:sld xmlns:a="http://schemas.openxmlformats.org/drawingml/2006/main" xmlns:r="http://schemas.openxmlformats.org/officeDocument/2006/relationships" xmlns:p="http://schemas.openxmlformats.org/presentationml/2006/main">
   <p:cSld>
     <p:spTree>
@@ -11723,165 +10406,6 @@
       </p:sp>
       <p:sp>
         <p:nvSpPr>
-          <p:cNvPr id="6" name="TextBox 5"/>
-          <p:cNvSpPr txBox="1"/>
-          <p:nvPr/>
-        </p:nvSpPr>
-        <p:spPr>
-          <a:xfrm>
-            <a:off x="611560" y="2996952"/>
-            <a:ext cx="5232523" cy="769441"/>
-          </a:xfrm>
-          <a:prstGeom prst="rect">
-            <a:avLst/>
-          </a:prstGeom>
-          <a:noFill/>
-        </p:spPr>
-        <p:txBody>
-          <a:bodyPr wrap="none" rtlCol="0">
-            <a:spAutoFit/>
-          </a:bodyPr>
-          <a:lstStyle/>
-          <a:p>
-            <a:r>
-              <a:rPr lang="en-GB" sz="4400" i="1" dirty="0" smtClean="0">
-                <a:solidFill>
-                  <a:srgbClr val="7030A0"/>
-                </a:solidFill>
-                <a:latin typeface="Calibri" panose="020F0502020204030204" pitchFamily="34" charset="0"/>
-                <a:cs typeface="Courier New" panose="02070309020205020404" pitchFamily="49" charset="0"/>
-              </a:rPr>
-              <a:t>[1,2,3,4]         </a:t>
-            </a:r>
-            <a:r>
-              <a:rPr lang="en-GB" sz="4400" i="1" dirty="0" smtClean="0">
-                <a:solidFill>
-                  <a:srgbClr val="7030A0"/>
-                </a:solidFill>
-                <a:latin typeface="Calibri" panose="020F0502020204030204" pitchFamily="34" charset="0"/>
-                <a:cs typeface="Courier New" panose="02070309020205020404" pitchFamily="49" charset="0"/>
-                <a:sym typeface="Wingdings" panose="05000000000000000000" pitchFamily="2" charset="2"/>
-              </a:rPr>
-              <a:t>1+2+3+4</a:t>
-            </a:r>
-            <a:endParaRPr lang="en-GB" sz="4400" i="1" dirty="0" smtClean="0">
-              <a:solidFill>
-                <a:srgbClr val="7030A0"/>
-              </a:solidFill>
-              <a:latin typeface="Calibri" panose="020F0502020204030204" pitchFamily="34" charset="0"/>
-              <a:cs typeface="Courier New" panose="02070309020205020404" pitchFamily="49" charset="0"/>
-            </a:endParaRPr>
-          </a:p>
-        </p:txBody>
-      </p:sp>
-      <p:sp>
-        <p:nvSpPr>
-          <p:cNvPr id="7" name="TextBox 6"/>
-          <p:cNvSpPr txBox="1"/>
-          <p:nvPr/>
-        </p:nvSpPr>
-        <p:spPr>
-          <a:xfrm>
-            <a:off x="611559" y="3739198"/>
-            <a:ext cx="5076583" cy="769441"/>
-          </a:xfrm>
-          <a:prstGeom prst="rect">
-            <a:avLst/>
-          </a:prstGeom>
-          <a:noFill/>
-        </p:spPr>
-        <p:txBody>
-          <a:bodyPr wrap="none" rtlCol="0">
-            <a:spAutoFit/>
-          </a:bodyPr>
-          <a:lstStyle/>
-          <a:p>
-            <a:r>
-              <a:rPr lang="en-GB" sz="4400" i="1" dirty="0" smtClean="0">
-                <a:solidFill>
-                  <a:srgbClr val="7030A0"/>
-                </a:solidFill>
-                <a:latin typeface="Calibri" panose="020F0502020204030204" pitchFamily="34" charset="0"/>
-                <a:cs typeface="Courier New" panose="02070309020205020404" pitchFamily="49" charset="0"/>
-              </a:rPr>
-              <a:t>foldr         </a:t>
-            </a:r>
-            <a:r>
-              <a:rPr lang="en-GB" sz="4400" i="1" dirty="0" smtClean="0">
-                <a:solidFill>
-                  <a:srgbClr val="7030A0"/>
-                </a:solidFill>
-                <a:latin typeface="Calibri" panose="020F0502020204030204" pitchFamily="34" charset="0"/>
-                <a:cs typeface="Courier New" panose="02070309020205020404" pitchFamily="49" charset="0"/>
-                <a:sym typeface="Wingdings" panose="05000000000000000000" pitchFamily="2" charset="2"/>
-              </a:rPr>
-              <a:t>1+(2+(3+4))</a:t>
-            </a:r>
-            <a:endParaRPr lang="en-GB" sz="4400" i="1" dirty="0" smtClean="0">
-              <a:solidFill>
-                <a:srgbClr val="7030A0"/>
-              </a:solidFill>
-              <a:latin typeface="Calibri" panose="020F0502020204030204" pitchFamily="34" charset="0"/>
-              <a:cs typeface="Courier New" panose="02070309020205020404" pitchFamily="49" charset="0"/>
-            </a:endParaRPr>
-          </a:p>
-        </p:txBody>
-      </p:sp>
-      <p:sp>
-        <p:nvSpPr>
-          <p:cNvPr id="8" name="TextBox 7"/>
-          <p:cNvSpPr txBox="1"/>
-          <p:nvPr/>
-        </p:nvSpPr>
-        <p:spPr>
-          <a:xfrm>
-            <a:off x="611560" y="4508639"/>
-            <a:ext cx="5137497" cy="769441"/>
-          </a:xfrm>
-          <a:prstGeom prst="rect">
-            <a:avLst/>
-          </a:prstGeom>
-          <a:noFill/>
-        </p:spPr>
-        <p:txBody>
-          <a:bodyPr wrap="none" rtlCol="0">
-            <a:spAutoFit/>
-          </a:bodyPr>
-          <a:lstStyle/>
-          <a:p>
-            <a:r>
-              <a:rPr lang="en-GB" sz="4400" i="1" dirty="0" smtClean="0">
-                <a:solidFill>
-                  <a:srgbClr val="7030A0"/>
-                </a:solidFill>
-                <a:latin typeface="Calibri" panose="020F0502020204030204" pitchFamily="34" charset="0"/>
-                <a:cs typeface="Courier New" panose="02070309020205020404" pitchFamily="49" charset="0"/>
-              </a:rPr>
-              <a:t>foldl'        ((</a:t>
-            </a:r>
-            <a:r>
-              <a:rPr lang="en-GB" sz="4400" i="1" dirty="0" smtClean="0">
-                <a:solidFill>
-                  <a:srgbClr val="7030A0"/>
-                </a:solidFill>
-                <a:latin typeface="Calibri" panose="020F0502020204030204" pitchFamily="34" charset="0"/>
-                <a:cs typeface="Courier New" panose="02070309020205020404" pitchFamily="49" charset="0"/>
-                <a:sym typeface="Wingdings" panose="05000000000000000000" pitchFamily="2" charset="2"/>
-              </a:rPr>
-              <a:t>1+2)+3)+4</a:t>
-            </a:r>
-            <a:endParaRPr lang="en-GB" sz="4400" i="1" dirty="0" smtClean="0">
-              <a:solidFill>
-                <a:srgbClr val="7030A0"/>
-              </a:solidFill>
-              <a:latin typeface="Calibri" panose="020F0502020204030204" pitchFamily="34" charset="0"/>
-              <a:cs typeface="Courier New" panose="02070309020205020404" pitchFamily="49" charset="0"/>
-            </a:endParaRPr>
-          </a:p>
-        </p:txBody>
-      </p:sp>
-      <p:sp>
-        <p:nvSpPr>
           <p:cNvPr id="9" name="TextBox 8"/>
           <p:cNvSpPr txBox="1"/>
           <p:nvPr/>
@@ -11926,6 +10450,162 @@
               </a:rPr>
               <a:t> sqrt) [1,2,3]</a:t>
             </a:r>
+          </a:p>
+        </p:txBody>
+      </p:sp>
+      <p:sp>
+        <p:nvSpPr>
+          <p:cNvPr id="2" name="TextBox 1"/>
+          <p:cNvSpPr txBox="1"/>
+          <p:nvPr/>
+        </p:nvSpPr>
+        <p:spPr>
+          <a:xfrm>
+            <a:off x="467544" y="3429000"/>
+            <a:ext cx="6611105" cy="769441"/>
+          </a:xfrm>
+          <a:prstGeom prst="rect">
+            <a:avLst/>
+          </a:prstGeom>
+          <a:noFill/>
+        </p:spPr>
+        <p:txBody>
+          <a:bodyPr wrap="none" rtlCol="0">
+            <a:spAutoFit/>
+          </a:bodyPr>
+          <a:lstStyle/>
+          <a:p>
+            <a:r>
+              <a:rPr lang="en-GB" sz="4400" dirty="0" smtClean="0">
+                <a:latin typeface="Courier New" panose="02070309020205020404" pitchFamily="49" charset="0"/>
+                <a:cs typeface="Courier New" panose="02070309020205020404" pitchFamily="49" charset="0"/>
+              </a:rPr>
+              <a:t>foldr (+) 0 [1,2,3]</a:t>
+            </a:r>
+            <a:endParaRPr lang="en-GB" sz="4400" dirty="0" smtClean="0">
+              <a:latin typeface="Courier New" panose="02070309020205020404" pitchFamily="49" charset="0"/>
+              <a:cs typeface="Courier New" panose="02070309020205020404" pitchFamily="49" charset="0"/>
+            </a:endParaRPr>
+          </a:p>
+        </p:txBody>
+      </p:sp>
+      <p:sp>
+        <p:nvSpPr>
+          <p:cNvPr id="10" name="TextBox 9"/>
+          <p:cNvSpPr txBox="1"/>
+          <p:nvPr/>
+        </p:nvSpPr>
+        <p:spPr>
+          <a:xfrm>
+            <a:off x="8100402" y="3490555"/>
+            <a:ext cx="492443" cy="707886"/>
+          </a:xfrm>
+          <a:prstGeom prst="rect">
+            <a:avLst/>
+          </a:prstGeom>
+          <a:noFill/>
+        </p:spPr>
+        <p:txBody>
+          <a:bodyPr wrap="none" rtlCol="0">
+            <a:spAutoFit/>
+          </a:bodyPr>
+          <a:lstStyle/>
+          <a:p>
+            <a:r>
+              <a:rPr lang="en-GB" sz="4000" dirty="0" smtClean="0">
+                <a:solidFill>
+                  <a:srgbClr val="0070C0"/>
+                </a:solidFill>
+                <a:latin typeface="Courier New" panose="02070309020205020404" pitchFamily="49" charset="0"/>
+                <a:cs typeface="Courier New" panose="02070309020205020404" pitchFamily="49" charset="0"/>
+              </a:rPr>
+              <a:t>6</a:t>
+            </a:r>
+            <a:endParaRPr lang="en-GB" sz="4000" dirty="0" smtClean="0">
+              <a:solidFill>
+                <a:srgbClr val="0070C0"/>
+              </a:solidFill>
+              <a:latin typeface="Courier New" panose="02070309020205020404" pitchFamily="49" charset="0"/>
+              <a:cs typeface="Courier New" panose="02070309020205020404" pitchFamily="49" charset="0"/>
+            </a:endParaRPr>
+          </a:p>
+        </p:txBody>
+      </p:sp>
+      <p:sp>
+        <p:nvSpPr>
+          <p:cNvPr id="11" name="TextBox 10"/>
+          <p:cNvSpPr txBox="1"/>
+          <p:nvPr/>
+        </p:nvSpPr>
+        <p:spPr>
+          <a:xfrm>
+            <a:off x="467544" y="4198441"/>
+            <a:ext cx="6949338" cy="769441"/>
+          </a:xfrm>
+          <a:prstGeom prst="rect">
+            <a:avLst/>
+          </a:prstGeom>
+          <a:noFill/>
+        </p:spPr>
+        <p:txBody>
+          <a:bodyPr wrap="none" rtlCol="0">
+            <a:spAutoFit/>
+          </a:bodyPr>
+          <a:lstStyle/>
+          <a:p>
+            <a:r>
+              <a:rPr lang="en-GB" sz="4400" dirty="0" smtClean="0">
+                <a:latin typeface="Courier New" panose="02070309020205020404" pitchFamily="49" charset="0"/>
+                <a:cs typeface="Courier New" panose="02070309020205020404" pitchFamily="49" charset="0"/>
+              </a:rPr>
+              <a:t>foldl' (+) 0 [1,2,3]</a:t>
+            </a:r>
+            <a:endParaRPr lang="en-GB" sz="4400" dirty="0" smtClean="0">
+              <a:latin typeface="Courier New" panose="02070309020205020404" pitchFamily="49" charset="0"/>
+              <a:cs typeface="Courier New" panose="02070309020205020404" pitchFamily="49" charset="0"/>
+            </a:endParaRPr>
+          </a:p>
+        </p:txBody>
+      </p:sp>
+      <p:sp>
+        <p:nvSpPr>
+          <p:cNvPr id="12" name="TextBox 11"/>
+          <p:cNvSpPr txBox="1"/>
+          <p:nvPr/>
+        </p:nvSpPr>
+        <p:spPr>
+          <a:xfrm>
+            <a:off x="8100402" y="4259996"/>
+            <a:ext cx="492443" cy="707886"/>
+          </a:xfrm>
+          <a:prstGeom prst="rect">
+            <a:avLst/>
+          </a:prstGeom>
+          <a:noFill/>
+        </p:spPr>
+        <p:txBody>
+          <a:bodyPr wrap="none" rtlCol="0">
+            <a:spAutoFit/>
+          </a:bodyPr>
+          <a:lstStyle/>
+          <a:p>
+            <a:r>
+              <a:rPr lang="en-GB" sz="4000" dirty="0" smtClean="0">
+                <a:solidFill>
+                  <a:srgbClr val="0070C0"/>
+                </a:solidFill>
+                <a:latin typeface="Courier New" panose="02070309020205020404" pitchFamily="49" charset="0"/>
+                <a:cs typeface="Courier New" panose="02070309020205020404" pitchFamily="49" charset="0"/>
+              </a:rPr>
+              <a:t>6</a:t>
+            </a:r>
+            <a:endParaRPr lang="en-GB" sz="4000" dirty="0" smtClean="0">
+              <a:solidFill>
+                <a:srgbClr val="0070C0"/>
+              </a:solidFill>
+              <a:latin typeface="Courier New" panose="02070309020205020404" pitchFamily="49" charset="0"/>
+              <a:cs typeface="Courier New" panose="02070309020205020404" pitchFamily="49" charset="0"/>
+            </a:endParaRPr>
           </a:p>
         </p:txBody>
       </p:sp>
@@ -12063,7 +10743,7 @@
                                           </p:stCondLst>
                                         </p:cTn>
                                         <p:tgtEl>
-                                          <p:spTgt spid="6"/>
+                                          <p:spTgt spid="9"/>
                                         </p:tgtEl>
                                         <p:attrNameLst>
                                           <p:attrName>style.visibility</p:attrName>
@@ -12108,7 +10788,7 @@
                                           </p:stCondLst>
                                         </p:cTn>
                                         <p:tgtEl>
-                                          <p:spTgt spid="7"/>
+                                          <p:spTgt spid="10"/>
                                         </p:tgtEl>
                                         <p:attrNameLst>
                                           <p:attrName>style.visibility</p:attrName>
@@ -12153,52 +10833,7 @@
                                           </p:stCondLst>
                                         </p:cTn>
                                         <p:tgtEl>
-                                          <p:spTgt spid="8"/>
-                                        </p:tgtEl>
-                                        <p:attrNameLst>
-                                          <p:attrName>style.visibility</p:attrName>
-                                        </p:attrNameLst>
-                                      </p:cBhvr>
-                                      <p:to>
-                                        <p:strVal val="visible"/>
-                                      </p:to>
-                                    </p:set>
-                                  </p:childTnLst>
-                                </p:cTn>
-                              </p:par>
-                            </p:childTnLst>
-                          </p:cTn>
-                        </p:par>
-                      </p:childTnLst>
-                    </p:cTn>
-                  </p:par>
-                  <p:par>
-                    <p:cTn id="23" fill="hold">
-                      <p:stCondLst>
-                        <p:cond delay="indefinite"/>
-                      </p:stCondLst>
-                      <p:childTnLst>
-                        <p:par>
-                          <p:cTn id="24" fill="hold">
-                            <p:stCondLst>
-                              <p:cond delay="0"/>
-                            </p:stCondLst>
-                            <p:childTnLst>
-                              <p:par>
-                                <p:cTn id="25" presetID="1" presetClass="entr" presetSubtype="0" fill="hold" grpId="0" nodeType="clickEffect">
-                                  <p:stCondLst>
-                                    <p:cond delay="0"/>
-                                  </p:stCondLst>
-                                  <p:childTnLst>
-                                    <p:set>
-                                      <p:cBhvr>
-                                        <p:cTn id="26" dur="1" fill="hold">
-                                          <p:stCondLst>
-                                            <p:cond delay="0"/>
-                                          </p:stCondLst>
-                                        </p:cTn>
-                                        <p:tgtEl>
-                                          <p:spTgt spid="9"/>
+                                          <p:spTgt spid="12"/>
                                         </p:tgtEl>
                                         <p:attrNameLst>
                                           <p:attrName>style.visibility</p:attrName>
@@ -12241,16 +10876,15 @@
     <p:bldLst>
       <p:bldP spid="4" grpId="0"/>
       <p:bldP spid="5" grpId="0"/>
-      <p:bldP spid="6" grpId="0"/>
-      <p:bldP spid="7" grpId="0"/>
-      <p:bldP spid="8" grpId="0"/>
       <p:bldP spid="9" grpId="0"/>
+      <p:bldP spid="10" grpId="0"/>
+      <p:bldP spid="12" grpId="0"/>
     </p:bldLst>
   </p:timing>
 </p:sld>
 </file>
 
-<file path=ppt/slides/slide27.xml><?xml version="1.0" encoding="utf-8"?>
+<file path=ppt/slides/slide24.xml><?xml version="1.0" encoding="utf-8"?>
 <p:sld xmlns:a="http://schemas.openxmlformats.org/drawingml/2006/main" xmlns:r="http://schemas.openxmlformats.org/officeDocument/2006/relationships" xmlns:p="http://schemas.openxmlformats.org/presentationml/2006/main">
   <p:cSld>
     <p:spTree>
@@ -12325,7 +10959,7 @@
 </p:sld>
 </file>
 
-<file path=ppt/slides/slide28.xml><?xml version="1.0" encoding="utf-8"?>
+<file path=ppt/slides/slide25.xml><?xml version="1.0" encoding="utf-8"?>
 <p:sld xmlns:a="http://schemas.openxmlformats.org/drawingml/2006/main" xmlns:r="http://schemas.openxmlformats.org/officeDocument/2006/relationships" xmlns:p="http://schemas.openxmlformats.org/presentationml/2006/main">
   <p:cSld>
     <p:spTree>
@@ -12986,7 +11620,7 @@
 </p:sld>
 </file>
 
-<file path=ppt/slides/slide29.xml><?xml version="1.0" encoding="utf-8"?>
+<file path=ppt/slides/slide26.xml><?xml version="1.0" encoding="utf-8"?>
 <p:sld xmlns:a="http://schemas.openxmlformats.org/drawingml/2006/main" xmlns:r="http://schemas.openxmlformats.org/officeDocument/2006/relationships" xmlns:p="http://schemas.openxmlformats.org/presentationml/2006/main">
   <p:cSld>
     <p:spTree>
@@ -13556,6 +12190,759 @@
       <p:bldP spid="4" grpId="0" animBg="1"/>
       <p:bldP spid="7" grpId="0" animBg="1"/>
     </p:bldLst>
+  </p:timing>
+</p:sld>
+</file>
+
+<file path=ppt/slides/slide27.xml><?xml version="1.0" encoding="utf-8"?>
+<p:sld xmlns:a="http://schemas.openxmlformats.org/drawingml/2006/main" xmlns:r="http://schemas.openxmlformats.org/officeDocument/2006/relationships" xmlns:p="http://schemas.openxmlformats.org/presentationml/2006/main">
+  <p:cSld>
+    <p:spTree>
+      <p:nvGrpSpPr>
+        <p:cNvPr id="1" name=""/>
+        <p:cNvGrpSpPr/>
+        <p:nvPr/>
+      </p:nvGrpSpPr>
+      <p:grpSpPr>
+        <a:xfrm>
+          <a:off x="0" y="0"/>
+          <a:ext cx="0" cy="0"/>
+          <a:chOff x="0" y="0"/>
+          <a:chExt cx="0" cy="0"/>
+        </a:xfrm>
+      </p:grpSpPr>
+      <p:sp>
+        <p:nvSpPr>
+          <p:cNvPr id="2" name="TextBox 1"/>
+          <p:cNvSpPr txBox="1"/>
+          <p:nvPr/>
+        </p:nvSpPr>
+        <p:spPr>
+          <a:xfrm>
+            <a:off x="323528" y="332656"/>
+            <a:ext cx="6340197" cy="3785652"/>
+          </a:xfrm>
+          <a:prstGeom prst="rect">
+            <a:avLst/>
+          </a:prstGeom>
+          <a:noFill/>
+          <a:ln>
+            <a:solidFill>
+              <a:schemeClr val="accent1"/>
+            </a:solidFill>
+          </a:ln>
+        </p:spPr>
+        <p:txBody>
+          <a:bodyPr wrap="none" rtlCol="0">
+            <a:spAutoFit/>
+          </a:bodyPr>
+          <a:lstStyle/>
+          <a:p>
+            <a:r>
+              <a:rPr lang="en-GB" sz="4000" dirty="0" smtClean="0">
+                <a:latin typeface="Courier New" panose="02070309020205020404" pitchFamily="49" charset="0"/>
+                <a:cs typeface="Courier New" panose="02070309020205020404" pitchFamily="49" charset="0"/>
+              </a:rPr>
+              <a:t>main </a:t>
+            </a:r>
+            <a:r>
+              <a:rPr lang="en-GB" sz="4000" dirty="0" smtClean="0">
+                <a:solidFill>
+                  <a:srgbClr val="FF0000"/>
+                </a:solidFill>
+                <a:latin typeface="Courier New" panose="02070309020205020404" pitchFamily="49" charset="0"/>
+                <a:cs typeface="Courier New" panose="02070309020205020404" pitchFamily="49" charset="0"/>
+              </a:rPr>
+              <a:t>=</a:t>
+            </a:r>
+            <a:r>
+              <a:rPr lang="en-GB" sz="4000" dirty="0" smtClean="0">
+                <a:latin typeface="Courier New" panose="02070309020205020404" pitchFamily="49" charset="0"/>
+                <a:cs typeface="Courier New" panose="02070309020205020404" pitchFamily="49" charset="0"/>
+              </a:rPr>
+              <a:t> </a:t>
+            </a:r>
+            <a:r>
+              <a:rPr lang="en-GB" sz="4000" dirty="0" smtClean="0">
+                <a:solidFill>
+                  <a:srgbClr val="0070C0"/>
+                </a:solidFill>
+                <a:latin typeface="Courier New" panose="02070309020205020404" pitchFamily="49" charset="0"/>
+                <a:cs typeface="Courier New" panose="02070309020205020404" pitchFamily="49" charset="0"/>
+              </a:rPr>
+              <a:t>do</a:t>
+            </a:r>
+          </a:p>
+          <a:p>
+            <a:r>
+              <a:rPr lang="en-GB" sz="4000" dirty="0">
+                <a:latin typeface="Courier New" panose="02070309020205020404" pitchFamily="49" charset="0"/>
+                <a:cs typeface="Courier New" panose="02070309020205020404" pitchFamily="49" charset="0"/>
+              </a:rPr>
+              <a:t> </a:t>
+            </a:r>
+            <a:r>
+              <a:rPr lang="en-GB" sz="4000" dirty="0" smtClean="0">
+                <a:latin typeface="Courier New" panose="02070309020205020404" pitchFamily="49" charset="0"/>
+                <a:cs typeface="Courier New" panose="02070309020205020404" pitchFamily="49" charset="0"/>
+              </a:rPr>
+              <a:t> str </a:t>
+            </a:r>
+            <a:r>
+              <a:rPr lang="en-GB" sz="4000" dirty="0" smtClean="0">
+                <a:solidFill>
+                  <a:srgbClr val="FF0000"/>
+                </a:solidFill>
+                <a:latin typeface="Courier New" panose="02070309020205020404" pitchFamily="49" charset="0"/>
+                <a:cs typeface="Courier New" panose="02070309020205020404" pitchFamily="49" charset="0"/>
+              </a:rPr>
+              <a:t>&lt;-</a:t>
+            </a:r>
+            <a:r>
+              <a:rPr lang="en-GB" sz="4000" dirty="0" smtClean="0">
+                <a:latin typeface="Courier New" panose="02070309020205020404" pitchFamily="49" charset="0"/>
+                <a:cs typeface="Courier New" panose="02070309020205020404" pitchFamily="49" charset="0"/>
+              </a:rPr>
+              <a:t> getContents</a:t>
+            </a:r>
+          </a:p>
+          <a:p>
+            <a:r>
+              <a:rPr lang="en-GB" sz="4000" dirty="0">
+                <a:latin typeface="Courier New" panose="02070309020205020404" pitchFamily="49" charset="0"/>
+                <a:cs typeface="Courier New" panose="02070309020205020404" pitchFamily="49" charset="0"/>
+              </a:rPr>
+              <a:t> </a:t>
+            </a:r>
+            <a:r>
+              <a:rPr lang="en-GB" sz="4000" dirty="0" smtClean="0">
+                <a:latin typeface="Courier New" panose="02070309020205020404" pitchFamily="49" charset="0"/>
+                <a:cs typeface="Courier New" panose="02070309020205020404" pitchFamily="49" charset="0"/>
+              </a:rPr>
+              <a:t> </a:t>
+            </a:r>
+            <a:r>
+              <a:rPr lang="en-GB" sz="4000" dirty="0" smtClean="0">
+                <a:solidFill>
+                  <a:srgbClr val="0070C0"/>
+                </a:solidFill>
+                <a:latin typeface="Courier New" panose="02070309020205020404" pitchFamily="49" charset="0"/>
+                <a:cs typeface="Courier New" panose="02070309020205020404" pitchFamily="49" charset="0"/>
+              </a:rPr>
+              <a:t>let</a:t>
+            </a:r>
+            <a:r>
+              <a:rPr lang="en-GB" sz="4000" dirty="0" smtClean="0">
+                <a:latin typeface="Courier New" panose="02070309020205020404" pitchFamily="49" charset="0"/>
+                <a:cs typeface="Courier New" panose="02070309020205020404" pitchFamily="49" charset="0"/>
+              </a:rPr>
+              <a:t> str' </a:t>
+            </a:r>
+            <a:r>
+              <a:rPr lang="en-GB" sz="4000" dirty="0" smtClean="0">
+                <a:solidFill>
+                  <a:srgbClr val="FF0000"/>
+                </a:solidFill>
+                <a:latin typeface="Courier New" panose="02070309020205020404" pitchFamily="49" charset="0"/>
+                <a:cs typeface="Courier New" panose="02070309020205020404" pitchFamily="49" charset="0"/>
+              </a:rPr>
+              <a:t>=</a:t>
+            </a:r>
+            <a:r>
+              <a:rPr lang="en-GB" sz="4000" dirty="0" smtClean="0">
+                <a:latin typeface="Courier New" panose="02070309020205020404" pitchFamily="49" charset="0"/>
+                <a:cs typeface="Courier New" panose="02070309020205020404" pitchFamily="49" charset="0"/>
+              </a:rPr>
+              <a:t> f str</a:t>
+            </a:r>
+          </a:p>
+          <a:p>
+            <a:r>
+              <a:rPr lang="en-GB" sz="4000" dirty="0">
+                <a:latin typeface="Courier New" panose="02070309020205020404" pitchFamily="49" charset="0"/>
+                <a:cs typeface="Courier New" panose="02070309020205020404" pitchFamily="49" charset="0"/>
+              </a:rPr>
+              <a:t> </a:t>
+            </a:r>
+            <a:r>
+              <a:rPr lang="en-GB" sz="4000" dirty="0" smtClean="0">
+                <a:latin typeface="Courier New" panose="02070309020205020404" pitchFamily="49" charset="0"/>
+                <a:cs typeface="Courier New" panose="02070309020205020404" pitchFamily="49" charset="0"/>
+              </a:rPr>
+              <a:t> putStr str'</a:t>
+            </a:r>
+          </a:p>
+          <a:p>
+            <a:endParaRPr lang="en-GB" sz="4000" dirty="0" smtClean="0">
+              <a:latin typeface="Courier New" panose="02070309020205020404" pitchFamily="49" charset="0"/>
+              <a:cs typeface="Courier New" panose="02070309020205020404" pitchFamily="49" charset="0"/>
+            </a:endParaRPr>
+          </a:p>
+          <a:p>
+            <a:r>
+              <a:rPr lang="en-GB" sz="4000" dirty="0" smtClean="0">
+                <a:latin typeface="Courier New" panose="02070309020205020404" pitchFamily="49" charset="0"/>
+                <a:cs typeface="Courier New" panose="02070309020205020404" pitchFamily="49" charset="0"/>
+              </a:rPr>
+              <a:t>f </a:t>
+            </a:r>
+            <a:r>
+              <a:rPr lang="en-GB" sz="4000" dirty="0" smtClean="0">
+                <a:solidFill>
+                  <a:srgbClr val="FF0000"/>
+                </a:solidFill>
+                <a:latin typeface="Courier New" panose="02070309020205020404" pitchFamily="49" charset="0"/>
+                <a:cs typeface="Courier New" panose="02070309020205020404" pitchFamily="49" charset="0"/>
+              </a:rPr>
+              <a:t>=</a:t>
+            </a:r>
+            <a:r>
+              <a:rPr lang="en-GB" sz="4000" dirty="0" smtClean="0">
+                <a:latin typeface="Courier New" panose="02070309020205020404" pitchFamily="49" charset="0"/>
+                <a:cs typeface="Courier New" panose="02070309020205020404" pitchFamily="49" charset="0"/>
+              </a:rPr>
+              <a:t> take 100</a:t>
+            </a:r>
+          </a:p>
+        </p:txBody>
+      </p:sp>
+      <p:sp>
+        <p:nvSpPr>
+          <p:cNvPr id="4" name="TextBox 3"/>
+          <p:cNvSpPr txBox="1"/>
+          <p:nvPr/>
+        </p:nvSpPr>
+        <p:spPr>
+          <a:xfrm>
+            <a:off x="323528" y="4725144"/>
+            <a:ext cx="8186857" cy="707886"/>
+          </a:xfrm>
+          <a:prstGeom prst="rect">
+            <a:avLst/>
+          </a:prstGeom>
+          <a:noFill/>
+          <a:ln>
+            <a:solidFill>
+              <a:schemeClr val="accent1"/>
+            </a:solidFill>
+          </a:ln>
+        </p:spPr>
+        <p:txBody>
+          <a:bodyPr wrap="none" rtlCol="0">
+            <a:spAutoFit/>
+          </a:bodyPr>
+          <a:lstStyle/>
+          <a:p>
+            <a:r>
+              <a:rPr lang="en-GB" sz="4000" dirty="0" smtClean="0">
+                <a:latin typeface="Courier New" panose="02070309020205020404" pitchFamily="49" charset="0"/>
+                <a:cs typeface="Courier New" panose="02070309020205020404" pitchFamily="49" charset="0"/>
+              </a:rPr>
+              <a:t>main </a:t>
+            </a:r>
+            <a:r>
+              <a:rPr lang="en-GB" sz="4000" dirty="0" smtClean="0">
+                <a:solidFill>
+                  <a:srgbClr val="FF0000"/>
+                </a:solidFill>
+                <a:latin typeface="Courier New" panose="02070309020205020404" pitchFamily="49" charset="0"/>
+                <a:cs typeface="Courier New" panose="02070309020205020404" pitchFamily="49" charset="0"/>
+              </a:rPr>
+              <a:t>=</a:t>
+            </a:r>
+            <a:r>
+              <a:rPr lang="en-GB" sz="4000" dirty="0" smtClean="0">
+                <a:latin typeface="Courier New" panose="02070309020205020404" pitchFamily="49" charset="0"/>
+                <a:cs typeface="Courier New" panose="02070309020205020404" pitchFamily="49" charset="0"/>
+              </a:rPr>
+              <a:t> interact </a:t>
+            </a:r>
+            <a:r>
+              <a:rPr lang="en-GB" sz="4000" dirty="0" smtClean="0">
+                <a:solidFill>
+                  <a:srgbClr val="FF0000"/>
+                </a:solidFill>
+                <a:latin typeface="Courier New" panose="02070309020205020404" pitchFamily="49" charset="0"/>
+                <a:cs typeface="Courier New" panose="02070309020205020404" pitchFamily="49" charset="0"/>
+              </a:rPr>
+              <a:t>$</a:t>
+            </a:r>
+            <a:r>
+              <a:rPr lang="en-GB" sz="4000" dirty="0" smtClean="0">
+                <a:latin typeface="Courier New" panose="02070309020205020404" pitchFamily="49" charset="0"/>
+                <a:cs typeface="Courier New" panose="02070309020205020404" pitchFamily="49" charset="0"/>
+              </a:rPr>
+              <a:t> take 100</a:t>
+            </a:r>
+          </a:p>
+        </p:txBody>
+      </p:sp>
+      <p:sp>
+        <p:nvSpPr>
+          <p:cNvPr id="6" name="TextBox 5"/>
+          <p:cNvSpPr txBox="1"/>
+          <p:nvPr/>
+        </p:nvSpPr>
+        <p:spPr>
+          <a:xfrm>
+            <a:off x="107504" y="6002124"/>
+            <a:ext cx="8561959" cy="523220"/>
+          </a:xfrm>
+          <a:prstGeom prst="rect">
+            <a:avLst/>
+          </a:prstGeom>
+          <a:noFill/>
+          <a:ln>
+            <a:solidFill>
+              <a:schemeClr val="accent1">
+                <a:shade val="95000"/>
+                <a:satMod val="105000"/>
+              </a:schemeClr>
+            </a:solidFill>
+          </a:ln>
+        </p:spPr>
+        <p:txBody>
+          <a:bodyPr wrap="none" rtlCol="0">
+            <a:spAutoFit/>
+          </a:bodyPr>
+          <a:lstStyle/>
+          <a:p>
+            <a:r>
+              <a:rPr lang="en-GB" sz="2800" dirty="0" smtClean="0">
+                <a:latin typeface="Courier New" panose="02070309020205020404" pitchFamily="49" charset="0"/>
+                <a:cs typeface="Courier New" panose="02070309020205020404" pitchFamily="49" charset="0"/>
+              </a:rPr>
+              <a:t>interact </a:t>
+            </a:r>
+            <a:r>
+              <a:rPr lang="en-GB" sz="2800" dirty="0" smtClean="0">
+                <a:solidFill>
+                  <a:srgbClr val="FF0000"/>
+                </a:solidFill>
+                <a:latin typeface="Courier New" panose="02070309020205020404" pitchFamily="49" charset="0"/>
+                <a:cs typeface="Courier New" panose="02070309020205020404" pitchFamily="49" charset="0"/>
+              </a:rPr>
+              <a:t>::</a:t>
+            </a:r>
+            <a:r>
+              <a:rPr lang="en-GB" sz="2800" dirty="0" smtClean="0">
+                <a:latin typeface="Courier New" panose="02070309020205020404" pitchFamily="49" charset="0"/>
+                <a:cs typeface="Courier New" panose="02070309020205020404" pitchFamily="49" charset="0"/>
+              </a:rPr>
+              <a:t> (String </a:t>
+            </a:r>
+            <a:r>
+              <a:rPr lang="en-GB" sz="2800" dirty="0" smtClean="0">
+                <a:solidFill>
+                  <a:srgbClr val="FF0000"/>
+                </a:solidFill>
+                <a:latin typeface="Courier New" panose="02070309020205020404" pitchFamily="49" charset="0"/>
+                <a:cs typeface="Courier New" panose="02070309020205020404" pitchFamily="49" charset="0"/>
+              </a:rPr>
+              <a:t>-&gt;</a:t>
+            </a:r>
+            <a:r>
+              <a:rPr lang="en-GB" sz="2800" dirty="0" smtClean="0">
+                <a:latin typeface="Courier New" panose="02070309020205020404" pitchFamily="49" charset="0"/>
+                <a:cs typeface="Courier New" panose="02070309020205020404" pitchFamily="49" charset="0"/>
+              </a:rPr>
+              <a:t> String) </a:t>
+            </a:r>
+            <a:r>
+              <a:rPr lang="en-GB" sz="2800" dirty="0" smtClean="0">
+                <a:solidFill>
+                  <a:srgbClr val="FF0000"/>
+                </a:solidFill>
+                <a:latin typeface="Courier New" panose="02070309020205020404" pitchFamily="49" charset="0"/>
+                <a:cs typeface="Courier New" panose="02070309020205020404" pitchFamily="49" charset="0"/>
+              </a:rPr>
+              <a:t>-&gt;</a:t>
+            </a:r>
+            <a:r>
+              <a:rPr lang="en-GB" sz="2800" dirty="0" smtClean="0">
+                <a:latin typeface="Courier New" panose="02070309020205020404" pitchFamily="49" charset="0"/>
+                <a:cs typeface="Courier New" panose="02070309020205020404" pitchFamily="49" charset="0"/>
+              </a:rPr>
+              <a:t> IO ()</a:t>
+            </a:r>
+          </a:p>
+        </p:txBody>
+      </p:sp>
+      <p:cxnSp>
+        <p:nvCxnSpPr>
+          <p:cNvPr id="8" name="Straight Arrow Connector 7"/>
+          <p:cNvCxnSpPr/>
+          <p:nvPr/>
+        </p:nvCxnSpPr>
+        <p:spPr>
+          <a:xfrm flipV="1">
+            <a:off x="1475656" y="5589240"/>
+            <a:ext cx="936104" cy="412884"/>
+          </a:xfrm>
+          <a:prstGeom prst="straightConnector1">
+            <a:avLst/>
+          </a:prstGeom>
+          <a:ln w="28575">
+            <a:tailEnd type="arrow"/>
+          </a:ln>
+        </p:spPr>
+        <p:style>
+          <a:lnRef idx="1">
+            <a:schemeClr val="accent1"/>
+          </a:lnRef>
+          <a:fillRef idx="0">
+            <a:schemeClr val="accent1"/>
+          </a:fillRef>
+          <a:effectRef idx="0">
+            <a:schemeClr val="accent1"/>
+          </a:effectRef>
+          <a:fontRef idx="minor">
+            <a:schemeClr val="tx1"/>
+          </a:fontRef>
+        </p:style>
+      </p:cxnSp>
+    </p:spTree>
+    <p:extLst>
+      <p:ext uri="{BB962C8B-B14F-4D97-AF65-F5344CB8AC3E}">
+        <p14:creationId xmlns:p14="http://schemas.microsoft.com/office/powerpoint/2010/main" val="119479251"/>
+      </p:ext>
+    </p:extLst>
+  </p:cSld>
+  <p:clrMapOvr>
+    <a:masterClrMapping/>
+  </p:clrMapOvr>
+  <p:timing>
+    <p:tnLst>
+      <p:par>
+        <p:cTn id="1" dur="indefinite" restart="never" nodeType="tmRoot">
+          <p:childTnLst>
+            <p:seq concurrent="1" nextAc="seek">
+              <p:cTn id="2" dur="indefinite" nodeType="mainSeq">
+                <p:childTnLst>
+                  <p:par>
+                    <p:cTn id="3" fill="hold">
+                      <p:stCondLst>
+                        <p:cond delay="indefinite"/>
+                      </p:stCondLst>
+                      <p:childTnLst>
+                        <p:par>
+                          <p:cTn id="4" fill="hold">
+                            <p:stCondLst>
+                              <p:cond delay="0"/>
+                            </p:stCondLst>
+                            <p:childTnLst>
+                              <p:par>
+                                <p:cTn id="5" presetID="1" presetClass="entr" presetSubtype="0" fill="hold" grpId="0" nodeType="clickEffect">
+                                  <p:stCondLst>
+                                    <p:cond delay="0"/>
+                                  </p:stCondLst>
+                                  <p:childTnLst>
+                                    <p:set>
+                                      <p:cBhvr>
+                                        <p:cTn id="6" dur="1" fill="hold">
+                                          <p:stCondLst>
+                                            <p:cond delay="0"/>
+                                          </p:stCondLst>
+                                        </p:cTn>
+                                        <p:tgtEl>
+                                          <p:spTgt spid="4"/>
+                                        </p:tgtEl>
+                                        <p:attrNameLst>
+                                          <p:attrName>style.visibility</p:attrName>
+                                        </p:attrNameLst>
+                                      </p:cBhvr>
+                                      <p:to>
+                                        <p:strVal val="visible"/>
+                                      </p:to>
+                                    </p:set>
+                                  </p:childTnLst>
+                                </p:cTn>
+                              </p:par>
+                            </p:childTnLst>
+                          </p:cTn>
+                        </p:par>
+                      </p:childTnLst>
+                    </p:cTn>
+                  </p:par>
+                  <p:par>
+                    <p:cTn id="7" fill="hold">
+                      <p:stCondLst>
+                        <p:cond delay="indefinite"/>
+                      </p:stCondLst>
+                      <p:childTnLst>
+                        <p:par>
+                          <p:cTn id="8" fill="hold">
+                            <p:stCondLst>
+                              <p:cond delay="0"/>
+                            </p:stCondLst>
+                            <p:childTnLst>
+                              <p:par>
+                                <p:cTn id="9" presetID="1" presetClass="entr" presetSubtype="0" fill="hold" nodeType="clickEffect">
+                                  <p:stCondLst>
+                                    <p:cond delay="0"/>
+                                  </p:stCondLst>
+                                  <p:childTnLst>
+                                    <p:set>
+                                      <p:cBhvr>
+                                        <p:cTn id="10" dur="1" fill="hold">
+                                          <p:stCondLst>
+                                            <p:cond delay="0"/>
+                                          </p:stCondLst>
+                                        </p:cTn>
+                                        <p:tgtEl>
+                                          <p:spTgt spid="8"/>
+                                        </p:tgtEl>
+                                        <p:attrNameLst>
+                                          <p:attrName>style.visibility</p:attrName>
+                                        </p:attrNameLst>
+                                      </p:cBhvr>
+                                      <p:to>
+                                        <p:strVal val="visible"/>
+                                      </p:to>
+                                    </p:set>
+                                  </p:childTnLst>
+                                </p:cTn>
+                              </p:par>
+                              <p:par>
+                                <p:cTn id="11" presetID="1" presetClass="entr" presetSubtype="0" fill="hold" grpId="0" nodeType="withEffect">
+                                  <p:stCondLst>
+                                    <p:cond delay="0"/>
+                                  </p:stCondLst>
+                                  <p:childTnLst>
+                                    <p:set>
+                                      <p:cBhvr>
+                                        <p:cTn id="12" dur="1" fill="hold">
+                                          <p:stCondLst>
+                                            <p:cond delay="0"/>
+                                          </p:stCondLst>
+                                        </p:cTn>
+                                        <p:tgtEl>
+                                          <p:spTgt spid="6"/>
+                                        </p:tgtEl>
+                                        <p:attrNameLst>
+                                          <p:attrName>style.visibility</p:attrName>
+                                        </p:attrNameLst>
+                                      </p:cBhvr>
+                                      <p:to>
+                                        <p:strVal val="visible"/>
+                                      </p:to>
+                                    </p:set>
+                                  </p:childTnLst>
+                                </p:cTn>
+                              </p:par>
+                            </p:childTnLst>
+                          </p:cTn>
+                        </p:par>
+                      </p:childTnLst>
+                    </p:cTn>
+                  </p:par>
+                </p:childTnLst>
+              </p:cTn>
+              <p:prevCondLst>
+                <p:cond evt="onPrev" delay="0">
+                  <p:tgtEl>
+                    <p:sldTgt/>
+                  </p:tgtEl>
+                </p:cond>
+              </p:prevCondLst>
+              <p:nextCondLst>
+                <p:cond evt="onNext" delay="0">
+                  <p:tgtEl>
+                    <p:sldTgt/>
+                  </p:tgtEl>
+                </p:cond>
+              </p:nextCondLst>
+            </p:seq>
+          </p:childTnLst>
+        </p:cTn>
+      </p:par>
+    </p:tnLst>
+    <p:bldLst>
+      <p:bldP spid="4" grpId="0" animBg="1"/>
+      <p:bldP spid="6" grpId="0" animBg="1"/>
+    </p:bldLst>
+  </p:timing>
+</p:sld>
+</file>
+
+<file path=ppt/slides/slide28.xml><?xml version="1.0" encoding="utf-8"?>
+<p:sld xmlns:a="http://schemas.openxmlformats.org/drawingml/2006/main" xmlns:r="http://schemas.openxmlformats.org/officeDocument/2006/relationships" xmlns:p="http://schemas.openxmlformats.org/presentationml/2006/main">
+  <p:cSld>
+    <p:spTree>
+      <p:nvGrpSpPr>
+        <p:cNvPr id="1" name=""/>
+        <p:cNvGrpSpPr/>
+        <p:nvPr/>
+      </p:nvGrpSpPr>
+      <p:grpSpPr>
+        <a:xfrm>
+          <a:off x="0" y="0"/>
+          <a:ext cx="0" cy="0"/>
+          <a:chOff x="0" y="0"/>
+          <a:chExt cx="0" cy="0"/>
+        </a:xfrm>
+      </p:grpSpPr>
+      <p:sp>
+        <p:nvSpPr>
+          <p:cNvPr id="2" name="TextBox 1"/>
+          <p:cNvSpPr txBox="1"/>
+          <p:nvPr/>
+        </p:nvSpPr>
+        <p:spPr>
+          <a:xfrm>
+            <a:off x="2627784" y="1700808"/>
+            <a:ext cx="4239237" cy="1200329"/>
+          </a:xfrm>
+          <a:prstGeom prst="rect">
+            <a:avLst/>
+          </a:prstGeom>
+          <a:noFill/>
+        </p:spPr>
+        <p:txBody>
+          <a:bodyPr wrap="none" rtlCol="0">
+            <a:spAutoFit/>
+          </a:bodyPr>
+          <a:lstStyle/>
+          <a:p>
+            <a:r>
+              <a:rPr lang="en-GB" sz="7200" dirty="0" smtClean="0">
+                <a:solidFill>
+                  <a:srgbClr val="0070C0"/>
+                </a:solidFill>
+              </a:rPr>
+              <a:t>Exercises 4</a:t>
+            </a:r>
+            <a:endParaRPr lang="en-GB" sz="7200" dirty="0">
+              <a:solidFill>
+                <a:srgbClr val="0070C0"/>
+              </a:solidFill>
+            </a:endParaRPr>
+          </a:p>
+        </p:txBody>
+      </p:sp>
+      <p:sp>
+        <p:nvSpPr>
+          <p:cNvPr id="3" name="TextBox 2"/>
+          <p:cNvSpPr txBox="1"/>
+          <p:nvPr/>
+        </p:nvSpPr>
+        <p:spPr>
+          <a:xfrm>
+            <a:off x="1619672" y="3573016"/>
+            <a:ext cx="5784532" cy="646331"/>
+          </a:xfrm>
+          <a:prstGeom prst="rect">
+            <a:avLst/>
+          </a:prstGeom>
+          <a:noFill/>
+        </p:spPr>
+        <p:txBody>
+          <a:bodyPr wrap="none" rtlCol="0">
+            <a:spAutoFit/>
+          </a:bodyPr>
+          <a:lstStyle/>
+          <a:p>
+            <a:r>
+              <a:rPr lang="en-GB" sz="3600" dirty="0" smtClean="0">
+                <a:hlinkClick r:id="rId3"/>
+              </a:rPr>
+              <a:t>http://dominicprior.github.io/</a:t>
+            </a:r>
+            <a:endParaRPr lang="en-GB" sz="3600" dirty="0"/>
+          </a:p>
+        </p:txBody>
+      </p:sp>
+    </p:spTree>
+    <p:extLst>
+      <p:ext uri="{BB962C8B-B14F-4D97-AF65-F5344CB8AC3E}">
+        <p14:creationId xmlns:p14="http://schemas.microsoft.com/office/powerpoint/2010/main" val="335475097"/>
+      </p:ext>
+    </p:extLst>
+  </p:cSld>
+  <p:clrMapOvr>
+    <a:masterClrMapping/>
+  </p:clrMapOvr>
+  <p:timing>
+    <p:tnLst>
+      <p:par>
+        <p:cTn id="1" dur="indefinite" restart="never" nodeType="tmRoot"/>
+      </p:par>
+    </p:tnLst>
+  </p:timing>
+</p:sld>
+</file>
+
+<file path=ppt/slides/slide29.xml><?xml version="1.0" encoding="utf-8"?>
+<p:sld xmlns:a="http://schemas.openxmlformats.org/drawingml/2006/main" xmlns:r="http://schemas.openxmlformats.org/officeDocument/2006/relationships" xmlns:p="http://schemas.openxmlformats.org/presentationml/2006/main">
+  <p:cSld>
+    <p:spTree>
+      <p:nvGrpSpPr>
+        <p:cNvPr id="1" name=""/>
+        <p:cNvGrpSpPr/>
+        <p:nvPr/>
+      </p:nvGrpSpPr>
+      <p:grpSpPr>
+        <a:xfrm>
+          <a:off x="0" y="0"/>
+          <a:ext cx="0" cy="0"/>
+          <a:chOff x="0" y="0"/>
+          <a:chExt cx="0" cy="0"/>
+        </a:xfrm>
+      </p:grpSpPr>
+      <p:sp>
+        <p:nvSpPr>
+          <p:cNvPr id="2" name="TextBox 1"/>
+          <p:cNvSpPr txBox="1"/>
+          <p:nvPr/>
+        </p:nvSpPr>
+        <p:spPr>
+          <a:xfrm>
+            <a:off x="2915816" y="2516703"/>
+            <a:ext cx="3259226" cy="1200329"/>
+          </a:xfrm>
+          <a:prstGeom prst="rect">
+            <a:avLst/>
+          </a:prstGeom>
+          <a:noFill/>
+        </p:spPr>
+        <p:txBody>
+          <a:bodyPr wrap="none" rtlCol="0">
+            <a:spAutoFit/>
+          </a:bodyPr>
+          <a:lstStyle/>
+          <a:p>
+            <a:r>
+              <a:rPr lang="en-GB" sz="7200" dirty="0" smtClean="0">
+                <a:solidFill>
+                  <a:srgbClr val="0070C0"/>
+                </a:solidFill>
+              </a:rPr>
+              <a:t>Laziness</a:t>
+            </a:r>
+            <a:endParaRPr lang="en-GB" sz="7200" dirty="0">
+              <a:solidFill>
+                <a:srgbClr val="0070C0"/>
+              </a:solidFill>
+            </a:endParaRPr>
+          </a:p>
+        </p:txBody>
+      </p:sp>
+    </p:spTree>
+    <p:extLst>
+      <p:ext uri="{BB962C8B-B14F-4D97-AF65-F5344CB8AC3E}">
+        <p14:creationId xmlns:p14="http://schemas.microsoft.com/office/powerpoint/2010/main" val="3867282665"/>
+      </p:ext>
+    </p:extLst>
+  </p:cSld>
+  <p:clrMapOvr>
+    <a:masterClrMapping/>
+  </p:clrMapOvr>
+  <p:timing>
+    <p:tnLst>
+      <p:par>
+        <p:cTn id="1" dur="indefinite" restart="never" nodeType="tmRoot"/>
+      </p:par>
+    </p:tnLst>
   </p:timing>
 </p:sld>
 </file>
@@ -14282,759 +13669,6 @@
       </p:grpSpPr>
       <p:sp>
         <p:nvSpPr>
-          <p:cNvPr id="2" name="TextBox 1"/>
-          <p:cNvSpPr txBox="1"/>
-          <p:nvPr/>
-        </p:nvSpPr>
-        <p:spPr>
-          <a:xfrm>
-            <a:off x="323528" y="332656"/>
-            <a:ext cx="6340197" cy="3785652"/>
-          </a:xfrm>
-          <a:prstGeom prst="rect">
-            <a:avLst/>
-          </a:prstGeom>
-          <a:noFill/>
-          <a:ln>
-            <a:solidFill>
-              <a:schemeClr val="accent1"/>
-            </a:solidFill>
-          </a:ln>
-        </p:spPr>
-        <p:txBody>
-          <a:bodyPr wrap="none" rtlCol="0">
-            <a:spAutoFit/>
-          </a:bodyPr>
-          <a:lstStyle/>
-          <a:p>
-            <a:r>
-              <a:rPr lang="en-GB" sz="4000" dirty="0" smtClean="0">
-                <a:latin typeface="Courier New" panose="02070309020205020404" pitchFamily="49" charset="0"/>
-                <a:cs typeface="Courier New" panose="02070309020205020404" pitchFamily="49" charset="0"/>
-              </a:rPr>
-              <a:t>main </a:t>
-            </a:r>
-            <a:r>
-              <a:rPr lang="en-GB" sz="4000" dirty="0" smtClean="0">
-                <a:solidFill>
-                  <a:srgbClr val="FF0000"/>
-                </a:solidFill>
-                <a:latin typeface="Courier New" panose="02070309020205020404" pitchFamily="49" charset="0"/>
-                <a:cs typeface="Courier New" panose="02070309020205020404" pitchFamily="49" charset="0"/>
-              </a:rPr>
-              <a:t>=</a:t>
-            </a:r>
-            <a:r>
-              <a:rPr lang="en-GB" sz="4000" dirty="0" smtClean="0">
-                <a:latin typeface="Courier New" panose="02070309020205020404" pitchFamily="49" charset="0"/>
-                <a:cs typeface="Courier New" panose="02070309020205020404" pitchFamily="49" charset="0"/>
-              </a:rPr>
-              <a:t> </a:t>
-            </a:r>
-            <a:r>
-              <a:rPr lang="en-GB" sz="4000" dirty="0" smtClean="0">
-                <a:solidFill>
-                  <a:srgbClr val="0070C0"/>
-                </a:solidFill>
-                <a:latin typeface="Courier New" panose="02070309020205020404" pitchFamily="49" charset="0"/>
-                <a:cs typeface="Courier New" panose="02070309020205020404" pitchFamily="49" charset="0"/>
-              </a:rPr>
-              <a:t>do</a:t>
-            </a:r>
-          </a:p>
-          <a:p>
-            <a:r>
-              <a:rPr lang="en-GB" sz="4000" dirty="0">
-                <a:latin typeface="Courier New" panose="02070309020205020404" pitchFamily="49" charset="0"/>
-                <a:cs typeface="Courier New" panose="02070309020205020404" pitchFamily="49" charset="0"/>
-              </a:rPr>
-              <a:t> </a:t>
-            </a:r>
-            <a:r>
-              <a:rPr lang="en-GB" sz="4000" dirty="0" smtClean="0">
-                <a:latin typeface="Courier New" panose="02070309020205020404" pitchFamily="49" charset="0"/>
-                <a:cs typeface="Courier New" panose="02070309020205020404" pitchFamily="49" charset="0"/>
-              </a:rPr>
-              <a:t> str </a:t>
-            </a:r>
-            <a:r>
-              <a:rPr lang="en-GB" sz="4000" dirty="0" smtClean="0">
-                <a:solidFill>
-                  <a:srgbClr val="FF0000"/>
-                </a:solidFill>
-                <a:latin typeface="Courier New" panose="02070309020205020404" pitchFamily="49" charset="0"/>
-                <a:cs typeface="Courier New" panose="02070309020205020404" pitchFamily="49" charset="0"/>
-              </a:rPr>
-              <a:t>&lt;-</a:t>
-            </a:r>
-            <a:r>
-              <a:rPr lang="en-GB" sz="4000" dirty="0" smtClean="0">
-                <a:latin typeface="Courier New" panose="02070309020205020404" pitchFamily="49" charset="0"/>
-                <a:cs typeface="Courier New" panose="02070309020205020404" pitchFamily="49" charset="0"/>
-              </a:rPr>
-              <a:t> getContents</a:t>
-            </a:r>
-          </a:p>
-          <a:p>
-            <a:r>
-              <a:rPr lang="en-GB" sz="4000" dirty="0">
-                <a:latin typeface="Courier New" panose="02070309020205020404" pitchFamily="49" charset="0"/>
-                <a:cs typeface="Courier New" panose="02070309020205020404" pitchFamily="49" charset="0"/>
-              </a:rPr>
-              <a:t> </a:t>
-            </a:r>
-            <a:r>
-              <a:rPr lang="en-GB" sz="4000" dirty="0" smtClean="0">
-                <a:latin typeface="Courier New" panose="02070309020205020404" pitchFamily="49" charset="0"/>
-                <a:cs typeface="Courier New" panose="02070309020205020404" pitchFamily="49" charset="0"/>
-              </a:rPr>
-              <a:t> </a:t>
-            </a:r>
-            <a:r>
-              <a:rPr lang="en-GB" sz="4000" dirty="0" smtClean="0">
-                <a:solidFill>
-                  <a:srgbClr val="0070C0"/>
-                </a:solidFill>
-                <a:latin typeface="Courier New" panose="02070309020205020404" pitchFamily="49" charset="0"/>
-                <a:cs typeface="Courier New" panose="02070309020205020404" pitchFamily="49" charset="0"/>
-              </a:rPr>
-              <a:t>let</a:t>
-            </a:r>
-            <a:r>
-              <a:rPr lang="en-GB" sz="4000" dirty="0" smtClean="0">
-                <a:latin typeface="Courier New" panose="02070309020205020404" pitchFamily="49" charset="0"/>
-                <a:cs typeface="Courier New" panose="02070309020205020404" pitchFamily="49" charset="0"/>
-              </a:rPr>
-              <a:t> str' </a:t>
-            </a:r>
-            <a:r>
-              <a:rPr lang="en-GB" sz="4000" dirty="0" smtClean="0">
-                <a:solidFill>
-                  <a:srgbClr val="FF0000"/>
-                </a:solidFill>
-                <a:latin typeface="Courier New" panose="02070309020205020404" pitchFamily="49" charset="0"/>
-                <a:cs typeface="Courier New" panose="02070309020205020404" pitchFamily="49" charset="0"/>
-              </a:rPr>
-              <a:t>=</a:t>
-            </a:r>
-            <a:r>
-              <a:rPr lang="en-GB" sz="4000" dirty="0" smtClean="0">
-                <a:latin typeface="Courier New" panose="02070309020205020404" pitchFamily="49" charset="0"/>
-                <a:cs typeface="Courier New" panose="02070309020205020404" pitchFamily="49" charset="0"/>
-              </a:rPr>
-              <a:t> f str</a:t>
-            </a:r>
-          </a:p>
-          <a:p>
-            <a:r>
-              <a:rPr lang="en-GB" sz="4000" dirty="0">
-                <a:latin typeface="Courier New" panose="02070309020205020404" pitchFamily="49" charset="0"/>
-                <a:cs typeface="Courier New" panose="02070309020205020404" pitchFamily="49" charset="0"/>
-              </a:rPr>
-              <a:t> </a:t>
-            </a:r>
-            <a:r>
-              <a:rPr lang="en-GB" sz="4000" dirty="0" smtClean="0">
-                <a:latin typeface="Courier New" panose="02070309020205020404" pitchFamily="49" charset="0"/>
-                <a:cs typeface="Courier New" panose="02070309020205020404" pitchFamily="49" charset="0"/>
-              </a:rPr>
-              <a:t> putStr str'</a:t>
-            </a:r>
-          </a:p>
-          <a:p>
-            <a:endParaRPr lang="en-GB" sz="4000" dirty="0" smtClean="0">
-              <a:latin typeface="Courier New" panose="02070309020205020404" pitchFamily="49" charset="0"/>
-              <a:cs typeface="Courier New" panose="02070309020205020404" pitchFamily="49" charset="0"/>
-            </a:endParaRPr>
-          </a:p>
-          <a:p>
-            <a:r>
-              <a:rPr lang="en-GB" sz="4000" dirty="0" smtClean="0">
-                <a:latin typeface="Courier New" panose="02070309020205020404" pitchFamily="49" charset="0"/>
-                <a:cs typeface="Courier New" panose="02070309020205020404" pitchFamily="49" charset="0"/>
-              </a:rPr>
-              <a:t>f </a:t>
-            </a:r>
-            <a:r>
-              <a:rPr lang="en-GB" sz="4000" dirty="0" smtClean="0">
-                <a:solidFill>
-                  <a:srgbClr val="FF0000"/>
-                </a:solidFill>
-                <a:latin typeface="Courier New" panose="02070309020205020404" pitchFamily="49" charset="0"/>
-                <a:cs typeface="Courier New" panose="02070309020205020404" pitchFamily="49" charset="0"/>
-              </a:rPr>
-              <a:t>=</a:t>
-            </a:r>
-            <a:r>
-              <a:rPr lang="en-GB" sz="4000" dirty="0" smtClean="0">
-                <a:latin typeface="Courier New" panose="02070309020205020404" pitchFamily="49" charset="0"/>
-                <a:cs typeface="Courier New" panose="02070309020205020404" pitchFamily="49" charset="0"/>
-              </a:rPr>
-              <a:t> take 100</a:t>
-            </a:r>
-          </a:p>
-        </p:txBody>
-      </p:sp>
-      <p:sp>
-        <p:nvSpPr>
-          <p:cNvPr id="4" name="TextBox 3"/>
-          <p:cNvSpPr txBox="1"/>
-          <p:nvPr/>
-        </p:nvSpPr>
-        <p:spPr>
-          <a:xfrm>
-            <a:off x="323528" y="4725144"/>
-            <a:ext cx="8186857" cy="707886"/>
-          </a:xfrm>
-          <a:prstGeom prst="rect">
-            <a:avLst/>
-          </a:prstGeom>
-          <a:noFill/>
-          <a:ln>
-            <a:solidFill>
-              <a:schemeClr val="accent1"/>
-            </a:solidFill>
-          </a:ln>
-        </p:spPr>
-        <p:txBody>
-          <a:bodyPr wrap="none" rtlCol="0">
-            <a:spAutoFit/>
-          </a:bodyPr>
-          <a:lstStyle/>
-          <a:p>
-            <a:r>
-              <a:rPr lang="en-GB" sz="4000" dirty="0" smtClean="0">
-                <a:latin typeface="Courier New" panose="02070309020205020404" pitchFamily="49" charset="0"/>
-                <a:cs typeface="Courier New" panose="02070309020205020404" pitchFamily="49" charset="0"/>
-              </a:rPr>
-              <a:t>main </a:t>
-            </a:r>
-            <a:r>
-              <a:rPr lang="en-GB" sz="4000" dirty="0" smtClean="0">
-                <a:solidFill>
-                  <a:srgbClr val="FF0000"/>
-                </a:solidFill>
-                <a:latin typeface="Courier New" panose="02070309020205020404" pitchFamily="49" charset="0"/>
-                <a:cs typeface="Courier New" panose="02070309020205020404" pitchFamily="49" charset="0"/>
-              </a:rPr>
-              <a:t>=</a:t>
-            </a:r>
-            <a:r>
-              <a:rPr lang="en-GB" sz="4000" dirty="0" smtClean="0">
-                <a:latin typeface="Courier New" panose="02070309020205020404" pitchFamily="49" charset="0"/>
-                <a:cs typeface="Courier New" panose="02070309020205020404" pitchFamily="49" charset="0"/>
-              </a:rPr>
-              <a:t> interact </a:t>
-            </a:r>
-            <a:r>
-              <a:rPr lang="en-GB" sz="4000" dirty="0" smtClean="0">
-                <a:solidFill>
-                  <a:srgbClr val="FF0000"/>
-                </a:solidFill>
-                <a:latin typeface="Courier New" panose="02070309020205020404" pitchFamily="49" charset="0"/>
-                <a:cs typeface="Courier New" panose="02070309020205020404" pitchFamily="49" charset="0"/>
-              </a:rPr>
-              <a:t>$</a:t>
-            </a:r>
-            <a:r>
-              <a:rPr lang="en-GB" sz="4000" dirty="0" smtClean="0">
-                <a:latin typeface="Courier New" panose="02070309020205020404" pitchFamily="49" charset="0"/>
-                <a:cs typeface="Courier New" panose="02070309020205020404" pitchFamily="49" charset="0"/>
-              </a:rPr>
-              <a:t> take 100</a:t>
-            </a:r>
-          </a:p>
-        </p:txBody>
-      </p:sp>
-      <p:sp>
-        <p:nvSpPr>
-          <p:cNvPr id="6" name="TextBox 5"/>
-          <p:cNvSpPr txBox="1"/>
-          <p:nvPr/>
-        </p:nvSpPr>
-        <p:spPr>
-          <a:xfrm>
-            <a:off x="107504" y="6002124"/>
-            <a:ext cx="8561959" cy="523220"/>
-          </a:xfrm>
-          <a:prstGeom prst="rect">
-            <a:avLst/>
-          </a:prstGeom>
-          <a:noFill/>
-          <a:ln>
-            <a:solidFill>
-              <a:schemeClr val="accent1">
-                <a:shade val="95000"/>
-                <a:satMod val="105000"/>
-              </a:schemeClr>
-            </a:solidFill>
-          </a:ln>
-        </p:spPr>
-        <p:txBody>
-          <a:bodyPr wrap="none" rtlCol="0">
-            <a:spAutoFit/>
-          </a:bodyPr>
-          <a:lstStyle/>
-          <a:p>
-            <a:r>
-              <a:rPr lang="en-GB" sz="2800" dirty="0" smtClean="0">
-                <a:latin typeface="Courier New" panose="02070309020205020404" pitchFamily="49" charset="0"/>
-                <a:cs typeface="Courier New" panose="02070309020205020404" pitchFamily="49" charset="0"/>
-              </a:rPr>
-              <a:t>interact </a:t>
-            </a:r>
-            <a:r>
-              <a:rPr lang="en-GB" sz="2800" dirty="0" smtClean="0">
-                <a:solidFill>
-                  <a:srgbClr val="FF0000"/>
-                </a:solidFill>
-                <a:latin typeface="Courier New" panose="02070309020205020404" pitchFamily="49" charset="0"/>
-                <a:cs typeface="Courier New" panose="02070309020205020404" pitchFamily="49" charset="0"/>
-              </a:rPr>
-              <a:t>::</a:t>
-            </a:r>
-            <a:r>
-              <a:rPr lang="en-GB" sz="2800" dirty="0" smtClean="0">
-                <a:latin typeface="Courier New" panose="02070309020205020404" pitchFamily="49" charset="0"/>
-                <a:cs typeface="Courier New" panose="02070309020205020404" pitchFamily="49" charset="0"/>
-              </a:rPr>
-              <a:t> (String </a:t>
-            </a:r>
-            <a:r>
-              <a:rPr lang="en-GB" sz="2800" dirty="0" smtClean="0">
-                <a:solidFill>
-                  <a:srgbClr val="FF0000"/>
-                </a:solidFill>
-                <a:latin typeface="Courier New" panose="02070309020205020404" pitchFamily="49" charset="0"/>
-                <a:cs typeface="Courier New" panose="02070309020205020404" pitchFamily="49" charset="0"/>
-              </a:rPr>
-              <a:t>-&gt;</a:t>
-            </a:r>
-            <a:r>
-              <a:rPr lang="en-GB" sz="2800" dirty="0" smtClean="0">
-                <a:latin typeface="Courier New" panose="02070309020205020404" pitchFamily="49" charset="0"/>
-                <a:cs typeface="Courier New" panose="02070309020205020404" pitchFamily="49" charset="0"/>
-              </a:rPr>
-              <a:t> String) </a:t>
-            </a:r>
-            <a:r>
-              <a:rPr lang="en-GB" sz="2800" dirty="0" smtClean="0">
-                <a:solidFill>
-                  <a:srgbClr val="FF0000"/>
-                </a:solidFill>
-                <a:latin typeface="Courier New" panose="02070309020205020404" pitchFamily="49" charset="0"/>
-                <a:cs typeface="Courier New" panose="02070309020205020404" pitchFamily="49" charset="0"/>
-              </a:rPr>
-              <a:t>-&gt;</a:t>
-            </a:r>
-            <a:r>
-              <a:rPr lang="en-GB" sz="2800" dirty="0" smtClean="0">
-                <a:latin typeface="Courier New" panose="02070309020205020404" pitchFamily="49" charset="0"/>
-                <a:cs typeface="Courier New" panose="02070309020205020404" pitchFamily="49" charset="0"/>
-              </a:rPr>
-              <a:t> IO ()</a:t>
-            </a:r>
-          </a:p>
-        </p:txBody>
-      </p:sp>
-      <p:cxnSp>
-        <p:nvCxnSpPr>
-          <p:cNvPr id="8" name="Straight Arrow Connector 7"/>
-          <p:cNvCxnSpPr/>
-          <p:nvPr/>
-        </p:nvCxnSpPr>
-        <p:spPr>
-          <a:xfrm flipV="1">
-            <a:off x="1475656" y="5589240"/>
-            <a:ext cx="936104" cy="412884"/>
-          </a:xfrm>
-          <a:prstGeom prst="straightConnector1">
-            <a:avLst/>
-          </a:prstGeom>
-          <a:ln w="28575">
-            <a:tailEnd type="arrow"/>
-          </a:ln>
-        </p:spPr>
-        <p:style>
-          <a:lnRef idx="1">
-            <a:schemeClr val="accent1"/>
-          </a:lnRef>
-          <a:fillRef idx="0">
-            <a:schemeClr val="accent1"/>
-          </a:fillRef>
-          <a:effectRef idx="0">
-            <a:schemeClr val="accent1"/>
-          </a:effectRef>
-          <a:fontRef idx="minor">
-            <a:schemeClr val="tx1"/>
-          </a:fontRef>
-        </p:style>
-      </p:cxnSp>
-    </p:spTree>
-    <p:extLst>
-      <p:ext uri="{BB962C8B-B14F-4D97-AF65-F5344CB8AC3E}">
-        <p14:creationId xmlns:p14="http://schemas.microsoft.com/office/powerpoint/2010/main" val="119479251"/>
-      </p:ext>
-    </p:extLst>
-  </p:cSld>
-  <p:clrMapOvr>
-    <a:masterClrMapping/>
-  </p:clrMapOvr>
-  <p:timing>
-    <p:tnLst>
-      <p:par>
-        <p:cTn id="1" dur="indefinite" restart="never" nodeType="tmRoot">
-          <p:childTnLst>
-            <p:seq concurrent="1" nextAc="seek">
-              <p:cTn id="2" dur="indefinite" nodeType="mainSeq">
-                <p:childTnLst>
-                  <p:par>
-                    <p:cTn id="3" fill="hold">
-                      <p:stCondLst>
-                        <p:cond delay="indefinite"/>
-                      </p:stCondLst>
-                      <p:childTnLst>
-                        <p:par>
-                          <p:cTn id="4" fill="hold">
-                            <p:stCondLst>
-                              <p:cond delay="0"/>
-                            </p:stCondLst>
-                            <p:childTnLst>
-                              <p:par>
-                                <p:cTn id="5" presetID="1" presetClass="entr" presetSubtype="0" fill="hold" grpId="0" nodeType="clickEffect">
-                                  <p:stCondLst>
-                                    <p:cond delay="0"/>
-                                  </p:stCondLst>
-                                  <p:childTnLst>
-                                    <p:set>
-                                      <p:cBhvr>
-                                        <p:cTn id="6" dur="1" fill="hold">
-                                          <p:stCondLst>
-                                            <p:cond delay="0"/>
-                                          </p:stCondLst>
-                                        </p:cTn>
-                                        <p:tgtEl>
-                                          <p:spTgt spid="4"/>
-                                        </p:tgtEl>
-                                        <p:attrNameLst>
-                                          <p:attrName>style.visibility</p:attrName>
-                                        </p:attrNameLst>
-                                      </p:cBhvr>
-                                      <p:to>
-                                        <p:strVal val="visible"/>
-                                      </p:to>
-                                    </p:set>
-                                  </p:childTnLst>
-                                </p:cTn>
-                              </p:par>
-                            </p:childTnLst>
-                          </p:cTn>
-                        </p:par>
-                      </p:childTnLst>
-                    </p:cTn>
-                  </p:par>
-                  <p:par>
-                    <p:cTn id="7" fill="hold">
-                      <p:stCondLst>
-                        <p:cond delay="indefinite"/>
-                      </p:stCondLst>
-                      <p:childTnLst>
-                        <p:par>
-                          <p:cTn id="8" fill="hold">
-                            <p:stCondLst>
-                              <p:cond delay="0"/>
-                            </p:stCondLst>
-                            <p:childTnLst>
-                              <p:par>
-                                <p:cTn id="9" presetID="1" presetClass="entr" presetSubtype="0" fill="hold" nodeType="clickEffect">
-                                  <p:stCondLst>
-                                    <p:cond delay="0"/>
-                                  </p:stCondLst>
-                                  <p:childTnLst>
-                                    <p:set>
-                                      <p:cBhvr>
-                                        <p:cTn id="10" dur="1" fill="hold">
-                                          <p:stCondLst>
-                                            <p:cond delay="0"/>
-                                          </p:stCondLst>
-                                        </p:cTn>
-                                        <p:tgtEl>
-                                          <p:spTgt spid="8"/>
-                                        </p:tgtEl>
-                                        <p:attrNameLst>
-                                          <p:attrName>style.visibility</p:attrName>
-                                        </p:attrNameLst>
-                                      </p:cBhvr>
-                                      <p:to>
-                                        <p:strVal val="visible"/>
-                                      </p:to>
-                                    </p:set>
-                                  </p:childTnLst>
-                                </p:cTn>
-                              </p:par>
-                              <p:par>
-                                <p:cTn id="11" presetID="1" presetClass="entr" presetSubtype="0" fill="hold" grpId="0" nodeType="withEffect">
-                                  <p:stCondLst>
-                                    <p:cond delay="0"/>
-                                  </p:stCondLst>
-                                  <p:childTnLst>
-                                    <p:set>
-                                      <p:cBhvr>
-                                        <p:cTn id="12" dur="1" fill="hold">
-                                          <p:stCondLst>
-                                            <p:cond delay="0"/>
-                                          </p:stCondLst>
-                                        </p:cTn>
-                                        <p:tgtEl>
-                                          <p:spTgt spid="6"/>
-                                        </p:tgtEl>
-                                        <p:attrNameLst>
-                                          <p:attrName>style.visibility</p:attrName>
-                                        </p:attrNameLst>
-                                      </p:cBhvr>
-                                      <p:to>
-                                        <p:strVal val="visible"/>
-                                      </p:to>
-                                    </p:set>
-                                  </p:childTnLst>
-                                </p:cTn>
-                              </p:par>
-                            </p:childTnLst>
-                          </p:cTn>
-                        </p:par>
-                      </p:childTnLst>
-                    </p:cTn>
-                  </p:par>
-                </p:childTnLst>
-              </p:cTn>
-              <p:prevCondLst>
-                <p:cond evt="onPrev" delay="0">
-                  <p:tgtEl>
-                    <p:sldTgt/>
-                  </p:tgtEl>
-                </p:cond>
-              </p:prevCondLst>
-              <p:nextCondLst>
-                <p:cond evt="onNext" delay="0">
-                  <p:tgtEl>
-                    <p:sldTgt/>
-                  </p:tgtEl>
-                </p:cond>
-              </p:nextCondLst>
-            </p:seq>
-          </p:childTnLst>
-        </p:cTn>
-      </p:par>
-    </p:tnLst>
-    <p:bldLst>
-      <p:bldP spid="4" grpId="0" animBg="1"/>
-      <p:bldP spid="6" grpId="0" animBg="1"/>
-    </p:bldLst>
-  </p:timing>
-</p:sld>
-</file>
-
-<file path=ppt/slides/slide31.xml><?xml version="1.0" encoding="utf-8"?>
-<p:sld xmlns:a="http://schemas.openxmlformats.org/drawingml/2006/main" xmlns:r="http://schemas.openxmlformats.org/officeDocument/2006/relationships" xmlns:p="http://schemas.openxmlformats.org/presentationml/2006/main">
-  <p:cSld>
-    <p:spTree>
-      <p:nvGrpSpPr>
-        <p:cNvPr id="1" name=""/>
-        <p:cNvGrpSpPr/>
-        <p:nvPr/>
-      </p:nvGrpSpPr>
-      <p:grpSpPr>
-        <a:xfrm>
-          <a:off x="0" y="0"/>
-          <a:ext cx="0" cy="0"/>
-          <a:chOff x="0" y="0"/>
-          <a:chExt cx="0" cy="0"/>
-        </a:xfrm>
-      </p:grpSpPr>
-      <p:sp>
-        <p:nvSpPr>
-          <p:cNvPr id="2" name="TextBox 1"/>
-          <p:cNvSpPr txBox="1"/>
-          <p:nvPr/>
-        </p:nvSpPr>
-        <p:spPr>
-          <a:xfrm>
-            <a:off x="2627784" y="1700808"/>
-            <a:ext cx="4239237" cy="1200329"/>
-          </a:xfrm>
-          <a:prstGeom prst="rect">
-            <a:avLst/>
-          </a:prstGeom>
-          <a:noFill/>
-        </p:spPr>
-        <p:txBody>
-          <a:bodyPr wrap="none" rtlCol="0">
-            <a:spAutoFit/>
-          </a:bodyPr>
-          <a:lstStyle/>
-          <a:p>
-            <a:r>
-              <a:rPr lang="en-GB" sz="7200" dirty="0" smtClean="0">
-                <a:solidFill>
-                  <a:srgbClr val="0070C0"/>
-                </a:solidFill>
-              </a:rPr>
-              <a:t>Exercises 4</a:t>
-            </a:r>
-            <a:endParaRPr lang="en-GB" sz="7200" dirty="0">
-              <a:solidFill>
-                <a:srgbClr val="0070C0"/>
-              </a:solidFill>
-            </a:endParaRPr>
-          </a:p>
-        </p:txBody>
-      </p:sp>
-      <p:sp>
-        <p:nvSpPr>
-          <p:cNvPr id="3" name="TextBox 2"/>
-          <p:cNvSpPr txBox="1"/>
-          <p:nvPr/>
-        </p:nvSpPr>
-        <p:spPr>
-          <a:xfrm>
-            <a:off x="1619672" y="3573016"/>
-            <a:ext cx="5784532" cy="646331"/>
-          </a:xfrm>
-          <a:prstGeom prst="rect">
-            <a:avLst/>
-          </a:prstGeom>
-          <a:noFill/>
-        </p:spPr>
-        <p:txBody>
-          <a:bodyPr wrap="none" rtlCol="0">
-            <a:spAutoFit/>
-          </a:bodyPr>
-          <a:lstStyle/>
-          <a:p>
-            <a:r>
-              <a:rPr lang="en-GB" sz="3600" dirty="0" smtClean="0">
-                <a:hlinkClick r:id="rId3"/>
-              </a:rPr>
-              <a:t>http://dominicprior.github.io/</a:t>
-            </a:r>
-            <a:endParaRPr lang="en-GB" sz="3600" dirty="0"/>
-          </a:p>
-        </p:txBody>
-      </p:sp>
-    </p:spTree>
-    <p:extLst>
-      <p:ext uri="{BB962C8B-B14F-4D97-AF65-F5344CB8AC3E}">
-        <p14:creationId xmlns:p14="http://schemas.microsoft.com/office/powerpoint/2010/main" val="335475097"/>
-      </p:ext>
-    </p:extLst>
-  </p:cSld>
-  <p:clrMapOvr>
-    <a:masterClrMapping/>
-  </p:clrMapOvr>
-  <p:timing>
-    <p:tnLst>
-      <p:par>
-        <p:cTn id="1" dur="indefinite" restart="never" nodeType="tmRoot"/>
-      </p:par>
-    </p:tnLst>
-  </p:timing>
-</p:sld>
-</file>
-
-<file path=ppt/slides/slide32.xml><?xml version="1.0" encoding="utf-8"?>
-<p:sld xmlns:a="http://schemas.openxmlformats.org/drawingml/2006/main" xmlns:r="http://schemas.openxmlformats.org/officeDocument/2006/relationships" xmlns:p="http://schemas.openxmlformats.org/presentationml/2006/main">
-  <p:cSld>
-    <p:spTree>
-      <p:nvGrpSpPr>
-        <p:cNvPr id="1" name=""/>
-        <p:cNvGrpSpPr/>
-        <p:nvPr/>
-      </p:nvGrpSpPr>
-      <p:grpSpPr>
-        <a:xfrm>
-          <a:off x="0" y="0"/>
-          <a:ext cx="0" cy="0"/>
-          <a:chOff x="0" y="0"/>
-          <a:chExt cx="0" cy="0"/>
-        </a:xfrm>
-      </p:grpSpPr>
-      <p:sp>
-        <p:nvSpPr>
-          <p:cNvPr id="2" name="TextBox 1"/>
-          <p:cNvSpPr txBox="1"/>
-          <p:nvPr/>
-        </p:nvSpPr>
-        <p:spPr>
-          <a:xfrm>
-            <a:off x="2915816" y="2516703"/>
-            <a:ext cx="3259226" cy="1200329"/>
-          </a:xfrm>
-          <a:prstGeom prst="rect">
-            <a:avLst/>
-          </a:prstGeom>
-          <a:noFill/>
-        </p:spPr>
-        <p:txBody>
-          <a:bodyPr wrap="none" rtlCol="0">
-            <a:spAutoFit/>
-          </a:bodyPr>
-          <a:lstStyle/>
-          <a:p>
-            <a:r>
-              <a:rPr lang="en-GB" sz="7200" dirty="0" smtClean="0">
-                <a:solidFill>
-                  <a:srgbClr val="0070C0"/>
-                </a:solidFill>
-              </a:rPr>
-              <a:t>Laziness</a:t>
-            </a:r>
-            <a:endParaRPr lang="en-GB" sz="7200" dirty="0">
-              <a:solidFill>
-                <a:srgbClr val="0070C0"/>
-              </a:solidFill>
-            </a:endParaRPr>
-          </a:p>
-        </p:txBody>
-      </p:sp>
-    </p:spTree>
-    <p:extLst>
-      <p:ext uri="{BB962C8B-B14F-4D97-AF65-F5344CB8AC3E}">
-        <p14:creationId xmlns:p14="http://schemas.microsoft.com/office/powerpoint/2010/main" val="3867282665"/>
-      </p:ext>
-    </p:extLst>
-  </p:cSld>
-  <p:clrMapOvr>
-    <a:masterClrMapping/>
-  </p:clrMapOvr>
-  <p:timing>
-    <p:tnLst>
-      <p:par>
-        <p:cTn id="1" dur="indefinite" restart="never" nodeType="tmRoot"/>
-      </p:par>
-    </p:tnLst>
-  </p:timing>
-</p:sld>
-</file>
-
-<file path=ppt/slides/slide33.xml><?xml version="1.0" encoding="utf-8"?>
-<p:sld xmlns:a="http://schemas.openxmlformats.org/drawingml/2006/main" xmlns:r="http://schemas.openxmlformats.org/officeDocument/2006/relationships" xmlns:p="http://schemas.openxmlformats.org/presentationml/2006/main">
-  <p:cSld>
-    <p:spTree>
-      <p:nvGrpSpPr>
-        <p:cNvPr id="1" name=""/>
-        <p:cNvGrpSpPr/>
-        <p:nvPr/>
-      </p:nvGrpSpPr>
-      <p:grpSpPr>
-        <a:xfrm>
-          <a:off x="0" y="0"/>
-          <a:ext cx="0" cy="0"/>
-          <a:chOff x="0" y="0"/>
-          <a:chExt cx="0" cy="0"/>
-        </a:xfrm>
-      </p:grpSpPr>
-      <p:sp>
-        <p:nvSpPr>
           <p:cNvPr id="3" name="TextBox 2"/>
           <p:cNvSpPr txBox="1"/>
           <p:nvPr/>
@@ -15704,10 +14338,6 @@
               </a:rPr>
               <a:t>(*)</a:t>
             </a:r>
-            <a:endParaRPr lang="en-GB" sz="5400" dirty="0" smtClean="0">
-              <a:latin typeface="Courier New" panose="02070309020205020404" pitchFamily="49" charset="0"/>
-              <a:cs typeface="Courier New" panose="02070309020205020404" pitchFamily="49" charset="0"/>
-            </a:endParaRPr>
           </a:p>
         </p:txBody>
       </p:sp>
@@ -15776,13 +14406,6 @@
               </a:rPr>
               <a:t>number</a:t>
             </a:r>
-            <a:endParaRPr lang="en-GB" sz="4400" i="1" dirty="0" smtClean="0">
-              <a:solidFill>
-                <a:srgbClr val="7030A0"/>
-              </a:solidFill>
-              <a:latin typeface="Calibri" panose="020F0502020204030204" pitchFamily="34" charset="0"/>
-              <a:cs typeface="Courier New" panose="02070309020205020404" pitchFamily="49" charset="0"/>
-            </a:endParaRPr>
           </a:p>
         </p:txBody>
       </p:sp>
@@ -15818,13 +14441,6 @@
               </a:rPr>
               <a:t>number</a:t>
             </a:r>
-            <a:endParaRPr lang="en-GB" sz="4400" i="1" dirty="0" smtClean="0">
-              <a:solidFill>
-                <a:srgbClr val="7030A0"/>
-              </a:solidFill>
-              <a:latin typeface="Calibri" panose="020F0502020204030204" pitchFamily="34" charset="0"/>
-              <a:cs typeface="Courier New" panose="02070309020205020404" pitchFamily="49" charset="0"/>
-            </a:endParaRPr>
           </a:p>
         </p:txBody>
       </p:sp>
@@ -15902,13 +14518,6 @@
               </a:rPr>
               <a:t>number</a:t>
             </a:r>
-            <a:endParaRPr lang="en-GB" sz="4400" i="1" dirty="0" smtClean="0">
-              <a:solidFill>
-                <a:srgbClr val="7030A0"/>
-              </a:solidFill>
-              <a:latin typeface="Calibri" panose="020F0502020204030204" pitchFamily="34" charset="0"/>
-              <a:cs typeface="Courier New" panose="02070309020205020404" pitchFamily="49" charset="0"/>
-            </a:endParaRPr>
           </a:p>
         </p:txBody>
       </p:sp>
@@ -15941,10 +14550,6 @@
               </a:rPr>
               <a:t>(*2)</a:t>
             </a:r>
-            <a:endParaRPr lang="en-GB" sz="5400" dirty="0" smtClean="0">
-              <a:latin typeface="Courier New" panose="02070309020205020404" pitchFamily="49" charset="0"/>
-              <a:cs typeface="Courier New" panose="02070309020205020404" pitchFamily="49" charset="0"/>
-            </a:endParaRPr>
           </a:p>
         </p:txBody>
       </p:sp>
@@ -16013,13 +14618,6 @@
               </a:rPr>
               <a:t>number</a:t>
             </a:r>
-            <a:endParaRPr lang="en-GB" sz="4400" i="1" dirty="0" smtClean="0">
-              <a:solidFill>
-                <a:srgbClr val="7030A0"/>
-              </a:solidFill>
-              <a:latin typeface="Calibri" panose="020F0502020204030204" pitchFamily="34" charset="0"/>
-              <a:cs typeface="Courier New" panose="02070309020205020404" pitchFamily="49" charset="0"/>
-            </a:endParaRPr>
           </a:p>
         </p:txBody>
       </p:sp>
@@ -16055,13 +14653,6 @@
               </a:rPr>
               <a:t>number</a:t>
             </a:r>
-            <a:endParaRPr lang="en-GB" sz="4400" i="1" dirty="0" smtClean="0">
-              <a:solidFill>
-                <a:srgbClr val="7030A0"/>
-              </a:solidFill>
-              <a:latin typeface="Calibri" panose="020F0502020204030204" pitchFamily="34" charset="0"/>
-              <a:cs typeface="Courier New" panose="02070309020205020404" pitchFamily="49" charset="0"/>
-            </a:endParaRPr>
           </a:p>
         </p:txBody>
       </p:sp>
@@ -16705,14 +15296,7 @@
                 <a:latin typeface="Courier New" panose="02070309020205020404" pitchFamily="49" charset="0"/>
                 <a:cs typeface="Courier New" panose="02070309020205020404" pitchFamily="49" charset="0"/>
               </a:rPr>
-              <a:t>sin </a:t>
-            </a:r>
-            <a:r>
-              <a:rPr lang="en-GB" sz="4400" dirty="0" smtClean="0">
-                <a:latin typeface="Courier New" panose="02070309020205020404" pitchFamily="49" charset="0"/>
-                <a:cs typeface="Courier New" panose="02070309020205020404" pitchFamily="49" charset="0"/>
-              </a:rPr>
-              <a:t>(</a:t>
+              <a:t>sin (</a:t>
             </a:r>
             <a:r>
               <a:rPr lang="en-GB" sz="4400" i="1" dirty="0" smtClean="0">
@@ -17136,35 +15720,7 @@
                 <a:latin typeface="Courier New" panose="02070309020205020404" pitchFamily="49" charset="0"/>
                 <a:cs typeface="Courier New" panose="02070309020205020404" pitchFamily="49" charset="0"/>
               </a:rPr>
-              <a:t>map </a:t>
-            </a:r>
-            <a:r>
-              <a:rPr lang="en-GB" sz="4000" dirty="0" smtClean="0">
-                <a:latin typeface="Courier New" panose="02070309020205020404" pitchFamily="49" charset="0"/>
-                <a:cs typeface="Courier New" panose="02070309020205020404" pitchFamily="49" charset="0"/>
-              </a:rPr>
-              <a:t>(^2</a:t>
-            </a:r>
-            <a:r>
-              <a:rPr lang="en-GB" sz="4000" dirty="0" smtClean="0">
-                <a:latin typeface="Courier New" panose="02070309020205020404" pitchFamily="49" charset="0"/>
-                <a:cs typeface="Courier New" panose="02070309020205020404" pitchFamily="49" charset="0"/>
-              </a:rPr>
-              <a:t>) (</a:t>
-            </a:r>
-            <a:r>
-              <a:rPr lang="en-GB" sz="4000" dirty="0" smtClean="0">
-                <a:latin typeface="Courier New" panose="02070309020205020404" pitchFamily="49" charset="0"/>
-                <a:cs typeface="Courier New" panose="02070309020205020404" pitchFamily="49" charset="0"/>
-              </a:rPr>
-              <a:t>filter odd [1..5</a:t>
-            </a:r>
-            <a:r>
-              <a:rPr lang="en-GB" sz="4000" dirty="0" smtClean="0">
-                <a:latin typeface="Courier New" panose="02070309020205020404" pitchFamily="49" charset="0"/>
-                <a:cs typeface="Courier New" panose="02070309020205020404" pitchFamily="49" charset="0"/>
-              </a:rPr>
-              <a:t>])</a:t>
+              <a:t>map (^2) (filter odd [1..5])</a:t>
             </a:r>
             <a:endParaRPr lang="en-GB" sz="4000" dirty="0">
               <a:latin typeface="Courier New" panose="02070309020205020404" pitchFamily="49" charset="0"/>
@@ -17200,21 +15756,7 @@
                 <a:latin typeface="Courier New" panose="02070309020205020404" pitchFamily="49" charset="0"/>
                 <a:cs typeface="Courier New" panose="02070309020205020404" pitchFamily="49" charset="0"/>
               </a:rPr>
-              <a:t>map </a:t>
-            </a:r>
-            <a:r>
-              <a:rPr lang="en-GB" sz="4000" dirty="0" smtClean="0">
-                <a:latin typeface="Courier New" panose="02070309020205020404" pitchFamily="49" charset="0"/>
-                <a:cs typeface="Courier New" panose="02070309020205020404" pitchFamily="49" charset="0"/>
-              </a:rPr>
-              <a:t>(^2</a:t>
-            </a:r>
-            <a:r>
-              <a:rPr lang="en-GB" sz="4000" dirty="0" smtClean="0">
-                <a:latin typeface="Courier New" panose="02070309020205020404" pitchFamily="49" charset="0"/>
-                <a:cs typeface="Courier New" panose="02070309020205020404" pitchFamily="49" charset="0"/>
-              </a:rPr>
-              <a:t>) </a:t>
+              <a:t>map (^2) </a:t>
             </a:r>
             <a:r>
               <a:rPr lang="en-GB" sz="4000" dirty="0" smtClean="0">
@@ -17231,21 +15773,7 @@
                 <a:latin typeface="Courier New" panose="02070309020205020404" pitchFamily="49" charset="0"/>
                 <a:cs typeface="Courier New" panose="02070309020205020404" pitchFamily="49" charset="0"/>
               </a:rPr>
-              <a:t> filter </a:t>
-            </a:r>
-            <a:r>
-              <a:rPr lang="en-GB" sz="4000" dirty="0" smtClean="0">
-                <a:latin typeface="Courier New" panose="02070309020205020404" pitchFamily="49" charset="0"/>
-                <a:cs typeface="Courier New" panose="02070309020205020404" pitchFamily="49" charset="0"/>
-              </a:rPr>
-              <a:t>odd [1..</a:t>
-            </a:r>
-            <a:r>
-              <a:rPr lang="en-GB" sz="4000" dirty="0" smtClean="0">
-                <a:latin typeface="Courier New" panose="02070309020205020404" pitchFamily="49" charset="0"/>
-                <a:cs typeface="Courier New" panose="02070309020205020404" pitchFamily="49" charset="0"/>
-              </a:rPr>
-              <a:t>5</a:t>
+              <a:t> filter odd [1..5</a:t>
             </a:r>
             <a:r>
               <a:rPr lang="en-GB" sz="4000" dirty="0">
@@ -17254,10 +15782,6 @@
               </a:rPr>
               <a:t>]</a:t>
             </a:r>
-            <a:endParaRPr lang="en-GB" sz="4000" dirty="0">
-              <a:latin typeface="Courier New" panose="02070309020205020404" pitchFamily="49" charset="0"/>
-              <a:cs typeface="Courier New" panose="02070309020205020404" pitchFamily="49" charset="0"/>
-            </a:endParaRPr>
           </a:p>
         </p:txBody>
       </p:sp>
@@ -17303,13 +15827,6 @@
               </a:rPr>
               <a:t>$</a:t>
             </a:r>
-            <a:endParaRPr lang="en-GB" sz="4000" dirty="0" smtClean="0">
-              <a:solidFill>
-                <a:srgbClr val="FF0000"/>
-              </a:solidFill>
-              <a:latin typeface="Courier New" panose="02070309020205020404" pitchFamily="49" charset="0"/>
-              <a:cs typeface="Courier New" panose="02070309020205020404" pitchFamily="49" charset="0"/>
-            </a:endParaRPr>
           </a:p>
           <a:p>
             <a:r>
@@ -17317,21 +15834,7 @@
                 <a:latin typeface="Courier New" panose="02070309020205020404" pitchFamily="49" charset="0"/>
                 <a:cs typeface="Courier New" panose="02070309020205020404" pitchFamily="49" charset="0"/>
               </a:rPr>
-              <a:t>  map </a:t>
-            </a:r>
-            <a:r>
-              <a:rPr lang="en-GB" sz="4000" dirty="0" smtClean="0">
-                <a:latin typeface="Courier New" panose="02070309020205020404" pitchFamily="49" charset="0"/>
-                <a:cs typeface="Courier New" panose="02070309020205020404" pitchFamily="49" charset="0"/>
-              </a:rPr>
-              <a:t>(^2</a:t>
-            </a:r>
-            <a:r>
-              <a:rPr lang="en-GB" sz="4000" dirty="0" smtClean="0">
-                <a:latin typeface="Courier New" panose="02070309020205020404" pitchFamily="49" charset="0"/>
-                <a:cs typeface="Courier New" panose="02070309020205020404" pitchFamily="49" charset="0"/>
-              </a:rPr>
-              <a:t>) </a:t>
+              <a:t>  map (^2) </a:t>
             </a:r>
             <a:r>
               <a:rPr lang="en-GB" sz="4000" dirty="0" smtClean="0">
@@ -17343,13 +15846,6 @@
               </a:rPr>
               <a:t>$</a:t>
             </a:r>
-            <a:endParaRPr lang="en-GB" sz="4000" dirty="0" smtClean="0">
-              <a:solidFill>
-                <a:srgbClr val="FF0000"/>
-              </a:solidFill>
-              <a:latin typeface="Courier New" panose="02070309020205020404" pitchFamily="49" charset="0"/>
-              <a:cs typeface="Courier New" panose="02070309020205020404" pitchFamily="49" charset="0"/>
-            </a:endParaRPr>
           </a:p>
           <a:p>
             <a:r>
@@ -17364,28 +15860,7 @@
                 <a:latin typeface="Courier New" panose="02070309020205020404" pitchFamily="49" charset="0"/>
                 <a:cs typeface="Courier New" panose="02070309020205020404" pitchFamily="49" charset="0"/>
               </a:rPr>
-              <a:t>   </a:t>
-            </a:r>
-            <a:r>
-              <a:rPr lang="en-GB" sz="4000" dirty="0" smtClean="0">
-                <a:latin typeface="Courier New" panose="02070309020205020404" pitchFamily="49" charset="0"/>
-                <a:cs typeface="Courier New" panose="02070309020205020404" pitchFamily="49" charset="0"/>
-              </a:rPr>
-              <a:t>filter </a:t>
-            </a:r>
-            <a:r>
-              <a:rPr lang="en-GB" sz="4000" dirty="0" smtClean="0">
-                <a:latin typeface="Courier New" panose="02070309020205020404" pitchFamily="49" charset="0"/>
-                <a:cs typeface="Courier New" panose="02070309020205020404" pitchFamily="49" charset="0"/>
-              </a:rPr>
-              <a:t>odd [1..5</a:t>
-            </a:r>
-            <a:r>
-              <a:rPr lang="en-GB" sz="4000" dirty="0" smtClean="0">
-                <a:latin typeface="Courier New" panose="02070309020205020404" pitchFamily="49" charset="0"/>
-                <a:cs typeface="Courier New" panose="02070309020205020404" pitchFamily="49" charset="0"/>
-              </a:rPr>
-              <a:t>]</a:t>
+              <a:t>   filter odd [1..5]</a:t>
             </a:r>
             <a:endParaRPr lang="en-GB" sz="4000" dirty="0">
               <a:latin typeface="Courier New" panose="02070309020205020404" pitchFamily="49" charset="0"/>
@@ -17457,13 +15932,6 @@
               </a:rPr>
               <a:t>        some  odd  numbers</a:t>
             </a:r>
-            <a:endParaRPr lang="en-GB" sz="4400" i="1" dirty="0" smtClean="0">
-              <a:solidFill>
-                <a:srgbClr val="7030A0"/>
-              </a:solidFill>
-              <a:latin typeface="Calibri" panose="020F0502020204030204" pitchFamily="34" charset="0"/>
-              <a:cs typeface="Courier New" panose="02070309020205020404" pitchFamily="49" charset="0"/>
-            </a:endParaRPr>
           </a:p>
         </p:txBody>
       </p:sp>
@@ -17504,13 +15972,6 @@
               </a:rPr>
               <a:t>[1,3,5]</a:t>
             </a:r>
-            <a:endParaRPr lang="en-GB" sz="3200" dirty="0" smtClean="0">
-              <a:solidFill>
-                <a:srgbClr val="0070C0"/>
-              </a:solidFill>
-              <a:latin typeface="Courier New" panose="02070309020205020404" pitchFamily="49" charset="0"/>
-              <a:cs typeface="Courier New" panose="02070309020205020404" pitchFamily="49" charset="0"/>
-            </a:endParaRPr>
           </a:p>
         </p:txBody>
       </p:sp>
@@ -17551,13 +16012,6 @@
               </a:rPr>
               <a:t>[1,9,25]</a:t>
             </a:r>
-            <a:endParaRPr lang="en-GB" sz="3200" dirty="0" smtClean="0">
-              <a:solidFill>
-                <a:srgbClr val="0070C0"/>
-              </a:solidFill>
-              <a:latin typeface="Courier New" panose="02070309020205020404" pitchFamily="49" charset="0"/>
-              <a:cs typeface="Courier New" panose="02070309020205020404" pitchFamily="49" charset="0"/>
-            </a:endParaRPr>
           </a:p>
         </p:txBody>
       </p:sp>
@@ -17598,13 +16052,6 @@
               </a:rPr>
               <a:t>35</a:t>
             </a:r>
-            <a:endParaRPr lang="en-GB" sz="3200" dirty="0" smtClean="0">
-              <a:solidFill>
-                <a:srgbClr val="0070C0"/>
-              </a:solidFill>
-              <a:latin typeface="Courier New" panose="02070309020205020404" pitchFamily="49" charset="0"/>
-              <a:cs typeface="Courier New" panose="02070309020205020404" pitchFamily="49" charset="0"/>
-            </a:endParaRPr>
           </a:p>
         </p:txBody>
       </p:sp>

</xml_diff>